<commit_message>
Ajout sommaire et quelques images
</commit_message>
<xml_diff>
--- a/Présentation/Soutenance_Groupe25.pptx
+++ b/Présentation/Soutenance_Groupe25.pptx
@@ -9,10 +9,10 @@
     <p:sldMasterId id="2147483672" r:id="rId5"/>
   </p:sldMasterIdLst>
   <p:notesMasterIdLst>
-    <p:notesMasterId r:id="rId34"/>
+    <p:notesMasterId r:id="rId35"/>
   </p:notesMasterIdLst>
   <p:handoutMasterIdLst>
-    <p:handoutMasterId r:id="rId35"/>
+    <p:handoutMasterId r:id="rId36"/>
   </p:handoutMasterIdLst>
   <p:sldIdLst>
     <p:sldId id="257" r:id="rId6"/>
@@ -32,17 +32,18 @@
     <p:sldId id="279" r:id="rId20"/>
     <p:sldId id="280" r:id="rId21"/>
     <p:sldId id="281" r:id="rId22"/>
-    <p:sldId id="269" r:id="rId23"/>
-    <p:sldId id="270" r:id="rId24"/>
-    <p:sldId id="282" r:id="rId25"/>
-    <p:sldId id="283" r:id="rId26"/>
-    <p:sldId id="284" r:id="rId27"/>
-    <p:sldId id="285" r:id="rId28"/>
-    <p:sldId id="272" r:id="rId29"/>
-    <p:sldId id="271" r:id="rId30"/>
-    <p:sldId id="261" r:id="rId31"/>
-    <p:sldId id="273" r:id="rId32"/>
-    <p:sldId id="274" r:id="rId33"/>
+    <p:sldId id="286" r:id="rId23"/>
+    <p:sldId id="269" r:id="rId24"/>
+    <p:sldId id="270" r:id="rId25"/>
+    <p:sldId id="282" r:id="rId26"/>
+    <p:sldId id="283" r:id="rId27"/>
+    <p:sldId id="284" r:id="rId28"/>
+    <p:sldId id="285" r:id="rId29"/>
+    <p:sldId id="272" r:id="rId30"/>
+    <p:sldId id="271" r:id="rId31"/>
+    <p:sldId id="261" r:id="rId32"/>
+    <p:sldId id="273" r:id="rId33"/>
+    <p:sldId id="274" r:id="rId34"/>
   </p:sldIdLst>
   <p:sldSz cx="12192000" cy="6858000"/>
   <p:notesSz cx="6858000" cy="9144000"/>
@@ -1415,13 +1416,31 @@
           <a:bodyPr wrap="square">
             <a:spAutoFit/>
           </a:bodyPr>
-          <a:lstStyle/>
+          <a:lstStyle>
+            <a:defPPr>
+              <a:defRPr lang="fr-FR"/>
+            </a:defPPr>
+            <a:lvl1pPr algn="ctr">
+              <a:defRPr sz="4801" b="1">
+                <a:solidFill>
+                  <a:srgbClr val="006A5A"/>
+                </a:solidFill>
+                <a:effectLst>
+                  <a:glow rad="101600">
+                    <a:schemeClr val="accent3">
+                      <a:satMod val="175000"/>
+                      <a:alpha val="40000"/>
+                    </a:schemeClr>
+                  </a:glow>
+                </a:effectLst>
+                <a:latin typeface="Gill Sans MT" panose="020B0502020104020203" pitchFamily="34" charset="0"/>
+              </a:defRPr>
+            </a:lvl1pPr>
+          </a:lstStyle>
           <a:p>
-            <a:pPr algn="ctr"/>
+            <a:pPr lvl="0"/>
             <a:r>
-              <a:rPr lang="fr-FR" sz="4801" dirty="0">
-                <a:latin typeface="Gill Sans MT" panose="020B0502020104020203" pitchFamily="34" charset="0"/>
-              </a:rPr>
+              <a:rPr lang="fr-FR" dirty="0"/>
               <a:t>Présentation du contexte</a:t>
             </a:r>
           </a:p>
@@ -1757,13 +1776,31 @@
           <a:bodyPr wrap="square">
             <a:spAutoFit/>
           </a:bodyPr>
-          <a:lstStyle/>
+          <a:lstStyle>
+            <a:defPPr>
+              <a:defRPr lang="fr-FR"/>
+            </a:defPPr>
+            <a:lvl1pPr lvl="0" algn="ctr">
+              <a:defRPr sz="4801" b="1">
+                <a:solidFill>
+                  <a:srgbClr val="006A5A"/>
+                </a:solidFill>
+                <a:effectLst>
+                  <a:glow rad="101600">
+                    <a:schemeClr val="accent3">
+                      <a:satMod val="175000"/>
+                      <a:alpha val="40000"/>
+                    </a:schemeClr>
+                  </a:glow>
+                </a:effectLst>
+                <a:latin typeface="Gill Sans MT" panose="020B0502020104020203" pitchFamily="34" charset="0"/>
+              </a:defRPr>
+            </a:lvl1pPr>
+          </a:lstStyle>
           <a:p>
-            <a:pPr algn="ctr"/>
+            <a:pPr lvl="0"/>
             <a:r>
-              <a:rPr lang="fr-FR" sz="4801" dirty="0">
-                <a:latin typeface="Gill Sans MT" panose="020B0502020104020203" pitchFamily="34" charset="0"/>
-              </a:rPr>
+              <a:rPr lang="fr-FR" dirty="0"/>
               <a:t>Méthodologie</a:t>
             </a:r>
           </a:p>
@@ -2099,13 +2136,31 @@
           <a:bodyPr wrap="square">
             <a:spAutoFit/>
           </a:bodyPr>
-          <a:lstStyle/>
+          <a:lstStyle>
+            <a:defPPr>
+              <a:defRPr lang="fr-FR"/>
+            </a:defPPr>
+            <a:lvl1pPr lvl="0" algn="ctr">
+              <a:defRPr sz="4801" b="1">
+                <a:solidFill>
+                  <a:srgbClr val="006A5A"/>
+                </a:solidFill>
+                <a:effectLst>
+                  <a:glow rad="101600">
+                    <a:schemeClr val="accent3">
+                      <a:satMod val="175000"/>
+                      <a:alpha val="40000"/>
+                    </a:schemeClr>
+                  </a:glow>
+                </a:effectLst>
+                <a:latin typeface="Gill Sans MT" panose="020B0502020104020203" pitchFamily="34" charset="0"/>
+              </a:defRPr>
+            </a:lvl1pPr>
+          </a:lstStyle>
           <a:p>
-            <a:pPr algn="ctr"/>
+            <a:pPr lvl="0"/>
             <a:r>
-              <a:rPr lang="fr-FR" sz="4801" dirty="0">
-                <a:latin typeface="Gill Sans MT" panose="020B0502020104020203" pitchFamily="34" charset="0"/>
-              </a:rPr>
+              <a:rPr lang="fr-FR" dirty="0"/>
               <a:t>Analyse descriptive</a:t>
             </a:r>
           </a:p>
@@ -2445,8 +2500,21 @@
           <a:p>
             <a:pPr algn="ctr"/>
             <a:r>
-              <a:rPr lang="fr-FR" sz="4801" dirty="0">
+              <a:rPr lang="fr-FR" sz="4801" b="1" kern="1200" dirty="0">
+                <a:solidFill>
+                  <a:srgbClr val="006A5A"/>
+                </a:solidFill>
+                <a:effectLst>
+                  <a:glow rad="101600">
+                    <a:schemeClr val="accent3">
+                      <a:satMod val="175000"/>
+                      <a:alpha val="40000"/>
+                    </a:schemeClr>
+                  </a:glow>
+                </a:effectLst>
                 <a:latin typeface="Gill Sans MT" panose="020B0502020104020203" pitchFamily="34" charset="0"/>
+                <a:ea typeface="+mn-ea"/>
+                <a:cs typeface="+mn-cs"/>
               </a:rPr>
               <a:t>Modélisation</a:t>
             </a:r>
@@ -2787,8 +2855,21 @@
           <a:p>
             <a:pPr algn="ctr"/>
             <a:r>
-              <a:rPr lang="fr-FR" sz="4801" dirty="0">
+              <a:rPr lang="fr-FR" sz="4801" b="1" kern="1200" dirty="0">
+                <a:solidFill>
+                  <a:srgbClr val="006A5A"/>
+                </a:solidFill>
+                <a:effectLst>
+                  <a:glow rad="101600">
+                    <a:schemeClr val="accent3">
+                      <a:satMod val="175000"/>
+                      <a:alpha val="40000"/>
+                    </a:schemeClr>
+                  </a:glow>
+                </a:effectLst>
                 <a:latin typeface="Gill Sans MT" panose="020B0502020104020203" pitchFamily="34" charset="0"/>
+                <a:ea typeface="+mn-ea"/>
+                <a:cs typeface="+mn-cs"/>
               </a:rPr>
               <a:t>Discussion</a:t>
             </a:r>
@@ -6680,7 +6761,7 @@
                 </a:solidFill>
                 <a:latin typeface="Gill Sans MT" panose="020B0502020104020203" pitchFamily="34" charset="0"/>
               </a:rPr>
-              <a:t> ABDELWAHID,</a:t>
+              <a:t> ABDELWAHID</a:t>
             </a:r>
           </a:p>
           <a:p>
@@ -7350,6 +7431,42 @@
           </a:prstGeom>
         </p:spPr>
       </p:pic>
+      <p:pic>
+        <p:nvPicPr>
+          <p:cNvPr id="6" name="Image 5">
+            <a:extLst>
+              <a:ext uri="{FF2B5EF4-FFF2-40B4-BE49-F238E27FC236}">
+                <a16:creationId xmlns:a16="http://schemas.microsoft.com/office/drawing/2014/main" id="{5339FC60-85E4-F425-FF8C-EEE5DBDE192C}"/>
+              </a:ext>
+            </a:extLst>
+          </p:cNvPr>
+          <p:cNvPicPr>
+            <a:picLocks noChangeAspect="1"/>
+          </p:cNvPicPr>
+          <p:nvPr/>
+        </p:nvPicPr>
+        <p:blipFill>
+          <a:blip r:embed="rId4">
+            <a:extLst>
+              <a:ext uri="{28A0092B-C50C-407E-A947-70E740481C1C}">
+                <a14:useLocalDpi xmlns:a14="http://schemas.microsoft.com/office/drawing/2010/main" val="0"/>
+              </a:ext>
+            </a:extLst>
+          </a:blip>
+          <a:stretch>
+            <a:fillRect/>
+          </a:stretch>
+        </p:blipFill>
+        <p:spPr>
+          <a:xfrm>
+            <a:off x="4023052" y="1703428"/>
+            <a:ext cx="7584310" cy="4176074"/>
+          </a:xfrm>
+          <a:prstGeom prst="rect">
+            <a:avLst/>
+          </a:prstGeom>
+        </p:spPr>
+      </p:pic>
     </p:spTree>
     <p:extLst>
       <p:ext uri="{BB962C8B-B14F-4D97-AF65-F5344CB8AC3E}">
@@ -7692,6 +7809,42 @@
           <a:xfrm>
             <a:off x="11078692" y="266700"/>
             <a:ext cx="1170459" cy="1170459"/>
+          </a:xfrm>
+          <a:prstGeom prst="rect">
+            <a:avLst/>
+          </a:prstGeom>
+        </p:spPr>
+      </p:pic>
+      <p:pic>
+        <p:nvPicPr>
+          <p:cNvPr id="6" name="Image 5">
+            <a:extLst>
+              <a:ext uri="{FF2B5EF4-FFF2-40B4-BE49-F238E27FC236}">
+                <a16:creationId xmlns:a16="http://schemas.microsoft.com/office/drawing/2014/main" id="{58EDE191-80B6-E256-D070-BA0E959C43C1}"/>
+              </a:ext>
+            </a:extLst>
+          </p:cNvPr>
+          <p:cNvPicPr>
+            <a:picLocks noChangeAspect="1"/>
+          </p:cNvPicPr>
+          <p:nvPr/>
+        </p:nvPicPr>
+        <p:blipFill>
+          <a:blip r:embed="rId4">
+            <a:extLst>
+              <a:ext uri="{28A0092B-C50C-407E-A947-70E740481C1C}">
+                <a14:useLocalDpi xmlns:a14="http://schemas.microsoft.com/office/drawing/2010/main" val="0"/>
+              </a:ext>
+            </a:extLst>
+          </a:blip>
+          <a:stretch>
+            <a:fillRect/>
+          </a:stretch>
+        </p:blipFill>
+        <p:spPr>
+          <a:xfrm>
+            <a:off x="4864231" y="1703428"/>
+            <a:ext cx="6327324" cy="2601890"/>
           </a:xfrm>
           <a:prstGeom prst="rect">
             <a:avLst/>
@@ -8030,6 +8183,42 @@
           </a:prstGeom>
         </p:spPr>
       </p:pic>
+      <p:pic>
+        <p:nvPicPr>
+          <p:cNvPr id="10" name="Image 9">
+            <a:extLst>
+              <a:ext uri="{FF2B5EF4-FFF2-40B4-BE49-F238E27FC236}">
+                <a16:creationId xmlns:a16="http://schemas.microsoft.com/office/drawing/2014/main" id="{506D8B6A-6540-DE0F-D902-BAFDC4D7FC2E}"/>
+              </a:ext>
+            </a:extLst>
+          </p:cNvPr>
+          <p:cNvPicPr>
+            <a:picLocks noChangeAspect="1"/>
+          </p:cNvPicPr>
+          <p:nvPr/>
+        </p:nvPicPr>
+        <p:blipFill>
+          <a:blip r:embed="rId4">
+            <a:extLst>
+              <a:ext uri="{28A0092B-C50C-407E-A947-70E740481C1C}">
+                <a14:useLocalDpi xmlns:a14="http://schemas.microsoft.com/office/drawing/2010/main" val="0"/>
+              </a:ext>
+            </a:extLst>
+          </a:blip>
+          <a:stretch>
+            <a:fillRect/>
+          </a:stretch>
+        </p:blipFill>
+        <p:spPr>
+          <a:xfrm>
+            <a:off x="390421" y="1983683"/>
+            <a:ext cx="5476978" cy="3791754"/>
+          </a:xfrm>
+          <a:prstGeom prst="rect">
+            <a:avLst/>
+          </a:prstGeom>
+        </p:spPr>
+      </p:pic>
     </p:spTree>
     <p:extLst>
       <p:ext uri="{BB962C8B-B14F-4D97-AF65-F5344CB8AC3E}">
@@ -8048,7 +8237,13 @@
   <p:cSld>
     <p:spTree>
       <p:nvGrpSpPr>
-        <p:cNvPr id="1" name=""/>
+        <p:cNvPr id="1" name="">
+          <a:extLst>
+            <a:ext uri="{FF2B5EF4-FFF2-40B4-BE49-F238E27FC236}">
+              <a16:creationId xmlns:a16="http://schemas.microsoft.com/office/drawing/2014/main" id="{905C0218-4730-E7FC-389E-E2DFB35D845C}"/>
+            </a:ext>
+          </a:extLst>
+        </p:cNvPr>
         <p:cNvGrpSpPr/>
         <p:nvPr/>
       </p:nvGrpSpPr>
@@ -8065,7 +8260,7 @@
           <p:cNvPr id="2" name="Espace réservé du numéro de diapositive 1">
             <a:extLst>
               <a:ext uri="{FF2B5EF4-FFF2-40B4-BE49-F238E27FC236}">
-                <a16:creationId xmlns:a16="http://schemas.microsoft.com/office/drawing/2014/main" id="{99099CF5-8A9C-3CE8-6FAF-040793C642E9}"/>
+                <a16:creationId xmlns:a16="http://schemas.microsoft.com/office/drawing/2014/main" id="{BA0CA7D5-9545-5F30-1B00-C339B55C4A5A}"/>
               </a:ext>
             </a:extLst>
           </p:cNvPr>
@@ -8090,10 +8285,127 @@
           </a:p>
         </p:txBody>
       </p:sp>
+      <p:sp>
+        <p:nvSpPr>
+          <p:cNvPr id="3" name="ZoneTexte 2">
+            <a:extLst>
+              <a:ext uri="{FF2B5EF4-FFF2-40B4-BE49-F238E27FC236}">
+                <a16:creationId xmlns:a16="http://schemas.microsoft.com/office/drawing/2014/main" id="{0744BEE0-ACF6-7AA0-7C96-ACBDE12D1D38}"/>
+              </a:ext>
+            </a:extLst>
+          </p:cNvPr>
+          <p:cNvSpPr txBox="1"/>
+          <p:nvPr/>
+        </p:nvSpPr>
+        <p:spPr>
+          <a:xfrm>
+            <a:off x="2" y="532969"/>
+            <a:ext cx="12191999" cy="646331"/>
+          </a:xfrm>
+          <a:prstGeom prst="rect">
+            <a:avLst/>
+          </a:prstGeom>
+          <a:solidFill>
+            <a:srgbClr val="006A5A"/>
+          </a:solidFill>
+        </p:spPr>
+        <p:txBody>
+          <a:bodyPr wrap="square" rtlCol="0">
+            <a:spAutoFit/>
+          </a:bodyPr>
+          <a:lstStyle/>
+          <a:p>
+            <a:r>
+              <a:rPr lang="fr-FR" sz="3600" b="1" dirty="0">
+                <a:solidFill>
+                  <a:schemeClr val="bg1"/>
+                </a:solidFill>
+                <a:latin typeface="Gill Sans MT" panose="020B0502020104020203" pitchFamily="34" charset="0"/>
+              </a:rPr>
+              <a:t>3.4. Analyse spatiale</a:t>
+            </a:r>
+          </a:p>
+        </p:txBody>
+      </p:sp>
+      <p:pic>
+        <p:nvPicPr>
+          <p:cNvPr id="4" name="Graphique 3" descr="Flèches de chevron">
+            <a:extLst>
+              <a:ext uri="{FF2B5EF4-FFF2-40B4-BE49-F238E27FC236}">
+                <a16:creationId xmlns:a16="http://schemas.microsoft.com/office/drawing/2014/main" id="{494D4D24-E698-F55E-9951-D464D56B12C0}"/>
+              </a:ext>
+            </a:extLst>
+          </p:cNvPr>
+          <p:cNvPicPr>
+            <a:picLocks noChangeAspect="1"/>
+          </p:cNvPicPr>
+          <p:nvPr/>
+        </p:nvPicPr>
+        <p:blipFill>
+          <a:blip r:embed="rId2">
+            <a:extLst>
+              <a:ext uri="{28A0092B-C50C-407E-A947-70E740481C1C}">
+                <a14:useLocalDpi xmlns:a14="http://schemas.microsoft.com/office/drawing/2010/main" val="0"/>
+              </a:ext>
+              <a:ext uri="{96DAC541-7B7A-43D3-8B79-37D633B846F1}">
+                <asvg:svgBlip xmlns:asvg="http://schemas.microsoft.com/office/drawing/2016/SVG/main" r:embed="rId3"/>
+              </a:ext>
+            </a:extLst>
+          </a:blip>
+          <a:stretch>
+            <a:fillRect/>
+          </a:stretch>
+        </p:blipFill>
+        <p:spPr>
+          <a:xfrm>
+            <a:off x="11078692" y="266700"/>
+            <a:ext cx="1170459" cy="1170459"/>
+          </a:xfrm>
+          <a:prstGeom prst="rect">
+            <a:avLst/>
+          </a:prstGeom>
+        </p:spPr>
+      </p:pic>
+      <p:pic>
+        <p:nvPicPr>
+          <p:cNvPr id="8" name="Image 7">
+            <a:extLst>
+              <a:ext uri="{FF2B5EF4-FFF2-40B4-BE49-F238E27FC236}">
+                <a16:creationId xmlns:a16="http://schemas.microsoft.com/office/drawing/2014/main" id="{A4506E19-AFB1-D647-C157-3C009B0B76E9}"/>
+              </a:ext>
+            </a:extLst>
+          </p:cNvPr>
+          <p:cNvPicPr>
+            <a:picLocks noChangeAspect="1"/>
+          </p:cNvPicPr>
+          <p:nvPr/>
+        </p:nvPicPr>
+        <p:blipFill>
+          <a:blip r:embed="rId4">
+            <a:extLst>
+              <a:ext uri="{28A0092B-C50C-407E-A947-70E740481C1C}">
+                <a14:useLocalDpi xmlns:a14="http://schemas.microsoft.com/office/drawing/2010/main" val="0"/>
+              </a:ext>
+            </a:extLst>
+          </a:blip>
+          <a:stretch>
+            <a:fillRect/>
+          </a:stretch>
+        </p:blipFill>
+        <p:spPr>
+          <a:xfrm>
+            <a:off x="1489436" y="1437159"/>
+            <a:ext cx="6386141" cy="4887224"/>
+          </a:xfrm>
+          <a:prstGeom prst="rect">
+            <a:avLst/>
+          </a:prstGeom>
+        </p:spPr>
+      </p:pic>
     </p:spTree>
     <p:extLst>
       <p:ext uri="{BB962C8B-B14F-4D97-AF65-F5344CB8AC3E}">
-        <p14:creationId xmlns:p14="http://schemas.microsoft.com/office/powerpoint/2010/main" val="1774505122"/>
+        <p14:creationId xmlns:p14="http://schemas.microsoft.com/office/powerpoint/2010/main" val="948134466"/>
       </p:ext>
     </p:extLst>
   </p:cSld>
@@ -8108,13 +8420,7 @@
   <p:cSld>
     <p:spTree>
       <p:nvGrpSpPr>
-        <p:cNvPr id="1" name="">
-          <a:extLst>
-            <a:ext uri="{FF2B5EF4-FFF2-40B4-BE49-F238E27FC236}">
-              <a16:creationId xmlns:a16="http://schemas.microsoft.com/office/drawing/2014/main" id="{F30D924C-E715-F9B4-8AFC-FD07EA503B33}"/>
-            </a:ext>
-          </a:extLst>
-        </p:cNvPr>
+        <p:cNvPr id="1" name=""/>
         <p:cNvGrpSpPr/>
         <p:nvPr/>
       </p:nvGrpSpPr>
@@ -8131,7 +8437,7 @@
           <p:cNvPr id="2" name="Espace réservé du numéro de diapositive 1">
             <a:extLst>
               <a:ext uri="{FF2B5EF4-FFF2-40B4-BE49-F238E27FC236}">
-                <a16:creationId xmlns:a16="http://schemas.microsoft.com/office/drawing/2014/main" id="{882A90CC-7389-1CA4-89EF-B85F758E4EB7}"/>
+                <a16:creationId xmlns:a16="http://schemas.microsoft.com/office/drawing/2014/main" id="{99099CF5-8A9C-3CE8-6FAF-040793C642E9}"/>
               </a:ext>
             </a:extLst>
           </p:cNvPr>
@@ -8156,91 +8462,10 @@
           </a:p>
         </p:txBody>
       </p:sp>
-      <p:sp>
-        <p:nvSpPr>
-          <p:cNvPr id="3" name="ZoneTexte 2">
-            <a:extLst>
-              <a:ext uri="{FF2B5EF4-FFF2-40B4-BE49-F238E27FC236}">
-                <a16:creationId xmlns:a16="http://schemas.microsoft.com/office/drawing/2014/main" id="{9169FD9A-0F1A-F62A-EAF4-74284432E518}"/>
-              </a:ext>
-            </a:extLst>
-          </p:cNvPr>
-          <p:cNvSpPr txBox="1"/>
-          <p:nvPr/>
-        </p:nvSpPr>
-        <p:spPr>
-          <a:xfrm>
-            <a:off x="2" y="532969"/>
-            <a:ext cx="12191999" cy="646331"/>
-          </a:xfrm>
-          <a:prstGeom prst="rect">
-            <a:avLst/>
-          </a:prstGeom>
-          <a:solidFill>
-            <a:srgbClr val="006A5A"/>
-          </a:solidFill>
-        </p:spPr>
-        <p:txBody>
-          <a:bodyPr wrap="square" rtlCol="0">
-            <a:spAutoFit/>
-          </a:bodyPr>
-          <a:lstStyle/>
-          <a:p>
-            <a:r>
-              <a:rPr lang="fr-FR" sz="3600" b="1" dirty="0">
-                <a:solidFill>
-                  <a:schemeClr val="bg1"/>
-                </a:solidFill>
-                <a:latin typeface="Gill Sans MT" panose="020B0502020104020203" pitchFamily="34" charset="0"/>
-              </a:rPr>
-              <a:t>4.1. Choix des variables dans la modélisation</a:t>
-            </a:r>
-          </a:p>
-        </p:txBody>
-      </p:sp>
-      <p:pic>
-        <p:nvPicPr>
-          <p:cNvPr id="4" name="Graphique 3" descr="Flèches de chevron">
-            <a:extLst>
-              <a:ext uri="{FF2B5EF4-FFF2-40B4-BE49-F238E27FC236}">
-                <a16:creationId xmlns:a16="http://schemas.microsoft.com/office/drawing/2014/main" id="{1A92E601-022D-F8F3-C090-920665EE7490}"/>
-              </a:ext>
-            </a:extLst>
-          </p:cNvPr>
-          <p:cNvPicPr>
-            <a:picLocks noChangeAspect="1"/>
-          </p:cNvPicPr>
-          <p:nvPr/>
-        </p:nvPicPr>
-        <p:blipFill>
-          <a:blip r:embed="rId2">
-            <a:extLst>
-              <a:ext uri="{28A0092B-C50C-407E-A947-70E740481C1C}">
-                <a14:useLocalDpi xmlns:a14="http://schemas.microsoft.com/office/drawing/2010/main" val="0"/>
-              </a:ext>
-              <a:ext uri="{96DAC541-7B7A-43D3-8B79-37D633B846F1}">
-                <asvg:svgBlip xmlns:asvg="http://schemas.microsoft.com/office/drawing/2016/SVG/main" r:embed="rId3"/>
-              </a:ext>
-            </a:extLst>
-          </a:blip>
-          <a:stretch>
-            <a:fillRect/>
-          </a:stretch>
-        </p:blipFill>
-        <p:spPr>
-          <a:xfrm>
-            <a:off x="11078692" y="266700"/>
-            <a:ext cx="1170459" cy="1170459"/>
-          </a:xfrm>
-          <a:prstGeom prst="rect">
-            <a:avLst/>
-          </a:prstGeom>
-        </p:spPr>
-      </p:pic>
     </p:spTree>
     <p:extLst>
       <p:ext uri="{BB962C8B-B14F-4D97-AF65-F5344CB8AC3E}">
-        <p14:creationId xmlns:p14="http://schemas.microsoft.com/office/powerpoint/2010/main" val="982776663"/>
+        <p14:creationId xmlns:p14="http://schemas.microsoft.com/office/powerpoint/2010/main" val="1774505122"/>
       </p:ext>
     </p:extLst>
   </p:cSld>
@@ -8296,6 +8521,1042 @@
           </a:p>
         </p:txBody>
       </p:sp>
+      <p:sp>
+        <p:nvSpPr>
+          <p:cNvPr id="37" name="ZoneTexte 36">
+            <a:extLst>
+              <a:ext uri="{FF2B5EF4-FFF2-40B4-BE49-F238E27FC236}">
+                <a16:creationId xmlns:a16="http://schemas.microsoft.com/office/drawing/2014/main" id="{FA0D879D-042A-4F25-1CD5-D96DEFB6454D}"/>
+              </a:ext>
+            </a:extLst>
+          </p:cNvPr>
+          <p:cNvSpPr txBox="1"/>
+          <p:nvPr/>
+        </p:nvSpPr>
+        <p:spPr>
+          <a:xfrm>
+            <a:off x="608325" y="1137618"/>
+            <a:ext cx="5349415" cy="523348"/>
+          </a:xfrm>
+          <a:prstGeom prst="rect">
+            <a:avLst/>
+          </a:prstGeom>
+          <a:solidFill>
+            <a:srgbClr val="203864"/>
+          </a:solidFill>
+        </p:spPr>
+        <p:txBody>
+          <a:bodyPr wrap="square" rtlCol="0">
+            <a:spAutoFit/>
+          </a:bodyPr>
+          <a:lstStyle>
+            <a:defPPr>
+              <a:defRPr lang="fr-FR"/>
+            </a:defPPr>
+            <a:lvl1pPr>
+              <a:defRPr sz="2800">
+                <a:latin typeface="Gill Sans MT" panose="020B0502020104020203" pitchFamily="34" charset="0"/>
+              </a:defRPr>
+            </a:lvl1pPr>
+          </a:lstStyle>
+          <a:p>
+            <a:pPr algn="ctr"/>
+            <a:r>
+              <a:rPr lang="fr-FR" sz="2801" dirty="0">
+                <a:solidFill>
+                  <a:schemeClr val="bg1"/>
+                </a:solidFill>
+              </a:rPr>
+              <a:t>Introduction</a:t>
+            </a:r>
+          </a:p>
+        </p:txBody>
+      </p:sp>
+      <p:sp>
+        <p:nvSpPr>
+          <p:cNvPr id="38" name="ZoneTexte 37">
+            <a:extLst>
+              <a:ext uri="{FF2B5EF4-FFF2-40B4-BE49-F238E27FC236}">
+                <a16:creationId xmlns:a16="http://schemas.microsoft.com/office/drawing/2014/main" id="{E6E416B3-72D9-0991-E65A-5B6A86928C8F}"/>
+              </a:ext>
+            </a:extLst>
+          </p:cNvPr>
+          <p:cNvSpPr txBox="1"/>
+          <p:nvPr/>
+        </p:nvSpPr>
+        <p:spPr>
+          <a:xfrm>
+            <a:off x="632035" y="5689079"/>
+            <a:ext cx="5325706" cy="523348"/>
+          </a:xfrm>
+          <a:prstGeom prst="rect">
+            <a:avLst/>
+          </a:prstGeom>
+          <a:solidFill>
+            <a:srgbClr val="203864"/>
+          </a:solidFill>
+        </p:spPr>
+        <p:txBody>
+          <a:bodyPr wrap="square" rtlCol="0">
+            <a:spAutoFit/>
+          </a:bodyPr>
+          <a:lstStyle>
+            <a:defPPr>
+              <a:defRPr lang="fr-FR"/>
+            </a:defPPr>
+            <a:lvl1pPr>
+              <a:defRPr sz="2800">
+                <a:solidFill>
+                  <a:schemeClr val="bg1"/>
+                </a:solidFill>
+                <a:latin typeface="Gill Sans MT" panose="020B0502020104020203" pitchFamily="34" charset="0"/>
+              </a:defRPr>
+            </a:lvl1pPr>
+          </a:lstStyle>
+          <a:p>
+            <a:pPr algn="ctr"/>
+            <a:r>
+              <a:rPr lang="fr-FR" sz="2801" dirty="0"/>
+              <a:t>Conclusion</a:t>
+            </a:r>
+          </a:p>
+        </p:txBody>
+      </p:sp>
+      <p:grpSp>
+        <p:nvGrpSpPr>
+          <p:cNvPr id="39" name="Groupe 38">
+            <a:extLst>
+              <a:ext uri="{FF2B5EF4-FFF2-40B4-BE49-F238E27FC236}">
+                <a16:creationId xmlns:a16="http://schemas.microsoft.com/office/drawing/2014/main" id="{EBDDB659-3E60-7E43-28F9-3636987C695A}"/>
+              </a:ext>
+            </a:extLst>
+          </p:cNvPr>
+          <p:cNvGrpSpPr/>
+          <p:nvPr/>
+        </p:nvGrpSpPr>
+        <p:grpSpPr>
+          <a:xfrm>
+            <a:off x="608324" y="1768735"/>
+            <a:ext cx="7648575" cy="646331"/>
+            <a:chOff x="985837" y="1886746"/>
+            <a:chExt cx="7648575" cy="646331"/>
+          </a:xfrm>
+        </p:grpSpPr>
+        <p:sp>
+          <p:nvSpPr>
+            <p:cNvPr id="40" name="ZoneTexte 39">
+              <a:extLst>
+                <a:ext uri="{FF2B5EF4-FFF2-40B4-BE49-F238E27FC236}">
+                  <a16:creationId xmlns:a16="http://schemas.microsoft.com/office/drawing/2014/main" id="{709AD6AB-46FD-ACFE-EA20-1856B0FB6936}"/>
+                </a:ext>
+              </a:extLst>
+            </p:cNvPr>
+            <p:cNvSpPr txBox="1"/>
+            <p:nvPr/>
+          </p:nvSpPr>
+          <p:spPr>
+            <a:xfrm>
+              <a:off x="1690687" y="1957827"/>
+              <a:ext cx="6943725" cy="523348"/>
+            </a:xfrm>
+            <a:prstGeom prst="rect">
+              <a:avLst/>
+            </a:prstGeom>
+            <a:noFill/>
+          </p:spPr>
+          <p:txBody>
+            <a:bodyPr wrap="square" rtlCol="0">
+              <a:spAutoFit/>
+            </a:bodyPr>
+            <a:lstStyle/>
+            <a:p>
+              <a:r>
+                <a:rPr lang="fr-FR" sz="2801" dirty="0">
+                  <a:latin typeface="Gill Sans MT" panose="020B0502020104020203" pitchFamily="34" charset="0"/>
+                </a:rPr>
+                <a:t>Présentation du contexte</a:t>
+              </a:r>
+            </a:p>
+          </p:txBody>
+        </p:sp>
+        <p:grpSp>
+          <p:nvGrpSpPr>
+            <p:cNvPr id="41" name="Groupe 40">
+              <a:extLst>
+                <a:ext uri="{FF2B5EF4-FFF2-40B4-BE49-F238E27FC236}">
+                  <a16:creationId xmlns:a16="http://schemas.microsoft.com/office/drawing/2014/main" id="{2640F53B-107F-1046-E511-77DCDC3E8DF1}"/>
+                </a:ext>
+              </a:extLst>
+            </p:cNvPr>
+            <p:cNvGrpSpPr/>
+            <p:nvPr/>
+          </p:nvGrpSpPr>
+          <p:grpSpPr>
+            <a:xfrm>
+              <a:off x="985837" y="1886746"/>
+              <a:ext cx="523875" cy="646331"/>
+              <a:chOff x="981075" y="1562896"/>
+              <a:chExt cx="523875" cy="646331"/>
+            </a:xfrm>
+          </p:grpSpPr>
+          <p:sp>
+            <p:nvSpPr>
+              <p:cNvPr id="42" name="Cercle : creux 41">
+                <a:extLst>
+                  <a:ext uri="{FF2B5EF4-FFF2-40B4-BE49-F238E27FC236}">
+                    <a16:creationId xmlns:a16="http://schemas.microsoft.com/office/drawing/2014/main" id="{193C0C7B-61C9-75A9-2AF3-6D3AEF3AD5E4}"/>
+                  </a:ext>
+                </a:extLst>
+              </p:cNvPr>
+              <p:cNvSpPr/>
+              <p:nvPr/>
+            </p:nvSpPr>
+            <p:spPr>
+              <a:xfrm>
+                <a:off x="981075" y="1633650"/>
+                <a:ext cx="523875" cy="523875"/>
+              </a:xfrm>
+              <a:prstGeom prst="donut">
+                <a:avLst>
+                  <a:gd name="adj" fmla="val 6665"/>
+                </a:avLst>
+              </a:prstGeom>
+              <a:solidFill>
+                <a:srgbClr val="006A5A"/>
+              </a:solidFill>
+              <a:ln>
+                <a:solidFill>
+                  <a:srgbClr val="006A5A"/>
+                </a:solidFill>
+              </a:ln>
+            </p:spPr>
+            <p:style>
+              <a:lnRef idx="2">
+                <a:schemeClr val="accent1">
+                  <a:shade val="15000"/>
+                </a:schemeClr>
+              </a:lnRef>
+              <a:fillRef idx="1">
+                <a:schemeClr val="accent1"/>
+              </a:fillRef>
+              <a:effectRef idx="0">
+                <a:schemeClr val="accent1"/>
+              </a:effectRef>
+              <a:fontRef idx="minor">
+                <a:schemeClr val="lt1"/>
+              </a:fontRef>
+            </p:style>
+            <p:txBody>
+              <a:bodyPr rtlCol="0" anchor="ctr"/>
+              <a:lstStyle/>
+              <a:p>
+                <a:pPr algn="ctr"/>
+                <a:endParaRPr lang="fr-FR" sz="1801" dirty="0">
+                  <a:solidFill>
+                    <a:schemeClr val="tx1"/>
+                  </a:solidFill>
+                </a:endParaRPr>
+              </a:p>
+            </p:txBody>
+          </p:sp>
+          <p:sp>
+            <p:nvSpPr>
+              <p:cNvPr id="43" name="Rectangle 42">
+                <a:extLst>
+                  <a:ext uri="{FF2B5EF4-FFF2-40B4-BE49-F238E27FC236}">
+                    <a16:creationId xmlns:a16="http://schemas.microsoft.com/office/drawing/2014/main" id="{28F490B2-7DA6-0768-1755-F15EA2FF6CEA}"/>
+                  </a:ext>
+                </a:extLst>
+              </p:cNvPr>
+              <p:cNvSpPr/>
+              <p:nvPr/>
+            </p:nvSpPr>
+            <p:spPr>
+              <a:xfrm>
+                <a:off x="1033660" y="1562896"/>
+                <a:ext cx="418704" cy="646331"/>
+              </a:xfrm>
+              <a:prstGeom prst="rect">
+                <a:avLst/>
+              </a:prstGeom>
+              <a:noFill/>
+            </p:spPr>
+            <p:txBody>
+              <a:bodyPr wrap="none" lIns="91440" tIns="45720" rIns="91440" bIns="45720">
+                <a:spAutoFit/>
+              </a:bodyPr>
+              <a:lstStyle/>
+              <a:p>
+                <a:pPr algn="ctr"/>
+                <a:r>
+                  <a:rPr lang="fr-FR" sz="3600" b="1" dirty="0">
+                    <a:ln w="0"/>
+                    <a:solidFill>
+                      <a:srgbClr val="006A5A"/>
+                    </a:solidFill>
+                    <a:effectLst>
+                      <a:outerShdw blurRad="38100" dist="19050" dir="2700000" algn="tl" rotWithShape="0">
+                        <a:schemeClr val="dk1">
+                          <a:alpha val="40000"/>
+                        </a:schemeClr>
+                      </a:outerShdw>
+                    </a:effectLst>
+                  </a:rPr>
+                  <a:t>1</a:t>
+                </a:r>
+              </a:p>
+            </p:txBody>
+          </p:sp>
+        </p:grpSp>
+      </p:grpSp>
+      <p:grpSp>
+        <p:nvGrpSpPr>
+          <p:cNvPr id="44" name="Groupe 43">
+            <a:extLst>
+              <a:ext uri="{FF2B5EF4-FFF2-40B4-BE49-F238E27FC236}">
+                <a16:creationId xmlns:a16="http://schemas.microsoft.com/office/drawing/2014/main" id="{9288D26F-2E4D-F953-0988-5B2103F6C0D7}"/>
+              </a:ext>
+            </a:extLst>
+          </p:cNvPr>
+          <p:cNvGrpSpPr/>
+          <p:nvPr/>
+        </p:nvGrpSpPr>
+        <p:grpSpPr>
+          <a:xfrm>
+            <a:off x="608323" y="3342274"/>
+            <a:ext cx="7343775" cy="646331"/>
+            <a:chOff x="985837" y="3278639"/>
+            <a:chExt cx="7343775" cy="646329"/>
+          </a:xfrm>
+        </p:grpSpPr>
+        <p:sp>
+          <p:nvSpPr>
+            <p:cNvPr id="45" name="ZoneTexte 44">
+              <a:extLst>
+                <a:ext uri="{FF2B5EF4-FFF2-40B4-BE49-F238E27FC236}">
+                  <a16:creationId xmlns:a16="http://schemas.microsoft.com/office/drawing/2014/main" id="{0178353F-6B3C-1A17-E773-4BACB6F4FE9C}"/>
+                </a:ext>
+              </a:extLst>
+            </p:cNvPr>
+            <p:cNvSpPr txBox="1"/>
+            <p:nvPr/>
+          </p:nvSpPr>
+          <p:spPr>
+            <a:xfrm>
+              <a:off x="1728787" y="3340194"/>
+              <a:ext cx="6600825" cy="523347"/>
+            </a:xfrm>
+            <a:prstGeom prst="rect">
+              <a:avLst/>
+            </a:prstGeom>
+            <a:noFill/>
+          </p:spPr>
+          <p:txBody>
+            <a:bodyPr wrap="square" rtlCol="0">
+              <a:spAutoFit/>
+            </a:bodyPr>
+            <a:lstStyle/>
+            <a:p>
+              <a:r>
+                <a:rPr lang="fr-FR" sz="2801" dirty="0">
+                  <a:latin typeface="Gill Sans MT" panose="020B0502020104020203" pitchFamily="34" charset="0"/>
+                </a:rPr>
+                <a:t>Analyse descriptive</a:t>
+              </a:r>
+            </a:p>
+          </p:txBody>
+        </p:sp>
+        <p:grpSp>
+          <p:nvGrpSpPr>
+            <p:cNvPr id="46" name="Groupe 45">
+              <a:extLst>
+                <a:ext uri="{FF2B5EF4-FFF2-40B4-BE49-F238E27FC236}">
+                  <a16:creationId xmlns:a16="http://schemas.microsoft.com/office/drawing/2014/main" id="{147AA981-0894-EE40-9042-ADBD324D32E1}"/>
+                </a:ext>
+              </a:extLst>
+            </p:cNvPr>
+            <p:cNvGrpSpPr/>
+            <p:nvPr/>
+          </p:nvGrpSpPr>
+          <p:grpSpPr>
+            <a:xfrm>
+              <a:off x="985837" y="3278639"/>
+              <a:ext cx="523875" cy="646329"/>
+              <a:chOff x="981075" y="1562896"/>
+              <a:chExt cx="523875" cy="646329"/>
+            </a:xfrm>
+          </p:grpSpPr>
+          <p:sp>
+            <p:nvSpPr>
+              <p:cNvPr id="47" name="Cercle : creux 46">
+                <a:extLst>
+                  <a:ext uri="{FF2B5EF4-FFF2-40B4-BE49-F238E27FC236}">
+                    <a16:creationId xmlns:a16="http://schemas.microsoft.com/office/drawing/2014/main" id="{8CA64879-7ADD-B4C1-2163-63C26635A73B}"/>
+                  </a:ext>
+                </a:extLst>
+              </p:cNvPr>
+              <p:cNvSpPr/>
+              <p:nvPr/>
+            </p:nvSpPr>
+            <p:spPr>
+              <a:xfrm>
+                <a:off x="981075" y="1633650"/>
+                <a:ext cx="523875" cy="523875"/>
+              </a:xfrm>
+              <a:prstGeom prst="donut">
+                <a:avLst>
+                  <a:gd name="adj" fmla="val 6665"/>
+                </a:avLst>
+              </a:prstGeom>
+              <a:solidFill>
+                <a:srgbClr val="006A5A"/>
+              </a:solidFill>
+              <a:ln>
+                <a:solidFill>
+                  <a:srgbClr val="006A5A"/>
+                </a:solidFill>
+              </a:ln>
+            </p:spPr>
+            <p:style>
+              <a:lnRef idx="2">
+                <a:schemeClr val="accent1">
+                  <a:shade val="15000"/>
+                </a:schemeClr>
+              </a:lnRef>
+              <a:fillRef idx="1">
+                <a:schemeClr val="accent1"/>
+              </a:fillRef>
+              <a:effectRef idx="0">
+                <a:schemeClr val="accent1"/>
+              </a:effectRef>
+              <a:fontRef idx="minor">
+                <a:schemeClr val="lt1"/>
+              </a:fontRef>
+            </p:style>
+            <p:txBody>
+              <a:bodyPr rtlCol="0" anchor="ctr"/>
+              <a:lstStyle/>
+              <a:p>
+                <a:pPr algn="ctr"/>
+                <a:endParaRPr lang="fr-FR" sz="1801">
+                  <a:solidFill>
+                    <a:schemeClr val="tx1"/>
+                  </a:solidFill>
+                </a:endParaRPr>
+              </a:p>
+            </p:txBody>
+          </p:sp>
+          <p:sp>
+            <p:nvSpPr>
+              <p:cNvPr id="48" name="Rectangle 47">
+                <a:extLst>
+                  <a:ext uri="{FF2B5EF4-FFF2-40B4-BE49-F238E27FC236}">
+                    <a16:creationId xmlns:a16="http://schemas.microsoft.com/office/drawing/2014/main" id="{551D671B-FFAC-5149-6A40-5A0B9443D2FF}"/>
+                  </a:ext>
+                </a:extLst>
+              </p:cNvPr>
+              <p:cNvSpPr/>
+              <p:nvPr/>
+            </p:nvSpPr>
+            <p:spPr>
+              <a:xfrm>
+                <a:off x="1033660" y="1562896"/>
+                <a:ext cx="418704" cy="646329"/>
+              </a:xfrm>
+              <a:prstGeom prst="rect">
+                <a:avLst/>
+              </a:prstGeom>
+              <a:noFill/>
+            </p:spPr>
+            <p:txBody>
+              <a:bodyPr wrap="none" lIns="91440" tIns="45720" rIns="91440" bIns="45720">
+                <a:spAutoFit/>
+              </a:bodyPr>
+              <a:lstStyle/>
+              <a:p>
+                <a:pPr algn="ctr"/>
+                <a:r>
+                  <a:rPr lang="fr-FR" sz="3600" b="1" dirty="0">
+                    <a:ln w="0"/>
+                    <a:solidFill>
+                      <a:srgbClr val="006A5A"/>
+                    </a:solidFill>
+                    <a:effectLst>
+                      <a:outerShdw blurRad="38100" dist="19050" dir="2700000" algn="tl" rotWithShape="0">
+                        <a:schemeClr val="dk1">
+                          <a:alpha val="40000"/>
+                        </a:schemeClr>
+                      </a:outerShdw>
+                    </a:effectLst>
+                  </a:rPr>
+                  <a:t>3</a:t>
+                </a:r>
+              </a:p>
+            </p:txBody>
+          </p:sp>
+        </p:grpSp>
+      </p:grpSp>
+      <p:grpSp>
+        <p:nvGrpSpPr>
+          <p:cNvPr id="49" name="Groupe 48">
+            <a:extLst>
+              <a:ext uri="{FF2B5EF4-FFF2-40B4-BE49-F238E27FC236}">
+                <a16:creationId xmlns:a16="http://schemas.microsoft.com/office/drawing/2014/main" id="{62E5D361-8AE1-FA7F-2F3A-26E0E5B6111E}"/>
+              </a:ext>
+            </a:extLst>
+          </p:cNvPr>
+          <p:cNvGrpSpPr/>
+          <p:nvPr/>
+        </p:nvGrpSpPr>
+        <p:grpSpPr>
+          <a:xfrm>
+            <a:off x="608323" y="2598007"/>
+            <a:ext cx="7343775" cy="646331"/>
+            <a:chOff x="985837" y="2603831"/>
+            <a:chExt cx="7343775" cy="646330"/>
+          </a:xfrm>
+        </p:grpSpPr>
+        <p:sp>
+          <p:nvSpPr>
+            <p:cNvPr id="50" name="ZoneTexte 49">
+              <a:extLst>
+                <a:ext uri="{FF2B5EF4-FFF2-40B4-BE49-F238E27FC236}">
+                  <a16:creationId xmlns:a16="http://schemas.microsoft.com/office/drawing/2014/main" id="{21E2CF4A-E88F-DE07-DF38-A0A8DDAF67BC}"/>
+                </a:ext>
+              </a:extLst>
+            </p:cNvPr>
+            <p:cNvSpPr txBox="1"/>
+            <p:nvPr/>
+          </p:nvSpPr>
+          <p:spPr>
+            <a:xfrm>
+              <a:off x="1728787" y="2617771"/>
+              <a:ext cx="6600825" cy="523347"/>
+            </a:xfrm>
+            <a:prstGeom prst="rect">
+              <a:avLst/>
+            </a:prstGeom>
+            <a:noFill/>
+          </p:spPr>
+          <p:txBody>
+            <a:bodyPr wrap="square" rtlCol="0">
+              <a:spAutoFit/>
+            </a:bodyPr>
+            <a:lstStyle/>
+            <a:p>
+              <a:r>
+                <a:rPr lang="fr-FR" sz="2801" dirty="0">
+                  <a:latin typeface="Gill Sans MT" panose="020B0502020104020203" pitchFamily="34" charset="0"/>
+                </a:rPr>
+                <a:t>Méthodologie</a:t>
+              </a:r>
+            </a:p>
+          </p:txBody>
+        </p:sp>
+        <p:grpSp>
+          <p:nvGrpSpPr>
+            <p:cNvPr id="51" name="Groupe 50">
+              <a:extLst>
+                <a:ext uri="{FF2B5EF4-FFF2-40B4-BE49-F238E27FC236}">
+                  <a16:creationId xmlns:a16="http://schemas.microsoft.com/office/drawing/2014/main" id="{E8677924-A07F-5FA7-AAAC-836D37DD1B16}"/>
+                </a:ext>
+              </a:extLst>
+            </p:cNvPr>
+            <p:cNvGrpSpPr/>
+            <p:nvPr/>
+          </p:nvGrpSpPr>
+          <p:grpSpPr>
+            <a:xfrm>
+              <a:off x="985837" y="2603831"/>
+              <a:ext cx="523875" cy="646330"/>
+              <a:chOff x="981075" y="1562896"/>
+              <a:chExt cx="523875" cy="646330"/>
+            </a:xfrm>
+          </p:grpSpPr>
+          <p:sp>
+            <p:nvSpPr>
+              <p:cNvPr id="52" name="Cercle : creux 51">
+                <a:extLst>
+                  <a:ext uri="{FF2B5EF4-FFF2-40B4-BE49-F238E27FC236}">
+                    <a16:creationId xmlns:a16="http://schemas.microsoft.com/office/drawing/2014/main" id="{25F76A91-21AA-0911-E7CB-5819FD285864}"/>
+                  </a:ext>
+                </a:extLst>
+              </p:cNvPr>
+              <p:cNvSpPr/>
+              <p:nvPr/>
+            </p:nvSpPr>
+            <p:spPr>
+              <a:xfrm>
+                <a:off x="981075" y="1633650"/>
+                <a:ext cx="523875" cy="523875"/>
+              </a:xfrm>
+              <a:prstGeom prst="donut">
+                <a:avLst>
+                  <a:gd name="adj" fmla="val 6665"/>
+                </a:avLst>
+              </a:prstGeom>
+              <a:solidFill>
+                <a:srgbClr val="006A5A"/>
+              </a:solidFill>
+              <a:ln>
+                <a:solidFill>
+                  <a:srgbClr val="006A5A"/>
+                </a:solidFill>
+              </a:ln>
+            </p:spPr>
+            <p:style>
+              <a:lnRef idx="2">
+                <a:schemeClr val="accent1">
+                  <a:shade val="15000"/>
+                </a:schemeClr>
+              </a:lnRef>
+              <a:fillRef idx="1">
+                <a:schemeClr val="accent1"/>
+              </a:fillRef>
+              <a:effectRef idx="0">
+                <a:schemeClr val="accent1"/>
+              </a:effectRef>
+              <a:fontRef idx="minor">
+                <a:schemeClr val="lt1"/>
+              </a:fontRef>
+            </p:style>
+            <p:txBody>
+              <a:bodyPr rtlCol="0" anchor="ctr"/>
+              <a:lstStyle/>
+              <a:p>
+                <a:pPr algn="ctr"/>
+                <a:endParaRPr lang="fr-FR" sz="1801">
+                  <a:solidFill>
+                    <a:schemeClr val="tx1"/>
+                  </a:solidFill>
+                </a:endParaRPr>
+              </a:p>
+            </p:txBody>
+          </p:sp>
+          <p:sp>
+            <p:nvSpPr>
+              <p:cNvPr id="53" name="Rectangle 52">
+                <a:extLst>
+                  <a:ext uri="{FF2B5EF4-FFF2-40B4-BE49-F238E27FC236}">
+                    <a16:creationId xmlns:a16="http://schemas.microsoft.com/office/drawing/2014/main" id="{4D2F1366-D15A-C4C8-5411-8748F4372BD7}"/>
+                  </a:ext>
+                </a:extLst>
+              </p:cNvPr>
+              <p:cNvSpPr/>
+              <p:nvPr/>
+            </p:nvSpPr>
+            <p:spPr>
+              <a:xfrm>
+                <a:off x="1033660" y="1562896"/>
+                <a:ext cx="418704" cy="646330"/>
+              </a:xfrm>
+              <a:prstGeom prst="rect">
+                <a:avLst/>
+              </a:prstGeom>
+              <a:noFill/>
+            </p:spPr>
+            <p:txBody>
+              <a:bodyPr wrap="none" lIns="91440" tIns="45720" rIns="91440" bIns="45720">
+                <a:spAutoFit/>
+              </a:bodyPr>
+              <a:lstStyle/>
+              <a:p>
+                <a:pPr algn="ctr"/>
+                <a:r>
+                  <a:rPr lang="fr-FR" sz="3600" b="1" dirty="0">
+                    <a:ln w="0"/>
+                    <a:solidFill>
+                      <a:srgbClr val="006A5A"/>
+                    </a:solidFill>
+                    <a:effectLst>
+                      <a:outerShdw blurRad="38100" dist="19050" dir="2700000" algn="tl" rotWithShape="0">
+                        <a:schemeClr val="dk1">
+                          <a:alpha val="40000"/>
+                        </a:schemeClr>
+                      </a:outerShdw>
+                    </a:effectLst>
+                  </a:rPr>
+                  <a:t>2</a:t>
+                </a:r>
+              </a:p>
+            </p:txBody>
+          </p:sp>
+        </p:grpSp>
+      </p:grpSp>
+      <p:grpSp>
+        <p:nvGrpSpPr>
+          <p:cNvPr id="54" name="Groupe 53">
+            <a:extLst>
+              <a:ext uri="{FF2B5EF4-FFF2-40B4-BE49-F238E27FC236}">
+                <a16:creationId xmlns:a16="http://schemas.microsoft.com/office/drawing/2014/main" id="{8018736C-97D8-7D21-9DD2-3D49EE35D250}"/>
+              </a:ext>
+            </a:extLst>
+          </p:cNvPr>
+          <p:cNvGrpSpPr/>
+          <p:nvPr/>
+        </p:nvGrpSpPr>
+        <p:grpSpPr>
+          <a:xfrm>
+            <a:off x="660908" y="4118897"/>
+            <a:ext cx="8201026" cy="646331"/>
+            <a:chOff x="985837" y="3975226"/>
+            <a:chExt cx="8201025" cy="646329"/>
+          </a:xfrm>
+        </p:grpSpPr>
+        <p:sp>
+          <p:nvSpPr>
+            <p:cNvPr id="55" name="ZoneTexte 54">
+              <a:extLst>
+                <a:ext uri="{FF2B5EF4-FFF2-40B4-BE49-F238E27FC236}">
+                  <a16:creationId xmlns:a16="http://schemas.microsoft.com/office/drawing/2014/main" id="{0B42BC64-6471-55D3-5F19-DDDFAEED3D98}"/>
+                </a:ext>
+              </a:extLst>
+            </p:cNvPr>
+            <p:cNvSpPr txBox="1"/>
+            <p:nvPr/>
+          </p:nvSpPr>
+          <p:spPr>
+            <a:xfrm>
+              <a:off x="1728787" y="4036781"/>
+              <a:ext cx="7458075" cy="523347"/>
+            </a:xfrm>
+            <a:prstGeom prst="rect">
+              <a:avLst/>
+            </a:prstGeom>
+            <a:noFill/>
+          </p:spPr>
+          <p:txBody>
+            <a:bodyPr wrap="square" rtlCol="0">
+              <a:spAutoFit/>
+            </a:bodyPr>
+            <a:lstStyle/>
+            <a:p>
+              <a:r>
+                <a:rPr lang="fr-FR" sz="2801" dirty="0">
+                  <a:latin typeface="Gill Sans MT" panose="020B0502020104020203" pitchFamily="34" charset="0"/>
+                </a:rPr>
+                <a:t>Modélisation</a:t>
+              </a:r>
+            </a:p>
+          </p:txBody>
+        </p:sp>
+        <p:grpSp>
+          <p:nvGrpSpPr>
+            <p:cNvPr id="56" name="Groupe 55">
+              <a:extLst>
+                <a:ext uri="{FF2B5EF4-FFF2-40B4-BE49-F238E27FC236}">
+                  <a16:creationId xmlns:a16="http://schemas.microsoft.com/office/drawing/2014/main" id="{4F8C7CB2-8232-A767-9B2A-34B47A05FBC5}"/>
+                </a:ext>
+              </a:extLst>
+            </p:cNvPr>
+            <p:cNvGrpSpPr/>
+            <p:nvPr/>
+          </p:nvGrpSpPr>
+          <p:grpSpPr>
+            <a:xfrm>
+              <a:off x="985837" y="3975226"/>
+              <a:ext cx="523875" cy="646329"/>
+              <a:chOff x="981075" y="1562896"/>
+              <a:chExt cx="523875" cy="646329"/>
+            </a:xfrm>
+          </p:grpSpPr>
+          <p:sp>
+            <p:nvSpPr>
+              <p:cNvPr id="57" name="Cercle : creux 56">
+                <a:extLst>
+                  <a:ext uri="{FF2B5EF4-FFF2-40B4-BE49-F238E27FC236}">
+                    <a16:creationId xmlns:a16="http://schemas.microsoft.com/office/drawing/2014/main" id="{4D84922F-6579-14ED-5433-CFA4DE117825}"/>
+                  </a:ext>
+                </a:extLst>
+              </p:cNvPr>
+              <p:cNvSpPr/>
+              <p:nvPr/>
+            </p:nvSpPr>
+            <p:spPr>
+              <a:xfrm>
+                <a:off x="981075" y="1633650"/>
+                <a:ext cx="523875" cy="523875"/>
+              </a:xfrm>
+              <a:prstGeom prst="donut">
+                <a:avLst>
+                  <a:gd name="adj" fmla="val 6665"/>
+                </a:avLst>
+              </a:prstGeom>
+              <a:solidFill>
+                <a:srgbClr val="006A5A"/>
+              </a:solidFill>
+              <a:ln>
+                <a:solidFill>
+                  <a:srgbClr val="006A5A"/>
+                </a:solidFill>
+              </a:ln>
+            </p:spPr>
+            <p:style>
+              <a:lnRef idx="2">
+                <a:schemeClr val="accent1">
+                  <a:shade val="15000"/>
+                </a:schemeClr>
+              </a:lnRef>
+              <a:fillRef idx="1">
+                <a:schemeClr val="accent1"/>
+              </a:fillRef>
+              <a:effectRef idx="0">
+                <a:schemeClr val="accent1"/>
+              </a:effectRef>
+              <a:fontRef idx="minor">
+                <a:schemeClr val="lt1"/>
+              </a:fontRef>
+            </p:style>
+            <p:txBody>
+              <a:bodyPr rtlCol="0" anchor="ctr"/>
+              <a:lstStyle/>
+              <a:p>
+                <a:pPr algn="ctr"/>
+                <a:endParaRPr lang="fr-FR" sz="1801">
+                  <a:solidFill>
+                    <a:schemeClr val="tx1"/>
+                  </a:solidFill>
+                </a:endParaRPr>
+              </a:p>
+            </p:txBody>
+          </p:sp>
+          <p:sp>
+            <p:nvSpPr>
+              <p:cNvPr id="58" name="Rectangle 57">
+                <a:extLst>
+                  <a:ext uri="{FF2B5EF4-FFF2-40B4-BE49-F238E27FC236}">
+                    <a16:creationId xmlns:a16="http://schemas.microsoft.com/office/drawing/2014/main" id="{4AA4C81D-C38A-38F5-C158-4B6B656180A9}"/>
+                  </a:ext>
+                </a:extLst>
+              </p:cNvPr>
+              <p:cNvSpPr/>
+              <p:nvPr/>
+            </p:nvSpPr>
+            <p:spPr>
+              <a:xfrm>
+                <a:off x="1033660" y="1562896"/>
+                <a:ext cx="418704" cy="646329"/>
+              </a:xfrm>
+              <a:prstGeom prst="rect">
+                <a:avLst/>
+              </a:prstGeom>
+              <a:noFill/>
+            </p:spPr>
+            <p:txBody>
+              <a:bodyPr wrap="none" lIns="91440" tIns="45720" rIns="91440" bIns="45720">
+                <a:spAutoFit/>
+              </a:bodyPr>
+              <a:lstStyle/>
+              <a:p>
+                <a:pPr algn="ctr"/>
+                <a:r>
+                  <a:rPr lang="fr-FR" sz="3600" b="1" dirty="0">
+                    <a:ln w="0"/>
+                    <a:solidFill>
+                      <a:srgbClr val="006A5A"/>
+                    </a:solidFill>
+                    <a:effectLst>
+                      <a:outerShdw blurRad="38100" dist="19050" dir="2700000" algn="tl" rotWithShape="0">
+                        <a:schemeClr val="dk1">
+                          <a:alpha val="40000"/>
+                        </a:schemeClr>
+                      </a:outerShdw>
+                    </a:effectLst>
+                  </a:rPr>
+                  <a:t>4</a:t>
+                </a:r>
+              </a:p>
+            </p:txBody>
+          </p:sp>
+        </p:grpSp>
+      </p:grpSp>
+      <p:grpSp>
+        <p:nvGrpSpPr>
+          <p:cNvPr id="59" name="Groupe 58">
+            <a:extLst>
+              <a:ext uri="{FF2B5EF4-FFF2-40B4-BE49-F238E27FC236}">
+                <a16:creationId xmlns:a16="http://schemas.microsoft.com/office/drawing/2014/main" id="{A52A3784-3785-DFD6-2A71-16E9A10ED0BC}"/>
+              </a:ext>
+            </a:extLst>
+          </p:cNvPr>
+          <p:cNvGrpSpPr/>
+          <p:nvPr/>
+        </p:nvGrpSpPr>
+        <p:grpSpPr>
+          <a:xfrm>
+            <a:off x="660909" y="4914559"/>
+            <a:ext cx="8162925" cy="646331"/>
+            <a:chOff x="985837" y="4689476"/>
+            <a:chExt cx="8162925" cy="677137"/>
+          </a:xfrm>
+        </p:grpSpPr>
+        <p:grpSp>
+          <p:nvGrpSpPr>
+            <p:cNvPr id="60" name="Groupe 59">
+              <a:extLst>
+                <a:ext uri="{FF2B5EF4-FFF2-40B4-BE49-F238E27FC236}">
+                  <a16:creationId xmlns:a16="http://schemas.microsoft.com/office/drawing/2014/main" id="{433F604A-C2A7-BF19-3A1C-82F1B53065A0}"/>
+                </a:ext>
+              </a:extLst>
+            </p:cNvPr>
+            <p:cNvGrpSpPr/>
+            <p:nvPr/>
+          </p:nvGrpSpPr>
+          <p:grpSpPr>
+            <a:xfrm>
+              <a:off x="985837" y="4689476"/>
+              <a:ext cx="523875" cy="677137"/>
+              <a:chOff x="981075" y="1562896"/>
+              <a:chExt cx="523875" cy="677137"/>
+            </a:xfrm>
+          </p:grpSpPr>
+          <p:sp>
+            <p:nvSpPr>
+              <p:cNvPr id="62" name="Cercle : creux 61">
+                <a:extLst>
+                  <a:ext uri="{FF2B5EF4-FFF2-40B4-BE49-F238E27FC236}">
+                    <a16:creationId xmlns:a16="http://schemas.microsoft.com/office/drawing/2014/main" id="{0384AE3B-9C2C-2C20-2DEA-49C3F630B3FC}"/>
+                  </a:ext>
+                </a:extLst>
+              </p:cNvPr>
+              <p:cNvSpPr/>
+              <p:nvPr/>
+            </p:nvSpPr>
+            <p:spPr>
+              <a:xfrm>
+                <a:off x="981075" y="1633650"/>
+                <a:ext cx="523875" cy="523875"/>
+              </a:xfrm>
+              <a:prstGeom prst="donut">
+                <a:avLst>
+                  <a:gd name="adj" fmla="val 6665"/>
+                </a:avLst>
+              </a:prstGeom>
+              <a:solidFill>
+                <a:srgbClr val="006A5A"/>
+              </a:solidFill>
+              <a:ln>
+                <a:solidFill>
+                  <a:srgbClr val="006A5A"/>
+                </a:solidFill>
+              </a:ln>
+            </p:spPr>
+            <p:style>
+              <a:lnRef idx="2">
+                <a:schemeClr val="accent1">
+                  <a:shade val="15000"/>
+                </a:schemeClr>
+              </a:lnRef>
+              <a:fillRef idx="1">
+                <a:schemeClr val="accent1"/>
+              </a:fillRef>
+              <a:effectRef idx="0">
+                <a:schemeClr val="accent1"/>
+              </a:effectRef>
+              <a:fontRef idx="minor">
+                <a:schemeClr val="lt1"/>
+              </a:fontRef>
+            </p:style>
+            <p:txBody>
+              <a:bodyPr rtlCol="0" anchor="ctr"/>
+              <a:lstStyle/>
+              <a:p>
+                <a:pPr algn="ctr"/>
+                <a:endParaRPr lang="fr-FR" sz="1801">
+                  <a:solidFill>
+                    <a:srgbClr val="006A5A"/>
+                  </a:solidFill>
+                </a:endParaRPr>
+              </a:p>
+            </p:txBody>
+          </p:sp>
+          <p:sp>
+            <p:nvSpPr>
+              <p:cNvPr id="63" name="Rectangle 62">
+                <a:extLst>
+                  <a:ext uri="{FF2B5EF4-FFF2-40B4-BE49-F238E27FC236}">
+                    <a16:creationId xmlns:a16="http://schemas.microsoft.com/office/drawing/2014/main" id="{D8D23376-65CE-679D-7256-13965BF7B9A0}"/>
+                  </a:ext>
+                </a:extLst>
+              </p:cNvPr>
+              <p:cNvSpPr/>
+              <p:nvPr/>
+            </p:nvSpPr>
+            <p:spPr>
+              <a:xfrm>
+                <a:off x="1033660" y="1562896"/>
+                <a:ext cx="418704" cy="677137"/>
+              </a:xfrm>
+              <a:prstGeom prst="rect">
+                <a:avLst/>
+              </a:prstGeom>
+              <a:noFill/>
+            </p:spPr>
+            <p:txBody>
+              <a:bodyPr wrap="none" lIns="91440" tIns="45720" rIns="91440" bIns="45720">
+                <a:spAutoFit/>
+              </a:bodyPr>
+              <a:lstStyle/>
+              <a:p>
+                <a:pPr algn="ctr"/>
+                <a:r>
+                  <a:rPr lang="fr-FR" sz="3600" b="1" dirty="0">
+                    <a:ln w="0"/>
+                    <a:solidFill>
+                      <a:srgbClr val="006A5A"/>
+                    </a:solidFill>
+                    <a:effectLst>
+                      <a:outerShdw blurRad="38100" dist="19050" dir="2700000" algn="tl" rotWithShape="0">
+                        <a:schemeClr val="dk1">
+                          <a:alpha val="40000"/>
+                        </a:schemeClr>
+                      </a:outerShdw>
+                    </a:effectLst>
+                  </a:rPr>
+                  <a:t>5</a:t>
+                </a:r>
+              </a:p>
+            </p:txBody>
+          </p:sp>
+        </p:grpSp>
+        <p:sp>
+          <p:nvSpPr>
+            <p:cNvPr id="61" name="ZoneTexte 60">
+              <a:extLst>
+                <a:ext uri="{FF2B5EF4-FFF2-40B4-BE49-F238E27FC236}">
+                  <a16:creationId xmlns:a16="http://schemas.microsoft.com/office/drawing/2014/main" id="{4DFF1519-0D03-D7CA-5E0D-A098EE8FEE91}"/>
+                </a:ext>
+              </a:extLst>
+            </p:cNvPr>
+            <p:cNvSpPr txBox="1"/>
+            <p:nvPr/>
+          </p:nvSpPr>
+          <p:spPr>
+            <a:xfrm>
+              <a:off x="1690686" y="4750475"/>
+              <a:ext cx="7458076" cy="548292"/>
+            </a:xfrm>
+            <a:prstGeom prst="rect">
+              <a:avLst/>
+            </a:prstGeom>
+            <a:noFill/>
+          </p:spPr>
+          <p:txBody>
+            <a:bodyPr wrap="square" rtlCol="0">
+              <a:spAutoFit/>
+            </a:bodyPr>
+            <a:lstStyle/>
+            <a:p>
+              <a:r>
+                <a:rPr lang="fr-FR" sz="2801" dirty="0">
+                  <a:latin typeface="Gill Sans MT" panose="020B0502020104020203" pitchFamily="34" charset="0"/>
+                </a:rPr>
+                <a:t>Discussion</a:t>
+              </a:r>
+            </a:p>
+          </p:txBody>
+        </p:sp>
+      </p:grpSp>
     </p:spTree>
     <p:extLst>
       <p:ext uri="{BB962C8B-B14F-4D97-AF65-F5344CB8AC3E}">
@@ -8306,10 +9567,506 @@
   <p:clrMapOvr>
     <a:masterClrMapping/>
   </p:clrMapOvr>
+  <p:timing>
+    <p:tnLst>
+      <p:par>
+        <p:cTn id="1" dur="indefinite" restart="never" nodeType="tmRoot">
+          <p:childTnLst>
+            <p:seq concurrent="1" nextAc="seek">
+              <p:cTn id="2" dur="indefinite" nodeType="mainSeq">
+                <p:childTnLst>
+                  <p:par>
+                    <p:cTn id="3" fill="hold">
+                      <p:stCondLst>
+                        <p:cond delay="indefinite"/>
+                      </p:stCondLst>
+                      <p:childTnLst>
+                        <p:par>
+                          <p:cTn id="4" fill="hold">
+                            <p:stCondLst>
+                              <p:cond delay="0"/>
+                            </p:stCondLst>
+                            <p:childTnLst>
+                              <p:par>
+                                <p:cTn id="5" presetID="1" presetClass="entr" presetSubtype="0" fill="hold" grpId="0" nodeType="clickEffect">
+                                  <p:stCondLst>
+                                    <p:cond delay="0"/>
+                                  </p:stCondLst>
+                                  <p:childTnLst>
+                                    <p:set>
+                                      <p:cBhvr>
+                                        <p:cTn id="6" dur="1" fill="hold">
+                                          <p:stCondLst>
+                                            <p:cond delay="0"/>
+                                          </p:stCondLst>
+                                        </p:cTn>
+                                        <p:tgtEl>
+                                          <p:spTgt spid="37"/>
+                                        </p:tgtEl>
+                                        <p:attrNameLst>
+                                          <p:attrName>style.visibility</p:attrName>
+                                        </p:attrNameLst>
+                                      </p:cBhvr>
+                                      <p:to>
+                                        <p:strVal val="visible"/>
+                                      </p:to>
+                                    </p:set>
+                                  </p:childTnLst>
+                                </p:cTn>
+                              </p:par>
+                            </p:childTnLst>
+                          </p:cTn>
+                        </p:par>
+                      </p:childTnLst>
+                    </p:cTn>
+                  </p:par>
+                  <p:par>
+                    <p:cTn id="7" fill="hold">
+                      <p:stCondLst>
+                        <p:cond delay="indefinite"/>
+                      </p:stCondLst>
+                      <p:childTnLst>
+                        <p:par>
+                          <p:cTn id="8" fill="hold">
+                            <p:stCondLst>
+                              <p:cond delay="0"/>
+                            </p:stCondLst>
+                            <p:childTnLst>
+                              <p:par>
+                                <p:cTn id="9" presetID="1" presetClass="entr" presetSubtype="0" fill="hold" nodeType="clickEffect">
+                                  <p:stCondLst>
+                                    <p:cond delay="0"/>
+                                  </p:stCondLst>
+                                  <p:childTnLst>
+                                    <p:set>
+                                      <p:cBhvr>
+                                        <p:cTn id="10" dur="1" fill="hold">
+                                          <p:stCondLst>
+                                            <p:cond delay="0"/>
+                                          </p:stCondLst>
+                                        </p:cTn>
+                                        <p:tgtEl>
+                                          <p:spTgt spid="39"/>
+                                        </p:tgtEl>
+                                        <p:attrNameLst>
+                                          <p:attrName>style.visibility</p:attrName>
+                                        </p:attrNameLst>
+                                      </p:cBhvr>
+                                      <p:to>
+                                        <p:strVal val="visible"/>
+                                      </p:to>
+                                    </p:set>
+                                  </p:childTnLst>
+                                </p:cTn>
+                              </p:par>
+                            </p:childTnLst>
+                          </p:cTn>
+                        </p:par>
+                      </p:childTnLst>
+                    </p:cTn>
+                  </p:par>
+                  <p:par>
+                    <p:cTn id="11" fill="hold">
+                      <p:stCondLst>
+                        <p:cond delay="indefinite"/>
+                      </p:stCondLst>
+                      <p:childTnLst>
+                        <p:par>
+                          <p:cTn id="12" fill="hold">
+                            <p:stCondLst>
+                              <p:cond delay="0"/>
+                            </p:stCondLst>
+                            <p:childTnLst>
+                              <p:par>
+                                <p:cTn id="13" presetID="1" presetClass="entr" presetSubtype="0" fill="hold" nodeType="clickEffect">
+                                  <p:stCondLst>
+                                    <p:cond delay="0"/>
+                                  </p:stCondLst>
+                                  <p:childTnLst>
+                                    <p:set>
+                                      <p:cBhvr>
+                                        <p:cTn id="14" dur="1" fill="hold">
+                                          <p:stCondLst>
+                                            <p:cond delay="0"/>
+                                          </p:stCondLst>
+                                        </p:cTn>
+                                        <p:tgtEl>
+                                          <p:spTgt spid="49"/>
+                                        </p:tgtEl>
+                                        <p:attrNameLst>
+                                          <p:attrName>style.visibility</p:attrName>
+                                        </p:attrNameLst>
+                                      </p:cBhvr>
+                                      <p:to>
+                                        <p:strVal val="visible"/>
+                                      </p:to>
+                                    </p:set>
+                                  </p:childTnLst>
+                                </p:cTn>
+                              </p:par>
+                            </p:childTnLst>
+                          </p:cTn>
+                        </p:par>
+                      </p:childTnLst>
+                    </p:cTn>
+                  </p:par>
+                  <p:par>
+                    <p:cTn id="15" fill="hold">
+                      <p:stCondLst>
+                        <p:cond delay="indefinite"/>
+                      </p:stCondLst>
+                      <p:childTnLst>
+                        <p:par>
+                          <p:cTn id="16" fill="hold">
+                            <p:stCondLst>
+                              <p:cond delay="0"/>
+                            </p:stCondLst>
+                            <p:childTnLst>
+                              <p:par>
+                                <p:cTn id="17" presetID="1" presetClass="entr" presetSubtype="0" fill="hold" nodeType="clickEffect">
+                                  <p:stCondLst>
+                                    <p:cond delay="0"/>
+                                  </p:stCondLst>
+                                  <p:childTnLst>
+                                    <p:set>
+                                      <p:cBhvr>
+                                        <p:cTn id="18" dur="1" fill="hold">
+                                          <p:stCondLst>
+                                            <p:cond delay="0"/>
+                                          </p:stCondLst>
+                                        </p:cTn>
+                                        <p:tgtEl>
+                                          <p:spTgt spid="44"/>
+                                        </p:tgtEl>
+                                        <p:attrNameLst>
+                                          <p:attrName>style.visibility</p:attrName>
+                                        </p:attrNameLst>
+                                      </p:cBhvr>
+                                      <p:to>
+                                        <p:strVal val="visible"/>
+                                      </p:to>
+                                    </p:set>
+                                  </p:childTnLst>
+                                </p:cTn>
+                              </p:par>
+                            </p:childTnLst>
+                          </p:cTn>
+                        </p:par>
+                      </p:childTnLst>
+                    </p:cTn>
+                  </p:par>
+                  <p:par>
+                    <p:cTn id="19" fill="hold">
+                      <p:stCondLst>
+                        <p:cond delay="indefinite"/>
+                      </p:stCondLst>
+                      <p:childTnLst>
+                        <p:par>
+                          <p:cTn id="20" fill="hold">
+                            <p:stCondLst>
+                              <p:cond delay="0"/>
+                            </p:stCondLst>
+                            <p:childTnLst>
+                              <p:par>
+                                <p:cTn id="21" presetID="1" presetClass="entr" presetSubtype="0" fill="hold" nodeType="clickEffect">
+                                  <p:stCondLst>
+                                    <p:cond delay="0"/>
+                                  </p:stCondLst>
+                                  <p:childTnLst>
+                                    <p:set>
+                                      <p:cBhvr>
+                                        <p:cTn id="22" dur="1" fill="hold">
+                                          <p:stCondLst>
+                                            <p:cond delay="0"/>
+                                          </p:stCondLst>
+                                        </p:cTn>
+                                        <p:tgtEl>
+                                          <p:spTgt spid="54"/>
+                                        </p:tgtEl>
+                                        <p:attrNameLst>
+                                          <p:attrName>style.visibility</p:attrName>
+                                        </p:attrNameLst>
+                                      </p:cBhvr>
+                                      <p:to>
+                                        <p:strVal val="visible"/>
+                                      </p:to>
+                                    </p:set>
+                                  </p:childTnLst>
+                                </p:cTn>
+                              </p:par>
+                            </p:childTnLst>
+                          </p:cTn>
+                        </p:par>
+                      </p:childTnLst>
+                    </p:cTn>
+                  </p:par>
+                  <p:par>
+                    <p:cTn id="23" fill="hold">
+                      <p:stCondLst>
+                        <p:cond delay="indefinite"/>
+                      </p:stCondLst>
+                      <p:childTnLst>
+                        <p:par>
+                          <p:cTn id="24" fill="hold">
+                            <p:stCondLst>
+                              <p:cond delay="0"/>
+                            </p:stCondLst>
+                            <p:childTnLst>
+                              <p:par>
+                                <p:cTn id="25" presetID="1" presetClass="entr" presetSubtype="0" fill="hold" nodeType="clickEffect">
+                                  <p:stCondLst>
+                                    <p:cond delay="0"/>
+                                  </p:stCondLst>
+                                  <p:childTnLst>
+                                    <p:set>
+                                      <p:cBhvr>
+                                        <p:cTn id="26" dur="1" fill="hold">
+                                          <p:stCondLst>
+                                            <p:cond delay="0"/>
+                                          </p:stCondLst>
+                                        </p:cTn>
+                                        <p:tgtEl>
+                                          <p:spTgt spid="59"/>
+                                        </p:tgtEl>
+                                        <p:attrNameLst>
+                                          <p:attrName>style.visibility</p:attrName>
+                                        </p:attrNameLst>
+                                      </p:cBhvr>
+                                      <p:to>
+                                        <p:strVal val="visible"/>
+                                      </p:to>
+                                    </p:set>
+                                  </p:childTnLst>
+                                </p:cTn>
+                              </p:par>
+                            </p:childTnLst>
+                          </p:cTn>
+                        </p:par>
+                      </p:childTnLst>
+                    </p:cTn>
+                  </p:par>
+                  <p:par>
+                    <p:cTn id="27" fill="hold">
+                      <p:stCondLst>
+                        <p:cond delay="indefinite"/>
+                      </p:stCondLst>
+                      <p:childTnLst>
+                        <p:par>
+                          <p:cTn id="28" fill="hold">
+                            <p:stCondLst>
+                              <p:cond delay="0"/>
+                            </p:stCondLst>
+                            <p:childTnLst>
+                              <p:par>
+                                <p:cTn id="29" presetID="1" presetClass="entr" presetSubtype="0" fill="hold" grpId="0" nodeType="clickEffect">
+                                  <p:stCondLst>
+                                    <p:cond delay="0"/>
+                                  </p:stCondLst>
+                                  <p:childTnLst>
+                                    <p:set>
+                                      <p:cBhvr>
+                                        <p:cTn id="30" dur="1" fill="hold">
+                                          <p:stCondLst>
+                                            <p:cond delay="0"/>
+                                          </p:stCondLst>
+                                        </p:cTn>
+                                        <p:tgtEl>
+                                          <p:spTgt spid="38"/>
+                                        </p:tgtEl>
+                                        <p:attrNameLst>
+                                          <p:attrName>style.visibility</p:attrName>
+                                        </p:attrNameLst>
+                                      </p:cBhvr>
+                                      <p:to>
+                                        <p:strVal val="visible"/>
+                                      </p:to>
+                                    </p:set>
+                                  </p:childTnLst>
+                                </p:cTn>
+                              </p:par>
+                            </p:childTnLst>
+                          </p:cTn>
+                        </p:par>
+                      </p:childTnLst>
+                    </p:cTn>
+                  </p:par>
+                </p:childTnLst>
+              </p:cTn>
+              <p:prevCondLst>
+                <p:cond evt="onPrev" delay="0">
+                  <p:tgtEl>
+                    <p:sldTgt/>
+                  </p:tgtEl>
+                </p:cond>
+              </p:prevCondLst>
+              <p:nextCondLst>
+                <p:cond evt="onNext" delay="0">
+                  <p:tgtEl>
+                    <p:sldTgt/>
+                  </p:tgtEl>
+                </p:cond>
+              </p:nextCondLst>
+            </p:seq>
+          </p:childTnLst>
+        </p:cTn>
+      </p:par>
+    </p:tnLst>
+    <p:bldLst>
+      <p:bldP spid="37" grpId="0" animBg="1"/>
+      <p:bldP spid="38" grpId="0" animBg="1"/>
+    </p:bldLst>
+  </p:timing>
 </p:sld>
 </file>
 
 <file path=ppt/slides/slide20.xml><?xml version="1.0" encoding="utf-8"?>
+<p:sld xmlns:a="http://schemas.openxmlformats.org/drawingml/2006/main" xmlns:r="http://schemas.openxmlformats.org/officeDocument/2006/relationships" xmlns:p="http://schemas.openxmlformats.org/presentationml/2006/main">
+  <p:cSld>
+    <p:spTree>
+      <p:nvGrpSpPr>
+        <p:cNvPr id="1" name="">
+          <a:extLst>
+            <a:ext uri="{FF2B5EF4-FFF2-40B4-BE49-F238E27FC236}">
+              <a16:creationId xmlns:a16="http://schemas.microsoft.com/office/drawing/2014/main" id="{F30D924C-E715-F9B4-8AFC-FD07EA503B33}"/>
+            </a:ext>
+          </a:extLst>
+        </p:cNvPr>
+        <p:cNvGrpSpPr/>
+        <p:nvPr/>
+      </p:nvGrpSpPr>
+      <p:grpSpPr>
+        <a:xfrm>
+          <a:off x="0" y="0"/>
+          <a:ext cx="0" cy="0"/>
+          <a:chOff x="0" y="0"/>
+          <a:chExt cx="0" cy="0"/>
+        </a:xfrm>
+      </p:grpSpPr>
+      <p:sp>
+        <p:nvSpPr>
+          <p:cNvPr id="2" name="Espace réservé du numéro de diapositive 1">
+            <a:extLst>
+              <a:ext uri="{FF2B5EF4-FFF2-40B4-BE49-F238E27FC236}">
+                <a16:creationId xmlns:a16="http://schemas.microsoft.com/office/drawing/2014/main" id="{882A90CC-7389-1CA4-89EF-B85F758E4EB7}"/>
+              </a:ext>
+            </a:extLst>
+          </p:cNvPr>
+          <p:cNvSpPr>
+            <a:spLocks noGrp="1"/>
+          </p:cNvSpPr>
+          <p:nvPr>
+            <p:ph type="sldNum" sz="quarter" idx="4"/>
+          </p:nvPr>
+        </p:nvSpPr>
+        <p:spPr/>
+        <p:txBody>
+          <a:bodyPr/>
+          <a:lstStyle/>
+          <a:p>
+            <a:fld id="{F546B7B7-7D14-4795-A998-350CFB2BDD43}" type="slidenum">
+              <a:rPr lang="fr-FR" smtClean="0"/>
+              <a:pPr/>
+              <a:t>20</a:t>
+            </a:fld>
+            <a:endParaRPr lang="fr-FR"/>
+          </a:p>
+        </p:txBody>
+      </p:sp>
+      <p:sp>
+        <p:nvSpPr>
+          <p:cNvPr id="3" name="ZoneTexte 2">
+            <a:extLst>
+              <a:ext uri="{FF2B5EF4-FFF2-40B4-BE49-F238E27FC236}">
+                <a16:creationId xmlns:a16="http://schemas.microsoft.com/office/drawing/2014/main" id="{9169FD9A-0F1A-F62A-EAF4-74284432E518}"/>
+              </a:ext>
+            </a:extLst>
+          </p:cNvPr>
+          <p:cNvSpPr txBox="1"/>
+          <p:nvPr/>
+        </p:nvSpPr>
+        <p:spPr>
+          <a:xfrm>
+            <a:off x="2" y="532969"/>
+            <a:ext cx="12191999" cy="646331"/>
+          </a:xfrm>
+          <a:prstGeom prst="rect">
+            <a:avLst/>
+          </a:prstGeom>
+          <a:solidFill>
+            <a:srgbClr val="006A5A"/>
+          </a:solidFill>
+        </p:spPr>
+        <p:txBody>
+          <a:bodyPr wrap="square" rtlCol="0">
+            <a:spAutoFit/>
+          </a:bodyPr>
+          <a:lstStyle/>
+          <a:p>
+            <a:r>
+              <a:rPr lang="fr-FR" sz="3600" b="1" dirty="0">
+                <a:solidFill>
+                  <a:schemeClr val="bg1"/>
+                </a:solidFill>
+                <a:latin typeface="Gill Sans MT" panose="020B0502020104020203" pitchFamily="34" charset="0"/>
+              </a:rPr>
+              <a:t>4.1. Choix des variables dans la modélisation</a:t>
+            </a:r>
+          </a:p>
+        </p:txBody>
+      </p:sp>
+      <p:pic>
+        <p:nvPicPr>
+          <p:cNvPr id="4" name="Graphique 3" descr="Flèches de chevron">
+            <a:extLst>
+              <a:ext uri="{FF2B5EF4-FFF2-40B4-BE49-F238E27FC236}">
+                <a16:creationId xmlns:a16="http://schemas.microsoft.com/office/drawing/2014/main" id="{1A92E601-022D-F8F3-C090-920665EE7490}"/>
+              </a:ext>
+            </a:extLst>
+          </p:cNvPr>
+          <p:cNvPicPr>
+            <a:picLocks noChangeAspect="1"/>
+          </p:cNvPicPr>
+          <p:nvPr/>
+        </p:nvPicPr>
+        <p:blipFill>
+          <a:blip r:embed="rId2">
+            <a:extLst>
+              <a:ext uri="{28A0092B-C50C-407E-A947-70E740481C1C}">
+                <a14:useLocalDpi xmlns:a14="http://schemas.microsoft.com/office/drawing/2010/main" val="0"/>
+              </a:ext>
+              <a:ext uri="{96DAC541-7B7A-43D3-8B79-37D633B846F1}">
+                <asvg:svgBlip xmlns:asvg="http://schemas.microsoft.com/office/drawing/2016/SVG/main" r:embed="rId3"/>
+              </a:ext>
+            </a:extLst>
+          </a:blip>
+          <a:stretch>
+            <a:fillRect/>
+          </a:stretch>
+        </p:blipFill>
+        <p:spPr>
+          <a:xfrm>
+            <a:off x="11078692" y="266700"/>
+            <a:ext cx="1170459" cy="1170459"/>
+          </a:xfrm>
+          <a:prstGeom prst="rect">
+            <a:avLst/>
+          </a:prstGeom>
+        </p:spPr>
+      </p:pic>
+    </p:spTree>
+    <p:extLst>
+      <p:ext uri="{BB962C8B-B14F-4D97-AF65-F5344CB8AC3E}">
+        <p14:creationId xmlns:p14="http://schemas.microsoft.com/office/powerpoint/2010/main" val="982776663"/>
+      </p:ext>
+    </p:extLst>
+  </p:cSld>
+  <p:clrMapOvr>
+    <a:masterClrMapping/>
+  </p:clrMapOvr>
+</p:sld>
+</file>
+
+<file path=ppt/slides/slide21.xml><?xml version="1.0" encoding="utf-8"?>
 <p:sld xmlns:a="http://schemas.openxmlformats.org/drawingml/2006/main" xmlns:r="http://schemas.openxmlformats.org/officeDocument/2006/relationships" xmlns:p="http://schemas.openxmlformats.org/presentationml/2006/main">
   <p:cSld>
     <p:spTree>
@@ -8356,7 +10113,7 @@
             <a:fld id="{F546B7B7-7D14-4795-A998-350CFB2BDD43}" type="slidenum">
               <a:rPr lang="fr-FR" smtClean="0"/>
               <a:pPr/>
-              <a:t>20</a:t>
+              <a:t>21</a:t>
             </a:fld>
             <a:endParaRPr lang="fr-FR"/>
           </a:p>
@@ -8474,7 +10231,7 @@
 </p:sld>
 </file>
 
-<file path=ppt/slides/slide21.xml><?xml version="1.0" encoding="utf-8"?>
+<file path=ppt/slides/slide22.xml><?xml version="1.0" encoding="utf-8"?>
 <p:sld xmlns:a="http://schemas.openxmlformats.org/drawingml/2006/main" xmlns:r="http://schemas.openxmlformats.org/officeDocument/2006/relationships" xmlns:p="http://schemas.openxmlformats.org/presentationml/2006/main">
   <p:cSld>
     <p:spTree>
@@ -8521,7 +10278,7 @@
             <a:fld id="{F546B7B7-7D14-4795-A998-350CFB2BDD43}" type="slidenum">
               <a:rPr lang="fr-FR" smtClean="0"/>
               <a:pPr/>
-              <a:t>21</a:t>
+              <a:t>22</a:t>
             </a:fld>
             <a:endParaRPr lang="fr-FR"/>
           </a:p>
@@ -8621,7 +10378,7 @@
 </p:sld>
 </file>
 
-<file path=ppt/slides/slide22.xml><?xml version="1.0" encoding="utf-8"?>
+<file path=ppt/slides/slide23.xml><?xml version="1.0" encoding="utf-8"?>
 <p:sld xmlns:a="http://schemas.openxmlformats.org/drawingml/2006/main" xmlns:r="http://schemas.openxmlformats.org/officeDocument/2006/relationships" xmlns:p="http://schemas.openxmlformats.org/presentationml/2006/main">
   <p:cSld>
     <p:spTree>
@@ -8668,7 +10425,7 @@
             <a:fld id="{F546B7B7-7D14-4795-A998-350CFB2BDD43}" type="slidenum">
               <a:rPr lang="fr-FR" smtClean="0"/>
               <a:pPr/>
-              <a:t>22</a:t>
+              <a:t>23</a:t>
             </a:fld>
             <a:endParaRPr lang="fr-FR"/>
           </a:p>
@@ -8768,7 +10525,7 @@
 </p:sld>
 </file>
 
-<file path=ppt/slides/slide23.xml><?xml version="1.0" encoding="utf-8"?>
+<file path=ppt/slides/slide24.xml><?xml version="1.0" encoding="utf-8"?>
 <p:sld xmlns:a="http://schemas.openxmlformats.org/drawingml/2006/main" xmlns:r="http://schemas.openxmlformats.org/officeDocument/2006/relationships" xmlns:p="http://schemas.openxmlformats.org/presentationml/2006/main">
   <p:cSld>
     <p:spTree>
@@ -8815,7 +10572,7 @@
             <a:fld id="{F546B7B7-7D14-4795-A998-350CFB2BDD43}" type="slidenum">
               <a:rPr lang="fr-FR" smtClean="0"/>
               <a:pPr/>
-              <a:t>23</a:t>
+              <a:t>24</a:t>
             </a:fld>
             <a:endParaRPr lang="fr-FR"/>
           </a:p>
@@ -8902,6 +10659,42 @@
           </a:prstGeom>
         </p:spPr>
       </p:pic>
+      <p:pic>
+        <p:nvPicPr>
+          <p:cNvPr id="6" name="Image 5">
+            <a:extLst>
+              <a:ext uri="{FF2B5EF4-FFF2-40B4-BE49-F238E27FC236}">
+                <a16:creationId xmlns:a16="http://schemas.microsoft.com/office/drawing/2014/main" id="{D23AC962-1BBC-5893-FA64-FBBF3CB72B31}"/>
+              </a:ext>
+            </a:extLst>
+          </p:cNvPr>
+          <p:cNvPicPr>
+            <a:picLocks noChangeAspect="1"/>
+          </p:cNvPicPr>
+          <p:nvPr/>
+        </p:nvPicPr>
+        <p:blipFill>
+          <a:blip r:embed="rId4">
+            <a:extLst>
+              <a:ext uri="{28A0092B-C50C-407E-A947-70E740481C1C}">
+                <a14:useLocalDpi xmlns:a14="http://schemas.microsoft.com/office/drawing/2010/main" val="0"/>
+              </a:ext>
+            </a:extLst>
+          </a:blip>
+          <a:stretch>
+            <a:fillRect/>
+          </a:stretch>
+        </p:blipFill>
+        <p:spPr>
+          <a:xfrm>
+            <a:off x="4395237" y="1879555"/>
+            <a:ext cx="6958563" cy="4004928"/>
+          </a:xfrm>
+          <a:prstGeom prst="rect">
+            <a:avLst/>
+          </a:prstGeom>
+        </p:spPr>
+      </p:pic>
     </p:spTree>
     <p:extLst>
       <p:ext uri="{BB962C8B-B14F-4D97-AF65-F5344CB8AC3E}">
@@ -8915,7 +10708,7 @@
 </p:sld>
 </file>
 
-<file path=ppt/slides/slide24.xml><?xml version="1.0" encoding="utf-8"?>
+<file path=ppt/slides/slide25.xml><?xml version="1.0" encoding="utf-8"?>
 <p:sld xmlns:a="http://schemas.openxmlformats.org/drawingml/2006/main" xmlns:r="http://schemas.openxmlformats.org/officeDocument/2006/relationships" xmlns:p="http://schemas.openxmlformats.org/presentationml/2006/main">
   <p:cSld>
     <p:spTree>
@@ -8956,7 +10749,7 @@
             <a:fld id="{F546B7B7-7D14-4795-A998-350CFB2BDD43}" type="slidenum">
               <a:rPr lang="fr-FR" smtClean="0"/>
               <a:pPr/>
-              <a:t>24</a:t>
+              <a:t>25</a:t>
             </a:fld>
             <a:endParaRPr lang="fr-FR"/>
           </a:p>
@@ -8975,7 +10768,7 @@
 </p:sld>
 </file>
 
-<file path=ppt/slides/slide25.xml><?xml version="1.0" encoding="utf-8"?>
+<file path=ppt/slides/slide26.xml><?xml version="1.0" encoding="utf-8"?>
 <p:sld xmlns:a="http://schemas.openxmlformats.org/drawingml/2006/main" xmlns:r="http://schemas.openxmlformats.org/officeDocument/2006/relationships" xmlns:p="http://schemas.openxmlformats.org/presentationml/2006/main">
   <p:cSld>
     <p:spTree>
@@ -9022,7 +10815,7 @@
             <a:fld id="{F546B7B7-7D14-4795-A998-350CFB2BDD43}" type="slidenum">
               <a:rPr lang="fr-FR" smtClean="0"/>
               <a:pPr/>
-              <a:t>25</a:t>
+              <a:t>26</a:t>
             </a:fld>
             <a:endParaRPr lang="fr-FR"/>
           </a:p>
@@ -9041,7 +10834,7 @@
 </p:sld>
 </file>
 
-<file path=ppt/slides/slide26.xml><?xml version="1.0" encoding="utf-8"?>
+<file path=ppt/slides/slide27.xml><?xml version="1.0" encoding="utf-8"?>
 <p:sld xmlns:a="http://schemas.openxmlformats.org/drawingml/2006/main" xmlns:r="http://schemas.openxmlformats.org/officeDocument/2006/relationships" xmlns:p="http://schemas.openxmlformats.org/presentationml/2006/main">
   <p:cSld>
     <p:spTree>
@@ -9082,7 +10875,7 @@
             <a:fld id="{F546B7B7-7D14-4795-A998-350CFB2BDD43}" type="slidenum">
               <a:rPr lang="fr-FR" smtClean="0"/>
               <a:pPr/>
-              <a:t>26</a:t>
+              <a:t>27</a:t>
             </a:fld>
             <a:endParaRPr lang="fr-FR"/>
           </a:p>
@@ -9101,7 +10894,7 @@
 </p:sld>
 </file>
 
-<file path=ppt/slides/slide27.xml><?xml version="1.0" encoding="utf-8"?>
+<file path=ppt/slides/slide28.xml><?xml version="1.0" encoding="utf-8"?>
 <p:sld xmlns:a="http://schemas.openxmlformats.org/drawingml/2006/main" xmlns:r="http://schemas.openxmlformats.org/officeDocument/2006/relationships" xmlns:p="http://schemas.openxmlformats.org/presentationml/2006/main">
   <p:cSld>
     <p:spTree>
@@ -9148,12 +10941,93 @@
             <a:fld id="{F546B7B7-7D14-4795-A998-350CFB2BDD43}" type="slidenum">
               <a:rPr lang="fr-FR" smtClean="0"/>
               <a:pPr/>
-              <a:t>27</a:t>
+              <a:t>28</a:t>
             </a:fld>
             <a:endParaRPr lang="fr-FR" dirty="0"/>
           </a:p>
         </p:txBody>
       </p:sp>
+      <p:sp>
+        <p:nvSpPr>
+          <p:cNvPr id="3" name="ZoneTexte 2">
+            <a:extLst>
+              <a:ext uri="{FF2B5EF4-FFF2-40B4-BE49-F238E27FC236}">
+                <a16:creationId xmlns:a16="http://schemas.microsoft.com/office/drawing/2014/main" id="{CE5A935D-6C97-6D69-D581-24F8704F08B1}"/>
+              </a:ext>
+            </a:extLst>
+          </p:cNvPr>
+          <p:cNvSpPr txBox="1"/>
+          <p:nvPr/>
+        </p:nvSpPr>
+        <p:spPr>
+          <a:xfrm>
+            <a:off x="2" y="532969"/>
+            <a:ext cx="12191999" cy="646331"/>
+          </a:xfrm>
+          <a:prstGeom prst="rect">
+            <a:avLst/>
+          </a:prstGeom>
+          <a:solidFill>
+            <a:srgbClr val="006A5A"/>
+          </a:solidFill>
+        </p:spPr>
+        <p:txBody>
+          <a:bodyPr wrap="square" rtlCol="0">
+            <a:spAutoFit/>
+          </a:bodyPr>
+          <a:lstStyle/>
+          <a:p>
+            <a:r>
+              <a:rPr lang="fr-FR" sz="3600" b="1" dirty="0">
+                <a:solidFill>
+                  <a:schemeClr val="bg1"/>
+                </a:solidFill>
+                <a:latin typeface="Gill Sans MT" panose="020B0502020104020203" pitchFamily="34" charset="0"/>
+              </a:rPr>
+              <a:t>Conclusion</a:t>
+            </a:r>
+          </a:p>
+        </p:txBody>
+      </p:sp>
+      <p:pic>
+        <p:nvPicPr>
+          <p:cNvPr id="4" name="Graphique 3" descr="Flèches de chevron">
+            <a:extLst>
+              <a:ext uri="{FF2B5EF4-FFF2-40B4-BE49-F238E27FC236}">
+                <a16:creationId xmlns:a16="http://schemas.microsoft.com/office/drawing/2014/main" id="{5656D646-2ADE-3673-AEFA-DA2A546191F0}"/>
+              </a:ext>
+            </a:extLst>
+          </p:cNvPr>
+          <p:cNvPicPr>
+            <a:picLocks noChangeAspect="1"/>
+          </p:cNvPicPr>
+          <p:nvPr/>
+        </p:nvPicPr>
+        <p:blipFill>
+          <a:blip r:embed="rId2">
+            <a:extLst>
+              <a:ext uri="{28A0092B-C50C-407E-A947-70E740481C1C}">
+                <a14:useLocalDpi xmlns:a14="http://schemas.microsoft.com/office/drawing/2010/main" val="0"/>
+              </a:ext>
+              <a:ext uri="{96DAC541-7B7A-43D3-8B79-37D633B846F1}">
+                <asvg:svgBlip xmlns:asvg="http://schemas.microsoft.com/office/drawing/2016/SVG/main" r:embed="rId3"/>
+              </a:ext>
+            </a:extLst>
+          </a:blip>
+          <a:stretch>
+            <a:fillRect/>
+          </a:stretch>
+        </p:blipFill>
+        <p:spPr>
+          <a:xfrm>
+            <a:off x="11078692" y="266700"/>
+            <a:ext cx="1170459" cy="1170459"/>
+          </a:xfrm>
+          <a:prstGeom prst="rect">
+            <a:avLst/>
+          </a:prstGeom>
+        </p:spPr>
+      </p:pic>
     </p:spTree>
     <p:extLst>
       <p:ext uri="{BB962C8B-B14F-4D97-AF65-F5344CB8AC3E}">
@@ -9167,7 +11041,7 @@
 </p:sld>
 </file>
 
-<file path=ppt/slides/slide28.xml><?xml version="1.0" encoding="utf-8"?>
+<file path=ppt/slides/slide29.xml><?xml version="1.0" encoding="utf-8"?>
 <p:sld xmlns:a="http://schemas.openxmlformats.org/drawingml/2006/main" xmlns:r="http://schemas.openxmlformats.org/officeDocument/2006/relationships" xmlns:p="http://schemas.openxmlformats.org/presentationml/2006/main">
   <p:cSld>
     <p:spTree>
@@ -9314,7 +11188,7 @@
                 <a:latin typeface="Montserrat" panose="02000505000000020004" pitchFamily="2" charset="0"/>
               </a:rPr>
               <a:pPr algn="r"/>
-              <a:t>28</a:t>
+              <a:t>29</a:t>
             </a:fld>
             <a:endParaRPr lang="fr-FR" dirty="0">
               <a:solidFill>
@@ -9636,6 +11510,87 @@
           </a:p>
         </p:txBody>
       </p:sp>
+      <p:sp>
+        <p:nvSpPr>
+          <p:cNvPr id="2" name="ZoneTexte 1">
+            <a:extLst>
+              <a:ext uri="{FF2B5EF4-FFF2-40B4-BE49-F238E27FC236}">
+                <a16:creationId xmlns:a16="http://schemas.microsoft.com/office/drawing/2014/main" id="{0A4C5EA5-8EC5-BD2E-0FB5-DC298C4E156C}"/>
+              </a:ext>
+            </a:extLst>
+          </p:cNvPr>
+          <p:cNvSpPr txBox="1"/>
+          <p:nvPr/>
+        </p:nvSpPr>
+        <p:spPr>
+          <a:xfrm>
+            <a:off x="2" y="532969"/>
+            <a:ext cx="12191999" cy="646331"/>
+          </a:xfrm>
+          <a:prstGeom prst="rect">
+            <a:avLst/>
+          </a:prstGeom>
+          <a:solidFill>
+            <a:srgbClr val="006A5A"/>
+          </a:solidFill>
+        </p:spPr>
+        <p:txBody>
+          <a:bodyPr wrap="square" rtlCol="0">
+            <a:spAutoFit/>
+          </a:bodyPr>
+          <a:lstStyle/>
+          <a:p>
+            <a:r>
+              <a:rPr lang="fr-FR" sz="3600" b="1" dirty="0">
+                <a:solidFill>
+                  <a:schemeClr val="bg1"/>
+                </a:solidFill>
+                <a:latin typeface="Gill Sans MT" panose="020B0502020104020203" pitchFamily="34" charset="0"/>
+              </a:rPr>
+              <a:t>Introduction</a:t>
+            </a:r>
+          </a:p>
+        </p:txBody>
+      </p:sp>
+      <p:pic>
+        <p:nvPicPr>
+          <p:cNvPr id="4" name="Graphique 3" descr="Flèches de chevron">
+            <a:extLst>
+              <a:ext uri="{FF2B5EF4-FFF2-40B4-BE49-F238E27FC236}">
+                <a16:creationId xmlns:a16="http://schemas.microsoft.com/office/drawing/2014/main" id="{358D0F2A-5D55-3BCA-A5C6-BEE40DA79E83}"/>
+              </a:ext>
+            </a:extLst>
+          </p:cNvPr>
+          <p:cNvPicPr>
+            <a:picLocks noChangeAspect="1"/>
+          </p:cNvPicPr>
+          <p:nvPr/>
+        </p:nvPicPr>
+        <p:blipFill>
+          <a:blip r:embed="rId2">
+            <a:extLst>
+              <a:ext uri="{28A0092B-C50C-407E-A947-70E740481C1C}">
+                <a14:useLocalDpi xmlns:a14="http://schemas.microsoft.com/office/drawing/2010/main" val="0"/>
+              </a:ext>
+              <a:ext uri="{96DAC541-7B7A-43D3-8B79-37D633B846F1}">
+                <asvg:svgBlip xmlns:asvg="http://schemas.microsoft.com/office/drawing/2016/SVG/main" r:embed="rId3"/>
+              </a:ext>
+            </a:extLst>
+          </a:blip>
+          <a:stretch>
+            <a:fillRect/>
+          </a:stretch>
+        </p:blipFill>
+        <p:spPr>
+          <a:xfrm>
+            <a:off x="11078692" y="266700"/>
+            <a:ext cx="1170459" cy="1170459"/>
+          </a:xfrm>
+          <a:prstGeom prst="rect">
+            <a:avLst/>
+          </a:prstGeom>
+        </p:spPr>
+      </p:pic>
     </p:spTree>
     <p:extLst>
       <p:ext uri="{BB962C8B-B14F-4D97-AF65-F5344CB8AC3E}">

</xml_diff>

<commit_message>
Réorganisation et attribution des parties
</commit_message>
<xml_diff>
--- a/Présentation/Soutenance_Groupe25.pptx
+++ b/Présentation/Soutenance_Groupe25.pptx
@@ -16,7 +16,7 @@
   </p:handoutMasterIdLst>
   <p:sldIdLst>
     <p:sldId id="257" r:id="rId6"/>
-    <p:sldId id="258" r:id="rId7"/>
+    <p:sldId id="295" r:id="rId7"/>
     <p:sldId id="259" r:id="rId8"/>
     <p:sldId id="260" r:id="rId9"/>
     <p:sldId id="288" r:id="rId10"/>
@@ -28,9 +28,9 @@
     <p:sldId id="291" r:id="rId16"/>
     <p:sldId id="265" r:id="rId17"/>
     <p:sldId id="266" r:id="rId18"/>
-    <p:sldId id="276" r:id="rId19"/>
-    <p:sldId id="277" r:id="rId20"/>
-    <p:sldId id="278" r:id="rId21"/>
+    <p:sldId id="277" r:id="rId19"/>
+    <p:sldId id="278" r:id="rId20"/>
+    <p:sldId id="296" r:id="rId21"/>
     <p:sldId id="267" r:id="rId22"/>
     <p:sldId id="268" r:id="rId23"/>
     <p:sldId id="279" r:id="rId24"/>
@@ -248,7 +248,7 @@
           <a:p>
             <a:fld id="{02EF5511-433E-438D-93BB-1E1EB804EB9E}" type="datetimeFigureOut">
               <a:rPr lang="fr-FR" smtClean="0"/>
-              <a:t>19/04/2025</a:t>
+              <a:t>21/04/2025</a:t>
             </a:fld>
             <a:endParaRPr lang="fr-FR"/>
           </a:p>
@@ -426,7 +426,7 @@
           <a:p>
             <a:fld id="{173019D8-EACC-4538-984E-33CCC42DAA4E}" type="datetimeFigureOut">
               <a:rPr lang="fr-FR" smtClean="0"/>
-              <a:t>19/04/2025</a:t>
+              <a:t>21/04/2025</a:t>
             </a:fld>
             <a:endParaRPr lang="fr-FR"/>
           </a:p>
@@ -919,7 +919,7 @@
             <a:fld id="{B4BDA9CF-F2B2-41BE-8486-9C59032E0655}" type="datetime4">
               <a:rPr lang="fr-FR" smtClean="0"/>
               <a:pPr/>
-              <a:t>19 avril 2025</a:t>
+              <a:t>21 avril 2025</a:t>
             </a:fld>
             <a:endParaRPr lang="fr-FR" dirty="0"/>
           </a:p>
@@ -8172,7 +8172,25 @@
                 </a:solidFill>
                 <a:latin typeface="Gill Sans MT" panose="020B0502020104020203" pitchFamily="34" charset="0"/>
               </a:rPr>
-              <a:t>2.1. Source des données</a:t>
+              <a:t>2.1. Données (</a:t>
+            </a:r>
+            <a:r>
+              <a:rPr lang="fr-FR" sz="3600" b="1" dirty="0">
+                <a:solidFill>
+                  <a:srgbClr val="FF0000"/>
+                </a:solidFill>
+                <a:latin typeface="Gill Sans MT" panose="020B0502020104020203" pitchFamily="34" charset="0"/>
+              </a:rPr>
+              <a:t>Toussaint</a:t>
+            </a:r>
+            <a:r>
+              <a:rPr lang="fr-FR" sz="3600" b="1" dirty="0">
+                <a:solidFill>
+                  <a:schemeClr val="bg1"/>
+                </a:solidFill>
+                <a:latin typeface="Gill Sans MT" panose="020B0502020104020203" pitchFamily="34" charset="0"/>
+              </a:rPr>
+              <a:t>)</a:t>
             </a:r>
           </a:p>
         </p:txBody>
@@ -8297,254 +8315,6 @@
 </file>
 
 <file path=ppt/slides/slide14.xml><?xml version="1.0" encoding="utf-8"?>
-<p:sld xmlns:a="http://schemas.openxmlformats.org/drawingml/2006/main" xmlns:r="http://schemas.openxmlformats.org/officeDocument/2006/relationships" xmlns:p="http://schemas.openxmlformats.org/presentationml/2006/main">
-  <p:cSld>
-    <p:spTree>
-      <p:nvGrpSpPr>
-        <p:cNvPr id="1" name="">
-          <a:extLst>
-            <a:ext uri="{FF2B5EF4-FFF2-40B4-BE49-F238E27FC236}">
-              <a16:creationId xmlns:a16="http://schemas.microsoft.com/office/drawing/2014/main" id="{9D13170E-A7F5-0DD7-25CF-965B06E13C35}"/>
-            </a:ext>
-          </a:extLst>
-        </p:cNvPr>
-        <p:cNvGrpSpPr/>
-        <p:nvPr/>
-      </p:nvGrpSpPr>
-      <p:grpSpPr>
-        <a:xfrm>
-          <a:off x="0" y="0"/>
-          <a:ext cx="0" cy="0"/>
-          <a:chOff x="0" y="0"/>
-          <a:chExt cx="0" cy="0"/>
-        </a:xfrm>
-      </p:grpSpPr>
-      <p:sp>
-        <p:nvSpPr>
-          <p:cNvPr id="2" name="Espace réservé du numéro de diapositive 1">
-            <a:extLst>
-              <a:ext uri="{FF2B5EF4-FFF2-40B4-BE49-F238E27FC236}">
-                <a16:creationId xmlns:a16="http://schemas.microsoft.com/office/drawing/2014/main" id="{063D944C-3C21-BB3D-D02B-3CDF035BF080}"/>
-              </a:ext>
-            </a:extLst>
-          </p:cNvPr>
-          <p:cNvSpPr>
-            <a:spLocks noGrp="1"/>
-          </p:cNvSpPr>
-          <p:nvPr>
-            <p:ph type="sldNum" sz="quarter" idx="4"/>
-          </p:nvPr>
-        </p:nvSpPr>
-        <p:spPr/>
-        <p:txBody>
-          <a:bodyPr/>
-          <a:lstStyle/>
-          <a:p>
-            <a:fld id="{F546B7B7-7D14-4795-A998-350CFB2BDD43}" type="slidenum">
-              <a:rPr lang="fr-FR" smtClean="0"/>
-              <a:pPr/>
-              <a:t>14</a:t>
-            </a:fld>
-            <a:endParaRPr lang="fr-FR"/>
-          </a:p>
-        </p:txBody>
-      </p:sp>
-      <p:sp>
-        <p:nvSpPr>
-          <p:cNvPr id="3" name="ZoneTexte 2">
-            <a:extLst>
-              <a:ext uri="{FF2B5EF4-FFF2-40B4-BE49-F238E27FC236}">
-                <a16:creationId xmlns:a16="http://schemas.microsoft.com/office/drawing/2014/main" id="{A88BB36C-22B0-C514-5127-3F70D4409339}"/>
-              </a:ext>
-            </a:extLst>
-          </p:cNvPr>
-          <p:cNvSpPr txBox="1"/>
-          <p:nvPr/>
-        </p:nvSpPr>
-        <p:spPr>
-          <a:xfrm>
-            <a:off x="2" y="532969"/>
-            <a:ext cx="12191999" cy="646331"/>
-          </a:xfrm>
-          <a:prstGeom prst="rect">
-            <a:avLst/>
-          </a:prstGeom>
-          <a:solidFill>
-            <a:srgbClr val="006A5A"/>
-          </a:solidFill>
-        </p:spPr>
-        <p:txBody>
-          <a:bodyPr wrap="square" rtlCol="0">
-            <a:spAutoFit/>
-          </a:bodyPr>
-          <a:lstStyle/>
-          <a:p>
-            <a:r>
-              <a:rPr lang="fr-FR" sz="3600" b="1" dirty="0">
-                <a:solidFill>
-                  <a:schemeClr val="bg1"/>
-                </a:solidFill>
-                <a:latin typeface="Gill Sans MT" panose="020B0502020104020203" pitchFamily="34" charset="0"/>
-              </a:rPr>
-              <a:t>2.2. Traitements réalisés sur la base de données</a:t>
-            </a:r>
-          </a:p>
-        </p:txBody>
-      </p:sp>
-      <p:pic>
-        <p:nvPicPr>
-          <p:cNvPr id="4" name="Graphique 3" descr="Flèches de chevron">
-            <a:extLst>
-              <a:ext uri="{FF2B5EF4-FFF2-40B4-BE49-F238E27FC236}">
-                <a16:creationId xmlns:a16="http://schemas.microsoft.com/office/drawing/2014/main" id="{E7CBEBBD-EC89-234C-5549-1D98CA7C0843}"/>
-              </a:ext>
-            </a:extLst>
-          </p:cNvPr>
-          <p:cNvPicPr>
-            <a:picLocks noChangeAspect="1"/>
-          </p:cNvPicPr>
-          <p:nvPr/>
-        </p:nvPicPr>
-        <p:blipFill>
-          <a:blip r:embed="rId2">
-            <a:extLst>
-              <a:ext uri="{28A0092B-C50C-407E-A947-70E740481C1C}">
-                <a14:useLocalDpi xmlns:a14="http://schemas.microsoft.com/office/drawing/2010/main" val="0"/>
-              </a:ext>
-              <a:ext uri="{96DAC541-7B7A-43D3-8B79-37D633B846F1}">
-                <asvg:svgBlip xmlns:asvg="http://schemas.microsoft.com/office/drawing/2016/SVG/main" r:embed="rId3"/>
-              </a:ext>
-            </a:extLst>
-          </a:blip>
-          <a:stretch>
-            <a:fillRect/>
-          </a:stretch>
-        </p:blipFill>
-        <p:spPr>
-          <a:xfrm>
-            <a:off x="11078692" y="266700"/>
-            <a:ext cx="1170459" cy="1170459"/>
-          </a:xfrm>
-          <a:prstGeom prst="rect">
-            <a:avLst/>
-          </a:prstGeom>
-        </p:spPr>
-      </p:pic>
-      <p:sp>
-        <p:nvSpPr>
-          <p:cNvPr id="6" name="ZoneTexte 5">
-            <a:extLst>
-              <a:ext uri="{FF2B5EF4-FFF2-40B4-BE49-F238E27FC236}">
-                <a16:creationId xmlns:a16="http://schemas.microsoft.com/office/drawing/2014/main" id="{3A61602A-B875-F1EE-6CD5-F3F498F133F6}"/>
-              </a:ext>
-            </a:extLst>
-          </p:cNvPr>
-          <p:cNvSpPr txBox="1"/>
-          <p:nvPr/>
-        </p:nvSpPr>
-        <p:spPr>
-          <a:xfrm>
-            <a:off x="0" y="1599029"/>
-            <a:ext cx="12191999" cy="1247586"/>
-          </a:xfrm>
-          <a:prstGeom prst="rect">
-            <a:avLst/>
-          </a:prstGeom>
-          <a:noFill/>
-        </p:spPr>
-        <p:txBody>
-          <a:bodyPr wrap="square">
-            <a:spAutoFit/>
-          </a:bodyPr>
-          <a:lstStyle/>
-          <a:p>
-            <a:pPr marL="742950" lvl="1" indent="-285750" algn="l">
-              <a:lnSpc>
-                <a:spcPts val="2143"/>
-              </a:lnSpc>
-              <a:spcBef>
-                <a:spcPts val="300"/>
-              </a:spcBef>
-              <a:spcAft>
-                <a:spcPts val="1029"/>
-              </a:spcAft>
-              <a:buFont typeface="Arial" panose="020B0604020202020204" pitchFamily="34" charset="0"/>
-              <a:buChar char="•"/>
-            </a:pPr>
-            <a:r>
-              <a:rPr lang="fr-FR" sz="2400" b="0" i="0" dirty="0">
-                <a:solidFill>
-                  <a:srgbClr val="404040"/>
-                </a:solidFill>
-                <a:effectLst/>
-              </a:rPr>
-              <a:t>Fusion des bases via le code commune.</a:t>
-            </a:r>
-          </a:p>
-          <a:p>
-            <a:pPr marL="742950" lvl="1" indent="-285750" algn="l">
-              <a:lnSpc>
-                <a:spcPts val="2143"/>
-              </a:lnSpc>
-              <a:spcBef>
-                <a:spcPts val="300"/>
-              </a:spcBef>
-              <a:spcAft>
-                <a:spcPts val="1029"/>
-              </a:spcAft>
-              <a:buFont typeface="Arial" panose="020B0604020202020204" pitchFamily="34" charset="0"/>
-              <a:buChar char="•"/>
-            </a:pPr>
-            <a:r>
-              <a:rPr lang="fr-FR" sz="2400" b="0" i="0" dirty="0">
-                <a:solidFill>
-                  <a:srgbClr val="404040"/>
-                </a:solidFill>
-                <a:effectLst/>
-              </a:rPr>
-              <a:t>Calcul du taux de consultations.</a:t>
-            </a:r>
-          </a:p>
-          <a:p>
-            <a:pPr marL="742950" lvl="1" indent="-285750" algn="l">
-              <a:lnSpc>
-                <a:spcPts val="2143"/>
-              </a:lnSpc>
-              <a:spcBef>
-                <a:spcPts val="300"/>
-              </a:spcBef>
-              <a:spcAft>
-                <a:spcPts val="1029"/>
-              </a:spcAft>
-              <a:buFont typeface="Arial" panose="020B0604020202020204" pitchFamily="34" charset="0"/>
-              <a:buChar char="•"/>
-            </a:pPr>
-            <a:r>
-              <a:rPr lang="fr-FR" sz="2400" b="0" i="0" dirty="0">
-                <a:solidFill>
-                  <a:srgbClr val="404040"/>
-                </a:solidFill>
-                <a:effectLst/>
-              </a:rPr>
-              <a:t>Correction des coordonnées géographiques.</a:t>
-            </a:r>
-          </a:p>
-        </p:txBody>
-      </p:sp>
-    </p:spTree>
-    <p:extLst>
-      <p:ext uri="{BB962C8B-B14F-4D97-AF65-F5344CB8AC3E}">
-        <p14:creationId xmlns:p14="http://schemas.microsoft.com/office/powerpoint/2010/main" val="3958834888"/>
-      </p:ext>
-    </p:extLst>
-  </p:cSld>
-  <p:clrMapOvr>
-    <a:masterClrMapping/>
-  </p:clrMapOvr>
-</p:sld>
-</file>
-
-<file path=ppt/slides/slide15.xml><?xml version="1.0" encoding="utf-8"?>
 <p:sld xmlns:a="http://schemas.openxmlformats.org/drawingml/2006/main" xmlns:r="http://schemas.openxmlformats.org/officeDocument/2006/relationships" xmlns:p="http://schemas.openxmlformats.org/presentationml/2006/main">
   <p:cSld>
     <p:spTree>
@@ -8583,6 +8353,176 @@
             <p:ph type="sldNum" sz="quarter" idx="4"/>
           </p:nvPr>
         </p:nvSpPr>
+        <p:spPr>
+          <a:xfrm>
+            <a:off x="8630334" y="6326664"/>
+            <a:ext cx="2743200" cy="365125"/>
+          </a:xfrm>
+        </p:spPr>
+        <p:txBody>
+          <a:bodyPr/>
+          <a:lstStyle/>
+          <a:p>
+            <a:fld id="{F546B7B7-7D14-4795-A998-350CFB2BDD43}" type="slidenum">
+              <a:rPr lang="fr-FR" smtClean="0"/>
+              <a:pPr/>
+              <a:t>14</a:t>
+            </a:fld>
+            <a:endParaRPr lang="fr-FR" dirty="0"/>
+          </a:p>
+        </p:txBody>
+      </p:sp>
+      <p:sp>
+        <p:nvSpPr>
+          <p:cNvPr id="3" name="ZoneTexte 2">
+            <a:extLst>
+              <a:ext uri="{FF2B5EF4-FFF2-40B4-BE49-F238E27FC236}">
+                <a16:creationId xmlns:a16="http://schemas.microsoft.com/office/drawing/2014/main" id="{77799782-4492-2B68-93B1-81779BB005B2}"/>
+              </a:ext>
+            </a:extLst>
+          </p:cNvPr>
+          <p:cNvSpPr txBox="1"/>
+          <p:nvPr/>
+        </p:nvSpPr>
+        <p:spPr>
+          <a:xfrm>
+            <a:off x="1" y="348773"/>
+            <a:ext cx="12191999" cy="646331"/>
+          </a:xfrm>
+          <a:prstGeom prst="rect">
+            <a:avLst/>
+          </a:prstGeom>
+          <a:solidFill>
+            <a:srgbClr val="006A5A"/>
+          </a:solidFill>
+        </p:spPr>
+        <p:txBody>
+          <a:bodyPr wrap="square" rtlCol="0">
+            <a:spAutoFit/>
+          </a:bodyPr>
+          <a:lstStyle/>
+          <a:p>
+            <a:r>
+              <a:rPr lang="fr-FR" sz="3600" b="1" dirty="0">
+                <a:solidFill>
+                  <a:schemeClr val="bg1"/>
+                </a:solidFill>
+                <a:latin typeface="Gill Sans MT" panose="020B0502020104020203" pitchFamily="34" charset="0"/>
+              </a:rPr>
+              <a:t>2.2. Concepts fondamentaux (</a:t>
+            </a:r>
+            <a:r>
+              <a:rPr lang="fr-FR" sz="3600" b="1" dirty="0">
+                <a:solidFill>
+                  <a:srgbClr val="FF0000"/>
+                </a:solidFill>
+                <a:latin typeface="Gill Sans MT" panose="020B0502020104020203" pitchFamily="34" charset="0"/>
+              </a:rPr>
+              <a:t>Toussaint</a:t>
+            </a:r>
+            <a:r>
+              <a:rPr lang="fr-FR" sz="3600" b="1" dirty="0">
+                <a:solidFill>
+                  <a:schemeClr val="bg1"/>
+                </a:solidFill>
+                <a:latin typeface="Gill Sans MT" panose="020B0502020104020203" pitchFamily="34" charset="0"/>
+              </a:rPr>
+              <a:t>)</a:t>
+            </a:r>
+          </a:p>
+        </p:txBody>
+      </p:sp>
+      <p:pic>
+        <p:nvPicPr>
+          <p:cNvPr id="4" name="Graphique 3" descr="Flèches de chevron">
+            <a:extLst>
+              <a:ext uri="{FF2B5EF4-FFF2-40B4-BE49-F238E27FC236}">
+                <a16:creationId xmlns:a16="http://schemas.microsoft.com/office/drawing/2014/main" id="{0E234149-892C-04F7-1E37-E661D2AA2103}"/>
+              </a:ext>
+            </a:extLst>
+          </p:cNvPr>
+          <p:cNvPicPr>
+            <a:picLocks noChangeAspect="1"/>
+          </p:cNvPicPr>
+          <p:nvPr/>
+        </p:nvPicPr>
+        <p:blipFill>
+          <a:blip r:embed="rId2">
+            <a:extLst>
+              <a:ext uri="{28A0092B-C50C-407E-A947-70E740481C1C}">
+                <a14:useLocalDpi xmlns:a14="http://schemas.microsoft.com/office/drawing/2010/main" val="0"/>
+              </a:ext>
+              <a:ext uri="{96DAC541-7B7A-43D3-8B79-37D633B846F1}">
+                <asvg:svgBlip xmlns:asvg="http://schemas.microsoft.com/office/drawing/2016/SVG/main" r:embed="rId3"/>
+              </a:ext>
+            </a:extLst>
+          </a:blip>
+          <a:stretch>
+            <a:fillRect/>
+          </a:stretch>
+        </p:blipFill>
+        <p:spPr>
+          <a:xfrm>
+            <a:off x="11078691" y="82504"/>
+            <a:ext cx="1170459" cy="1170459"/>
+          </a:xfrm>
+          <a:prstGeom prst="rect">
+            <a:avLst/>
+          </a:prstGeom>
+        </p:spPr>
+      </p:pic>
+    </p:spTree>
+    <p:extLst>
+      <p:ext uri="{BB962C8B-B14F-4D97-AF65-F5344CB8AC3E}">
+        <p14:creationId xmlns:p14="http://schemas.microsoft.com/office/powerpoint/2010/main" val="2392160713"/>
+      </p:ext>
+    </p:extLst>
+  </p:cSld>
+  <p:clrMapOvr>
+    <a:masterClrMapping/>
+  </p:clrMapOvr>
+</p:sld>
+</file>
+
+<file path=ppt/slides/slide15.xml><?xml version="1.0" encoding="utf-8"?>
+<p:sld xmlns:a="http://schemas.openxmlformats.org/drawingml/2006/main" xmlns:r="http://schemas.openxmlformats.org/officeDocument/2006/relationships" xmlns:p="http://schemas.openxmlformats.org/presentationml/2006/main">
+  <p:cSld>
+    <p:spTree>
+      <p:nvGrpSpPr>
+        <p:cNvPr id="1" name="">
+          <a:extLst>
+            <a:ext uri="{FF2B5EF4-FFF2-40B4-BE49-F238E27FC236}">
+              <a16:creationId xmlns:a16="http://schemas.microsoft.com/office/drawing/2014/main" id="{98B0D1BF-5844-EDB5-F573-31335D368525}"/>
+            </a:ext>
+          </a:extLst>
+        </p:cNvPr>
+        <p:cNvGrpSpPr/>
+        <p:nvPr/>
+      </p:nvGrpSpPr>
+      <p:grpSpPr>
+        <a:xfrm>
+          <a:off x="0" y="0"/>
+          <a:ext cx="0" cy="0"/>
+          <a:chOff x="0" y="0"/>
+          <a:chExt cx="0" cy="0"/>
+        </a:xfrm>
+      </p:grpSpPr>
+      <p:sp>
+        <p:nvSpPr>
+          <p:cNvPr id="2" name="Espace réservé du numéro de diapositive 1">
+            <a:extLst>
+              <a:ext uri="{FF2B5EF4-FFF2-40B4-BE49-F238E27FC236}">
+                <a16:creationId xmlns:a16="http://schemas.microsoft.com/office/drawing/2014/main" id="{15E57845-333C-D9B0-61B9-E44608ADEAA3}"/>
+              </a:ext>
+            </a:extLst>
+          </p:cNvPr>
+          <p:cNvSpPr>
+            <a:spLocks noGrp="1"/>
+          </p:cNvSpPr>
+          <p:nvPr>
+            <p:ph type="sldNum" sz="quarter" idx="4"/>
+          </p:nvPr>
+        </p:nvSpPr>
         <p:spPr/>
         <p:txBody>
           <a:bodyPr/>
@@ -8602,7 +8542,7 @@
           <p:cNvPr id="3" name="ZoneTexte 2">
             <a:extLst>
               <a:ext uri="{FF2B5EF4-FFF2-40B4-BE49-F238E27FC236}">
-                <a16:creationId xmlns:a16="http://schemas.microsoft.com/office/drawing/2014/main" id="{77799782-4492-2B68-93B1-81779BB005B2}"/>
+                <a16:creationId xmlns:a16="http://schemas.microsoft.com/office/drawing/2014/main" id="{7A5700A4-2F79-0C0D-2093-533521F29605}"/>
               </a:ext>
             </a:extLst>
           </p:cNvPr>
@@ -8634,7 +8574,25 @@
                 </a:solidFill>
                 <a:latin typeface="Gill Sans MT" panose="020B0502020104020203" pitchFamily="34" charset="0"/>
               </a:rPr>
-              <a:t>2.3. Concepts fondamentaux en économétrie spatiale</a:t>
+              <a:t>2.4. Modèles (</a:t>
+            </a:r>
+            <a:r>
+              <a:rPr lang="fr-FR" sz="3600" b="1" dirty="0">
+                <a:solidFill>
+                  <a:srgbClr val="FF0000"/>
+                </a:solidFill>
+                <a:latin typeface="Gill Sans MT" panose="020B0502020104020203" pitchFamily="34" charset="0"/>
+              </a:rPr>
+              <a:t>Richard</a:t>
+            </a:r>
+            <a:r>
+              <a:rPr lang="fr-FR" sz="3600" b="1" dirty="0">
+                <a:solidFill>
+                  <a:schemeClr val="bg1"/>
+                </a:solidFill>
+                <a:latin typeface="Gill Sans MT" panose="020B0502020104020203" pitchFamily="34" charset="0"/>
+              </a:rPr>
+              <a:t>)</a:t>
             </a:r>
           </a:p>
         </p:txBody>
@@ -8644,7 +8602,7 @@
           <p:cNvPr id="4" name="Graphique 3" descr="Flèches de chevron">
             <a:extLst>
               <a:ext uri="{FF2B5EF4-FFF2-40B4-BE49-F238E27FC236}">
-                <a16:creationId xmlns:a16="http://schemas.microsoft.com/office/drawing/2014/main" id="{0E234149-892C-04F7-1E37-E661D2AA2103}"/>
+                <a16:creationId xmlns:a16="http://schemas.microsoft.com/office/drawing/2014/main" id="{280B7A1C-90CA-A1EF-957B-AF158B9ACE97}"/>
               </a:ext>
             </a:extLst>
           </p:cNvPr>
@@ -8681,7 +8639,7 @@
     </p:spTree>
     <p:extLst>
       <p:ext uri="{BB962C8B-B14F-4D97-AF65-F5344CB8AC3E}">
-        <p14:creationId xmlns:p14="http://schemas.microsoft.com/office/powerpoint/2010/main" val="2392160713"/>
+        <p14:creationId xmlns:p14="http://schemas.microsoft.com/office/powerpoint/2010/main" val="3610963717"/>
       </p:ext>
     </p:extLst>
   </p:cSld>
@@ -8781,7 +8739,7 @@
                 </a:solidFill>
                 <a:latin typeface="Gill Sans MT" panose="020B0502020104020203" pitchFamily="34" charset="0"/>
               </a:rPr>
-              <a:t>2.4. Modélisation en économétrie spatiale</a:t>
+              <a:t>2.4. Modèles</a:t>
             </a:r>
           </a:p>
         </p:txBody>
@@ -8853,8 +8811,8 @@
         </p:blipFill>
         <p:spPr>
           <a:xfrm>
-            <a:off x="4023052" y="1703428"/>
-            <a:ext cx="7584310" cy="4176074"/>
+            <a:off x="1059125" y="1236666"/>
+            <a:ext cx="9315038" cy="5062317"/>
           </a:xfrm>
           <a:prstGeom prst="rect">
             <a:avLst/>
@@ -8864,7 +8822,7 @@
     </p:spTree>
     <p:extLst>
       <p:ext uri="{BB962C8B-B14F-4D97-AF65-F5344CB8AC3E}">
-        <p14:creationId xmlns:p14="http://schemas.microsoft.com/office/powerpoint/2010/main" val="3610963717"/>
+        <p14:creationId xmlns:p14="http://schemas.microsoft.com/office/powerpoint/2010/main" val="3843628031"/>
       </p:ext>
     </p:extLst>
   </p:cSld>
@@ -8918,6 +8876,47 @@
               <a:t>17</a:t>
             </a:fld>
             <a:endParaRPr lang="fr-FR"/>
+          </a:p>
+        </p:txBody>
+      </p:sp>
+      <p:sp>
+        <p:nvSpPr>
+          <p:cNvPr id="3" name="ZoneTexte 2">
+            <a:extLst>
+              <a:ext uri="{FF2B5EF4-FFF2-40B4-BE49-F238E27FC236}">
+                <a16:creationId xmlns:a16="http://schemas.microsoft.com/office/drawing/2014/main" id="{8C7A9209-43A5-4EC1-8923-66DC1EBB94AB}"/>
+              </a:ext>
+            </a:extLst>
+          </p:cNvPr>
+          <p:cNvSpPr txBox="1"/>
+          <p:nvPr/>
+        </p:nvSpPr>
+        <p:spPr>
+          <a:xfrm>
+            <a:off x="3545767" y="4960127"/>
+            <a:ext cx="4802245" cy="646331"/>
+          </a:xfrm>
+          <a:prstGeom prst="rect">
+            <a:avLst/>
+          </a:prstGeom>
+          <a:noFill/>
+        </p:spPr>
+        <p:txBody>
+          <a:bodyPr wrap="square" rtlCol="0">
+            <a:spAutoFit/>
+          </a:bodyPr>
+          <a:lstStyle/>
+          <a:p>
+            <a:pPr algn="ctr"/>
+            <a:r>
+              <a:rPr lang="fr-FR" sz="3600" b="1" dirty="0">
+                <a:solidFill>
+                  <a:srgbClr val="FF0000"/>
+                </a:solidFill>
+                <a:latin typeface="Gill Sans MT" panose="020B0502020104020203" pitchFamily="34" charset="0"/>
+              </a:rPr>
+              <a:t>Ali et Alex</a:t>
+            </a:r>
           </a:p>
         </p:txBody>
       </p:sp>
@@ -9280,7 +9279,7 @@
           <p:cNvPr id="2" name="Espace réservé du numéro de diapositive 1">
             <a:extLst>
               <a:ext uri="{FF2B5EF4-FFF2-40B4-BE49-F238E27FC236}">
-                <a16:creationId xmlns:a16="http://schemas.microsoft.com/office/drawing/2014/main" id="{13C29215-135A-F8DE-B645-88C4FB843ED2}"/>
+                <a16:creationId xmlns:a16="http://schemas.microsoft.com/office/drawing/2014/main" id="{8C01E1E5-CF31-43CE-B673-7FD9ACDEA53D}"/>
               </a:ext>
             </a:extLst>
           </p:cNvPr>
@@ -9288,7 +9287,7 @@
             <a:spLocks noGrp="1"/>
           </p:cNvSpPr>
           <p:nvPr>
-            <p:ph type="sldNum" sz="quarter" idx="12"/>
+            <p:ph type="sldNum" sz="quarter" idx="4"/>
           </p:nvPr>
         </p:nvSpPr>
         <p:spPr/>
@@ -9298,6 +9297,7 @@
           <a:p>
             <a:fld id="{F546B7B7-7D14-4795-A998-350CFB2BDD43}" type="slidenum">
               <a:rPr lang="fr-FR" smtClean="0"/>
+              <a:pPr/>
               <a:t>2</a:t>
             </a:fld>
             <a:endParaRPr lang="fr-FR" dirty="0"/>
@@ -9306,10 +9306,10 @@
       </p:sp>
       <p:sp>
         <p:nvSpPr>
-          <p:cNvPr id="37" name="ZoneTexte 36">
-            <a:extLst>
-              <a:ext uri="{FF2B5EF4-FFF2-40B4-BE49-F238E27FC236}">
-                <a16:creationId xmlns:a16="http://schemas.microsoft.com/office/drawing/2014/main" id="{FA0D879D-042A-4F25-1CD5-D96DEFB6454D}"/>
+          <p:cNvPr id="3" name="ZoneTexte 2">
+            <a:extLst>
+              <a:ext uri="{FF2B5EF4-FFF2-40B4-BE49-F238E27FC236}">
+                <a16:creationId xmlns:a16="http://schemas.microsoft.com/office/drawing/2014/main" id="{DCA9429B-D3C5-4B58-B7FB-94AEE6F0D1FF}"/>
               </a:ext>
             </a:extLst>
           </p:cNvPr>
@@ -9318,99 +9318,173 @@
         </p:nvSpPr>
         <p:spPr>
           <a:xfrm>
-            <a:off x="608325" y="1137618"/>
-            <a:ext cx="5349415" cy="523348"/>
+            <a:off x="407039" y="858984"/>
+            <a:ext cx="11276229" cy="48838"/>
           </a:xfrm>
           <a:prstGeom prst="rect">
             <a:avLst/>
           </a:prstGeom>
           <a:solidFill>
-            <a:srgbClr val="203864"/>
+            <a:srgbClr val="006A5A"/>
           </a:solidFill>
         </p:spPr>
         <p:txBody>
-          <a:bodyPr wrap="square" rtlCol="0">
+          <a:bodyPr wrap="square">
             <a:spAutoFit/>
           </a:bodyPr>
+          <a:lstStyle/>
+          <a:p>
+            <a:pPr algn="ctr">
+              <a:lnSpc>
+                <a:spcPts val="2143"/>
+              </a:lnSpc>
+              <a:spcBef>
+                <a:spcPts val="1029"/>
+              </a:spcBef>
+              <a:spcAft>
+                <a:spcPts val="1029"/>
+              </a:spcAft>
+            </a:pPr>
+            <a:endParaRPr lang="fr-FR" sz="3200" dirty="0">
+              <a:solidFill>
+                <a:schemeClr val="bg1"/>
+              </a:solidFill>
+              <a:latin typeface="DeepSeek-CJK-patch"/>
+            </a:endParaRPr>
+          </a:p>
+        </p:txBody>
+      </p:sp>
+      <p:sp>
+        <p:nvSpPr>
+          <p:cNvPr id="4" name="Espace réservé du numéro de diapositive 1">
+            <a:extLst>
+              <a:ext uri="{FF2B5EF4-FFF2-40B4-BE49-F238E27FC236}">
+                <a16:creationId xmlns:a16="http://schemas.microsoft.com/office/drawing/2014/main" id="{E9C80AF1-A5BB-4436-92D8-F3407CB1AA8A}"/>
+              </a:ext>
+            </a:extLst>
+          </p:cNvPr>
+          <p:cNvSpPr txBox="1">
+            <a:spLocks/>
+          </p:cNvSpPr>
+          <p:nvPr/>
+        </p:nvSpPr>
+        <p:spPr>
+          <a:xfrm>
+            <a:off x="8610600" y="6356350"/>
+            <a:ext cx="2704278" cy="365125"/>
+          </a:xfrm>
+          <a:prstGeom prst="rect">
+            <a:avLst/>
+          </a:prstGeom>
+        </p:spPr>
+        <p:txBody>
+          <a:bodyPr/>
           <a:lstStyle>
             <a:defPPr>
               <a:defRPr lang="fr-FR"/>
             </a:defPPr>
-            <a:lvl1pPr>
-              <a:defRPr sz="2800">
-                <a:latin typeface="Gill Sans MT" panose="020B0502020104020203" pitchFamily="34" charset="0"/>
+            <a:lvl1pPr marL="0" algn="l" defTabSz="914400" rtl="0" eaLnBrk="1" latinLnBrk="0" hangingPunct="1">
+              <a:defRPr sz="1800" kern="1200">
+                <a:solidFill>
+                  <a:schemeClr val="tx1"/>
+                </a:solidFill>
+                <a:latin typeface="+mn-lt"/>
+                <a:ea typeface="+mn-ea"/>
+                <a:cs typeface="+mn-cs"/>
               </a:defRPr>
             </a:lvl1pPr>
+            <a:lvl2pPr marL="457200" algn="l" defTabSz="914400" rtl="0" eaLnBrk="1" latinLnBrk="0" hangingPunct="1">
+              <a:defRPr sz="1800" kern="1200">
+                <a:solidFill>
+                  <a:schemeClr val="tx1"/>
+                </a:solidFill>
+                <a:latin typeface="+mn-lt"/>
+                <a:ea typeface="+mn-ea"/>
+                <a:cs typeface="+mn-cs"/>
+              </a:defRPr>
+            </a:lvl2pPr>
+            <a:lvl3pPr marL="914400" algn="l" defTabSz="914400" rtl="0" eaLnBrk="1" latinLnBrk="0" hangingPunct="1">
+              <a:defRPr sz="1800" kern="1200">
+                <a:solidFill>
+                  <a:schemeClr val="tx1"/>
+                </a:solidFill>
+                <a:latin typeface="+mn-lt"/>
+                <a:ea typeface="+mn-ea"/>
+                <a:cs typeface="+mn-cs"/>
+              </a:defRPr>
+            </a:lvl3pPr>
+            <a:lvl4pPr marL="1371600" algn="l" defTabSz="914400" rtl="0" eaLnBrk="1" latinLnBrk="0" hangingPunct="1">
+              <a:defRPr sz="1800" kern="1200">
+                <a:solidFill>
+                  <a:schemeClr val="tx1"/>
+                </a:solidFill>
+                <a:latin typeface="+mn-lt"/>
+                <a:ea typeface="+mn-ea"/>
+                <a:cs typeface="+mn-cs"/>
+              </a:defRPr>
+            </a:lvl4pPr>
+            <a:lvl5pPr marL="1828800" algn="l" defTabSz="914400" rtl="0" eaLnBrk="1" latinLnBrk="0" hangingPunct="1">
+              <a:defRPr sz="1800" kern="1200">
+                <a:solidFill>
+                  <a:schemeClr val="tx1"/>
+                </a:solidFill>
+                <a:latin typeface="+mn-lt"/>
+                <a:ea typeface="+mn-ea"/>
+                <a:cs typeface="+mn-cs"/>
+              </a:defRPr>
+            </a:lvl5pPr>
+            <a:lvl6pPr marL="2286000" algn="l" defTabSz="914400" rtl="0" eaLnBrk="1" latinLnBrk="0" hangingPunct="1">
+              <a:defRPr sz="1800" kern="1200">
+                <a:solidFill>
+                  <a:schemeClr val="tx1"/>
+                </a:solidFill>
+                <a:latin typeface="+mn-lt"/>
+                <a:ea typeface="+mn-ea"/>
+                <a:cs typeface="+mn-cs"/>
+              </a:defRPr>
+            </a:lvl6pPr>
+            <a:lvl7pPr marL="2743200" algn="l" defTabSz="914400" rtl="0" eaLnBrk="1" latinLnBrk="0" hangingPunct="1">
+              <a:defRPr sz="1800" kern="1200">
+                <a:solidFill>
+                  <a:schemeClr val="tx1"/>
+                </a:solidFill>
+                <a:latin typeface="+mn-lt"/>
+                <a:ea typeface="+mn-ea"/>
+                <a:cs typeface="+mn-cs"/>
+              </a:defRPr>
+            </a:lvl7pPr>
+            <a:lvl8pPr marL="3200400" algn="l" defTabSz="914400" rtl="0" eaLnBrk="1" latinLnBrk="0" hangingPunct="1">
+              <a:defRPr sz="1800" kern="1200">
+                <a:solidFill>
+                  <a:schemeClr val="tx1"/>
+                </a:solidFill>
+                <a:latin typeface="+mn-lt"/>
+                <a:ea typeface="+mn-ea"/>
+                <a:cs typeface="+mn-cs"/>
+              </a:defRPr>
+            </a:lvl8pPr>
+            <a:lvl9pPr marL="3657600" algn="l" defTabSz="914400" rtl="0" eaLnBrk="1" latinLnBrk="0" hangingPunct="1">
+              <a:defRPr sz="1800" kern="1200">
+                <a:solidFill>
+                  <a:schemeClr val="tx1"/>
+                </a:solidFill>
+                <a:latin typeface="+mn-lt"/>
+                <a:ea typeface="+mn-ea"/>
+                <a:cs typeface="+mn-cs"/>
+              </a:defRPr>
+            </a:lvl9pPr>
           </a:lstStyle>
           <a:p>
-            <a:pPr algn="ctr"/>
-            <a:r>
-              <a:rPr lang="fr-FR" sz="2801" dirty="0">
-                <a:solidFill>
-                  <a:schemeClr val="bg1"/>
-                </a:solidFill>
-              </a:rPr>
-              <a:t>Introduction</a:t>
-            </a:r>
-          </a:p>
-        </p:txBody>
-      </p:sp>
-      <p:sp>
-        <p:nvSpPr>
-          <p:cNvPr id="38" name="ZoneTexte 37">
-            <a:extLst>
-              <a:ext uri="{FF2B5EF4-FFF2-40B4-BE49-F238E27FC236}">
-                <a16:creationId xmlns:a16="http://schemas.microsoft.com/office/drawing/2014/main" id="{E6E416B3-72D9-0991-E65A-5B6A86928C8F}"/>
-              </a:ext>
-            </a:extLst>
-          </p:cNvPr>
-          <p:cNvSpPr txBox="1"/>
-          <p:nvPr/>
-        </p:nvSpPr>
-        <p:spPr>
-          <a:xfrm>
-            <a:off x="632035" y="5689079"/>
-            <a:ext cx="5325706" cy="523348"/>
-          </a:xfrm>
-          <a:prstGeom prst="rect">
-            <a:avLst/>
-          </a:prstGeom>
-          <a:solidFill>
-            <a:srgbClr val="203864"/>
-          </a:solidFill>
-        </p:spPr>
-        <p:txBody>
-          <a:bodyPr wrap="square" rtlCol="0">
-            <a:spAutoFit/>
-          </a:bodyPr>
-          <a:lstStyle>
-            <a:defPPr>
-              <a:defRPr lang="fr-FR"/>
-            </a:defPPr>
-            <a:lvl1pPr>
-              <a:defRPr sz="2800">
-                <a:solidFill>
-                  <a:schemeClr val="bg1"/>
-                </a:solidFill>
-                <a:latin typeface="Gill Sans MT" panose="020B0502020104020203" pitchFamily="34" charset="0"/>
-              </a:defRPr>
-            </a:lvl1pPr>
-          </a:lstStyle>
-          <a:p>
-            <a:pPr algn="ctr"/>
-            <a:r>
-              <a:rPr lang="fr-FR" sz="2801" dirty="0"/>
-              <a:t>Conclusion</a:t>
-            </a:r>
+            <a:endParaRPr lang="fr-FR" dirty="0"/>
           </a:p>
         </p:txBody>
       </p:sp>
       <p:grpSp>
         <p:nvGrpSpPr>
-          <p:cNvPr id="39" name="Groupe 38">
-            <a:extLst>
-              <a:ext uri="{FF2B5EF4-FFF2-40B4-BE49-F238E27FC236}">
-                <a16:creationId xmlns:a16="http://schemas.microsoft.com/office/drawing/2014/main" id="{EBDDB659-3E60-7E43-28F9-3636987C695A}"/>
+          <p:cNvPr id="5" name="Groupe 4">
+            <a:extLst>
+              <a:ext uri="{FF2B5EF4-FFF2-40B4-BE49-F238E27FC236}">
+                <a16:creationId xmlns:a16="http://schemas.microsoft.com/office/drawing/2014/main" id="{59F9D4A7-2416-405E-BBE0-03055436D312}"/>
               </a:ext>
             </a:extLst>
           </p:cNvPr>
@@ -9427,10 +9501,10 @@
         </p:grpSpPr>
         <p:sp>
           <p:nvSpPr>
-            <p:cNvPr id="40" name="ZoneTexte 39">
+            <p:cNvPr id="6" name="ZoneTexte 5">
               <a:extLst>
                 <a:ext uri="{FF2B5EF4-FFF2-40B4-BE49-F238E27FC236}">
-                  <a16:creationId xmlns:a16="http://schemas.microsoft.com/office/drawing/2014/main" id="{709AD6AB-46FD-ACFE-EA20-1856B0FB6936}"/>
+                  <a16:creationId xmlns:a16="http://schemas.microsoft.com/office/drawing/2014/main" id="{0F262350-90A5-4142-85C2-5930CB37AAE4}"/>
                 </a:ext>
               </a:extLst>
             </p:cNvPr>
@@ -9464,10 +9538,10 @@
         </p:sp>
         <p:grpSp>
           <p:nvGrpSpPr>
-            <p:cNvPr id="41" name="Groupe 40">
+            <p:cNvPr id="7" name="Groupe 6">
               <a:extLst>
                 <a:ext uri="{FF2B5EF4-FFF2-40B4-BE49-F238E27FC236}">
-                  <a16:creationId xmlns:a16="http://schemas.microsoft.com/office/drawing/2014/main" id="{2640F53B-107F-1046-E511-77DCDC3E8DF1}"/>
+                  <a16:creationId xmlns:a16="http://schemas.microsoft.com/office/drawing/2014/main" id="{4E9FB72F-0228-4ABB-900C-D0434E725F20}"/>
                 </a:ext>
               </a:extLst>
             </p:cNvPr>
@@ -9484,10 +9558,10 @@
           </p:grpSpPr>
           <p:sp>
             <p:nvSpPr>
-              <p:cNvPr id="42" name="Cercle : creux 41">
+              <p:cNvPr id="8" name="Cercle : creux 7">
                 <a:extLst>
                   <a:ext uri="{FF2B5EF4-FFF2-40B4-BE49-F238E27FC236}">
-                    <a16:creationId xmlns:a16="http://schemas.microsoft.com/office/drawing/2014/main" id="{193C0C7B-61C9-75A9-2AF3-6D3AEF3AD5E4}"/>
+                    <a16:creationId xmlns:a16="http://schemas.microsoft.com/office/drawing/2014/main" id="{8D5E8AEB-150F-4907-9F1B-7FBAF5C80384}"/>
                   </a:ext>
                 </a:extLst>
               </p:cNvPr>
@@ -9544,10 +9618,10 @@
           </p:sp>
           <p:sp>
             <p:nvSpPr>
-              <p:cNvPr id="43" name="Rectangle 42">
+              <p:cNvPr id="9" name="Rectangle 8">
                 <a:extLst>
                   <a:ext uri="{FF2B5EF4-FFF2-40B4-BE49-F238E27FC236}">
-                    <a16:creationId xmlns:a16="http://schemas.microsoft.com/office/drawing/2014/main" id="{28F490B2-7DA6-0768-1755-F15EA2FF6CEA}"/>
+                    <a16:creationId xmlns:a16="http://schemas.microsoft.com/office/drawing/2014/main" id="{9BD40985-1F27-47DE-B65B-6A8AB0A6E6D0}"/>
                   </a:ext>
                 </a:extLst>
               </p:cNvPr>
@@ -9594,10 +9668,10 @@
       </p:grpSp>
       <p:grpSp>
         <p:nvGrpSpPr>
-          <p:cNvPr id="44" name="Groupe 43">
-            <a:extLst>
-              <a:ext uri="{FF2B5EF4-FFF2-40B4-BE49-F238E27FC236}">
-                <a16:creationId xmlns:a16="http://schemas.microsoft.com/office/drawing/2014/main" id="{9288D26F-2E4D-F953-0988-5B2103F6C0D7}"/>
+          <p:cNvPr id="10" name="Groupe 9">
+            <a:extLst>
+              <a:ext uri="{FF2B5EF4-FFF2-40B4-BE49-F238E27FC236}">
+                <a16:creationId xmlns:a16="http://schemas.microsoft.com/office/drawing/2014/main" id="{9EB94F0D-A7C1-411C-B25A-FBAC6D6B2882}"/>
               </a:ext>
             </a:extLst>
           </p:cNvPr>
@@ -9614,10 +9688,10 @@
         </p:grpSpPr>
         <p:sp>
           <p:nvSpPr>
-            <p:cNvPr id="45" name="ZoneTexte 44">
+            <p:cNvPr id="11" name="ZoneTexte 10">
               <a:extLst>
                 <a:ext uri="{FF2B5EF4-FFF2-40B4-BE49-F238E27FC236}">
-                  <a16:creationId xmlns:a16="http://schemas.microsoft.com/office/drawing/2014/main" id="{0178353F-6B3C-1A17-E773-4BACB6F4FE9C}"/>
+                  <a16:creationId xmlns:a16="http://schemas.microsoft.com/office/drawing/2014/main" id="{763974EA-7F85-424D-A7D8-D0AE71B22B58}"/>
                 </a:ext>
               </a:extLst>
             </p:cNvPr>
@@ -9651,10 +9725,10 @@
         </p:sp>
         <p:grpSp>
           <p:nvGrpSpPr>
-            <p:cNvPr id="46" name="Groupe 45">
+            <p:cNvPr id="12" name="Groupe 11">
               <a:extLst>
                 <a:ext uri="{FF2B5EF4-FFF2-40B4-BE49-F238E27FC236}">
-                  <a16:creationId xmlns:a16="http://schemas.microsoft.com/office/drawing/2014/main" id="{147AA981-0894-EE40-9042-ADBD324D32E1}"/>
+                  <a16:creationId xmlns:a16="http://schemas.microsoft.com/office/drawing/2014/main" id="{25CD77AF-CEF9-4972-85BE-38F9121C3DE8}"/>
                 </a:ext>
               </a:extLst>
             </p:cNvPr>
@@ -9671,10 +9745,10 @@
           </p:grpSpPr>
           <p:sp>
             <p:nvSpPr>
-              <p:cNvPr id="47" name="Cercle : creux 46">
+              <p:cNvPr id="13" name="Cercle : creux 12">
                 <a:extLst>
                   <a:ext uri="{FF2B5EF4-FFF2-40B4-BE49-F238E27FC236}">
-                    <a16:creationId xmlns:a16="http://schemas.microsoft.com/office/drawing/2014/main" id="{8CA64879-7ADD-B4C1-2163-63C26635A73B}"/>
+                    <a16:creationId xmlns:a16="http://schemas.microsoft.com/office/drawing/2014/main" id="{CA6AEEBA-7438-4C5F-9570-B60857290B87}"/>
                   </a:ext>
                 </a:extLst>
               </p:cNvPr>
@@ -9731,10 +9805,10 @@
           </p:sp>
           <p:sp>
             <p:nvSpPr>
-              <p:cNvPr id="48" name="Rectangle 47">
+              <p:cNvPr id="14" name="Rectangle 13">
                 <a:extLst>
                   <a:ext uri="{FF2B5EF4-FFF2-40B4-BE49-F238E27FC236}">
-                    <a16:creationId xmlns:a16="http://schemas.microsoft.com/office/drawing/2014/main" id="{551D671B-FFAC-5149-6A40-5A0B9443D2FF}"/>
+                    <a16:creationId xmlns:a16="http://schemas.microsoft.com/office/drawing/2014/main" id="{440149E8-68B7-4369-8E56-2344F31B4B34}"/>
                   </a:ext>
                 </a:extLst>
               </p:cNvPr>
@@ -9781,10 +9855,10 @@
       </p:grpSp>
       <p:grpSp>
         <p:nvGrpSpPr>
-          <p:cNvPr id="49" name="Groupe 48">
-            <a:extLst>
-              <a:ext uri="{FF2B5EF4-FFF2-40B4-BE49-F238E27FC236}">
-                <a16:creationId xmlns:a16="http://schemas.microsoft.com/office/drawing/2014/main" id="{62E5D361-8AE1-FA7F-2F3A-26E0E5B6111E}"/>
+          <p:cNvPr id="15" name="Groupe 14">
+            <a:extLst>
+              <a:ext uri="{FF2B5EF4-FFF2-40B4-BE49-F238E27FC236}">
+                <a16:creationId xmlns:a16="http://schemas.microsoft.com/office/drawing/2014/main" id="{36766DF8-C0F9-40F5-B98C-38F2490EE981}"/>
               </a:ext>
             </a:extLst>
           </p:cNvPr>
@@ -9801,10 +9875,10 @@
         </p:grpSpPr>
         <p:sp>
           <p:nvSpPr>
-            <p:cNvPr id="50" name="ZoneTexte 49">
+            <p:cNvPr id="16" name="ZoneTexte 15">
               <a:extLst>
                 <a:ext uri="{FF2B5EF4-FFF2-40B4-BE49-F238E27FC236}">
-                  <a16:creationId xmlns:a16="http://schemas.microsoft.com/office/drawing/2014/main" id="{21E2CF4A-E88F-DE07-DF38-A0A8DDAF67BC}"/>
+                  <a16:creationId xmlns:a16="http://schemas.microsoft.com/office/drawing/2014/main" id="{EA15076D-41F0-47AC-B455-0C0F08A873CC}"/>
                 </a:ext>
               </a:extLst>
             </p:cNvPr>
@@ -9838,10 +9912,10 @@
         </p:sp>
         <p:grpSp>
           <p:nvGrpSpPr>
-            <p:cNvPr id="51" name="Groupe 50">
+            <p:cNvPr id="17" name="Groupe 16">
               <a:extLst>
                 <a:ext uri="{FF2B5EF4-FFF2-40B4-BE49-F238E27FC236}">
-                  <a16:creationId xmlns:a16="http://schemas.microsoft.com/office/drawing/2014/main" id="{E8677924-A07F-5FA7-AAAC-836D37DD1B16}"/>
+                  <a16:creationId xmlns:a16="http://schemas.microsoft.com/office/drawing/2014/main" id="{595EB68B-D894-4916-A52D-3837E28C413C}"/>
                 </a:ext>
               </a:extLst>
             </p:cNvPr>
@@ -9858,10 +9932,10 @@
           </p:grpSpPr>
           <p:sp>
             <p:nvSpPr>
-              <p:cNvPr id="52" name="Cercle : creux 51">
+              <p:cNvPr id="18" name="Cercle : creux 17">
                 <a:extLst>
                   <a:ext uri="{FF2B5EF4-FFF2-40B4-BE49-F238E27FC236}">
-                    <a16:creationId xmlns:a16="http://schemas.microsoft.com/office/drawing/2014/main" id="{25F76A91-21AA-0911-E7CB-5819FD285864}"/>
+                    <a16:creationId xmlns:a16="http://schemas.microsoft.com/office/drawing/2014/main" id="{10B02FDF-275D-43F3-B5A7-0BF9865AA6E0}"/>
                   </a:ext>
                 </a:extLst>
               </p:cNvPr>
@@ -9918,10 +9992,10 @@
           </p:sp>
           <p:sp>
             <p:nvSpPr>
-              <p:cNvPr id="53" name="Rectangle 52">
+              <p:cNvPr id="19" name="Rectangle 18">
                 <a:extLst>
                   <a:ext uri="{FF2B5EF4-FFF2-40B4-BE49-F238E27FC236}">
-                    <a16:creationId xmlns:a16="http://schemas.microsoft.com/office/drawing/2014/main" id="{4D2F1366-D15A-C4C8-5411-8748F4372BD7}"/>
+                    <a16:creationId xmlns:a16="http://schemas.microsoft.com/office/drawing/2014/main" id="{3C36B7DB-2CC3-41DA-948E-E1440F780FB6}"/>
                   </a:ext>
                 </a:extLst>
               </p:cNvPr>
@@ -9968,10 +10042,10 @@
       </p:grpSp>
       <p:grpSp>
         <p:nvGrpSpPr>
-          <p:cNvPr id="54" name="Groupe 53">
-            <a:extLst>
-              <a:ext uri="{FF2B5EF4-FFF2-40B4-BE49-F238E27FC236}">
-                <a16:creationId xmlns:a16="http://schemas.microsoft.com/office/drawing/2014/main" id="{8018736C-97D8-7D21-9DD2-3D49EE35D250}"/>
+          <p:cNvPr id="20" name="Groupe 19">
+            <a:extLst>
+              <a:ext uri="{FF2B5EF4-FFF2-40B4-BE49-F238E27FC236}">
+                <a16:creationId xmlns:a16="http://schemas.microsoft.com/office/drawing/2014/main" id="{A553D76E-8747-40A8-95A1-CE531F755900}"/>
               </a:ext>
             </a:extLst>
           </p:cNvPr>
@@ -9988,10 +10062,10 @@
         </p:grpSpPr>
         <p:sp>
           <p:nvSpPr>
-            <p:cNvPr id="55" name="ZoneTexte 54">
+            <p:cNvPr id="21" name="ZoneTexte 20">
               <a:extLst>
                 <a:ext uri="{FF2B5EF4-FFF2-40B4-BE49-F238E27FC236}">
-                  <a16:creationId xmlns:a16="http://schemas.microsoft.com/office/drawing/2014/main" id="{0B42BC64-6471-55D3-5F19-DDDFAEED3D98}"/>
+                  <a16:creationId xmlns:a16="http://schemas.microsoft.com/office/drawing/2014/main" id="{BCFDD510-CA1A-414D-8090-375CAE330DEC}"/>
                 </a:ext>
               </a:extLst>
             </p:cNvPr>
@@ -10025,10 +10099,10 @@
         </p:sp>
         <p:grpSp>
           <p:nvGrpSpPr>
-            <p:cNvPr id="56" name="Groupe 55">
+            <p:cNvPr id="22" name="Groupe 21">
               <a:extLst>
                 <a:ext uri="{FF2B5EF4-FFF2-40B4-BE49-F238E27FC236}">
-                  <a16:creationId xmlns:a16="http://schemas.microsoft.com/office/drawing/2014/main" id="{4F8C7CB2-8232-A767-9B2A-34B47A05FBC5}"/>
+                  <a16:creationId xmlns:a16="http://schemas.microsoft.com/office/drawing/2014/main" id="{C3595E46-230A-4B9D-BA9A-E4886D3EDBB4}"/>
                 </a:ext>
               </a:extLst>
             </p:cNvPr>
@@ -10045,10 +10119,10 @@
           </p:grpSpPr>
           <p:sp>
             <p:nvSpPr>
-              <p:cNvPr id="57" name="Cercle : creux 56">
+              <p:cNvPr id="23" name="Cercle : creux 22">
                 <a:extLst>
                   <a:ext uri="{FF2B5EF4-FFF2-40B4-BE49-F238E27FC236}">
-                    <a16:creationId xmlns:a16="http://schemas.microsoft.com/office/drawing/2014/main" id="{4D84922F-6579-14ED-5433-CFA4DE117825}"/>
+                    <a16:creationId xmlns:a16="http://schemas.microsoft.com/office/drawing/2014/main" id="{20C4C8EA-A8AC-45E3-9226-ED211D6D8B28}"/>
                   </a:ext>
                 </a:extLst>
               </p:cNvPr>
@@ -10105,10 +10179,10 @@
           </p:sp>
           <p:sp>
             <p:nvSpPr>
-              <p:cNvPr id="58" name="Rectangle 57">
+              <p:cNvPr id="24" name="Rectangle 23">
                 <a:extLst>
                   <a:ext uri="{FF2B5EF4-FFF2-40B4-BE49-F238E27FC236}">
-                    <a16:creationId xmlns:a16="http://schemas.microsoft.com/office/drawing/2014/main" id="{4AA4C81D-C38A-38F5-C158-4B6B656180A9}"/>
+                    <a16:creationId xmlns:a16="http://schemas.microsoft.com/office/drawing/2014/main" id="{D5512D47-51A7-48DD-94F0-9146AB945B43}"/>
                   </a:ext>
                 </a:extLst>
               </p:cNvPr>
@@ -10155,10 +10229,10 @@
       </p:grpSp>
       <p:grpSp>
         <p:nvGrpSpPr>
-          <p:cNvPr id="59" name="Groupe 58">
-            <a:extLst>
-              <a:ext uri="{FF2B5EF4-FFF2-40B4-BE49-F238E27FC236}">
-                <a16:creationId xmlns:a16="http://schemas.microsoft.com/office/drawing/2014/main" id="{A52A3784-3785-DFD6-2A71-16E9A10ED0BC}"/>
+          <p:cNvPr id="25" name="Groupe 24">
+            <a:extLst>
+              <a:ext uri="{FF2B5EF4-FFF2-40B4-BE49-F238E27FC236}">
+                <a16:creationId xmlns:a16="http://schemas.microsoft.com/office/drawing/2014/main" id="{112F6F79-4161-432A-81D3-E1265BBB790D}"/>
               </a:ext>
             </a:extLst>
           </p:cNvPr>
@@ -10175,10 +10249,10 @@
         </p:grpSpPr>
         <p:grpSp>
           <p:nvGrpSpPr>
-            <p:cNvPr id="60" name="Groupe 59">
+            <p:cNvPr id="26" name="Groupe 25">
               <a:extLst>
                 <a:ext uri="{FF2B5EF4-FFF2-40B4-BE49-F238E27FC236}">
-                  <a16:creationId xmlns:a16="http://schemas.microsoft.com/office/drawing/2014/main" id="{433F604A-C2A7-BF19-3A1C-82F1B53065A0}"/>
+                  <a16:creationId xmlns:a16="http://schemas.microsoft.com/office/drawing/2014/main" id="{A3AE196A-9B5D-4B86-BC33-5B2C0AD2175D}"/>
                 </a:ext>
               </a:extLst>
             </p:cNvPr>
@@ -10195,10 +10269,10 @@
           </p:grpSpPr>
           <p:sp>
             <p:nvSpPr>
-              <p:cNvPr id="62" name="Cercle : creux 61">
+              <p:cNvPr id="28" name="Cercle : creux 27">
                 <a:extLst>
                   <a:ext uri="{FF2B5EF4-FFF2-40B4-BE49-F238E27FC236}">
-                    <a16:creationId xmlns:a16="http://schemas.microsoft.com/office/drawing/2014/main" id="{0384AE3B-9C2C-2C20-2DEA-49C3F630B3FC}"/>
+                    <a16:creationId xmlns:a16="http://schemas.microsoft.com/office/drawing/2014/main" id="{3C048E6B-EBB6-4CF3-8604-C70163E755A9}"/>
                   </a:ext>
                 </a:extLst>
               </p:cNvPr>
@@ -10255,10 +10329,10 @@
           </p:sp>
           <p:sp>
             <p:nvSpPr>
-              <p:cNvPr id="63" name="Rectangle 62">
+              <p:cNvPr id="29" name="Rectangle 28">
                 <a:extLst>
                   <a:ext uri="{FF2B5EF4-FFF2-40B4-BE49-F238E27FC236}">
-                    <a16:creationId xmlns:a16="http://schemas.microsoft.com/office/drawing/2014/main" id="{D8D23376-65CE-679D-7256-13965BF7B9A0}"/>
+                    <a16:creationId xmlns:a16="http://schemas.microsoft.com/office/drawing/2014/main" id="{9D643DA9-0323-4876-8494-B13998B45C47}"/>
                   </a:ext>
                 </a:extLst>
               </p:cNvPr>
@@ -10304,10 +10378,10 @@
         </p:grpSp>
         <p:sp>
           <p:nvSpPr>
-            <p:cNvPr id="61" name="ZoneTexte 60">
+            <p:cNvPr id="27" name="ZoneTexte 26">
               <a:extLst>
                 <a:ext uri="{FF2B5EF4-FFF2-40B4-BE49-F238E27FC236}">
-                  <a16:creationId xmlns:a16="http://schemas.microsoft.com/office/drawing/2014/main" id="{4DFF1519-0D03-D7CA-5E0D-A098EE8FEE91}"/>
+                  <a16:creationId xmlns:a16="http://schemas.microsoft.com/office/drawing/2014/main" id="{4FAAA7E8-159A-4A34-BCBC-6D93009909BA}"/>
                 </a:ext>
               </a:extLst>
             </p:cNvPr>
@@ -10340,10 +10414,50 @@
           </p:txBody>
         </p:sp>
       </p:grpSp>
+      <p:sp>
+        <p:nvSpPr>
+          <p:cNvPr id="30" name="ZoneTexte 29">
+            <a:extLst>
+              <a:ext uri="{FF2B5EF4-FFF2-40B4-BE49-F238E27FC236}">
+                <a16:creationId xmlns:a16="http://schemas.microsoft.com/office/drawing/2014/main" id="{A16DBB7D-6970-437A-AD12-89C5B0761AAC}"/>
+              </a:ext>
+            </a:extLst>
+          </p:cNvPr>
+          <p:cNvSpPr txBox="1"/>
+          <p:nvPr/>
+        </p:nvSpPr>
+        <p:spPr>
+          <a:xfrm>
+            <a:off x="407039" y="384602"/>
+            <a:ext cx="3085277" cy="523220"/>
+          </a:xfrm>
+          <a:prstGeom prst="rect">
+            <a:avLst/>
+          </a:prstGeom>
+          <a:noFill/>
+        </p:spPr>
+        <p:txBody>
+          <a:bodyPr wrap="square" rtlCol="0">
+            <a:spAutoFit/>
+          </a:bodyPr>
+          <a:lstStyle/>
+          <a:p>
+            <a:r>
+              <a:rPr lang="fr-FR" sz="2800" b="1" dirty="0">
+                <a:solidFill>
+                  <a:srgbClr val="006A5A"/>
+                </a:solidFill>
+                <a:latin typeface="Gill Sans MT" panose="020B0502020104020203" pitchFamily="34" charset="0"/>
+              </a:rPr>
+              <a:t>SOMMAIRE</a:t>
+            </a:r>
+          </a:p>
+        </p:txBody>
+      </p:sp>
     </p:spTree>
     <p:extLst>
       <p:ext uri="{BB962C8B-B14F-4D97-AF65-F5344CB8AC3E}">
-        <p14:creationId xmlns:p14="http://schemas.microsoft.com/office/powerpoint/2010/main" val="1883667098"/>
+        <p14:creationId xmlns:p14="http://schemas.microsoft.com/office/powerpoint/2010/main" val="2701273255"/>
       </p:ext>
     </p:extLst>
   </p:cSld>
@@ -10371,7 +10485,7 @@
                             </p:stCondLst>
                             <p:childTnLst>
                               <p:par>
-                                <p:cTn id="5" presetID="1" presetClass="entr" presetSubtype="0" fill="hold" grpId="0" nodeType="clickEffect">
+                                <p:cTn id="5" presetID="1" presetClass="entr" presetSubtype="0" fill="hold" nodeType="clickEffect">
                                   <p:stCondLst>
                                     <p:cond delay="0"/>
                                   </p:stCondLst>
@@ -10384,7 +10498,7 @@
                                           </p:stCondLst>
                                         </p:cTn>
                                         <p:tgtEl>
-                                          <p:spTgt spid="37"/>
+                                          <p:spTgt spid="5"/>
                                         </p:tgtEl>
                                         <p:attrNameLst>
                                           <p:attrName>style.visibility</p:attrName>
@@ -10429,7 +10543,7 @@
                                           </p:stCondLst>
                                         </p:cTn>
                                         <p:tgtEl>
-                                          <p:spTgt spid="39"/>
+                                          <p:spTgt spid="15"/>
                                         </p:tgtEl>
                                         <p:attrNameLst>
                                           <p:attrName>style.visibility</p:attrName>
@@ -10474,7 +10588,7 @@
                                           </p:stCondLst>
                                         </p:cTn>
                                         <p:tgtEl>
-                                          <p:spTgt spid="49"/>
+                                          <p:spTgt spid="10"/>
                                         </p:tgtEl>
                                         <p:attrNameLst>
                                           <p:attrName>style.visibility</p:attrName>
@@ -10519,7 +10633,7 @@
                                           </p:stCondLst>
                                         </p:cTn>
                                         <p:tgtEl>
-                                          <p:spTgt spid="44"/>
+                                          <p:spTgt spid="20"/>
                                         </p:tgtEl>
                                         <p:attrNameLst>
                                           <p:attrName>style.visibility</p:attrName>
@@ -10564,97 +10678,7 @@
                                           </p:stCondLst>
                                         </p:cTn>
                                         <p:tgtEl>
-                                          <p:spTgt spid="54"/>
-                                        </p:tgtEl>
-                                        <p:attrNameLst>
-                                          <p:attrName>style.visibility</p:attrName>
-                                        </p:attrNameLst>
-                                      </p:cBhvr>
-                                      <p:to>
-                                        <p:strVal val="visible"/>
-                                      </p:to>
-                                    </p:set>
-                                  </p:childTnLst>
-                                </p:cTn>
-                              </p:par>
-                            </p:childTnLst>
-                          </p:cTn>
-                        </p:par>
-                      </p:childTnLst>
-                    </p:cTn>
-                  </p:par>
-                  <p:par>
-                    <p:cTn id="23" fill="hold">
-                      <p:stCondLst>
-                        <p:cond delay="indefinite"/>
-                      </p:stCondLst>
-                      <p:childTnLst>
-                        <p:par>
-                          <p:cTn id="24" fill="hold">
-                            <p:stCondLst>
-                              <p:cond delay="0"/>
-                            </p:stCondLst>
-                            <p:childTnLst>
-                              <p:par>
-                                <p:cTn id="25" presetID="1" presetClass="entr" presetSubtype="0" fill="hold" nodeType="clickEffect">
-                                  <p:stCondLst>
-                                    <p:cond delay="0"/>
-                                  </p:stCondLst>
-                                  <p:childTnLst>
-                                    <p:set>
-                                      <p:cBhvr>
-                                        <p:cTn id="26" dur="1" fill="hold">
-                                          <p:stCondLst>
-                                            <p:cond delay="0"/>
-                                          </p:stCondLst>
-                                        </p:cTn>
-                                        <p:tgtEl>
-                                          <p:spTgt spid="59"/>
-                                        </p:tgtEl>
-                                        <p:attrNameLst>
-                                          <p:attrName>style.visibility</p:attrName>
-                                        </p:attrNameLst>
-                                      </p:cBhvr>
-                                      <p:to>
-                                        <p:strVal val="visible"/>
-                                      </p:to>
-                                    </p:set>
-                                  </p:childTnLst>
-                                </p:cTn>
-                              </p:par>
-                            </p:childTnLst>
-                          </p:cTn>
-                        </p:par>
-                      </p:childTnLst>
-                    </p:cTn>
-                  </p:par>
-                  <p:par>
-                    <p:cTn id="27" fill="hold">
-                      <p:stCondLst>
-                        <p:cond delay="indefinite"/>
-                      </p:stCondLst>
-                      <p:childTnLst>
-                        <p:par>
-                          <p:cTn id="28" fill="hold">
-                            <p:stCondLst>
-                              <p:cond delay="0"/>
-                            </p:stCondLst>
-                            <p:childTnLst>
-                              <p:par>
-                                <p:cTn id="29" presetID="1" presetClass="entr" presetSubtype="0" fill="hold" grpId="0" nodeType="clickEffect">
-                                  <p:stCondLst>
-                                    <p:cond delay="0"/>
-                                  </p:stCondLst>
-                                  <p:childTnLst>
-                                    <p:set>
-                                      <p:cBhvr>
-                                        <p:cTn id="30" dur="1" fill="hold">
-                                          <p:stCondLst>
-                                            <p:cond delay="0"/>
-                                          </p:stCondLst>
-                                        </p:cTn>
-                                        <p:tgtEl>
-                                          <p:spTgt spid="38"/>
+                                          <p:spTgt spid="25"/>
                                         </p:tgtEl>
                                         <p:attrNameLst>
                                           <p:attrName>style.visibility</p:attrName>
@@ -10694,10 +10718,6 @@
         </p:cTn>
       </p:par>
     </p:tnLst>
-    <p:bldLst>
-      <p:bldP spid="37" grpId="0" animBg="1"/>
-      <p:bldP spid="38" grpId="0" animBg="1"/>
-    </p:bldLst>
   </p:timing>
 </p:sld>
 </file>
@@ -11403,7 +11423,25 @@
                 </a:solidFill>
                 <a:latin typeface="Gill Sans MT" panose="020B0502020104020203" pitchFamily="34" charset="0"/>
               </a:rPr>
-              <a:t>4.1. Choix des variables dans la modélisation</a:t>
+              <a:t>4.1. Choix des variables (</a:t>
+            </a:r>
+            <a:r>
+              <a:rPr lang="fr-FR" sz="3600" b="1" dirty="0">
+                <a:solidFill>
+                  <a:srgbClr val="FF0000"/>
+                </a:solidFill>
+                <a:latin typeface="Gill Sans MT" panose="020B0502020104020203" pitchFamily="34" charset="0"/>
+              </a:rPr>
+              <a:t>Toussaint</a:t>
+            </a:r>
+            <a:r>
+              <a:rPr lang="fr-FR" sz="3600" b="1" dirty="0">
+                <a:solidFill>
+                  <a:schemeClr val="bg1"/>
+                </a:solidFill>
+                <a:latin typeface="Gill Sans MT" panose="020B0502020104020203" pitchFamily="34" charset="0"/>
+              </a:rPr>
+              <a:t>)</a:t>
             </a:r>
           </a:p>
         </p:txBody>
@@ -11550,25 +11588,25 @@
                 </a:solidFill>
                 <a:latin typeface="Gill Sans MT" panose="020B0502020104020203" pitchFamily="34" charset="0"/>
               </a:rPr>
-              <a:t>4.2. Tests de Moran et de </a:t>
-            </a:r>
-            <a:r>
-              <a:rPr lang="fr-FR" sz="3600" b="1" dirty="0" err="1">
-                <a:solidFill>
-                  <a:schemeClr val="bg1"/>
-                </a:solidFill>
-                <a:latin typeface="Gill Sans MT" panose="020B0502020104020203" pitchFamily="34" charset="0"/>
-              </a:rPr>
-              <a:t>Rao’s</a:t>
+              <a:t>4.2. Tests (</a:t>
             </a:r>
             <a:r>
               <a:rPr lang="fr-FR" sz="3600" b="1" dirty="0">
                 <a:solidFill>
-                  <a:schemeClr val="bg1"/>
+                  <a:srgbClr val="FF0000"/>
                 </a:solidFill>
                 <a:latin typeface="Gill Sans MT" panose="020B0502020104020203" pitchFamily="34" charset="0"/>
               </a:rPr>
-              <a:t> score</a:t>
+              <a:t>Richard</a:t>
+            </a:r>
+            <a:r>
+              <a:rPr lang="fr-FR" sz="3600" b="1" dirty="0">
+                <a:solidFill>
+                  <a:schemeClr val="bg1"/>
+                </a:solidFill>
+                <a:latin typeface="Gill Sans MT" panose="020B0502020104020203" pitchFamily="34" charset="0"/>
+              </a:rPr>
+              <a:t>)</a:t>
             </a:r>
           </a:p>
         </p:txBody>
@@ -11715,7 +11753,25 @@
                 </a:solidFill>
                 <a:latin typeface="Gill Sans MT" panose="020B0502020104020203" pitchFamily="34" charset="0"/>
               </a:rPr>
-              <a:t>4.3. Comparaison des modèles estimés</a:t>
+              <a:t>4.3. Comparaison des modèles (</a:t>
+            </a:r>
+            <a:r>
+              <a:rPr lang="fr-FR" sz="3600" b="1" dirty="0">
+                <a:solidFill>
+                  <a:srgbClr val="FF0000"/>
+                </a:solidFill>
+                <a:latin typeface="Gill Sans MT" panose="020B0502020104020203" pitchFamily="34" charset="0"/>
+              </a:rPr>
+              <a:t>Richard</a:t>
+            </a:r>
+            <a:r>
+              <a:rPr lang="fr-FR" sz="3600" b="1" dirty="0">
+                <a:solidFill>
+                  <a:schemeClr val="bg1"/>
+                </a:solidFill>
+                <a:latin typeface="Gill Sans MT" panose="020B0502020104020203" pitchFamily="34" charset="0"/>
+              </a:rPr>
+              <a:t>)</a:t>
             </a:r>
           </a:p>
         </p:txBody>
@@ -11862,7 +11918,25 @@
                 </a:solidFill>
                 <a:latin typeface="Gill Sans MT" panose="020B0502020104020203" pitchFamily="34" charset="0"/>
               </a:rPr>
-              <a:t>4.4. Sélection des variables et modèle final</a:t>
+              <a:t>4.4. Résultats du modèle final (</a:t>
+            </a:r>
+            <a:r>
+              <a:rPr lang="fr-FR" sz="3600" b="1" dirty="0">
+                <a:solidFill>
+                  <a:srgbClr val="FF0000"/>
+                </a:solidFill>
+                <a:latin typeface="Gill Sans MT" panose="020B0502020104020203" pitchFamily="34" charset="0"/>
+              </a:rPr>
+              <a:t>Richard</a:t>
+            </a:r>
+            <a:r>
+              <a:rPr lang="fr-FR" sz="3600" b="1" dirty="0">
+                <a:solidFill>
+                  <a:schemeClr val="bg1"/>
+                </a:solidFill>
+                <a:latin typeface="Gill Sans MT" panose="020B0502020104020203" pitchFamily="34" charset="0"/>
+              </a:rPr>
+              <a:t>)</a:t>
             </a:r>
           </a:p>
         </p:txBody>
@@ -12009,7 +12083,25 @@
                 </a:solidFill>
                 <a:latin typeface="Gill Sans MT" panose="020B0502020104020203" pitchFamily="34" charset="0"/>
               </a:rPr>
-              <a:t>4.5. Importance des variables</a:t>
+              <a:t>4.5. Importance des variables (</a:t>
+            </a:r>
+            <a:r>
+              <a:rPr lang="fr-FR" sz="3600" b="1" dirty="0">
+                <a:solidFill>
+                  <a:srgbClr val="FF0000"/>
+                </a:solidFill>
+                <a:latin typeface="Gill Sans MT" panose="020B0502020104020203" pitchFamily="34" charset="0"/>
+              </a:rPr>
+              <a:t>Richard</a:t>
+            </a:r>
+            <a:r>
+              <a:rPr lang="fr-FR" sz="3600" b="1" dirty="0">
+                <a:solidFill>
+                  <a:schemeClr val="bg1"/>
+                </a:solidFill>
+                <a:latin typeface="Gill Sans MT" panose="020B0502020104020203" pitchFamily="34" charset="0"/>
+              </a:rPr>
+              <a:t>)</a:t>
             </a:r>
           </a:p>
         </p:txBody>
@@ -12081,7 +12173,7 @@
         </p:blipFill>
         <p:spPr>
           <a:xfrm>
-            <a:off x="4395237" y="1879555"/>
+            <a:off x="185050" y="1965074"/>
             <a:ext cx="6958563" cy="4004928"/>
           </a:xfrm>
           <a:prstGeom prst="rect">
@@ -12146,6 +12238,46 @@
               <a:t>29</a:t>
             </a:fld>
             <a:endParaRPr lang="fr-FR"/>
+          </a:p>
+        </p:txBody>
+      </p:sp>
+      <p:sp>
+        <p:nvSpPr>
+          <p:cNvPr id="3" name="ZoneTexte 2">
+            <a:extLst>
+              <a:ext uri="{FF2B5EF4-FFF2-40B4-BE49-F238E27FC236}">
+                <a16:creationId xmlns:a16="http://schemas.microsoft.com/office/drawing/2014/main" id="{A3F2E86E-ED1B-4477-A0EF-E314068F0577}"/>
+              </a:ext>
+            </a:extLst>
+          </p:cNvPr>
+          <p:cNvSpPr txBox="1"/>
+          <p:nvPr/>
+        </p:nvSpPr>
+        <p:spPr>
+          <a:xfrm>
+            <a:off x="4664098" y="5025911"/>
+            <a:ext cx="2835298" cy="707886"/>
+          </a:xfrm>
+          <a:prstGeom prst="rect">
+            <a:avLst/>
+          </a:prstGeom>
+          <a:noFill/>
+        </p:spPr>
+        <p:txBody>
+          <a:bodyPr wrap="square" rtlCol="0">
+            <a:spAutoFit/>
+          </a:bodyPr>
+          <a:lstStyle/>
+          <a:p>
+            <a:pPr algn="ctr"/>
+            <a:r>
+              <a:rPr lang="fr-FR" sz="4000" b="1" dirty="0">
+                <a:solidFill>
+                  <a:srgbClr val="FF0000"/>
+                </a:solidFill>
+              </a:rPr>
+              <a:t>Toussaint</a:t>
+            </a:r>
           </a:p>
         </p:txBody>
       </p:sp>
@@ -12261,7 +12393,12 @@
             <p:ph type="sldNum" sz="quarter" idx="4"/>
           </p:nvPr>
         </p:nvSpPr>
-        <p:spPr/>
+        <p:spPr>
+          <a:xfrm>
+            <a:off x="8636914" y="6356350"/>
+            <a:ext cx="2743200" cy="365125"/>
+          </a:xfrm>
+        </p:spPr>
         <p:txBody>
           <a:bodyPr/>
           <a:lstStyle/>
@@ -12271,7 +12408,7 @@
               <a:pPr/>
               <a:t>30</a:t>
             </a:fld>
-            <a:endParaRPr lang="fr-FR"/>
+            <a:endParaRPr lang="fr-FR" dirty="0"/>
           </a:p>
         </p:txBody>
       </p:sp>
@@ -12941,7 +13078,25 @@
                 </a:solidFill>
                 <a:latin typeface="Gill Sans MT" panose="020B0502020104020203" pitchFamily="34" charset="0"/>
               </a:rPr>
-              <a:t>Introduction</a:t>
+              <a:t>Introduction (</a:t>
+            </a:r>
+            <a:r>
+              <a:rPr lang="fr-FR" sz="3600" b="1" dirty="0">
+                <a:solidFill>
+                  <a:srgbClr val="FF0000"/>
+                </a:solidFill>
+                <a:latin typeface="Gill Sans MT" panose="020B0502020104020203" pitchFamily="34" charset="0"/>
+              </a:rPr>
+              <a:t>Toussaint: revoir sur une seule diapo</a:t>
+            </a:r>
+            <a:r>
+              <a:rPr lang="fr-FR" sz="3600" b="1" dirty="0">
+                <a:solidFill>
+                  <a:schemeClr val="bg1"/>
+                </a:solidFill>
+                <a:latin typeface="Gill Sans MT" panose="020B0502020104020203" pitchFamily="34" charset="0"/>
+              </a:rPr>
+              <a:t>)</a:t>
             </a:r>
           </a:p>
         </p:txBody>
@@ -13908,7 +14063,25 @@
                 </a:solidFill>
                 <a:latin typeface="Gill Sans MT" panose="020B0502020104020203" pitchFamily="34" charset="0"/>
               </a:rPr>
-              <a:t>1.1. Cadre conceptuel de l’étude</a:t>
+              <a:t>1.1. Cadre conceptuel (</a:t>
+            </a:r>
+            <a:r>
+              <a:rPr lang="fr-FR" sz="3600" b="1" dirty="0">
+                <a:solidFill>
+                  <a:srgbClr val="FF0000"/>
+                </a:solidFill>
+                <a:latin typeface="Gill Sans MT" panose="020B0502020104020203" pitchFamily="34" charset="0"/>
+              </a:rPr>
+              <a:t>Toussaint revoir</a:t>
+            </a:r>
+            <a:r>
+              <a:rPr lang="fr-FR" sz="3600" b="1" dirty="0">
+                <a:solidFill>
+                  <a:schemeClr val="bg1"/>
+                </a:solidFill>
+                <a:latin typeface="Gill Sans MT" panose="020B0502020104020203" pitchFamily="34" charset="0"/>
+              </a:rPr>
+              <a:t>)</a:t>
             </a:r>
           </a:p>
         </p:txBody>
@@ -13952,8 +14125,8 @@
           </a:prstGeom>
         </p:spPr>
       </p:pic>
-      <mc:AlternateContent xmlns:mc="http://schemas.openxmlformats.org/markup-compatibility/2006">
-        <mc:Choice xmlns:a14="http://schemas.microsoft.com/office/drawing/2010/main" Requires="a14">
+      <mc:AlternateContent xmlns:mc="http://schemas.openxmlformats.org/markup-compatibility/2006" xmlns:a14="http://schemas.microsoft.com/office/drawing/2010/main">
+        <mc:Choice Requires="a14">
           <p:sp>
             <p:nvSpPr>
               <p:cNvPr id="6" name="ZoneTexte 5">
@@ -14217,7 +14390,7 @@
             </p:txBody>
           </p:sp>
         </mc:Choice>
-        <mc:Fallback>
+        <mc:Fallback xmlns="">
           <p:sp>
             <p:nvSpPr>
               <p:cNvPr id="6" name="ZoneTexte 5">
@@ -14262,8 +14435,8 @@
           </p:sp>
         </mc:Fallback>
       </mc:AlternateContent>
-      <mc:AlternateContent xmlns:mc="http://schemas.openxmlformats.org/markup-compatibility/2006">
-        <mc:Choice xmlns:a14="http://schemas.microsoft.com/office/drawing/2010/main" Requires="a14">
+      <mc:AlternateContent xmlns:mc="http://schemas.openxmlformats.org/markup-compatibility/2006" xmlns:a14="http://schemas.microsoft.com/office/drawing/2010/main">
+        <mc:Choice Requires="a14">
           <p:sp>
             <p:nvSpPr>
               <p:cNvPr id="8" name="ZoneTexte 7">
@@ -14942,7 +15115,7 @@
             </p:txBody>
           </p:sp>
         </mc:Choice>
-        <mc:Fallback>
+        <mc:Fallback xmlns="">
           <p:sp>
             <p:nvSpPr>
               <p:cNvPr id="8" name="ZoneTexte 7">
@@ -15351,7 +15524,25 @@
                 </a:solidFill>
                 <a:latin typeface="Gill Sans MT" panose="020B0502020104020203" pitchFamily="34" charset="0"/>
               </a:rPr>
-              <a:t>1.2. Revue de littérature</a:t>
+              <a:t>1.2. Revue de littérature (</a:t>
+            </a:r>
+            <a:r>
+              <a:rPr lang="fr-FR" sz="2400" b="1" dirty="0">
+                <a:solidFill>
+                  <a:srgbClr val="FF0000"/>
+                </a:solidFill>
+                <a:latin typeface="Gill Sans MT" panose="020B0502020104020203" pitchFamily="34" charset="0"/>
+              </a:rPr>
+              <a:t>Alex: réorganiser si possible sur 2 diapo</a:t>
+            </a:r>
+            <a:r>
+              <a:rPr lang="fr-FR" sz="3600" b="1" dirty="0">
+                <a:solidFill>
+                  <a:schemeClr val="bg1"/>
+                </a:solidFill>
+                <a:latin typeface="Gill Sans MT" panose="020B0502020104020203" pitchFamily="34" charset="0"/>
+              </a:rPr>
+              <a:t>)</a:t>
             </a:r>
           </a:p>
         </p:txBody>
@@ -15409,7 +15600,7 @@
         </p:nvSpPr>
         <p:spPr>
           <a:xfrm>
-            <a:off x="0" y="2270158"/>
+            <a:off x="0" y="2276736"/>
             <a:ext cx="12191999" cy="4235583"/>
           </a:xfrm>
           <a:prstGeom prst="rect">

</xml_diff>

<commit_message>
Mes dernières modifs avant Richard
</commit_message>
<xml_diff>
--- a/Présentation/Soutenance_Groupe25.pptx
+++ b/Présentation/Soutenance_Groupe25.pptx
@@ -248,7 +248,7 @@
           <a:p>
             <a:fld id="{02EF5511-433E-438D-93BB-1E1EB804EB9E}" type="datetimeFigureOut">
               <a:rPr lang="fr-FR" smtClean="0"/>
-              <a:t>19/04/2025</a:t>
+              <a:t>20/04/2025</a:t>
             </a:fld>
             <a:endParaRPr lang="fr-FR"/>
           </a:p>
@@ -426,7 +426,7 @@
           <a:p>
             <a:fld id="{173019D8-EACC-4538-984E-33CCC42DAA4E}" type="datetimeFigureOut">
               <a:rPr lang="fr-FR" smtClean="0"/>
-              <a:t>19/04/2025</a:t>
+              <a:t>20/04/2025</a:t>
             </a:fld>
             <a:endParaRPr lang="fr-FR"/>
           </a:p>
@@ -919,7 +919,7 @@
             <a:fld id="{B4BDA9CF-F2B2-41BE-8486-9C59032E0655}" type="datetime4">
               <a:rPr lang="fr-FR" smtClean="0"/>
               <a:pPr/>
-              <a:t>19 avril 2025</a:t>
+              <a:t>20 avril 2025</a:t>
             </a:fld>
             <a:endParaRPr lang="fr-FR" dirty="0"/>
           </a:p>
@@ -13550,7 +13550,7 @@
         </p:nvSpPr>
         <p:spPr>
           <a:xfrm>
-            <a:off x="0" y="4829326"/>
+            <a:off x="0" y="4697246"/>
             <a:ext cx="12191999" cy="1799723"/>
           </a:xfrm>
           <a:prstGeom prst="rect">
@@ -13645,7 +13645,7 @@
         </p:nvSpPr>
         <p:spPr>
           <a:xfrm>
-            <a:off x="5755658" y="4127401"/>
+            <a:off x="5755658" y="4076601"/>
             <a:ext cx="680682" cy="541453"/>
           </a:xfrm>
           <a:prstGeom prst="downArrow">
@@ -13952,8 +13952,8 @@
           </a:prstGeom>
         </p:spPr>
       </p:pic>
-      <mc:AlternateContent xmlns:mc="http://schemas.openxmlformats.org/markup-compatibility/2006">
-        <mc:Choice xmlns:a14="http://schemas.microsoft.com/office/drawing/2010/main" Requires="a14">
+      <mc:AlternateContent xmlns:mc="http://schemas.openxmlformats.org/markup-compatibility/2006" xmlns:a14="http://schemas.microsoft.com/office/drawing/2010/main">
+        <mc:Choice Requires="a14">
           <p:sp>
             <p:nvSpPr>
               <p:cNvPr id="6" name="ZoneTexte 5">
@@ -14217,7 +14217,7 @@
             </p:txBody>
           </p:sp>
         </mc:Choice>
-        <mc:Fallback>
+        <mc:Fallback xmlns="">
           <p:sp>
             <p:nvSpPr>
               <p:cNvPr id="6" name="ZoneTexte 5">
@@ -14262,8 +14262,8 @@
           </p:sp>
         </mc:Fallback>
       </mc:AlternateContent>
-      <mc:AlternateContent xmlns:mc="http://schemas.openxmlformats.org/markup-compatibility/2006">
-        <mc:Choice xmlns:a14="http://schemas.microsoft.com/office/drawing/2010/main" Requires="a14">
+      <mc:AlternateContent xmlns:mc="http://schemas.openxmlformats.org/markup-compatibility/2006" xmlns:a14="http://schemas.microsoft.com/office/drawing/2010/main">
+        <mc:Choice Requires="a14">
           <p:sp>
             <p:nvSpPr>
               <p:cNvPr id="8" name="ZoneTexte 7">
@@ -14942,7 +14942,7 @@
             </p:txBody>
           </p:sp>
         </mc:Choice>
-        <mc:Fallback>
+        <mc:Fallback xmlns="">
           <p:sp>
             <p:nvSpPr>
               <p:cNvPr id="8" name="ZoneTexte 7">

</xml_diff>

<commit_message>
Ajout des parties de Richard
</commit_message>
<xml_diff>
--- a/Présentation/Soutenance_Groupe25.pptx
+++ b/Présentation/Soutenance_Groupe25.pptx
@@ -9,10 +9,10 @@
     <p:sldMasterId id="2147483672" r:id="rId5"/>
   </p:sldMasterIdLst>
   <p:notesMasterIdLst>
-    <p:notesMasterId r:id="rId39"/>
+    <p:notesMasterId r:id="rId41"/>
   </p:notesMasterIdLst>
   <p:handoutMasterIdLst>
-    <p:handoutMasterId r:id="rId40"/>
+    <p:handoutMasterId r:id="rId42"/>
   </p:handoutMasterIdLst>
   <p:sldIdLst>
     <p:sldId id="257" r:id="rId6"/>
@@ -41,13 +41,15 @@
     <p:sldId id="282" r:id="rId29"/>
     <p:sldId id="283" r:id="rId30"/>
     <p:sldId id="284" r:id="rId31"/>
-    <p:sldId id="285" r:id="rId32"/>
-    <p:sldId id="272" r:id="rId33"/>
-    <p:sldId id="271" r:id="rId34"/>
-    <p:sldId id="297" r:id="rId35"/>
-    <p:sldId id="261" r:id="rId36"/>
-    <p:sldId id="273" r:id="rId37"/>
-    <p:sldId id="274" r:id="rId38"/>
+    <p:sldId id="298" r:id="rId32"/>
+    <p:sldId id="285" r:id="rId33"/>
+    <p:sldId id="299" r:id="rId34"/>
+    <p:sldId id="272" r:id="rId35"/>
+    <p:sldId id="271" r:id="rId36"/>
+    <p:sldId id="297" r:id="rId37"/>
+    <p:sldId id="261" r:id="rId38"/>
+    <p:sldId id="273" r:id="rId39"/>
+    <p:sldId id="274" r:id="rId40"/>
   </p:sldIdLst>
   <p:sldSz cx="12192000" cy="6858000"/>
   <p:notesSz cx="6858000" cy="9144000"/>
@@ -1272,7 +1274,7 @@
           <a:p>
             <a:fld id="{45C44DBB-F87B-49EA-91FB-EDB78BBE8593}" type="slidenum">
               <a:rPr lang="fr-FR" smtClean="0"/>
-              <a:t>29</a:t>
+              <a:t>31</a:t>
             </a:fld>
             <a:endParaRPr lang="fr-FR"/>
           </a:p>
@@ -1383,7 +1385,7 @@
           <a:p>
             <a:fld id="{45C44DBB-F87B-49EA-91FB-EDB78BBE8593}" type="slidenum">
               <a:rPr lang="fr-FR" smtClean="0"/>
-              <a:t>30</a:t>
+              <a:t>32</a:t>
             </a:fld>
             <a:endParaRPr lang="fr-FR"/>
           </a:p>
@@ -9609,25 +9611,7 @@
                 </a:solidFill>
                 <a:latin typeface="Gill Sans MT" panose="020B0502020104020203" pitchFamily="34" charset="0"/>
               </a:rPr>
-              <a:t>2.4. Modèles (</a:t>
-            </a:r>
-            <a:r>
-              <a:rPr lang="fr-FR" sz="3600" b="1" dirty="0">
-                <a:solidFill>
-                  <a:srgbClr val="FF0000"/>
-                </a:solidFill>
-                <a:latin typeface="Gill Sans MT" panose="020B0502020104020203" pitchFamily="34" charset="0"/>
-              </a:rPr>
-              <a:t>Richard</a:t>
-            </a:r>
-            <a:r>
-              <a:rPr lang="fr-FR" sz="3600" b="1" dirty="0">
-                <a:solidFill>
-                  <a:schemeClr val="bg1"/>
-                </a:solidFill>
-                <a:latin typeface="Gill Sans MT" panose="020B0502020104020203" pitchFamily="34" charset="0"/>
-              </a:rPr>
-              <a:t>)</a:t>
+              <a:t>2.4. Modèles</a:t>
             </a:r>
           </a:p>
         </p:txBody>
@@ -9671,6 +9655,1381 @@
           </a:prstGeom>
         </p:spPr>
       </p:pic>
+      <p:sp>
+        <p:nvSpPr>
+          <p:cNvPr id="5" name="ZoneTexte 4">
+            <a:extLst>
+              <a:ext uri="{FF2B5EF4-FFF2-40B4-BE49-F238E27FC236}">
+                <a16:creationId xmlns:a16="http://schemas.microsoft.com/office/drawing/2014/main" id="{BE397EBF-F696-43A9-AB35-7698BD20AEF6}"/>
+              </a:ext>
+            </a:extLst>
+          </p:cNvPr>
+          <p:cNvSpPr txBox="1"/>
+          <p:nvPr/>
+        </p:nvSpPr>
+        <p:spPr>
+          <a:xfrm>
+            <a:off x="570676" y="1664256"/>
+            <a:ext cx="3585236" cy="461665"/>
+          </a:xfrm>
+          <a:prstGeom prst="rect">
+            <a:avLst/>
+          </a:prstGeom>
+          <a:noFill/>
+        </p:spPr>
+        <p:txBody>
+          <a:bodyPr wrap="square" rtlCol="0">
+            <a:spAutoFit/>
+          </a:bodyPr>
+          <a:lstStyle/>
+          <a:p>
+            <a:r>
+              <a:rPr lang="fr-FR" sz="2400" b="1" dirty="0">
+                <a:latin typeface="Gill Sans MT" panose="020B0502020104020203" pitchFamily="34" charset="0"/>
+              </a:rPr>
+              <a:t>MCO</a:t>
+            </a:r>
+            <a:r>
+              <a:rPr lang="fr-FR" sz="2400" dirty="0">
+                <a:latin typeface="Gill Sans MT" panose="020B0502020104020203" pitchFamily="34" charset="0"/>
+              </a:rPr>
+              <a:t>(Modèle classique) </a:t>
+            </a:r>
+          </a:p>
+        </p:txBody>
+      </p:sp>
+      <p:sp>
+        <p:nvSpPr>
+          <p:cNvPr id="6" name="ZoneTexte 5">
+            <a:extLst>
+              <a:ext uri="{FF2B5EF4-FFF2-40B4-BE49-F238E27FC236}">
+                <a16:creationId xmlns:a16="http://schemas.microsoft.com/office/drawing/2014/main" id="{908E050E-2F7A-4452-BA04-C789FD11C686}"/>
+              </a:ext>
+            </a:extLst>
+          </p:cNvPr>
+          <p:cNvSpPr txBox="1"/>
+          <p:nvPr/>
+        </p:nvSpPr>
+        <p:spPr>
+          <a:xfrm>
+            <a:off x="570676" y="3264703"/>
+            <a:ext cx="3697070" cy="461665"/>
+          </a:xfrm>
+          <a:prstGeom prst="rect">
+            <a:avLst/>
+          </a:prstGeom>
+          <a:noFill/>
+        </p:spPr>
+        <p:txBody>
+          <a:bodyPr wrap="square" rtlCol="0">
+            <a:spAutoFit/>
+          </a:bodyPr>
+          <a:lstStyle>
+            <a:defPPr>
+              <a:defRPr lang="fr-FR"/>
+            </a:defPPr>
+            <a:lvl1pPr>
+              <a:defRPr sz="2400">
+                <a:latin typeface="Gill Sans MT" panose="020B0502020104020203" pitchFamily="34" charset="0"/>
+              </a:defRPr>
+            </a:lvl1pPr>
+          </a:lstStyle>
+          <a:p>
+            <a:r>
+              <a:rPr lang="fr-FR" b="1" dirty="0"/>
+              <a:t>SAR </a:t>
+            </a:r>
+            <a:r>
+              <a:rPr lang="fr-FR" dirty="0"/>
+              <a:t>(</a:t>
+            </a:r>
+            <a:r>
+              <a:rPr lang="fr-FR" b="1" dirty="0">
+                <a:solidFill>
+                  <a:srgbClr val="006A5A"/>
+                </a:solidFill>
+              </a:rPr>
+              <a:t>S</a:t>
+            </a:r>
+            <a:r>
+              <a:rPr lang="fr-FR" dirty="0"/>
+              <a:t>patial </a:t>
+            </a:r>
+            <a:r>
+              <a:rPr lang="fr-FR" b="1" dirty="0" err="1">
+                <a:solidFill>
+                  <a:srgbClr val="006A5A"/>
+                </a:solidFill>
+              </a:rPr>
+              <a:t>A</a:t>
+            </a:r>
+            <a:r>
+              <a:rPr lang="fr-FR" dirty="0" err="1"/>
+              <a:t>uto</a:t>
+            </a:r>
+            <a:r>
+              <a:rPr lang="fr-FR" b="1" dirty="0" err="1">
+                <a:solidFill>
+                  <a:srgbClr val="006A5A"/>
+                </a:solidFill>
+              </a:rPr>
+              <a:t>R</a:t>
+            </a:r>
+            <a:r>
+              <a:rPr lang="fr-FR" dirty="0" err="1"/>
+              <a:t>egresif</a:t>
+            </a:r>
+            <a:r>
+              <a:rPr lang="fr-FR" dirty="0"/>
+              <a:t>)</a:t>
+            </a:r>
+          </a:p>
+        </p:txBody>
+      </p:sp>
+      <p:sp>
+        <p:nvSpPr>
+          <p:cNvPr id="7" name="ZoneTexte 6">
+            <a:extLst>
+              <a:ext uri="{FF2B5EF4-FFF2-40B4-BE49-F238E27FC236}">
+                <a16:creationId xmlns:a16="http://schemas.microsoft.com/office/drawing/2014/main" id="{F7AED6EA-09C3-489D-8973-FFAEB32F203C}"/>
+              </a:ext>
+            </a:extLst>
+          </p:cNvPr>
+          <p:cNvSpPr txBox="1"/>
+          <p:nvPr/>
+        </p:nvSpPr>
+        <p:spPr>
+          <a:xfrm>
+            <a:off x="7309260" y="1658361"/>
+            <a:ext cx="3585237" cy="461665"/>
+          </a:xfrm>
+          <a:prstGeom prst="rect">
+            <a:avLst/>
+          </a:prstGeom>
+          <a:noFill/>
+        </p:spPr>
+        <p:txBody>
+          <a:bodyPr wrap="square" rtlCol="0">
+            <a:spAutoFit/>
+          </a:bodyPr>
+          <a:lstStyle>
+            <a:defPPr>
+              <a:defRPr lang="fr-FR"/>
+            </a:defPPr>
+            <a:lvl1pPr>
+              <a:defRPr sz="2400">
+                <a:latin typeface="Gill Sans MT" panose="020B0502020104020203" pitchFamily="34" charset="0"/>
+              </a:defRPr>
+            </a:lvl1pPr>
+          </a:lstStyle>
+          <a:p>
+            <a:r>
+              <a:rPr lang="fr-FR" b="1" dirty="0"/>
+              <a:t>SEM</a:t>
+            </a:r>
+            <a:r>
+              <a:rPr lang="fr-FR" dirty="0"/>
+              <a:t>(</a:t>
+            </a:r>
+            <a:r>
+              <a:rPr lang="fr-FR" b="1" dirty="0">
+                <a:solidFill>
+                  <a:srgbClr val="006A5A"/>
+                </a:solidFill>
+              </a:rPr>
+              <a:t>S</a:t>
+            </a:r>
+            <a:r>
+              <a:rPr lang="fr-FR" dirty="0"/>
+              <a:t>patial </a:t>
+            </a:r>
+            <a:r>
+              <a:rPr lang="fr-FR" b="1" dirty="0" err="1">
+                <a:solidFill>
+                  <a:srgbClr val="006A5A"/>
+                </a:solidFill>
+              </a:rPr>
+              <a:t>E</a:t>
+            </a:r>
+            <a:r>
+              <a:rPr lang="fr-FR" dirty="0" err="1"/>
+              <a:t>rror</a:t>
+            </a:r>
+            <a:r>
+              <a:rPr lang="fr-FR" dirty="0"/>
+              <a:t> </a:t>
+            </a:r>
+            <a:r>
+              <a:rPr lang="fr-FR" b="1" dirty="0">
+                <a:solidFill>
+                  <a:srgbClr val="006A5A"/>
+                </a:solidFill>
+              </a:rPr>
+              <a:t>M</a:t>
+            </a:r>
+            <a:r>
+              <a:rPr lang="fr-FR" dirty="0"/>
+              <a:t>odel)</a:t>
+            </a:r>
+          </a:p>
+        </p:txBody>
+      </p:sp>
+      <p:sp>
+        <p:nvSpPr>
+          <p:cNvPr id="8" name="ZoneTexte 7">
+            <a:extLst>
+              <a:ext uri="{FF2B5EF4-FFF2-40B4-BE49-F238E27FC236}">
+                <a16:creationId xmlns:a16="http://schemas.microsoft.com/office/drawing/2014/main" id="{EC54D75E-F1A9-4991-822B-A4F4E8DA1A83}"/>
+              </a:ext>
+            </a:extLst>
+          </p:cNvPr>
+          <p:cNvSpPr txBox="1"/>
+          <p:nvPr/>
+        </p:nvSpPr>
+        <p:spPr>
+          <a:xfrm>
+            <a:off x="7309260" y="3127011"/>
+            <a:ext cx="4137186" cy="461665"/>
+          </a:xfrm>
+          <a:prstGeom prst="rect">
+            <a:avLst/>
+          </a:prstGeom>
+          <a:noFill/>
+        </p:spPr>
+        <p:txBody>
+          <a:bodyPr wrap="square" rtlCol="0">
+            <a:spAutoFit/>
+          </a:bodyPr>
+          <a:lstStyle>
+            <a:defPPr>
+              <a:defRPr lang="fr-FR"/>
+            </a:defPPr>
+            <a:lvl1pPr>
+              <a:defRPr sz="2400">
+                <a:latin typeface="Gill Sans MT" panose="020B0502020104020203" pitchFamily="34" charset="0"/>
+              </a:defRPr>
+            </a:lvl1pPr>
+          </a:lstStyle>
+          <a:p>
+            <a:r>
+              <a:rPr lang="fr-FR" b="1" dirty="0"/>
+              <a:t>SLX</a:t>
+            </a:r>
+            <a:r>
+              <a:rPr lang="fr-FR" dirty="0"/>
+              <a:t>(</a:t>
+            </a:r>
+            <a:r>
+              <a:rPr lang="fr-FR" b="1" dirty="0">
+                <a:solidFill>
+                  <a:srgbClr val="006A5A"/>
+                </a:solidFill>
+              </a:rPr>
+              <a:t>S</a:t>
+            </a:r>
+            <a:r>
+              <a:rPr lang="fr-FR" dirty="0"/>
+              <a:t>patial </a:t>
+            </a:r>
+            <a:r>
+              <a:rPr lang="fr-FR" b="1" dirty="0">
+                <a:solidFill>
+                  <a:srgbClr val="006A5A"/>
+                </a:solidFill>
+              </a:rPr>
+              <a:t>L</a:t>
+            </a:r>
+            <a:r>
+              <a:rPr lang="fr-FR" dirty="0"/>
+              <a:t>ag of </a:t>
+            </a:r>
+            <a:r>
+              <a:rPr lang="fr-FR" b="1" dirty="0">
+                <a:solidFill>
+                  <a:srgbClr val="006A5A"/>
+                </a:solidFill>
+              </a:rPr>
+              <a:t>X</a:t>
+            </a:r>
+            <a:r>
+              <a:rPr lang="fr-FR" dirty="0"/>
+              <a:t> model)</a:t>
+            </a:r>
+          </a:p>
+        </p:txBody>
+      </p:sp>
+      <p:sp>
+        <p:nvSpPr>
+          <p:cNvPr id="9" name="ZoneTexte 8">
+            <a:extLst>
+              <a:ext uri="{FF2B5EF4-FFF2-40B4-BE49-F238E27FC236}">
+                <a16:creationId xmlns:a16="http://schemas.microsoft.com/office/drawing/2014/main" id="{8ED130DF-3A65-4B3B-91E9-30C615965A0A}"/>
+              </a:ext>
+            </a:extLst>
+          </p:cNvPr>
+          <p:cNvSpPr txBox="1"/>
+          <p:nvPr/>
+        </p:nvSpPr>
+        <p:spPr>
+          <a:xfrm>
+            <a:off x="4267746" y="4967598"/>
+            <a:ext cx="3894422" cy="461665"/>
+          </a:xfrm>
+          <a:prstGeom prst="rect">
+            <a:avLst/>
+          </a:prstGeom>
+          <a:noFill/>
+        </p:spPr>
+        <p:txBody>
+          <a:bodyPr wrap="square" rtlCol="0">
+            <a:spAutoFit/>
+          </a:bodyPr>
+          <a:lstStyle>
+            <a:defPPr>
+              <a:defRPr lang="fr-FR"/>
+            </a:defPPr>
+            <a:lvl1pPr>
+              <a:defRPr sz="2400">
+                <a:latin typeface="Gill Sans MT" panose="020B0502020104020203" pitchFamily="34" charset="0"/>
+              </a:defRPr>
+            </a:lvl1pPr>
+          </a:lstStyle>
+          <a:p>
+            <a:r>
+              <a:rPr lang="fr-FR" b="1" dirty="0"/>
+              <a:t>SDM</a:t>
+            </a:r>
+            <a:r>
+              <a:rPr lang="fr-FR" dirty="0"/>
+              <a:t>(</a:t>
+            </a:r>
+            <a:r>
+              <a:rPr lang="fr-FR" b="1" dirty="0">
+                <a:solidFill>
+                  <a:srgbClr val="006A5A"/>
+                </a:solidFill>
+              </a:rPr>
+              <a:t>S</a:t>
+            </a:r>
+            <a:r>
+              <a:rPr lang="fr-FR" dirty="0"/>
+              <a:t>patial </a:t>
+            </a:r>
+            <a:r>
+              <a:rPr lang="fr-FR" b="1" dirty="0">
+                <a:solidFill>
+                  <a:srgbClr val="006A5A"/>
+                </a:solidFill>
+              </a:rPr>
+              <a:t>D</a:t>
+            </a:r>
+            <a:r>
+              <a:rPr lang="fr-FR" dirty="0"/>
+              <a:t>urbin </a:t>
+            </a:r>
+            <a:r>
+              <a:rPr lang="fr-FR" b="1" dirty="0">
+                <a:solidFill>
+                  <a:srgbClr val="006A5A"/>
+                </a:solidFill>
+              </a:rPr>
+              <a:t>M</a:t>
+            </a:r>
+            <a:r>
+              <a:rPr lang="fr-FR" dirty="0"/>
+              <a:t>odel)</a:t>
+            </a:r>
+          </a:p>
+        </p:txBody>
+      </p:sp>
+      <p:sp>
+        <p:nvSpPr>
+          <p:cNvPr id="10" name="Rectangle 9">
+            <a:extLst>
+              <a:ext uri="{FF2B5EF4-FFF2-40B4-BE49-F238E27FC236}">
+                <a16:creationId xmlns:a16="http://schemas.microsoft.com/office/drawing/2014/main" id="{0E3D93F1-05AD-4E8B-A3ED-C8D8254D94E4}"/>
+              </a:ext>
+            </a:extLst>
+          </p:cNvPr>
+          <p:cNvSpPr/>
+          <p:nvPr/>
+        </p:nvSpPr>
+        <p:spPr>
+          <a:xfrm>
+            <a:off x="317406" y="1817868"/>
+            <a:ext cx="203931" cy="197353"/>
+          </a:xfrm>
+          <a:prstGeom prst="rect">
+            <a:avLst/>
+          </a:prstGeom>
+          <a:solidFill>
+            <a:srgbClr val="006A5A"/>
+          </a:solidFill>
+        </p:spPr>
+        <p:style>
+          <a:lnRef idx="2">
+            <a:schemeClr val="accent1">
+              <a:shade val="50000"/>
+            </a:schemeClr>
+          </a:lnRef>
+          <a:fillRef idx="1">
+            <a:schemeClr val="accent1"/>
+          </a:fillRef>
+          <a:effectRef idx="0">
+            <a:schemeClr val="accent1"/>
+          </a:effectRef>
+          <a:fontRef idx="minor">
+            <a:schemeClr val="lt1"/>
+          </a:fontRef>
+        </p:style>
+        <p:txBody>
+          <a:bodyPr rtlCol="0" anchor="ctr"/>
+          <a:lstStyle/>
+          <a:p>
+            <a:pPr algn="ctr"/>
+            <a:endParaRPr lang="fr-FR"/>
+          </a:p>
+        </p:txBody>
+      </p:sp>
+      <p:sp>
+        <p:nvSpPr>
+          <p:cNvPr id="11" name="Rectangle 10">
+            <a:extLst>
+              <a:ext uri="{FF2B5EF4-FFF2-40B4-BE49-F238E27FC236}">
+                <a16:creationId xmlns:a16="http://schemas.microsoft.com/office/drawing/2014/main" id="{1D4F0291-506F-4EF2-9B91-4B4432012D97}"/>
+              </a:ext>
+            </a:extLst>
+          </p:cNvPr>
+          <p:cNvSpPr/>
+          <p:nvPr/>
+        </p:nvSpPr>
+        <p:spPr>
+          <a:xfrm>
+            <a:off x="317405" y="3396858"/>
+            <a:ext cx="203931" cy="197353"/>
+          </a:xfrm>
+          <a:prstGeom prst="rect">
+            <a:avLst/>
+          </a:prstGeom>
+          <a:solidFill>
+            <a:srgbClr val="006A5A"/>
+          </a:solidFill>
+        </p:spPr>
+        <p:style>
+          <a:lnRef idx="2">
+            <a:schemeClr val="accent1">
+              <a:shade val="50000"/>
+            </a:schemeClr>
+          </a:lnRef>
+          <a:fillRef idx="1">
+            <a:schemeClr val="accent1"/>
+          </a:fillRef>
+          <a:effectRef idx="0">
+            <a:schemeClr val="accent1"/>
+          </a:effectRef>
+          <a:fontRef idx="minor">
+            <a:schemeClr val="lt1"/>
+          </a:fontRef>
+        </p:style>
+        <p:txBody>
+          <a:bodyPr rtlCol="0" anchor="ctr"/>
+          <a:lstStyle/>
+          <a:p>
+            <a:pPr algn="ctr"/>
+            <a:endParaRPr lang="fr-FR"/>
+          </a:p>
+        </p:txBody>
+      </p:sp>
+      <p:sp>
+        <p:nvSpPr>
+          <p:cNvPr id="12" name="Rectangle 11">
+            <a:extLst>
+              <a:ext uri="{FF2B5EF4-FFF2-40B4-BE49-F238E27FC236}">
+                <a16:creationId xmlns:a16="http://schemas.microsoft.com/office/drawing/2014/main" id="{9178589A-CC7E-473B-884D-A479078A8174}"/>
+              </a:ext>
+            </a:extLst>
+          </p:cNvPr>
+          <p:cNvSpPr/>
+          <p:nvPr/>
+        </p:nvSpPr>
+        <p:spPr>
+          <a:xfrm>
+            <a:off x="7055991" y="1822049"/>
+            <a:ext cx="203931" cy="197353"/>
+          </a:xfrm>
+          <a:prstGeom prst="rect">
+            <a:avLst/>
+          </a:prstGeom>
+          <a:solidFill>
+            <a:srgbClr val="006A5A"/>
+          </a:solidFill>
+        </p:spPr>
+        <p:style>
+          <a:lnRef idx="2">
+            <a:schemeClr val="accent1">
+              <a:shade val="50000"/>
+            </a:schemeClr>
+          </a:lnRef>
+          <a:fillRef idx="1">
+            <a:schemeClr val="accent1"/>
+          </a:fillRef>
+          <a:effectRef idx="0">
+            <a:schemeClr val="accent1"/>
+          </a:effectRef>
+          <a:fontRef idx="minor">
+            <a:schemeClr val="lt1"/>
+          </a:fontRef>
+        </p:style>
+        <p:txBody>
+          <a:bodyPr rtlCol="0" anchor="ctr"/>
+          <a:lstStyle/>
+          <a:p>
+            <a:pPr algn="ctr"/>
+            <a:endParaRPr lang="fr-FR"/>
+          </a:p>
+        </p:txBody>
+      </p:sp>
+      <p:sp>
+        <p:nvSpPr>
+          <p:cNvPr id="13" name="Rectangle 12">
+            <a:extLst>
+              <a:ext uri="{FF2B5EF4-FFF2-40B4-BE49-F238E27FC236}">
+                <a16:creationId xmlns:a16="http://schemas.microsoft.com/office/drawing/2014/main" id="{B4E803D5-3B40-440D-8151-5EF4C6E7C9CA}"/>
+              </a:ext>
+            </a:extLst>
+          </p:cNvPr>
+          <p:cNvSpPr/>
+          <p:nvPr/>
+        </p:nvSpPr>
+        <p:spPr>
+          <a:xfrm>
+            <a:off x="7055990" y="3259166"/>
+            <a:ext cx="203931" cy="197353"/>
+          </a:xfrm>
+          <a:prstGeom prst="rect">
+            <a:avLst/>
+          </a:prstGeom>
+          <a:solidFill>
+            <a:srgbClr val="006A5A"/>
+          </a:solidFill>
+        </p:spPr>
+        <p:style>
+          <a:lnRef idx="2">
+            <a:schemeClr val="accent1">
+              <a:shade val="50000"/>
+            </a:schemeClr>
+          </a:lnRef>
+          <a:fillRef idx="1">
+            <a:schemeClr val="accent1"/>
+          </a:fillRef>
+          <a:effectRef idx="0">
+            <a:schemeClr val="accent1"/>
+          </a:effectRef>
+          <a:fontRef idx="minor">
+            <a:schemeClr val="lt1"/>
+          </a:fontRef>
+        </p:style>
+        <p:txBody>
+          <a:bodyPr rtlCol="0" anchor="ctr"/>
+          <a:lstStyle/>
+          <a:p>
+            <a:pPr algn="ctr"/>
+            <a:endParaRPr lang="fr-FR"/>
+          </a:p>
+        </p:txBody>
+      </p:sp>
+      <p:sp>
+        <p:nvSpPr>
+          <p:cNvPr id="14" name="Rectangle 13">
+            <a:extLst>
+              <a:ext uri="{FF2B5EF4-FFF2-40B4-BE49-F238E27FC236}">
+                <a16:creationId xmlns:a16="http://schemas.microsoft.com/office/drawing/2014/main" id="{1421FB3C-83A0-4FCD-904A-42050F6EBA00}"/>
+              </a:ext>
+            </a:extLst>
+          </p:cNvPr>
+          <p:cNvSpPr/>
+          <p:nvPr/>
+        </p:nvSpPr>
+        <p:spPr>
+          <a:xfrm>
+            <a:off x="3943848" y="5110928"/>
+            <a:ext cx="203931" cy="197353"/>
+          </a:xfrm>
+          <a:prstGeom prst="rect">
+            <a:avLst/>
+          </a:prstGeom>
+          <a:solidFill>
+            <a:srgbClr val="006A5A"/>
+          </a:solidFill>
+        </p:spPr>
+        <p:style>
+          <a:lnRef idx="2">
+            <a:schemeClr val="accent1">
+              <a:shade val="50000"/>
+            </a:schemeClr>
+          </a:lnRef>
+          <a:fillRef idx="1">
+            <a:schemeClr val="accent1"/>
+          </a:fillRef>
+          <a:effectRef idx="0">
+            <a:schemeClr val="accent1"/>
+          </a:effectRef>
+          <a:fontRef idx="minor">
+            <a:schemeClr val="lt1"/>
+          </a:fontRef>
+        </p:style>
+        <p:txBody>
+          <a:bodyPr rtlCol="0" anchor="ctr"/>
+          <a:lstStyle/>
+          <a:p>
+            <a:pPr algn="ctr"/>
+            <a:endParaRPr lang="fr-FR"/>
+          </a:p>
+        </p:txBody>
+      </p:sp>
+      <mc:AlternateContent xmlns:mc="http://schemas.openxmlformats.org/markup-compatibility/2006">
+        <mc:Choice xmlns:a14="http://schemas.microsoft.com/office/drawing/2010/main" Requires="a14">
+          <p:sp>
+            <p:nvSpPr>
+              <p:cNvPr id="15" name="ZoneTexte 14">
+                <a:extLst>
+                  <a:ext uri="{FF2B5EF4-FFF2-40B4-BE49-F238E27FC236}">
+                    <a16:creationId xmlns:a16="http://schemas.microsoft.com/office/drawing/2014/main" id="{CABFA3D5-464D-4F11-AF07-72B001F726A5}"/>
+                  </a:ext>
+                </a:extLst>
+              </p:cNvPr>
+              <p:cNvSpPr txBox="1"/>
+              <p:nvPr/>
+            </p:nvSpPr>
+            <p:spPr>
+              <a:xfrm>
+                <a:off x="962090" y="2257864"/>
+                <a:ext cx="1958870" cy="430887"/>
+              </a:xfrm>
+              <a:prstGeom prst="rect">
+                <a:avLst/>
+              </a:prstGeom>
+              <a:noFill/>
+            </p:spPr>
+            <p:txBody>
+              <a:bodyPr wrap="none" lIns="0" tIns="0" rIns="0" bIns="0" rtlCol="0">
+                <a:spAutoFit/>
+              </a:bodyPr>
+              <a:lstStyle/>
+              <a:p>
+                <a14:m>
+                  <m:oMathPara xmlns:m="http://schemas.openxmlformats.org/officeDocument/2006/math">
+                    <m:oMathParaPr>
+                      <m:jc m:val="centerGroup"/>
+                    </m:oMathParaPr>
+                    <m:oMath xmlns:m="http://schemas.openxmlformats.org/officeDocument/2006/math">
+                      <m:r>
+                        <a:rPr lang="fr-FR" sz="2800" b="0" i="1" smtClean="0">
+                          <a:latin typeface="Cambria Math" panose="02040503050406030204" pitchFamily="18" charset="0"/>
+                        </a:rPr>
+                        <m:t>𝑌</m:t>
+                      </m:r>
+                      <m:r>
+                        <a:rPr lang="fr-FR" sz="2800" b="0" i="1" smtClean="0">
+                          <a:latin typeface="Cambria Math" panose="02040503050406030204" pitchFamily="18" charset="0"/>
+                        </a:rPr>
+                        <m:t>=</m:t>
+                      </m:r>
+                      <m:r>
+                        <a:rPr lang="fr-FR" sz="2800" b="0" i="1" smtClean="0">
+                          <a:latin typeface="Cambria Math" panose="02040503050406030204" pitchFamily="18" charset="0"/>
+                        </a:rPr>
+                        <m:t>𝑋</m:t>
+                      </m:r>
+                      <m:r>
+                        <a:rPr lang="fr-FR" sz="2800" b="0" i="1" smtClean="0">
+                          <a:latin typeface="Cambria Math" panose="02040503050406030204" pitchFamily="18" charset="0"/>
+                          <a:ea typeface="Cambria Math" panose="02040503050406030204" pitchFamily="18" charset="0"/>
+                        </a:rPr>
+                        <m:t>𝛽</m:t>
+                      </m:r>
+                      <m:r>
+                        <a:rPr lang="fr-FR" sz="2800" b="0" i="1" smtClean="0">
+                          <a:latin typeface="Cambria Math" panose="02040503050406030204" pitchFamily="18" charset="0"/>
+                          <a:ea typeface="Cambria Math" panose="02040503050406030204" pitchFamily="18" charset="0"/>
+                        </a:rPr>
+                        <m:t>+ </m:t>
+                      </m:r>
+                      <m:r>
+                        <a:rPr lang="fr-FR" sz="2800" b="0" i="1" smtClean="0">
+                          <a:latin typeface="Cambria Math" panose="02040503050406030204" pitchFamily="18" charset="0"/>
+                          <a:ea typeface="Cambria Math" panose="02040503050406030204" pitchFamily="18" charset="0"/>
+                        </a:rPr>
+                        <m:t>𝜀</m:t>
+                      </m:r>
+                    </m:oMath>
+                  </m:oMathPara>
+                </a14:m>
+                <a:endParaRPr lang="fr-FR" sz="2800" dirty="0"/>
+              </a:p>
+            </p:txBody>
+          </p:sp>
+        </mc:Choice>
+        <mc:Fallback>
+          <p:sp>
+            <p:nvSpPr>
+              <p:cNvPr id="15" name="ZoneTexte 14">
+                <a:extLst>
+                  <a:ext uri="{FF2B5EF4-FFF2-40B4-BE49-F238E27FC236}">
+                    <a16:creationId xmlns:a16="http://schemas.microsoft.com/office/drawing/2014/main" id="{CABFA3D5-464D-4F11-AF07-72B001F726A5}"/>
+                  </a:ext>
+                </a:extLst>
+              </p:cNvPr>
+              <p:cNvSpPr txBox="1">
+                <a:spLocks noRot="1" noChangeAspect="1" noMove="1" noResize="1" noEditPoints="1" noAdjustHandles="1" noChangeArrowheads="1" noChangeShapeType="1" noTextEdit="1"/>
+              </p:cNvSpPr>
+              <p:nvPr/>
+            </p:nvSpPr>
+            <p:spPr>
+              <a:xfrm>
+                <a:off x="962090" y="2257864"/>
+                <a:ext cx="1958870" cy="430887"/>
+              </a:xfrm>
+              <a:prstGeom prst="rect">
+                <a:avLst/>
+              </a:prstGeom>
+              <a:blipFill>
+                <a:blip r:embed="rId4"/>
+                <a:stretch>
+                  <a:fillRect/>
+                </a:stretch>
+              </a:blipFill>
+            </p:spPr>
+            <p:txBody>
+              <a:bodyPr/>
+              <a:lstStyle/>
+              <a:p>
+                <a:r>
+                  <a:rPr lang="fr-FR">
+                    <a:noFill/>
+                  </a:rPr>
+                  <a:t> </a:t>
+                </a:r>
+              </a:p>
+            </p:txBody>
+          </p:sp>
+        </mc:Fallback>
+      </mc:AlternateContent>
+      <mc:AlternateContent xmlns:mc="http://schemas.openxmlformats.org/markup-compatibility/2006">
+        <mc:Choice xmlns:a14="http://schemas.microsoft.com/office/drawing/2010/main" Requires="a14">
+          <p:sp>
+            <p:nvSpPr>
+              <p:cNvPr id="16" name="ZoneTexte 15">
+                <a:extLst>
+                  <a:ext uri="{FF2B5EF4-FFF2-40B4-BE49-F238E27FC236}">
+                    <a16:creationId xmlns:a16="http://schemas.microsoft.com/office/drawing/2014/main" id="{58AF11F9-D5C7-40B6-9979-CBC8C2E5D26B}"/>
+                  </a:ext>
+                </a:extLst>
+              </p:cNvPr>
+              <p:cNvSpPr txBox="1"/>
+              <p:nvPr/>
+            </p:nvSpPr>
+            <p:spPr>
+              <a:xfrm>
+                <a:off x="521336" y="3797294"/>
+                <a:ext cx="3177986" cy="430887"/>
+              </a:xfrm>
+              <a:prstGeom prst="rect">
+                <a:avLst/>
+              </a:prstGeom>
+              <a:noFill/>
+            </p:spPr>
+            <p:txBody>
+              <a:bodyPr wrap="none" lIns="0" tIns="0" rIns="0" bIns="0" rtlCol="0">
+                <a:spAutoFit/>
+              </a:bodyPr>
+              <a:lstStyle/>
+              <a:p>
+                <a14:m>
+                  <m:oMathPara xmlns:m="http://schemas.openxmlformats.org/officeDocument/2006/math">
+                    <m:oMathParaPr>
+                      <m:jc m:val="centerGroup"/>
+                    </m:oMathParaPr>
+                    <m:oMath xmlns:m="http://schemas.openxmlformats.org/officeDocument/2006/math">
+                      <m:r>
+                        <a:rPr lang="fr-FR" sz="2800" b="0" i="1">
+                          <a:latin typeface="Cambria Math" panose="02040503050406030204" pitchFamily="18" charset="0"/>
+                        </a:rPr>
+                        <m:t>𝑌</m:t>
+                      </m:r>
+                      <m:r>
+                        <a:rPr lang="fr-FR" sz="2800" b="0" i="1">
+                          <a:latin typeface="Cambria Math" panose="02040503050406030204" pitchFamily="18" charset="0"/>
+                        </a:rPr>
+                        <m:t>=</m:t>
+                      </m:r>
+                      <m:r>
+                        <a:rPr lang="fr-FR" sz="2800" b="0" i="1">
+                          <a:latin typeface="Cambria Math" panose="02040503050406030204" pitchFamily="18" charset="0"/>
+                        </a:rPr>
+                        <m:t>𝜌</m:t>
+                      </m:r>
+                      <m:r>
+                        <a:rPr lang="fr-FR" sz="2800" b="0" i="1">
+                          <a:latin typeface="Cambria Math" panose="02040503050406030204" pitchFamily="18" charset="0"/>
+                        </a:rPr>
+                        <m:t>𝑊𝑌</m:t>
+                      </m:r>
+                      <m:r>
+                        <a:rPr lang="fr-FR" sz="2800" b="0" i="1">
+                          <a:latin typeface="Cambria Math" panose="02040503050406030204" pitchFamily="18" charset="0"/>
+                        </a:rPr>
+                        <m:t>+</m:t>
+                      </m:r>
+                      <m:r>
+                        <a:rPr lang="fr-FR" sz="2800" b="0" i="1">
+                          <a:latin typeface="Cambria Math" panose="02040503050406030204" pitchFamily="18" charset="0"/>
+                        </a:rPr>
+                        <m:t>𝑋</m:t>
+                      </m:r>
+                      <m:r>
+                        <a:rPr lang="fr-FR" sz="2800" b="0" i="1">
+                          <a:latin typeface="Cambria Math" panose="02040503050406030204" pitchFamily="18" charset="0"/>
+                        </a:rPr>
+                        <m:t>𝛽</m:t>
+                      </m:r>
+                      <m:r>
+                        <a:rPr lang="fr-FR" sz="2800" b="0" i="1">
+                          <a:latin typeface="Cambria Math" panose="02040503050406030204" pitchFamily="18" charset="0"/>
+                        </a:rPr>
+                        <m:t>+ </m:t>
+                      </m:r>
+                      <m:r>
+                        <a:rPr lang="fr-FR" sz="2800" b="0" i="1">
+                          <a:latin typeface="Cambria Math" panose="02040503050406030204" pitchFamily="18" charset="0"/>
+                        </a:rPr>
+                        <m:t>𝜖</m:t>
+                      </m:r>
+                    </m:oMath>
+                  </m:oMathPara>
+                </a14:m>
+                <a:endParaRPr lang="fr-FR" sz="2800" i="1" dirty="0">
+                  <a:latin typeface="Cambria Math" panose="02040503050406030204" pitchFamily="18" charset="0"/>
+                </a:endParaRPr>
+              </a:p>
+            </p:txBody>
+          </p:sp>
+        </mc:Choice>
+        <mc:Fallback>
+          <p:sp>
+            <p:nvSpPr>
+              <p:cNvPr id="16" name="ZoneTexte 15">
+                <a:extLst>
+                  <a:ext uri="{FF2B5EF4-FFF2-40B4-BE49-F238E27FC236}">
+                    <a16:creationId xmlns:a16="http://schemas.microsoft.com/office/drawing/2014/main" id="{58AF11F9-D5C7-40B6-9979-CBC8C2E5D26B}"/>
+                  </a:ext>
+                </a:extLst>
+              </p:cNvPr>
+              <p:cNvSpPr txBox="1">
+                <a:spLocks noRot="1" noChangeAspect="1" noMove="1" noResize="1" noEditPoints="1" noAdjustHandles="1" noChangeArrowheads="1" noChangeShapeType="1" noTextEdit="1"/>
+              </p:cNvSpPr>
+              <p:nvPr/>
+            </p:nvSpPr>
+            <p:spPr>
+              <a:xfrm>
+                <a:off x="521336" y="3797294"/>
+                <a:ext cx="3177986" cy="430887"/>
+              </a:xfrm>
+              <a:prstGeom prst="rect">
+                <a:avLst/>
+              </a:prstGeom>
+              <a:blipFill>
+                <a:blip r:embed="rId5"/>
+                <a:stretch>
+                  <a:fillRect/>
+                </a:stretch>
+              </a:blipFill>
+            </p:spPr>
+            <p:txBody>
+              <a:bodyPr/>
+              <a:lstStyle/>
+              <a:p>
+                <a:r>
+                  <a:rPr lang="fr-FR">
+                    <a:noFill/>
+                  </a:rPr>
+                  <a:t> </a:t>
+                </a:r>
+              </a:p>
+            </p:txBody>
+          </p:sp>
+        </mc:Fallback>
+      </mc:AlternateContent>
+      <mc:AlternateContent xmlns:mc="http://schemas.openxmlformats.org/markup-compatibility/2006">
+        <mc:Choice xmlns:a14="http://schemas.microsoft.com/office/drawing/2010/main" Requires="a14">
+          <p:sp>
+            <p:nvSpPr>
+              <p:cNvPr id="19" name="ZoneTexte 18">
+                <a:extLst>
+                  <a:ext uri="{FF2B5EF4-FFF2-40B4-BE49-F238E27FC236}">
+                    <a16:creationId xmlns:a16="http://schemas.microsoft.com/office/drawing/2014/main" id="{FE29D418-67E3-47A4-AFED-8247234C9374}"/>
+                  </a:ext>
+                </a:extLst>
+              </p:cNvPr>
+              <p:cNvSpPr txBox="1"/>
+              <p:nvPr/>
+            </p:nvSpPr>
+            <p:spPr>
+              <a:xfrm>
+                <a:off x="7378332" y="2257864"/>
+                <a:ext cx="3242105" cy="430887"/>
+              </a:xfrm>
+              <a:prstGeom prst="rect">
+                <a:avLst/>
+              </a:prstGeom>
+              <a:noFill/>
+            </p:spPr>
+            <p:txBody>
+              <a:bodyPr wrap="none" lIns="0" tIns="0" rIns="0" bIns="0" rtlCol="0">
+                <a:spAutoFit/>
+              </a:bodyPr>
+              <a:lstStyle/>
+              <a:p>
+                <a14:m>
+                  <m:oMathPara xmlns:m="http://schemas.openxmlformats.org/officeDocument/2006/math">
+                    <m:oMathParaPr>
+                      <m:jc m:val="centerGroup"/>
+                    </m:oMathParaPr>
+                    <m:oMath xmlns:m="http://schemas.openxmlformats.org/officeDocument/2006/math">
+                      <m:r>
+                        <a:rPr lang="fr-FR" sz="2800" b="0" i="1" smtClean="0">
+                          <a:latin typeface="Cambria Math" panose="02040503050406030204" pitchFamily="18" charset="0"/>
+                        </a:rPr>
+                        <m:t>𝑌</m:t>
+                      </m:r>
+                      <m:r>
+                        <a:rPr lang="fr-FR" sz="2800" b="0" i="1" smtClean="0">
+                          <a:latin typeface="Cambria Math" panose="02040503050406030204" pitchFamily="18" charset="0"/>
+                        </a:rPr>
+                        <m:t>=</m:t>
+                      </m:r>
+                      <m:r>
+                        <a:rPr lang="fr-FR" sz="2800" b="0" i="1" smtClean="0">
+                          <a:latin typeface="Cambria Math" panose="02040503050406030204" pitchFamily="18" charset="0"/>
+                        </a:rPr>
+                        <m:t>𝑋</m:t>
+                      </m:r>
+                      <m:r>
+                        <a:rPr lang="fr-FR" sz="2800" b="0" i="1" smtClean="0">
+                          <a:latin typeface="Cambria Math" panose="02040503050406030204" pitchFamily="18" charset="0"/>
+                        </a:rPr>
+                        <m:t>𝛽</m:t>
+                      </m:r>
+                      <m:r>
+                        <a:rPr lang="fr-FR" sz="2800" b="0" i="1" smtClean="0">
+                          <a:latin typeface="Cambria Math" panose="02040503050406030204" pitchFamily="18" charset="0"/>
+                        </a:rPr>
+                        <m:t>+ </m:t>
+                      </m:r>
+                      <m:r>
+                        <a:rPr lang="fr-FR" sz="2800" b="0" i="1" smtClean="0">
+                          <a:latin typeface="Cambria Math" panose="02040503050406030204" pitchFamily="18" charset="0"/>
+                          <a:ea typeface="Cambria Math" panose="02040503050406030204" pitchFamily="18" charset="0"/>
+                        </a:rPr>
+                        <m:t>𝜆</m:t>
+                      </m:r>
+                      <m:r>
+                        <a:rPr lang="fr-FR" sz="2800" b="0" i="1" smtClean="0">
+                          <a:latin typeface="Cambria Math" panose="02040503050406030204" pitchFamily="18" charset="0"/>
+                          <a:ea typeface="Cambria Math" panose="02040503050406030204" pitchFamily="18" charset="0"/>
+                        </a:rPr>
+                        <m:t>𝑊</m:t>
+                      </m:r>
+                      <m:r>
+                        <a:rPr lang="fr-FR" sz="2800" b="0" i="1" smtClean="0">
+                          <a:latin typeface="Cambria Math" panose="02040503050406030204" pitchFamily="18" charset="0"/>
+                          <a:ea typeface="Cambria Math" panose="02040503050406030204" pitchFamily="18" charset="0"/>
+                        </a:rPr>
+                        <m:t>𝜇</m:t>
+                      </m:r>
+                      <m:r>
+                        <a:rPr lang="fr-FR" sz="2800" b="0" i="1" smtClean="0">
+                          <a:latin typeface="Cambria Math" panose="02040503050406030204" pitchFamily="18" charset="0"/>
+                          <a:ea typeface="Cambria Math" panose="02040503050406030204" pitchFamily="18" charset="0"/>
+                        </a:rPr>
+                        <m:t>+ </m:t>
+                      </m:r>
+                      <m:r>
+                        <a:rPr lang="fr-FR" sz="2800" b="0" i="1" smtClean="0">
+                          <a:latin typeface="Cambria Math" panose="02040503050406030204" pitchFamily="18" charset="0"/>
+                          <a:ea typeface="Cambria Math" panose="02040503050406030204" pitchFamily="18" charset="0"/>
+                        </a:rPr>
+                        <m:t>𝜀</m:t>
+                      </m:r>
+                    </m:oMath>
+                  </m:oMathPara>
+                </a14:m>
+                <a:endParaRPr lang="fr-FR" sz="2800" i="1" dirty="0">
+                  <a:latin typeface="Cambria Math" panose="02040503050406030204" pitchFamily="18" charset="0"/>
+                </a:endParaRPr>
+              </a:p>
+            </p:txBody>
+          </p:sp>
+        </mc:Choice>
+        <mc:Fallback>
+          <p:sp>
+            <p:nvSpPr>
+              <p:cNvPr id="19" name="ZoneTexte 18">
+                <a:extLst>
+                  <a:ext uri="{FF2B5EF4-FFF2-40B4-BE49-F238E27FC236}">
+                    <a16:creationId xmlns:a16="http://schemas.microsoft.com/office/drawing/2014/main" id="{FE29D418-67E3-47A4-AFED-8247234C9374}"/>
+                  </a:ext>
+                </a:extLst>
+              </p:cNvPr>
+              <p:cNvSpPr txBox="1">
+                <a:spLocks noRot="1" noChangeAspect="1" noMove="1" noResize="1" noEditPoints="1" noAdjustHandles="1" noChangeArrowheads="1" noChangeShapeType="1" noTextEdit="1"/>
+              </p:cNvSpPr>
+              <p:nvPr/>
+            </p:nvSpPr>
+            <p:spPr>
+              <a:xfrm>
+                <a:off x="7378332" y="2257864"/>
+                <a:ext cx="3242105" cy="430887"/>
+              </a:xfrm>
+              <a:prstGeom prst="rect">
+                <a:avLst/>
+              </a:prstGeom>
+              <a:blipFill>
+                <a:blip r:embed="rId6"/>
+                <a:stretch>
+                  <a:fillRect/>
+                </a:stretch>
+              </a:blipFill>
+            </p:spPr>
+            <p:txBody>
+              <a:bodyPr/>
+              <a:lstStyle/>
+              <a:p>
+                <a:r>
+                  <a:rPr lang="fr-FR">
+                    <a:noFill/>
+                  </a:rPr>
+                  <a:t> </a:t>
+                </a:r>
+              </a:p>
+            </p:txBody>
+          </p:sp>
+        </mc:Fallback>
+      </mc:AlternateContent>
+      <mc:AlternateContent xmlns:mc="http://schemas.openxmlformats.org/markup-compatibility/2006">
+        <mc:Choice xmlns:a14="http://schemas.microsoft.com/office/drawing/2010/main" Requires="a14">
+          <p:sp>
+            <p:nvSpPr>
+              <p:cNvPr id="20" name="ZoneTexte 19">
+                <a:extLst>
+                  <a:ext uri="{FF2B5EF4-FFF2-40B4-BE49-F238E27FC236}">
+                    <a16:creationId xmlns:a16="http://schemas.microsoft.com/office/drawing/2014/main" id="{1D3E75DC-0CD8-4CD1-BFCA-8FFA28C7329F}"/>
+                  </a:ext>
+                </a:extLst>
+              </p:cNvPr>
+              <p:cNvSpPr txBox="1"/>
+              <p:nvPr/>
+            </p:nvSpPr>
+            <p:spPr>
+              <a:xfrm>
+                <a:off x="7378332" y="3797294"/>
+                <a:ext cx="3124894" cy="430887"/>
+              </a:xfrm>
+              <a:prstGeom prst="rect">
+                <a:avLst/>
+              </a:prstGeom>
+              <a:noFill/>
+            </p:spPr>
+            <p:txBody>
+              <a:bodyPr wrap="none" lIns="0" tIns="0" rIns="0" bIns="0" rtlCol="0">
+                <a:spAutoFit/>
+              </a:bodyPr>
+              <a:lstStyle/>
+              <a:p>
+                <a14:m>
+                  <m:oMathPara xmlns:m="http://schemas.openxmlformats.org/officeDocument/2006/math">
+                    <m:oMathParaPr>
+                      <m:jc m:val="centerGroup"/>
+                    </m:oMathParaPr>
+                    <m:oMath xmlns:m="http://schemas.openxmlformats.org/officeDocument/2006/math">
+                      <m:r>
+                        <a:rPr lang="fr-FR" sz="2800" i="1" smtClean="0">
+                          <a:latin typeface="Cambria Math" panose="02040503050406030204" pitchFamily="18" charset="0"/>
+                        </a:rPr>
+                        <m:t>𝑌</m:t>
+                      </m:r>
+                      <m:r>
+                        <a:rPr lang="fr-FR" sz="2800" i="1" smtClean="0">
+                          <a:latin typeface="Cambria Math" panose="02040503050406030204" pitchFamily="18" charset="0"/>
+                        </a:rPr>
+                        <m:t>=</m:t>
+                      </m:r>
+                      <m:r>
+                        <a:rPr lang="fr-FR" sz="2800" i="1" smtClean="0">
+                          <a:latin typeface="Cambria Math" panose="02040503050406030204" pitchFamily="18" charset="0"/>
+                        </a:rPr>
+                        <m:t>𝑋</m:t>
+                      </m:r>
+                      <m:r>
+                        <a:rPr lang="fr-FR" sz="2800" i="1" smtClean="0">
+                          <a:latin typeface="Cambria Math" panose="02040503050406030204" pitchFamily="18" charset="0"/>
+                        </a:rPr>
+                        <m:t>𝛽</m:t>
+                      </m:r>
+                      <m:r>
+                        <a:rPr lang="fr-FR" sz="2800" i="1" smtClean="0">
+                          <a:latin typeface="Cambria Math" panose="02040503050406030204" pitchFamily="18" charset="0"/>
+                        </a:rPr>
+                        <m:t>+</m:t>
+                      </m:r>
+                      <m:r>
+                        <a:rPr lang="fr-FR" sz="2800" i="1" smtClean="0">
+                          <a:latin typeface="Cambria Math" panose="02040503050406030204" pitchFamily="18" charset="0"/>
+                          <a:ea typeface="Cambria Math" panose="02040503050406030204" pitchFamily="18" charset="0"/>
+                        </a:rPr>
+                        <m:t>𝜃</m:t>
+                      </m:r>
+                      <m:r>
+                        <a:rPr lang="fr-FR" sz="2800" b="0" i="1" smtClean="0">
+                          <a:latin typeface="Cambria Math" panose="02040503050406030204" pitchFamily="18" charset="0"/>
+                          <a:ea typeface="Cambria Math" panose="02040503050406030204" pitchFamily="18" charset="0"/>
+                        </a:rPr>
+                        <m:t>𝑊𝑋</m:t>
+                      </m:r>
+                      <m:r>
+                        <a:rPr lang="fr-FR" sz="2800" b="0" i="1" smtClean="0">
+                          <a:latin typeface="Cambria Math" panose="02040503050406030204" pitchFamily="18" charset="0"/>
+                          <a:ea typeface="Cambria Math" panose="02040503050406030204" pitchFamily="18" charset="0"/>
+                        </a:rPr>
+                        <m:t>+ </m:t>
+                      </m:r>
+                      <m:r>
+                        <a:rPr lang="fr-FR" sz="2800" i="1">
+                          <a:latin typeface="Cambria Math" panose="02040503050406030204" pitchFamily="18" charset="0"/>
+                        </a:rPr>
+                        <m:t>𝜖</m:t>
+                      </m:r>
+                    </m:oMath>
+                  </m:oMathPara>
+                </a14:m>
+                <a:endParaRPr lang="fr-FR" sz="2800" i="1" dirty="0">
+                  <a:latin typeface="Cambria Math" panose="02040503050406030204" pitchFamily="18" charset="0"/>
+                </a:endParaRPr>
+              </a:p>
+            </p:txBody>
+          </p:sp>
+        </mc:Choice>
+        <mc:Fallback>
+          <p:sp>
+            <p:nvSpPr>
+              <p:cNvPr id="20" name="ZoneTexte 19">
+                <a:extLst>
+                  <a:ext uri="{FF2B5EF4-FFF2-40B4-BE49-F238E27FC236}">
+                    <a16:creationId xmlns:a16="http://schemas.microsoft.com/office/drawing/2014/main" id="{1D3E75DC-0CD8-4CD1-BFCA-8FFA28C7329F}"/>
+                  </a:ext>
+                </a:extLst>
+              </p:cNvPr>
+              <p:cNvSpPr txBox="1">
+                <a:spLocks noRot="1" noChangeAspect="1" noMove="1" noResize="1" noEditPoints="1" noAdjustHandles="1" noChangeArrowheads="1" noChangeShapeType="1" noTextEdit="1"/>
+              </p:cNvSpPr>
+              <p:nvPr/>
+            </p:nvSpPr>
+            <p:spPr>
+              <a:xfrm>
+                <a:off x="7378332" y="3797294"/>
+                <a:ext cx="3124894" cy="430887"/>
+              </a:xfrm>
+              <a:prstGeom prst="rect">
+                <a:avLst/>
+              </a:prstGeom>
+              <a:blipFill>
+                <a:blip r:embed="rId7"/>
+                <a:stretch>
+                  <a:fillRect/>
+                </a:stretch>
+              </a:blipFill>
+            </p:spPr>
+            <p:txBody>
+              <a:bodyPr/>
+              <a:lstStyle/>
+              <a:p>
+                <a:r>
+                  <a:rPr lang="fr-FR">
+                    <a:noFill/>
+                  </a:rPr>
+                  <a:t> </a:t>
+                </a:r>
+              </a:p>
+            </p:txBody>
+          </p:sp>
+        </mc:Fallback>
+      </mc:AlternateContent>
+      <mc:AlternateContent xmlns:mc="http://schemas.openxmlformats.org/markup-compatibility/2006">
+        <mc:Choice xmlns:a14="http://schemas.microsoft.com/office/drawing/2010/main" Requires="a14">
+          <p:sp>
+            <p:nvSpPr>
+              <p:cNvPr id="21" name="ZoneTexte 20">
+                <a:extLst>
+                  <a:ext uri="{FF2B5EF4-FFF2-40B4-BE49-F238E27FC236}">
+                    <a16:creationId xmlns:a16="http://schemas.microsoft.com/office/drawing/2014/main" id="{3073813A-3BFF-42E6-9753-72D3CB2ECB29}"/>
+                  </a:ext>
+                </a:extLst>
+              </p:cNvPr>
+              <p:cNvSpPr txBox="1"/>
+              <p:nvPr/>
+            </p:nvSpPr>
+            <p:spPr>
+              <a:xfrm>
+                <a:off x="3662532" y="5643626"/>
+                <a:ext cx="4430765" cy="430887"/>
+              </a:xfrm>
+              <a:prstGeom prst="rect">
+                <a:avLst/>
+              </a:prstGeom>
+              <a:noFill/>
+            </p:spPr>
+            <p:txBody>
+              <a:bodyPr wrap="none" lIns="0" tIns="0" rIns="0" bIns="0" rtlCol="0">
+                <a:spAutoFit/>
+              </a:bodyPr>
+              <a:lstStyle/>
+              <a:p>
+                <a14:m>
+                  <m:oMathPara xmlns:m="http://schemas.openxmlformats.org/officeDocument/2006/math">
+                    <m:oMathParaPr>
+                      <m:jc m:val="centerGroup"/>
+                    </m:oMathParaPr>
+                    <m:oMath xmlns:m="http://schemas.openxmlformats.org/officeDocument/2006/math">
+                      <m:r>
+                        <a:rPr lang="fr-FR" sz="2800" b="0" i="1" smtClean="0">
+                          <a:latin typeface="Cambria Math" panose="02040503050406030204" pitchFamily="18" charset="0"/>
+                        </a:rPr>
+                        <m:t>𝑌</m:t>
+                      </m:r>
+                      <m:r>
+                        <a:rPr lang="fr-FR" sz="2800" b="0" i="1" smtClean="0">
+                          <a:latin typeface="Cambria Math" panose="02040503050406030204" pitchFamily="18" charset="0"/>
+                        </a:rPr>
+                        <m:t>=</m:t>
+                      </m:r>
+                      <m:r>
+                        <a:rPr lang="fr-FR" sz="2800" b="0" i="1" smtClean="0">
+                          <a:latin typeface="Cambria Math" panose="02040503050406030204" pitchFamily="18" charset="0"/>
+                        </a:rPr>
+                        <m:t>𝜌</m:t>
+                      </m:r>
+                      <m:r>
+                        <a:rPr lang="fr-FR" sz="2800" b="0" i="1" smtClean="0">
+                          <a:latin typeface="Cambria Math" panose="02040503050406030204" pitchFamily="18" charset="0"/>
+                        </a:rPr>
+                        <m:t>𝑊𝑌</m:t>
+                      </m:r>
+                      <m:r>
+                        <a:rPr lang="fr-FR" sz="2800" b="0" i="1" smtClean="0">
+                          <a:latin typeface="Cambria Math" panose="02040503050406030204" pitchFamily="18" charset="0"/>
+                        </a:rPr>
+                        <m:t>+</m:t>
+                      </m:r>
+                      <m:r>
+                        <a:rPr lang="fr-FR" sz="2800" b="0" i="1" smtClean="0">
+                          <a:latin typeface="Cambria Math" panose="02040503050406030204" pitchFamily="18" charset="0"/>
+                        </a:rPr>
+                        <m:t>𝑋</m:t>
+                      </m:r>
+                      <m:r>
+                        <a:rPr lang="fr-FR" sz="2800" b="0" i="1" smtClean="0">
+                          <a:latin typeface="Cambria Math" panose="02040503050406030204" pitchFamily="18" charset="0"/>
+                        </a:rPr>
+                        <m:t>𝛽</m:t>
+                      </m:r>
+                      <m:r>
+                        <a:rPr lang="fr-FR" sz="2800" b="0" i="1" smtClean="0">
+                          <a:latin typeface="Cambria Math" panose="02040503050406030204" pitchFamily="18" charset="0"/>
+                        </a:rPr>
+                        <m:t>+</m:t>
+                      </m:r>
+                      <m:r>
+                        <a:rPr lang="fr-FR" sz="2800" b="0" i="1">
+                          <a:latin typeface="Cambria Math" panose="02040503050406030204" pitchFamily="18" charset="0"/>
+                          <a:ea typeface="Cambria Math" panose="02040503050406030204" pitchFamily="18" charset="0"/>
+                        </a:rPr>
+                        <m:t>𝜃</m:t>
+                      </m:r>
+                      <m:r>
+                        <a:rPr lang="fr-FR" sz="2800" b="0" i="1">
+                          <a:latin typeface="Cambria Math" panose="02040503050406030204" pitchFamily="18" charset="0"/>
+                          <a:ea typeface="Cambria Math" panose="02040503050406030204" pitchFamily="18" charset="0"/>
+                        </a:rPr>
+                        <m:t>𝑊𝑋</m:t>
+                      </m:r>
+                      <m:r>
+                        <a:rPr lang="fr-FR" sz="2800" b="0" i="1" smtClean="0">
+                          <a:latin typeface="Cambria Math" panose="02040503050406030204" pitchFamily="18" charset="0"/>
+                          <a:ea typeface="Cambria Math" panose="02040503050406030204" pitchFamily="18" charset="0"/>
+                        </a:rPr>
+                        <m:t>+ </m:t>
+                      </m:r>
+                      <m:r>
+                        <a:rPr lang="fr-FR" sz="2800" b="0" i="1">
+                          <a:latin typeface="Cambria Math" panose="02040503050406030204" pitchFamily="18" charset="0"/>
+                        </a:rPr>
+                        <m:t>𝜖</m:t>
+                      </m:r>
+                    </m:oMath>
+                  </m:oMathPara>
+                </a14:m>
+                <a:endParaRPr lang="fr-FR" sz="2800" i="1" dirty="0">
+                  <a:latin typeface="Cambria Math" panose="02040503050406030204" pitchFamily="18" charset="0"/>
+                </a:endParaRPr>
+              </a:p>
+            </p:txBody>
+          </p:sp>
+        </mc:Choice>
+        <mc:Fallback>
+          <p:sp>
+            <p:nvSpPr>
+              <p:cNvPr id="21" name="ZoneTexte 20">
+                <a:extLst>
+                  <a:ext uri="{FF2B5EF4-FFF2-40B4-BE49-F238E27FC236}">
+                    <a16:creationId xmlns:a16="http://schemas.microsoft.com/office/drawing/2014/main" id="{3073813A-3BFF-42E6-9753-72D3CB2ECB29}"/>
+                  </a:ext>
+                </a:extLst>
+              </p:cNvPr>
+              <p:cNvSpPr txBox="1">
+                <a:spLocks noRot="1" noChangeAspect="1" noMove="1" noResize="1" noEditPoints="1" noAdjustHandles="1" noChangeArrowheads="1" noChangeShapeType="1" noTextEdit="1"/>
+              </p:cNvSpPr>
+              <p:nvPr/>
+            </p:nvSpPr>
+            <p:spPr>
+              <a:xfrm>
+                <a:off x="3662532" y="5643626"/>
+                <a:ext cx="4430765" cy="430887"/>
+              </a:xfrm>
+              <a:prstGeom prst="rect">
+                <a:avLst/>
+              </a:prstGeom>
+              <a:blipFill>
+                <a:blip r:embed="rId8"/>
+                <a:stretch>
+                  <a:fillRect/>
+                </a:stretch>
+              </a:blipFill>
+            </p:spPr>
+            <p:txBody>
+              <a:bodyPr/>
+              <a:lstStyle/>
+              <a:p>
+                <a:r>
+                  <a:rPr lang="fr-FR">
+                    <a:noFill/>
+                  </a:rPr>
+                  <a:t> </a:t>
+                </a:r>
+              </a:p>
+            </p:txBody>
+          </p:sp>
+        </mc:Fallback>
+      </mc:AlternateContent>
     </p:spTree>
     <p:extLst>
       <p:ext uri="{BB962C8B-B14F-4D97-AF65-F5344CB8AC3E}">
@@ -11275,6 +12634,104 @@
           </a:p>
         </p:txBody>
       </p:sp>
+      <p:sp>
+        <p:nvSpPr>
+          <p:cNvPr id="7" name="Rectangle 6">
+            <a:extLst>
+              <a:ext uri="{FF2B5EF4-FFF2-40B4-BE49-F238E27FC236}">
+                <a16:creationId xmlns:a16="http://schemas.microsoft.com/office/drawing/2014/main" id="{A8AAC44F-4F43-4F2E-AEC3-61ACF46B9A1B}"/>
+              </a:ext>
+            </a:extLst>
+          </p:cNvPr>
+          <p:cNvSpPr/>
+          <p:nvPr/>
+        </p:nvSpPr>
+        <p:spPr>
+          <a:xfrm>
+            <a:off x="364415" y="2107319"/>
+            <a:ext cx="203931" cy="197353"/>
+          </a:xfrm>
+          <a:prstGeom prst="rect">
+            <a:avLst/>
+          </a:prstGeom>
+          <a:solidFill>
+            <a:srgbClr val="006A5A"/>
+          </a:solidFill>
+        </p:spPr>
+        <p:style>
+          <a:lnRef idx="2">
+            <a:schemeClr val="accent1">
+              <a:shade val="50000"/>
+            </a:schemeClr>
+          </a:lnRef>
+          <a:fillRef idx="1">
+            <a:schemeClr val="accent1"/>
+          </a:fillRef>
+          <a:effectRef idx="0">
+            <a:schemeClr val="accent1"/>
+          </a:effectRef>
+          <a:fontRef idx="minor">
+            <a:schemeClr val="lt1"/>
+          </a:fontRef>
+        </p:style>
+        <p:txBody>
+          <a:bodyPr rtlCol="0" anchor="ctr"/>
+          <a:lstStyle/>
+          <a:p>
+            <a:pPr algn="ctr"/>
+            <a:endParaRPr lang="fr-FR"/>
+          </a:p>
+        </p:txBody>
+      </p:sp>
+      <p:sp>
+        <p:nvSpPr>
+          <p:cNvPr id="9" name="Rectangle 8">
+            <a:extLst>
+              <a:ext uri="{FF2B5EF4-FFF2-40B4-BE49-F238E27FC236}">
+                <a16:creationId xmlns:a16="http://schemas.microsoft.com/office/drawing/2014/main" id="{80DCC880-D582-4818-951D-7060A46EC3DC}"/>
+              </a:ext>
+            </a:extLst>
+          </p:cNvPr>
+          <p:cNvSpPr/>
+          <p:nvPr/>
+        </p:nvSpPr>
+        <p:spPr>
+          <a:xfrm>
+            <a:off x="364415" y="4355976"/>
+            <a:ext cx="203931" cy="197353"/>
+          </a:xfrm>
+          <a:prstGeom prst="rect">
+            <a:avLst/>
+          </a:prstGeom>
+          <a:solidFill>
+            <a:srgbClr val="006A5A"/>
+          </a:solidFill>
+        </p:spPr>
+        <p:style>
+          <a:lnRef idx="2">
+            <a:schemeClr val="accent1">
+              <a:shade val="50000"/>
+            </a:schemeClr>
+          </a:lnRef>
+          <a:fillRef idx="1">
+            <a:schemeClr val="accent1"/>
+          </a:fillRef>
+          <a:effectRef idx="0">
+            <a:schemeClr val="accent1"/>
+          </a:effectRef>
+          <a:fontRef idx="minor">
+            <a:schemeClr val="lt1"/>
+          </a:fontRef>
+        </p:style>
+        <p:txBody>
+          <a:bodyPr rtlCol="0" anchor="ctr"/>
+          <a:lstStyle/>
+          <a:p>
+            <a:pPr algn="ctr"/>
+            <a:endParaRPr lang="fr-FR"/>
+          </a:p>
+        </p:txBody>
+      </p:sp>
     </p:spTree>
     <p:extLst>
       <p:ext uri="{BB962C8B-B14F-4D97-AF65-F5344CB8AC3E}">
@@ -11378,25 +12835,7 @@
                 </a:solidFill>
                 <a:latin typeface="Gill Sans MT" panose="020B0502020104020203" pitchFamily="34" charset="0"/>
               </a:rPr>
-              <a:t>4.2. Tests (</a:t>
-            </a:r>
-            <a:r>
-              <a:rPr lang="fr-FR" sz="3600" b="1" dirty="0">
-                <a:solidFill>
-                  <a:srgbClr val="FF0000"/>
-                </a:solidFill>
-                <a:latin typeface="Gill Sans MT" panose="020B0502020104020203" pitchFamily="34" charset="0"/>
-              </a:rPr>
-              <a:t>Richard</a:t>
-            </a:r>
-            <a:r>
-              <a:rPr lang="fr-FR" sz="3600" b="1" dirty="0">
-                <a:solidFill>
-                  <a:schemeClr val="bg1"/>
-                </a:solidFill>
-                <a:latin typeface="Gill Sans MT" panose="020B0502020104020203" pitchFamily="34" charset="0"/>
-              </a:rPr>
-              <a:t>)</a:t>
+              <a:t>4.2. Résultats des tests</a:t>
             </a:r>
           </a:p>
         </p:txBody>
@@ -11440,6 +12879,250 @@
           </a:prstGeom>
         </p:spPr>
       </p:pic>
+      <p:sp>
+        <p:nvSpPr>
+          <p:cNvPr id="5" name="ZoneTexte 4">
+            <a:extLst>
+              <a:ext uri="{FF2B5EF4-FFF2-40B4-BE49-F238E27FC236}">
+                <a16:creationId xmlns:a16="http://schemas.microsoft.com/office/drawing/2014/main" id="{704B0C7A-5B25-4AE4-8E8E-19A15F8207F7}"/>
+              </a:ext>
+            </a:extLst>
+          </p:cNvPr>
+          <p:cNvSpPr txBox="1"/>
+          <p:nvPr/>
+        </p:nvSpPr>
+        <p:spPr>
+          <a:xfrm>
+            <a:off x="1289370" y="1743281"/>
+            <a:ext cx="2657680" cy="523220"/>
+          </a:xfrm>
+          <a:prstGeom prst="rect">
+            <a:avLst/>
+          </a:prstGeom>
+          <a:noFill/>
+        </p:spPr>
+        <p:txBody>
+          <a:bodyPr wrap="square" rtlCol="0">
+            <a:spAutoFit/>
+          </a:bodyPr>
+          <a:lstStyle/>
+          <a:p>
+            <a:r>
+              <a:rPr lang="fr-FR" sz="2800" b="1" dirty="0">
+                <a:latin typeface="Gill Sans MT" panose="020B0502020104020203" pitchFamily="34" charset="0"/>
+              </a:rPr>
+              <a:t>Test de Moran</a:t>
+            </a:r>
+          </a:p>
+        </p:txBody>
+      </p:sp>
+      <p:pic>
+        <p:nvPicPr>
+          <p:cNvPr id="8" name="Image 7">
+            <a:extLst>
+              <a:ext uri="{FF2B5EF4-FFF2-40B4-BE49-F238E27FC236}">
+                <a16:creationId xmlns:a16="http://schemas.microsoft.com/office/drawing/2014/main" id="{08FA61C8-F3E5-4D0E-8AC3-E41D36977808}"/>
+              </a:ext>
+            </a:extLst>
+          </p:cNvPr>
+          <p:cNvPicPr>
+            <a:picLocks noChangeAspect="1"/>
+          </p:cNvPicPr>
+          <p:nvPr/>
+        </p:nvPicPr>
+        <p:blipFill>
+          <a:blip r:embed="rId4"/>
+          <a:stretch>
+            <a:fillRect/>
+          </a:stretch>
+        </p:blipFill>
+        <p:spPr>
+          <a:xfrm>
+            <a:off x="1470782" y="2310037"/>
+            <a:ext cx="7842653" cy="1341457"/>
+          </a:xfrm>
+          <a:prstGeom prst="rect">
+            <a:avLst/>
+          </a:prstGeom>
+        </p:spPr>
+      </p:pic>
+      <p:pic>
+        <p:nvPicPr>
+          <p:cNvPr id="10" name="Image 9">
+            <a:extLst>
+              <a:ext uri="{FF2B5EF4-FFF2-40B4-BE49-F238E27FC236}">
+                <a16:creationId xmlns:a16="http://schemas.microsoft.com/office/drawing/2014/main" id="{C796B334-C348-4ACD-8FBD-AEDD7BFB61B0}"/>
+              </a:ext>
+            </a:extLst>
+          </p:cNvPr>
+          <p:cNvPicPr>
+            <a:picLocks noChangeAspect="1"/>
+          </p:cNvPicPr>
+          <p:nvPr/>
+        </p:nvPicPr>
+        <p:blipFill>
+          <a:blip r:embed="rId5"/>
+          <a:stretch>
+            <a:fillRect/>
+          </a:stretch>
+        </p:blipFill>
+        <p:spPr>
+          <a:xfrm>
+            <a:off x="3108218" y="4659585"/>
+            <a:ext cx="5226637" cy="2261215"/>
+          </a:xfrm>
+          <a:prstGeom prst="rect">
+            <a:avLst/>
+          </a:prstGeom>
+        </p:spPr>
+      </p:pic>
+      <p:sp>
+        <p:nvSpPr>
+          <p:cNvPr id="11" name="ZoneTexte 10">
+            <a:extLst>
+              <a:ext uri="{FF2B5EF4-FFF2-40B4-BE49-F238E27FC236}">
+                <a16:creationId xmlns:a16="http://schemas.microsoft.com/office/drawing/2014/main" id="{877CA3D4-7B64-4FB5-A37A-84CBA3A5AEEC}"/>
+              </a:ext>
+            </a:extLst>
+          </p:cNvPr>
+          <p:cNvSpPr txBox="1"/>
+          <p:nvPr/>
+        </p:nvSpPr>
+        <p:spPr>
+          <a:xfrm>
+            <a:off x="1289369" y="4136365"/>
+            <a:ext cx="3748601" cy="523220"/>
+          </a:xfrm>
+          <a:prstGeom prst="rect">
+            <a:avLst/>
+          </a:prstGeom>
+          <a:noFill/>
+        </p:spPr>
+        <p:txBody>
+          <a:bodyPr wrap="square" rtlCol="0">
+            <a:spAutoFit/>
+          </a:bodyPr>
+          <a:lstStyle/>
+          <a:p>
+            <a:r>
+              <a:rPr lang="fr-FR" sz="2800" b="1" dirty="0">
+                <a:latin typeface="Gill Sans MT" panose="020B0502020104020203" pitchFamily="34" charset="0"/>
+              </a:rPr>
+              <a:t>Tests de </a:t>
+            </a:r>
+            <a:r>
+              <a:rPr lang="fr-FR" sz="2800" b="1" dirty="0" err="1">
+                <a:latin typeface="Gill Sans MT" panose="020B0502020104020203" pitchFamily="34" charset="0"/>
+              </a:rPr>
+              <a:t>Rao’s</a:t>
+            </a:r>
+            <a:r>
+              <a:rPr lang="fr-FR" sz="2800" b="1" dirty="0">
+                <a:latin typeface="Gill Sans MT" panose="020B0502020104020203" pitchFamily="34" charset="0"/>
+              </a:rPr>
+              <a:t> score</a:t>
+            </a:r>
+          </a:p>
+        </p:txBody>
+      </p:sp>
+      <p:sp>
+        <p:nvSpPr>
+          <p:cNvPr id="12" name="Rectangle 11">
+            <a:extLst>
+              <a:ext uri="{FF2B5EF4-FFF2-40B4-BE49-F238E27FC236}">
+                <a16:creationId xmlns:a16="http://schemas.microsoft.com/office/drawing/2014/main" id="{0CEA0246-CBE8-4B01-AE2A-041B3EB8346B}"/>
+              </a:ext>
+            </a:extLst>
+          </p:cNvPr>
+          <p:cNvSpPr/>
+          <p:nvPr/>
+        </p:nvSpPr>
+        <p:spPr>
+          <a:xfrm>
+            <a:off x="1085439" y="1906214"/>
+            <a:ext cx="203931" cy="197353"/>
+          </a:xfrm>
+          <a:prstGeom prst="rect">
+            <a:avLst/>
+          </a:prstGeom>
+          <a:solidFill>
+            <a:srgbClr val="006A5A"/>
+          </a:solidFill>
+        </p:spPr>
+        <p:style>
+          <a:lnRef idx="2">
+            <a:schemeClr val="accent1">
+              <a:shade val="50000"/>
+            </a:schemeClr>
+          </a:lnRef>
+          <a:fillRef idx="1">
+            <a:schemeClr val="accent1"/>
+          </a:fillRef>
+          <a:effectRef idx="0">
+            <a:schemeClr val="accent1"/>
+          </a:effectRef>
+          <a:fontRef idx="minor">
+            <a:schemeClr val="lt1"/>
+          </a:fontRef>
+        </p:style>
+        <p:txBody>
+          <a:bodyPr rtlCol="0" anchor="ctr"/>
+          <a:lstStyle/>
+          <a:p>
+            <a:pPr algn="ctr"/>
+            <a:endParaRPr lang="fr-FR"/>
+          </a:p>
+        </p:txBody>
+      </p:sp>
+      <p:sp>
+        <p:nvSpPr>
+          <p:cNvPr id="13" name="Rectangle 12">
+            <a:extLst>
+              <a:ext uri="{FF2B5EF4-FFF2-40B4-BE49-F238E27FC236}">
+                <a16:creationId xmlns:a16="http://schemas.microsoft.com/office/drawing/2014/main" id="{6668954D-80E0-460A-8E90-45E67C0C68D4}"/>
+              </a:ext>
+            </a:extLst>
+          </p:cNvPr>
+          <p:cNvSpPr/>
+          <p:nvPr/>
+        </p:nvSpPr>
+        <p:spPr>
+          <a:xfrm>
+            <a:off x="1085438" y="4312995"/>
+            <a:ext cx="203931" cy="197353"/>
+          </a:xfrm>
+          <a:prstGeom prst="rect">
+            <a:avLst/>
+          </a:prstGeom>
+          <a:solidFill>
+            <a:srgbClr val="006A5A"/>
+          </a:solidFill>
+        </p:spPr>
+        <p:style>
+          <a:lnRef idx="2">
+            <a:schemeClr val="accent1">
+              <a:shade val="50000"/>
+            </a:schemeClr>
+          </a:lnRef>
+          <a:fillRef idx="1">
+            <a:schemeClr val="accent1"/>
+          </a:fillRef>
+          <a:effectRef idx="0">
+            <a:schemeClr val="accent1"/>
+          </a:effectRef>
+          <a:fontRef idx="minor">
+            <a:schemeClr val="lt1"/>
+          </a:fontRef>
+        </p:style>
+        <p:txBody>
+          <a:bodyPr rtlCol="0" anchor="ctr"/>
+          <a:lstStyle/>
+          <a:p>
+            <a:pPr algn="ctr"/>
+            <a:endParaRPr lang="fr-FR"/>
+          </a:p>
+        </p:txBody>
+      </p:sp>
     </p:spTree>
     <p:extLst>
       <p:ext uri="{BB962C8B-B14F-4D97-AF65-F5344CB8AC3E}">
@@ -11543,25 +13226,7 @@
                 </a:solidFill>
                 <a:latin typeface="Gill Sans MT" panose="020B0502020104020203" pitchFamily="34" charset="0"/>
               </a:rPr>
-              <a:t>4.3. Comparaison des modèles (</a:t>
-            </a:r>
-            <a:r>
-              <a:rPr lang="fr-FR" sz="3600" b="1" dirty="0">
-                <a:solidFill>
-                  <a:srgbClr val="FF0000"/>
-                </a:solidFill>
-                <a:latin typeface="Gill Sans MT" panose="020B0502020104020203" pitchFamily="34" charset="0"/>
-              </a:rPr>
-              <a:t>Richard</a:t>
-            </a:r>
-            <a:r>
-              <a:rPr lang="fr-FR" sz="3600" b="1" dirty="0">
-                <a:solidFill>
-                  <a:schemeClr val="bg1"/>
-                </a:solidFill>
-                <a:latin typeface="Gill Sans MT" panose="020B0502020104020203" pitchFamily="34" charset="0"/>
-              </a:rPr>
-              <a:t>)</a:t>
+              <a:t>4.3. Comparaison des modèles</a:t>
             </a:r>
           </a:p>
         </p:txBody>
@@ -11605,6 +13270,85 @@
           </a:prstGeom>
         </p:spPr>
       </p:pic>
+      <p:pic>
+        <p:nvPicPr>
+          <p:cNvPr id="6" name="Image 5">
+            <a:extLst>
+              <a:ext uri="{FF2B5EF4-FFF2-40B4-BE49-F238E27FC236}">
+                <a16:creationId xmlns:a16="http://schemas.microsoft.com/office/drawing/2014/main" id="{2AB6183B-8184-4CBD-84AD-63536C0BD4D0}"/>
+              </a:ext>
+            </a:extLst>
+          </p:cNvPr>
+          <p:cNvPicPr>
+            <a:picLocks noChangeAspect="1"/>
+          </p:cNvPicPr>
+          <p:nvPr/>
+        </p:nvPicPr>
+        <p:blipFill>
+          <a:blip r:embed="rId4"/>
+          <a:stretch>
+            <a:fillRect/>
+          </a:stretch>
+        </p:blipFill>
+        <p:spPr>
+          <a:xfrm>
+            <a:off x="3197112" y="1694988"/>
+            <a:ext cx="5473242" cy="3765098"/>
+          </a:xfrm>
+          <a:prstGeom prst="rect">
+            <a:avLst/>
+          </a:prstGeom>
+        </p:spPr>
+      </p:pic>
+      <p:sp>
+        <p:nvSpPr>
+          <p:cNvPr id="7" name="ZoneTexte 6">
+            <a:extLst>
+              <a:ext uri="{FF2B5EF4-FFF2-40B4-BE49-F238E27FC236}">
+                <a16:creationId xmlns:a16="http://schemas.microsoft.com/office/drawing/2014/main" id="{95353583-A0C2-44EC-B63F-7CD626340E77}"/>
+              </a:ext>
+            </a:extLst>
+          </p:cNvPr>
+          <p:cNvSpPr txBox="1"/>
+          <p:nvPr/>
+        </p:nvSpPr>
+        <p:spPr>
+          <a:xfrm>
+            <a:off x="799278" y="5636826"/>
+            <a:ext cx="10268909" cy="461665"/>
+          </a:xfrm>
+          <a:prstGeom prst="rect">
+            <a:avLst/>
+          </a:prstGeom>
+          <a:noFill/>
+        </p:spPr>
+        <p:txBody>
+          <a:bodyPr wrap="square" rtlCol="0">
+            <a:spAutoFit/>
+          </a:bodyPr>
+          <a:lstStyle/>
+          <a:p>
+            <a:r>
+              <a:rPr lang="fr-FR" sz="2400" dirty="0">
+                <a:latin typeface="Gill Sans MT" panose="020B0502020104020203" pitchFamily="34" charset="0"/>
+              </a:rPr>
+              <a:t>Avec un AIC plus faible, le modèle </a:t>
+            </a:r>
+            <a:r>
+              <a:rPr lang="fr-FR" sz="2400" b="1" dirty="0">
+                <a:latin typeface="Gill Sans MT" panose="020B0502020104020203" pitchFamily="34" charset="0"/>
+              </a:rPr>
+              <a:t>SDM</a:t>
+            </a:r>
+            <a:r>
+              <a:rPr lang="fr-FR" sz="2400" dirty="0">
+                <a:latin typeface="Gill Sans MT" panose="020B0502020104020203" pitchFamily="34" charset="0"/>
+              </a:rPr>
+              <a:t> ressort comme étant le meilleur modèle </a:t>
+            </a:r>
+          </a:p>
+        </p:txBody>
+      </p:sp>
     </p:spTree>
     <p:extLst>
       <p:ext uri="{BB962C8B-B14F-4D97-AF65-F5344CB8AC3E}">
@@ -11708,25 +13452,7 @@
                 </a:solidFill>
                 <a:latin typeface="Gill Sans MT" panose="020B0502020104020203" pitchFamily="34" charset="0"/>
               </a:rPr>
-              <a:t>4.4. Résultats du modèle final (</a:t>
-            </a:r>
-            <a:r>
-              <a:rPr lang="fr-FR" sz="3600" b="1" dirty="0">
-                <a:solidFill>
-                  <a:srgbClr val="FF0000"/>
-                </a:solidFill>
-                <a:latin typeface="Gill Sans MT" panose="020B0502020104020203" pitchFamily="34" charset="0"/>
-              </a:rPr>
-              <a:t>Richard</a:t>
-            </a:r>
-            <a:r>
-              <a:rPr lang="fr-FR" sz="3600" b="1" dirty="0">
-                <a:solidFill>
-                  <a:schemeClr val="bg1"/>
-                </a:solidFill>
-                <a:latin typeface="Gill Sans MT" panose="020B0502020104020203" pitchFamily="34" charset="0"/>
-              </a:rPr>
-              <a:t>)</a:t>
+              <a:t>4.4. Résultats du modèle final</a:t>
             </a:r>
           </a:p>
         </p:txBody>
@@ -11764,6 +13490,36 @@
           <a:xfrm>
             <a:off x="11078692" y="266700"/>
             <a:ext cx="1170459" cy="1170459"/>
+          </a:xfrm>
+          <a:prstGeom prst="rect">
+            <a:avLst/>
+          </a:prstGeom>
+        </p:spPr>
+      </p:pic>
+      <p:pic>
+        <p:nvPicPr>
+          <p:cNvPr id="6" name="Image 5">
+            <a:extLst>
+              <a:ext uri="{FF2B5EF4-FFF2-40B4-BE49-F238E27FC236}">
+                <a16:creationId xmlns:a16="http://schemas.microsoft.com/office/drawing/2014/main" id="{D2AF2CAB-204D-446D-8D79-22F35F4C799C}"/>
+              </a:ext>
+            </a:extLst>
+          </p:cNvPr>
+          <p:cNvPicPr>
+            <a:picLocks noChangeAspect="1"/>
+          </p:cNvPicPr>
+          <p:nvPr/>
+        </p:nvPicPr>
+        <p:blipFill>
+          <a:blip r:embed="rId4"/>
+          <a:stretch>
+            <a:fillRect/>
+          </a:stretch>
+        </p:blipFill>
+        <p:spPr>
+          <a:xfrm>
+            <a:off x="1145428" y="1517834"/>
+            <a:ext cx="9506439" cy="4807197"/>
           </a:xfrm>
           <a:prstGeom prst="rect">
             <a:avLst/>
@@ -11791,7 +13547,7 @@
         <p:cNvPr id="1" name="">
           <a:extLst>
             <a:ext uri="{FF2B5EF4-FFF2-40B4-BE49-F238E27FC236}">
-              <a16:creationId xmlns:a16="http://schemas.microsoft.com/office/drawing/2014/main" id="{D0883E41-4E42-7945-61B6-CAD013D6BEFE}"/>
+              <a16:creationId xmlns:a16="http://schemas.microsoft.com/office/drawing/2014/main" id="{DE57E7BF-7E63-CDCE-3B39-D62386786CFC}"/>
             </a:ext>
           </a:extLst>
         </p:cNvPr>
@@ -11811,7 +13567,7 @@
           <p:cNvPr id="2" name="Espace réservé du numéro de diapositive 1">
             <a:extLst>
               <a:ext uri="{FF2B5EF4-FFF2-40B4-BE49-F238E27FC236}">
-                <a16:creationId xmlns:a16="http://schemas.microsoft.com/office/drawing/2014/main" id="{18374531-05B7-D43C-7ECE-E3551515F7E6}"/>
+                <a16:creationId xmlns:a16="http://schemas.microsoft.com/office/drawing/2014/main" id="{828E9B66-400B-46FD-9F1E-58BE96CF638D}"/>
               </a:ext>
             </a:extLst>
           </p:cNvPr>
@@ -11841,7 +13597,7 @@
           <p:cNvPr id="3" name="ZoneTexte 2">
             <a:extLst>
               <a:ext uri="{FF2B5EF4-FFF2-40B4-BE49-F238E27FC236}">
-                <a16:creationId xmlns:a16="http://schemas.microsoft.com/office/drawing/2014/main" id="{871FD580-3A6E-B316-8BC7-9CB96F2D45AA}"/>
+                <a16:creationId xmlns:a16="http://schemas.microsoft.com/office/drawing/2014/main" id="{53AFD727-8ADD-A2C1-1CD7-40226AF81120}"/>
               </a:ext>
             </a:extLst>
           </p:cNvPr>
@@ -11873,17 +13629,279 @@
                 </a:solidFill>
                 <a:latin typeface="Gill Sans MT" panose="020B0502020104020203" pitchFamily="34" charset="0"/>
               </a:rPr>
-              <a:t>4.5. Importance des variables (</a:t>
-            </a:r>
-            <a:r>
-              <a:rPr lang="fr-FR" sz="3600" b="1" dirty="0">
-                <a:solidFill>
-                  <a:srgbClr val="FF0000"/>
-                </a:solidFill>
-                <a:latin typeface="Gill Sans MT" panose="020B0502020104020203" pitchFamily="34" charset="0"/>
-              </a:rPr>
-              <a:t>Richard</a:t>
-            </a:r>
+              <a:t>4.4. Résultats du modèle final</a:t>
+            </a:r>
+          </a:p>
+        </p:txBody>
+      </p:sp>
+      <p:pic>
+        <p:nvPicPr>
+          <p:cNvPr id="4" name="Graphique 3" descr="Flèches de chevron">
+            <a:extLst>
+              <a:ext uri="{FF2B5EF4-FFF2-40B4-BE49-F238E27FC236}">
+                <a16:creationId xmlns:a16="http://schemas.microsoft.com/office/drawing/2014/main" id="{F75BEB96-AC2C-D93F-ED0D-23CE9E5050D3}"/>
+              </a:ext>
+            </a:extLst>
+          </p:cNvPr>
+          <p:cNvPicPr>
+            <a:picLocks noChangeAspect="1"/>
+          </p:cNvPicPr>
+          <p:nvPr/>
+        </p:nvPicPr>
+        <p:blipFill>
+          <a:blip r:embed="rId2">
+            <a:extLst>
+              <a:ext uri="{28A0092B-C50C-407E-A947-70E740481C1C}">
+                <a14:useLocalDpi xmlns:a14="http://schemas.microsoft.com/office/drawing/2010/main" val="0"/>
+              </a:ext>
+              <a:ext uri="{96DAC541-7B7A-43D3-8B79-37D633B846F1}">
+                <asvg:svgBlip xmlns:asvg="http://schemas.microsoft.com/office/drawing/2016/SVG/main" r:embed="rId3"/>
+              </a:ext>
+            </a:extLst>
+          </a:blip>
+          <a:stretch>
+            <a:fillRect/>
+          </a:stretch>
+        </p:blipFill>
+        <p:spPr>
+          <a:xfrm>
+            <a:off x="11078692" y="266700"/>
+            <a:ext cx="1170459" cy="1170459"/>
+          </a:xfrm>
+          <a:prstGeom prst="rect">
+            <a:avLst/>
+          </a:prstGeom>
+        </p:spPr>
+      </p:pic>
+      <p:pic>
+        <p:nvPicPr>
+          <p:cNvPr id="7" name="Image 6">
+            <a:extLst>
+              <a:ext uri="{FF2B5EF4-FFF2-40B4-BE49-F238E27FC236}">
+                <a16:creationId xmlns:a16="http://schemas.microsoft.com/office/drawing/2014/main" id="{85E00EB5-86B6-4B6D-81B2-AB61329BBD07}"/>
+              </a:ext>
+            </a:extLst>
+          </p:cNvPr>
+          <p:cNvPicPr>
+            <a:picLocks noChangeAspect="1"/>
+          </p:cNvPicPr>
+          <p:nvPr/>
+        </p:nvPicPr>
+        <p:blipFill>
+          <a:blip r:embed="rId4"/>
+          <a:stretch>
+            <a:fillRect/>
+          </a:stretch>
+        </p:blipFill>
+        <p:spPr>
+          <a:xfrm>
+            <a:off x="2074958" y="2153004"/>
+            <a:ext cx="7029571" cy="1754576"/>
+          </a:xfrm>
+          <a:prstGeom prst="rect">
+            <a:avLst/>
+          </a:prstGeom>
+        </p:spPr>
+      </p:pic>
+      <mc:AlternateContent xmlns:mc="http://schemas.openxmlformats.org/markup-compatibility/2006">
+        <mc:Choice xmlns:a14="http://schemas.microsoft.com/office/drawing/2010/main" Requires="a14">
+          <p:sp>
+            <p:nvSpPr>
+              <p:cNvPr id="8" name="ZoneTexte 7">
+                <a:extLst>
+                  <a:ext uri="{FF2B5EF4-FFF2-40B4-BE49-F238E27FC236}">
+                    <a16:creationId xmlns:a16="http://schemas.microsoft.com/office/drawing/2014/main" id="{536DA113-D0B1-43AB-BA86-5935A376D619}"/>
+                  </a:ext>
+                </a:extLst>
+              </p:cNvPr>
+              <p:cNvSpPr txBox="1"/>
+              <p:nvPr/>
+            </p:nvSpPr>
+            <p:spPr>
+              <a:xfrm>
+                <a:off x="1170957" y="4238099"/>
+                <a:ext cx="10387321" cy="1200329"/>
+              </a:xfrm>
+              <a:prstGeom prst="rect">
+                <a:avLst/>
+              </a:prstGeom>
+              <a:noFill/>
+            </p:spPr>
+            <p:txBody>
+              <a:bodyPr wrap="square" rtlCol="0">
+                <a:spAutoFit/>
+              </a:bodyPr>
+              <a:lstStyle/>
+              <a:p>
+                <a:pPr algn="just"/>
+                <a:r>
+                  <a:rPr lang="fr-FR" sz="2400" dirty="0">
+                    <a:latin typeface="Gill Sans MT" panose="020B0502020104020203" pitchFamily="34" charset="0"/>
+                  </a:rPr>
+                  <a:t>Le coefficient </a:t>
+                </a:r>
+                <a14:m>
+                  <m:oMath xmlns:m="http://schemas.openxmlformats.org/officeDocument/2006/math">
+                    <m:r>
+                      <a:rPr lang="fr-FR" sz="2400" b="1" i="1" smtClean="0">
+                        <a:latin typeface="Cambria Math" panose="02040503050406030204" pitchFamily="18" charset="0"/>
+                        <a:ea typeface="Cambria Math" panose="02040503050406030204" pitchFamily="18" charset="0"/>
+                      </a:rPr>
+                      <m:t>𝝆</m:t>
+                    </m:r>
+                  </m:oMath>
+                </a14:m>
+                <a:r>
+                  <a:rPr lang="fr-FR" sz="2400" dirty="0">
+                    <a:latin typeface="Gill Sans MT" panose="020B0502020104020203" pitchFamily="34" charset="0"/>
+                  </a:rPr>
+                  <a:t> du modèle SDM confirme l’existence d’un effet spatial significatif, indiquant une interdépendance dans le taux de consultations entre communes voisines</a:t>
+                </a:r>
+              </a:p>
+            </p:txBody>
+          </p:sp>
+        </mc:Choice>
+        <mc:Fallback>
+          <p:sp>
+            <p:nvSpPr>
+              <p:cNvPr id="8" name="ZoneTexte 7">
+                <a:extLst>
+                  <a:ext uri="{FF2B5EF4-FFF2-40B4-BE49-F238E27FC236}">
+                    <a16:creationId xmlns:a16="http://schemas.microsoft.com/office/drawing/2014/main" id="{536DA113-D0B1-43AB-BA86-5935A376D619}"/>
+                  </a:ext>
+                </a:extLst>
+              </p:cNvPr>
+              <p:cNvSpPr txBox="1">
+                <a:spLocks noRot="1" noChangeAspect="1" noMove="1" noResize="1" noEditPoints="1" noAdjustHandles="1" noChangeArrowheads="1" noChangeShapeType="1" noTextEdit="1"/>
+              </p:cNvSpPr>
+              <p:nvPr/>
+            </p:nvSpPr>
+            <p:spPr>
+              <a:xfrm>
+                <a:off x="1170957" y="4238099"/>
+                <a:ext cx="10387321" cy="1200329"/>
+              </a:xfrm>
+              <a:prstGeom prst="rect">
+                <a:avLst/>
+              </a:prstGeom>
+              <a:blipFill>
+                <a:blip r:embed="rId5"/>
+                <a:stretch>
+                  <a:fillRect l="-880" t="-4061" r="-939" b="-10660"/>
+                </a:stretch>
+              </a:blipFill>
+            </p:spPr>
+            <p:txBody>
+              <a:bodyPr/>
+              <a:lstStyle/>
+              <a:p>
+                <a:r>
+                  <a:rPr lang="fr-FR">
+                    <a:noFill/>
+                  </a:rPr>
+                  <a:t> </a:t>
+                </a:r>
+              </a:p>
+            </p:txBody>
+          </p:sp>
+        </mc:Fallback>
+      </mc:AlternateContent>
+    </p:spTree>
+    <p:extLst>
+      <p:ext uri="{BB962C8B-B14F-4D97-AF65-F5344CB8AC3E}">
+        <p14:creationId xmlns:p14="http://schemas.microsoft.com/office/powerpoint/2010/main" val="3022964590"/>
+      </p:ext>
+    </p:extLst>
+  </p:cSld>
+  <p:clrMapOvr>
+    <a:masterClrMapping/>
+  </p:clrMapOvr>
+</p:sld>
+</file>
+
+<file path=ppt/slides/slide28.xml><?xml version="1.0" encoding="utf-8"?>
+<p:sld xmlns:a="http://schemas.openxmlformats.org/drawingml/2006/main" xmlns:r="http://schemas.openxmlformats.org/officeDocument/2006/relationships" xmlns:p="http://schemas.openxmlformats.org/presentationml/2006/main">
+  <p:cSld>
+    <p:spTree>
+      <p:nvGrpSpPr>
+        <p:cNvPr id="1" name="">
+          <a:extLst>
+            <a:ext uri="{FF2B5EF4-FFF2-40B4-BE49-F238E27FC236}">
+              <a16:creationId xmlns:a16="http://schemas.microsoft.com/office/drawing/2014/main" id="{D0883E41-4E42-7945-61B6-CAD013D6BEFE}"/>
+            </a:ext>
+          </a:extLst>
+        </p:cNvPr>
+        <p:cNvGrpSpPr/>
+        <p:nvPr/>
+      </p:nvGrpSpPr>
+      <p:grpSpPr>
+        <a:xfrm>
+          <a:off x="0" y="0"/>
+          <a:ext cx="0" cy="0"/>
+          <a:chOff x="0" y="0"/>
+          <a:chExt cx="0" cy="0"/>
+        </a:xfrm>
+      </p:grpSpPr>
+      <p:sp>
+        <p:nvSpPr>
+          <p:cNvPr id="2" name="Espace réservé du numéro de diapositive 1">
+            <a:extLst>
+              <a:ext uri="{FF2B5EF4-FFF2-40B4-BE49-F238E27FC236}">
+                <a16:creationId xmlns:a16="http://schemas.microsoft.com/office/drawing/2014/main" id="{18374531-05B7-D43C-7ECE-E3551515F7E6}"/>
+              </a:ext>
+            </a:extLst>
+          </p:cNvPr>
+          <p:cNvSpPr>
+            <a:spLocks noGrp="1"/>
+          </p:cNvSpPr>
+          <p:nvPr>
+            <p:ph type="sldNum" sz="quarter" idx="4"/>
+          </p:nvPr>
+        </p:nvSpPr>
+        <p:spPr/>
+        <p:txBody>
+          <a:bodyPr/>
+          <a:lstStyle/>
+          <a:p>
+            <a:fld id="{F546B7B7-7D14-4795-A998-350CFB2BDD43}" type="slidenum">
+              <a:rPr lang="fr-FR" smtClean="0"/>
+              <a:pPr/>
+              <a:t>28</a:t>
+            </a:fld>
+            <a:endParaRPr lang="fr-FR"/>
+          </a:p>
+        </p:txBody>
+      </p:sp>
+      <p:sp>
+        <p:nvSpPr>
+          <p:cNvPr id="3" name="ZoneTexte 2">
+            <a:extLst>
+              <a:ext uri="{FF2B5EF4-FFF2-40B4-BE49-F238E27FC236}">
+                <a16:creationId xmlns:a16="http://schemas.microsoft.com/office/drawing/2014/main" id="{871FD580-3A6E-B316-8BC7-9CB96F2D45AA}"/>
+              </a:ext>
+            </a:extLst>
+          </p:cNvPr>
+          <p:cNvSpPr txBox="1"/>
+          <p:nvPr/>
+        </p:nvSpPr>
+        <p:spPr>
+          <a:xfrm>
+            <a:off x="2" y="532969"/>
+            <a:ext cx="12191999" cy="646331"/>
+          </a:xfrm>
+          <a:prstGeom prst="rect">
+            <a:avLst/>
+          </a:prstGeom>
+          <a:solidFill>
+            <a:srgbClr val="006A5A"/>
+          </a:solidFill>
+        </p:spPr>
+        <p:txBody>
+          <a:bodyPr wrap="square" rtlCol="0">
+            <a:spAutoFit/>
+          </a:bodyPr>
+          <a:lstStyle/>
+          <a:p>
             <a:r>
               <a:rPr lang="fr-FR" sz="3600" b="1" dirty="0">
                 <a:solidFill>
@@ -11891,7 +13909,7 @@
                 </a:solidFill>
                 <a:latin typeface="Gill Sans MT" panose="020B0502020104020203" pitchFamily="34" charset="0"/>
               </a:rPr>
-              <a:t>)</a:t>
+              <a:t>4.5. Importance des variables</a:t>
             </a:r>
           </a:p>
         </p:txBody>
@@ -11963,14 +13981,52 @@
         </p:blipFill>
         <p:spPr>
           <a:xfrm>
-            <a:off x="185050" y="1965074"/>
-            <a:ext cx="6958563" cy="4004928"/>
+            <a:off x="592910" y="1261182"/>
+            <a:ext cx="10182537" cy="4106805"/>
           </a:xfrm>
           <a:prstGeom prst="rect">
             <a:avLst/>
           </a:prstGeom>
         </p:spPr>
       </p:pic>
+      <p:sp>
+        <p:nvSpPr>
+          <p:cNvPr id="7" name="ZoneTexte 6">
+            <a:extLst>
+              <a:ext uri="{FF2B5EF4-FFF2-40B4-BE49-F238E27FC236}">
+                <a16:creationId xmlns:a16="http://schemas.microsoft.com/office/drawing/2014/main" id="{AF25388E-5C29-435C-B76B-DCAE60ECA572}"/>
+              </a:ext>
+            </a:extLst>
+          </p:cNvPr>
+          <p:cNvSpPr txBox="1"/>
+          <p:nvPr/>
+        </p:nvSpPr>
+        <p:spPr>
+          <a:xfrm>
+            <a:off x="1750955" y="5642832"/>
+            <a:ext cx="8690089" cy="830997"/>
+          </a:xfrm>
+          <a:prstGeom prst="rect">
+            <a:avLst/>
+          </a:prstGeom>
+          <a:noFill/>
+        </p:spPr>
+        <p:txBody>
+          <a:bodyPr wrap="square" rtlCol="0">
+            <a:spAutoFit/>
+          </a:bodyPr>
+          <a:lstStyle/>
+          <a:p>
+            <a:pPr algn="just"/>
+            <a:r>
+              <a:rPr lang="fr-FR" sz="2400" dirty="0">
+                <a:latin typeface="Gill Sans MT" panose="020B0502020104020203" pitchFamily="34" charset="0"/>
+              </a:rPr>
+              <a:t>Le graphique montre l’influence marquée des caractéristiques des communes voisines sur le taux de consultations</a:t>
+            </a:r>
+          </a:p>
+        </p:txBody>
+      </p:sp>
     </p:spTree>
     <p:extLst>
       <p:ext uri="{BB962C8B-B14F-4D97-AF65-F5344CB8AC3E}">
@@ -11984,7 +14040,1082 @@
 </p:sld>
 </file>
 
-<file path=ppt/slides/slide28.xml><?xml version="1.0" encoding="utf-8"?>
+<file path=ppt/slides/slide29.xml><?xml version="1.0" encoding="utf-8"?>
+<p:sld xmlns:a="http://schemas.openxmlformats.org/drawingml/2006/main" xmlns:r="http://schemas.openxmlformats.org/officeDocument/2006/relationships" xmlns:p="http://schemas.openxmlformats.org/presentationml/2006/main">
+  <p:cSld>
+    <p:spTree>
+      <p:nvGrpSpPr>
+        <p:cNvPr id="1" name="">
+          <a:extLst>
+            <a:ext uri="{FF2B5EF4-FFF2-40B4-BE49-F238E27FC236}">
+              <a16:creationId xmlns:a16="http://schemas.microsoft.com/office/drawing/2014/main" id="{D0883E41-4E42-7945-61B6-CAD013D6BEFE}"/>
+            </a:ext>
+          </a:extLst>
+        </p:cNvPr>
+        <p:cNvGrpSpPr/>
+        <p:nvPr/>
+      </p:nvGrpSpPr>
+      <p:grpSpPr>
+        <a:xfrm>
+          <a:off x="0" y="0"/>
+          <a:ext cx="0" cy="0"/>
+          <a:chOff x="0" y="0"/>
+          <a:chExt cx="0" cy="0"/>
+        </a:xfrm>
+      </p:grpSpPr>
+      <p:sp>
+        <p:nvSpPr>
+          <p:cNvPr id="2" name="Espace réservé du numéro de diapositive 1">
+            <a:extLst>
+              <a:ext uri="{FF2B5EF4-FFF2-40B4-BE49-F238E27FC236}">
+                <a16:creationId xmlns:a16="http://schemas.microsoft.com/office/drawing/2014/main" id="{18374531-05B7-D43C-7ECE-E3551515F7E6}"/>
+              </a:ext>
+            </a:extLst>
+          </p:cNvPr>
+          <p:cNvSpPr>
+            <a:spLocks noGrp="1"/>
+          </p:cNvSpPr>
+          <p:nvPr>
+            <p:ph type="sldNum" sz="quarter" idx="4"/>
+          </p:nvPr>
+        </p:nvSpPr>
+        <p:spPr/>
+        <p:txBody>
+          <a:bodyPr/>
+          <a:lstStyle/>
+          <a:p>
+            <a:fld id="{F546B7B7-7D14-4795-A998-350CFB2BDD43}" type="slidenum">
+              <a:rPr lang="fr-FR" smtClean="0"/>
+              <a:pPr/>
+              <a:t>29</a:t>
+            </a:fld>
+            <a:endParaRPr lang="fr-FR"/>
+          </a:p>
+        </p:txBody>
+      </p:sp>
+      <p:sp>
+        <p:nvSpPr>
+          <p:cNvPr id="3" name="ZoneTexte 2">
+            <a:extLst>
+              <a:ext uri="{FF2B5EF4-FFF2-40B4-BE49-F238E27FC236}">
+                <a16:creationId xmlns:a16="http://schemas.microsoft.com/office/drawing/2014/main" id="{871FD580-3A6E-B316-8BC7-9CB96F2D45AA}"/>
+              </a:ext>
+            </a:extLst>
+          </p:cNvPr>
+          <p:cNvSpPr txBox="1"/>
+          <p:nvPr/>
+        </p:nvSpPr>
+        <p:spPr>
+          <a:xfrm>
+            <a:off x="2" y="532969"/>
+            <a:ext cx="12191999" cy="646331"/>
+          </a:xfrm>
+          <a:prstGeom prst="rect">
+            <a:avLst/>
+          </a:prstGeom>
+          <a:solidFill>
+            <a:srgbClr val="006A5A"/>
+          </a:solidFill>
+        </p:spPr>
+        <p:txBody>
+          <a:bodyPr wrap="square" rtlCol="0">
+            <a:spAutoFit/>
+          </a:bodyPr>
+          <a:lstStyle/>
+          <a:p>
+            <a:r>
+              <a:rPr lang="fr-FR" sz="3600" b="1" dirty="0">
+                <a:solidFill>
+                  <a:schemeClr val="bg1"/>
+                </a:solidFill>
+                <a:latin typeface="Gill Sans MT" panose="020B0502020104020203" pitchFamily="34" charset="0"/>
+              </a:rPr>
+              <a:t>4.6. Observations VS prédictions</a:t>
+            </a:r>
+          </a:p>
+        </p:txBody>
+      </p:sp>
+      <p:pic>
+        <p:nvPicPr>
+          <p:cNvPr id="4" name="Graphique 3" descr="Flèches de chevron">
+            <a:extLst>
+              <a:ext uri="{FF2B5EF4-FFF2-40B4-BE49-F238E27FC236}">
+                <a16:creationId xmlns:a16="http://schemas.microsoft.com/office/drawing/2014/main" id="{E6BBA90F-BC7E-705D-974E-92597471D422}"/>
+              </a:ext>
+            </a:extLst>
+          </p:cNvPr>
+          <p:cNvPicPr>
+            <a:picLocks noChangeAspect="1"/>
+          </p:cNvPicPr>
+          <p:nvPr/>
+        </p:nvPicPr>
+        <p:blipFill>
+          <a:blip r:embed="rId2">
+            <a:extLst>
+              <a:ext uri="{28A0092B-C50C-407E-A947-70E740481C1C}">
+                <a14:useLocalDpi xmlns:a14="http://schemas.microsoft.com/office/drawing/2010/main" val="0"/>
+              </a:ext>
+              <a:ext uri="{96DAC541-7B7A-43D3-8B79-37D633B846F1}">
+                <asvg:svgBlip xmlns:asvg="http://schemas.microsoft.com/office/drawing/2016/SVG/main" r:embed="rId3"/>
+              </a:ext>
+            </a:extLst>
+          </a:blip>
+          <a:stretch>
+            <a:fillRect/>
+          </a:stretch>
+        </p:blipFill>
+        <p:spPr>
+          <a:xfrm>
+            <a:off x="11078692" y="266700"/>
+            <a:ext cx="1170459" cy="1170459"/>
+          </a:xfrm>
+          <a:prstGeom prst="rect">
+            <a:avLst/>
+          </a:prstGeom>
+        </p:spPr>
+      </p:pic>
+      <p:pic>
+        <p:nvPicPr>
+          <p:cNvPr id="7" name="Image 6">
+            <a:extLst>
+              <a:ext uri="{FF2B5EF4-FFF2-40B4-BE49-F238E27FC236}">
+                <a16:creationId xmlns:a16="http://schemas.microsoft.com/office/drawing/2014/main" id="{7DC43D8C-A4AA-496B-A608-EF8D8145529B}"/>
+              </a:ext>
+            </a:extLst>
+          </p:cNvPr>
+          <p:cNvPicPr>
+            <a:picLocks noChangeAspect="1"/>
+          </p:cNvPicPr>
+          <p:nvPr/>
+        </p:nvPicPr>
+        <p:blipFill>
+          <a:blip r:embed="rId4"/>
+          <a:stretch>
+            <a:fillRect/>
+          </a:stretch>
+        </p:blipFill>
+        <p:spPr>
+          <a:xfrm>
+            <a:off x="232727" y="1437159"/>
+            <a:ext cx="6069398" cy="4193966"/>
+          </a:xfrm>
+          <a:prstGeom prst="rect">
+            <a:avLst/>
+          </a:prstGeom>
+        </p:spPr>
+      </p:pic>
+      <p:pic>
+        <p:nvPicPr>
+          <p:cNvPr id="9" name="Image 8">
+            <a:extLst>
+              <a:ext uri="{FF2B5EF4-FFF2-40B4-BE49-F238E27FC236}">
+                <a16:creationId xmlns:a16="http://schemas.microsoft.com/office/drawing/2014/main" id="{1B06FCEC-C3A1-4723-B33B-78823BF3A0AA}"/>
+              </a:ext>
+            </a:extLst>
+          </p:cNvPr>
+          <p:cNvPicPr>
+            <a:picLocks noChangeAspect="1"/>
+          </p:cNvPicPr>
+          <p:nvPr/>
+        </p:nvPicPr>
+        <p:blipFill>
+          <a:blip r:embed="rId5"/>
+          <a:stretch>
+            <a:fillRect/>
+          </a:stretch>
+        </p:blipFill>
+        <p:spPr>
+          <a:xfrm>
+            <a:off x="5704427" y="1437159"/>
+            <a:ext cx="6366969" cy="4193966"/>
+          </a:xfrm>
+          <a:prstGeom prst="rect">
+            <a:avLst/>
+          </a:prstGeom>
+        </p:spPr>
+      </p:pic>
+    </p:spTree>
+    <p:extLst>
+      <p:ext uri="{BB962C8B-B14F-4D97-AF65-F5344CB8AC3E}">
+        <p14:creationId xmlns:p14="http://schemas.microsoft.com/office/powerpoint/2010/main" val="3381023947"/>
+      </p:ext>
+    </p:extLst>
+  </p:cSld>
+  <p:clrMapOvr>
+    <a:masterClrMapping/>
+  </p:clrMapOvr>
+</p:sld>
+</file>
+
+<file path=ppt/slides/slide3.xml><?xml version="1.0" encoding="utf-8"?>
+<p:sld xmlns:a="http://schemas.openxmlformats.org/drawingml/2006/main" xmlns:r="http://schemas.openxmlformats.org/officeDocument/2006/relationships" xmlns:p="http://schemas.openxmlformats.org/presentationml/2006/main">
+  <p:cSld>
+    <p:spTree>
+      <p:nvGrpSpPr>
+        <p:cNvPr id="1" name=""/>
+        <p:cNvGrpSpPr/>
+        <p:nvPr/>
+      </p:nvGrpSpPr>
+      <p:grpSpPr>
+        <a:xfrm>
+          <a:off x="0" y="0"/>
+          <a:ext cx="0" cy="0"/>
+          <a:chOff x="0" y="0"/>
+          <a:chExt cx="0" cy="0"/>
+        </a:xfrm>
+      </p:grpSpPr>
+      <p:sp>
+        <p:nvSpPr>
+          <p:cNvPr id="3" name="Espace réservé du numéro de diapositive 2">
+            <a:extLst>
+              <a:ext uri="{FF2B5EF4-FFF2-40B4-BE49-F238E27FC236}">
+                <a16:creationId xmlns:a16="http://schemas.microsoft.com/office/drawing/2014/main" id="{68EEE016-1B4D-27DD-4ADA-3B73EB64F3E1}"/>
+              </a:ext>
+            </a:extLst>
+          </p:cNvPr>
+          <p:cNvSpPr>
+            <a:spLocks noGrp="1"/>
+          </p:cNvSpPr>
+          <p:nvPr>
+            <p:ph type="sldNum" sz="quarter" idx="4"/>
+          </p:nvPr>
+        </p:nvSpPr>
+        <p:spPr>
+          <a:xfrm>
+            <a:off x="8610600" y="6356350"/>
+            <a:ext cx="2743200" cy="365125"/>
+          </a:xfrm>
+        </p:spPr>
+        <p:txBody>
+          <a:bodyPr/>
+          <a:lstStyle/>
+          <a:p>
+            <a:fld id="{F546B7B7-7D14-4795-A998-350CFB2BDD43}" type="slidenum">
+              <a:rPr lang="fr-FR" smtClean="0"/>
+              <a:pPr/>
+              <a:t>3</a:t>
+            </a:fld>
+            <a:endParaRPr lang="fr-FR" dirty="0"/>
+          </a:p>
+        </p:txBody>
+      </p:sp>
+      <p:sp>
+        <p:nvSpPr>
+          <p:cNvPr id="2" name="ZoneTexte 1">
+            <a:extLst>
+              <a:ext uri="{FF2B5EF4-FFF2-40B4-BE49-F238E27FC236}">
+                <a16:creationId xmlns:a16="http://schemas.microsoft.com/office/drawing/2014/main" id="{0A4C5EA5-8EC5-BD2E-0FB5-DC298C4E156C}"/>
+              </a:ext>
+            </a:extLst>
+          </p:cNvPr>
+          <p:cNvSpPr txBox="1"/>
+          <p:nvPr/>
+        </p:nvSpPr>
+        <p:spPr>
+          <a:xfrm>
+            <a:off x="2" y="532969"/>
+            <a:ext cx="12191999" cy="646331"/>
+          </a:xfrm>
+          <a:prstGeom prst="rect">
+            <a:avLst/>
+          </a:prstGeom>
+          <a:solidFill>
+            <a:srgbClr val="006A5A"/>
+          </a:solidFill>
+        </p:spPr>
+        <p:txBody>
+          <a:bodyPr wrap="square" rtlCol="0">
+            <a:spAutoFit/>
+          </a:bodyPr>
+          <a:lstStyle/>
+          <a:p>
+            <a:r>
+              <a:rPr lang="fr-FR" sz="3600" b="1" dirty="0">
+                <a:solidFill>
+                  <a:schemeClr val="bg1"/>
+                </a:solidFill>
+                <a:latin typeface="Gill Sans MT" panose="020B0502020104020203" pitchFamily="34" charset="0"/>
+              </a:rPr>
+              <a:t>Introduction</a:t>
+            </a:r>
+          </a:p>
+        </p:txBody>
+      </p:sp>
+      <p:pic>
+        <p:nvPicPr>
+          <p:cNvPr id="4" name="Graphique 3" descr="Flèches de chevron">
+            <a:extLst>
+              <a:ext uri="{FF2B5EF4-FFF2-40B4-BE49-F238E27FC236}">
+                <a16:creationId xmlns:a16="http://schemas.microsoft.com/office/drawing/2014/main" id="{358D0F2A-5D55-3BCA-A5C6-BEE40DA79E83}"/>
+              </a:ext>
+            </a:extLst>
+          </p:cNvPr>
+          <p:cNvPicPr>
+            <a:picLocks noChangeAspect="1"/>
+          </p:cNvPicPr>
+          <p:nvPr/>
+        </p:nvPicPr>
+        <p:blipFill>
+          <a:blip r:embed="rId2">
+            <a:extLst>
+              <a:ext uri="{28A0092B-C50C-407E-A947-70E740481C1C}">
+                <a14:useLocalDpi xmlns:a14="http://schemas.microsoft.com/office/drawing/2010/main" val="0"/>
+              </a:ext>
+              <a:ext uri="{96DAC541-7B7A-43D3-8B79-37D633B846F1}">
+                <asvg:svgBlip xmlns:asvg="http://schemas.microsoft.com/office/drawing/2016/SVG/main" r:embed="rId3"/>
+              </a:ext>
+            </a:extLst>
+          </a:blip>
+          <a:stretch>
+            <a:fillRect/>
+          </a:stretch>
+        </p:blipFill>
+        <p:spPr>
+          <a:xfrm>
+            <a:off x="11078692" y="266700"/>
+            <a:ext cx="1170459" cy="1170459"/>
+          </a:xfrm>
+          <a:prstGeom prst="rect">
+            <a:avLst/>
+          </a:prstGeom>
+        </p:spPr>
+      </p:pic>
+      <p:sp>
+        <p:nvSpPr>
+          <p:cNvPr id="8" name="ZoneTexte 7">
+            <a:extLst>
+              <a:ext uri="{FF2B5EF4-FFF2-40B4-BE49-F238E27FC236}">
+                <a16:creationId xmlns:a16="http://schemas.microsoft.com/office/drawing/2014/main" id="{CDA3B022-3B8D-2B7C-C02F-660DEFB862E6}"/>
+              </a:ext>
+            </a:extLst>
+          </p:cNvPr>
+          <p:cNvSpPr txBox="1"/>
+          <p:nvPr/>
+        </p:nvSpPr>
+        <p:spPr>
+          <a:xfrm>
+            <a:off x="2383971" y="1484388"/>
+            <a:ext cx="8871858" cy="906338"/>
+          </a:xfrm>
+          <a:prstGeom prst="rect">
+            <a:avLst/>
+          </a:prstGeom>
+          <a:noFill/>
+        </p:spPr>
+        <p:txBody>
+          <a:bodyPr wrap="square">
+            <a:spAutoFit/>
+          </a:bodyPr>
+          <a:lstStyle/>
+          <a:p>
+            <a:pPr algn="just">
+              <a:lnSpc>
+                <a:spcPts val="2143"/>
+              </a:lnSpc>
+              <a:spcBef>
+                <a:spcPts val="1029"/>
+              </a:spcBef>
+              <a:spcAft>
+                <a:spcPts val="1029"/>
+              </a:spcAft>
+            </a:pPr>
+            <a:r>
+              <a:rPr lang="fr-FR" sz="2400" b="1" dirty="0">
+                <a:latin typeface="Gill Sans MT" panose="020B0502020104020203" pitchFamily="34" charset="0"/>
+              </a:rPr>
+              <a:t>Disparités territoriales d’accès aux soins en France </a:t>
+            </a:r>
+            <a:r>
+              <a:rPr lang="fr-FR" sz="2400" dirty="0">
+                <a:latin typeface="Gill Sans MT" panose="020B0502020104020203" pitchFamily="34" charset="0"/>
+              </a:rPr>
+              <a:t>(3,9 consultations/an en moyenne, mais </a:t>
+            </a:r>
+            <a:r>
+              <a:rPr lang="fr-FR" sz="2400" b="1" dirty="0">
+                <a:latin typeface="Gill Sans MT" panose="020B0502020104020203" pitchFamily="34" charset="0"/>
+              </a:rPr>
+              <a:t>déserts médicaux en zones rurales</a:t>
+            </a:r>
+            <a:r>
+              <a:rPr lang="fr-FR" sz="2400" dirty="0">
+                <a:latin typeface="Gill Sans MT" panose="020B0502020104020203" pitchFamily="34" charset="0"/>
+              </a:rPr>
+              <a:t>) (INSEE, 2021).</a:t>
+            </a:r>
+          </a:p>
+        </p:txBody>
+      </p:sp>
+      <p:grpSp>
+        <p:nvGrpSpPr>
+          <p:cNvPr id="7" name="Groupe 6">
+            <a:extLst>
+              <a:ext uri="{FF2B5EF4-FFF2-40B4-BE49-F238E27FC236}">
+                <a16:creationId xmlns:a16="http://schemas.microsoft.com/office/drawing/2014/main" id="{FF5EFF40-3651-5EDB-8412-378CD4EF499A}"/>
+              </a:ext>
+            </a:extLst>
+          </p:cNvPr>
+          <p:cNvGrpSpPr/>
+          <p:nvPr/>
+        </p:nvGrpSpPr>
+        <p:grpSpPr>
+          <a:xfrm>
+            <a:off x="152401" y="1506628"/>
+            <a:ext cx="2100942" cy="538782"/>
+            <a:chOff x="1621972" y="1405339"/>
+            <a:chExt cx="2100942" cy="538782"/>
+          </a:xfrm>
+        </p:grpSpPr>
+        <p:sp>
+          <p:nvSpPr>
+            <p:cNvPr id="5" name="Rectangle : coins arrondis 4">
+              <a:extLst>
+                <a:ext uri="{FF2B5EF4-FFF2-40B4-BE49-F238E27FC236}">
+                  <a16:creationId xmlns:a16="http://schemas.microsoft.com/office/drawing/2014/main" id="{E61FF78D-D4B7-8A0E-3A99-B11CA2BF9D35}"/>
+                </a:ext>
+              </a:extLst>
+            </p:cNvPr>
+            <p:cNvSpPr/>
+            <p:nvPr/>
+          </p:nvSpPr>
+          <p:spPr>
+            <a:xfrm>
+              <a:off x="1959429" y="1405339"/>
+              <a:ext cx="1763485" cy="522872"/>
+            </a:xfrm>
+            <a:prstGeom prst="roundRect">
+              <a:avLst>
+                <a:gd name="adj" fmla="val 50000"/>
+              </a:avLst>
+            </a:prstGeom>
+            <a:solidFill>
+              <a:srgbClr val="006A5A"/>
+            </a:solidFill>
+            <a:ln>
+              <a:noFill/>
+            </a:ln>
+          </p:spPr>
+          <p:style>
+            <a:lnRef idx="2">
+              <a:schemeClr val="accent1">
+                <a:shade val="15000"/>
+              </a:schemeClr>
+            </a:lnRef>
+            <a:fillRef idx="1">
+              <a:schemeClr val="accent1"/>
+            </a:fillRef>
+            <a:effectRef idx="0">
+              <a:schemeClr val="accent1"/>
+            </a:effectRef>
+            <a:fontRef idx="minor">
+              <a:schemeClr val="lt1"/>
+            </a:fontRef>
+          </p:style>
+          <p:txBody>
+            <a:bodyPr rtlCol="0" anchor="ctr"/>
+            <a:lstStyle/>
+            <a:p>
+              <a:pPr algn="ctr"/>
+              <a:r>
+                <a:rPr lang="fr-FR" sz="2400" b="1" dirty="0">
+                  <a:latin typeface="Gill Sans MT" panose="020B0502020104020203" pitchFamily="34" charset="0"/>
+                </a:rPr>
+                <a:t>Contexte</a:t>
+              </a:r>
+            </a:p>
+          </p:txBody>
+        </p:sp>
+        <p:sp>
+          <p:nvSpPr>
+            <p:cNvPr id="6" name="Ellipse 5">
+              <a:extLst>
+                <a:ext uri="{FF2B5EF4-FFF2-40B4-BE49-F238E27FC236}">
+                  <a16:creationId xmlns:a16="http://schemas.microsoft.com/office/drawing/2014/main" id="{CC05190E-5C02-D88A-51CD-8B54185D60C5}"/>
+                </a:ext>
+              </a:extLst>
+            </p:cNvPr>
+            <p:cNvSpPr/>
+            <p:nvPr/>
+          </p:nvSpPr>
+          <p:spPr>
+            <a:xfrm>
+              <a:off x="1621972" y="1421249"/>
+              <a:ext cx="522872" cy="522872"/>
+            </a:xfrm>
+            <a:prstGeom prst="ellipse">
+              <a:avLst/>
+            </a:prstGeom>
+            <a:solidFill>
+              <a:schemeClr val="accent2"/>
+            </a:solidFill>
+            <a:ln>
+              <a:noFill/>
+            </a:ln>
+          </p:spPr>
+          <p:style>
+            <a:lnRef idx="2">
+              <a:schemeClr val="accent1">
+                <a:shade val="15000"/>
+              </a:schemeClr>
+            </a:lnRef>
+            <a:fillRef idx="1">
+              <a:schemeClr val="accent1"/>
+            </a:fillRef>
+            <a:effectRef idx="0">
+              <a:schemeClr val="accent1"/>
+            </a:effectRef>
+            <a:fontRef idx="minor">
+              <a:schemeClr val="lt1"/>
+            </a:fontRef>
+          </p:style>
+          <p:txBody>
+            <a:bodyPr rtlCol="0" anchor="ctr"/>
+            <a:lstStyle/>
+            <a:p>
+              <a:pPr algn="ctr"/>
+              <a:endParaRPr lang="fr-FR"/>
+            </a:p>
+          </p:txBody>
+        </p:sp>
+      </p:grpSp>
+      <p:sp>
+        <p:nvSpPr>
+          <p:cNvPr id="15" name="ZoneTexte 14">
+            <a:extLst>
+              <a:ext uri="{FF2B5EF4-FFF2-40B4-BE49-F238E27FC236}">
+                <a16:creationId xmlns:a16="http://schemas.microsoft.com/office/drawing/2014/main" id="{F0CCCD4C-73B8-500E-6EFC-DBF78E6F546F}"/>
+              </a:ext>
+            </a:extLst>
+          </p:cNvPr>
+          <p:cNvSpPr txBox="1"/>
+          <p:nvPr/>
+        </p:nvSpPr>
+        <p:spPr>
+          <a:xfrm>
+            <a:off x="3271035" y="2647574"/>
+            <a:ext cx="7984793" cy="644857"/>
+          </a:xfrm>
+          <a:prstGeom prst="rect">
+            <a:avLst/>
+          </a:prstGeom>
+          <a:noFill/>
+        </p:spPr>
+        <p:txBody>
+          <a:bodyPr wrap="square">
+            <a:spAutoFit/>
+          </a:bodyPr>
+          <a:lstStyle/>
+          <a:p>
+            <a:pPr algn="just">
+              <a:lnSpc>
+                <a:spcPts val="2143"/>
+              </a:lnSpc>
+              <a:spcBef>
+                <a:spcPts val="1029"/>
+              </a:spcBef>
+              <a:spcAft>
+                <a:spcPts val="1029"/>
+              </a:spcAft>
+            </a:pPr>
+            <a:r>
+              <a:rPr lang="fr-FR" sz="2400" b="0" i="0" dirty="0">
+                <a:solidFill>
+                  <a:srgbClr val="404040"/>
+                </a:solidFill>
+                <a:effectLst/>
+                <a:latin typeface="Gill Sans MT" panose="020B0502020104020203" pitchFamily="34" charset="0"/>
+              </a:rPr>
+              <a:t>Identifier les facteurs socio-économiques, démographiques et spatiaux influençant le taux de consultations</a:t>
+            </a:r>
+            <a:endParaRPr lang="fr-FR" sz="2400" dirty="0">
+              <a:latin typeface="Gill Sans MT" panose="020B0502020104020203" pitchFamily="34" charset="0"/>
+            </a:endParaRPr>
+          </a:p>
+        </p:txBody>
+      </p:sp>
+      <p:grpSp>
+        <p:nvGrpSpPr>
+          <p:cNvPr id="19" name="Groupe 18">
+            <a:extLst>
+              <a:ext uri="{FF2B5EF4-FFF2-40B4-BE49-F238E27FC236}">
+                <a16:creationId xmlns:a16="http://schemas.microsoft.com/office/drawing/2014/main" id="{B32077B7-68FF-8583-E5BA-6D4C6199B2FF}"/>
+              </a:ext>
+            </a:extLst>
+          </p:cNvPr>
+          <p:cNvGrpSpPr/>
+          <p:nvPr/>
+        </p:nvGrpSpPr>
+        <p:grpSpPr>
+          <a:xfrm>
+            <a:off x="152401" y="2624966"/>
+            <a:ext cx="2883995" cy="538782"/>
+            <a:chOff x="1621972" y="1405339"/>
+            <a:chExt cx="2883995" cy="538782"/>
+          </a:xfrm>
+        </p:grpSpPr>
+        <p:sp>
+          <p:nvSpPr>
+            <p:cNvPr id="20" name="Rectangle : coins arrondis 19">
+              <a:extLst>
+                <a:ext uri="{FF2B5EF4-FFF2-40B4-BE49-F238E27FC236}">
+                  <a16:creationId xmlns:a16="http://schemas.microsoft.com/office/drawing/2014/main" id="{3F06EF53-242C-6BF9-C239-E6386CD4EE98}"/>
+                </a:ext>
+              </a:extLst>
+            </p:cNvPr>
+            <p:cNvSpPr/>
+            <p:nvPr/>
+          </p:nvSpPr>
+          <p:spPr>
+            <a:xfrm>
+              <a:off x="1959429" y="1405339"/>
+              <a:ext cx="2546538" cy="522872"/>
+            </a:xfrm>
+            <a:prstGeom prst="roundRect">
+              <a:avLst>
+                <a:gd name="adj" fmla="val 50000"/>
+              </a:avLst>
+            </a:prstGeom>
+            <a:solidFill>
+              <a:srgbClr val="006A5A"/>
+            </a:solidFill>
+            <a:ln>
+              <a:noFill/>
+            </a:ln>
+          </p:spPr>
+          <p:style>
+            <a:lnRef idx="2">
+              <a:schemeClr val="accent1">
+                <a:shade val="15000"/>
+              </a:schemeClr>
+            </a:lnRef>
+            <a:fillRef idx="1">
+              <a:schemeClr val="accent1"/>
+            </a:fillRef>
+            <a:effectRef idx="0">
+              <a:schemeClr val="accent1"/>
+            </a:effectRef>
+            <a:fontRef idx="minor">
+              <a:schemeClr val="lt1"/>
+            </a:fontRef>
+          </p:style>
+          <p:txBody>
+            <a:bodyPr rtlCol="0" anchor="ctr"/>
+            <a:lstStyle/>
+            <a:p>
+              <a:pPr algn="ctr"/>
+              <a:r>
+                <a:rPr lang="fr-FR" sz="2400" b="1" dirty="0">
+                  <a:latin typeface="Gill Sans MT" panose="020B0502020104020203" pitchFamily="34" charset="0"/>
+                </a:rPr>
+                <a:t>Problématique</a:t>
+              </a:r>
+            </a:p>
+          </p:txBody>
+        </p:sp>
+        <p:sp>
+          <p:nvSpPr>
+            <p:cNvPr id="21" name="Ellipse 20">
+              <a:extLst>
+                <a:ext uri="{FF2B5EF4-FFF2-40B4-BE49-F238E27FC236}">
+                  <a16:creationId xmlns:a16="http://schemas.microsoft.com/office/drawing/2014/main" id="{FCDD2A58-1E7E-68A5-7E44-A3204A77B173}"/>
+                </a:ext>
+              </a:extLst>
+            </p:cNvPr>
+            <p:cNvSpPr/>
+            <p:nvPr/>
+          </p:nvSpPr>
+          <p:spPr>
+            <a:xfrm>
+              <a:off x="1621972" y="1421249"/>
+              <a:ext cx="522872" cy="522872"/>
+            </a:xfrm>
+            <a:prstGeom prst="ellipse">
+              <a:avLst/>
+            </a:prstGeom>
+            <a:solidFill>
+              <a:schemeClr val="accent2"/>
+            </a:solidFill>
+            <a:ln>
+              <a:noFill/>
+            </a:ln>
+          </p:spPr>
+          <p:style>
+            <a:lnRef idx="2">
+              <a:schemeClr val="accent1">
+                <a:shade val="15000"/>
+              </a:schemeClr>
+            </a:lnRef>
+            <a:fillRef idx="1">
+              <a:schemeClr val="accent1"/>
+            </a:fillRef>
+            <a:effectRef idx="0">
+              <a:schemeClr val="accent1"/>
+            </a:effectRef>
+            <a:fontRef idx="minor">
+              <a:schemeClr val="lt1"/>
+            </a:fontRef>
+          </p:style>
+          <p:txBody>
+            <a:bodyPr rtlCol="0" anchor="ctr"/>
+            <a:lstStyle/>
+            <a:p>
+              <a:pPr algn="ctr"/>
+              <a:endParaRPr lang="fr-FR"/>
+            </a:p>
+          </p:txBody>
+        </p:sp>
+      </p:grpSp>
+      <p:grpSp>
+        <p:nvGrpSpPr>
+          <p:cNvPr id="22" name="Groupe 21">
+            <a:extLst>
+              <a:ext uri="{FF2B5EF4-FFF2-40B4-BE49-F238E27FC236}">
+                <a16:creationId xmlns:a16="http://schemas.microsoft.com/office/drawing/2014/main" id="{D6D82661-F38D-D88D-F8AC-3A6EAB4450B0}"/>
+              </a:ext>
+            </a:extLst>
+          </p:cNvPr>
+          <p:cNvGrpSpPr/>
+          <p:nvPr/>
+        </p:nvGrpSpPr>
+        <p:grpSpPr>
+          <a:xfrm>
+            <a:off x="152401" y="3669997"/>
+            <a:ext cx="2024742" cy="538782"/>
+            <a:chOff x="1621972" y="1405339"/>
+            <a:chExt cx="2024742" cy="538782"/>
+          </a:xfrm>
+        </p:grpSpPr>
+        <p:sp>
+          <p:nvSpPr>
+            <p:cNvPr id="23" name="Rectangle : coins arrondis 22">
+              <a:extLst>
+                <a:ext uri="{FF2B5EF4-FFF2-40B4-BE49-F238E27FC236}">
+                  <a16:creationId xmlns:a16="http://schemas.microsoft.com/office/drawing/2014/main" id="{0B4B3CA1-25EE-0DBC-61A6-EACDC061F948}"/>
+                </a:ext>
+              </a:extLst>
+            </p:cNvPr>
+            <p:cNvSpPr/>
+            <p:nvPr/>
+          </p:nvSpPr>
+          <p:spPr>
+            <a:xfrm>
+              <a:off x="1959429" y="1405339"/>
+              <a:ext cx="1687285" cy="522872"/>
+            </a:xfrm>
+            <a:prstGeom prst="roundRect">
+              <a:avLst>
+                <a:gd name="adj" fmla="val 50000"/>
+              </a:avLst>
+            </a:prstGeom>
+            <a:solidFill>
+              <a:srgbClr val="006A5A"/>
+            </a:solidFill>
+            <a:ln>
+              <a:noFill/>
+            </a:ln>
+          </p:spPr>
+          <p:style>
+            <a:lnRef idx="2">
+              <a:schemeClr val="accent1">
+                <a:shade val="15000"/>
+              </a:schemeClr>
+            </a:lnRef>
+            <a:fillRef idx="1">
+              <a:schemeClr val="accent1"/>
+            </a:fillRef>
+            <a:effectRef idx="0">
+              <a:schemeClr val="accent1"/>
+            </a:effectRef>
+            <a:fontRef idx="minor">
+              <a:schemeClr val="lt1"/>
+            </a:fontRef>
+          </p:style>
+          <p:txBody>
+            <a:bodyPr rtlCol="0" anchor="ctr"/>
+            <a:lstStyle/>
+            <a:p>
+              <a:pPr algn="ctr"/>
+              <a:r>
+                <a:rPr lang="fr-FR" sz="2400" b="1" dirty="0">
+                  <a:latin typeface="Gill Sans MT" panose="020B0502020104020203" pitchFamily="34" charset="0"/>
+                </a:rPr>
+                <a:t>Objectifs</a:t>
+              </a:r>
+            </a:p>
+          </p:txBody>
+        </p:sp>
+        <p:sp>
+          <p:nvSpPr>
+            <p:cNvPr id="24" name="Ellipse 23">
+              <a:extLst>
+                <a:ext uri="{FF2B5EF4-FFF2-40B4-BE49-F238E27FC236}">
+                  <a16:creationId xmlns:a16="http://schemas.microsoft.com/office/drawing/2014/main" id="{14B93CAC-4DFB-F0BB-8646-C8C6109CC018}"/>
+                </a:ext>
+              </a:extLst>
+            </p:cNvPr>
+            <p:cNvSpPr/>
+            <p:nvPr/>
+          </p:nvSpPr>
+          <p:spPr>
+            <a:xfrm>
+              <a:off x="1621972" y="1421249"/>
+              <a:ext cx="522872" cy="522872"/>
+            </a:xfrm>
+            <a:prstGeom prst="ellipse">
+              <a:avLst/>
+            </a:prstGeom>
+            <a:solidFill>
+              <a:schemeClr val="accent2"/>
+            </a:solidFill>
+            <a:ln>
+              <a:noFill/>
+            </a:ln>
+          </p:spPr>
+          <p:style>
+            <a:lnRef idx="2">
+              <a:schemeClr val="accent1">
+                <a:shade val="15000"/>
+              </a:schemeClr>
+            </a:lnRef>
+            <a:fillRef idx="1">
+              <a:schemeClr val="accent1"/>
+            </a:fillRef>
+            <a:effectRef idx="0">
+              <a:schemeClr val="accent1"/>
+            </a:effectRef>
+            <a:fontRef idx="minor">
+              <a:schemeClr val="lt1"/>
+            </a:fontRef>
+          </p:style>
+          <p:txBody>
+            <a:bodyPr rtlCol="0" anchor="ctr"/>
+            <a:lstStyle/>
+            <a:p>
+              <a:pPr algn="ctr"/>
+              <a:endParaRPr lang="fr-FR"/>
+            </a:p>
+          </p:txBody>
+        </p:sp>
+      </p:grpSp>
+      <p:sp>
+        <p:nvSpPr>
+          <p:cNvPr id="25" name="ZoneTexte 24">
+            <a:extLst>
+              <a:ext uri="{FF2B5EF4-FFF2-40B4-BE49-F238E27FC236}">
+                <a16:creationId xmlns:a16="http://schemas.microsoft.com/office/drawing/2014/main" id="{5272EEDB-5531-D0B6-EBD6-2438CB98641A}"/>
+              </a:ext>
+            </a:extLst>
+          </p:cNvPr>
+          <p:cNvSpPr txBox="1"/>
+          <p:nvPr/>
+        </p:nvSpPr>
+        <p:spPr>
+          <a:xfrm>
+            <a:off x="1997528" y="3847080"/>
+            <a:ext cx="8392885" cy="367729"/>
+          </a:xfrm>
+          <a:prstGeom prst="rect">
+            <a:avLst/>
+          </a:prstGeom>
+          <a:noFill/>
+        </p:spPr>
+        <p:txBody>
+          <a:bodyPr wrap="square">
+            <a:spAutoFit/>
+          </a:bodyPr>
+          <a:lstStyle/>
+          <a:p>
+            <a:pPr lvl="1" algn="ctr">
+              <a:lnSpc>
+                <a:spcPts val="2143"/>
+              </a:lnSpc>
+              <a:spcBef>
+                <a:spcPts val="300"/>
+              </a:spcBef>
+              <a:spcAft>
+                <a:spcPts val="1029"/>
+              </a:spcAft>
+            </a:pPr>
+            <a:r>
+              <a:rPr lang="fr-FR" sz="2400" b="0" i="0" dirty="0">
+                <a:solidFill>
+                  <a:srgbClr val="404040"/>
+                </a:solidFill>
+                <a:effectLst/>
+                <a:latin typeface="Gill Sans MT" panose="020B0502020104020203" pitchFamily="34" charset="0"/>
+              </a:rPr>
+              <a:t>Modéliser le taux de consultations avec une approche spatiale.</a:t>
+            </a:r>
+          </a:p>
+        </p:txBody>
+      </p:sp>
+      <p:sp>
+        <p:nvSpPr>
+          <p:cNvPr id="28" name="Rectangle : coins arrondis 27">
+            <a:extLst>
+              <a:ext uri="{FF2B5EF4-FFF2-40B4-BE49-F238E27FC236}">
+                <a16:creationId xmlns:a16="http://schemas.microsoft.com/office/drawing/2014/main" id="{24C3065A-1C45-96EA-E252-8CF3DCA501CC}"/>
+              </a:ext>
+            </a:extLst>
+          </p:cNvPr>
+          <p:cNvSpPr/>
+          <p:nvPr/>
+        </p:nvSpPr>
+        <p:spPr>
+          <a:xfrm>
+            <a:off x="2177143" y="4354905"/>
+            <a:ext cx="8599713" cy="2209181"/>
+          </a:xfrm>
+          <a:prstGeom prst="roundRect">
+            <a:avLst>
+              <a:gd name="adj" fmla="val 25536"/>
+            </a:avLst>
+          </a:prstGeom>
+          <a:noFill/>
+          <a:ln w="38100">
+            <a:solidFill>
+              <a:srgbClr val="006A5A"/>
+            </a:solidFill>
+          </a:ln>
+        </p:spPr>
+        <p:style>
+          <a:lnRef idx="2">
+            <a:schemeClr val="accent1">
+              <a:shade val="15000"/>
+            </a:schemeClr>
+          </a:lnRef>
+          <a:fillRef idx="1">
+            <a:schemeClr val="accent1"/>
+          </a:fillRef>
+          <a:effectRef idx="0">
+            <a:schemeClr val="accent1"/>
+          </a:effectRef>
+          <a:fontRef idx="minor">
+            <a:schemeClr val="lt1"/>
+          </a:fontRef>
+        </p:style>
+        <p:txBody>
+          <a:bodyPr rtlCol="0" anchor="ctr"/>
+          <a:lstStyle/>
+          <a:p>
+            <a:pPr algn="ctr"/>
+            <a:endParaRPr lang="fr-FR"/>
+          </a:p>
+        </p:txBody>
+      </p:sp>
+      <p:sp>
+        <p:nvSpPr>
+          <p:cNvPr id="29" name="ZoneTexte 28">
+            <a:extLst>
+              <a:ext uri="{FF2B5EF4-FFF2-40B4-BE49-F238E27FC236}">
+                <a16:creationId xmlns:a16="http://schemas.microsoft.com/office/drawing/2014/main" id="{7C997150-358C-394F-6876-D61E7CFCA646}"/>
+              </a:ext>
+            </a:extLst>
+          </p:cNvPr>
+          <p:cNvSpPr txBox="1"/>
+          <p:nvPr/>
+        </p:nvSpPr>
+        <p:spPr>
+          <a:xfrm>
+            <a:off x="1894115" y="4559633"/>
+            <a:ext cx="8599712" cy="1799723"/>
+          </a:xfrm>
+          <a:prstGeom prst="rect">
+            <a:avLst/>
+          </a:prstGeom>
+          <a:noFill/>
+        </p:spPr>
+        <p:txBody>
+          <a:bodyPr wrap="square">
+            <a:spAutoFit/>
+          </a:bodyPr>
+          <a:lstStyle/>
+          <a:p>
+            <a:pPr marL="914400" lvl="1" indent="-457200" algn="just">
+              <a:lnSpc>
+                <a:spcPts val="2143"/>
+              </a:lnSpc>
+              <a:spcBef>
+                <a:spcPts val="300"/>
+              </a:spcBef>
+              <a:spcAft>
+                <a:spcPts val="1029"/>
+              </a:spcAft>
+              <a:buFont typeface="+mj-lt"/>
+              <a:buAutoNum type="arabicPeriod"/>
+            </a:pPr>
+            <a:r>
+              <a:rPr lang="fr-FR" sz="2400" dirty="0">
+                <a:solidFill>
+                  <a:srgbClr val="404040"/>
+                </a:solidFill>
+                <a:latin typeface="Gill Sans MT" panose="020B0502020104020203" pitchFamily="34" charset="0"/>
+              </a:rPr>
+              <a:t>Visualiser la répartition spatiale de ces taux en vue d’identifier les zones à fort et faible taux</a:t>
+            </a:r>
+          </a:p>
+          <a:p>
+            <a:pPr marL="914400" lvl="1" indent="-457200" algn="just">
+              <a:lnSpc>
+                <a:spcPts val="2143"/>
+              </a:lnSpc>
+              <a:spcBef>
+                <a:spcPts val="300"/>
+              </a:spcBef>
+              <a:spcAft>
+                <a:spcPts val="1029"/>
+              </a:spcAft>
+              <a:buFont typeface="+mj-lt"/>
+              <a:buAutoNum type="arabicPeriod"/>
+            </a:pPr>
+            <a:r>
+              <a:rPr lang="fr-FR" sz="2400" dirty="0">
+                <a:latin typeface="Gill Sans MT" panose="020B0502020104020203" pitchFamily="34" charset="0"/>
+              </a:rPr>
+              <a:t>Identifier les facteurs socio-économiques et démographiques qui influencent le taux de consultations</a:t>
+            </a:r>
+          </a:p>
+          <a:p>
+            <a:pPr marL="914400" lvl="1" indent="-457200" algn="just">
+              <a:lnSpc>
+                <a:spcPts val="2143"/>
+              </a:lnSpc>
+              <a:spcBef>
+                <a:spcPts val="300"/>
+              </a:spcBef>
+              <a:spcAft>
+                <a:spcPts val="1029"/>
+              </a:spcAft>
+              <a:buFont typeface="+mj-lt"/>
+              <a:buAutoNum type="arabicPeriod"/>
+            </a:pPr>
+            <a:r>
+              <a:rPr lang="fr-FR" sz="2400" b="0" i="0" dirty="0">
+                <a:solidFill>
+                  <a:srgbClr val="404040"/>
+                </a:solidFill>
+                <a:effectLst/>
+                <a:latin typeface="Gill Sans MT" panose="020B0502020104020203" pitchFamily="34" charset="0"/>
+              </a:rPr>
+              <a:t>Proposer des recommandations pour réduire les inégalités.</a:t>
+            </a:r>
+          </a:p>
+        </p:txBody>
+      </p:sp>
+    </p:spTree>
+    <p:extLst>
+      <p:ext uri="{BB962C8B-B14F-4D97-AF65-F5344CB8AC3E}">
+        <p14:creationId xmlns:p14="http://schemas.microsoft.com/office/powerpoint/2010/main" val="413827849"/>
+      </p:ext>
+    </p:extLst>
+  </p:cSld>
+  <p:clrMapOvr>
+    <a:masterClrMapping/>
+  </p:clrMapOvr>
+</p:sld>
+</file>
+
+<file path=ppt/slides/slide30.xml><?xml version="1.0" encoding="utf-8"?>
 <p:sld xmlns:a="http://schemas.openxmlformats.org/drawingml/2006/main" xmlns:r="http://schemas.openxmlformats.org/officeDocument/2006/relationships" xmlns:p="http://schemas.openxmlformats.org/presentationml/2006/main">
   <p:cSld>
     <p:spTree>
@@ -12025,7 +15156,7 @@
             <a:fld id="{F546B7B7-7D14-4795-A998-350CFB2BDD43}" type="slidenum">
               <a:rPr lang="fr-FR" smtClean="0"/>
               <a:pPr/>
-              <a:t>28</a:t>
+              <a:t>30</a:t>
             </a:fld>
             <a:endParaRPr lang="fr-FR"/>
           </a:p>
@@ -12044,7 +15175,7 @@
 </p:sld>
 </file>
 
-<file path=ppt/slides/slide29.xml><?xml version="1.0" encoding="utf-8"?>
+<file path=ppt/slides/slide31.xml><?xml version="1.0" encoding="utf-8"?>
 <p:sld xmlns:a="http://schemas.openxmlformats.org/drawingml/2006/main" xmlns:r="http://schemas.openxmlformats.org/officeDocument/2006/relationships" xmlns:p="http://schemas.openxmlformats.org/presentationml/2006/main">
   <p:cSld>
     <p:spTree>
@@ -12096,7 +15227,7 @@
             <a:fld id="{F546B7B7-7D14-4795-A998-350CFB2BDD43}" type="slidenum">
               <a:rPr lang="fr-FR" smtClean="0"/>
               <a:pPr/>
-              <a:t>29</a:t>
+              <a:t>31</a:t>
             </a:fld>
             <a:endParaRPr lang="fr-FR" dirty="0"/>
           </a:p>
@@ -12635,875 +15766,7 @@
 </p:sld>
 </file>
 
-<file path=ppt/slides/slide3.xml><?xml version="1.0" encoding="utf-8"?>
-<p:sld xmlns:a="http://schemas.openxmlformats.org/drawingml/2006/main" xmlns:r="http://schemas.openxmlformats.org/officeDocument/2006/relationships" xmlns:p="http://schemas.openxmlformats.org/presentationml/2006/main">
-  <p:cSld>
-    <p:spTree>
-      <p:nvGrpSpPr>
-        <p:cNvPr id="1" name=""/>
-        <p:cNvGrpSpPr/>
-        <p:nvPr/>
-      </p:nvGrpSpPr>
-      <p:grpSpPr>
-        <a:xfrm>
-          <a:off x="0" y="0"/>
-          <a:ext cx="0" cy="0"/>
-          <a:chOff x="0" y="0"/>
-          <a:chExt cx="0" cy="0"/>
-        </a:xfrm>
-      </p:grpSpPr>
-      <p:sp>
-        <p:nvSpPr>
-          <p:cNvPr id="3" name="Espace réservé du numéro de diapositive 2">
-            <a:extLst>
-              <a:ext uri="{FF2B5EF4-FFF2-40B4-BE49-F238E27FC236}">
-                <a16:creationId xmlns:a16="http://schemas.microsoft.com/office/drawing/2014/main" id="{68EEE016-1B4D-27DD-4ADA-3B73EB64F3E1}"/>
-              </a:ext>
-            </a:extLst>
-          </p:cNvPr>
-          <p:cNvSpPr>
-            <a:spLocks noGrp="1"/>
-          </p:cNvSpPr>
-          <p:nvPr>
-            <p:ph type="sldNum" sz="quarter" idx="4"/>
-          </p:nvPr>
-        </p:nvSpPr>
-        <p:spPr>
-          <a:xfrm>
-            <a:off x="8610600" y="6356350"/>
-            <a:ext cx="2743200" cy="365125"/>
-          </a:xfrm>
-        </p:spPr>
-        <p:txBody>
-          <a:bodyPr/>
-          <a:lstStyle/>
-          <a:p>
-            <a:fld id="{F546B7B7-7D14-4795-A998-350CFB2BDD43}" type="slidenum">
-              <a:rPr lang="fr-FR" smtClean="0"/>
-              <a:pPr/>
-              <a:t>3</a:t>
-            </a:fld>
-            <a:endParaRPr lang="fr-FR" dirty="0"/>
-          </a:p>
-        </p:txBody>
-      </p:sp>
-      <p:sp>
-        <p:nvSpPr>
-          <p:cNvPr id="2" name="ZoneTexte 1">
-            <a:extLst>
-              <a:ext uri="{FF2B5EF4-FFF2-40B4-BE49-F238E27FC236}">
-                <a16:creationId xmlns:a16="http://schemas.microsoft.com/office/drawing/2014/main" id="{0A4C5EA5-8EC5-BD2E-0FB5-DC298C4E156C}"/>
-              </a:ext>
-            </a:extLst>
-          </p:cNvPr>
-          <p:cNvSpPr txBox="1"/>
-          <p:nvPr/>
-        </p:nvSpPr>
-        <p:spPr>
-          <a:xfrm>
-            <a:off x="2" y="532969"/>
-            <a:ext cx="12191999" cy="646331"/>
-          </a:xfrm>
-          <a:prstGeom prst="rect">
-            <a:avLst/>
-          </a:prstGeom>
-          <a:solidFill>
-            <a:srgbClr val="006A5A"/>
-          </a:solidFill>
-        </p:spPr>
-        <p:txBody>
-          <a:bodyPr wrap="square" rtlCol="0">
-            <a:spAutoFit/>
-          </a:bodyPr>
-          <a:lstStyle/>
-          <a:p>
-            <a:r>
-              <a:rPr lang="fr-FR" sz="3600" b="1" dirty="0">
-                <a:solidFill>
-                  <a:schemeClr val="bg1"/>
-                </a:solidFill>
-                <a:latin typeface="Gill Sans MT" panose="020B0502020104020203" pitchFamily="34" charset="0"/>
-              </a:rPr>
-              <a:t>Introduction</a:t>
-            </a:r>
-          </a:p>
-        </p:txBody>
-      </p:sp>
-      <p:pic>
-        <p:nvPicPr>
-          <p:cNvPr id="4" name="Graphique 3" descr="Flèches de chevron">
-            <a:extLst>
-              <a:ext uri="{FF2B5EF4-FFF2-40B4-BE49-F238E27FC236}">
-                <a16:creationId xmlns:a16="http://schemas.microsoft.com/office/drawing/2014/main" id="{358D0F2A-5D55-3BCA-A5C6-BEE40DA79E83}"/>
-              </a:ext>
-            </a:extLst>
-          </p:cNvPr>
-          <p:cNvPicPr>
-            <a:picLocks noChangeAspect="1"/>
-          </p:cNvPicPr>
-          <p:nvPr/>
-        </p:nvPicPr>
-        <p:blipFill>
-          <a:blip r:embed="rId2">
-            <a:extLst>
-              <a:ext uri="{28A0092B-C50C-407E-A947-70E740481C1C}">
-                <a14:useLocalDpi xmlns:a14="http://schemas.microsoft.com/office/drawing/2010/main" val="0"/>
-              </a:ext>
-              <a:ext uri="{96DAC541-7B7A-43D3-8B79-37D633B846F1}">
-                <asvg:svgBlip xmlns:asvg="http://schemas.microsoft.com/office/drawing/2016/SVG/main" r:embed="rId3"/>
-              </a:ext>
-            </a:extLst>
-          </a:blip>
-          <a:stretch>
-            <a:fillRect/>
-          </a:stretch>
-        </p:blipFill>
-        <p:spPr>
-          <a:xfrm>
-            <a:off x="11078692" y="266700"/>
-            <a:ext cx="1170459" cy="1170459"/>
-          </a:xfrm>
-          <a:prstGeom prst="rect">
-            <a:avLst/>
-          </a:prstGeom>
-        </p:spPr>
-      </p:pic>
-      <p:sp>
-        <p:nvSpPr>
-          <p:cNvPr id="8" name="ZoneTexte 7">
-            <a:extLst>
-              <a:ext uri="{FF2B5EF4-FFF2-40B4-BE49-F238E27FC236}">
-                <a16:creationId xmlns:a16="http://schemas.microsoft.com/office/drawing/2014/main" id="{CDA3B022-3B8D-2B7C-C02F-660DEFB862E6}"/>
-              </a:ext>
-            </a:extLst>
-          </p:cNvPr>
-          <p:cNvSpPr txBox="1"/>
-          <p:nvPr/>
-        </p:nvSpPr>
-        <p:spPr>
-          <a:xfrm>
-            <a:off x="2383971" y="1484388"/>
-            <a:ext cx="8871858" cy="906338"/>
-          </a:xfrm>
-          <a:prstGeom prst="rect">
-            <a:avLst/>
-          </a:prstGeom>
-          <a:noFill/>
-        </p:spPr>
-        <p:txBody>
-          <a:bodyPr wrap="square">
-            <a:spAutoFit/>
-          </a:bodyPr>
-          <a:lstStyle/>
-          <a:p>
-            <a:pPr algn="just">
-              <a:lnSpc>
-                <a:spcPts val="2143"/>
-              </a:lnSpc>
-              <a:spcBef>
-                <a:spcPts val="1029"/>
-              </a:spcBef>
-              <a:spcAft>
-                <a:spcPts val="1029"/>
-              </a:spcAft>
-            </a:pPr>
-            <a:r>
-              <a:rPr lang="fr-FR" sz="2400" b="1" dirty="0">
-                <a:latin typeface="Gill Sans MT" panose="020B0502020104020203" pitchFamily="34" charset="0"/>
-              </a:rPr>
-              <a:t>Disparités territoriales d’accès aux soins en France </a:t>
-            </a:r>
-            <a:r>
-              <a:rPr lang="fr-FR" sz="2400" dirty="0">
-                <a:latin typeface="Gill Sans MT" panose="020B0502020104020203" pitchFamily="34" charset="0"/>
-              </a:rPr>
-              <a:t>(3,9 consultations/an en moyenne, mais </a:t>
-            </a:r>
-            <a:r>
-              <a:rPr lang="fr-FR" sz="2400" b="1" dirty="0">
-                <a:latin typeface="Gill Sans MT" panose="020B0502020104020203" pitchFamily="34" charset="0"/>
-              </a:rPr>
-              <a:t>déserts médicaux en zones rurales</a:t>
-            </a:r>
-            <a:r>
-              <a:rPr lang="fr-FR" sz="2400" dirty="0">
-                <a:latin typeface="Gill Sans MT" panose="020B0502020104020203" pitchFamily="34" charset="0"/>
-              </a:rPr>
-              <a:t>) (INSEE, 2021).</a:t>
-            </a:r>
-          </a:p>
-        </p:txBody>
-      </p:sp>
-      <p:grpSp>
-        <p:nvGrpSpPr>
-          <p:cNvPr id="7" name="Groupe 6">
-            <a:extLst>
-              <a:ext uri="{FF2B5EF4-FFF2-40B4-BE49-F238E27FC236}">
-                <a16:creationId xmlns:a16="http://schemas.microsoft.com/office/drawing/2014/main" id="{FF5EFF40-3651-5EDB-8412-378CD4EF499A}"/>
-              </a:ext>
-            </a:extLst>
-          </p:cNvPr>
-          <p:cNvGrpSpPr/>
-          <p:nvPr/>
-        </p:nvGrpSpPr>
-        <p:grpSpPr>
-          <a:xfrm>
-            <a:off x="152401" y="1506628"/>
-            <a:ext cx="2100942" cy="538782"/>
-            <a:chOff x="1621972" y="1405339"/>
-            <a:chExt cx="2100942" cy="538782"/>
-          </a:xfrm>
-        </p:grpSpPr>
-        <p:sp>
-          <p:nvSpPr>
-            <p:cNvPr id="5" name="Rectangle : coins arrondis 4">
-              <a:extLst>
-                <a:ext uri="{FF2B5EF4-FFF2-40B4-BE49-F238E27FC236}">
-                  <a16:creationId xmlns:a16="http://schemas.microsoft.com/office/drawing/2014/main" id="{E61FF78D-D4B7-8A0E-3A99-B11CA2BF9D35}"/>
-                </a:ext>
-              </a:extLst>
-            </p:cNvPr>
-            <p:cNvSpPr/>
-            <p:nvPr/>
-          </p:nvSpPr>
-          <p:spPr>
-            <a:xfrm>
-              <a:off x="1959429" y="1405339"/>
-              <a:ext cx="1763485" cy="522872"/>
-            </a:xfrm>
-            <a:prstGeom prst="roundRect">
-              <a:avLst>
-                <a:gd name="adj" fmla="val 50000"/>
-              </a:avLst>
-            </a:prstGeom>
-            <a:solidFill>
-              <a:srgbClr val="006A5A"/>
-            </a:solidFill>
-            <a:ln>
-              <a:noFill/>
-            </a:ln>
-          </p:spPr>
-          <p:style>
-            <a:lnRef idx="2">
-              <a:schemeClr val="accent1">
-                <a:shade val="15000"/>
-              </a:schemeClr>
-            </a:lnRef>
-            <a:fillRef idx="1">
-              <a:schemeClr val="accent1"/>
-            </a:fillRef>
-            <a:effectRef idx="0">
-              <a:schemeClr val="accent1"/>
-            </a:effectRef>
-            <a:fontRef idx="minor">
-              <a:schemeClr val="lt1"/>
-            </a:fontRef>
-          </p:style>
-          <p:txBody>
-            <a:bodyPr rtlCol="0" anchor="ctr"/>
-            <a:lstStyle/>
-            <a:p>
-              <a:pPr algn="ctr"/>
-              <a:r>
-                <a:rPr lang="fr-FR" sz="2400" b="1" dirty="0">
-                  <a:latin typeface="Gill Sans MT" panose="020B0502020104020203" pitchFamily="34" charset="0"/>
-                </a:rPr>
-                <a:t>Contexte</a:t>
-              </a:r>
-            </a:p>
-          </p:txBody>
-        </p:sp>
-        <p:sp>
-          <p:nvSpPr>
-            <p:cNvPr id="6" name="Ellipse 5">
-              <a:extLst>
-                <a:ext uri="{FF2B5EF4-FFF2-40B4-BE49-F238E27FC236}">
-                  <a16:creationId xmlns:a16="http://schemas.microsoft.com/office/drawing/2014/main" id="{CC05190E-5C02-D88A-51CD-8B54185D60C5}"/>
-                </a:ext>
-              </a:extLst>
-            </p:cNvPr>
-            <p:cNvSpPr/>
-            <p:nvPr/>
-          </p:nvSpPr>
-          <p:spPr>
-            <a:xfrm>
-              <a:off x="1621972" y="1421249"/>
-              <a:ext cx="522872" cy="522872"/>
-            </a:xfrm>
-            <a:prstGeom prst="ellipse">
-              <a:avLst/>
-            </a:prstGeom>
-            <a:solidFill>
-              <a:schemeClr val="accent2"/>
-            </a:solidFill>
-            <a:ln>
-              <a:noFill/>
-            </a:ln>
-          </p:spPr>
-          <p:style>
-            <a:lnRef idx="2">
-              <a:schemeClr val="accent1">
-                <a:shade val="15000"/>
-              </a:schemeClr>
-            </a:lnRef>
-            <a:fillRef idx="1">
-              <a:schemeClr val="accent1"/>
-            </a:fillRef>
-            <a:effectRef idx="0">
-              <a:schemeClr val="accent1"/>
-            </a:effectRef>
-            <a:fontRef idx="minor">
-              <a:schemeClr val="lt1"/>
-            </a:fontRef>
-          </p:style>
-          <p:txBody>
-            <a:bodyPr rtlCol="0" anchor="ctr"/>
-            <a:lstStyle/>
-            <a:p>
-              <a:pPr algn="ctr"/>
-              <a:endParaRPr lang="fr-FR"/>
-            </a:p>
-          </p:txBody>
-        </p:sp>
-      </p:grpSp>
-      <p:sp>
-        <p:nvSpPr>
-          <p:cNvPr id="15" name="ZoneTexte 14">
-            <a:extLst>
-              <a:ext uri="{FF2B5EF4-FFF2-40B4-BE49-F238E27FC236}">
-                <a16:creationId xmlns:a16="http://schemas.microsoft.com/office/drawing/2014/main" id="{F0CCCD4C-73B8-500E-6EFC-DBF78E6F546F}"/>
-              </a:ext>
-            </a:extLst>
-          </p:cNvPr>
-          <p:cNvSpPr txBox="1"/>
-          <p:nvPr/>
-        </p:nvSpPr>
-        <p:spPr>
-          <a:xfrm>
-            <a:off x="3271035" y="2647574"/>
-            <a:ext cx="7984793" cy="644857"/>
-          </a:xfrm>
-          <a:prstGeom prst="rect">
-            <a:avLst/>
-          </a:prstGeom>
-          <a:noFill/>
-        </p:spPr>
-        <p:txBody>
-          <a:bodyPr wrap="square">
-            <a:spAutoFit/>
-          </a:bodyPr>
-          <a:lstStyle/>
-          <a:p>
-            <a:pPr algn="just">
-              <a:lnSpc>
-                <a:spcPts val="2143"/>
-              </a:lnSpc>
-              <a:spcBef>
-                <a:spcPts val="1029"/>
-              </a:spcBef>
-              <a:spcAft>
-                <a:spcPts val="1029"/>
-              </a:spcAft>
-            </a:pPr>
-            <a:r>
-              <a:rPr lang="fr-FR" sz="2400" b="0" i="0" dirty="0">
-                <a:solidFill>
-                  <a:srgbClr val="404040"/>
-                </a:solidFill>
-                <a:effectLst/>
-                <a:latin typeface="Gill Sans MT" panose="020B0502020104020203" pitchFamily="34" charset="0"/>
-              </a:rPr>
-              <a:t>Identifier les facteurs socio-économiques, démographiques et spatiaux influençant le taux de consultations</a:t>
-            </a:r>
-            <a:endParaRPr lang="fr-FR" sz="2400" dirty="0">
-              <a:latin typeface="Gill Sans MT" panose="020B0502020104020203" pitchFamily="34" charset="0"/>
-            </a:endParaRPr>
-          </a:p>
-        </p:txBody>
-      </p:sp>
-      <p:grpSp>
-        <p:nvGrpSpPr>
-          <p:cNvPr id="19" name="Groupe 18">
-            <a:extLst>
-              <a:ext uri="{FF2B5EF4-FFF2-40B4-BE49-F238E27FC236}">
-                <a16:creationId xmlns:a16="http://schemas.microsoft.com/office/drawing/2014/main" id="{B32077B7-68FF-8583-E5BA-6D4C6199B2FF}"/>
-              </a:ext>
-            </a:extLst>
-          </p:cNvPr>
-          <p:cNvGrpSpPr/>
-          <p:nvPr/>
-        </p:nvGrpSpPr>
-        <p:grpSpPr>
-          <a:xfrm>
-            <a:off x="152401" y="2624966"/>
-            <a:ext cx="2883995" cy="538782"/>
-            <a:chOff x="1621972" y="1405339"/>
-            <a:chExt cx="2883995" cy="538782"/>
-          </a:xfrm>
-        </p:grpSpPr>
-        <p:sp>
-          <p:nvSpPr>
-            <p:cNvPr id="20" name="Rectangle : coins arrondis 19">
-              <a:extLst>
-                <a:ext uri="{FF2B5EF4-FFF2-40B4-BE49-F238E27FC236}">
-                  <a16:creationId xmlns:a16="http://schemas.microsoft.com/office/drawing/2014/main" id="{3F06EF53-242C-6BF9-C239-E6386CD4EE98}"/>
-                </a:ext>
-              </a:extLst>
-            </p:cNvPr>
-            <p:cNvSpPr/>
-            <p:nvPr/>
-          </p:nvSpPr>
-          <p:spPr>
-            <a:xfrm>
-              <a:off x="1959429" y="1405339"/>
-              <a:ext cx="2546538" cy="522872"/>
-            </a:xfrm>
-            <a:prstGeom prst="roundRect">
-              <a:avLst>
-                <a:gd name="adj" fmla="val 50000"/>
-              </a:avLst>
-            </a:prstGeom>
-            <a:solidFill>
-              <a:srgbClr val="006A5A"/>
-            </a:solidFill>
-            <a:ln>
-              <a:noFill/>
-            </a:ln>
-          </p:spPr>
-          <p:style>
-            <a:lnRef idx="2">
-              <a:schemeClr val="accent1">
-                <a:shade val="15000"/>
-              </a:schemeClr>
-            </a:lnRef>
-            <a:fillRef idx="1">
-              <a:schemeClr val="accent1"/>
-            </a:fillRef>
-            <a:effectRef idx="0">
-              <a:schemeClr val="accent1"/>
-            </a:effectRef>
-            <a:fontRef idx="minor">
-              <a:schemeClr val="lt1"/>
-            </a:fontRef>
-          </p:style>
-          <p:txBody>
-            <a:bodyPr rtlCol="0" anchor="ctr"/>
-            <a:lstStyle/>
-            <a:p>
-              <a:pPr algn="ctr"/>
-              <a:r>
-                <a:rPr lang="fr-FR" sz="2400" b="1" dirty="0">
-                  <a:latin typeface="Gill Sans MT" panose="020B0502020104020203" pitchFamily="34" charset="0"/>
-                </a:rPr>
-                <a:t>Problématique</a:t>
-              </a:r>
-            </a:p>
-          </p:txBody>
-        </p:sp>
-        <p:sp>
-          <p:nvSpPr>
-            <p:cNvPr id="21" name="Ellipse 20">
-              <a:extLst>
-                <a:ext uri="{FF2B5EF4-FFF2-40B4-BE49-F238E27FC236}">
-                  <a16:creationId xmlns:a16="http://schemas.microsoft.com/office/drawing/2014/main" id="{FCDD2A58-1E7E-68A5-7E44-A3204A77B173}"/>
-                </a:ext>
-              </a:extLst>
-            </p:cNvPr>
-            <p:cNvSpPr/>
-            <p:nvPr/>
-          </p:nvSpPr>
-          <p:spPr>
-            <a:xfrm>
-              <a:off x="1621972" y="1421249"/>
-              <a:ext cx="522872" cy="522872"/>
-            </a:xfrm>
-            <a:prstGeom prst="ellipse">
-              <a:avLst/>
-            </a:prstGeom>
-            <a:solidFill>
-              <a:schemeClr val="accent2"/>
-            </a:solidFill>
-            <a:ln>
-              <a:noFill/>
-            </a:ln>
-          </p:spPr>
-          <p:style>
-            <a:lnRef idx="2">
-              <a:schemeClr val="accent1">
-                <a:shade val="15000"/>
-              </a:schemeClr>
-            </a:lnRef>
-            <a:fillRef idx="1">
-              <a:schemeClr val="accent1"/>
-            </a:fillRef>
-            <a:effectRef idx="0">
-              <a:schemeClr val="accent1"/>
-            </a:effectRef>
-            <a:fontRef idx="minor">
-              <a:schemeClr val="lt1"/>
-            </a:fontRef>
-          </p:style>
-          <p:txBody>
-            <a:bodyPr rtlCol="0" anchor="ctr"/>
-            <a:lstStyle/>
-            <a:p>
-              <a:pPr algn="ctr"/>
-              <a:endParaRPr lang="fr-FR"/>
-            </a:p>
-          </p:txBody>
-        </p:sp>
-      </p:grpSp>
-      <p:grpSp>
-        <p:nvGrpSpPr>
-          <p:cNvPr id="22" name="Groupe 21">
-            <a:extLst>
-              <a:ext uri="{FF2B5EF4-FFF2-40B4-BE49-F238E27FC236}">
-                <a16:creationId xmlns:a16="http://schemas.microsoft.com/office/drawing/2014/main" id="{D6D82661-F38D-D88D-F8AC-3A6EAB4450B0}"/>
-              </a:ext>
-            </a:extLst>
-          </p:cNvPr>
-          <p:cNvGrpSpPr/>
-          <p:nvPr/>
-        </p:nvGrpSpPr>
-        <p:grpSpPr>
-          <a:xfrm>
-            <a:off x="152401" y="3669997"/>
-            <a:ext cx="2024742" cy="538782"/>
-            <a:chOff x="1621972" y="1405339"/>
-            <a:chExt cx="2024742" cy="538782"/>
-          </a:xfrm>
-        </p:grpSpPr>
-        <p:sp>
-          <p:nvSpPr>
-            <p:cNvPr id="23" name="Rectangle : coins arrondis 22">
-              <a:extLst>
-                <a:ext uri="{FF2B5EF4-FFF2-40B4-BE49-F238E27FC236}">
-                  <a16:creationId xmlns:a16="http://schemas.microsoft.com/office/drawing/2014/main" id="{0B4B3CA1-25EE-0DBC-61A6-EACDC061F948}"/>
-                </a:ext>
-              </a:extLst>
-            </p:cNvPr>
-            <p:cNvSpPr/>
-            <p:nvPr/>
-          </p:nvSpPr>
-          <p:spPr>
-            <a:xfrm>
-              <a:off x="1959429" y="1405339"/>
-              <a:ext cx="1687285" cy="522872"/>
-            </a:xfrm>
-            <a:prstGeom prst="roundRect">
-              <a:avLst>
-                <a:gd name="adj" fmla="val 50000"/>
-              </a:avLst>
-            </a:prstGeom>
-            <a:solidFill>
-              <a:srgbClr val="006A5A"/>
-            </a:solidFill>
-            <a:ln>
-              <a:noFill/>
-            </a:ln>
-          </p:spPr>
-          <p:style>
-            <a:lnRef idx="2">
-              <a:schemeClr val="accent1">
-                <a:shade val="15000"/>
-              </a:schemeClr>
-            </a:lnRef>
-            <a:fillRef idx="1">
-              <a:schemeClr val="accent1"/>
-            </a:fillRef>
-            <a:effectRef idx="0">
-              <a:schemeClr val="accent1"/>
-            </a:effectRef>
-            <a:fontRef idx="minor">
-              <a:schemeClr val="lt1"/>
-            </a:fontRef>
-          </p:style>
-          <p:txBody>
-            <a:bodyPr rtlCol="0" anchor="ctr"/>
-            <a:lstStyle/>
-            <a:p>
-              <a:pPr algn="ctr"/>
-              <a:r>
-                <a:rPr lang="fr-FR" sz="2400" b="1" dirty="0">
-                  <a:latin typeface="Gill Sans MT" panose="020B0502020104020203" pitchFamily="34" charset="0"/>
-                </a:rPr>
-                <a:t>Objectifs</a:t>
-              </a:r>
-            </a:p>
-          </p:txBody>
-        </p:sp>
-        <p:sp>
-          <p:nvSpPr>
-            <p:cNvPr id="24" name="Ellipse 23">
-              <a:extLst>
-                <a:ext uri="{FF2B5EF4-FFF2-40B4-BE49-F238E27FC236}">
-                  <a16:creationId xmlns:a16="http://schemas.microsoft.com/office/drawing/2014/main" id="{14B93CAC-4DFB-F0BB-8646-C8C6109CC018}"/>
-                </a:ext>
-              </a:extLst>
-            </p:cNvPr>
-            <p:cNvSpPr/>
-            <p:nvPr/>
-          </p:nvSpPr>
-          <p:spPr>
-            <a:xfrm>
-              <a:off x="1621972" y="1421249"/>
-              <a:ext cx="522872" cy="522872"/>
-            </a:xfrm>
-            <a:prstGeom prst="ellipse">
-              <a:avLst/>
-            </a:prstGeom>
-            <a:solidFill>
-              <a:schemeClr val="accent2"/>
-            </a:solidFill>
-            <a:ln>
-              <a:noFill/>
-            </a:ln>
-          </p:spPr>
-          <p:style>
-            <a:lnRef idx="2">
-              <a:schemeClr val="accent1">
-                <a:shade val="15000"/>
-              </a:schemeClr>
-            </a:lnRef>
-            <a:fillRef idx="1">
-              <a:schemeClr val="accent1"/>
-            </a:fillRef>
-            <a:effectRef idx="0">
-              <a:schemeClr val="accent1"/>
-            </a:effectRef>
-            <a:fontRef idx="minor">
-              <a:schemeClr val="lt1"/>
-            </a:fontRef>
-          </p:style>
-          <p:txBody>
-            <a:bodyPr rtlCol="0" anchor="ctr"/>
-            <a:lstStyle/>
-            <a:p>
-              <a:pPr algn="ctr"/>
-              <a:endParaRPr lang="fr-FR"/>
-            </a:p>
-          </p:txBody>
-        </p:sp>
-      </p:grpSp>
-      <p:sp>
-        <p:nvSpPr>
-          <p:cNvPr id="25" name="ZoneTexte 24">
-            <a:extLst>
-              <a:ext uri="{FF2B5EF4-FFF2-40B4-BE49-F238E27FC236}">
-                <a16:creationId xmlns:a16="http://schemas.microsoft.com/office/drawing/2014/main" id="{5272EEDB-5531-D0B6-EBD6-2438CB98641A}"/>
-              </a:ext>
-            </a:extLst>
-          </p:cNvPr>
-          <p:cNvSpPr txBox="1"/>
-          <p:nvPr/>
-        </p:nvSpPr>
-        <p:spPr>
-          <a:xfrm>
-            <a:off x="1997528" y="3847080"/>
-            <a:ext cx="8392885" cy="367729"/>
-          </a:xfrm>
-          <a:prstGeom prst="rect">
-            <a:avLst/>
-          </a:prstGeom>
-          <a:noFill/>
-        </p:spPr>
-        <p:txBody>
-          <a:bodyPr wrap="square">
-            <a:spAutoFit/>
-          </a:bodyPr>
-          <a:lstStyle/>
-          <a:p>
-            <a:pPr lvl="1" algn="ctr">
-              <a:lnSpc>
-                <a:spcPts val="2143"/>
-              </a:lnSpc>
-              <a:spcBef>
-                <a:spcPts val="300"/>
-              </a:spcBef>
-              <a:spcAft>
-                <a:spcPts val="1029"/>
-              </a:spcAft>
-            </a:pPr>
-            <a:r>
-              <a:rPr lang="fr-FR" sz="2400" b="0" i="0" dirty="0">
-                <a:solidFill>
-                  <a:srgbClr val="404040"/>
-                </a:solidFill>
-                <a:effectLst/>
-                <a:latin typeface="Gill Sans MT" panose="020B0502020104020203" pitchFamily="34" charset="0"/>
-              </a:rPr>
-              <a:t>Modéliser le taux de consultations avec une approche spatiale.</a:t>
-            </a:r>
-          </a:p>
-        </p:txBody>
-      </p:sp>
-      <p:sp>
-        <p:nvSpPr>
-          <p:cNvPr id="28" name="Rectangle : coins arrondis 27">
-            <a:extLst>
-              <a:ext uri="{FF2B5EF4-FFF2-40B4-BE49-F238E27FC236}">
-                <a16:creationId xmlns:a16="http://schemas.microsoft.com/office/drawing/2014/main" id="{24C3065A-1C45-96EA-E252-8CF3DCA501CC}"/>
-              </a:ext>
-            </a:extLst>
-          </p:cNvPr>
-          <p:cNvSpPr/>
-          <p:nvPr/>
-        </p:nvSpPr>
-        <p:spPr>
-          <a:xfrm>
-            <a:off x="2177143" y="4354905"/>
-            <a:ext cx="8599713" cy="2209181"/>
-          </a:xfrm>
-          <a:prstGeom prst="roundRect">
-            <a:avLst>
-              <a:gd name="adj" fmla="val 25536"/>
-            </a:avLst>
-          </a:prstGeom>
-          <a:noFill/>
-          <a:ln w="38100">
-            <a:solidFill>
-              <a:srgbClr val="006A5A"/>
-            </a:solidFill>
-          </a:ln>
-        </p:spPr>
-        <p:style>
-          <a:lnRef idx="2">
-            <a:schemeClr val="accent1">
-              <a:shade val="15000"/>
-            </a:schemeClr>
-          </a:lnRef>
-          <a:fillRef idx="1">
-            <a:schemeClr val="accent1"/>
-          </a:fillRef>
-          <a:effectRef idx="0">
-            <a:schemeClr val="accent1"/>
-          </a:effectRef>
-          <a:fontRef idx="minor">
-            <a:schemeClr val="lt1"/>
-          </a:fontRef>
-        </p:style>
-        <p:txBody>
-          <a:bodyPr rtlCol="0" anchor="ctr"/>
-          <a:lstStyle/>
-          <a:p>
-            <a:pPr algn="ctr"/>
-            <a:endParaRPr lang="fr-FR"/>
-          </a:p>
-        </p:txBody>
-      </p:sp>
-      <p:sp>
-        <p:nvSpPr>
-          <p:cNvPr id="29" name="ZoneTexte 28">
-            <a:extLst>
-              <a:ext uri="{FF2B5EF4-FFF2-40B4-BE49-F238E27FC236}">
-                <a16:creationId xmlns:a16="http://schemas.microsoft.com/office/drawing/2014/main" id="{7C997150-358C-394F-6876-D61E7CFCA646}"/>
-              </a:ext>
-            </a:extLst>
-          </p:cNvPr>
-          <p:cNvSpPr txBox="1"/>
-          <p:nvPr/>
-        </p:nvSpPr>
-        <p:spPr>
-          <a:xfrm>
-            <a:off x="1894115" y="4559633"/>
-            <a:ext cx="8599712" cy="1799723"/>
-          </a:xfrm>
-          <a:prstGeom prst="rect">
-            <a:avLst/>
-          </a:prstGeom>
-          <a:noFill/>
-        </p:spPr>
-        <p:txBody>
-          <a:bodyPr wrap="square">
-            <a:spAutoFit/>
-          </a:bodyPr>
-          <a:lstStyle/>
-          <a:p>
-            <a:pPr marL="914400" lvl="1" indent="-457200" algn="just">
-              <a:lnSpc>
-                <a:spcPts val="2143"/>
-              </a:lnSpc>
-              <a:spcBef>
-                <a:spcPts val="300"/>
-              </a:spcBef>
-              <a:spcAft>
-                <a:spcPts val="1029"/>
-              </a:spcAft>
-              <a:buFont typeface="+mj-lt"/>
-              <a:buAutoNum type="arabicPeriod"/>
-            </a:pPr>
-            <a:r>
-              <a:rPr lang="fr-FR" sz="2400" dirty="0">
-                <a:solidFill>
-                  <a:srgbClr val="404040"/>
-                </a:solidFill>
-                <a:latin typeface="Gill Sans MT" panose="020B0502020104020203" pitchFamily="34" charset="0"/>
-              </a:rPr>
-              <a:t>Visualiser la répartition spatiale de ces taux en vue d’identifier les zones à fort et faible taux</a:t>
-            </a:r>
-          </a:p>
-          <a:p>
-            <a:pPr marL="914400" lvl="1" indent="-457200" algn="just">
-              <a:lnSpc>
-                <a:spcPts val="2143"/>
-              </a:lnSpc>
-              <a:spcBef>
-                <a:spcPts val="300"/>
-              </a:spcBef>
-              <a:spcAft>
-                <a:spcPts val="1029"/>
-              </a:spcAft>
-              <a:buFont typeface="+mj-lt"/>
-              <a:buAutoNum type="arabicPeriod"/>
-            </a:pPr>
-            <a:r>
-              <a:rPr lang="fr-FR" sz="2400" dirty="0">
-                <a:latin typeface="Gill Sans MT" panose="020B0502020104020203" pitchFamily="34" charset="0"/>
-              </a:rPr>
-              <a:t>Identifier les facteurs socio-économiques et démographiques qui influencent le taux de consultations</a:t>
-            </a:r>
-          </a:p>
-          <a:p>
-            <a:pPr marL="914400" lvl="1" indent="-457200" algn="just">
-              <a:lnSpc>
-                <a:spcPts val="2143"/>
-              </a:lnSpc>
-              <a:spcBef>
-                <a:spcPts val="300"/>
-              </a:spcBef>
-              <a:spcAft>
-                <a:spcPts val="1029"/>
-              </a:spcAft>
-              <a:buFont typeface="+mj-lt"/>
-              <a:buAutoNum type="arabicPeriod"/>
-            </a:pPr>
-            <a:r>
-              <a:rPr lang="fr-FR" sz="2400" b="0" i="0" dirty="0">
-                <a:solidFill>
-                  <a:srgbClr val="404040"/>
-                </a:solidFill>
-                <a:effectLst/>
-                <a:latin typeface="Gill Sans MT" panose="020B0502020104020203" pitchFamily="34" charset="0"/>
-              </a:rPr>
-              <a:t>Proposer des recommandations pour réduire les inégalités.</a:t>
-            </a:r>
-          </a:p>
-        </p:txBody>
-      </p:sp>
-    </p:spTree>
-    <p:extLst>
-      <p:ext uri="{BB962C8B-B14F-4D97-AF65-F5344CB8AC3E}">
-        <p14:creationId xmlns:p14="http://schemas.microsoft.com/office/powerpoint/2010/main" val="413827849"/>
-      </p:ext>
-    </p:extLst>
-  </p:cSld>
-  <p:clrMapOvr>
-    <a:masterClrMapping/>
-  </p:clrMapOvr>
-</p:sld>
-</file>
-
-<file path=ppt/slides/slide30.xml><?xml version="1.0" encoding="utf-8"?>
+<file path=ppt/slides/slide32.xml><?xml version="1.0" encoding="utf-8"?>
 <p:sld xmlns:a="http://schemas.openxmlformats.org/drawingml/2006/main" xmlns:r="http://schemas.openxmlformats.org/officeDocument/2006/relationships" xmlns:p="http://schemas.openxmlformats.org/presentationml/2006/main">
   <p:cSld>
     <p:spTree>
@@ -13555,7 +15818,7 @@
             <a:fld id="{F546B7B7-7D14-4795-A998-350CFB2BDD43}" type="slidenum">
               <a:rPr lang="fr-FR" smtClean="0"/>
               <a:pPr/>
-              <a:t>30</a:t>
+              <a:t>32</a:t>
             </a:fld>
             <a:endParaRPr lang="fr-FR" dirty="0"/>
           </a:p>
@@ -14178,7 +16441,7 @@
 </p:sld>
 </file>
 
-<file path=ppt/slides/slide31.xml><?xml version="1.0" encoding="utf-8"?>
+<file path=ppt/slides/slide33.xml><?xml version="1.0" encoding="utf-8"?>
 <p:sld xmlns:a="http://schemas.openxmlformats.org/drawingml/2006/main" xmlns:r="http://schemas.openxmlformats.org/officeDocument/2006/relationships" xmlns:p="http://schemas.openxmlformats.org/presentationml/2006/main">
   <p:cSld>
     <p:spTree>
@@ -14219,7 +16482,7 @@
             <a:fld id="{F546B7B7-7D14-4795-A998-350CFB2BDD43}" type="slidenum">
               <a:rPr lang="fr-FR" smtClean="0"/>
               <a:pPr/>
-              <a:t>31</a:t>
+              <a:t>33</a:t>
             </a:fld>
             <a:endParaRPr lang="fr-FR"/>
           </a:p>
@@ -14238,7 +16501,7 @@
 </p:sld>
 </file>
 
-<file path=ppt/slides/slide32.xml><?xml version="1.0" encoding="utf-8"?>
+<file path=ppt/slides/slide34.xml><?xml version="1.0" encoding="utf-8"?>
 <p:sld xmlns:a="http://schemas.openxmlformats.org/drawingml/2006/main" xmlns:r="http://schemas.openxmlformats.org/officeDocument/2006/relationships" xmlns:p="http://schemas.openxmlformats.org/presentationml/2006/main">
   <p:cSld>
     <p:spTree>
@@ -14285,7 +16548,7 @@
             <a:fld id="{F546B7B7-7D14-4795-A998-350CFB2BDD43}" type="slidenum">
               <a:rPr lang="fr-FR" smtClean="0"/>
               <a:pPr/>
-              <a:t>32</a:t>
+              <a:t>34</a:t>
             </a:fld>
             <a:endParaRPr lang="fr-FR" dirty="0"/>
           </a:p>
@@ -14883,7 +17146,7 @@
 </p:sld>
 </file>
 
-<file path=ppt/slides/slide33.xml><?xml version="1.0" encoding="utf-8"?>
+<file path=ppt/slides/slide35.xml><?xml version="1.0" encoding="utf-8"?>
 <p:sld xmlns:a="http://schemas.openxmlformats.org/drawingml/2006/main" xmlns:r="http://schemas.openxmlformats.org/officeDocument/2006/relationships" xmlns:p="http://schemas.openxmlformats.org/presentationml/2006/main">
   <p:cSld>
     <p:spTree>
@@ -15030,7 +17293,7 @@
                 <a:latin typeface="Montserrat" panose="02000505000000020004" pitchFamily="2" charset="0"/>
               </a:rPr>
               <a:pPr algn="r"/>
-              <a:t>33</a:t>
+              <a:t>35</a:t>
             </a:fld>
             <a:endParaRPr lang="fr-FR" dirty="0">
               <a:solidFill>
@@ -16432,7 +18695,7 @@
                 </a:solidFill>
                 <a:latin typeface="Gill Sans MT" panose="020B0502020104020203" pitchFamily="34" charset="0"/>
               </a:rPr>
-              <a:t>SOMMAIRE</a:t>
+              <a:t>PLAN</a:t>
             </a:r>
           </a:p>
         </p:txBody>

</xml_diff>

<commit_message>
Modifs Samedi 26 Avril
</commit_message>
<xml_diff>
--- a/Présentation/Soutenance_Groupe25.pptx
+++ b/Présentation/Soutenance_Groupe25.pptx
@@ -9,10 +9,10 @@
     <p:sldMasterId id="2147483672" r:id="rId5"/>
   </p:sldMasterIdLst>
   <p:notesMasterIdLst>
-    <p:notesMasterId r:id="rId41"/>
+    <p:notesMasterId r:id="rId38"/>
   </p:notesMasterIdLst>
   <p:handoutMasterIdLst>
-    <p:handoutMasterId r:id="rId42"/>
+    <p:handoutMasterId r:id="rId39"/>
   </p:handoutMasterIdLst>
   <p:sldIdLst>
     <p:sldId id="257" r:id="rId6"/>
@@ -21,35 +21,32 @@
     <p:sldId id="295" r:id="rId9"/>
     <p:sldId id="263" r:id="rId10"/>
     <p:sldId id="264" r:id="rId11"/>
-    <p:sldId id="289" r:id="rId12"/>
-    <p:sldId id="275" r:id="rId13"/>
-    <p:sldId id="293" r:id="rId14"/>
-    <p:sldId id="291" r:id="rId15"/>
-    <p:sldId id="265" r:id="rId16"/>
-    <p:sldId id="266" r:id="rId17"/>
-    <p:sldId id="277" r:id="rId18"/>
-    <p:sldId id="278" r:id="rId19"/>
-    <p:sldId id="296" r:id="rId20"/>
-    <p:sldId id="267" r:id="rId21"/>
-    <p:sldId id="301" r:id="rId22"/>
-    <p:sldId id="302" r:id="rId23"/>
-    <p:sldId id="303" r:id="rId24"/>
-    <p:sldId id="304" r:id="rId25"/>
-    <p:sldId id="305" r:id="rId26"/>
-    <p:sldId id="269" r:id="rId27"/>
-    <p:sldId id="270" r:id="rId28"/>
-    <p:sldId id="282" r:id="rId29"/>
-    <p:sldId id="283" r:id="rId30"/>
-    <p:sldId id="284" r:id="rId31"/>
-    <p:sldId id="298" r:id="rId32"/>
-    <p:sldId id="285" r:id="rId33"/>
-    <p:sldId id="299" r:id="rId34"/>
-    <p:sldId id="272" r:id="rId35"/>
-    <p:sldId id="271" r:id="rId36"/>
-    <p:sldId id="297" r:id="rId37"/>
-    <p:sldId id="261" r:id="rId38"/>
-    <p:sldId id="273" r:id="rId39"/>
-    <p:sldId id="274" r:id="rId40"/>
+    <p:sldId id="275" r:id="rId12"/>
+    <p:sldId id="293" r:id="rId13"/>
+    <p:sldId id="265" r:id="rId14"/>
+    <p:sldId id="266" r:id="rId15"/>
+    <p:sldId id="277" r:id="rId16"/>
+    <p:sldId id="278" r:id="rId17"/>
+    <p:sldId id="267" r:id="rId18"/>
+    <p:sldId id="301" r:id="rId19"/>
+    <p:sldId id="302" r:id="rId20"/>
+    <p:sldId id="303" r:id="rId21"/>
+    <p:sldId id="304" r:id="rId22"/>
+    <p:sldId id="305" r:id="rId23"/>
+    <p:sldId id="269" r:id="rId24"/>
+    <p:sldId id="270" r:id="rId25"/>
+    <p:sldId id="282" r:id="rId26"/>
+    <p:sldId id="283" r:id="rId27"/>
+    <p:sldId id="284" r:id="rId28"/>
+    <p:sldId id="298" r:id="rId29"/>
+    <p:sldId id="285" r:id="rId30"/>
+    <p:sldId id="299" r:id="rId31"/>
+    <p:sldId id="272" r:id="rId32"/>
+    <p:sldId id="271" r:id="rId33"/>
+    <p:sldId id="297" r:id="rId34"/>
+    <p:sldId id="261" r:id="rId35"/>
+    <p:sldId id="273" r:id="rId36"/>
+    <p:sldId id="274" r:id="rId37"/>
   </p:sldIdLst>
   <p:sldSz cx="12192000" cy="6858000"/>
   <p:notesSz cx="6858000" cy="9144000"/>
@@ -250,7 +247,7 @@
           <a:p>
             <a:fld id="{02EF5511-433E-438D-93BB-1E1EB804EB9E}" type="datetimeFigureOut">
               <a:rPr lang="fr-FR" smtClean="0"/>
-              <a:t>23/04/2025</a:t>
+              <a:t>26/04/2025</a:t>
             </a:fld>
             <a:endParaRPr lang="fr-FR"/>
           </a:p>
@@ -428,7 +425,7 @@
           <a:p>
             <a:fld id="{173019D8-EACC-4538-984E-33CCC42DAA4E}" type="datetimeFigureOut">
               <a:rPr lang="fr-FR" smtClean="0"/>
-              <a:t>23/04/2025</a:t>
+              <a:t>26/04/2025</a:t>
             </a:fld>
             <a:endParaRPr lang="fr-FR"/>
           </a:p>
@@ -909,7 +906,7 @@
           <a:p>
             <a:fld id="{45C44DBB-F87B-49EA-91FB-EDB78BBE8593}" type="slidenum">
               <a:rPr lang="fr-FR" smtClean="0"/>
-              <a:t>12</a:t>
+              <a:t>10</a:t>
             </a:fld>
             <a:endParaRPr lang="fr-FR"/>
           </a:p>
@@ -1045,7 +1042,7 @@
           <a:p>
             <a:fld id="{45C44DBB-F87B-49EA-91FB-EDB78BBE8593}" type="slidenum">
               <a:rPr lang="fr-FR" smtClean="0"/>
-              <a:t>13</a:t>
+              <a:t>11</a:t>
             </a:fld>
             <a:endParaRPr lang="fr-FR"/>
           </a:p>
@@ -1179,7 +1176,7 @@
           <a:p>
             <a:fld id="{45C44DBB-F87B-49EA-91FB-EDB78BBE8593}" type="slidenum">
               <a:rPr lang="fr-FR" smtClean="0"/>
-              <a:t>23</a:t>
+              <a:t>20</a:t>
             </a:fld>
             <a:endParaRPr lang="fr-FR"/>
           </a:p>
@@ -1274,7 +1271,7 @@
           <a:p>
             <a:fld id="{45C44DBB-F87B-49EA-91FB-EDB78BBE8593}" type="slidenum">
               <a:rPr lang="fr-FR" smtClean="0"/>
-              <a:t>31</a:t>
+              <a:t>28</a:t>
             </a:fld>
             <a:endParaRPr lang="fr-FR"/>
           </a:p>
@@ -1385,7 +1382,7 @@
           <a:p>
             <a:fld id="{45C44DBB-F87B-49EA-91FB-EDB78BBE8593}" type="slidenum">
               <a:rPr lang="fr-FR" smtClean="0"/>
-              <a:t>32</a:t>
+              <a:t>29</a:t>
             </a:fld>
             <a:endParaRPr lang="fr-FR"/>
           </a:p>
@@ -1545,7 +1542,7 @@
             <a:fld id="{B4BDA9CF-F2B2-41BE-8486-9C59032E0655}" type="datetime4">
               <a:rPr lang="fr-FR" smtClean="0"/>
               <a:pPr/>
-              <a:t>23 avril 2025</a:t>
+              <a:t>26 avril 2025</a:t>
             </a:fld>
             <a:endParaRPr lang="fr-FR" dirty="0"/>
           </a:p>
@@ -7638,13 +7635,7 @@
   <p:cSld>
     <p:spTree>
       <p:nvGrpSpPr>
-        <p:cNvPr id="1" name="">
-          <a:extLst>
-            <a:ext uri="{FF2B5EF4-FFF2-40B4-BE49-F238E27FC236}">
-              <a16:creationId xmlns:a16="http://schemas.microsoft.com/office/drawing/2014/main" id="{E6241B86-8E7D-90B3-9C81-3BDF445D67A5}"/>
-            </a:ext>
-          </a:extLst>
-        </p:cNvPr>
+        <p:cNvPr id="1" name=""/>
         <p:cNvGrpSpPr/>
         <p:nvPr/>
       </p:nvGrpSpPr>
@@ -7658,10 +7649,10 @@
       </p:grpSpPr>
       <p:sp>
         <p:nvSpPr>
-          <p:cNvPr id="3" name="Espace réservé du numéro de diapositive 2">
+          <p:cNvPr id="2" name="Espace réservé du numéro de diapositive 1">
             <a:extLst>
               <a:ext uri="{FF2B5EF4-FFF2-40B4-BE49-F238E27FC236}">
-                <a16:creationId xmlns:a16="http://schemas.microsoft.com/office/drawing/2014/main" id="{06C1BD33-3102-6148-2C28-9BC659076D70}"/>
+                <a16:creationId xmlns:a16="http://schemas.microsoft.com/office/drawing/2014/main" id="{3C9AC15D-D109-9768-8977-CF168595D874}"/>
               </a:ext>
             </a:extLst>
           </p:cNvPr>
@@ -7672,12 +7663,7 @@
             <p:ph type="sldNum" sz="quarter" idx="4"/>
           </p:nvPr>
         </p:nvSpPr>
-        <p:spPr>
-          <a:xfrm>
-            <a:off x="8610600" y="6356350"/>
-            <a:ext cx="2743200" cy="365125"/>
-          </a:xfrm>
-        </p:spPr>
+        <p:spPr/>
         <p:txBody>
           <a:bodyPr/>
           <a:lstStyle/>
@@ -7693,10 +7679,10 @@
       </p:sp>
       <p:sp>
         <p:nvSpPr>
-          <p:cNvPr id="2" name="ZoneTexte 1">
+          <p:cNvPr id="3" name="ZoneTexte 2">
             <a:extLst>
               <a:ext uri="{FF2B5EF4-FFF2-40B4-BE49-F238E27FC236}">
-                <a16:creationId xmlns:a16="http://schemas.microsoft.com/office/drawing/2014/main" id="{60868D0B-ED35-F808-6D83-05507129356A}"/>
+                <a16:creationId xmlns:a16="http://schemas.microsoft.com/office/drawing/2014/main" id="{ABD51FAC-0FBC-21FF-D03C-FE7F761AA6BC}"/>
               </a:ext>
             </a:extLst>
           </p:cNvPr>
@@ -7728,542 +7714,6 @@
                 </a:solidFill>
                 <a:latin typeface="Gill Sans MT" panose="020B0502020104020203" pitchFamily="34" charset="0"/>
               </a:rPr>
-              <a:t>1.2. Revue de littérature</a:t>
-            </a:r>
-          </a:p>
-        </p:txBody>
-      </p:sp>
-      <p:pic>
-        <p:nvPicPr>
-          <p:cNvPr id="4" name="Graphique 3" descr="Flèches de chevron">
-            <a:extLst>
-              <a:ext uri="{FF2B5EF4-FFF2-40B4-BE49-F238E27FC236}">
-                <a16:creationId xmlns:a16="http://schemas.microsoft.com/office/drawing/2014/main" id="{C6042DE6-4112-6205-5E3C-7E38A4AE54F2}"/>
-              </a:ext>
-            </a:extLst>
-          </p:cNvPr>
-          <p:cNvPicPr>
-            <a:picLocks noChangeAspect="1"/>
-          </p:cNvPicPr>
-          <p:nvPr/>
-        </p:nvPicPr>
-        <p:blipFill>
-          <a:blip r:embed="rId2">
-            <a:extLst>
-              <a:ext uri="{28A0092B-C50C-407E-A947-70E740481C1C}">
-                <a14:useLocalDpi xmlns:a14="http://schemas.microsoft.com/office/drawing/2010/main" val="0"/>
-              </a:ext>
-              <a:ext uri="{96DAC541-7B7A-43D3-8B79-37D633B846F1}">
-                <asvg:svgBlip xmlns:asvg="http://schemas.microsoft.com/office/drawing/2016/SVG/main" r:embed="rId3"/>
-              </a:ext>
-            </a:extLst>
-          </a:blip>
-          <a:stretch>
-            <a:fillRect/>
-          </a:stretch>
-        </p:blipFill>
-        <p:spPr>
-          <a:xfrm>
-            <a:off x="11078692" y="266700"/>
-            <a:ext cx="1170459" cy="1170459"/>
-          </a:xfrm>
-          <a:prstGeom prst="rect">
-            <a:avLst/>
-          </a:prstGeom>
-        </p:spPr>
-      </p:pic>
-      <p:sp>
-        <p:nvSpPr>
-          <p:cNvPr id="6" name="ZoneTexte 5">
-            <a:extLst>
-              <a:ext uri="{FF2B5EF4-FFF2-40B4-BE49-F238E27FC236}">
-                <a16:creationId xmlns:a16="http://schemas.microsoft.com/office/drawing/2014/main" id="{B99BA82A-6A49-2480-8AF1-92E36FD5DF5E}"/>
-              </a:ext>
-            </a:extLst>
-          </p:cNvPr>
-          <p:cNvSpPr txBox="1"/>
-          <p:nvPr/>
-        </p:nvSpPr>
-        <p:spPr>
-          <a:xfrm>
-            <a:off x="0" y="2280436"/>
-            <a:ext cx="12191999" cy="3863686"/>
-          </a:xfrm>
-          <a:prstGeom prst="rect">
-            <a:avLst/>
-          </a:prstGeom>
-          <a:noFill/>
-          <a:ln>
-            <a:noFill/>
-          </a:ln>
-        </p:spPr>
-        <p:txBody>
-          <a:bodyPr wrap="square">
-            <a:spAutoFit/>
-          </a:bodyPr>
-          <a:lstStyle/>
-          <a:p>
-            <a:pPr marL="342900" indent="-342900">
-              <a:lnSpc>
-                <a:spcPts val="2143"/>
-              </a:lnSpc>
-              <a:spcBef>
-                <a:spcPts val="1372"/>
-              </a:spcBef>
-              <a:spcAft>
-                <a:spcPts val="1029"/>
-              </a:spcAft>
-              <a:buFont typeface="Wingdings" panose="05000000000000000000" pitchFamily="2" charset="2"/>
-              <a:buChar char="§"/>
-            </a:pPr>
-            <a:r>
-              <a:rPr lang="fr-FR" sz="2400" b="1" dirty="0"/>
-              <a:t>Facteurs organisationnels</a:t>
-            </a:r>
-          </a:p>
-          <a:p>
-            <a:pPr marL="800100" lvl="1" indent="-342900">
-              <a:spcBef>
-                <a:spcPts val="300"/>
-              </a:spcBef>
-              <a:buFont typeface="Wingdings" panose="05000000000000000000" pitchFamily="2" charset="2"/>
-              <a:buChar char="ü"/>
-            </a:pPr>
-            <a:r>
-              <a:rPr lang="fr-FR" sz="2400" dirty="0">
-                <a:solidFill>
-                  <a:srgbClr val="404040"/>
-                </a:solidFill>
-                <a:latin typeface="DeepSeek-CJK-patch"/>
-              </a:rPr>
-              <a:t>Disponibilité des structures de soins et </a:t>
-            </a:r>
-            <a:r>
-              <a:rPr lang="fr-FR" sz="2400" dirty="0"/>
-              <a:t>qualité des infrastructures</a:t>
-            </a:r>
-            <a:endParaRPr lang="fr-FR" sz="2400" dirty="0">
-              <a:solidFill>
-                <a:srgbClr val="404040"/>
-              </a:solidFill>
-              <a:latin typeface="DeepSeek-CJK-patch"/>
-            </a:endParaRPr>
-          </a:p>
-          <a:p>
-            <a:pPr marL="800100" lvl="1" indent="-342900">
-              <a:spcBef>
-                <a:spcPts val="300"/>
-              </a:spcBef>
-              <a:buFont typeface="Wingdings" panose="05000000000000000000" pitchFamily="2" charset="2"/>
-              <a:buChar char="ü"/>
-            </a:pPr>
-            <a:r>
-              <a:rPr lang="fr-FR" sz="2400" dirty="0"/>
-              <a:t>Accès aux équipements médicaux et disponibilité des services d’urgence</a:t>
-            </a:r>
-            <a:endParaRPr lang="fr-FR" sz="2400" dirty="0">
-              <a:solidFill>
-                <a:srgbClr val="404040"/>
-              </a:solidFill>
-              <a:latin typeface="DeepSeek-CJK-patch"/>
-            </a:endParaRPr>
-          </a:p>
-          <a:p>
-            <a:pPr marL="800100" lvl="1" indent="-342900">
-              <a:spcBef>
-                <a:spcPts val="300"/>
-              </a:spcBef>
-              <a:buFont typeface="Wingdings" panose="05000000000000000000" pitchFamily="2" charset="2"/>
-              <a:buChar char="ü"/>
-            </a:pPr>
-            <a:r>
-              <a:rPr lang="fr-FR" sz="2400" dirty="0">
-                <a:solidFill>
-                  <a:srgbClr val="404040"/>
-                </a:solidFill>
-                <a:latin typeface="DeepSeek-CJK-patch"/>
-              </a:rPr>
-              <a:t>Horaires d’ouverture des cabinets</a:t>
-            </a:r>
-          </a:p>
-          <a:p>
-            <a:pPr marL="800100" lvl="1" indent="-342900">
-              <a:spcBef>
-                <a:spcPts val="300"/>
-              </a:spcBef>
-              <a:buFont typeface="Wingdings" panose="05000000000000000000" pitchFamily="2" charset="2"/>
-              <a:buChar char="ü"/>
-            </a:pPr>
-            <a:r>
-              <a:rPr lang="fr-FR" sz="2400" dirty="0">
-                <a:solidFill>
-                  <a:srgbClr val="404040"/>
-                </a:solidFill>
-                <a:latin typeface="DeepSeek-CJK-patch"/>
-              </a:rPr>
-              <a:t>Collaboration </a:t>
-            </a:r>
-            <a:r>
-              <a:rPr lang="fr-FR" sz="2400" b="0" i="0" dirty="0">
-                <a:solidFill>
-                  <a:srgbClr val="404040"/>
-                </a:solidFill>
-                <a:effectLst/>
-                <a:latin typeface="DeepSeek-CJK-patch"/>
-              </a:rPr>
-              <a:t>entre professionnels de santé</a:t>
-            </a:r>
-          </a:p>
-          <a:p>
-            <a:pPr marL="800100" lvl="1" indent="-342900">
-              <a:spcBef>
-                <a:spcPts val="300"/>
-              </a:spcBef>
-              <a:buFont typeface="Wingdings" panose="05000000000000000000" pitchFamily="2" charset="2"/>
-              <a:buChar char="ü"/>
-            </a:pPr>
-            <a:r>
-              <a:rPr lang="fr-FR" sz="2400" b="0" i="0" dirty="0">
-                <a:solidFill>
-                  <a:srgbClr val="404040"/>
-                </a:solidFill>
-                <a:effectLst/>
-                <a:latin typeface="DeepSeek-CJK-patch"/>
-              </a:rPr>
-              <a:t>Formation des médecins</a:t>
-            </a:r>
-          </a:p>
-          <a:p>
-            <a:pPr marL="342900" indent="-342900">
-              <a:lnSpc>
-                <a:spcPts val="2143"/>
-              </a:lnSpc>
-              <a:spcBef>
-                <a:spcPts val="1372"/>
-              </a:spcBef>
-              <a:spcAft>
-                <a:spcPts val="1029"/>
-              </a:spcAft>
-              <a:buFont typeface="Wingdings" panose="05000000000000000000" pitchFamily="2" charset="2"/>
-              <a:buChar char="§"/>
-            </a:pPr>
-            <a:r>
-              <a:rPr lang="fr-FR" sz="2400" b="1" dirty="0"/>
-              <a:t>Facteurs personnels</a:t>
-            </a:r>
-          </a:p>
-          <a:p>
-            <a:pPr marL="800100" lvl="1" indent="-342900">
-              <a:lnSpc>
-                <a:spcPts val="2143"/>
-              </a:lnSpc>
-              <a:spcBef>
-                <a:spcPts val="300"/>
-              </a:spcBef>
-              <a:spcAft>
-                <a:spcPts val="1029"/>
-              </a:spcAft>
-              <a:buFont typeface="Wingdings" panose="05000000000000000000" pitchFamily="2" charset="2"/>
-              <a:buChar char="ü"/>
-            </a:pPr>
-            <a:r>
-              <a:rPr lang="fr-FR" sz="2400" dirty="0">
-                <a:solidFill>
-                  <a:srgbClr val="404040"/>
-                </a:solidFill>
-                <a:latin typeface="DeepSeek-CJK-patch"/>
-              </a:rPr>
-              <a:t>Expérience professionnelle, formation continue et confiance </a:t>
-            </a:r>
-            <a:r>
-              <a:rPr lang="fr-FR" sz="2400" dirty="0"/>
-              <a:t>en soi des médecins</a:t>
-            </a:r>
-          </a:p>
-          <a:p>
-            <a:pPr marL="800100" lvl="1" indent="-342900">
-              <a:lnSpc>
-                <a:spcPts val="2143"/>
-              </a:lnSpc>
-              <a:spcBef>
-                <a:spcPts val="300"/>
-              </a:spcBef>
-              <a:spcAft>
-                <a:spcPts val="1029"/>
-              </a:spcAft>
-              <a:buFont typeface="Wingdings" panose="05000000000000000000" pitchFamily="2" charset="2"/>
-              <a:buChar char="ü"/>
-            </a:pPr>
-            <a:r>
-              <a:rPr lang="fr-FR" sz="2400" dirty="0"/>
-              <a:t>Présentation des patients, leur niveau d’urgence perçu et leurs attentes</a:t>
-            </a:r>
-          </a:p>
-        </p:txBody>
-      </p:sp>
-      <p:sp>
-        <p:nvSpPr>
-          <p:cNvPr id="7" name="ZoneTexte 6">
-            <a:extLst>
-              <a:ext uri="{FF2B5EF4-FFF2-40B4-BE49-F238E27FC236}">
-                <a16:creationId xmlns:a16="http://schemas.microsoft.com/office/drawing/2014/main" id="{004CC40A-B8D3-007A-5F26-0188E5989988}"/>
-              </a:ext>
-            </a:extLst>
-          </p:cNvPr>
-          <p:cNvSpPr txBox="1"/>
-          <p:nvPr/>
-        </p:nvSpPr>
-        <p:spPr>
-          <a:xfrm>
-            <a:off x="0" y="1437159"/>
-            <a:ext cx="12192000" cy="375552"/>
-          </a:xfrm>
-          <a:prstGeom prst="rect">
-            <a:avLst/>
-          </a:prstGeom>
-          <a:solidFill>
-            <a:srgbClr val="006A5A"/>
-          </a:solidFill>
-        </p:spPr>
-        <p:txBody>
-          <a:bodyPr wrap="square">
-            <a:spAutoFit/>
-          </a:bodyPr>
-          <a:lstStyle/>
-          <a:p>
-            <a:pPr algn="ctr">
-              <a:lnSpc>
-                <a:spcPts val="2143"/>
-              </a:lnSpc>
-              <a:spcBef>
-                <a:spcPts val="1372"/>
-              </a:spcBef>
-              <a:spcAft>
-                <a:spcPts val="1029"/>
-              </a:spcAft>
-            </a:pPr>
-            <a:r>
-              <a:rPr lang="fr-FR" sz="2400" b="1" dirty="0">
-                <a:solidFill>
-                  <a:schemeClr val="bg1"/>
-                </a:solidFill>
-              </a:rPr>
-              <a:t>Facteurs influençant la prise en charge des urgences en médecine générale</a:t>
-            </a:r>
-          </a:p>
-        </p:txBody>
-      </p:sp>
-      <p:sp>
-        <p:nvSpPr>
-          <p:cNvPr id="8" name="ZoneTexte 7">
-            <a:extLst>
-              <a:ext uri="{FF2B5EF4-FFF2-40B4-BE49-F238E27FC236}">
-                <a16:creationId xmlns:a16="http://schemas.microsoft.com/office/drawing/2014/main" id="{A34279CD-87D1-44B7-03DA-204D46F65251}"/>
-              </a:ext>
-            </a:extLst>
-          </p:cNvPr>
-          <p:cNvSpPr txBox="1"/>
-          <p:nvPr/>
-        </p:nvSpPr>
-        <p:spPr>
-          <a:xfrm>
-            <a:off x="-4493" y="1818571"/>
-            <a:ext cx="12192000" cy="375552"/>
-          </a:xfrm>
-          <a:prstGeom prst="rect">
-            <a:avLst/>
-          </a:prstGeom>
-          <a:noFill/>
-        </p:spPr>
-        <p:txBody>
-          <a:bodyPr wrap="square">
-            <a:spAutoFit/>
-          </a:bodyPr>
-          <a:lstStyle/>
-          <a:p>
-            <a:pPr algn="ctr">
-              <a:lnSpc>
-                <a:spcPts val="2143"/>
-              </a:lnSpc>
-              <a:spcBef>
-                <a:spcPts val="1372"/>
-              </a:spcBef>
-              <a:spcAft>
-                <a:spcPts val="1029"/>
-              </a:spcAft>
-            </a:pPr>
-            <a:r>
-              <a:rPr lang="fr-FR" sz="2400" dirty="0">
-                <a:solidFill>
-                  <a:srgbClr val="404040"/>
-                </a:solidFill>
-              </a:rPr>
-              <a:t>(</a:t>
-            </a:r>
-            <a:r>
-              <a:rPr lang="fr-FR" sz="2400" dirty="0"/>
-              <a:t>Julie Dumouchel, 2012)</a:t>
-            </a:r>
-          </a:p>
-        </p:txBody>
-      </p:sp>
-    </p:spTree>
-    <p:extLst>
-      <p:ext uri="{BB962C8B-B14F-4D97-AF65-F5344CB8AC3E}">
-        <p14:creationId xmlns:p14="http://schemas.microsoft.com/office/powerpoint/2010/main" val="235381260"/>
-      </p:ext>
-    </p:extLst>
-  </p:cSld>
-  <p:clrMapOvr>
-    <a:masterClrMapping/>
-  </p:clrMapOvr>
-</p:sld>
-</file>
-
-<file path=ppt/slides/slide11.xml><?xml version="1.0" encoding="utf-8"?>
-<p:sld xmlns:a="http://schemas.openxmlformats.org/drawingml/2006/main" xmlns:r="http://schemas.openxmlformats.org/officeDocument/2006/relationships" xmlns:p="http://schemas.openxmlformats.org/presentationml/2006/main">
-  <p:cSld>
-    <p:spTree>
-      <p:nvGrpSpPr>
-        <p:cNvPr id="1" name=""/>
-        <p:cNvGrpSpPr/>
-        <p:nvPr/>
-      </p:nvGrpSpPr>
-      <p:grpSpPr>
-        <a:xfrm>
-          <a:off x="0" y="0"/>
-          <a:ext cx="0" cy="0"/>
-          <a:chOff x="0" y="0"/>
-          <a:chExt cx="0" cy="0"/>
-        </a:xfrm>
-      </p:grpSpPr>
-      <p:sp>
-        <p:nvSpPr>
-          <p:cNvPr id="2" name="Espace réservé du numéro de diapositive 1">
-            <a:extLst>
-              <a:ext uri="{FF2B5EF4-FFF2-40B4-BE49-F238E27FC236}">
-                <a16:creationId xmlns:a16="http://schemas.microsoft.com/office/drawing/2014/main" id="{E166AE0D-2FAB-3003-2BD1-E74A9391CFB5}"/>
-              </a:ext>
-            </a:extLst>
-          </p:cNvPr>
-          <p:cNvSpPr>
-            <a:spLocks noGrp="1"/>
-          </p:cNvSpPr>
-          <p:nvPr>
-            <p:ph type="sldNum" sz="quarter" idx="4"/>
-          </p:nvPr>
-        </p:nvSpPr>
-        <p:spPr/>
-        <p:txBody>
-          <a:bodyPr/>
-          <a:lstStyle/>
-          <a:p>
-            <a:fld id="{F546B7B7-7D14-4795-A998-350CFB2BDD43}" type="slidenum">
-              <a:rPr lang="fr-FR" smtClean="0"/>
-              <a:pPr/>
-              <a:t>11</a:t>
-            </a:fld>
-            <a:endParaRPr lang="fr-FR"/>
-          </a:p>
-        </p:txBody>
-      </p:sp>
-    </p:spTree>
-    <p:extLst>
-      <p:ext uri="{BB962C8B-B14F-4D97-AF65-F5344CB8AC3E}">
-        <p14:creationId xmlns:p14="http://schemas.microsoft.com/office/powerpoint/2010/main" val="1312687224"/>
-      </p:ext>
-    </p:extLst>
-  </p:cSld>
-  <p:clrMapOvr>
-    <a:masterClrMapping/>
-  </p:clrMapOvr>
-</p:sld>
-</file>
-
-<file path=ppt/slides/slide12.xml><?xml version="1.0" encoding="utf-8"?>
-<p:sld xmlns:a="http://schemas.openxmlformats.org/drawingml/2006/main" xmlns:r="http://schemas.openxmlformats.org/officeDocument/2006/relationships" xmlns:p="http://schemas.openxmlformats.org/presentationml/2006/main">
-  <p:cSld>
-    <p:spTree>
-      <p:nvGrpSpPr>
-        <p:cNvPr id="1" name=""/>
-        <p:cNvGrpSpPr/>
-        <p:nvPr/>
-      </p:nvGrpSpPr>
-      <p:grpSpPr>
-        <a:xfrm>
-          <a:off x="0" y="0"/>
-          <a:ext cx="0" cy="0"/>
-          <a:chOff x="0" y="0"/>
-          <a:chExt cx="0" cy="0"/>
-        </a:xfrm>
-      </p:grpSpPr>
-      <p:sp>
-        <p:nvSpPr>
-          <p:cNvPr id="2" name="Espace réservé du numéro de diapositive 1">
-            <a:extLst>
-              <a:ext uri="{FF2B5EF4-FFF2-40B4-BE49-F238E27FC236}">
-                <a16:creationId xmlns:a16="http://schemas.microsoft.com/office/drawing/2014/main" id="{3C9AC15D-D109-9768-8977-CF168595D874}"/>
-              </a:ext>
-            </a:extLst>
-          </p:cNvPr>
-          <p:cNvSpPr>
-            <a:spLocks noGrp="1"/>
-          </p:cNvSpPr>
-          <p:nvPr>
-            <p:ph type="sldNum" sz="quarter" idx="4"/>
-          </p:nvPr>
-        </p:nvSpPr>
-        <p:spPr/>
-        <p:txBody>
-          <a:bodyPr/>
-          <a:lstStyle/>
-          <a:p>
-            <a:fld id="{F546B7B7-7D14-4795-A998-350CFB2BDD43}" type="slidenum">
-              <a:rPr lang="fr-FR" smtClean="0"/>
-              <a:pPr/>
-              <a:t>12</a:t>
-            </a:fld>
-            <a:endParaRPr lang="fr-FR"/>
-          </a:p>
-        </p:txBody>
-      </p:sp>
-      <p:sp>
-        <p:nvSpPr>
-          <p:cNvPr id="3" name="ZoneTexte 2">
-            <a:extLst>
-              <a:ext uri="{FF2B5EF4-FFF2-40B4-BE49-F238E27FC236}">
-                <a16:creationId xmlns:a16="http://schemas.microsoft.com/office/drawing/2014/main" id="{ABD51FAC-0FBC-21FF-D03C-FE7F761AA6BC}"/>
-              </a:ext>
-            </a:extLst>
-          </p:cNvPr>
-          <p:cNvSpPr txBox="1"/>
-          <p:nvPr/>
-        </p:nvSpPr>
-        <p:spPr>
-          <a:xfrm>
-            <a:off x="2" y="532969"/>
-            <a:ext cx="12191999" cy="646331"/>
-          </a:xfrm>
-          <a:prstGeom prst="rect">
-            <a:avLst/>
-          </a:prstGeom>
-          <a:solidFill>
-            <a:srgbClr val="006A5A"/>
-          </a:solidFill>
-        </p:spPr>
-        <p:txBody>
-          <a:bodyPr wrap="square" rtlCol="0">
-            <a:spAutoFit/>
-          </a:bodyPr>
-          <a:lstStyle/>
-          <a:p>
-            <a:r>
-              <a:rPr lang="fr-FR" sz="3600" b="1" dirty="0">
-                <a:solidFill>
-                  <a:schemeClr val="bg1"/>
-                </a:solidFill>
-                <a:latin typeface="Gill Sans MT" panose="020B0502020104020203" pitchFamily="34" charset="0"/>
-              </a:rPr>
               <a:t>2.1. Données</a:t>
             </a:r>
           </a:p>
@@ -8473,22 +7923,13 @@
               <a:t>Traitements </a:t>
             </a:r>
             <a:r>
-              <a:rPr lang="fr-FR" sz="2400" dirty="0" err="1">
-                <a:solidFill>
-                  <a:schemeClr val="tx1"/>
-                </a:solidFill>
-                <a:latin typeface="Gill Sans MT" panose="020B0502020104020203" pitchFamily="34" charset="0"/>
-              </a:rPr>
-              <a:t>initaux</a:t>
-            </a:r>
-            <a:r>
               <a:rPr lang="fr-FR" sz="2400" dirty="0">
                 <a:solidFill>
                   <a:schemeClr val="tx1"/>
                 </a:solidFill>
                 <a:latin typeface="Gill Sans MT" panose="020B0502020104020203" pitchFamily="34" charset="0"/>
               </a:rPr>
-              <a:t> : nettoyage, traitement des valeurs manquantes ou incorrectes, création de variables spatiales et transformation de certaines variables pour améliorer leur interprétabilité. </a:t>
+              <a:t>initiaux : nettoyage, traitement des valeurs manquantes ou incorrectes, création de variables spatiales et transformation de certaines variables pour améliorer leur interprétabilité. </a:t>
             </a:r>
           </a:p>
         </p:txBody>
@@ -8506,7 +7947,7 @@
 </p:sld>
 </file>
 
-<file path=ppt/slides/slide13.xml><?xml version="1.0" encoding="utf-8"?>
+<file path=ppt/slides/slide11.xml><?xml version="1.0" encoding="utf-8"?>
 <p:sld xmlns:a="http://schemas.openxmlformats.org/drawingml/2006/main" xmlns:r="http://schemas.openxmlformats.org/officeDocument/2006/relationships" xmlns:p="http://schemas.openxmlformats.org/presentationml/2006/main">
   <p:cSld>
     <p:spTree>
@@ -8558,7 +7999,7 @@
             <a:fld id="{F546B7B7-7D14-4795-A998-350CFB2BDD43}" type="slidenum">
               <a:rPr lang="fr-FR" smtClean="0"/>
               <a:pPr/>
-              <a:t>13</a:t>
+              <a:t>11</a:t>
             </a:fld>
             <a:endParaRPr lang="fr-FR" dirty="0"/>
           </a:p>
@@ -9385,7 +8826,7 @@
         </p:nvGrpSpPr>
         <p:grpSpPr>
           <a:xfrm>
-            <a:off x="119743" y="5032430"/>
+            <a:off x="72608" y="5032430"/>
             <a:ext cx="4966607" cy="538782"/>
             <a:chOff x="1621972" y="1405339"/>
             <a:chExt cx="4966607" cy="538782"/>
@@ -9521,7 +8962,7 @@
 </p:sld>
 </file>
 
-<file path=ppt/slides/slide14.xml><?xml version="1.0" encoding="utf-8"?>
+<file path=ppt/slides/slide12.xml><?xml version="1.0" encoding="utf-8"?>
 <p:sld xmlns:a="http://schemas.openxmlformats.org/drawingml/2006/main" xmlns:r="http://schemas.openxmlformats.org/officeDocument/2006/relationships" xmlns:p="http://schemas.openxmlformats.org/presentationml/2006/main">
   <p:cSld>
     <p:spTree>
@@ -9568,7 +9009,7 @@
             <a:fld id="{F546B7B7-7D14-4795-A998-350CFB2BDD43}" type="slidenum">
               <a:rPr lang="fr-FR" smtClean="0"/>
               <a:pPr/>
-              <a:t>14</a:t>
+              <a:t>12</a:t>
             </a:fld>
             <a:endParaRPr lang="fr-FR"/>
           </a:p>
@@ -11048,190 +10489,7 @@
 </p:sld>
 </file>
 
-<file path=ppt/slides/slide15.xml><?xml version="1.0" encoding="utf-8"?>
-<p:sld xmlns:a="http://schemas.openxmlformats.org/drawingml/2006/main" xmlns:r="http://schemas.openxmlformats.org/officeDocument/2006/relationships" xmlns:p="http://schemas.openxmlformats.org/presentationml/2006/main">
-  <p:cSld>
-    <p:spTree>
-      <p:nvGrpSpPr>
-        <p:cNvPr id="1" name="">
-          <a:extLst>
-            <a:ext uri="{FF2B5EF4-FFF2-40B4-BE49-F238E27FC236}">
-              <a16:creationId xmlns:a16="http://schemas.microsoft.com/office/drawing/2014/main" id="{98B0D1BF-5844-EDB5-F573-31335D368525}"/>
-            </a:ext>
-          </a:extLst>
-        </p:cNvPr>
-        <p:cNvGrpSpPr/>
-        <p:nvPr/>
-      </p:nvGrpSpPr>
-      <p:grpSpPr>
-        <a:xfrm>
-          <a:off x="0" y="0"/>
-          <a:ext cx="0" cy="0"/>
-          <a:chOff x="0" y="0"/>
-          <a:chExt cx="0" cy="0"/>
-        </a:xfrm>
-      </p:grpSpPr>
-      <p:sp>
-        <p:nvSpPr>
-          <p:cNvPr id="2" name="Espace réservé du numéro de diapositive 1">
-            <a:extLst>
-              <a:ext uri="{FF2B5EF4-FFF2-40B4-BE49-F238E27FC236}">
-                <a16:creationId xmlns:a16="http://schemas.microsoft.com/office/drawing/2014/main" id="{15E57845-333C-D9B0-61B9-E44608ADEAA3}"/>
-              </a:ext>
-            </a:extLst>
-          </p:cNvPr>
-          <p:cNvSpPr>
-            <a:spLocks noGrp="1"/>
-          </p:cNvSpPr>
-          <p:nvPr>
-            <p:ph type="sldNum" sz="quarter" idx="4"/>
-          </p:nvPr>
-        </p:nvSpPr>
-        <p:spPr/>
-        <p:txBody>
-          <a:bodyPr/>
-          <a:lstStyle/>
-          <a:p>
-            <a:fld id="{F546B7B7-7D14-4795-A998-350CFB2BDD43}" type="slidenum">
-              <a:rPr lang="fr-FR" smtClean="0"/>
-              <a:pPr/>
-              <a:t>15</a:t>
-            </a:fld>
-            <a:endParaRPr lang="fr-FR"/>
-          </a:p>
-        </p:txBody>
-      </p:sp>
-      <p:sp>
-        <p:nvSpPr>
-          <p:cNvPr id="3" name="ZoneTexte 2">
-            <a:extLst>
-              <a:ext uri="{FF2B5EF4-FFF2-40B4-BE49-F238E27FC236}">
-                <a16:creationId xmlns:a16="http://schemas.microsoft.com/office/drawing/2014/main" id="{7A5700A4-2F79-0C0D-2093-533521F29605}"/>
-              </a:ext>
-            </a:extLst>
-          </p:cNvPr>
-          <p:cNvSpPr txBox="1"/>
-          <p:nvPr/>
-        </p:nvSpPr>
-        <p:spPr>
-          <a:xfrm>
-            <a:off x="2" y="532969"/>
-            <a:ext cx="12191999" cy="646331"/>
-          </a:xfrm>
-          <a:prstGeom prst="rect">
-            <a:avLst/>
-          </a:prstGeom>
-          <a:solidFill>
-            <a:srgbClr val="006A5A"/>
-          </a:solidFill>
-        </p:spPr>
-        <p:txBody>
-          <a:bodyPr wrap="square" rtlCol="0">
-            <a:spAutoFit/>
-          </a:bodyPr>
-          <a:lstStyle/>
-          <a:p>
-            <a:r>
-              <a:rPr lang="fr-FR" sz="3600" b="1" dirty="0">
-                <a:solidFill>
-                  <a:schemeClr val="bg1"/>
-                </a:solidFill>
-                <a:latin typeface="Gill Sans MT" panose="020B0502020104020203" pitchFamily="34" charset="0"/>
-              </a:rPr>
-              <a:t>2.4. Modèles</a:t>
-            </a:r>
-          </a:p>
-        </p:txBody>
-      </p:sp>
-      <p:pic>
-        <p:nvPicPr>
-          <p:cNvPr id="4" name="Graphique 3" descr="Flèches de chevron">
-            <a:extLst>
-              <a:ext uri="{FF2B5EF4-FFF2-40B4-BE49-F238E27FC236}">
-                <a16:creationId xmlns:a16="http://schemas.microsoft.com/office/drawing/2014/main" id="{280B7A1C-90CA-A1EF-957B-AF158B9ACE97}"/>
-              </a:ext>
-            </a:extLst>
-          </p:cNvPr>
-          <p:cNvPicPr>
-            <a:picLocks noChangeAspect="1"/>
-          </p:cNvPicPr>
-          <p:nvPr/>
-        </p:nvPicPr>
-        <p:blipFill>
-          <a:blip r:embed="rId2">
-            <a:extLst>
-              <a:ext uri="{28A0092B-C50C-407E-A947-70E740481C1C}">
-                <a14:useLocalDpi xmlns:a14="http://schemas.microsoft.com/office/drawing/2010/main" val="0"/>
-              </a:ext>
-              <a:ext uri="{96DAC541-7B7A-43D3-8B79-37D633B846F1}">
-                <asvg:svgBlip xmlns:asvg="http://schemas.microsoft.com/office/drawing/2016/SVG/main" r:embed="rId3"/>
-              </a:ext>
-            </a:extLst>
-          </a:blip>
-          <a:stretch>
-            <a:fillRect/>
-          </a:stretch>
-        </p:blipFill>
-        <p:spPr>
-          <a:xfrm>
-            <a:off x="11078692" y="266700"/>
-            <a:ext cx="1170459" cy="1170459"/>
-          </a:xfrm>
-          <a:prstGeom prst="rect">
-            <a:avLst/>
-          </a:prstGeom>
-        </p:spPr>
-      </p:pic>
-      <p:pic>
-        <p:nvPicPr>
-          <p:cNvPr id="6" name="Image 5">
-            <a:extLst>
-              <a:ext uri="{FF2B5EF4-FFF2-40B4-BE49-F238E27FC236}">
-                <a16:creationId xmlns:a16="http://schemas.microsoft.com/office/drawing/2014/main" id="{5339FC60-85E4-F425-FF8C-EEE5DBDE192C}"/>
-              </a:ext>
-            </a:extLst>
-          </p:cNvPr>
-          <p:cNvPicPr>
-            <a:picLocks noChangeAspect="1"/>
-          </p:cNvPicPr>
-          <p:nvPr/>
-        </p:nvPicPr>
-        <p:blipFill>
-          <a:blip r:embed="rId4">
-            <a:extLst>
-              <a:ext uri="{28A0092B-C50C-407E-A947-70E740481C1C}">
-                <a14:useLocalDpi xmlns:a14="http://schemas.microsoft.com/office/drawing/2010/main" val="0"/>
-              </a:ext>
-            </a:extLst>
-          </a:blip>
-          <a:stretch>
-            <a:fillRect/>
-          </a:stretch>
-        </p:blipFill>
-        <p:spPr>
-          <a:xfrm>
-            <a:off x="1059125" y="1236666"/>
-            <a:ext cx="9315038" cy="5062317"/>
-          </a:xfrm>
-          <a:prstGeom prst="rect">
-            <a:avLst/>
-          </a:prstGeom>
-        </p:spPr>
-      </p:pic>
-    </p:spTree>
-    <p:extLst>
-      <p:ext uri="{BB962C8B-B14F-4D97-AF65-F5344CB8AC3E}">
-        <p14:creationId xmlns:p14="http://schemas.microsoft.com/office/powerpoint/2010/main" val="3843628031"/>
-      </p:ext>
-    </p:extLst>
-  </p:cSld>
-  <p:clrMapOvr>
-    <a:masterClrMapping/>
-  </p:clrMapOvr>
-</p:sld>
-</file>
-
-<file path=ppt/slides/slide16.xml><?xml version="1.0" encoding="utf-8"?>
+<file path=ppt/slides/slide13.xml><?xml version="1.0" encoding="utf-8"?>
 <p:sld xmlns:a="http://schemas.openxmlformats.org/drawingml/2006/main" xmlns:r="http://schemas.openxmlformats.org/officeDocument/2006/relationships" xmlns:p="http://schemas.openxmlformats.org/presentationml/2006/main">
   <p:cSld>
     <p:spTree>
@@ -11272,7 +10530,7 @@
             <a:fld id="{F546B7B7-7D14-4795-A998-350CFB2BDD43}" type="slidenum">
               <a:rPr lang="fr-FR" smtClean="0"/>
               <a:pPr/>
-              <a:t>16</a:t>
+              <a:t>13</a:t>
             </a:fld>
             <a:endParaRPr lang="fr-FR"/>
           </a:p>
@@ -11291,7 +10549,7 @@
 </p:sld>
 </file>
 
-<file path=ppt/slides/slide17.xml><?xml version="1.0" encoding="utf-8"?>
+<file path=ppt/slides/slide14.xml><?xml version="1.0" encoding="utf-8"?>
 <p:sld xmlns:a="http://schemas.openxmlformats.org/drawingml/2006/main" xmlns:r="http://schemas.openxmlformats.org/officeDocument/2006/relationships" xmlns:p="http://schemas.openxmlformats.org/presentationml/2006/main">
   <p:cSld>
     <p:spTree>
@@ -11332,7 +10590,7 @@
             <a:fld id="{F546B7B7-7D14-4795-A998-350CFB2BDD43}" type="slidenum">
               <a:rPr lang="fr-FR" smtClean="0"/>
               <a:pPr/>
-              <a:t>17</a:t>
+              <a:t>14</a:t>
             </a:fld>
             <a:endParaRPr lang="fr-FR"/>
           </a:p>
@@ -11673,7 +10931,7 @@
 </p:sld>
 </file>
 
-<file path=ppt/slides/slide18.xml><?xml version="1.0" encoding="utf-8"?>
+<file path=ppt/slides/slide15.xml><?xml version="1.0" encoding="utf-8"?>
 <p:sld xmlns:a="http://schemas.openxmlformats.org/drawingml/2006/main" xmlns:r="http://schemas.openxmlformats.org/officeDocument/2006/relationships" xmlns:p="http://schemas.openxmlformats.org/presentationml/2006/main">
   <p:cSld>
     <p:spTree>
@@ -11720,7 +10978,7 @@
             <a:fld id="{F546B7B7-7D14-4795-A998-350CFB2BDD43}" type="slidenum">
               <a:rPr lang="fr-FR" smtClean="0"/>
               <a:pPr/>
-              <a:t>18</a:t>
+              <a:t>15</a:t>
             </a:fld>
             <a:endParaRPr lang="fr-FR"/>
           </a:p>
@@ -12436,7 +11694,7 @@
 </p:sld>
 </file>
 
-<file path=ppt/slides/slide19.xml><?xml version="1.0" encoding="utf-8"?>
+<file path=ppt/slides/slide16.xml><?xml version="1.0" encoding="utf-8"?>
 <p:sld xmlns:a="http://schemas.openxmlformats.org/drawingml/2006/main" xmlns:r="http://schemas.openxmlformats.org/officeDocument/2006/relationships" xmlns:p="http://schemas.openxmlformats.org/presentationml/2006/main">
   <p:cSld>
     <p:spTree>
@@ -12483,7 +11741,7 @@
             <a:fld id="{F546B7B7-7D14-4795-A998-350CFB2BDD43}" type="slidenum">
               <a:rPr lang="fr-FR" smtClean="0"/>
               <a:pPr/>
-              <a:t>19</a:t>
+              <a:t>16</a:t>
             </a:fld>
             <a:endParaRPr lang="fr-FR"/>
           </a:p>
@@ -12735,67 +11993,7 @@
 </p:sld>
 </file>
 
-<file path=ppt/slides/slide2.xml><?xml version="1.0" encoding="utf-8"?>
-<p:sld xmlns:a="http://schemas.openxmlformats.org/drawingml/2006/main" xmlns:r="http://schemas.openxmlformats.org/officeDocument/2006/relationships" xmlns:p="http://schemas.openxmlformats.org/presentationml/2006/main">
-  <p:cSld>
-    <p:spTree>
-      <p:nvGrpSpPr>
-        <p:cNvPr id="1" name=""/>
-        <p:cNvGrpSpPr/>
-        <p:nvPr/>
-      </p:nvGrpSpPr>
-      <p:grpSpPr>
-        <a:xfrm>
-          <a:off x="0" y="0"/>
-          <a:ext cx="0" cy="0"/>
-          <a:chOff x="0" y="0"/>
-          <a:chExt cx="0" cy="0"/>
-        </a:xfrm>
-      </p:grpSpPr>
-      <p:sp>
-        <p:nvSpPr>
-          <p:cNvPr id="4" name="Espace réservé du numéro de diapositive 3">
-            <a:extLst>
-              <a:ext uri="{FF2B5EF4-FFF2-40B4-BE49-F238E27FC236}">
-                <a16:creationId xmlns:a16="http://schemas.microsoft.com/office/drawing/2014/main" id="{0BDA0677-C19B-D077-2572-F5A403C2CE4E}"/>
-              </a:ext>
-            </a:extLst>
-          </p:cNvPr>
-          <p:cNvSpPr>
-            <a:spLocks noGrp="1"/>
-          </p:cNvSpPr>
-          <p:nvPr>
-            <p:ph type="sldNum" sz="quarter" idx="4"/>
-          </p:nvPr>
-        </p:nvSpPr>
-        <p:spPr/>
-        <p:txBody>
-          <a:bodyPr/>
-          <a:lstStyle/>
-          <a:p>
-            <a:fld id="{F546B7B7-7D14-4795-A998-350CFB2BDD43}" type="slidenum">
-              <a:rPr lang="fr-FR" smtClean="0"/>
-              <a:pPr/>
-              <a:t>2</a:t>
-            </a:fld>
-            <a:endParaRPr lang="fr-FR"/>
-          </a:p>
-        </p:txBody>
-      </p:sp>
-    </p:spTree>
-    <p:extLst>
-      <p:ext uri="{BB962C8B-B14F-4D97-AF65-F5344CB8AC3E}">
-        <p14:creationId xmlns:p14="http://schemas.microsoft.com/office/powerpoint/2010/main" val="81490865"/>
-      </p:ext>
-    </p:extLst>
-  </p:cSld>
-  <p:clrMapOvr>
-    <a:masterClrMapping/>
-  </p:clrMapOvr>
-</p:sld>
-</file>
-
-<file path=ppt/slides/slide20.xml><?xml version="1.0" encoding="utf-8"?>
+<file path=ppt/slides/slide17.xml><?xml version="1.0" encoding="utf-8"?>
 <p:sld xmlns:a="http://schemas.openxmlformats.org/drawingml/2006/main" xmlns:r="http://schemas.openxmlformats.org/officeDocument/2006/relationships" xmlns:p="http://schemas.openxmlformats.org/presentationml/2006/main">
   <p:cSld>
     <p:spTree>
@@ -12842,7 +12040,7 @@
             <a:fld id="{F546B7B7-7D14-4795-A998-350CFB2BDD43}" type="slidenum">
               <a:rPr lang="fr-FR" smtClean="0"/>
               <a:pPr/>
-              <a:t>20</a:t>
+              <a:t>17</a:t>
             </a:fld>
             <a:endParaRPr lang="fr-FR"/>
           </a:p>
@@ -13153,7 +12351,7 @@
 </p:sld>
 </file>
 
-<file path=ppt/slides/slide21.xml><?xml version="1.0" encoding="utf-8"?>
+<file path=ppt/slides/slide18.xml><?xml version="1.0" encoding="utf-8"?>
 <p:sld xmlns:a="http://schemas.openxmlformats.org/drawingml/2006/main" xmlns:r="http://schemas.openxmlformats.org/officeDocument/2006/relationships" xmlns:p="http://schemas.openxmlformats.org/presentationml/2006/main">
   <p:cSld>
     <p:spTree>
@@ -13200,7 +12398,7 @@
             <a:fld id="{F546B7B7-7D14-4795-A998-350CFB2BDD43}" type="slidenum">
               <a:rPr lang="fr-FR" smtClean="0"/>
               <a:pPr/>
-              <a:t>21</a:t>
+              <a:t>18</a:t>
             </a:fld>
             <a:endParaRPr lang="fr-FR"/>
           </a:p>
@@ -13446,7 +12644,7 @@
 </p:sld>
 </file>
 
-<file path=ppt/slides/slide22.xml><?xml version="1.0" encoding="utf-8"?>
+<file path=ppt/slides/slide19.xml><?xml version="1.0" encoding="utf-8"?>
 <p:sld xmlns:a="http://schemas.openxmlformats.org/drawingml/2006/main" xmlns:r="http://schemas.openxmlformats.org/officeDocument/2006/relationships" xmlns:p="http://schemas.openxmlformats.org/presentationml/2006/main">
   <p:cSld>
     <p:spTree>
@@ -13487,7 +12685,7 @@
             <a:fld id="{F546B7B7-7D14-4795-A998-350CFB2BDD43}" type="slidenum">
               <a:rPr lang="fr-FR" smtClean="0"/>
               <a:pPr/>
-              <a:t>22</a:t>
+              <a:t>19</a:t>
             </a:fld>
             <a:endParaRPr lang="fr-FR"/>
           </a:p>
@@ -13506,7 +12704,67 @@
 </p:sld>
 </file>
 
-<file path=ppt/slides/slide23.xml><?xml version="1.0" encoding="utf-8"?>
+<file path=ppt/slides/slide2.xml><?xml version="1.0" encoding="utf-8"?>
+<p:sld xmlns:a="http://schemas.openxmlformats.org/drawingml/2006/main" xmlns:r="http://schemas.openxmlformats.org/officeDocument/2006/relationships" xmlns:p="http://schemas.openxmlformats.org/presentationml/2006/main">
+  <p:cSld>
+    <p:spTree>
+      <p:nvGrpSpPr>
+        <p:cNvPr id="1" name=""/>
+        <p:cNvGrpSpPr/>
+        <p:nvPr/>
+      </p:nvGrpSpPr>
+      <p:grpSpPr>
+        <a:xfrm>
+          <a:off x="0" y="0"/>
+          <a:ext cx="0" cy="0"/>
+          <a:chOff x="0" y="0"/>
+          <a:chExt cx="0" cy="0"/>
+        </a:xfrm>
+      </p:grpSpPr>
+      <p:sp>
+        <p:nvSpPr>
+          <p:cNvPr id="4" name="Espace réservé du numéro de diapositive 3">
+            <a:extLst>
+              <a:ext uri="{FF2B5EF4-FFF2-40B4-BE49-F238E27FC236}">
+                <a16:creationId xmlns:a16="http://schemas.microsoft.com/office/drawing/2014/main" id="{0BDA0677-C19B-D077-2572-F5A403C2CE4E}"/>
+              </a:ext>
+            </a:extLst>
+          </p:cNvPr>
+          <p:cNvSpPr>
+            <a:spLocks noGrp="1"/>
+          </p:cNvSpPr>
+          <p:nvPr>
+            <p:ph type="sldNum" sz="quarter" idx="4"/>
+          </p:nvPr>
+        </p:nvSpPr>
+        <p:spPr/>
+        <p:txBody>
+          <a:bodyPr/>
+          <a:lstStyle/>
+          <a:p>
+            <a:fld id="{F546B7B7-7D14-4795-A998-350CFB2BDD43}" type="slidenum">
+              <a:rPr lang="fr-FR" smtClean="0"/>
+              <a:pPr/>
+              <a:t>2</a:t>
+            </a:fld>
+            <a:endParaRPr lang="fr-FR"/>
+          </a:p>
+        </p:txBody>
+      </p:sp>
+    </p:spTree>
+    <p:extLst>
+      <p:ext uri="{BB962C8B-B14F-4D97-AF65-F5344CB8AC3E}">
+        <p14:creationId xmlns:p14="http://schemas.microsoft.com/office/powerpoint/2010/main" val="81490865"/>
+      </p:ext>
+    </p:extLst>
+  </p:cSld>
+  <p:clrMapOvr>
+    <a:masterClrMapping/>
+  </p:clrMapOvr>
+</p:sld>
+</file>
+
+<file path=ppt/slides/slide20.xml><?xml version="1.0" encoding="utf-8"?>
 <p:sld xmlns:a="http://schemas.openxmlformats.org/drawingml/2006/main" xmlns:r="http://schemas.openxmlformats.org/officeDocument/2006/relationships" xmlns:p="http://schemas.openxmlformats.org/presentationml/2006/main">
   <p:cSld>
     <p:spTree>
@@ -13553,7 +12811,7 @@
             <a:fld id="{F546B7B7-7D14-4795-A998-350CFB2BDD43}" type="slidenum">
               <a:rPr lang="fr-FR" smtClean="0"/>
               <a:pPr/>
-              <a:t>23</a:t>
+              <a:t>20</a:t>
             </a:fld>
             <a:endParaRPr lang="fr-FR"/>
           </a:p>
@@ -13929,7 +13187,7 @@
 </p:sld>
 </file>
 
-<file path=ppt/slides/slide24.xml><?xml version="1.0" encoding="utf-8"?>
+<file path=ppt/slides/slide21.xml><?xml version="1.0" encoding="utf-8"?>
 <p:sld xmlns:a="http://schemas.openxmlformats.org/drawingml/2006/main" xmlns:r="http://schemas.openxmlformats.org/officeDocument/2006/relationships" xmlns:p="http://schemas.openxmlformats.org/presentationml/2006/main">
   <p:cSld>
     <p:spTree>
@@ -13976,7 +13234,7 @@
             <a:fld id="{F546B7B7-7D14-4795-A998-350CFB2BDD43}" type="slidenum">
               <a:rPr lang="fr-FR" smtClean="0"/>
               <a:pPr/>
-              <a:t>24</a:t>
+              <a:t>21</a:t>
             </a:fld>
             <a:endParaRPr lang="fr-FR"/>
           </a:p>
@@ -14152,7 +13410,7 @@
         </p:blipFill>
         <p:spPr>
           <a:xfrm>
-            <a:off x="3108218" y="4659585"/>
+            <a:off x="5037970" y="4277697"/>
             <a:ext cx="5226637" cy="2261215"/>
           </a:xfrm>
           <a:prstGeom prst="rect">
@@ -14320,7 +13578,7 @@
 </p:sld>
 </file>
 
-<file path=ppt/slides/slide25.xml><?xml version="1.0" encoding="utf-8"?>
+<file path=ppt/slides/slide22.xml><?xml version="1.0" encoding="utf-8"?>
 <p:sld xmlns:a="http://schemas.openxmlformats.org/drawingml/2006/main" xmlns:r="http://schemas.openxmlformats.org/officeDocument/2006/relationships" xmlns:p="http://schemas.openxmlformats.org/presentationml/2006/main">
   <p:cSld>
     <p:spTree>
@@ -14367,7 +13625,7 @@
             <a:fld id="{F546B7B7-7D14-4795-A998-350CFB2BDD43}" type="slidenum">
               <a:rPr lang="fr-FR" smtClean="0"/>
               <a:pPr/>
-              <a:t>25</a:t>
+              <a:t>22</a:t>
             </a:fld>
             <a:endParaRPr lang="fr-FR"/>
           </a:p>
@@ -14546,7 +13804,7 @@
 </p:sld>
 </file>
 
-<file path=ppt/slides/slide26.xml><?xml version="1.0" encoding="utf-8"?>
+<file path=ppt/slides/slide23.xml><?xml version="1.0" encoding="utf-8"?>
 <p:sld xmlns:a="http://schemas.openxmlformats.org/drawingml/2006/main" xmlns:r="http://schemas.openxmlformats.org/officeDocument/2006/relationships" xmlns:p="http://schemas.openxmlformats.org/presentationml/2006/main">
   <p:cSld>
     <p:spTree>
@@ -14593,7 +13851,7 @@
             <a:fld id="{F546B7B7-7D14-4795-A998-350CFB2BDD43}" type="slidenum">
               <a:rPr lang="fr-FR" smtClean="0"/>
               <a:pPr/>
-              <a:t>26</a:t>
+              <a:t>23</a:t>
             </a:fld>
             <a:endParaRPr lang="fr-FR"/>
           </a:p>
@@ -14723,7 +13981,7 @@
 </p:sld>
 </file>
 
-<file path=ppt/slides/slide27.xml><?xml version="1.0" encoding="utf-8"?>
+<file path=ppt/slides/slide24.xml><?xml version="1.0" encoding="utf-8"?>
 <p:sld xmlns:a="http://schemas.openxmlformats.org/drawingml/2006/main" xmlns:r="http://schemas.openxmlformats.org/officeDocument/2006/relationships" xmlns:p="http://schemas.openxmlformats.org/presentationml/2006/main">
   <p:cSld>
     <p:spTree>
@@ -14770,7 +14028,7 @@
             <a:fld id="{F546B7B7-7D14-4795-A998-350CFB2BDD43}" type="slidenum">
               <a:rPr lang="fr-FR" smtClean="0"/>
               <a:pPr/>
-              <a:t>27</a:t>
+              <a:t>24</a:t>
             </a:fld>
             <a:endParaRPr lang="fr-FR"/>
           </a:p>
@@ -15003,7 +14261,7 @@
 </p:sld>
 </file>
 
-<file path=ppt/slides/slide28.xml><?xml version="1.0" encoding="utf-8"?>
+<file path=ppt/slides/slide25.xml><?xml version="1.0" encoding="utf-8"?>
 <p:sld xmlns:a="http://schemas.openxmlformats.org/drawingml/2006/main" xmlns:r="http://schemas.openxmlformats.org/officeDocument/2006/relationships" xmlns:p="http://schemas.openxmlformats.org/presentationml/2006/main">
   <p:cSld>
     <p:spTree>
@@ -15050,7 +14308,7 @@
             <a:fld id="{F546B7B7-7D14-4795-A998-350CFB2BDD43}" type="slidenum">
               <a:rPr lang="fr-FR" smtClean="0"/>
               <a:pPr/>
-              <a:t>28</a:t>
+              <a:t>25</a:t>
             </a:fld>
             <a:endParaRPr lang="fr-FR"/>
           </a:p>
@@ -15165,8 +14423,8 @@
         </p:blipFill>
         <p:spPr>
           <a:xfrm>
-            <a:off x="592910" y="1261182"/>
-            <a:ext cx="10182537" cy="4106805"/>
+            <a:off x="1750954" y="1288381"/>
+            <a:ext cx="8690090" cy="4106805"/>
           </a:xfrm>
           <a:prstGeom prst="rect">
             <a:avLst/>
@@ -15224,7 +14482,7 @@
 </p:sld>
 </file>
 
-<file path=ppt/slides/slide29.xml><?xml version="1.0" encoding="utf-8"?>
+<file path=ppt/slides/slide26.xml><?xml version="1.0" encoding="utf-8"?>
 <p:sld xmlns:a="http://schemas.openxmlformats.org/drawingml/2006/main" xmlns:r="http://schemas.openxmlformats.org/officeDocument/2006/relationships" xmlns:p="http://schemas.openxmlformats.org/presentationml/2006/main">
   <p:cSld>
     <p:spTree>
@@ -15271,7 +14529,7 @@
             <a:fld id="{F546B7B7-7D14-4795-A998-350CFB2BDD43}" type="slidenum">
               <a:rPr lang="fr-FR" smtClean="0"/>
               <a:pPr/>
-              <a:t>29</a:t>
+              <a:t>26</a:t>
             </a:fld>
             <a:endParaRPr lang="fr-FR"/>
           </a:p>
@@ -15431,875 +14689,7 @@
 </p:sld>
 </file>
 
-<file path=ppt/slides/slide3.xml><?xml version="1.0" encoding="utf-8"?>
-<p:sld xmlns:a="http://schemas.openxmlformats.org/drawingml/2006/main" xmlns:r="http://schemas.openxmlformats.org/officeDocument/2006/relationships" xmlns:p="http://schemas.openxmlformats.org/presentationml/2006/main">
-  <p:cSld>
-    <p:spTree>
-      <p:nvGrpSpPr>
-        <p:cNvPr id="1" name=""/>
-        <p:cNvGrpSpPr/>
-        <p:nvPr/>
-      </p:nvGrpSpPr>
-      <p:grpSpPr>
-        <a:xfrm>
-          <a:off x="0" y="0"/>
-          <a:ext cx="0" cy="0"/>
-          <a:chOff x="0" y="0"/>
-          <a:chExt cx="0" cy="0"/>
-        </a:xfrm>
-      </p:grpSpPr>
-      <p:sp>
-        <p:nvSpPr>
-          <p:cNvPr id="3" name="Espace réservé du numéro de diapositive 2">
-            <a:extLst>
-              <a:ext uri="{FF2B5EF4-FFF2-40B4-BE49-F238E27FC236}">
-                <a16:creationId xmlns:a16="http://schemas.microsoft.com/office/drawing/2014/main" id="{68EEE016-1B4D-27DD-4ADA-3B73EB64F3E1}"/>
-              </a:ext>
-            </a:extLst>
-          </p:cNvPr>
-          <p:cNvSpPr>
-            <a:spLocks noGrp="1"/>
-          </p:cNvSpPr>
-          <p:nvPr>
-            <p:ph type="sldNum" sz="quarter" idx="4"/>
-          </p:nvPr>
-        </p:nvSpPr>
-        <p:spPr>
-          <a:xfrm>
-            <a:off x="8610600" y="6356350"/>
-            <a:ext cx="2743200" cy="365125"/>
-          </a:xfrm>
-        </p:spPr>
-        <p:txBody>
-          <a:bodyPr/>
-          <a:lstStyle/>
-          <a:p>
-            <a:fld id="{F546B7B7-7D14-4795-A998-350CFB2BDD43}" type="slidenum">
-              <a:rPr lang="fr-FR" smtClean="0"/>
-              <a:pPr/>
-              <a:t>3</a:t>
-            </a:fld>
-            <a:endParaRPr lang="fr-FR" dirty="0"/>
-          </a:p>
-        </p:txBody>
-      </p:sp>
-      <p:sp>
-        <p:nvSpPr>
-          <p:cNvPr id="2" name="ZoneTexte 1">
-            <a:extLst>
-              <a:ext uri="{FF2B5EF4-FFF2-40B4-BE49-F238E27FC236}">
-                <a16:creationId xmlns:a16="http://schemas.microsoft.com/office/drawing/2014/main" id="{0A4C5EA5-8EC5-BD2E-0FB5-DC298C4E156C}"/>
-              </a:ext>
-            </a:extLst>
-          </p:cNvPr>
-          <p:cNvSpPr txBox="1"/>
-          <p:nvPr/>
-        </p:nvSpPr>
-        <p:spPr>
-          <a:xfrm>
-            <a:off x="2" y="532969"/>
-            <a:ext cx="12191999" cy="646331"/>
-          </a:xfrm>
-          <a:prstGeom prst="rect">
-            <a:avLst/>
-          </a:prstGeom>
-          <a:solidFill>
-            <a:srgbClr val="006A5A"/>
-          </a:solidFill>
-        </p:spPr>
-        <p:txBody>
-          <a:bodyPr wrap="square" rtlCol="0">
-            <a:spAutoFit/>
-          </a:bodyPr>
-          <a:lstStyle/>
-          <a:p>
-            <a:r>
-              <a:rPr lang="fr-FR" sz="3600" b="1" dirty="0">
-                <a:solidFill>
-                  <a:schemeClr val="bg1"/>
-                </a:solidFill>
-                <a:latin typeface="Gill Sans MT" panose="020B0502020104020203" pitchFamily="34" charset="0"/>
-              </a:rPr>
-              <a:t>Introduction</a:t>
-            </a:r>
-          </a:p>
-        </p:txBody>
-      </p:sp>
-      <p:pic>
-        <p:nvPicPr>
-          <p:cNvPr id="4" name="Graphique 3" descr="Flèches de chevron">
-            <a:extLst>
-              <a:ext uri="{FF2B5EF4-FFF2-40B4-BE49-F238E27FC236}">
-                <a16:creationId xmlns:a16="http://schemas.microsoft.com/office/drawing/2014/main" id="{358D0F2A-5D55-3BCA-A5C6-BEE40DA79E83}"/>
-              </a:ext>
-            </a:extLst>
-          </p:cNvPr>
-          <p:cNvPicPr>
-            <a:picLocks noChangeAspect="1"/>
-          </p:cNvPicPr>
-          <p:nvPr/>
-        </p:nvPicPr>
-        <p:blipFill>
-          <a:blip r:embed="rId2">
-            <a:extLst>
-              <a:ext uri="{28A0092B-C50C-407E-A947-70E740481C1C}">
-                <a14:useLocalDpi xmlns:a14="http://schemas.microsoft.com/office/drawing/2010/main" val="0"/>
-              </a:ext>
-              <a:ext uri="{96DAC541-7B7A-43D3-8B79-37D633B846F1}">
-                <asvg:svgBlip xmlns:asvg="http://schemas.microsoft.com/office/drawing/2016/SVG/main" r:embed="rId3"/>
-              </a:ext>
-            </a:extLst>
-          </a:blip>
-          <a:stretch>
-            <a:fillRect/>
-          </a:stretch>
-        </p:blipFill>
-        <p:spPr>
-          <a:xfrm>
-            <a:off x="11078692" y="266700"/>
-            <a:ext cx="1170459" cy="1170459"/>
-          </a:xfrm>
-          <a:prstGeom prst="rect">
-            <a:avLst/>
-          </a:prstGeom>
-        </p:spPr>
-      </p:pic>
-      <p:sp>
-        <p:nvSpPr>
-          <p:cNvPr id="8" name="ZoneTexte 7">
-            <a:extLst>
-              <a:ext uri="{FF2B5EF4-FFF2-40B4-BE49-F238E27FC236}">
-                <a16:creationId xmlns:a16="http://schemas.microsoft.com/office/drawing/2014/main" id="{CDA3B022-3B8D-2B7C-C02F-660DEFB862E6}"/>
-              </a:ext>
-            </a:extLst>
-          </p:cNvPr>
-          <p:cNvSpPr txBox="1"/>
-          <p:nvPr/>
-        </p:nvSpPr>
-        <p:spPr>
-          <a:xfrm>
-            <a:off x="2383971" y="1484388"/>
-            <a:ext cx="8871858" cy="906338"/>
-          </a:xfrm>
-          <a:prstGeom prst="rect">
-            <a:avLst/>
-          </a:prstGeom>
-          <a:noFill/>
-        </p:spPr>
-        <p:txBody>
-          <a:bodyPr wrap="square">
-            <a:spAutoFit/>
-          </a:bodyPr>
-          <a:lstStyle/>
-          <a:p>
-            <a:pPr algn="just">
-              <a:lnSpc>
-                <a:spcPts val="2143"/>
-              </a:lnSpc>
-              <a:spcBef>
-                <a:spcPts val="1029"/>
-              </a:spcBef>
-              <a:spcAft>
-                <a:spcPts val="1029"/>
-              </a:spcAft>
-            </a:pPr>
-            <a:r>
-              <a:rPr lang="fr-FR" sz="2400" b="1" dirty="0">
-                <a:latin typeface="Gill Sans MT" panose="020B0502020104020203" pitchFamily="34" charset="0"/>
-              </a:rPr>
-              <a:t>Disparités territoriales d’accès aux soins en France </a:t>
-            </a:r>
-            <a:r>
-              <a:rPr lang="fr-FR" sz="2400" dirty="0">
-                <a:latin typeface="Gill Sans MT" panose="020B0502020104020203" pitchFamily="34" charset="0"/>
-              </a:rPr>
-              <a:t>(3,9 consultations/an en moyenne, mais </a:t>
-            </a:r>
-            <a:r>
-              <a:rPr lang="fr-FR" sz="2400" b="1" dirty="0">
-                <a:latin typeface="Gill Sans MT" panose="020B0502020104020203" pitchFamily="34" charset="0"/>
-              </a:rPr>
-              <a:t>déserts médicaux en zones rurales</a:t>
-            </a:r>
-            <a:r>
-              <a:rPr lang="fr-FR" sz="2400" dirty="0">
-                <a:latin typeface="Gill Sans MT" panose="020B0502020104020203" pitchFamily="34" charset="0"/>
-              </a:rPr>
-              <a:t>) (INSEE, 2021).</a:t>
-            </a:r>
-          </a:p>
-        </p:txBody>
-      </p:sp>
-      <p:grpSp>
-        <p:nvGrpSpPr>
-          <p:cNvPr id="7" name="Groupe 6">
-            <a:extLst>
-              <a:ext uri="{FF2B5EF4-FFF2-40B4-BE49-F238E27FC236}">
-                <a16:creationId xmlns:a16="http://schemas.microsoft.com/office/drawing/2014/main" id="{FF5EFF40-3651-5EDB-8412-378CD4EF499A}"/>
-              </a:ext>
-            </a:extLst>
-          </p:cNvPr>
-          <p:cNvGrpSpPr/>
-          <p:nvPr/>
-        </p:nvGrpSpPr>
-        <p:grpSpPr>
-          <a:xfrm>
-            <a:off x="152401" y="1506628"/>
-            <a:ext cx="2100942" cy="538782"/>
-            <a:chOff x="1621972" y="1405339"/>
-            <a:chExt cx="2100942" cy="538782"/>
-          </a:xfrm>
-        </p:grpSpPr>
-        <p:sp>
-          <p:nvSpPr>
-            <p:cNvPr id="5" name="Rectangle : coins arrondis 4">
-              <a:extLst>
-                <a:ext uri="{FF2B5EF4-FFF2-40B4-BE49-F238E27FC236}">
-                  <a16:creationId xmlns:a16="http://schemas.microsoft.com/office/drawing/2014/main" id="{E61FF78D-D4B7-8A0E-3A99-B11CA2BF9D35}"/>
-                </a:ext>
-              </a:extLst>
-            </p:cNvPr>
-            <p:cNvSpPr/>
-            <p:nvPr/>
-          </p:nvSpPr>
-          <p:spPr>
-            <a:xfrm>
-              <a:off x="1959429" y="1405339"/>
-              <a:ext cx="1763485" cy="522872"/>
-            </a:xfrm>
-            <a:prstGeom prst="roundRect">
-              <a:avLst>
-                <a:gd name="adj" fmla="val 50000"/>
-              </a:avLst>
-            </a:prstGeom>
-            <a:solidFill>
-              <a:srgbClr val="006A5A"/>
-            </a:solidFill>
-            <a:ln>
-              <a:noFill/>
-            </a:ln>
-          </p:spPr>
-          <p:style>
-            <a:lnRef idx="2">
-              <a:schemeClr val="accent1">
-                <a:shade val="15000"/>
-              </a:schemeClr>
-            </a:lnRef>
-            <a:fillRef idx="1">
-              <a:schemeClr val="accent1"/>
-            </a:fillRef>
-            <a:effectRef idx="0">
-              <a:schemeClr val="accent1"/>
-            </a:effectRef>
-            <a:fontRef idx="minor">
-              <a:schemeClr val="lt1"/>
-            </a:fontRef>
-          </p:style>
-          <p:txBody>
-            <a:bodyPr rtlCol="0" anchor="ctr"/>
-            <a:lstStyle/>
-            <a:p>
-              <a:pPr algn="ctr"/>
-              <a:r>
-                <a:rPr lang="fr-FR" sz="2400" b="1" dirty="0">
-                  <a:latin typeface="Gill Sans MT" panose="020B0502020104020203" pitchFamily="34" charset="0"/>
-                </a:rPr>
-                <a:t>Contexte</a:t>
-              </a:r>
-            </a:p>
-          </p:txBody>
-        </p:sp>
-        <p:sp>
-          <p:nvSpPr>
-            <p:cNvPr id="6" name="Ellipse 5">
-              <a:extLst>
-                <a:ext uri="{FF2B5EF4-FFF2-40B4-BE49-F238E27FC236}">
-                  <a16:creationId xmlns:a16="http://schemas.microsoft.com/office/drawing/2014/main" id="{CC05190E-5C02-D88A-51CD-8B54185D60C5}"/>
-                </a:ext>
-              </a:extLst>
-            </p:cNvPr>
-            <p:cNvSpPr/>
-            <p:nvPr/>
-          </p:nvSpPr>
-          <p:spPr>
-            <a:xfrm>
-              <a:off x="1621972" y="1421249"/>
-              <a:ext cx="522872" cy="522872"/>
-            </a:xfrm>
-            <a:prstGeom prst="ellipse">
-              <a:avLst/>
-            </a:prstGeom>
-            <a:solidFill>
-              <a:schemeClr val="accent2"/>
-            </a:solidFill>
-            <a:ln>
-              <a:noFill/>
-            </a:ln>
-          </p:spPr>
-          <p:style>
-            <a:lnRef idx="2">
-              <a:schemeClr val="accent1">
-                <a:shade val="15000"/>
-              </a:schemeClr>
-            </a:lnRef>
-            <a:fillRef idx="1">
-              <a:schemeClr val="accent1"/>
-            </a:fillRef>
-            <a:effectRef idx="0">
-              <a:schemeClr val="accent1"/>
-            </a:effectRef>
-            <a:fontRef idx="minor">
-              <a:schemeClr val="lt1"/>
-            </a:fontRef>
-          </p:style>
-          <p:txBody>
-            <a:bodyPr rtlCol="0" anchor="ctr"/>
-            <a:lstStyle/>
-            <a:p>
-              <a:pPr algn="ctr"/>
-              <a:endParaRPr lang="fr-FR"/>
-            </a:p>
-          </p:txBody>
-        </p:sp>
-      </p:grpSp>
-      <p:sp>
-        <p:nvSpPr>
-          <p:cNvPr id="15" name="ZoneTexte 14">
-            <a:extLst>
-              <a:ext uri="{FF2B5EF4-FFF2-40B4-BE49-F238E27FC236}">
-                <a16:creationId xmlns:a16="http://schemas.microsoft.com/office/drawing/2014/main" id="{F0CCCD4C-73B8-500E-6EFC-DBF78E6F546F}"/>
-              </a:ext>
-            </a:extLst>
-          </p:cNvPr>
-          <p:cNvSpPr txBox="1"/>
-          <p:nvPr/>
-        </p:nvSpPr>
-        <p:spPr>
-          <a:xfrm>
-            <a:off x="3271035" y="2647574"/>
-            <a:ext cx="7984793" cy="644857"/>
-          </a:xfrm>
-          <a:prstGeom prst="rect">
-            <a:avLst/>
-          </a:prstGeom>
-          <a:noFill/>
-        </p:spPr>
-        <p:txBody>
-          <a:bodyPr wrap="square">
-            <a:spAutoFit/>
-          </a:bodyPr>
-          <a:lstStyle/>
-          <a:p>
-            <a:pPr algn="just">
-              <a:lnSpc>
-                <a:spcPts val="2143"/>
-              </a:lnSpc>
-              <a:spcBef>
-                <a:spcPts val="1029"/>
-              </a:spcBef>
-              <a:spcAft>
-                <a:spcPts val="1029"/>
-              </a:spcAft>
-            </a:pPr>
-            <a:r>
-              <a:rPr lang="fr-FR" sz="2400" b="0" i="0" dirty="0">
-                <a:solidFill>
-                  <a:srgbClr val="404040"/>
-                </a:solidFill>
-                <a:effectLst/>
-                <a:latin typeface="Gill Sans MT" panose="020B0502020104020203" pitchFamily="34" charset="0"/>
-              </a:rPr>
-              <a:t>Identifier les facteurs socio-économiques, démographiques et spatiaux influençant le taux de consultations</a:t>
-            </a:r>
-            <a:endParaRPr lang="fr-FR" sz="2400" dirty="0">
-              <a:latin typeface="Gill Sans MT" panose="020B0502020104020203" pitchFamily="34" charset="0"/>
-            </a:endParaRPr>
-          </a:p>
-        </p:txBody>
-      </p:sp>
-      <p:grpSp>
-        <p:nvGrpSpPr>
-          <p:cNvPr id="19" name="Groupe 18">
-            <a:extLst>
-              <a:ext uri="{FF2B5EF4-FFF2-40B4-BE49-F238E27FC236}">
-                <a16:creationId xmlns:a16="http://schemas.microsoft.com/office/drawing/2014/main" id="{B32077B7-68FF-8583-E5BA-6D4C6199B2FF}"/>
-              </a:ext>
-            </a:extLst>
-          </p:cNvPr>
-          <p:cNvGrpSpPr/>
-          <p:nvPr/>
-        </p:nvGrpSpPr>
-        <p:grpSpPr>
-          <a:xfrm>
-            <a:off x="152401" y="2624966"/>
-            <a:ext cx="2883995" cy="538782"/>
-            <a:chOff x="1621972" y="1405339"/>
-            <a:chExt cx="2883995" cy="538782"/>
-          </a:xfrm>
-        </p:grpSpPr>
-        <p:sp>
-          <p:nvSpPr>
-            <p:cNvPr id="20" name="Rectangle : coins arrondis 19">
-              <a:extLst>
-                <a:ext uri="{FF2B5EF4-FFF2-40B4-BE49-F238E27FC236}">
-                  <a16:creationId xmlns:a16="http://schemas.microsoft.com/office/drawing/2014/main" id="{3F06EF53-242C-6BF9-C239-E6386CD4EE98}"/>
-                </a:ext>
-              </a:extLst>
-            </p:cNvPr>
-            <p:cNvSpPr/>
-            <p:nvPr/>
-          </p:nvSpPr>
-          <p:spPr>
-            <a:xfrm>
-              <a:off x="1959429" y="1405339"/>
-              <a:ext cx="2546538" cy="522872"/>
-            </a:xfrm>
-            <a:prstGeom prst="roundRect">
-              <a:avLst>
-                <a:gd name="adj" fmla="val 50000"/>
-              </a:avLst>
-            </a:prstGeom>
-            <a:solidFill>
-              <a:srgbClr val="006A5A"/>
-            </a:solidFill>
-            <a:ln>
-              <a:noFill/>
-            </a:ln>
-          </p:spPr>
-          <p:style>
-            <a:lnRef idx="2">
-              <a:schemeClr val="accent1">
-                <a:shade val="15000"/>
-              </a:schemeClr>
-            </a:lnRef>
-            <a:fillRef idx="1">
-              <a:schemeClr val="accent1"/>
-            </a:fillRef>
-            <a:effectRef idx="0">
-              <a:schemeClr val="accent1"/>
-            </a:effectRef>
-            <a:fontRef idx="minor">
-              <a:schemeClr val="lt1"/>
-            </a:fontRef>
-          </p:style>
-          <p:txBody>
-            <a:bodyPr rtlCol="0" anchor="ctr"/>
-            <a:lstStyle/>
-            <a:p>
-              <a:pPr algn="ctr"/>
-              <a:r>
-                <a:rPr lang="fr-FR" sz="2400" b="1" dirty="0">
-                  <a:latin typeface="Gill Sans MT" panose="020B0502020104020203" pitchFamily="34" charset="0"/>
-                </a:rPr>
-                <a:t>Problématique</a:t>
-              </a:r>
-            </a:p>
-          </p:txBody>
-        </p:sp>
-        <p:sp>
-          <p:nvSpPr>
-            <p:cNvPr id="21" name="Ellipse 20">
-              <a:extLst>
-                <a:ext uri="{FF2B5EF4-FFF2-40B4-BE49-F238E27FC236}">
-                  <a16:creationId xmlns:a16="http://schemas.microsoft.com/office/drawing/2014/main" id="{FCDD2A58-1E7E-68A5-7E44-A3204A77B173}"/>
-                </a:ext>
-              </a:extLst>
-            </p:cNvPr>
-            <p:cNvSpPr/>
-            <p:nvPr/>
-          </p:nvSpPr>
-          <p:spPr>
-            <a:xfrm>
-              <a:off x="1621972" y="1421249"/>
-              <a:ext cx="522872" cy="522872"/>
-            </a:xfrm>
-            <a:prstGeom prst="ellipse">
-              <a:avLst/>
-            </a:prstGeom>
-            <a:solidFill>
-              <a:schemeClr val="accent2"/>
-            </a:solidFill>
-            <a:ln>
-              <a:noFill/>
-            </a:ln>
-          </p:spPr>
-          <p:style>
-            <a:lnRef idx="2">
-              <a:schemeClr val="accent1">
-                <a:shade val="15000"/>
-              </a:schemeClr>
-            </a:lnRef>
-            <a:fillRef idx="1">
-              <a:schemeClr val="accent1"/>
-            </a:fillRef>
-            <a:effectRef idx="0">
-              <a:schemeClr val="accent1"/>
-            </a:effectRef>
-            <a:fontRef idx="minor">
-              <a:schemeClr val="lt1"/>
-            </a:fontRef>
-          </p:style>
-          <p:txBody>
-            <a:bodyPr rtlCol="0" anchor="ctr"/>
-            <a:lstStyle/>
-            <a:p>
-              <a:pPr algn="ctr"/>
-              <a:endParaRPr lang="fr-FR"/>
-            </a:p>
-          </p:txBody>
-        </p:sp>
-      </p:grpSp>
-      <p:grpSp>
-        <p:nvGrpSpPr>
-          <p:cNvPr id="22" name="Groupe 21">
-            <a:extLst>
-              <a:ext uri="{FF2B5EF4-FFF2-40B4-BE49-F238E27FC236}">
-                <a16:creationId xmlns:a16="http://schemas.microsoft.com/office/drawing/2014/main" id="{D6D82661-F38D-D88D-F8AC-3A6EAB4450B0}"/>
-              </a:ext>
-            </a:extLst>
-          </p:cNvPr>
-          <p:cNvGrpSpPr/>
-          <p:nvPr/>
-        </p:nvGrpSpPr>
-        <p:grpSpPr>
-          <a:xfrm>
-            <a:off x="152401" y="3669997"/>
-            <a:ext cx="2024742" cy="538782"/>
-            <a:chOff x="1621972" y="1405339"/>
-            <a:chExt cx="2024742" cy="538782"/>
-          </a:xfrm>
-        </p:grpSpPr>
-        <p:sp>
-          <p:nvSpPr>
-            <p:cNvPr id="23" name="Rectangle : coins arrondis 22">
-              <a:extLst>
-                <a:ext uri="{FF2B5EF4-FFF2-40B4-BE49-F238E27FC236}">
-                  <a16:creationId xmlns:a16="http://schemas.microsoft.com/office/drawing/2014/main" id="{0B4B3CA1-25EE-0DBC-61A6-EACDC061F948}"/>
-                </a:ext>
-              </a:extLst>
-            </p:cNvPr>
-            <p:cNvSpPr/>
-            <p:nvPr/>
-          </p:nvSpPr>
-          <p:spPr>
-            <a:xfrm>
-              <a:off x="1959429" y="1405339"/>
-              <a:ext cx="1687285" cy="522872"/>
-            </a:xfrm>
-            <a:prstGeom prst="roundRect">
-              <a:avLst>
-                <a:gd name="adj" fmla="val 50000"/>
-              </a:avLst>
-            </a:prstGeom>
-            <a:solidFill>
-              <a:srgbClr val="006A5A"/>
-            </a:solidFill>
-            <a:ln>
-              <a:noFill/>
-            </a:ln>
-          </p:spPr>
-          <p:style>
-            <a:lnRef idx="2">
-              <a:schemeClr val="accent1">
-                <a:shade val="15000"/>
-              </a:schemeClr>
-            </a:lnRef>
-            <a:fillRef idx="1">
-              <a:schemeClr val="accent1"/>
-            </a:fillRef>
-            <a:effectRef idx="0">
-              <a:schemeClr val="accent1"/>
-            </a:effectRef>
-            <a:fontRef idx="minor">
-              <a:schemeClr val="lt1"/>
-            </a:fontRef>
-          </p:style>
-          <p:txBody>
-            <a:bodyPr rtlCol="0" anchor="ctr"/>
-            <a:lstStyle/>
-            <a:p>
-              <a:pPr algn="ctr"/>
-              <a:r>
-                <a:rPr lang="fr-FR" sz="2400" b="1" dirty="0">
-                  <a:latin typeface="Gill Sans MT" panose="020B0502020104020203" pitchFamily="34" charset="0"/>
-                </a:rPr>
-                <a:t>Objectifs</a:t>
-              </a:r>
-            </a:p>
-          </p:txBody>
-        </p:sp>
-        <p:sp>
-          <p:nvSpPr>
-            <p:cNvPr id="24" name="Ellipse 23">
-              <a:extLst>
-                <a:ext uri="{FF2B5EF4-FFF2-40B4-BE49-F238E27FC236}">
-                  <a16:creationId xmlns:a16="http://schemas.microsoft.com/office/drawing/2014/main" id="{14B93CAC-4DFB-F0BB-8646-C8C6109CC018}"/>
-                </a:ext>
-              </a:extLst>
-            </p:cNvPr>
-            <p:cNvSpPr/>
-            <p:nvPr/>
-          </p:nvSpPr>
-          <p:spPr>
-            <a:xfrm>
-              <a:off x="1621972" y="1421249"/>
-              <a:ext cx="522872" cy="522872"/>
-            </a:xfrm>
-            <a:prstGeom prst="ellipse">
-              <a:avLst/>
-            </a:prstGeom>
-            <a:solidFill>
-              <a:schemeClr val="accent2"/>
-            </a:solidFill>
-            <a:ln>
-              <a:noFill/>
-            </a:ln>
-          </p:spPr>
-          <p:style>
-            <a:lnRef idx="2">
-              <a:schemeClr val="accent1">
-                <a:shade val="15000"/>
-              </a:schemeClr>
-            </a:lnRef>
-            <a:fillRef idx="1">
-              <a:schemeClr val="accent1"/>
-            </a:fillRef>
-            <a:effectRef idx="0">
-              <a:schemeClr val="accent1"/>
-            </a:effectRef>
-            <a:fontRef idx="minor">
-              <a:schemeClr val="lt1"/>
-            </a:fontRef>
-          </p:style>
-          <p:txBody>
-            <a:bodyPr rtlCol="0" anchor="ctr"/>
-            <a:lstStyle/>
-            <a:p>
-              <a:pPr algn="ctr"/>
-              <a:endParaRPr lang="fr-FR"/>
-            </a:p>
-          </p:txBody>
-        </p:sp>
-      </p:grpSp>
-      <p:sp>
-        <p:nvSpPr>
-          <p:cNvPr id="25" name="ZoneTexte 24">
-            <a:extLst>
-              <a:ext uri="{FF2B5EF4-FFF2-40B4-BE49-F238E27FC236}">
-                <a16:creationId xmlns:a16="http://schemas.microsoft.com/office/drawing/2014/main" id="{5272EEDB-5531-D0B6-EBD6-2438CB98641A}"/>
-              </a:ext>
-            </a:extLst>
-          </p:cNvPr>
-          <p:cNvSpPr txBox="1"/>
-          <p:nvPr/>
-        </p:nvSpPr>
-        <p:spPr>
-          <a:xfrm>
-            <a:off x="1997528" y="3847080"/>
-            <a:ext cx="8392885" cy="367729"/>
-          </a:xfrm>
-          <a:prstGeom prst="rect">
-            <a:avLst/>
-          </a:prstGeom>
-          <a:noFill/>
-        </p:spPr>
-        <p:txBody>
-          <a:bodyPr wrap="square">
-            <a:spAutoFit/>
-          </a:bodyPr>
-          <a:lstStyle/>
-          <a:p>
-            <a:pPr lvl="1" algn="ctr">
-              <a:lnSpc>
-                <a:spcPts val="2143"/>
-              </a:lnSpc>
-              <a:spcBef>
-                <a:spcPts val="300"/>
-              </a:spcBef>
-              <a:spcAft>
-                <a:spcPts val="1029"/>
-              </a:spcAft>
-            </a:pPr>
-            <a:r>
-              <a:rPr lang="fr-FR" sz="2400" b="0" i="0" dirty="0">
-                <a:solidFill>
-                  <a:srgbClr val="404040"/>
-                </a:solidFill>
-                <a:effectLst/>
-                <a:latin typeface="Gill Sans MT" panose="020B0502020104020203" pitchFamily="34" charset="0"/>
-              </a:rPr>
-              <a:t>Modéliser le taux de consultations avec une approche spatiale.</a:t>
-            </a:r>
-          </a:p>
-        </p:txBody>
-      </p:sp>
-      <p:sp>
-        <p:nvSpPr>
-          <p:cNvPr id="28" name="Rectangle : coins arrondis 27">
-            <a:extLst>
-              <a:ext uri="{FF2B5EF4-FFF2-40B4-BE49-F238E27FC236}">
-                <a16:creationId xmlns:a16="http://schemas.microsoft.com/office/drawing/2014/main" id="{24C3065A-1C45-96EA-E252-8CF3DCA501CC}"/>
-              </a:ext>
-            </a:extLst>
-          </p:cNvPr>
-          <p:cNvSpPr/>
-          <p:nvPr/>
-        </p:nvSpPr>
-        <p:spPr>
-          <a:xfrm>
-            <a:off x="2177143" y="4354905"/>
-            <a:ext cx="8599713" cy="2209181"/>
-          </a:xfrm>
-          <a:prstGeom prst="roundRect">
-            <a:avLst>
-              <a:gd name="adj" fmla="val 25536"/>
-            </a:avLst>
-          </a:prstGeom>
-          <a:noFill/>
-          <a:ln w="38100">
-            <a:solidFill>
-              <a:srgbClr val="006A5A"/>
-            </a:solidFill>
-          </a:ln>
-        </p:spPr>
-        <p:style>
-          <a:lnRef idx="2">
-            <a:schemeClr val="accent1">
-              <a:shade val="15000"/>
-            </a:schemeClr>
-          </a:lnRef>
-          <a:fillRef idx="1">
-            <a:schemeClr val="accent1"/>
-          </a:fillRef>
-          <a:effectRef idx="0">
-            <a:schemeClr val="accent1"/>
-          </a:effectRef>
-          <a:fontRef idx="minor">
-            <a:schemeClr val="lt1"/>
-          </a:fontRef>
-        </p:style>
-        <p:txBody>
-          <a:bodyPr rtlCol="0" anchor="ctr"/>
-          <a:lstStyle/>
-          <a:p>
-            <a:pPr algn="ctr"/>
-            <a:endParaRPr lang="fr-FR"/>
-          </a:p>
-        </p:txBody>
-      </p:sp>
-      <p:sp>
-        <p:nvSpPr>
-          <p:cNvPr id="29" name="ZoneTexte 28">
-            <a:extLst>
-              <a:ext uri="{FF2B5EF4-FFF2-40B4-BE49-F238E27FC236}">
-                <a16:creationId xmlns:a16="http://schemas.microsoft.com/office/drawing/2014/main" id="{7C997150-358C-394F-6876-D61E7CFCA646}"/>
-              </a:ext>
-            </a:extLst>
-          </p:cNvPr>
-          <p:cNvSpPr txBox="1"/>
-          <p:nvPr/>
-        </p:nvSpPr>
-        <p:spPr>
-          <a:xfrm>
-            <a:off x="1894115" y="4559633"/>
-            <a:ext cx="8599712" cy="1799723"/>
-          </a:xfrm>
-          <a:prstGeom prst="rect">
-            <a:avLst/>
-          </a:prstGeom>
-          <a:noFill/>
-        </p:spPr>
-        <p:txBody>
-          <a:bodyPr wrap="square">
-            <a:spAutoFit/>
-          </a:bodyPr>
-          <a:lstStyle/>
-          <a:p>
-            <a:pPr marL="914400" lvl="1" indent="-457200" algn="just">
-              <a:lnSpc>
-                <a:spcPts val="2143"/>
-              </a:lnSpc>
-              <a:spcBef>
-                <a:spcPts val="300"/>
-              </a:spcBef>
-              <a:spcAft>
-                <a:spcPts val="1029"/>
-              </a:spcAft>
-              <a:buFont typeface="+mj-lt"/>
-              <a:buAutoNum type="arabicPeriod"/>
-            </a:pPr>
-            <a:r>
-              <a:rPr lang="fr-FR" sz="2400" dirty="0">
-                <a:solidFill>
-                  <a:srgbClr val="404040"/>
-                </a:solidFill>
-                <a:latin typeface="Gill Sans MT" panose="020B0502020104020203" pitchFamily="34" charset="0"/>
-              </a:rPr>
-              <a:t>Visualiser la répartition spatiale de ces taux en vue d’identifier les zones à fort et faible taux</a:t>
-            </a:r>
-          </a:p>
-          <a:p>
-            <a:pPr marL="914400" lvl="1" indent="-457200" algn="just">
-              <a:lnSpc>
-                <a:spcPts val="2143"/>
-              </a:lnSpc>
-              <a:spcBef>
-                <a:spcPts val="300"/>
-              </a:spcBef>
-              <a:spcAft>
-                <a:spcPts val="1029"/>
-              </a:spcAft>
-              <a:buFont typeface="+mj-lt"/>
-              <a:buAutoNum type="arabicPeriod"/>
-            </a:pPr>
-            <a:r>
-              <a:rPr lang="fr-FR" sz="2400" dirty="0">
-                <a:latin typeface="Gill Sans MT" panose="020B0502020104020203" pitchFamily="34" charset="0"/>
-              </a:rPr>
-              <a:t>Identifier les facteurs socio-économiques et démographiques qui influencent le taux de consultations</a:t>
-            </a:r>
-          </a:p>
-          <a:p>
-            <a:pPr marL="914400" lvl="1" indent="-457200" algn="just">
-              <a:lnSpc>
-                <a:spcPts val="2143"/>
-              </a:lnSpc>
-              <a:spcBef>
-                <a:spcPts val="300"/>
-              </a:spcBef>
-              <a:spcAft>
-                <a:spcPts val="1029"/>
-              </a:spcAft>
-              <a:buFont typeface="+mj-lt"/>
-              <a:buAutoNum type="arabicPeriod"/>
-            </a:pPr>
-            <a:r>
-              <a:rPr lang="fr-FR" sz="2400" b="0" i="0" dirty="0">
-                <a:solidFill>
-                  <a:srgbClr val="404040"/>
-                </a:solidFill>
-                <a:effectLst/>
-                <a:latin typeface="Gill Sans MT" panose="020B0502020104020203" pitchFamily="34" charset="0"/>
-              </a:rPr>
-              <a:t>Proposer des recommandations pour réduire les inégalités.</a:t>
-            </a:r>
-          </a:p>
-        </p:txBody>
-      </p:sp>
-    </p:spTree>
-    <p:extLst>
-      <p:ext uri="{BB962C8B-B14F-4D97-AF65-F5344CB8AC3E}">
-        <p14:creationId xmlns:p14="http://schemas.microsoft.com/office/powerpoint/2010/main" val="413827849"/>
-      </p:ext>
-    </p:extLst>
-  </p:cSld>
-  <p:clrMapOvr>
-    <a:masterClrMapping/>
-  </p:clrMapOvr>
-</p:sld>
-</file>
-
-<file path=ppt/slides/slide30.xml><?xml version="1.0" encoding="utf-8"?>
+<file path=ppt/slides/slide27.xml><?xml version="1.0" encoding="utf-8"?>
 <p:sld xmlns:a="http://schemas.openxmlformats.org/drawingml/2006/main" xmlns:r="http://schemas.openxmlformats.org/officeDocument/2006/relationships" xmlns:p="http://schemas.openxmlformats.org/presentationml/2006/main">
   <p:cSld>
     <p:spTree>
@@ -16340,7 +14730,7 @@
             <a:fld id="{F546B7B7-7D14-4795-A998-350CFB2BDD43}" type="slidenum">
               <a:rPr lang="fr-FR" smtClean="0"/>
               <a:pPr/>
-              <a:t>30</a:t>
+              <a:t>27</a:t>
             </a:fld>
             <a:endParaRPr lang="fr-FR"/>
           </a:p>
@@ -16359,7 +14749,7 @@
 </p:sld>
 </file>
 
-<file path=ppt/slides/slide31.xml><?xml version="1.0" encoding="utf-8"?>
+<file path=ppt/slides/slide28.xml><?xml version="1.0" encoding="utf-8"?>
 <p:sld xmlns:a="http://schemas.openxmlformats.org/drawingml/2006/main" xmlns:r="http://schemas.openxmlformats.org/officeDocument/2006/relationships" xmlns:p="http://schemas.openxmlformats.org/presentationml/2006/main">
   <p:cSld>
     <p:spTree>
@@ -16411,7 +14801,7 @@
             <a:fld id="{F546B7B7-7D14-4795-A998-350CFB2BDD43}" type="slidenum">
               <a:rPr lang="fr-FR" smtClean="0"/>
               <a:pPr/>
-              <a:t>31</a:t>
+              <a:t>28</a:t>
             </a:fld>
             <a:endParaRPr lang="fr-FR" dirty="0"/>
           </a:p>
@@ -16931,7 +15321,7 @@
                 <a:rPr lang="fr-FR" sz="2800" dirty="0">
                   <a:latin typeface="Gill Sans MT" panose="020B0502020104020203" pitchFamily="34" charset="0"/>
                 </a:rPr>
-                <a:t>Effets de débordement spatial</a:t>
+                <a:t>Inégalités territoriales</a:t>
               </a:r>
             </a:p>
           </p:txBody>
@@ -16950,7 +15340,7 @@
 </p:sld>
 </file>
 
-<file path=ppt/slides/slide32.xml><?xml version="1.0" encoding="utf-8"?>
+<file path=ppt/slides/slide29.xml><?xml version="1.0" encoding="utf-8"?>
 <p:sld xmlns:a="http://schemas.openxmlformats.org/drawingml/2006/main" xmlns:r="http://schemas.openxmlformats.org/officeDocument/2006/relationships" xmlns:p="http://schemas.openxmlformats.org/presentationml/2006/main">
   <p:cSld>
     <p:spTree>
@@ -17002,7 +15392,7 @@
             <a:fld id="{F546B7B7-7D14-4795-A998-350CFB2BDD43}" type="slidenum">
               <a:rPr lang="fr-FR" smtClean="0"/>
               <a:pPr/>
-              <a:t>32</a:t>
+              <a:t>29</a:t>
             </a:fld>
             <a:endParaRPr lang="fr-FR" dirty="0"/>
           </a:p>
@@ -17625,7 +16015,875 @@
 </p:sld>
 </file>
 
-<file path=ppt/slides/slide33.xml><?xml version="1.0" encoding="utf-8"?>
+<file path=ppt/slides/slide3.xml><?xml version="1.0" encoding="utf-8"?>
+<p:sld xmlns:a="http://schemas.openxmlformats.org/drawingml/2006/main" xmlns:r="http://schemas.openxmlformats.org/officeDocument/2006/relationships" xmlns:p="http://schemas.openxmlformats.org/presentationml/2006/main">
+  <p:cSld>
+    <p:spTree>
+      <p:nvGrpSpPr>
+        <p:cNvPr id="1" name=""/>
+        <p:cNvGrpSpPr/>
+        <p:nvPr/>
+      </p:nvGrpSpPr>
+      <p:grpSpPr>
+        <a:xfrm>
+          <a:off x="0" y="0"/>
+          <a:ext cx="0" cy="0"/>
+          <a:chOff x="0" y="0"/>
+          <a:chExt cx="0" cy="0"/>
+        </a:xfrm>
+      </p:grpSpPr>
+      <p:sp>
+        <p:nvSpPr>
+          <p:cNvPr id="3" name="Espace réservé du numéro de diapositive 2">
+            <a:extLst>
+              <a:ext uri="{FF2B5EF4-FFF2-40B4-BE49-F238E27FC236}">
+                <a16:creationId xmlns:a16="http://schemas.microsoft.com/office/drawing/2014/main" id="{68EEE016-1B4D-27DD-4ADA-3B73EB64F3E1}"/>
+              </a:ext>
+            </a:extLst>
+          </p:cNvPr>
+          <p:cNvSpPr>
+            <a:spLocks noGrp="1"/>
+          </p:cNvSpPr>
+          <p:nvPr>
+            <p:ph type="sldNum" sz="quarter" idx="4"/>
+          </p:nvPr>
+        </p:nvSpPr>
+        <p:spPr>
+          <a:xfrm>
+            <a:off x="8610600" y="6356350"/>
+            <a:ext cx="2743200" cy="365125"/>
+          </a:xfrm>
+        </p:spPr>
+        <p:txBody>
+          <a:bodyPr/>
+          <a:lstStyle/>
+          <a:p>
+            <a:fld id="{F546B7B7-7D14-4795-A998-350CFB2BDD43}" type="slidenum">
+              <a:rPr lang="fr-FR" smtClean="0"/>
+              <a:pPr/>
+              <a:t>3</a:t>
+            </a:fld>
+            <a:endParaRPr lang="fr-FR" dirty="0"/>
+          </a:p>
+        </p:txBody>
+      </p:sp>
+      <p:sp>
+        <p:nvSpPr>
+          <p:cNvPr id="2" name="ZoneTexte 1">
+            <a:extLst>
+              <a:ext uri="{FF2B5EF4-FFF2-40B4-BE49-F238E27FC236}">
+                <a16:creationId xmlns:a16="http://schemas.microsoft.com/office/drawing/2014/main" id="{0A4C5EA5-8EC5-BD2E-0FB5-DC298C4E156C}"/>
+              </a:ext>
+            </a:extLst>
+          </p:cNvPr>
+          <p:cNvSpPr txBox="1"/>
+          <p:nvPr/>
+        </p:nvSpPr>
+        <p:spPr>
+          <a:xfrm>
+            <a:off x="2" y="532969"/>
+            <a:ext cx="12191999" cy="646331"/>
+          </a:xfrm>
+          <a:prstGeom prst="rect">
+            <a:avLst/>
+          </a:prstGeom>
+          <a:solidFill>
+            <a:srgbClr val="006A5A"/>
+          </a:solidFill>
+        </p:spPr>
+        <p:txBody>
+          <a:bodyPr wrap="square" rtlCol="0">
+            <a:spAutoFit/>
+          </a:bodyPr>
+          <a:lstStyle/>
+          <a:p>
+            <a:r>
+              <a:rPr lang="fr-FR" sz="3600" b="1" dirty="0">
+                <a:solidFill>
+                  <a:schemeClr val="bg1"/>
+                </a:solidFill>
+                <a:latin typeface="Gill Sans MT" panose="020B0502020104020203" pitchFamily="34" charset="0"/>
+              </a:rPr>
+              <a:t>Introduction</a:t>
+            </a:r>
+          </a:p>
+        </p:txBody>
+      </p:sp>
+      <p:pic>
+        <p:nvPicPr>
+          <p:cNvPr id="4" name="Graphique 3" descr="Flèches de chevron">
+            <a:extLst>
+              <a:ext uri="{FF2B5EF4-FFF2-40B4-BE49-F238E27FC236}">
+                <a16:creationId xmlns:a16="http://schemas.microsoft.com/office/drawing/2014/main" id="{358D0F2A-5D55-3BCA-A5C6-BEE40DA79E83}"/>
+              </a:ext>
+            </a:extLst>
+          </p:cNvPr>
+          <p:cNvPicPr>
+            <a:picLocks noChangeAspect="1"/>
+          </p:cNvPicPr>
+          <p:nvPr/>
+        </p:nvPicPr>
+        <p:blipFill>
+          <a:blip r:embed="rId2">
+            <a:extLst>
+              <a:ext uri="{28A0092B-C50C-407E-A947-70E740481C1C}">
+                <a14:useLocalDpi xmlns:a14="http://schemas.microsoft.com/office/drawing/2010/main" val="0"/>
+              </a:ext>
+              <a:ext uri="{96DAC541-7B7A-43D3-8B79-37D633B846F1}">
+                <asvg:svgBlip xmlns:asvg="http://schemas.microsoft.com/office/drawing/2016/SVG/main" r:embed="rId3"/>
+              </a:ext>
+            </a:extLst>
+          </a:blip>
+          <a:stretch>
+            <a:fillRect/>
+          </a:stretch>
+        </p:blipFill>
+        <p:spPr>
+          <a:xfrm>
+            <a:off x="11078692" y="266700"/>
+            <a:ext cx="1170459" cy="1170459"/>
+          </a:xfrm>
+          <a:prstGeom prst="rect">
+            <a:avLst/>
+          </a:prstGeom>
+        </p:spPr>
+      </p:pic>
+      <p:sp>
+        <p:nvSpPr>
+          <p:cNvPr id="8" name="ZoneTexte 7">
+            <a:extLst>
+              <a:ext uri="{FF2B5EF4-FFF2-40B4-BE49-F238E27FC236}">
+                <a16:creationId xmlns:a16="http://schemas.microsoft.com/office/drawing/2014/main" id="{CDA3B022-3B8D-2B7C-C02F-660DEFB862E6}"/>
+              </a:ext>
+            </a:extLst>
+          </p:cNvPr>
+          <p:cNvSpPr txBox="1"/>
+          <p:nvPr/>
+        </p:nvSpPr>
+        <p:spPr>
+          <a:xfrm>
+            <a:off x="2383971" y="1484388"/>
+            <a:ext cx="8871858" cy="906338"/>
+          </a:xfrm>
+          <a:prstGeom prst="rect">
+            <a:avLst/>
+          </a:prstGeom>
+          <a:noFill/>
+        </p:spPr>
+        <p:txBody>
+          <a:bodyPr wrap="square">
+            <a:spAutoFit/>
+          </a:bodyPr>
+          <a:lstStyle/>
+          <a:p>
+            <a:pPr algn="just">
+              <a:lnSpc>
+                <a:spcPts val="2143"/>
+              </a:lnSpc>
+              <a:spcBef>
+                <a:spcPts val="1029"/>
+              </a:spcBef>
+              <a:spcAft>
+                <a:spcPts val="1029"/>
+              </a:spcAft>
+            </a:pPr>
+            <a:r>
+              <a:rPr lang="fr-FR" sz="2400" b="1" dirty="0">
+                <a:latin typeface="Gill Sans MT" panose="020B0502020104020203" pitchFamily="34" charset="0"/>
+              </a:rPr>
+              <a:t>Disparités territoriales d’accès aux soins en France </a:t>
+            </a:r>
+            <a:r>
+              <a:rPr lang="fr-FR" sz="2400" dirty="0">
+                <a:latin typeface="Gill Sans MT" panose="020B0502020104020203" pitchFamily="34" charset="0"/>
+              </a:rPr>
+              <a:t>(3,9 consultations/an en moyenne, mais </a:t>
+            </a:r>
+            <a:r>
+              <a:rPr lang="fr-FR" sz="2400" b="1" dirty="0">
+                <a:latin typeface="Gill Sans MT" panose="020B0502020104020203" pitchFamily="34" charset="0"/>
+              </a:rPr>
+              <a:t>déserts médicaux en zones rurales</a:t>
+            </a:r>
+            <a:r>
+              <a:rPr lang="fr-FR" sz="2400" dirty="0">
+                <a:latin typeface="Gill Sans MT" panose="020B0502020104020203" pitchFamily="34" charset="0"/>
+              </a:rPr>
+              <a:t>) (INSEE, 2021).</a:t>
+            </a:r>
+          </a:p>
+        </p:txBody>
+      </p:sp>
+      <p:grpSp>
+        <p:nvGrpSpPr>
+          <p:cNvPr id="7" name="Groupe 6">
+            <a:extLst>
+              <a:ext uri="{FF2B5EF4-FFF2-40B4-BE49-F238E27FC236}">
+                <a16:creationId xmlns:a16="http://schemas.microsoft.com/office/drawing/2014/main" id="{FF5EFF40-3651-5EDB-8412-378CD4EF499A}"/>
+              </a:ext>
+            </a:extLst>
+          </p:cNvPr>
+          <p:cNvGrpSpPr/>
+          <p:nvPr/>
+        </p:nvGrpSpPr>
+        <p:grpSpPr>
+          <a:xfrm>
+            <a:off x="152401" y="1506628"/>
+            <a:ext cx="2100942" cy="538782"/>
+            <a:chOff x="1621972" y="1405339"/>
+            <a:chExt cx="2100942" cy="538782"/>
+          </a:xfrm>
+        </p:grpSpPr>
+        <p:sp>
+          <p:nvSpPr>
+            <p:cNvPr id="5" name="Rectangle : coins arrondis 4">
+              <a:extLst>
+                <a:ext uri="{FF2B5EF4-FFF2-40B4-BE49-F238E27FC236}">
+                  <a16:creationId xmlns:a16="http://schemas.microsoft.com/office/drawing/2014/main" id="{E61FF78D-D4B7-8A0E-3A99-B11CA2BF9D35}"/>
+                </a:ext>
+              </a:extLst>
+            </p:cNvPr>
+            <p:cNvSpPr/>
+            <p:nvPr/>
+          </p:nvSpPr>
+          <p:spPr>
+            <a:xfrm>
+              <a:off x="1959429" y="1405339"/>
+              <a:ext cx="1763485" cy="522872"/>
+            </a:xfrm>
+            <a:prstGeom prst="roundRect">
+              <a:avLst>
+                <a:gd name="adj" fmla="val 50000"/>
+              </a:avLst>
+            </a:prstGeom>
+            <a:solidFill>
+              <a:srgbClr val="006A5A"/>
+            </a:solidFill>
+            <a:ln>
+              <a:noFill/>
+            </a:ln>
+          </p:spPr>
+          <p:style>
+            <a:lnRef idx="2">
+              <a:schemeClr val="accent1">
+                <a:shade val="15000"/>
+              </a:schemeClr>
+            </a:lnRef>
+            <a:fillRef idx="1">
+              <a:schemeClr val="accent1"/>
+            </a:fillRef>
+            <a:effectRef idx="0">
+              <a:schemeClr val="accent1"/>
+            </a:effectRef>
+            <a:fontRef idx="minor">
+              <a:schemeClr val="lt1"/>
+            </a:fontRef>
+          </p:style>
+          <p:txBody>
+            <a:bodyPr rtlCol="0" anchor="ctr"/>
+            <a:lstStyle/>
+            <a:p>
+              <a:pPr algn="ctr"/>
+              <a:r>
+                <a:rPr lang="fr-FR" sz="2400" b="1" dirty="0">
+                  <a:latin typeface="Gill Sans MT" panose="020B0502020104020203" pitchFamily="34" charset="0"/>
+                </a:rPr>
+                <a:t>Contexte</a:t>
+              </a:r>
+            </a:p>
+          </p:txBody>
+        </p:sp>
+        <p:sp>
+          <p:nvSpPr>
+            <p:cNvPr id="6" name="Ellipse 5">
+              <a:extLst>
+                <a:ext uri="{FF2B5EF4-FFF2-40B4-BE49-F238E27FC236}">
+                  <a16:creationId xmlns:a16="http://schemas.microsoft.com/office/drawing/2014/main" id="{CC05190E-5C02-D88A-51CD-8B54185D60C5}"/>
+                </a:ext>
+              </a:extLst>
+            </p:cNvPr>
+            <p:cNvSpPr/>
+            <p:nvPr/>
+          </p:nvSpPr>
+          <p:spPr>
+            <a:xfrm>
+              <a:off x="1621972" y="1421249"/>
+              <a:ext cx="522872" cy="522872"/>
+            </a:xfrm>
+            <a:prstGeom prst="ellipse">
+              <a:avLst/>
+            </a:prstGeom>
+            <a:solidFill>
+              <a:schemeClr val="accent2"/>
+            </a:solidFill>
+            <a:ln>
+              <a:noFill/>
+            </a:ln>
+          </p:spPr>
+          <p:style>
+            <a:lnRef idx="2">
+              <a:schemeClr val="accent1">
+                <a:shade val="15000"/>
+              </a:schemeClr>
+            </a:lnRef>
+            <a:fillRef idx="1">
+              <a:schemeClr val="accent1"/>
+            </a:fillRef>
+            <a:effectRef idx="0">
+              <a:schemeClr val="accent1"/>
+            </a:effectRef>
+            <a:fontRef idx="minor">
+              <a:schemeClr val="lt1"/>
+            </a:fontRef>
+          </p:style>
+          <p:txBody>
+            <a:bodyPr rtlCol="0" anchor="ctr"/>
+            <a:lstStyle/>
+            <a:p>
+              <a:pPr algn="ctr"/>
+              <a:endParaRPr lang="fr-FR"/>
+            </a:p>
+          </p:txBody>
+        </p:sp>
+      </p:grpSp>
+      <p:sp>
+        <p:nvSpPr>
+          <p:cNvPr id="15" name="ZoneTexte 14">
+            <a:extLst>
+              <a:ext uri="{FF2B5EF4-FFF2-40B4-BE49-F238E27FC236}">
+                <a16:creationId xmlns:a16="http://schemas.microsoft.com/office/drawing/2014/main" id="{F0CCCD4C-73B8-500E-6EFC-DBF78E6F546F}"/>
+              </a:ext>
+            </a:extLst>
+          </p:cNvPr>
+          <p:cNvSpPr txBox="1"/>
+          <p:nvPr/>
+        </p:nvSpPr>
+        <p:spPr>
+          <a:xfrm>
+            <a:off x="3271035" y="2647574"/>
+            <a:ext cx="7984793" cy="644857"/>
+          </a:xfrm>
+          <a:prstGeom prst="rect">
+            <a:avLst/>
+          </a:prstGeom>
+          <a:noFill/>
+        </p:spPr>
+        <p:txBody>
+          <a:bodyPr wrap="square">
+            <a:spAutoFit/>
+          </a:bodyPr>
+          <a:lstStyle/>
+          <a:p>
+            <a:pPr algn="just">
+              <a:lnSpc>
+                <a:spcPts val="2143"/>
+              </a:lnSpc>
+              <a:spcBef>
+                <a:spcPts val="1029"/>
+              </a:spcBef>
+              <a:spcAft>
+                <a:spcPts val="1029"/>
+              </a:spcAft>
+            </a:pPr>
+            <a:r>
+              <a:rPr lang="fr-FR" sz="2400" b="0" i="0" dirty="0">
+                <a:solidFill>
+                  <a:srgbClr val="404040"/>
+                </a:solidFill>
+                <a:effectLst/>
+                <a:latin typeface="Gill Sans MT" panose="020B0502020104020203" pitchFamily="34" charset="0"/>
+              </a:rPr>
+              <a:t>Identifier les facteurs socio-économiques, démographiques et spatiaux influençant le taux de consultations</a:t>
+            </a:r>
+            <a:endParaRPr lang="fr-FR" sz="2400" dirty="0">
+              <a:latin typeface="Gill Sans MT" panose="020B0502020104020203" pitchFamily="34" charset="0"/>
+            </a:endParaRPr>
+          </a:p>
+        </p:txBody>
+      </p:sp>
+      <p:grpSp>
+        <p:nvGrpSpPr>
+          <p:cNvPr id="19" name="Groupe 18">
+            <a:extLst>
+              <a:ext uri="{FF2B5EF4-FFF2-40B4-BE49-F238E27FC236}">
+                <a16:creationId xmlns:a16="http://schemas.microsoft.com/office/drawing/2014/main" id="{B32077B7-68FF-8583-E5BA-6D4C6199B2FF}"/>
+              </a:ext>
+            </a:extLst>
+          </p:cNvPr>
+          <p:cNvGrpSpPr/>
+          <p:nvPr/>
+        </p:nvGrpSpPr>
+        <p:grpSpPr>
+          <a:xfrm>
+            <a:off x="152401" y="2624966"/>
+            <a:ext cx="2883995" cy="538782"/>
+            <a:chOff x="1621972" y="1405339"/>
+            <a:chExt cx="2883995" cy="538782"/>
+          </a:xfrm>
+        </p:grpSpPr>
+        <p:sp>
+          <p:nvSpPr>
+            <p:cNvPr id="20" name="Rectangle : coins arrondis 19">
+              <a:extLst>
+                <a:ext uri="{FF2B5EF4-FFF2-40B4-BE49-F238E27FC236}">
+                  <a16:creationId xmlns:a16="http://schemas.microsoft.com/office/drawing/2014/main" id="{3F06EF53-242C-6BF9-C239-E6386CD4EE98}"/>
+                </a:ext>
+              </a:extLst>
+            </p:cNvPr>
+            <p:cNvSpPr/>
+            <p:nvPr/>
+          </p:nvSpPr>
+          <p:spPr>
+            <a:xfrm>
+              <a:off x="1959429" y="1405339"/>
+              <a:ext cx="2546538" cy="522872"/>
+            </a:xfrm>
+            <a:prstGeom prst="roundRect">
+              <a:avLst>
+                <a:gd name="adj" fmla="val 50000"/>
+              </a:avLst>
+            </a:prstGeom>
+            <a:solidFill>
+              <a:srgbClr val="006A5A"/>
+            </a:solidFill>
+            <a:ln>
+              <a:noFill/>
+            </a:ln>
+          </p:spPr>
+          <p:style>
+            <a:lnRef idx="2">
+              <a:schemeClr val="accent1">
+                <a:shade val="15000"/>
+              </a:schemeClr>
+            </a:lnRef>
+            <a:fillRef idx="1">
+              <a:schemeClr val="accent1"/>
+            </a:fillRef>
+            <a:effectRef idx="0">
+              <a:schemeClr val="accent1"/>
+            </a:effectRef>
+            <a:fontRef idx="minor">
+              <a:schemeClr val="lt1"/>
+            </a:fontRef>
+          </p:style>
+          <p:txBody>
+            <a:bodyPr rtlCol="0" anchor="ctr"/>
+            <a:lstStyle/>
+            <a:p>
+              <a:pPr algn="ctr"/>
+              <a:r>
+                <a:rPr lang="fr-FR" sz="2400" b="1" dirty="0">
+                  <a:latin typeface="Gill Sans MT" panose="020B0502020104020203" pitchFamily="34" charset="0"/>
+                </a:rPr>
+                <a:t>Problématique</a:t>
+              </a:r>
+            </a:p>
+          </p:txBody>
+        </p:sp>
+        <p:sp>
+          <p:nvSpPr>
+            <p:cNvPr id="21" name="Ellipse 20">
+              <a:extLst>
+                <a:ext uri="{FF2B5EF4-FFF2-40B4-BE49-F238E27FC236}">
+                  <a16:creationId xmlns:a16="http://schemas.microsoft.com/office/drawing/2014/main" id="{FCDD2A58-1E7E-68A5-7E44-A3204A77B173}"/>
+                </a:ext>
+              </a:extLst>
+            </p:cNvPr>
+            <p:cNvSpPr/>
+            <p:nvPr/>
+          </p:nvSpPr>
+          <p:spPr>
+            <a:xfrm>
+              <a:off x="1621972" y="1421249"/>
+              <a:ext cx="522872" cy="522872"/>
+            </a:xfrm>
+            <a:prstGeom prst="ellipse">
+              <a:avLst/>
+            </a:prstGeom>
+            <a:solidFill>
+              <a:schemeClr val="accent2"/>
+            </a:solidFill>
+            <a:ln>
+              <a:noFill/>
+            </a:ln>
+          </p:spPr>
+          <p:style>
+            <a:lnRef idx="2">
+              <a:schemeClr val="accent1">
+                <a:shade val="15000"/>
+              </a:schemeClr>
+            </a:lnRef>
+            <a:fillRef idx="1">
+              <a:schemeClr val="accent1"/>
+            </a:fillRef>
+            <a:effectRef idx="0">
+              <a:schemeClr val="accent1"/>
+            </a:effectRef>
+            <a:fontRef idx="minor">
+              <a:schemeClr val="lt1"/>
+            </a:fontRef>
+          </p:style>
+          <p:txBody>
+            <a:bodyPr rtlCol="0" anchor="ctr"/>
+            <a:lstStyle/>
+            <a:p>
+              <a:pPr algn="ctr"/>
+              <a:endParaRPr lang="fr-FR"/>
+            </a:p>
+          </p:txBody>
+        </p:sp>
+      </p:grpSp>
+      <p:grpSp>
+        <p:nvGrpSpPr>
+          <p:cNvPr id="22" name="Groupe 21">
+            <a:extLst>
+              <a:ext uri="{FF2B5EF4-FFF2-40B4-BE49-F238E27FC236}">
+                <a16:creationId xmlns:a16="http://schemas.microsoft.com/office/drawing/2014/main" id="{D6D82661-F38D-D88D-F8AC-3A6EAB4450B0}"/>
+              </a:ext>
+            </a:extLst>
+          </p:cNvPr>
+          <p:cNvGrpSpPr/>
+          <p:nvPr/>
+        </p:nvGrpSpPr>
+        <p:grpSpPr>
+          <a:xfrm>
+            <a:off x="152401" y="3669997"/>
+            <a:ext cx="2024742" cy="538782"/>
+            <a:chOff x="1621972" y="1405339"/>
+            <a:chExt cx="2024742" cy="538782"/>
+          </a:xfrm>
+        </p:grpSpPr>
+        <p:sp>
+          <p:nvSpPr>
+            <p:cNvPr id="23" name="Rectangle : coins arrondis 22">
+              <a:extLst>
+                <a:ext uri="{FF2B5EF4-FFF2-40B4-BE49-F238E27FC236}">
+                  <a16:creationId xmlns:a16="http://schemas.microsoft.com/office/drawing/2014/main" id="{0B4B3CA1-25EE-0DBC-61A6-EACDC061F948}"/>
+                </a:ext>
+              </a:extLst>
+            </p:cNvPr>
+            <p:cNvSpPr/>
+            <p:nvPr/>
+          </p:nvSpPr>
+          <p:spPr>
+            <a:xfrm>
+              <a:off x="1959429" y="1405339"/>
+              <a:ext cx="1687285" cy="522872"/>
+            </a:xfrm>
+            <a:prstGeom prst="roundRect">
+              <a:avLst>
+                <a:gd name="adj" fmla="val 50000"/>
+              </a:avLst>
+            </a:prstGeom>
+            <a:solidFill>
+              <a:srgbClr val="006A5A"/>
+            </a:solidFill>
+            <a:ln>
+              <a:noFill/>
+            </a:ln>
+          </p:spPr>
+          <p:style>
+            <a:lnRef idx="2">
+              <a:schemeClr val="accent1">
+                <a:shade val="15000"/>
+              </a:schemeClr>
+            </a:lnRef>
+            <a:fillRef idx="1">
+              <a:schemeClr val="accent1"/>
+            </a:fillRef>
+            <a:effectRef idx="0">
+              <a:schemeClr val="accent1"/>
+            </a:effectRef>
+            <a:fontRef idx="minor">
+              <a:schemeClr val="lt1"/>
+            </a:fontRef>
+          </p:style>
+          <p:txBody>
+            <a:bodyPr rtlCol="0" anchor="ctr"/>
+            <a:lstStyle/>
+            <a:p>
+              <a:pPr algn="ctr"/>
+              <a:r>
+                <a:rPr lang="fr-FR" sz="2400" b="1" dirty="0">
+                  <a:latin typeface="Gill Sans MT" panose="020B0502020104020203" pitchFamily="34" charset="0"/>
+                </a:rPr>
+                <a:t>Objectifs</a:t>
+              </a:r>
+            </a:p>
+          </p:txBody>
+        </p:sp>
+        <p:sp>
+          <p:nvSpPr>
+            <p:cNvPr id="24" name="Ellipse 23">
+              <a:extLst>
+                <a:ext uri="{FF2B5EF4-FFF2-40B4-BE49-F238E27FC236}">
+                  <a16:creationId xmlns:a16="http://schemas.microsoft.com/office/drawing/2014/main" id="{14B93CAC-4DFB-F0BB-8646-C8C6109CC018}"/>
+                </a:ext>
+              </a:extLst>
+            </p:cNvPr>
+            <p:cNvSpPr/>
+            <p:nvPr/>
+          </p:nvSpPr>
+          <p:spPr>
+            <a:xfrm>
+              <a:off x="1621972" y="1421249"/>
+              <a:ext cx="522872" cy="522872"/>
+            </a:xfrm>
+            <a:prstGeom prst="ellipse">
+              <a:avLst/>
+            </a:prstGeom>
+            <a:solidFill>
+              <a:schemeClr val="accent2"/>
+            </a:solidFill>
+            <a:ln>
+              <a:noFill/>
+            </a:ln>
+          </p:spPr>
+          <p:style>
+            <a:lnRef idx="2">
+              <a:schemeClr val="accent1">
+                <a:shade val="15000"/>
+              </a:schemeClr>
+            </a:lnRef>
+            <a:fillRef idx="1">
+              <a:schemeClr val="accent1"/>
+            </a:fillRef>
+            <a:effectRef idx="0">
+              <a:schemeClr val="accent1"/>
+            </a:effectRef>
+            <a:fontRef idx="minor">
+              <a:schemeClr val="lt1"/>
+            </a:fontRef>
+          </p:style>
+          <p:txBody>
+            <a:bodyPr rtlCol="0" anchor="ctr"/>
+            <a:lstStyle/>
+            <a:p>
+              <a:pPr algn="ctr"/>
+              <a:endParaRPr lang="fr-FR"/>
+            </a:p>
+          </p:txBody>
+        </p:sp>
+      </p:grpSp>
+      <p:sp>
+        <p:nvSpPr>
+          <p:cNvPr id="25" name="ZoneTexte 24">
+            <a:extLst>
+              <a:ext uri="{FF2B5EF4-FFF2-40B4-BE49-F238E27FC236}">
+                <a16:creationId xmlns:a16="http://schemas.microsoft.com/office/drawing/2014/main" id="{5272EEDB-5531-D0B6-EBD6-2438CB98641A}"/>
+              </a:ext>
+            </a:extLst>
+          </p:cNvPr>
+          <p:cNvSpPr txBox="1"/>
+          <p:nvPr/>
+        </p:nvSpPr>
+        <p:spPr>
+          <a:xfrm>
+            <a:off x="1997528" y="3847080"/>
+            <a:ext cx="8392885" cy="367729"/>
+          </a:xfrm>
+          <a:prstGeom prst="rect">
+            <a:avLst/>
+          </a:prstGeom>
+          <a:noFill/>
+        </p:spPr>
+        <p:txBody>
+          <a:bodyPr wrap="square">
+            <a:spAutoFit/>
+          </a:bodyPr>
+          <a:lstStyle/>
+          <a:p>
+            <a:pPr lvl="1" algn="ctr">
+              <a:lnSpc>
+                <a:spcPts val="2143"/>
+              </a:lnSpc>
+              <a:spcBef>
+                <a:spcPts val="300"/>
+              </a:spcBef>
+              <a:spcAft>
+                <a:spcPts val="1029"/>
+              </a:spcAft>
+            </a:pPr>
+            <a:r>
+              <a:rPr lang="fr-FR" sz="2400" b="0" i="0" dirty="0">
+                <a:solidFill>
+                  <a:srgbClr val="404040"/>
+                </a:solidFill>
+                <a:effectLst/>
+                <a:latin typeface="Gill Sans MT" panose="020B0502020104020203" pitchFamily="34" charset="0"/>
+              </a:rPr>
+              <a:t>Modéliser le taux de consultations avec une approche spatiale.</a:t>
+            </a:r>
+          </a:p>
+        </p:txBody>
+      </p:sp>
+      <p:sp>
+        <p:nvSpPr>
+          <p:cNvPr id="28" name="Rectangle : coins arrondis 27">
+            <a:extLst>
+              <a:ext uri="{FF2B5EF4-FFF2-40B4-BE49-F238E27FC236}">
+                <a16:creationId xmlns:a16="http://schemas.microsoft.com/office/drawing/2014/main" id="{24C3065A-1C45-96EA-E252-8CF3DCA501CC}"/>
+              </a:ext>
+            </a:extLst>
+          </p:cNvPr>
+          <p:cNvSpPr/>
+          <p:nvPr/>
+        </p:nvSpPr>
+        <p:spPr>
+          <a:xfrm>
+            <a:off x="2177143" y="4354905"/>
+            <a:ext cx="8599713" cy="2209181"/>
+          </a:xfrm>
+          <a:prstGeom prst="roundRect">
+            <a:avLst>
+              <a:gd name="adj" fmla="val 25536"/>
+            </a:avLst>
+          </a:prstGeom>
+          <a:noFill/>
+          <a:ln w="38100">
+            <a:solidFill>
+              <a:srgbClr val="006A5A"/>
+            </a:solidFill>
+          </a:ln>
+        </p:spPr>
+        <p:style>
+          <a:lnRef idx="2">
+            <a:schemeClr val="accent1">
+              <a:shade val="15000"/>
+            </a:schemeClr>
+          </a:lnRef>
+          <a:fillRef idx="1">
+            <a:schemeClr val="accent1"/>
+          </a:fillRef>
+          <a:effectRef idx="0">
+            <a:schemeClr val="accent1"/>
+          </a:effectRef>
+          <a:fontRef idx="minor">
+            <a:schemeClr val="lt1"/>
+          </a:fontRef>
+        </p:style>
+        <p:txBody>
+          <a:bodyPr rtlCol="0" anchor="ctr"/>
+          <a:lstStyle/>
+          <a:p>
+            <a:pPr algn="ctr"/>
+            <a:endParaRPr lang="fr-FR"/>
+          </a:p>
+        </p:txBody>
+      </p:sp>
+      <p:sp>
+        <p:nvSpPr>
+          <p:cNvPr id="29" name="ZoneTexte 28">
+            <a:extLst>
+              <a:ext uri="{FF2B5EF4-FFF2-40B4-BE49-F238E27FC236}">
+                <a16:creationId xmlns:a16="http://schemas.microsoft.com/office/drawing/2014/main" id="{7C997150-358C-394F-6876-D61E7CFCA646}"/>
+              </a:ext>
+            </a:extLst>
+          </p:cNvPr>
+          <p:cNvSpPr txBox="1"/>
+          <p:nvPr/>
+        </p:nvSpPr>
+        <p:spPr>
+          <a:xfrm>
+            <a:off x="1894115" y="4559633"/>
+            <a:ext cx="8599712" cy="1799723"/>
+          </a:xfrm>
+          <a:prstGeom prst="rect">
+            <a:avLst/>
+          </a:prstGeom>
+          <a:noFill/>
+        </p:spPr>
+        <p:txBody>
+          <a:bodyPr wrap="square">
+            <a:spAutoFit/>
+          </a:bodyPr>
+          <a:lstStyle/>
+          <a:p>
+            <a:pPr marL="914400" lvl="1" indent="-457200" algn="just">
+              <a:lnSpc>
+                <a:spcPts val="2143"/>
+              </a:lnSpc>
+              <a:spcBef>
+                <a:spcPts val="300"/>
+              </a:spcBef>
+              <a:spcAft>
+                <a:spcPts val="1029"/>
+              </a:spcAft>
+              <a:buFont typeface="+mj-lt"/>
+              <a:buAutoNum type="arabicPeriod"/>
+            </a:pPr>
+            <a:r>
+              <a:rPr lang="fr-FR" sz="2400" dirty="0">
+                <a:solidFill>
+                  <a:srgbClr val="404040"/>
+                </a:solidFill>
+                <a:latin typeface="Gill Sans MT" panose="020B0502020104020203" pitchFamily="34" charset="0"/>
+              </a:rPr>
+              <a:t>Visualiser la répartition spatiale de ces taux en vue d’identifier les zones à fort et faible taux</a:t>
+            </a:r>
+          </a:p>
+          <a:p>
+            <a:pPr marL="914400" lvl="1" indent="-457200" algn="just">
+              <a:lnSpc>
+                <a:spcPts val="2143"/>
+              </a:lnSpc>
+              <a:spcBef>
+                <a:spcPts val="300"/>
+              </a:spcBef>
+              <a:spcAft>
+                <a:spcPts val="1029"/>
+              </a:spcAft>
+              <a:buFont typeface="+mj-lt"/>
+              <a:buAutoNum type="arabicPeriod"/>
+            </a:pPr>
+            <a:r>
+              <a:rPr lang="fr-FR" sz="2400" dirty="0">
+                <a:latin typeface="Gill Sans MT" panose="020B0502020104020203" pitchFamily="34" charset="0"/>
+              </a:rPr>
+              <a:t>Identifier les facteurs socio-économiques et démographiques qui influencent le taux de consultations</a:t>
+            </a:r>
+          </a:p>
+          <a:p>
+            <a:pPr marL="914400" lvl="1" indent="-457200" algn="just">
+              <a:lnSpc>
+                <a:spcPts val="2143"/>
+              </a:lnSpc>
+              <a:spcBef>
+                <a:spcPts val="300"/>
+              </a:spcBef>
+              <a:spcAft>
+                <a:spcPts val="1029"/>
+              </a:spcAft>
+              <a:buFont typeface="+mj-lt"/>
+              <a:buAutoNum type="arabicPeriod"/>
+            </a:pPr>
+            <a:r>
+              <a:rPr lang="fr-FR" sz="2400" b="0" i="0" dirty="0">
+                <a:solidFill>
+                  <a:srgbClr val="404040"/>
+                </a:solidFill>
+                <a:effectLst/>
+                <a:latin typeface="Gill Sans MT" panose="020B0502020104020203" pitchFamily="34" charset="0"/>
+              </a:rPr>
+              <a:t>Proposer des recommandations pour réduire les inégalités.</a:t>
+            </a:r>
+          </a:p>
+        </p:txBody>
+      </p:sp>
+    </p:spTree>
+    <p:extLst>
+      <p:ext uri="{BB962C8B-B14F-4D97-AF65-F5344CB8AC3E}">
+        <p14:creationId xmlns:p14="http://schemas.microsoft.com/office/powerpoint/2010/main" val="413827849"/>
+      </p:ext>
+    </p:extLst>
+  </p:cSld>
+  <p:clrMapOvr>
+    <a:masterClrMapping/>
+  </p:clrMapOvr>
+</p:sld>
+</file>
+
+<file path=ppt/slides/slide30.xml><?xml version="1.0" encoding="utf-8"?>
 <p:sld xmlns:a="http://schemas.openxmlformats.org/drawingml/2006/main" xmlns:r="http://schemas.openxmlformats.org/officeDocument/2006/relationships" xmlns:p="http://schemas.openxmlformats.org/presentationml/2006/main">
   <p:cSld>
     <p:spTree>
@@ -17666,7 +16924,7 @@
             <a:fld id="{F546B7B7-7D14-4795-A998-350CFB2BDD43}" type="slidenum">
               <a:rPr lang="fr-FR" smtClean="0"/>
               <a:pPr/>
-              <a:t>33</a:t>
+              <a:t>30</a:t>
             </a:fld>
             <a:endParaRPr lang="fr-FR"/>
           </a:p>
@@ -17685,7 +16943,7 @@
 </p:sld>
 </file>
 
-<file path=ppt/slides/slide34.xml><?xml version="1.0" encoding="utf-8"?>
+<file path=ppt/slides/slide31.xml><?xml version="1.0" encoding="utf-8"?>
 <p:sld xmlns:a="http://schemas.openxmlformats.org/drawingml/2006/main" xmlns:r="http://schemas.openxmlformats.org/officeDocument/2006/relationships" xmlns:p="http://schemas.openxmlformats.org/presentationml/2006/main">
   <p:cSld>
     <p:spTree>
@@ -17732,7 +16990,7 @@
             <a:fld id="{F546B7B7-7D14-4795-A998-350CFB2BDD43}" type="slidenum">
               <a:rPr lang="fr-FR" smtClean="0"/>
               <a:pPr/>
-              <a:t>34</a:t>
+              <a:t>31</a:t>
             </a:fld>
             <a:endParaRPr lang="fr-FR" dirty="0"/>
           </a:p>
@@ -18330,7 +17588,7 @@
 </p:sld>
 </file>
 
-<file path=ppt/slides/slide35.xml><?xml version="1.0" encoding="utf-8"?>
+<file path=ppt/slides/slide32.xml><?xml version="1.0" encoding="utf-8"?>
 <p:sld xmlns:a="http://schemas.openxmlformats.org/drawingml/2006/main" xmlns:r="http://schemas.openxmlformats.org/officeDocument/2006/relationships" xmlns:p="http://schemas.openxmlformats.org/presentationml/2006/main">
   <p:cSld>
     <p:spTree>
@@ -18477,7 +17735,7 @@
                 <a:latin typeface="Montserrat" panose="02000505000000020004" pitchFamily="2" charset="0"/>
               </a:rPr>
               <a:pPr algn="r"/>
-              <a:t>35</a:t>
+              <a:t>32</a:t>
             </a:fld>
             <a:endParaRPr lang="fr-FR" dirty="0">
               <a:solidFill>
@@ -20365,8 +19623,8 @@
         </p:nvSpPr>
         <p:spPr>
           <a:xfrm>
-            <a:off x="382483" y="3874108"/>
-            <a:ext cx="10818917" cy="2308324"/>
+            <a:off x="390648" y="3198167"/>
+            <a:ext cx="3446062" cy="461665"/>
           </a:xfrm>
           <a:prstGeom prst="rect">
             <a:avLst/>
@@ -20393,386 +19651,65 @@
               <a:latin typeface="Gill Sans MT" panose="020B0502020104020203" pitchFamily="34" charset="0"/>
             </a:endParaRPr>
           </a:p>
-          <a:p>
-            <a:pPr marL="800100" lvl="1" indent="-342900">
-              <a:buFont typeface="Wingdings" panose="05000000000000000000" pitchFamily="2" charset="2"/>
-              <a:buChar char="ü"/>
-            </a:pPr>
-            <a:r>
-              <a:rPr lang="fr-FR" sz="2400" b="1" dirty="0">
-                <a:latin typeface="Gill Sans MT" panose="020B0502020104020203" pitchFamily="34" charset="0"/>
-              </a:rPr>
-              <a:t>Basée sur la distance </a:t>
-            </a:r>
-            <a:r>
-              <a:rPr lang="fr-FR" sz="2400" dirty="0">
-                <a:latin typeface="Gill Sans MT" panose="020B0502020104020203" pitchFamily="34" charset="0"/>
-              </a:rPr>
-              <a:t>: Deux localités sont voisines si la distance entre elles est inférieure à un seuil prédéfini.</a:t>
-            </a:r>
-          </a:p>
-          <a:p>
-            <a:pPr marL="800100" lvl="1" indent="-342900">
-              <a:buFont typeface="Wingdings" panose="05000000000000000000" pitchFamily="2" charset="2"/>
-              <a:buChar char="ü"/>
-            </a:pPr>
-            <a:r>
-              <a:rPr lang="fr-FR" sz="2400" b="1" dirty="0">
-                <a:latin typeface="Gill Sans MT" panose="020B0502020104020203" pitchFamily="34" charset="0"/>
-              </a:rPr>
-              <a:t>Basée sur la contiguïté </a:t>
-            </a:r>
-            <a:r>
-              <a:rPr lang="fr-FR" sz="2400" dirty="0">
-                <a:latin typeface="Gill Sans MT" panose="020B0502020104020203" pitchFamily="34" charset="0"/>
-              </a:rPr>
-              <a:t>: On distingue par exemple la contiguïté </a:t>
-            </a:r>
-            <a:r>
-              <a:rPr lang="fr-FR" sz="2400" dirty="0" err="1">
-                <a:latin typeface="Gill Sans MT" panose="020B0502020104020203" pitchFamily="34" charset="0"/>
-              </a:rPr>
-              <a:t>Rook</a:t>
-            </a:r>
-            <a:r>
-              <a:rPr lang="fr-FR" sz="2400" dirty="0">
-                <a:latin typeface="Gill Sans MT" panose="020B0502020104020203" pitchFamily="34" charset="0"/>
-              </a:rPr>
-              <a:t> et la contiguïté Queen.</a:t>
-            </a:r>
-          </a:p>
-          <a:p>
-            <a:pPr marL="800100" lvl="1" indent="-342900">
-              <a:buFont typeface="Wingdings" panose="05000000000000000000" pitchFamily="2" charset="2"/>
-              <a:buChar char="ü"/>
-            </a:pPr>
-            <a:r>
-              <a:rPr lang="fr-FR" sz="2400" b="1" dirty="0">
-                <a:latin typeface="Gill Sans MT" panose="020B0502020104020203" pitchFamily="34" charset="0"/>
-              </a:rPr>
-              <a:t>Basée sur l’optimisation d’une trajectoire</a:t>
-            </a:r>
-            <a:endParaRPr lang="en-US" sz="2400" b="1" dirty="0">
-              <a:latin typeface="Gill Sans MT" panose="020B0502020104020203" pitchFamily="34" charset="0"/>
-            </a:endParaRPr>
-          </a:p>
         </p:txBody>
       </p:sp>
-      <p:grpSp>
-        <p:nvGrpSpPr>
-          <p:cNvPr id="11" name="Groupe 10">
-            <a:extLst>
-              <a:ext uri="{FF2B5EF4-FFF2-40B4-BE49-F238E27FC236}">
-                <a16:creationId xmlns:a16="http://schemas.microsoft.com/office/drawing/2014/main" id="{3A67ACA6-3011-7E10-2157-844DD05DB304}"/>
-              </a:ext>
-            </a:extLst>
-          </p:cNvPr>
-          <p:cNvGrpSpPr/>
-          <p:nvPr/>
-        </p:nvGrpSpPr>
-        <p:grpSpPr>
-          <a:xfrm>
-            <a:off x="247771" y="1283157"/>
-            <a:ext cx="11106029" cy="4913704"/>
-            <a:chOff x="102053" y="1362165"/>
-            <a:chExt cx="11106029" cy="4711809"/>
-          </a:xfrm>
-        </p:grpSpPr>
-        <p:sp>
-          <p:nvSpPr>
-            <p:cNvPr id="10" name="Rectangle : coins arrondis 9">
-              <a:extLst>
-                <a:ext uri="{FF2B5EF4-FFF2-40B4-BE49-F238E27FC236}">
-                  <a16:creationId xmlns:a16="http://schemas.microsoft.com/office/drawing/2014/main" id="{6BB401D5-D84D-D920-FA55-64F792B2DA24}"/>
-                </a:ext>
-              </a:extLst>
-            </p:cNvPr>
-            <p:cNvSpPr/>
-            <p:nvPr/>
-          </p:nvSpPr>
-          <p:spPr>
-            <a:xfrm>
-              <a:off x="119743" y="1362165"/>
-              <a:ext cx="11088339" cy="2241167"/>
-            </a:xfrm>
-            <a:prstGeom prst="roundRect">
-              <a:avLst/>
-            </a:prstGeom>
-            <a:noFill/>
-          </p:spPr>
-          <p:style>
-            <a:lnRef idx="2">
-              <a:schemeClr val="accent1">
-                <a:shade val="15000"/>
-              </a:schemeClr>
-            </a:lnRef>
-            <a:fillRef idx="1">
-              <a:schemeClr val="accent1"/>
-            </a:fillRef>
-            <a:effectRef idx="0">
-              <a:schemeClr val="accent1"/>
-            </a:effectRef>
-            <a:fontRef idx="minor">
-              <a:schemeClr val="lt1"/>
-            </a:fontRef>
-          </p:style>
-          <p:txBody>
-            <a:bodyPr rtlCol="0" anchor="ctr"/>
-            <a:lstStyle/>
-            <a:p>
-              <a:pPr algn="ctr"/>
-              <a:endParaRPr lang="fr-FR" dirty="0"/>
-            </a:p>
-          </p:txBody>
-        </p:sp>
-        <mc:AlternateContent xmlns:mc="http://schemas.openxmlformats.org/markup-compatibility/2006" xmlns:a14="http://schemas.microsoft.com/office/drawing/2010/main">
-          <mc:Choice Requires="a14">
-            <p:sp>
-              <p:nvSpPr>
-                <p:cNvPr id="6" name="ZoneTexte 5">
-                  <a:extLst>
-                    <a:ext uri="{FF2B5EF4-FFF2-40B4-BE49-F238E27FC236}">
-                      <a16:creationId xmlns:a16="http://schemas.microsoft.com/office/drawing/2014/main" id="{16044062-2647-3BDD-6E66-9E907B89CFA5}"/>
-                    </a:ext>
-                  </a:extLst>
-                </p:cNvPr>
-                <p:cNvSpPr txBox="1"/>
-                <p:nvPr/>
-              </p:nvSpPr>
-              <p:spPr>
-                <a:xfrm>
-                  <a:off x="244929" y="1672224"/>
-                  <a:ext cx="5834743" cy="1895262"/>
-                </a:xfrm>
-                <a:prstGeom prst="rect">
-                  <a:avLst/>
-                </a:prstGeom>
-                <a:noFill/>
-              </p:spPr>
-              <p:txBody>
-                <a:bodyPr wrap="square">
-                  <a:spAutoFit/>
-                </a:bodyPr>
-                <a:lstStyle/>
-                <a:p>
-                  <a:pPr marL="342900" indent="-342900">
-                    <a:buFont typeface="Arial" panose="020B0604020202020204" pitchFamily="34" charset="0"/>
-                    <a:buChar char="•"/>
-                  </a:pPr>
-                  <a:r>
-                    <a:rPr lang="fr-FR" sz="2400" dirty="0">
-                      <a:latin typeface="Gill Sans MT" panose="020B0502020104020203" pitchFamily="34" charset="0"/>
-                    </a:rPr>
-                    <a:t>Le </a:t>
-                  </a:r>
-                  <a:r>
-                    <a:rPr lang="fr-FR" sz="2400" b="1" dirty="0">
-                      <a:latin typeface="Gill Sans MT" panose="020B0502020104020203" pitchFamily="34" charset="0"/>
-                    </a:rPr>
-                    <a:t>taux de consultations</a:t>
-                  </a:r>
-                  <a:r>
-                    <a:rPr lang="fr-FR" sz="2400" dirty="0">
-                      <a:latin typeface="Gill Sans MT" panose="020B0502020104020203" pitchFamily="34" charset="0"/>
-                    </a:rPr>
-                    <a:t>  est le nombre moyen de consultations dans chaque commune :</a:t>
-                  </a:r>
-                </a:p>
-                <a:p>
-                  <a:pPr algn="ctr"/>
-                  <a14:m>
-                    <m:oMathPara xmlns:m="http://schemas.openxmlformats.org/officeDocument/2006/math">
-                      <m:oMathParaPr>
-                        <m:jc m:val="centerGroup"/>
-                      </m:oMathParaPr>
-                      <m:oMath xmlns:m="http://schemas.openxmlformats.org/officeDocument/2006/math">
-                        <m:sSub>
-                          <m:sSubPr>
-                            <m:ctrlPr>
-                              <a:rPr lang="en-US" sz="2400" i="1" smtClean="0">
-                                <a:latin typeface="Cambria Math" panose="02040503050406030204" pitchFamily="18" charset="0"/>
-                              </a:rPr>
-                            </m:ctrlPr>
-                          </m:sSubPr>
-                          <m:e>
-                            <m:r>
-                              <a:rPr lang="en-US" sz="2400" i="1" smtClean="0">
-                                <a:latin typeface="Cambria Math" panose="02040503050406030204" pitchFamily="18" charset="0"/>
-                                <a:ea typeface="Cambria Math" panose="02040503050406030204" pitchFamily="18" charset="0"/>
-                              </a:rPr>
-                              <m:t>𝜏</m:t>
-                            </m:r>
-                          </m:e>
-                          <m:sub>
-                            <m:r>
-                              <a:rPr lang="fr-FR" sz="2400" b="0" i="1" smtClean="0">
-                                <a:latin typeface="Cambria Math" panose="02040503050406030204" pitchFamily="18" charset="0"/>
-                              </a:rPr>
-                              <m:t>𝑖</m:t>
-                            </m:r>
-                          </m:sub>
-                        </m:sSub>
-                        <m:r>
-                          <a:rPr lang="fr-FR" sz="2400" b="0" i="1" smtClean="0">
-                            <a:latin typeface="Cambria Math" panose="02040503050406030204" pitchFamily="18" charset="0"/>
-                          </a:rPr>
-                          <m:t>=</m:t>
-                        </m:r>
-                        <m:f>
-                          <m:fPr>
-                            <m:ctrlPr>
-                              <a:rPr lang="fr-FR" sz="2400" b="0" i="1" smtClean="0">
-                                <a:latin typeface="Cambria Math" panose="02040503050406030204" pitchFamily="18" charset="0"/>
-                              </a:rPr>
-                            </m:ctrlPr>
-                          </m:fPr>
-                          <m:num>
-                            <m:sSub>
-                              <m:sSubPr>
-                                <m:ctrlPr>
-                                  <a:rPr lang="fr-FR" sz="2400" b="0" i="1" smtClean="0">
-                                    <a:latin typeface="Cambria Math" panose="02040503050406030204" pitchFamily="18" charset="0"/>
-                                  </a:rPr>
-                                </m:ctrlPr>
-                              </m:sSubPr>
-                              <m:e>
-                                <m:r>
-                                  <a:rPr lang="fr-FR" sz="2400" b="0" i="1" smtClean="0">
-                                    <a:latin typeface="Cambria Math" panose="02040503050406030204" pitchFamily="18" charset="0"/>
-                                  </a:rPr>
-                                  <m:t>𝑛</m:t>
-                                </m:r>
-                              </m:e>
-                              <m:sub>
-                                <m:r>
-                                  <a:rPr lang="fr-FR" sz="2400" b="0" i="1" smtClean="0">
-                                    <a:latin typeface="Cambria Math" panose="02040503050406030204" pitchFamily="18" charset="0"/>
-                                  </a:rPr>
-                                  <m:t>𝑖</m:t>
-                                </m:r>
-                              </m:sub>
-                            </m:sSub>
-                          </m:num>
-                          <m:den>
-                            <m:sSub>
-                              <m:sSubPr>
-                                <m:ctrlPr>
-                                  <a:rPr lang="fr-FR" sz="2400" b="0" i="1" smtClean="0">
-                                    <a:latin typeface="Cambria Math" panose="02040503050406030204" pitchFamily="18" charset="0"/>
-                                  </a:rPr>
-                                </m:ctrlPr>
-                              </m:sSubPr>
-                              <m:e>
-                                <m:r>
-                                  <a:rPr lang="fr-FR" sz="2400" b="0" i="1" smtClean="0">
-                                    <a:latin typeface="Cambria Math" panose="02040503050406030204" pitchFamily="18" charset="0"/>
-                                  </a:rPr>
-                                  <m:t>𝑃</m:t>
-                                </m:r>
-                              </m:e>
-                              <m:sub>
-                                <m:r>
-                                  <a:rPr lang="fr-FR" sz="2400" b="0" i="1" smtClean="0">
-                                    <a:latin typeface="Cambria Math" panose="02040503050406030204" pitchFamily="18" charset="0"/>
-                                  </a:rPr>
-                                  <m:t>𝑖</m:t>
-                                </m:r>
-                              </m:sub>
-                            </m:sSub>
-                          </m:den>
-                        </m:f>
-                      </m:oMath>
-                    </m:oMathPara>
-                  </a14:m>
-                  <a:endParaRPr lang="en-US" sz="2400" dirty="0">
+      <mc:AlternateContent xmlns:mc="http://schemas.openxmlformats.org/markup-compatibility/2006">
+        <mc:Choice xmlns:a14="http://schemas.microsoft.com/office/drawing/2010/main" Requires="a14">
+          <p:sp>
+            <p:nvSpPr>
+              <p:cNvPr id="6" name="ZoneTexte 5">
+                <a:extLst>
+                  <a:ext uri="{FF2B5EF4-FFF2-40B4-BE49-F238E27FC236}">
+                    <a16:creationId xmlns:a16="http://schemas.microsoft.com/office/drawing/2014/main" id="{16044062-2647-3BDD-6E66-9E907B89CFA5}"/>
+                  </a:ext>
+                </a:extLst>
+              </p:cNvPr>
+              <p:cNvSpPr txBox="1"/>
+              <p:nvPr/>
+            </p:nvSpPr>
+            <p:spPr>
+              <a:xfrm>
+                <a:off x="390647" y="1606501"/>
+                <a:ext cx="5834743" cy="1156598"/>
+              </a:xfrm>
+              <a:prstGeom prst="rect">
+                <a:avLst/>
+              </a:prstGeom>
+              <a:noFill/>
+            </p:spPr>
+            <p:txBody>
+              <a:bodyPr wrap="square">
+                <a:spAutoFit/>
+              </a:bodyPr>
+              <a:lstStyle/>
+              <a:p>
+                <a:pPr marL="342900" indent="-342900">
+                  <a:buFont typeface="Arial" panose="020B0604020202020204" pitchFamily="34" charset="0"/>
+                  <a:buChar char="•"/>
+                </a:pPr>
+                <a:r>
+                  <a:rPr lang="fr-FR" sz="2400" dirty="0">
                     <a:latin typeface="Gill Sans MT" panose="020B0502020104020203" pitchFamily="34" charset="0"/>
-                  </a:endParaRPr>
-                </a:p>
-              </p:txBody>
-            </p:sp>
-          </mc:Choice>
-          <mc:Fallback xmlns="">
-            <p:sp>
-              <p:nvSpPr>
-                <p:cNvPr id="6" name="ZoneTexte 5">
-                  <a:extLst>
-                    <a:ext uri="{FF2B5EF4-FFF2-40B4-BE49-F238E27FC236}">
-                      <a16:creationId xmlns:a16="http://schemas.microsoft.com/office/drawing/2014/main" id="{16044062-2647-3BDD-6E66-9E907B89CFA5}"/>
-                    </a:ext>
-                  </a:extLst>
-                </p:cNvPr>
-                <p:cNvSpPr txBox="1">
-                  <a:spLocks noRot="1" noChangeAspect="1" noMove="1" noResize="1" noEditPoints="1" noAdjustHandles="1" noChangeArrowheads="1" noChangeShapeType="1" noTextEdit="1"/>
-                </p:cNvSpPr>
-                <p:nvPr/>
-              </p:nvSpPr>
-              <p:spPr>
-                <a:xfrm>
-                  <a:off x="244929" y="1672224"/>
-                  <a:ext cx="5834743" cy="1895262"/>
-                </a:xfrm>
-                <a:prstGeom prst="rect">
-                  <a:avLst/>
-                </a:prstGeom>
-                <a:blipFill>
-                  <a:blip r:embed="rId4"/>
-                  <a:stretch>
-                    <a:fillRect l="-1358" t="-2469" r="-2821"/>
-                  </a:stretch>
-                </a:blipFill>
-              </p:spPr>
-              <p:txBody>
-                <a:bodyPr/>
-                <a:lstStyle/>
-                <a:p>
-                  <a:r>
-                    <a:rPr lang="fr-FR">
-                      <a:noFill/>
-                    </a:rPr>
-                    <a:t> </a:t>
-                  </a:r>
-                </a:p>
-              </p:txBody>
-            </p:sp>
-          </mc:Fallback>
-        </mc:AlternateContent>
-        <mc:AlternateContent xmlns:mc="http://schemas.openxmlformats.org/markup-compatibility/2006" xmlns:a14="http://schemas.microsoft.com/office/drawing/2010/main">
-          <mc:Choice Requires="a14">
-            <p:sp>
-              <p:nvSpPr>
-                <p:cNvPr id="9" name="ZoneTexte 8">
-                  <a:extLst>
-                    <a:ext uri="{FF2B5EF4-FFF2-40B4-BE49-F238E27FC236}">
-                      <a16:creationId xmlns:a16="http://schemas.microsoft.com/office/drawing/2014/main" id="{2C442562-28C8-D55B-3644-361E62740B73}"/>
-                    </a:ext>
-                  </a:extLst>
-                </p:cNvPr>
-                <p:cNvSpPr txBox="1"/>
-                <p:nvPr/>
-              </p:nvSpPr>
-              <p:spPr>
-                <a:xfrm>
-                  <a:off x="6173439" y="1672224"/>
-                  <a:ext cx="5034643" cy="1569660"/>
-                </a:xfrm>
-                <a:prstGeom prst="rect">
-                  <a:avLst/>
-                </a:prstGeom>
-                <a:noFill/>
-              </p:spPr>
-              <p:txBody>
-                <a:bodyPr wrap="square">
-                  <a:spAutoFit/>
-                </a:bodyPr>
-                <a:lstStyle/>
-                <a:p>
-                  <a:r>
-                    <a:rPr lang="fr-FR" sz="2400" dirty="0">
-                      <a:latin typeface="Gill Sans MT" panose="020B0502020104020203" pitchFamily="34" charset="0"/>
-                    </a:rPr>
-                    <a:t>Avec </a:t>
-                  </a:r>
-                  <a14:m>
+                  </a:rPr>
+                  <a:t>Le </a:t>
+                </a:r>
+                <a:r>
+                  <a:rPr lang="fr-FR" sz="2400" b="1" dirty="0">
+                    <a:latin typeface="Gill Sans MT" panose="020B0502020104020203" pitchFamily="34" charset="0"/>
+                  </a:rPr>
+                  <a:t>taux de consultations</a:t>
+                </a:r>
+                <a:endParaRPr lang="fr-FR" sz="2400" dirty="0">
+                  <a:latin typeface="Gill Sans MT" panose="020B0502020104020203" pitchFamily="34" charset="0"/>
+                </a:endParaRPr>
+              </a:p>
+              <a:p>
+                <a:pPr algn="ctr"/>
+                <a14:m>
+                  <m:oMathPara xmlns:m="http://schemas.openxmlformats.org/officeDocument/2006/math">
+                    <m:oMathParaPr>
+                      <m:jc m:val="centerGroup"/>
+                    </m:oMathParaPr>
                     <m:oMath xmlns:m="http://schemas.openxmlformats.org/officeDocument/2006/math">
                       <m:sSub>
                         <m:sSubPr>
@@ -20800,360 +19737,138 @@
                           </m:r>
                         </m:sub>
                       </m:sSub>
-                    </m:oMath>
-                  </a14:m>
-                  <a:r>
-                    <a:rPr lang="fr-FR" sz="2400" dirty="0">
-                      <a:latin typeface="Gill Sans MT" panose="020B0502020104020203" pitchFamily="34" charset="0"/>
-                    </a:rPr>
-                    <a:t> , </a:t>
-                  </a:r>
-                  <a14:m>
-                    <m:oMath xmlns:m="http://schemas.openxmlformats.org/officeDocument/2006/math">
-                      <m:sSub>
-                        <m:sSubPr>
+                      <m:r>
+                        <a:rPr lang="fr-FR" sz="2400" b="0" i="1" smtClean="0">
+                          <a:latin typeface="Cambria Math" panose="02040503050406030204" pitchFamily="18" charset="0"/>
+                        </a:rPr>
+                        <m:t>=</m:t>
+                      </m:r>
+                      <m:f>
+                        <m:fPr>
                           <m:ctrlPr>
-                            <a:rPr lang="fr-FR" sz="2400" i="1">
+                            <a:rPr lang="fr-FR" sz="2400" b="0" i="1" smtClean="0">
                               <a:latin typeface="Cambria Math" panose="02040503050406030204" pitchFamily="18" charset="0"/>
                             </a:rPr>
                           </m:ctrlPr>
-                        </m:sSubPr>
-                        <m:e>
-                          <m:r>
-                            <a:rPr lang="fr-FR" sz="2400" i="1">
-                              <a:latin typeface="Cambria Math" panose="02040503050406030204" pitchFamily="18" charset="0"/>
-                            </a:rPr>
-                            <m:t>𝑛</m:t>
-                          </m:r>
-                        </m:e>
-                        <m:sub>
-                          <m:r>
-                            <a:rPr lang="fr-FR" sz="2400" i="1">
-                              <a:latin typeface="Cambria Math" panose="02040503050406030204" pitchFamily="18" charset="0"/>
-                            </a:rPr>
-                            <m:t>𝑖</m:t>
-                          </m:r>
-                        </m:sub>
-                      </m:sSub>
+                        </m:fPr>
+                        <m:num>
+                          <m:sSub>
+                            <m:sSubPr>
+                              <m:ctrlPr>
+                                <a:rPr lang="fr-FR" sz="2400" b="0" i="1" smtClean="0">
+                                  <a:latin typeface="Cambria Math" panose="02040503050406030204" pitchFamily="18" charset="0"/>
+                                </a:rPr>
+                              </m:ctrlPr>
+                            </m:sSubPr>
+                            <m:e>
+                              <m:r>
+                                <a:rPr lang="fr-FR" sz="2400" b="0" i="1" smtClean="0">
+                                  <a:latin typeface="Cambria Math" panose="02040503050406030204" pitchFamily="18" charset="0"/>
+                                </a:rPr>
+                                <m:t>𝑛</m:t>
+                              </m:r>
+                            </m:e>
+                            <m:sub>
+                              <m:r>
+                                <a:rPr lang="fr-FR" sz="2400" b="0" i="1" smtClean="0">
+                                  <a:latin typeface="Cambria Math" panose="02040503050406030204" pitchFamily="18" charset="0"/>
+                                </a:rPr>
+                                <m:t>𝑖</m:t>
+                              </m:r>
+                            </m:sub>
+                          </m:sSub>
+                        </m:num>
+                        <m:den>
+                          <m:sSub>
+                            <m:sSubPr>
+                              <m:ctrlPr>
+                                <a:rPr lang="fr-FR" sz="2400" b="0" i="1" smtClean="0">
+                                  <a:latin typeface="Cambria Math" panose="02040503050406030204" pitchFamily="18" charset="0"/>
+                                </a:rPr>
+                              </m:ctrlPr>
+                            </m:sSubPr>
+                            <m:e>
+                              <m:r>
+                                <a:rPr lang="fr-FR" sz="2400" b="0" i="1" smtClean="0">
+                                  <a:latin typeface="Cambria Math" panose="02040503050406030204" pitchFamily="18" charset="0"/>
+                                </a:rPr>
+                                <m:t>𝑃</m:t>
+                              </m:r>
+                            </m:e>
+                            <m:sub>
+                              <m:r>
+                                <a:rPr lang="fr-FR" sz="2400" b="0" i="1" smtClean="0">
+                                  <a:latin typeface="Cambria Math" panose="02040503050406030204" pitchFamily="18" charset="0"/>
+                                </a:rPr>
+                                <m:t>𝑖</m:t>
+                              </m:r>
+                            </m:sub>
+                          </m:sSub>
+                        </m:den>
+                      </m:f>
                     </m:oMath>
-                  </a14:m>
-                  <a:r>
-                    <a:rPr lang="fr-FR" sz="2400" dirty="0">
-                      <a:latin typeface="Gill Sans MT" panose="020B0502020104020203" pitchFamily="34" charset="0"/>
-                    </a:rPr>
-                    <a:t> et </a:t>
-                  </a:r>
-                  <a14:m>
-                    <m:oMath xmlns:m="http://schemas.openxmlformats.org/officeDocument/2006/math">
-                      <m:sSub>
-                        <m:sSubPr>
-                          <m:ctrlPr>
-                            <a:rPr lang="fr-FR" sz="2400" i="1">
-                              <a:latin typeface="Cambria Math" panose="02040503050406030204" pitchFamily="18" charset="0"/>
-                            </a:rPr>
-                          </m:ctrlPr>
-                        </m:sSubPr>
-                        <m:e>
-                          <m:r>
-                            <a:rPr lang="fr-FR" sz="2400" i="1">
-                              <a:latin typeface="Cambria Math" panose="02040503050406030204" pitchFamily="18" charset="0"/>
-                            </a:rPr>
-                            <m:t>𝑃</m:t>
-                          </m:r>
-                        </m:e>
-                        <m:sub>
-                          <m:r>
-                            <a:rPr lang="fr-FR" sz="2400" i="1">
-                              <a:latin typeface="Cambria Math" panose="02040503050406030204" pitchFamily="18" charset="0"/>
-                            </a:rPr>
-                            <m:t>𝑖</m:t>
-                          </m:r>
-                        </m:sub>
-                      </m:sSub>
-                    </m:oMath>
-                  </a14:m>
-                  <a:r>
-                    <a:rPr lang="fr-FR" sz="2400" dirty="0">
-                      <a:latin typeface="Gill Sans MT" panose="020B0502020104020203" pitchFamily="34" charset="0"/>
-                    </a:rPr>
-                    <a:t>, respectivement le taux de consultations, le nombre de consultations et la population de la commune </a:t>
-                  </a:r>
-                  <a14:m>
-                    <m:oMath xmlns:m="http://schemas.openxmlformats.org/officeDocument/2006/math">
-                      <m:r>
-                        <a:rPr lang="fr-FR" sz="2400" i="1" dirty="0" smtClean="0">
-                          <a:latin typeface="Cambria Math" panose="02040503050406030204" pitchFamily="18" charset="0"/>
-                        </a:rPr>
-                        <m:t>𝑖</m:t>
-                      </m:r>
-                    </m:oMath>
-                  </a14:m>
-                  <a:r>
-                    <a:rPr lang="fr-FR" sz="2400" dirty="0">
-                      <a:latin typeface="Gill Sans MT" panose="020B0502020104020203" pitchFamily="34" charset="0"/>
-                    </a:rPr>
-                    <a:t>.</a:t>
-                  </a:r>
-                  <a:endParaRPr lang="en-US" sz="2400" dirty="0">
-                    <a:latin typeface="Gill Sans MT" panose="020B0502020104020203" pitchFamily="34" charset="0"/>
-                  </a:endParaRPr>
-                </a:p>
-              </p:txBody>
-            </p:sp>
-          </mc:Choice>
-          <mc:Fallback xmlns="">
-            <p:sp>
-              <p:nvSpPr>
-                <p:cNvPr id="9" name="ZoneTexte 8">
-                  <a:extLst>
-                    <a:ext uri="{FF2B5EF4-FFF2-40B4-BE49-F238E27FC236}">
-                      <a16:creationId xmlns:a16="http://schemas.microsoft.com/office/drawing/2014/main" id="{2C442562-28C8-D55B-3644-361E62740B73}"/>
-                    </a:ext>
-                  </a:extLst>
-                </p:cNvPr>
-                <p:cNvSpPr txBox="1">
-                  <a:spLocks noRot="1" noChangeAspect="1" noMove="1" noResize="1" noEditPoints="1" noAdjustHandles="1" noChangeArrowheads="1" noChangeShapeType="1" noTextEdit="1"/>
-                </p:cNvSpPr>
-                <p:nvPr/>
-              </p:nvSpPr>
-              <p:spPr>
-                <a:xfrm>
-                  <a:off x="6173439" y="1672224"/>
-                  <a:ext cx="5034643" cy="1569660"/>
-                </a:xfrm>
-                <a:prstGeom prst="rect">
-                  <a:avLst/>
-                </a:prstGeom>
-                <a:blipFill>
-                  <a:blip r:embed="rId5"/>
-                  <a:stretch>
-                    <a:fillRect l="-1937" t="-2985" b="-3731"/>
-                  </a:stretch>
-                </a:blipFill>
-              </p:spPr>
-              <p:txBody>
-                <a:bodyPr/>
-                <a:lstStyle/>
-                <a:p>
-                  <a:r>
-                    <a:rPr lang="fr-FR">
-                      <a:noFill/>
-                    </a:rPr>
-                    <a:t> </a:t>
-                  </a:r>
-                </a:p>
-              </p:txBody>
-            </p:sp>
-          </mc:Fallback>
-        </mc:AlternateContent>
-        <p:sp>
-          <p:nvSpPr>
-            <p:cNvPr id="12" name="Rectangle : coins arrondis 11">
-              <a:extLst>
-                <a:ext uri="{FF2B5EF4-FFF2-40B4-BE49-F238E27FC236}">
-                  <a16:creationId xmlns:a16="http://schemas.microsoft.com/office/drawing/2014/main" id="{51FECEE6-D937-2875-5E80-45020A8753EB}"/>
-                </a:ext>
-              </a:extLst>
-            </p:cNvPr>
-            <p:cNvSpPr/>
-            <p:nvPr/>
-          </p:nvSpPr>
-          <p:spPr>
-            <a:xfrm>
-              <a:off x="102053" y="3832807"/>
-              <a:ext cx="11088339" cy="2241167"/>
-            </a:xfrm>
-            <a:prstGeom prst="roundRect">
-              <a:avLst/>
-            </a:prstGeom>
-            <a:noFill/>
-          </p:spPr>
-          <p:style>
-            <a:lnRef idx="2">
-              <a:schemeClr val="accent1">
-                <a:shade val="15000"/>
-              </a:schemeClr>
-            </a:lnRef>
-            <a:fillRef idx="1">
-              <a:schemeClr val="accent1"/>
-            </a:fillRef>
-            <a:effectRef idx="0">
-              <a:schemeClr val="accent1"/>
-            </a:effectRef>
-            <a:fontRef idx="minor">
-              <a:schemeClr val="lt1"/>
-            </a:fontRef>
-          </p:style>
-          <p:txBody>
-            <a:bodyPr rtlCol="0" anchor="ctr"/>
-            <a:lstStyle/>
-            <a:p>
-              <a:pPr algn="ctr"/>
-              <a:endParaRPr lang="fr-FR" dirty="0"/>
-            </a:p>
-          </p:txBody>
-        </p:sp>
-      </p:grpSp>
-    </p:spTree>
-    <p:extLst>
-      <p:ext uri="{BB962C8B-B14F-4D97-AF65-F5344CB8AC3E}">
-        <p14:creationId xmlns:p14="http://schemas.microsoft.com/office/powerpoint/2010/main" val="1964435662"/>
-      </p:ext>
-    </p:extLst>
-  </p:cSld>
-  <p:clrMapOvr>
-    <a:masterClrMapping/>
-  </p:clrMapOvr>
-</p:sld>
-</file>
-
-<file path=ppt/slides/slide7.xml><?xml version="1.0" encoding="utf-8"?>
-<p:sld xmlns:a="http://schemas.openxmlformats.org/drawingml/2006/main" xmlns:r="http://schemas.openxmlformats.org/officeDocument/2006/relationships" xmlns:p="http://schemas.openxmlformats.org/presentationml/2006/main">
-  <p:cSld>
-    <p:spTree>
-      <p:nvGrpSpPr>
-        <p:cNvPr id="1" name="">
-          <a:extLst>
-            <a:ext uri="{FF2B5EF4-FFF2-40B4-BE49-F238E27FC236}">
-              <a16:creationId xmlns:a16="http://schemas.microsoft.com/office/drawing/2014/main" id="{C67557DB-E485-B1ED-5FD9-327415A607DF}"/>
-            </a:ext>
-          </a:extLst>
-        </p:cNvPr>
-        <p:cNvGrpSpPr/>
-        <p:nvPr/>
-      </p:nvGrpSpPr>
-      <p:grpSpPr>
-        <a:xfrm>
-          <a:off x="0" y="0"/>
-          <a:ext cx="0" cy="0"/>
-          <a:chOff x="0" y="0"/>
-          <a:chExt cx="0" cy="0"/>
-        </a:xfrm>
-      </p:grpSpPr>
-      <p:sp>
-        <p:nvSpPr>
-          <p:cNvPr id="3" name="Espace réservé du numéro de diapositive 2">
-            <a:extLst>
-              <a:ext uri="{FF2B5EF4-FFF2-40B4-BE49-F238E27FC236}">
-                <a16:creationId xmlns:a16="http://schemas.microsoft.com/office/drawing/2014/main" id="{CE4AAA5A-E668-F3E9-7981-CF3DB415D332}"/>
-              </a:ext>
-            </a:extLst>
-          </p:cNvPr>
-          <p:cNvSpPr>
-            <a:spLocks noGrp="1"/>
-          </p:cNvSpPr>
-          <p:nvPr>
-            <p:ph type="sldNum" sz="quarter" idx="4"/>
-          </p:nvPr>
-        </p:nvSpPr>
-        <p:spPr>
-          <a:xfrm>
-            <a:off x="8610600" y="6356350"/>
-            <a:ext cx="2743200" cy="365125"/>
-          </a:xfrm>
-        </p:spPr>
-        <p:txBody>
-          <a:bodyPr/>
-          <a:lstStyle/>
-          <a:p>
-            <a:fld id="{F546B7B7-7D14-4795-A998-350CFB2BDD43}" type="slidenum">
-              <a:rPr lang="fr-FR" smtClean="0"/>
-              <a:pPr/>
-              <a:t>7</a:t>
-            </a:fld>
-            <a:endParaRPr lang="fr-FR"/>
-          </a:p>
-        </p:txBody>
-      </p:sp>
-      <p:sp>
-        <p:nvSpPr>
-          <p:cNvPr id="2" name="ZoneTexte 1">
-            <a:extLst>
-              <a:ext uri="{FF2B5EF4-FFF2-40B4-BE49-F238E27FC236}">
-                <a16:creationId xmlns:a16="http://schemas.microsoft.com/office/drawing/2014/main" id="{7DB62A4C-01F7-8146-ADBE-E4040BDCC217}"/>
-              </a:ext>
-            </a:extLst>
-          </p:cNvPr>
-          <p:cNvSpPr txBox="1"/>
-          <p:nvPr/>
-        </p:nvSpPr>
-        <p:spPr>
-          <a:xfrm>
-            <a:off x="2" y="532969"/>
-            <a:ext cx="12191999" cy="646331"/>
-          </a:xfrm>
-          <a:prstGeom prst="rect">
-            <a:avLst/>
-          </a:prstGeom>
-          <a:solidFill>
-            <a:srgbClr val="006A5A"/>
-          </a:solidFill>
-        </p:spPr>
-        <p:txBody>
-          <a:bodyPr wrap="square" rtlCol="0">
-            <a:spAutoFit/>
-          </a:bodyPr>
-          <a:lstStyle/>
-          <a:p>
-            <a:r>
-              <a:rPr lang="fr-FR" sz="3600" b="1" dirty="0">
-                <a:solidFill>
-                  <a:schemeClr val="bg1"/>
-                </a:solidFill>
-                <a:latin typeface="Gill Sans MT" panose="020B0502020104020203" pitchFamily="34" charset="0"/>
-              </a:rPr>
-              <a:t>1.1. Cadre conceptuel de l’étude</a:t>
-            </a:r>
-          </a:p>
-        </p:txBody>
-      </p:sp>
-      <p:pic>
-        <p:nvPicPr>
-          <p:cNvPr id="4" name="Graphique 3" descr="Flèches de chevron">
-            <a:extLst>
-              <a:ext uri="{FF2B5EF4-FFF2-40B4-BE49-F238E27FC236}">
-                <a16:creationId xmlns:a16="http://schemas.microsoft.com/office/drawing/2014/main" id="{364AF47F-2B95-0F93-CE36-A0B2B11D4774}"/>
-              </a:ext>
-            </a:extLst>
-          </p:cNvPr>
-          <p:cNvPicPr>
-            <a:picLocks noChangeAspect="1"/>
-          </p:cNvPicPr>
-          <p:nvPr/>
-        </p:nvPicPr>
-        <p:blipFill>
-          <a:blip r:embed="rId2">
-            <a:extLst>
-              <a:ext uri="{28A0092B-C50C-407E-A947-70E740481C1C}">
-                <a14:useLocalDpi xmlns:a14="http://schemas.microsoft.com/office/drawing/2010/main" val="0"/>
-              </a:ext>
-              <a:ext uri="{96DAC541-7B7A-43D3-8B79-37D633B846F1}">
-                <asvg:svgBlip xmlns:asvg="http://schemas.microsoft.com/office/drawing/2016/SVG/main" r:embed="rId3"/>
-              </a:ext>
-            </a:extLst>
-          </a:blip>
-          <a:stretch>
-            <a:fillRect/>
-          </a:stretch>
-        </p:blipFill>
-        <p:spPr>
-          <a:xfrm>
-            <a:off x="11078692" y="266700"/>
-            <a:ext cx="1170459" cy="1170459"/>
-          </a:xfrm>
-          <a:prstGeom prst="rect">
-            <a:avLst/>
-          </a:prstGeom>
-        </p:spPr>
-      </p:pic>
-      <mc:AlternateContent xmlns:mc="http://schemas.openxmlformats.org/markup-compatibility/2006" xmlns:a14="http://schemas.microsoft.com/office/drawing/2010/main">
-        <mc:Choice Requires="a14">
+                  </m:oMathPara>
+                </a14:m>
+                <a:endParaRPr lang="en-US" sz="2400" dirty="0">
+                  <a:latin typeface="Gill Sans MT" panose="020B0502020104020203" pitchFamily="34" charset="0"/>
+                </a:endParaRPr>
+              </a:p>
+            </p:txBody>
+          </p:sp>
+        </mc:Choice>
+        <mc:Fallback>
           <p:sp>
             <p:nvSpPr>
-              <p:cNvPr id="5" name="ZoneTexte 4">
+              <p:cNvPr id="6" name="ZoneTexte 5">
                 <a:extLst>
                   <a:ext uri="{FF2B5EF4-FFF2-40B4-BE49-F238E27FC236}">
-                    <a16:creationId xmlns:a16="http://schemas.microsoft.com/office/drawing/2014/main" id="{9F81570F-F297-B13B-ABA1-DE1E4FC2354A}"/>
+                    <a16:creationId xmlns:a16="http://schemas.microsoft.com/office/drawing/2014/main" id="{16044062-2647-3BDD-6E66-9E907B89CFA5}"/>
+                  </a:ext>
+                </a:extLst>
+              </p:cNvPr>
+              <p:cNvSpPr txBox="1">
+                <a:spLocks noRot="1" noChangeAspect="1" noMove="1" noResize="1" noEditPoints="1" noAdjustHandles="1" noChangeArrowheads="1" noChangeShapeType="1" noTextEdit="1"/>
+              </p:cNvSpPr>
+              <p:nvPr/>
+            </p:nvSpPr>
+            <p:spPr>
+              <a:xfrm>
+                <a:off x="390647" y="1606501"/>
+                <a:ext cx="5834743" cy="1156598"/>
+              </a:xfrm>
+              <a:prstGeom prst="rect">
+                <a:avLst/>
+              </a:prstGeom>
+              <a:blipFill>
+                <a:blip r:embed="rId4"/>
+                <a:stretch>
+                  <a:fillRect l="-1358" t="-4233"/>
+                </a:stretch>
+              </a:blipFill>
+            </p:spPr>
+            <p:txBody>
+              <a:bodyPr/>
+              <a:lstStyle/>
+              <a:p>
+                <a:r>
+                  <a:rPr lang="fr-FR">
+                    <a:noFill/>
+                  </a:rPr>
+                  <a:t> </a:t>
+                </a:r>
+              </a:p>
+            </p:txBody>
+          </p:sp>
+        </mc:Fallback>
+      </mc:AlternateContent>
+      <mc:AlternateContent xmlns:mc="http://schemas.openxmlformats.org/markup-compatibility/2006">
+        <mc:Choice xmlns:a14="http://schemas.microsoft.com/office/drawing/2010/main" Requires="a14">
+          <p:sp>
+            <p:nvSpPr>
+              <p:cNvPr id="7" name="ZoneTexte 6">
+                <a:extLst>
+                  <a:ext uri="{FF2B5EF4-FFF2-40B4-BE49-F238E27FC236}">
+                    <a16:creationId xmlns:a16="http://schemas.microsoft.com/office/drawing/2014/main" id="{20C5E080-9BA5-0202-4544-2E5F62BBF121}"/>
                   </a:ext>
                 </a:extLst>
               </p:cNvPr>
@@ -21162,8 +19877,8 @@
             </p:nvSpPr>
             <p:spPr>
               <a:xfrm>
-                <a:off x="587829" y="2079171"/>
-                <a:ext cx="10308771" cy="3187539"/>
+                <a:off x="390647" y="4477319"/>
+                <a:ext cx="10308771" cy="1650708"/>
               </a:xfrm>
               <a:prstGeom prst="rect">
                 <a:avLst/>
@@ -21204,15 +19919,11 @@
                   </a:rPr>
                   <a:t> </a:t>
                 </a:r>
-                <a:r>
-                  <a:rPr lang="fr-FR" sz="2400" dirty="0">
-                    <a:latin typeface="Gill Sans MT" panose="020B0502020104020203" pitchFamily="34" charset="0"/>
-                  </a:rPr>
-                  <a:t>est une mesure de la distance entre deux points sur une sphère, basée sur leurs coordonnées géographiques :</a:t>
-                </a:r>
+                <a:endParaRPr lang="fr-FR" sz="2400" i="1" dirty="0">
+                  <a:latin typeface="Cambria Math" panose="02040503050406030204" pitchFamily="18" charset="0"/>
+                </a:endParaRPr>
               </a:p>
               <a:p>
-                <a:pPr algn="ctr"/>
                 <a14:m>
                   <m:oMathPara xmlns:m="http://schemas.openxmlformats.org/officeDocument/2006/math">
                     <m:oMathParaPr>
@@ -21611,260 +20322,16 @@
                   <a:latin typeface="Gill Sans MT" panose="020B0502020104020203" pitchFamily="34" charset="0"/>
                 </a:endParaRPr>
               </a:p>
-              <a:p>
-                <a:pPr marL="800100" lvl="1" indent="-342900" algn="just">
-                  <a:buFont typeface="Wingdings" panose="05000000000000000000" pitchFamily="2" charset="2"/>
-                  <a:buChar char="§"/>
-                </a:pPr>
-                <a14:m>
-                  <m:oMath xmlns:m="http://schemas.openxmlformats.org/officeDocument/2006/math">
-                    <m:r>
-                      <a:rPr lang="fr-FR" sz="2400">
-                        <a:latin typeface="Cambria Math" panose="02040503050406030204" pitchFamily="18" charset="0"/>
-                      </a:rPr>
-                      <m:t>𝑟</m:t>
-                    </m:r>
-                  </m:oMath>
-                </a14:m>
-                <a:r>
-                  <a:rPr lang="fr-FR" sz="2400" dirty="0">
-                    <a:latin typeface="Gill Sans MT" panose="020B0502020104020203" pitchFamily="34" charset="0"/>
-                  </a:rPr>
-                  <a:t> est le rayon de la terre (environ 6371 km).</a:t>
-                </a:r>
-              </a:p>
-              <a:p>
-                <a:pPr marL="800100" lvl="1" indent="-342900" algn="just">
-                  <a:buFont typeface="Wingdings" panose="05000000000000000000" pitchFamily="2" charset="2"/>
-                  <a:buChar char="§"/>
-                </a:pPr>
-                <a:r>
-                  <a:rPr lang="fr-FR" sz="2400" dirty="0">
-                    <a:latin typeface="Gill Sans MT" panose="020B0502020104020203" pitchFamily="34" charset="0"/>
-                  </a:rPr>
-                  <a:t> </a:t>
-                </a:r>
-                <a14:m>
-                  <m:oMath xmlns:m="http://schemas.openxmlformats.org/officeDocument/2006/math">
-                    <m:sSub>
-                      <m:sSubPr>
-                        <m:ctrlPr>
-                          <a:rPr lang="fr-FR" sz="2400" i="1" smtClean="0">
-                            <a:latin typeface="Cambria Math" panose="02040503050406030204" pitchFamily="18" charset="0"/>
-                          </a:rPr>
-                        </m:ctrlPr>
-                      </m:sSubPr>
-                      <m:e>
-                        <m:r>
-                          <a:rPr lang="fr-FR" sz="2400">
-                            <a:latin typeface="Cambria Math" panose="02040503050406030204" pitchFamily="18" charset="0"/>
-                          </a:rPr>
-                          <m:t>𝜑</m:t>
-                        </m:r>
-                      </m:e>
-                      <m:sub>
-                        <m:r>
-                          <a:rPr lang="fr-FR" sz="2400">
-                            <a:latin typeface="Cambria Math" panose="02040503050406030204" pitchFamily="18" charset="0"/>
-                          </a:rPr>
-                          <m:t>𝑖</m:t>
-                        </m:r>
-                      </m:sub>
-                    </m:sSub>
-                  </m:oMath>
-                </a14:m>
-                <a:r>
-                  <a:rPr lang="fr-FR" sz="2400" dirty="0">
-                    <a:latin typeface="Gill Sans MT" panose="020B0502020104020203" pitchFamily="34" charset="0"/>
-                  </a:rPr>
-                  <a:t> , </a:t>
-                </a:r>
-                <a14:m>
-                  <m:oMath xmlns:m="http://schemas.openxmlformats.org/officeDocument/2006/math">
-                    <m:sSub>
-                      <m:sSubPr>
-                        <m:ctrlPr>
-                          <a:rPr lang="fr-FR" sz="2400" i="1">
-                            <a:latin typeface="Cambria Math" panose="02040503050406030204" pitchFamily="18" charset="0"/>
-                          </a:rPr>
-                        </m:ctrlPr>
-                      </m:sSubPr>
-                      <m:e>
-                        <m:r>
-                          <a:rPr lang="fr-FR" sz="2400">
-                            <a:latin typeface="Cambria Math" panose="02040503050406030204" pitchFamily="18" charset="0"/>
-                          </a:rPr>
-                          <m:t>𝜑</m:t>
-                        </m:r>
-                      </m:e>
-                      <m:sub>
-                        <m:r>
-                          <a:rPr lang="fr-FR" sz="2400" b="0" i="1" smtClean="0">
-                            <a:latin typeface="Cambria Math" panose="02040503050406030204" pitchFamily="18" charset="0"/>
-                          </a:rPr>
-                          <m:t>𝑗</m:t>
-                        </m:r>
-                      </m:sub>
-                    </m:sSub>
-                  </m:oMath>
-                </a14:m>
-                <a:r>
-                  <a:rPr lang="fr-FR" sz="2400" dirty="0">
-                    <a:latin typeface="Gill Sans MT" panose="020B0502020104020203" pitchFamily="34" charset="0"/>
-                  </a:rPr>
-                  <a:t> sont les latitudes des points </a:t>
-                </a:r>
-                <a14:m>
-                  <m:oMath xmlns:m="http://schemas.openxmlformats.org/officeDocument/2006/math">
-                    <m:r>
-                      <a:rPr lang="fr-FR" sz="2400" b="0" i="1" smtClean="0">
-                        <a:latin typeface="Cambria Math" panose="02040503050406030204" pitchFamily="18" charset="0"/>
-                      </a:rPr>
-                      <m:t>𝑖</m:t>
-                    </m:r>
-                  </m:oMath>
-                </a14:m>
-                <a:r>
-                  <a:rPr lang="fr-FR" sz="2400" dirty="0">
-                    <a:latin typeface="Gill Sans MT" panose="020B0502020104020203" pitchFamily="34" charset="0"/>
-                  </a:rPr>
-                  <a:t> et </a:t>
-                </a:r>
-                <a14:m>
-                  <m:oMath xmlns:m="http://schemas.openxmlformats.org/officeDocument/2006/math">
-                    <m:r>
-                      <a:rPr lang="fr-FR" sz="2400" b="0" i="1" smtClean="0">
-                        <a:latin typeface="Cambria Math" panose="02040503050406030204" pitchFamily="18" charset="0"/>
-                      </a:rPr>
-                      <m:t>𝑗</m:t>
-                    </m:r>
-                  </m:oMath>
-                </a14:m>
-                <a:r>
-                  <a:rPr lang="fr-FR" sz="2400" dirty="0">
-                    <a:latin typeface="Gill Sans MT" panose="020B0502020104020203" pitchFamily="34" charset="0"/>
-                  </a:rPr>
-                  <a:t> (en radians).</a:t>
-                </a:r>
-              </a:p>
-              <a:p>
-                <a:pPr marL="800100" lvl="1" indent="-342900" algn="just">
-                  <a:buFont typeface="Wingdings" panose="05000000000000000000" pitchFamily="2" charset="2"/>
-                  <a:buChar char="§"/>
-                </a:pPr>
-                <a14:m>
-                  <m:oMath xmlns:m="http://schemas.openxmlformats.org/officeDocument/2006/math">
-                    <m:sSub>
-                      <m:sSubPr>
-                        <m:ctrlPr>
-                          <a:rPr lang="fr-FR" sz="2400" i="1" smtClean="0">
-                            <a:latin typeface="Cambria Math" panose="02040503050406030204" pitchFamily="18" charset="0"/>
-                          </a:rPr>
-                        </m:ctrlPr>
-                      </m:sSubPr>
-                      <m:e>
-                        <m:r>
-                          <a:rPr lang="fr-FR" sz="2400">
-                            <a:latin typeface="Cambria Math" panose="02040503050406030204" pitchFamily="18" charset="0"/>
-                          </a:rPr>
-                          <m:t>𝜆</m:t>
-                        </m:r>
-                      </m:e>
-                      <m:sub>
-                        <m:r>
-                          <a:rPr lang="fr-FR" sz="2400">
-                            <a:latin typeface="Cambria Math" panose="02040503050406030204" pitchFamily="18" charset="0"/>
-                          </a:rPr>
-                          <m:t>𝑖</m:t>
-                        </m:r>
-                      </m:sub>
-                    </m:sSub>
-                  </m:oMath>
-                </a14:m>
-                <a:r>
-                  <a:rPr lang="fr-FR" sz="2400" dirty="0">
-                    <a:latin typeface="Gill Sans MT" panose="020B0502020104020203" pitchFamily="34" charset="0"/>
-                  </a:rPr>
-                  <a:t>, </a:t>
-                </a:r>
-                <a14:m>
-                  <m:oMath xmlns:m="http://schemas.openxmlformats.org/officeDocument/2006/math">
-                    <m:sSub>
-                      <m:sSubPr>
-                        <m:ctrlPr>
-                          <a:rPr lang="fr-FR" sz="2400" i="1">
-                            <a:latin typeface="Cambria Math" panose="02040503050406030204" pitchFamily="18" charset="0"/>
-                          </a:rPr>
-                        </m:ctrlPr>
-                      </m:sSubPr>
-                      <m:e>
-                        <m:r>
-                          <a:rPr lang="fr-FR" sz="2400">
-                            <a:latin typeface="Cambria Math" panose="02040503050406030204" pitchFamily="18" charset="0"/>
-                          </a:rPr>
-                          <m:t>𝜆</m:t>
-                        </m:r>
-                      </m:e>
-                      <m:sub>
-                        <m:r>
-                          <a:rPr lang="fr-FR" sz="2400" b="0" i="1" smtClean="0">
-                            <a:latin typeface="Cambria Math" panose="02040503050406030204" pitchFamily="18" charset="0"/>
-                          </a:rPr>
-                          <m:t>𝑗</m:t>
-                        </m:r>
-                      </m:sub>
-                    </m:sSub>
-                  </m:oMath>
-                </a14:m>
-                <a:r>
-                  <a:rPr lang="fr-FR" sz="2400" dirty="0">
-                    <a:latin typeface="Gill Sans MT" panose="020B0502020104020203" pitchFamily="34" charset="0"/>
-                  </a:rPr>
-                  <a:t> : les longitudes des points </a:t>
-                </a:r>
-                <a14:m>
-                  <m:oMath xmlns:m="http://schemas.openxmlformats.org/officeDocument/2006/math">
-                    <m:r>
-                      <a:rPr lang="fr-FR" sz="2400" i="1">
-                        <a:latin typeface="Cambria Math" panose="02040503050406030204" pitchFamily="18" charset="0"/>
-                      </a:rPr>
-                      <m:t>𝑖</m:t>
-                    </m:r>
-                  </m:oMath>
-                </a14:m>
-                <a:r>
-                  <a:rPr lang="fr-FR" sz="2400" dirty="0">
-                    <a:latin typeface="Gill Sans MT" panose="020B0502020104020203" pitchFamily="34" charset="0"/>
-                  </a:rPr>
-                  <a:t> et </a:t>
-                </a:r>
-                <a14:m>
-                  <m:oMath xmlns:m="http://schemas.openxmlformats.org/officeDocument/2006/math">
-                    <m:r>
-                      <a:rPr lang="fr-FR" sz="2400" i="1">
-                        <a:latin typeface="Cambria Math" panose="02040503050406030204" pitchFamily="18" charset="0"/>
-                      </a:rPr>
-                      <m:t>𝑗</m:t>
-                    </m:r>
-                  </m:oMath>
-                </a14:m>
-                <a:r>
-                  <a:rPr lang="fr-FR" sz="2400" dirty="0">
-                    <a:latin typeface="Gill Sans MT" panose="020B0502020104020203" pitchFamily="34" charset="0"/>
-                  </a:rPr>
-                  <a:t> (en radians).</a:t>
-                </a:r>
-              </a:p>
             </p:txBody>
           </p:sp>
         </mc:Choice>
-        <mc:Fallback xmlns="">
+        <mc:Fallback>
           <p:sp>
             <p:nvSpPr>
-              <p:cNvPr id="5" name="ZoneTexte 4">
+              <p:cNvPr id="7" name="ZoneTexte 6">
                 <a:extLst>
                   <a:ext uri="{FF2B5EF4-FFF2-40B4-BE49-F238E27FC236}">
-                    <a16:creationId xmlns:a16="http://schemas.microsoft.com/office/drawing/2014/main" id="{9F81570F-F297-B13B-ABA1-DE1E4FC2354A}"/>
+                    <a16:creationId xmlns:a16="http://schemas.microsoft.com/office/drawing/2014/main" id="{20C5E080-9BA5-0202-4544-2E5F62BBF121}"/>
                   </a:ext>
                 </a:extLst>
               </p:cNvPr>
@@ -21875,16 +20342,16 @@
             </p:nvSpPr>
             <p:spPr>
               <a:xfrm>
-                <a:off x="587829" y="2079171"/>
-                <a:ext cx="10308771" cy="3187539"/>
+                <a:off x="390647" y="4477319"/>
+                <a:ext cx="10308771" cy="1650708"/>
               </a:xfrm>
               <a:prstGeom prst="rect">
                 <a:avLst/>
               </a:prstGeom>
               <a:blipFill>
-                <a:blip r:embed="rId4"/>
+                <a:blip r:embed="rId5"/>
                 <a:stretch>
-                  <a:fillRect l="-768" t="-1530" b="-2486"/>
+                  <a:fillRect l="-769" t="-2952"/>
                 </a:stretch>
               </a:blipFill>
             </p:spPr>
@@ -21903,57 +20370,10 @@
           </p:sp>
         </mc:Fallback>
       </mc:AlternateContent>
-      <p:sp>
-        <p:nvSpPr>
-          <p:cNvPr id="6" name="Rectangle : coins arrondis 5">
-            <a:extLst>
-              <a:ext uri="{FF2B5EF4-FFF2-40B4-BE49-F238E27FC236}">
-                <a16:creationId xmlns:a16="http://schemas.microsoft.com/office/drawing/2014/main" id="{76CA1956-751F-88BA-9706-A459333F12C0}"/>
-              </a:ext>
-            </a:extLst>
-          </p:cNvPr>
-          <p:cNvSpPr/>
-          <p:nvPr/>
-        </p:nvSpPr>
-        <p:spPr>
-          <a:xfrm>
-            <a:off x="194582" y="1413475"/>
-            <a:ext cx="11469339" cy="4518929"/>
-          </a:xfrm>
-          <a:prstGeom prst="roundRect">
-            <a:avLst/>
-          </a:prstGeom>
-          <a:noFill/>
-        </p:spPr>
-        <p:style>
-          <a:lnRef idx="2">
-            <a:schemeClr val="accent1">
-              <a:shade val="15000"/>
-            </a:schemeClr>
-          </a:lnRef>
-          <a:fillRef idx="1">
-            <a:schemeClr val="accent1"/>
-          </a:fillRef>
-          <a:effectRef idx="0">
-            <a:schemeClr val="accent1"/>
-          </a:effectRef>
-          <a:fontRef idx="minor">
-            <a:schemeClr val="lt1"/>
-          </a:fontRef>
-        </p:style>
-        <p:txBody>
-          <a:bodyPr rtlCol="0" anchor="ctr"/>
-          <a:lstStyle/>
-          <a:p>
-            <a:pPr algn="ctr"/>
-            <a:endParaRPr lang="fr-FR" dirty="0"/>
-          </a:p>
-        </p:txBody>
-      </p:sp>
     </p:spTree>
     <p:extLst>
       <p:ext uri="{BB962C8B-B14F-4D97-AF65-F5344CB8AC3E}">
-        <p14:creationId xmlns:p14="http://schemas.microsoft.com/office/powerpoint/2010/main" val="2150441019"/>
+        <p14:creationId xmlns:p14="http://schemas.microsoft.com/office/powerpoint/2010/main" val="1964435662"/>
       </p:ext>
     </p:extLst>
   </p:cSld>
@@ -21963,7 +20383,7 @@
 </p:sld>
 </file>
 
-<file path=ppt/slides/slide8.xml><?xml version="1.0" encoding="utf-8"?>
+<file path=ppt/slides/slide7.xml><?xml version="1.0" encoding="utf-8"?>
 <p:sld xmlns:a="http://schemas.openxmlformats.org/drawingml/2006/main" xmlns:r="http://schemas.openxmlformats.org/officeDocument/2006/relationships" xmlns:p="http://schemas.openxmlformats.org/presentationml/2006/main">
   <p:cSld>
     <p:spTree>
@@ -22015,7 +20435,7 @@
             <a:fld id="{F546B7B7-7D14-4795-A998-350CFB2BDD43}" type="slidenum">
               <a:rPr lang="fr-FR" smtClean="0"/>
               <a:pPr/>
-              <a:t>8</a:t>
+              <a:t>7</a:t>
             </a:fld>
             <a:endParaRPr lang="fr-FR"/>
           </a:p>
@@ -22058,25 +20478,7 @@
                 </a:solidFill>
                 <a:latin typeface="Gill Sans MT" panose="020B0502020104020203" pitchFamily="34" charset="0"/>
               </a:rPr>
-              <a:t>1.2. Revue de littérature (</a:t>
-            </a:r>
-            <a:r>
-              <a:rPr lang="fr-FR" sz="2400" b="1" dirty="0">
-                <a:solidFill>
-                  <a:srgbClr val="FF0000"/>
-                </a:solidFill>
-                <a:latin typeface="Gill Sans MT" panose="020B0502020104020203" pitchFamily="34" charset="0"/>
-              </a:rPr>
-              <a:t>Alex: réorganiser si possible sur 2 diapo</a:t>
-            </a:r>
-            <a:r>
-              <a:rPr lang="fr-FR" sz="3600" b="1" dirty="0">
-                <a:solidFill>
-                  <a:schemeClr val="bg1"/>
-                </a:solidFill>
-                <a:latin typeface="Gill Sans MT" panose="020B0502020104020203" pitchFamily="34" charset="0"/>
-              </a:rPr>
-              <a:t>)</a:t>
+              <a:t>1.2. Revue de littérature</a:t>
             </a:r>
           </a:p>
         </p:txBody>
@@ -22523,7 +20925,7 @@
 </p:sld>
 </file>
 
-<file path=ppt/slides/slide9.xml><?xml version="1.0" encoding="utf-8"?>
+<file path=ppt/slides/slide8.xml><?xml version="1.0" encoding="utf-8"?>
 <p:sld xmlns:a="http://schemas.openxmlformats.org/drawingml/2006/main" xmlns:r="http://schemas.openxmlformats.org/officeDocument/2006/relationships" xmlns:p="http://schemas.openxmlformats.org/presentationml/2006/main">
   <p:cSld>
     <p:spTree>
@@ -22575,7 +20977,7 @@
             <a:fld id="{F546B7B7-7D14-4795-A998-350CFB2BDD43}" type="slidenum">
               <a:rPr lang="fr-FR" smtClean="0"/>
               <a:pPr/>
-              <a:t>9</a:t>
+              <a:t>8</a:t>
             </a:fld>
             <a:endParaRPr lang="fr-FR"/>
           </a:p>
@@ -23048,6 +21450,66 @@
     <p:extLst>
       <p:ext uri="{BB962C8B-B14F-4D97-AF65-F5344CB8AC3E}">
         <p14:creationId xmlns:p14="http://schemas.microsoft.com/office/powerpoint/2010/main" val="1674074081"/>
+      </p:ext>
+    </p:extLst>
+  </p:cSld>
+  <p:clrMapOvr>
+    <a:masterClrMapping/>
+  </p:clrMapOvr>
+</p:sld>
+</file>
+
+<file path=ppt/slides/slide9.xml><?xml version="1.0" encoding="utf-8"?>
+<p:sld xmlns:a="http://schemas.openxmlformats.org/drawingml/2006/main" xmlns:r="http://schemas.openxmlformats.org/officeDocument/2006/relationships" xmlns:p="http://schemas.openxmlformats.org/presentationml/2006/main">
+  <p:cSld>
+    <p:spTree>
+      <p:nvGrpSpPr>
+        <p:cNvPr id="1" name=""/>
+        <p:cNvGrpSpPr/>
+        <p:nvPr/>
+      </p:nvGrpSpPr>
+      <p:grpSpPr>
+        <a:xfrm>
+          <a:off x="0" y="0"/>
+          <a:ext cx="0" cy="0"/>
+          <a:chOff x="0" y="0"/>
+          <a:chExt cx="0" cy="0"/>
+        </a:xfrm>
+      </p:grpSpPr>
+      <p:sp>
+        <p:nvSpPr>
+          <p:cNvPr id="2" name="Espace réservé du numéro de diapositive 1">
+            <a:extLst>
+              <a:ext uri="{FF2B5EF4-FFF2-40B4-BE49-F238E27FC236}">
+                <a16:creationId xmlns:a16="http://schemas.microsoft.com/office/drawing/2014/main" id="{E166AE0D-2FAB-3003-2BD1-E74A9391CFB5}"/>
+              </a:ext>
+            </a:extLst>
+          </p:cNvPr>
+          <p:cNvSpPr>
+            <a:spLocks noGrp="1"/>
+          </p:cNvSpPr>
+          <p:nvPr>
+            <p:ph type="sldNum" sz="quarter" idx="4"/>
+          </p:nvPr>
+        </p:nvSpPr>
+        <p:spPr/>
+        <p:txBody>
+          <a:bodyPr/>
+          <a:lstStyle/>
+          <a:p>
+            <a:fld id="{F546B7B7-7D14-4795-A998-350CFB2BDD43}" type="slidenum">
+              <a:rPr lang="fr-FR" smtClean="0"/>
+              <a:pPr/>
+              <a:t>9</a:t>
+            </a:fld>
+            <a:endParaRPr lang="fr-FR"/>
+          </a:p>
+        </p:txBody>
+      </p:sp>
+    </p:spTree>
+    <p:extLst>
+      <p:ext uri="{BB962C8B-B14F-4D97-AF65-F5344CB8AC3E}">
+        <p14:creationId xmlns:p14="http://schemas.microsoft.com/office/powerpoint/2010/main" val="1312687224"/>
       </p:ext>
     </p:extLst>
   </p:cSld>

</xml_diff>

<commit_message>
Modifications sur les parties de Richard
</commit_message>
<xml_diff>
--- a/Présentation/Soutenance_Groupe25.pptx
+++ b/Présentation/Soutenance_Groupe25.pptx
@@ -35,12 +35,12 @@
     <p:sldId id="305" r:id="rId23"/>
     <p:sldId id="269" r:id="rId24"/>
     <p:sldId id="270" r:id="rId25"/>
-    <p:sldId id="282" r:id="rId26"/>
-    <p:sldId id="283" r:id="rId27"/>
-    <p:sldId id="284" r:id="rId28"/>
-    <p:sldId id="298" r:id="rId29"/>
+    <p:sldId id="306" r:id="rId26"/>
+    <p:sldId id="307" r:id="rId27"/>
+    <p:sldId id="308" r:id="rId28"/>
+    <p:sldId id="309" r:id="rId29"/>
     <p:sldId id="285" r:id="rId30"/>
-    <p:sldId id="299" r:id="rId31"/>
+    <p:sldId id="310" r:id="rId31"/>
     <p:sldId id="272" r:id="rId32"/>
     <p:sldId id="271" r:id="rId33"/>
     <p:sldId id="297" r:id="rId34"/>
@@ -247,7 +247,7 @@
           <a:p>
             <a:fld id="{02EF5511-433E-438D-93BB-1E1EB804EB9E}" type="datetimeFigureOut">
               <a:rPr lang="fr-FR" smtClean="0"/>
-              <a:t>26/04/2025</a:t>
+              <a:t>27/04/2025</a:t>
             </a:fld>
             <a:endParaRPr lang="fr-FR"/>
           </a:p>
@@ -425,7 +425,7 @@
           <a:p>
             <a:fld id="{173019D8-EACC-4538-984E-33CCC42DAA4E}" type="datetimeFigureOut">
               <a:rPr lang="fr-FR" smtClean="0"/>
-              <a:t>26/04/2025</a:t>
+              <a:t>27/04/2025</a:t>
             </a:fld>
             <a:endParaRPr lang="fr-FR"/>
           </a:p>
@@ -1239,6 +1239,90 @@
           <a:bodyPr/>
           <a:lstStyle/>
           <a:p>
+            <a:endParaRPr lang="fr-FR" dirty="0"/>
+          </a:p>
+        </p:txBody>
+      </p:sp>
+      <p:sp>
+        <p:nvSpPr>
+          <p:cNvPr id="4" name="Espace réservé du numéro de diapositive 3"/>
+          <p:cNvSpPr>
+            <a:spLocks noGrp="1"/>
+          </p:cNvSpPr>
+          <p:nvPr>
+            <p:ph type="sldNum" sz="quarter" idx="5"/>
+          </p:nvPr>
+        </p:nvSpPr>
+        <p:spPr/>
+        <p:txBody>
+          <a:bodyPr/>
+          <a:lstStyle/>
+          <a:p>
+            <a:fld id="{45C44DBB-F87B-49EA-91FB-EDB78BBE8593}" type="slidenum">
+              <a:rPr lang="fr-FR" smtClean="0"/>
+              <a:t>26</a:t>
+            </a:fld>
+            <a:endParaRPr lang="fr-FR"/>
+          </a:p>
+        </p:txBody>
+      </p:sp>
+    </p:spTree>
+    <p:extLst>
+      <p:ext uri="{BB962C8B-B14F-4D97-AF65-F5344CB8AC3E}">
+        <p14:creationId xmlns:p14="http://schemas.microsoft.com/office/powerpoint/2010/main" val="2613062387"/>
+      </p:ext>
+    </p:extLst>
+  </p:cSld>
+  <p:clrMapOvr>
+    <a:masterClrMapping/>
+  </p:clrMapOvr>
+</p:notes>
+</file>
+
+<file path=ppt/notesSlides/notesSlide6.xml><?xml version="1.0" encoding="utf-8"?>
+<p:notes xmlns:a="http://schemas.openxmlformats.org/drawingml/2006/main" xmlns:r="http://schemas.openxmlformats.org/officeDocument/2006/relationships" xmlns:p="http://schemas.openxmlformats.org/presentationml/2006/main">
+  <p:cSld>
+    <p:spTree>
+      <p:nvGrpSpPr>
+        <p:cNvPr id="1" name=""/>
+        <p:cNvGrpSpPr/>
+        <p:nvPr/>
+      </p:nvGrpSpPr>
+      <p:grpSpPr>
+        <a:xfrm>
+          <a:off x="0" y="0"/>
+          <a:ext cx="0" cy="0"/>
+          <a:chOff x="0" y="0"/>
+          <a:chExt cx="0" cy="0"/>
+        </a:xfrm>
+      </p:grpSpPr>
+      <p:sp>
+        <p:nvSpPr>
+          <p:cNvPr id="2" name="Espace réservé de l'image des diapositives 1"/>
+          <p:cNvSpPr>
+            <a:spLocks noGrp="1" noRot="1" noChangeAspect="1"/>
+          </p:cNvSpPr>
+          <p:nvPr>
+            <p:ph type="sldImg"/>
+          </p:nvPr>
+        </p:nvSpPr>
+        <p:spPr/>
+      </p:sp>
+      <p:sp>
+        <p:nvSpPr>
+          <p:cNvPr id="3" name="Espace réservé des notes 2"/>
+          <p:cNvSpPr>
+            <a:spLocks noGrp="1"/>
+          </p:cNvSpPr>
+          <p:nvPr>
+            <p:ph type="body" idx="1"/>
+          </p:nvPr>
+        </p:nvSpPr>
+        <p:spPr/>
+        <p:txBody>
+          <a:bodyPr/>
+          <a:lstStyle/>
+          <a:p>
             <a:r>
               <a:rPr lang="fr-FR" dirty="0"/>
               <a:t>Nous insistons ici sur les </a:t>
@@ -1290,7 +1374,7 @@
 </p:notes>
 </file>
 
-<file path=ppt/notesSlides/notesSlide6.xml><?xml version="1.0" encoding="utf-8"?>
+<file path=ppt/notesSlides/notesSlide7.xml><?xml version="1.0" encoding="utf-8"?>
 <p:notes xmlns:a="http://schemas.openxmlformats.org/drawingml/2006/main" xmlns:r="http://schemas.openxmlformats.org/officeDocument/2006/relationships" xmlns:p="http://schemas.openxmlformats.org/presentationml/2006/main">
   <p:cSld>
     <p:spTree>
@@ -1542,7 +1626,7 @@
             <a:fld id="{B4BDA9CF-F2B2-41BE-8486-9C59032E0655}" type="datetime4">
               <a:rPr lang="fr-FR" smtClean="0"/>
               <a:pPr/>
-              <a:t>26 avril 2025</a:t>
+              <a:t>27 avril 2025</a:t>
             </a:fld>
             <a:endParaRPr lang="fr-FR" dirty="0"/>
           </a:p>
@@ -13236,7 +13320,7 @@
               <a:pPr/>
               <a:t>21</a:t>
             </a:fld>
-            <a:endParaRPr lang="fr-FR"/>
+            <a:endParaRPr lang="fr-FR" dirty="0"/>
           </a:p>
         </p:txBody>
       </p:sp>
@@ -13321,12 +13405,841 @@
           </a:prstGeom>
         </p:spPr>
       </p:pic>
+      <p:graphicFrame>
+        <p:nvGraphicFramePr>
+          <p:cNvPr id="6" name="Tableau 6">
+            <a:extLst>
+              <a:ext uri="{FF2B5EF4-FFF2-40B4-BE49-F238E27FC236}">
+                <a16:creationId xmlns:a16="http://schemas.microsoft.com/office/drawing/2014/main" id="{41163AAB-78A7-4168-9615-1CEFC22A6FD3}"/>
+              </a:ext>
+            </a:extLst>
+          </p:cNvPr>
+          <p:cNvGraphicFramePr>
+            <a:graphicFrameLocks noGrp="1"/>
+          </p:cNvGraphicFramePr>
+          <p:nvPr/>
+        </p:nvGraphicFramePr>
+        <p:xfrm>
+          <a:off x="6288621" y="2239949"/>
+          <a:ext cx="5667852" cy="2377440"/>
+        </p:xfrm>
+        <a:graphic>
+          <a:graphicData uri="http://schemas.openxmlformats.org/drawingml/2006/table">
+            <a:tbl>
+              <a:tblPr firstRow="1" bandRow="1">
+                <a:tableStyleId>{C083E6E3-FA7D-4D7B-A595-EF9225AFEA82}</a:tableStyleId>
+              </a:tblPr>
+              <a:tblGrid>
+                <a:gridCol w="1416963">
+                  <a:extLst>
+                    <a:ext uri="{9D8B030D-6E8A-4147-A177-3AD203B41FA5}">
+                      <a16:colId xmlns:a16="http://schemas.microsoft.com/office/drawing/2014/main" val="3779222157"/>
+                    </a:ext>
+                  </a:extLst>
+                </a:gridCol>
+                <a:gridCol w="1416963">
+                  <a:extLst>
+                    <a:ext uri="{9D8B030D-6E8A-4147-A177-3AD203B41FA5}">
+                      <a16:colId xmlns:a16="http://schemas.microsoft.com/office/drawing/2014/main" val="118586844"/>
+                    </a:ext>
+                  </a:extLst>
+                </a:gridCol>
+                <a:gridCol w="1416963">
+                  <a:extLst>
+                    <a:ext uri="{9D8B030D-6E8A-4147-A177-3AD203B41FA5}">
+                      <a16:colId xmlns:a16="http://schemas.microsoft.com/office/drawing/2014/main" val="907235389"/>
+                    </a:ext>
+                  </a:extLst>
+                </a:gridCol>
+                <a:gridCol w="1416963">
+                  <a:extLst>
+                    <a:ext uri="{9D8B030D-6E8A-4147-A177-3AD203B41FA5}">
+                      <a16:colId xmlns:a16="http://schemas.microsoft.com/office/drawing/2014/main" val="2776099443"/>
+                    </a:ext>
+                  </a:extLst>
+                </a:gridCol>
+              </a:tblGrid>
+              <a:tr h="370840">
+                <a:tc>
+                  <a:txBody>
+                    <a:bodyPr/>
+                    <a:lstStyle/>
+                    <a:p>
+                      <a:r>
+                        <a:rPr lang="fr-FR" sz="2000" dirty="0"/>
+                        <a:t>Statistique</a:t>
+                      </a:r>
+                      <a:endParaRPr lang="fr-FR" sz="2000" dirty="0">
+                        <a:latin typeface="Gill Sans MT" panose="020B0502020104020203" pitchFamily="34" charset="0"/>
+                      </a:endParaRPr>
+                    </a:p>
+                  </a:txBody>
+                  <a:tcPr/>
+                </a:tc>
+                <a:tc>
+                  <a:txBody>
+                    <a:bodyPr/>
+                    <a:lstStyle/>
+                    <a:p>
+                      <a:pPr algn="ctr"/>
+                      <a:r>
+                        <a:rPr lang="fr-FR" sz="2000" dirty="0"/>
+                        <a:t>Valeur</a:t>
+                      </a:r>
+                      <a:endParaRPr lang="fr-FR" sz="2000" dirty="0">
+                        <a:latin typeface="Gill Sans MT" panose="020B0502020104020203" pitchFamily="34" charset="0"/>
+                      </a:endParaRPr>
+                    </a:p>
+                  </a:txBody>
+                  <a:tcPr/>
+                </a:tc>
+                <a:tc>
+                  <a:txBody>
+                    <a:bodyPr/>
+                    <a:lstStyle/>
+                    <a:p>
+                      <a:pPr algn="ctr"/>
+                      <a:r>
+                        <a:rPr lang="fr-FR" sz="2000" dirty="0"/>
+                        <a:t>P-value</a:t>
+                      </a:r>
+                      <a:endParaRPr lang="fr-FR" sz="2000" dirty="0">
+                        <a:latin typeface="Gill Sans MT" panose="020B0502020104020203" pitchFamily="34" charset="0"/>
+                      </a:endParaRPr>
+                    </a:p>
+                  </a:txBody>
+                  <a:tcPr/>
+                </a:tc>
+                <a:tc>
+                  <a:txBody>
+                    <a:bodyPr/>
+                    <a:lstStyle/>
+                    <a:p>
+                      <a:pPr algn="ctr"/>
+                      <a:r>
+                        <a:rPr lang="fr-FR" sz="2000" dirty="0"/>
+                        <a:t>df</a:t>
+                      </a:r>
+                      <a:endParaRPr lang="fr-FR" sz="2000" dirty="0">
+                        <a:latin typeface="Gill Sans MT" panose="020B0502020104020203" pitchFamily="34" charset="0"/>
+                      </a:endParaRPr>
+                    </a:p>
+                  </a:txBody>
+                  <a:tcPr/>
+                </a:tc>
+                <a:extLst>
+                  <a:ext uri="{0D108BD9-81ED-4DB2-BD59-A6C34878D82A}">
+                    <a16:rowId xmlns:a16="http://schemas.microsoft.com/office/drawing/2014/main" val="461027112"/>
+                  </a:ext>
+                </a:extLst>
+              </a:tr>
+              <a:tr h="370840">
+                <a:tc>
+                  <a:txBody>
+                    <a:bodyPr/>
+                    <a:lstStyle/>
+                    <a:p>
+                      <a:r>
+                        <a:rPr lang="fr-FR" sz="2000" dirty="0" err="1"/>
+                        <a:t>RSerr</a:t>
+                      </a:r>
+                      <a:endParaRPr lang="fr-FR" sz="2000" dirty="0">
+                        <a:latin typeface="Gill Sans MT" panose="020B0502020104020203" pitchFamily="34" charset="0"/>
+                      </a:endParaRPr>
+                    </a:p>
+                  </a:txBody>
+                  <a:tcPr/>
+                </a:tc>
+                <a:tc>
+                  <a:txBody>
+                    <a:bodyPr/>
+                    <a:lstStyle/>
+                    <a:p>
+                      <a:pPr algn="ctr"/>
+                      <a:r>
+                        <a:rPr lang="fr-FR" sz="2000" dirty="0"/>
+                        <a:t>6643.03037</a:t>
+                      </a:r>
+                      <a:endParaRPr lang="fr-FR" sz="2000" dirty="0">
+                        <a:latin typeface="Gill Sans MT" panose="020B0502020104020203" pitchFamily="34" charset="0"/>
+                      </a:endParaRPr>
+                    </a:p>
+                  </a:txBody>
+                  <a:tcPr/>
+                </a:tc>
+                <a:tc>
+                  <a:txBody>
+                    <a:bodyPr/>
+                    <a:lstStyle/>
+                    <a:p>
+                      <a:pPr algn="ctr"/>
+                      <a:r>
+                        <a:rPr lang="fr-FR" sz="2000" dirty="0"/>
+                        <a:t>&lt; 2.2e-16</a:t>
+                      </a:r>
+                      <a:endParaRPr lang="fr-FR" sz="2000" dirty="0">
+                        <a:latin typeface="Gill Sans MT" panose="020B0502020104020203" pitchFamily="34" charset="0"/>
+                      </a:endParaRPr>
+                    </a:p>
+                  </a:txBody>
+                  <a:tcPr/>
+                </a:tc>
+                <a:tc>
+                  <a:txBody>
+                    <a:bodyPr/>
+                    <a:lstStyle/>
+                    <a:p>
+                      <a:pPr algn="ctr"/>
+                      <a:r>
+                        <a:rPr lang="fr-FR" sz="2000" dirty="0"/>
+                        <a:t>1</a:t>
+                      </a:r>
+                      <a:endParaRPr lang="fr-FR" sz="2000" dirty="0">
+                        <a:latin typeface="Gill Sans MT" panose="020B0502020104020203" pitchFamily="34" charset="0"/>
+                      </a:endParaRPr>
+                    </a:p>
+                  </a:txBody>
+                  <a:tcPr/>
+                </a:tc>
+                <a:extLst>
+                  <a:ext uri="{0D108BD9-81ED-4DB2-BD59-A6C34878D82A}">
+                    <a16:rowId xmlns:a16="http://schemas.microsoft.com/office/drawing/2014/main" val="151348923"/>
+                  </a:ext>
+                </a:extLst>
+              </a:tr>
+              <a:tr h="370840">
+                <a:tc>
+                  <a:txBody>
+                    <a:bodyPr/>
+                    <a:lstStyle/>
+                    <a:p>
+                      <a:r>
+                        <a:rPr lang="fr-FR" sz="2000" dirty="0" err="1"/>
+                        <a:t>RSlag</a:t>
+                      </a:r>
+                      <a:endParaRPr lang="fr-FR" sz="2000" dirty="0">
+                        <a:latin typeface="Gill Sans MT" panose="020B0502020104020203" pitchFamily="34" charset="0"/>
+                      </a:endParaRPr>
+                    </a:p>
+                  </a:txBody>
+                  <a:tcPr/>
+                </a:tc>
+                <a:tc>
+                  <a:txBody>
+                    <a:bodyPr/>
+                    <a:lstStyle/>
+                    <a:p>
+                      <a:pPr algn="ctr"/>
+                      <a:r>
+                        <a:rPr lang="fr-FR" sz="2000" dirty="0"/>
+                        <a:t>1356.47586</a:t>
+                      </a:r>
+                      <a:endParaRPr lang="fr-FR" sz="2000" dirty="0">
+                        <a:latin typeface="Gill Sans MT" panose="020B0502020104020203" pitchFamily="34" charset="0"/>
+                      </a:endParaRPr>
+                    </a:p>
+                  </a:txBody>
+                  <a:tcPr/>
+                </a:tc>
+                <a:tc>
+                  <a:txBody>
+                    <a:bodyPr/>
+                    <a:lstStyle/>
+                    <a:p>
+                      <a:pPr marL="0" marR="0" lvl="0" indent="0" algn="ctr" defTabSz="914400" rtl="0" eaLnBrk="1" fontAlgn="auto" latinLnBrk="0" hangingPunct="1">
+                        <a:lnSpc>
+                          <a:spcPct val="100000"/>
+                        </a:lnSpc>
+                        <a:spcBef>
+                          <a:spcPts val="0"/>
+                        </a:spcBef>
+                        <a:spcAft>
+                          <a:spcPts val="0"/>
+                        </a:spcAft>
+                        <a:buClrTx/>
+                        <a:buSzTx/>
+                        <a:buFontTx/>
+                        <a:buNone/>
+                        <a:tabLst/>
+                        <a:defRPr/>
+                      </a:pPr>
+                      <a:r>
+                        <a:rPr lang="fr-FR" sz="2000" dirty="0"/>
+                        <a:t>&lt; 2.2e-16</a:t>
+                      </a:r>
+                      <a:endParaRPr lang="fr-FR" sz="2000" dirty="0">
+                        <a:latin typeface="Gill Sans MT" panose="020B0502020104020203" pitchFamily="34" charset="0"/>
+                      </a:endParaRPr>
+                    </a:p>
+                  </a:txBody>
+                  <a:tcPr/>
+                </a:tc>
+                <a:tc>
+                  <a:txBody>
+                    <a:bodyPr/>
+                    <a:lstStyle/>
+                    <a:p>
+                      <a:pPr algn="ctr"/>
+                      <a:r>
+                        <a:rPr lang="fr-FR" sz="2000" dirty="0"/>
+                        <a:t>1</a:t>
+                      </a:r>
+                      <a:endParaRPr lang="fr-FR" sz="2000" dirty="0">
+                        <a:latin typeface="Gill Sans MT" panose="020B0502020104020203" pitchFamily="34" charset="0"/>
+                      </a:endParaRPr>
+                    </a:p>
+                  </a:txBody>
+                  <a:tcPr/>
+                </a:tc>
+                <a:extLst>
+                  <a:ext uri="{0D108BD9-81ED-4DB2-BD59-A6C34878D82A}">
+                    <a16:rowId xmlns:a16="http://schemas.microsoft.com/office/drawing/2014/main" val="220206527"/>
+                  </a:ext>
+                </a:extLst>
+              </a:tr>
+              <a:tr h="370840">
+                <a:tc>
+                  <a:txBody>
+                    <a:bodyPr/>
+                    <a:lstStyle/>
+                    <a:p>
+                      <a:r>
+                        <a:rPr lang="fr-FR" sz="2000" dirty="0" err="1"/>
+                        <a:t>adjRserr</a:t>
+                      </a:r>
+                      <a:endParaRPr lang="fr-FR" sz="2000" dirty="0">
+                        <a:latin typeface="Gill Sans MT" panose="020B0502020104020203" pitchFamily="34" charset="0"/>
+                      </a:endParaRPr>
+                    </a:p>
+                  </a:txBody>
+                  <a:tcPr/>
+                </a:tc>
+                <a:tc>
+                  <a:txBody>
+                    <a:bodyPr/>
+                    <a:lstStyle/>
+                    <a:p>
+                      <a:pPr algn="ctr"/>
+                      <a:r>
+                        <a:rPr lang="fr-FR" sz="2000" dirty="0"/>
+                        <a:t>5309.52308</a:t>
+                      </a:r>
+                      <a:endParaRPr lang="fr-FR" sz="2000" dirty="0">
+                        <a:latin typeface="Gill Sans MT" panose="020B0502020104020203" pitchFamily="34" charset="0"/>
+                      </a:endParaRPr>
+                    </a:p>
+                  </a:txBody>
+                  <a:tcPr/>
+                </a:tc>
+                <a:tc>
+                  <a:txBody>
+                    <a:bodyPr/>
+                    <a:lstStyle/>
+                    <a:p>
+                      <a:pPr marL="0" marR="0" lvl="0" indent="0" algn="ctr" defTabSz="914400" rtl="0" eaLnBrk="1" fontAlgn="auto" latinLnBrk="0" hangingPunct="1">
+                        <a:lnSpc>
+                          <a:spcPct val="100000"/>
+                        </a:lnSpc>
+                        <a:spcBef>
+                          <a:spcPts val="0"/>
+                        </a:spcBef>
+                        <a:spcAft>
+                          <a:spcPts val="0"/>
+                        </a:spcAft>
+                        <a:buClrTx/>
+                        <a:buSzTx/>
+                        <a:buFontTx/>
+                        <a:buNone/>
+                        <a:tabLst/>
+                        <a:defRPr/>
+                      </a:pPr>
+                      <a:r>
+                        <a:rPr lang="fr-FR" sz="2000" dirty="0"/>
+                        <a:t>&lt; 2.2e-16</a:t>
+                      </a:r>
+                      <a:endParaRPr lang="fr-FR" sz="2000" dirty="0">
+                        <a:latin typeface="Gill Sans MT" panose="020B0502020104020203" pitchFamily="34" charset="0"/>
+                      </a:endParaRPr>
+                    </a:p>
+                  </a:txBody>
+                  <a:tcPr/>
+                </a:tc>
+                <a:tc>
+                  <a:txBody>
+                    <a:bodyPr/>
+                    <a:lstStyle/>
+                    <a:p>
+                      <a:pPr algn="ctr"/>
+                      <a:r>
+                        <a:rPr lang="fr-FR" sz="2000" dirty="0"/>
+                        <a:t>1</a:t>
+                      </a:r>
+                      <a:endParaRPr lang="fr-FR" sz="2000" dirty="0">
+                        <a:latin typeface="Gill Sans MT" panose="020B0502020104020203" pitchFamily="34" charset="0"/>
+                      </a:endParaRPr>
+                    </a:p>
+                  </a:txBody>
+                  <a:tcPr/>
+                </a:tc>
+                <a:extLst>
+                  <a:ext uri="{0D108BD9-81ED-4DB2-BD59-A6C34878D82A}">
+                    <a16:rowId xmlns:a16="http://schemas.microsoft.com/office/drawing/2014/main" val="2413646511"/>
+                  </a:ext>
+                </a:extLst>
+              </a:tr>
+              <a:tr h="370840">
+                <a:tc>
+                  <a:txBody>
+                    <a:bodyPr/>
+                    <a:lstStyle/>
+                    <a:p>
+                      <a:r>
+                        <a:rPr lang="fr-FR" sz="2000" dirty="0" err="1"/>
+                        <a:t>adjRSlag</a:t>
+                      </a:r>
+                      <a:endParaRPr lang="fr-FR" sz="2000" dirty="0">
+                        <a:latin typeface="Gill Sans MT" panose="020B0502020104020203" pitchFamily="34" charset="0"/>
+                      </a:endParaRPr>
+                    </a:p>
+                  </a:txBody>
+                  <a:tcPr/>
+                </a:tc>
+                <a:tc>
+                  <a:txBody>
+                    <a:bodyPr/>
+                    <a:lstStyle/>
+                    <a:p>
+                      <a:pPr algn="ctr"/>
+                      <a:r>
+                        <a:rPr lang="fr-FR" sz="2000" dirty="0"/>
+                        <a:t>22.96857</a:t>
+                      </a:r>
+                      <a:endParaRPr lang="fr-FR" sz="2000" dirty="0">
+                        <a:latin typeface="Gill Sans MT" panose="020B0502020104020203" pitchFamily="34" charset="0"/>
+                      </a:endParaRPr>
+                    </a:p>
+                  </a:txBody>
+                  <a:tcPr/>
+                </a:tc>
+                <a:tc>
+                  <a:txBody>
+                    <a:bodyPr/>
+                    <a:lstStyle/>
+                    <a:p>
+                      <a:pPr algn="ctr"/>
+                      <a:r>
+                        <a:rPr lang="fr-FR" sz="2000" dirty="0"/>
+                        <a:t>1.647e-06</a:t>
+                      </a:r>
+                      <a:endParaRPr lang="fr-FR" sz="2000" dirty="0">
+                        <a:latin typeface="Gill Sans MT" panose="020B0502020104020203" pitchFamily="34" charset="0"/>
+                      </a:endParaRPr>
+                    </a:p>
+                  </a:txBody>
+                  <a:tcPr/>
+                </a:tc>
+                <a:tc>
+                  <a:txBody>
+                    <a:bodyPr/>
+                    <a:lstStyle/>
+                    <a:p>
+                      <a:pPr algn="ctr"/>
+                      <a:r>
+                        <a:rPr lang="fr-FR" sz="2000" dirty="0"/>
+                        <a:t>1</a:t>
+                      </a:r>
+                      <a:endParaRPr lang="fr-FR" sz="2000" dirty="0">
+                        <a:latin typeface="Gill Sans MT" panose="020B0502020104020203" pitchFamily="34" charset="0"/>
+                      </a:endParaRPr>
+                    </a:p>
+                  </a:txBody>
+                  <a:tcPr/>
+                </a:tc>
+                <a:extLst>
+                  <a:ext uri="{0D108BD9-81ED-4DB2-BD59-A6C34878D82A}">
+                    <a16:rowId xmlns:a16="http://schemas.microsoft.com/office/drawing/2014/main" val="1087405980"/>
+                  </a:ext>
+                </a:extLst>
+              </a:tr>
+              <a:tr h="370840">
+                <a:tc>
+                  <a:txBody>
+                    <a:bodyPr/>
+                    <a:lstStyle/>
+                    <a:p>
+                      <a:r>
+                        <a:rPr lang="fr-FR" sz="2000" dirty="0"/>
+                        <a:t>SARMA</a:t>
+                      </a:r>
+                      <a:endParaRPr lang="fr-FR" sz="2000" dirty="0">
+                        <a:latin typeface="Gill Sans MT" panose="020B0502020104020203" pitchFamily="34" charset="0"/>
+                      </a:endParaRPr>
+                    </a:p>
+                  </a:txBody>
+                  <a:tcPr/>
+                </a:tc>
+                <a:tc>
+                  <a:txBody>
+                    <a:bodyPr/>
+                    <a:lstStyle/>
+                    <a:p>
+                      <a:pPr algn="ctr"/>
+                      <a:r>
+                        <a:rPr lang="fr-FR" sz="2000" dirty="0"/>
+                        <a:t>6665.99894</a:t>
+                      </a:r>
+                      <a:endParaRPr lang="fr-FR" sz="2000" dirty="0">
+                        <a:latin typeface="Gill Sans MT" panose="020B0502020104020203" pitchFamily="34" charset="0"/>
+                      </a:endParaRPr>
+                    </a:p>
+                  </a:txBody>
+                  <a:tcPr/>
+                </a:tc>
+                <a:tc>
+                  <a:txBody>
+                    <a:bodyPr/>
+                    <a:lstStyle/>
+                    <a:p>
+                      <a:pPr marL="0" marR="0" lvl="0" indent="0" algn="ctr" defTabSz="914400" rtl="0" eaLnBrk="1" fontAlgn="auto" latinLnBrk="0" hangingPunct="1">
+                        <a:lnSpc>
+                          <a:spcPct val="100000"/>
+                        </a:lnSpc>
+                        <a:spcBef>
+                          <a:spcPts val="0"/>
+                        </a:spcBef>
+                        <a:spcAft>
+                          <a:spcPts val="0"/>
+                        </a:spcAft>
+                        <a:buClrTx/>
+                        <a:buSzTx/>
+                        <a:buFontTx/>
+                        <a:buNone/>
+                        <a:tabLst/>
+                        <a:defRPr/>
+                      </a:pPr>
+                      <a:r>
+                        <a:rPr lang="fr-FR" sz="2000" dirty="0"/>
+                        <a:t>&lt; 2.2e-16</a:t>
+                      </a:r>
+                      <a:endParaRPr lang="fr-FR" sz="2000" dirty="0">
+                        <a:latin typeface="Gill Sans MT" panose="020B0502020104020203" pitchFamily="34" charset="0"/>
+                      </a:endParaRPr>
+                    </a:p>
+                  </a:txBody>
+                  <a:tcPr/>
+                </a:tc>
+                <a:tc>
+                  <a:txBody>
+                    <a:bodyPr/>
+                    <a:lstStyle/>
+                    <a:p>
+                      <a:pPr algn="ctr"/>
+                      <a:r>
+                        <a:rPr lang="fr-FR" sz="2000" dirty="0"/>
+                        <a:t>2</a:t>
+                      </a:r>
+                      <a:endParaRPr lang="fr-FR" sz="2000" dirty="0">
+                        <a:latin typeface="Gill Sans MT" panose="020B0502020104020203" pitchFamily="34" charset="0"/>
+                      </a:endParaRPr>
+                    </a:p>
+                  </a:txBody>
+                  <a:tcPr/>
+                </a:tc>
+                <a:extLst>
+                  <a:ext uri="{0D108BD9-81ED-4DB2-BD59-A6C34878D82A}">
+                    <a16:rowId xmlns:a16="http://schemas.microsoft.com/office/drawing/2014/main" val="4224023318"/>
+                  </a:ext>
+                </a:extLst>
+              </a:tr>
+            </a:tbl>
+          </a:graphicData>
+        </a:graphic>
+      </p:graphicFrame>
+      <p:graphicFrame>
+        <p:nvGraphicFramePr>
+          <p:cNvPr id="18" name="Tableau 18">
+            <a:extLst>
+              <a:ext uri="{FF2B5EF4-FFF2-40B4-BE49-F238E27FC236}">
+                <a16:creationId xmlns:a16="http://schemas.microsoft.com/office/drawing/2014/main" id="{41081142-63E1-4FA2-915E-2AA29439753C}"/>
+              </a:ext>
+            </a:extLst>
+          </p:cNvPr>
+          <p:cNvGraphicFramePr>
+            <a:graphicFrameLocks noGrp="1"/>
+          </p:cNvGraphicFramePr>
+          <p:nvPr/>
+        </p:nvGraphicFramePr>
+        <p:xfrm>
+          <a:off x="314035" y="2501900"/>
+          <a:ext cx="4271819" cy="1981200"/>
+        </p:xfrm>
+        <a:graphic>
+          <a:graphicData uri="http://schemas.openxmlformats.org/drawingml/2006/table">
+            <a:tbl>
+              <a:tblPr bandRow="1">
+                <a:tableStyleId>{C083E6E3-FA7D-4D7B-A595-EF9225AFEA82}</a:tableStyleId>
+              </a:tblPr>
+              <a:tblGrid>
+                <a:gridCol w="2841867">
+                  <a:extLst>
+                    <a:ext uri="{9D8B030D-6E8A-4147-A177-3AD203B41FA5}">
+                      <a16:colId xmlns:a16="http://schemas.microsoft.com/office/drawing/2014/main" val="3515936695"/>
+                    </a:ext>
+                  </a:extLst>
+                </a:gridCol>
+                <a:gridCol w="1429952">
+                  <a:extLst>
+                    <a:ext uri="{9D8B030D-6E8A-4147-A177-3AD203B41FA5}">
+                      <a16:colId xmlns:a16="http://schemas.microsoft.com/office/drawing/2014/main" val="1368002904"/>
+                    </a:ext>
+                  </a:extLst>
+                </a:gridCol>
+              </a:tblGrid>
+              <a:tr h="370840">
+                <a:tc>
+                  <a:txBody>
+                    <a:bodyPr/>
+                    <a:lstStyle/>
+                    <a:p>
+                      <a:pPr algn="l"/>
+                      <a:r>
+                        <a:rPr lang="fr-FR" sz="2000" dirty="0" err="1">
+                          <a:latin typeface="Gill Sans MT" panose="020B0502020104020203" pitchFamily="34" charset="0"/>
+                        </a:rPr>
+                        <a:t>Observed</a:t>
+                      </a:r>
+                      <a:r>
+                        <a:rPr lang="fr-FR" sz="2000" dirty="0">
+                          <a:latin typeface="Gill Sans MT" panose="020B0502020104020203" pitchFamily="34" charset="0"/>
+                        </a:rPr>
+                        <a:t> Moran I</a:t>
+                      </a:r>
+                    </a:p>
+                  </a:txBody>
+                  <a:tcPr/>
+                </a:tc>
+                <a:tc>
+                  <a:txBody>
+                    <a:bodyPr/>
+                    <a:lstStyle/>
+                    <a:p>
+                      <a:pPr algn="ctr"/>
+                      <a:r>
+                        <a:rPr lang="fr-FR" sz="2000" dirty="0">
+                          <a:latin typeface="Gill Sans MT" panose="020B0502020104020203" pitchFamily="34" charset="0"/>
+                        </a:rPr>
+                        <a:t>0.1597993</a:t>
+                      </a:r>
+                    </a:p>
+                  </a:txBody>
+                  <a:tcPr/>
+                </a:tc>
+                <a:extLst>
+                  <a:ext uri="{0D108BD9-81ED-4DB2-BD59-A6C34878D82A}">
+                    <a16:rowId xmlns:a16="http://schemas.microsoft.com/office/drawing/2014/main" val="2893546417"/>
+                  </a:ext>
+                </a:extLst>
+              </a:tr>
+              <a:tr h="370840">
+                <a:tc>
+                  <a:txBody>
+                    <a:bodyPr/>
+                    <a:lstStyle/>
+                    <a:p>
+                      <a:pPr algn="l"/>
+                      <a:r>
+                        <a:rPr lang="fr-FR" sz="2000" dirty="0" err="1">
+                          <a:latin typeface="Gill Sans MT" panose="020B0502020104020203" pitchFamily="34" charset="0"/>
+                        </a:rPr>
+                        <a:t>Excpectation</a:t>
+                      </a:r>
+                      <a:endParaRPr lang="fr-FR" sz="2000" dirty="0">
+                        <a:latin typeface="Gill Sans MT" panose="020B0502020104020203" pitchFamily="34" charset="0"/>
+                      </a:endParaRPr>
+                    </a:p>
+                  </a:txBody>
+                  <a:tcPr/>
+                </a:tc>
+                <a:tc>
+                  <a:txBody>
+                    <a:bodyPr/>
+                    <a:lstStyle/>
+                    <a:p>
+                      <a:pPr algn="ctr"/>
+                      <a:r>
+                        <a:rPr lang="fr-FR" sz="2000" dirty="0">
+                          <a:latin typeface="Gill Sans MT" panose="020B0502020104020203" pitchFamily="34" charset="0"/>
+                        </a:rPr>
+                        <a:t>-0.0005762</a:t>
+                      </a:r>
+                    </a:p>
+                  </a:txBody>
+                  <a:tcPr/>
+                </a:tc>
+                <a:extLst>
+                  <a:ext uri="{0D108BD9-81ED-4DB2-BD59-A6C34878D82A}">
+                    <a16:rowId xmlns:a16="http://schemas.microsoft.com/office/drawing/2014/main" val="1269124689"/>
+                  </a:ext>
+                </a:extLst>
+              </a:tr>
+              <a:tr h="370840">
+                <a:tc>
+                  <a:txBody>
+                    <a:bodyPr/>
+                    <a:lstStyle/>
+                    <a:p>
+                      <a:pPr algn="l"/>
+                      <a:r>
+                        <a:rPr lang="fr-FR" sz="2000" dirty="0">
+                          <a:latin typeface="Gill Sans MT" panose="020B0502020104020203" pitchFamily="34" charset="0"/>
+                        </a:rPr>
+                        <a:t>Variance</a:t>
+                      </a:r>
+                    </a:p>
+                  </a:txBody>
+                  <a:tcPr/>
+                </a:tc>
+                <a:tc>
+                  <a:txBody>
+                    <a:bodyPr/>
+                    <a:lstStyle/>
+                    <a:p>
+                      <a:pPr algn="ctr"/>
+                      <a:r>
+                        <a:rPr lang="fr-FR" sz="2000" dirty="0">
+                          <a:latin typeface="Gill Sans MT" panose="020B0502020104020203" pitchFamily="34" charset="0"/>
+                        </a:rPr>
+                        <a:t>3.52e-06</a:t>
+                      </a:r>
+                    </a:p>
+                  </a:txBody>
+                  <a:tcPr/>
+                </a:tc>
+                <a:extLst>
+                  <a:ext uri="{0D108BD9-81ED-4DB2-BD59-A6C34878D82A}">
+                    <a16:rowId xmlns:a16="http://schemas.microsoft.com/office/drawing/2014/main" val="580035877"/>
+                  </a:ext>
+                </a:extLst>
+              </a:tr>
+              <a:tr h="370840">
+                <a:tc>
+                  <a:txBody>
+                    <a:bodyPr/>
+                    <a:lstStyle/>
+                    <a:p>
+                      <a:pPr algn="l"/>
+                      <a:r>
+                        <a:rPr lang="fr-FR" sz="2000" dirty="0" err="1">
+                          <a:latin typeface="Gill Sans MT" panose="020B0502020104020203" pitchFamily="34" charset="0"/>
+                        </a:rPr>
+                        <a:t>statistic</a:t>
+                      </a:r>
+                      <a:r>
+                        <a:rPr lang="fr-FR" sz="2000" dirty="0">
+                          <a:latin typeface="Gill Sans MT" panose="020B0502020104020203" pitchFamily="34" charset="0"/>
+                        </a:rPr>
+                        <a:t> standard </a:t>
+                      </a:r>
+                      <a:r>
+                        <a:rPr lang="fr-FR" sz="2000" dirty="0" err="1">
+                          <a:latin typeface="Gill Sans MT" panose="020B0502020104020203" pitchFamily="34" charset="0"/>
+                        </a:rPr>
+                        <a:t>deviate</a:t>
+                      </a:r>
+                      <a:endParaRPr lang="fr-FR" sz="2000" dirty="0">
+                        <a:latin typeface="Gill Sans MT" panose="020B0502020104020203" pitchFamily="34" charset="0"/>
+                      </a:endParaRPr>
+                    </a:p>
+                  </a:txBody>
+                  <a:tcPr/>
+                </a:tc>
+                <a:tc>
+                  <a:txBody>
+                    <a:bodyPr/>
+                    <a:lstStyle/>
+                    <a:p>
+                      <a:pPr algn="ctr"/>
+                      <a:r>
+                        <a:rPr lang="fr-FR" sz="2000" dirty="0">
+                          <a:latin typeface="Gill Sans MT" panose="020B0502020104020203" pitchFamily="34" charset="0"/>
+                        </a:rPr>
+                        <a:t>85.43473</a:t>
+                      </a:r>
+                    </a:p>
+                  </a:txBody>
+                  <a:tcPr/>
+                </a:tc>
+                <a:extLst>
+                  <a:ext uri="{0D108BD9-81ED-4DB2-BD59-A6C34878D82A}">
+                    <a16:rowId xmlns:a16="http://schemas.microsoft.com/office/drawing/2014/main" val="1245637835"/>
+                  </a:ext>
+                </a:extLst>
+              </a:tr>
+              <a:tr h="370840">
+                <a:tc>
+                  <a:txBody>
+                    <a:bodyPr/>
+                    <a:lstStyle/>
+                    <a:p>
+                      <a:pPr algn="l"/>
+                      <a:r>
+                        <a:rPr lang="fr-FR" sz="2000" dirty="0">
+                          <a:latin typeface="Gill Sans MT" panose="020B0502020104020203" pitchFamily="34" charset="0"/>
+                        </a:rPr>
+                        <a:t>p-value</a:t>
+                      </a:r>
+                    </a:p>
+                  </a:txBody>
+                  <a:tcPr/>
+                </a:tc>
+                <a:tc>
+                  <a:txBody>
+                    <a:bodyPr/>
+                    <a:lstStyle/>
+                    <a:p>
+                      <a:pPr marL="0" marR="0" lvl="0" indent="0" algn="ctr" defTabSz="914400" rtl="0" eaLnBrk="1" fontAlgn="auto" latinLnBrk="0" hangingPunct="1">
+                        <a:lnSpc>
+                          <a:spcPct val="100000"/>
+                        </a:lnSpc>
+                        <a:spcBef>
+                          <a:spcPts val="0"/>
+                        </a:spcBef>
+                        <a:spcAft>
+                          <a:spcPts val="0"/>
+                        </a:spcAft>
+                        <a:buClrTx/>
+                        <a:buSzTx/>
+                        <a:buFontTx/>
+                        <a:buNone/>
+                        <a:tabLst/>
+                        <a:defRPr/>
+                      </a:pPr>
+                      <a:r>
+                        <a:rPr lang="fr-FR" sz="2000" dirty="0">
+                          <a:latin typeface="Gill Sans MT" panose="020B0502020104020203" pitchFamily="34" charset="0"/>
+                        </a:rPr>
+                        <a:t>&lt; 2.2e-16</a:t>
+                      </a:r>
+                    </a:p>
+                  </a:txBody>
+                  <a:tcPr/>
+                </a:tc>
+                <a:extLst>
+                  <a:ext uri="{0D108BD9-81ED-4DB2-BD59-A6C34878D82A}">
+                    <a16:rowId xmlns:a16="http://schemas.microsoft.com/office/drawing/2014/main" val="2435526101"/>
+                  </a:ext>
+                </a:extLst>
+              </a:tr>
+            </a:tbl>
+          </a:graphicData>
+        </a:graphic>
+      </p:graphicFrame>
       <p:sp>
         <p:nvSpPr>
-          <p:cNvPr id="5" name="ZoneTexte 4">
+          <p:cNvPr id="20" name="ZoneTexte 19">
             <a:extLst>
               <a:ext uri="{FF2B5EF4-FFF2-40B4-BE49-F238E27FC236}">
-                <a16:creationId xmlns:a16="http://schemas.microsoft.com/office/drawing/2014/main" id="{704B0C7A-5B25-4AE4-8E8E-19A15F8207F7}"/>
+                <a16:creationId xmlns:a16="http://schemas.microsoft.com/office/drawing/2014/main" id="{911238F6-1579-4060-8C99-A4343358024F}"/>
               </a:ext>
             </a:extLst>
           </p:cNvPr>
@@ -13335,7 +14248,7 @@
         </p:nvSpPr>
         <p:spPr>
           <a:xfrm>
-            <a:off x="1289370" y="1743281"/>
+            <a:off x="1171607" y="1486792"/>
             <a:ext cx="2657680" cy="523220"/>
           </a:xfrm>
           <a:prstGeom prst="rect">
@@ -13358,72 +14271,61 @@
           </a:p>
         </p:txBody>
       </p:sp>
-      <p:pic>
-        <p:nvPicPr>
-          <p:cNvPr id="8" name="Image 7">
+      <p:sp>
+        <p:nvSpPr>
+          <p:cNvPr id="21" name="Rectangle 20">
             <a:extLst>
               <a:ext uri="{FF2B5EF4-FFF2-40B4-BE49-F238E27FC236}">
-                <a16:creationId xmlns:a16="http://schemas.microsoft.com/office/drawing/2014/main" id="{08FA61C8-F3E5-4D0E-8AC3-E41D36977808}"/>
+                <a16:creationId xmlns:a16="http://schemas.microsoft.com/office/drawing/2014/main" id="{E159F90B-4F07-43BC-93C2-B4DC697C30A3}"/>
               </a:ext>
             </a:extLst>
           </p:cNvPr>
-          <p:cNvPicPr>
-            <a:picLocks noChangeAspect="1"/>
-          </p:cNvPicPr>
+          <p:cNvSpPr/>
           <p:nvPr/>
-        </p:nvPicPr>
-        <p:blipFill>
-          <a:blip r:embed="rId4"/>
-          <a:stretch>
-            <a:fillRect/>
-          </a:stretch>
-        </p:blipFill>
+        </p:nvSpPr>
         <p:spPr>
           <a:xfrm>
-            <a:off x="1470782" y="2310037"/>
-            <a:ext cx="7842653" cy="1341457"/>
+            <a:off x="967676" y="1649725"/>
+            <a:ext cx="203931" cy="197353"/>
           </a:xfrm>
           <a:prstGeom prst="rect">
             <a:avLst/>
           </a:prstGeom>
+          <a:solidFill>
+            <a:srgbClr val="006A5A"/>
+          </a:solidFill>
         </p:spPr>
-      </p:pic>
-      <p:pic>
-        <p:nvPicPr>
-          <p:cNvPr id="10" name="Image 9">
+        <p:style>
+          <a:lnRef idx="2">
+            <a:schemeClr val="accent1">
+              <a:shade val="50000"/>
+            </a:schemeClr>
+          </a:lnRef>
+          <a:fillRef idx="1">
+            <a:schemeClr val="accent1"/>
+          </a:fillRef>
+          <a:effectRef idx="0">
+            <a:schemeClr val="accent1"/>
+          </a:effectRef>
+          <a:fontRef idx="minor">
+            <a:schemeClr val="lt1"/>
+          </a:fontRef>
+        </p:style>
+        <p:txBody>
+          <a:bodyPr rtlCol="0" anchor="ctr"/>
+          <a:lstStyle/>
+          <a:p>
+            <a:pPr algn="ctr"/>
+            <a:endParaRPr lang="fr-FR"/>
+          </a:p>
+        </p:txBody>
+      </p:sp>
+      <p:sp>
+        <p:nvSpPr>
+          <p:cNvPr id="22" name="ZoneTexte 21">
             <a:extLst>
               <a:ext uri="{FF2B5EF4-FFF2-40B4-BE49-F238E27FC236}">
-                <a16:creationId xmlns:a16="http://schemas.microsoft.com/office/drawing/2014/main" id="{C796B334-C348-4ACD-8FBD-AEDD7BFB61B0}"/>
-              </a:ext>
-            </a:extLst>
-          </p:cNvPr>
-          <p:cNvPicPr>
-            <a:picLocks noChangeAspect="1"/>
-          </p:cNvPicPr>
-          <p:nvPr/>
-        </p:nvPicPr>
-        <p:blipFill>
-          <a:blip r:embed="rId5"/>
-          <a:stretch>
-            <a:fillRect/>
-          </a:stretch>
-        </p:blipFill>
-        <p:spPr>
-          <a:xfrm>
-            <a:off x="5037970" y="4277697"/>
-            <a:ext cx="5226637" cy="2261215"/>
-          </a:xfrm>
-          <a:prstGeom prst="rect">
-            <a:avLst/>
-          </a:prstGeom>
-        </p:spPr>
-      </p:pic>
-      <p:sp>
-        <p:nvSpPr>
-          <p:cNvPr id="11" name="ZoneTexte 10">
-            <a:extLst>
-              <a:ext uri="{FF2B5EF4-FFF2-40B4-BE49-F238E27FC236}">
-                <a16:creationId xmlns:a16="http://schemas.microsoft.com/office/drawing/2014/main" id="{877CA3D4-7B64-4FB5-A37A-84CBA3A5AEEC}"/>
+                <a16:creationId xmlns:a16="http://schemas.microsoft.com/office/drawing/2014/main" id="{F1BB4949-2C07-4E69-9522-34E945CD7DA5}"/>
               </a:ext>
             </a:extLst>
           </p:cNvPr>
@@ -13432,7 +14334,7 @@
         </p:nvSpPr>
         <p:spPr>
           <a:xfrm>
-            <a:off x="1289369" y="4136365"/>
+            <a:off x="7271792" y="1480755"/>
             <a:ext cx="3748601" cy="523220"/>
           </a:xfrm>
           <a:prstGeom prst="rect">
@@ -13469,10 +14371,10 @@
       </p:sp>
       <p:sp>
         <p:nvSpPr>
-          <p:cNvPr id="12" name="Rectangle 11">
+          <p:cNvPr id="23" name="Rectangle 22">
             <a:extLst>
               <a:ext uri="{FF2B5EF4-FFF2-40B4-BE49-F238E27FC236}">
-                <a16:creationId xmlns:a16="http://schemas.microsoft.com/office/drawing/2014/main" id="{0CEA0246-CBE8-4B01-AE2A-041B3EB8346B}"/>
+                <a16:creationId xmlns:a16="http://schemas.microsoft.com/office/drawing/2014/main" id="{E32A2D87-8D60-415C-B094-94CEBED81669}"/>
               </a:ext>
             </a:extLst>
           </p:cNvPr>
@@ -13481,7 +14383,7 @@
         </p:nvSpPr>
         <p:spPr>
           <a:xfrm>
-            <a:off x="1085439" y="1906214"/>
+            <a:off x="7067861" y="1657385"/>
             <a:ext cx="203931" cy="197353"/>
           </a:xfrm>
           <a:prstGeom prst="rect">
@@ -13518,57 +14420,94 @@
       </p:sp>
       <p:sp>
         <p:nvSpPr>
-          <p:cNvPr id="13" name="Rectangle 12">
+          <p:cNvPr id="24" name="ZoneTexte 23">
             <a:extLst>
               <a:ext uri="{FF2B5EF4-FFF2-40B4-BE49-F238E27FC236}">
-                <a16:creationId xmlns:a16="http://schemas.microsoft.com/office/drawing/2014/main" id="{6668954D-80E0-460A-8E90-45E67C0C68D4}"/>
+                <a16:creationId xmlns:a16="http://schemas.microsoft.com/office/drawing/2014/main" id="{FFFF1E66-5868-4A32-A832-82DA800F3713}"/>
               </a:ext>
             </a:extLst>
           </p:cNvPr>
-          <p:cNvSpPr/>
+          <p:cNvSpPr txBox="1"/>
           <p:nvPr/>
         </p:nvSpPr>
         <p:spPr>
           <a:xfrm>
-            <a:off x="1085438" y="4312995"/>
-            <a:ext cx="203931" cy="197353"/>
+            <a:off x="422564" y="4959927"/>
+            <a:ext cx="4163290" cy="1015663"/>
           </a:xfrm>
           <a:prstGeom prst="rect">
             <a:avLst/>
           </a:prstGeom>
-          <a:solidFill>
-            <a:srgbClr val="006A5A"/>
-          </a:solidFill>
+          <a:noFill/>
         </p:spPr>
-        <p:style>
-          <a:lnRef idx="2">
-            <a:schemeClr val="accent1">
-              <a:shade val="50000"/>
-            </a:schemeClr>
-          </a:lnRef>
-          <a:fillRef idx="1">
-            <a:schemeClr val="accent1"/>
-          </a:fillRef>
-          <a:effectRef idx="0">
-            <a:schemeClr val="accent1"/>
-          </a:effectRef>
-          <a:fontRef idx="minor">
-            <a:schemeClr val="lt1"/>
-          </a:fontRef>
-        </p:style>
         <p:txBody>
-          <a:bodyPr rtlCol="0" anchor="ctr"/>
+          <a:bodyPr wrap="square" rtlCol="0">
+            <a:spAutoFit/>
+          </a:bodyPr>
           <a:lstStyle/>
           <a:p>
-            <a:pPr algn="ctr"/>
-            <a:endParaRPr lang="fr-FR"/>
+            <a:r>
+              <a:rPr lang="fr-FR" sz="2000" dirty="0">
+                <a:latin typeface="Gill Sans MT" panose="020B0502020104020203" pitchFamily="34" charset="0"/>
+              </a:rPr>
+              <a:t>L’indice de Moran </a:t>
+            </a:r>
+            <a:r>
+              <a:rPr lang="fr-FR" sz="2000" b="1" dirty="0">
+                <a:latin typeface="Gill Sans MT" panose="020B0502020104020203" pitchFamily="34" charset="0"/>
+              </a:rPr>
+              <a:t>I = 0.1598 &gt; 0 </a:t>
+            </a:r>
+            <a:r>
+              <a:rPr lang="fr-FR" sz="2000" dirty="0">
+                <a:latin typeface="Gill Sans MT" panose="020B0502020104020203" pitchFamily="34" charset="0"/>
+              </a:rPr>
+              <a:t>indique une autocorrélation spatiale positive</a:t>
+            </a:r>
+          </a:p>
+        </p:txBody>
+      </p:sp>
+      <p:sp>
+        <p:nvSpPr>
+          <p:cNvPr id="25" name="ZoneTexte 24">
+            <a:extLst>
+              <a:ext uri="{FF2B5EF4-FFF2-40B4-BE49-F238E27FC236}">
+                <a16:creationId xmlns:a16="http://schemas.microsoft.com/office/drawing/2014/main" id="{C4C38F74-2973-4959-95E8-A326DE8B430E}"/>
+              </a:ext>
+            </a:extLst>
+          </p:cNvPr>
+          <p:cNvSpPr txBox="1"/>
+          <p:nvPr/>
+        </p:nvSpPr>
+        <p:spPr>
+          <a:xfrm>
+            <a:off x="6288621" y="4959927"/>
+            <a:ext cx="5570870" cy="1015663"/>
+          </a:xfrm>
+          <a:prstGeom prst="rect">
+            <a:avLst/>
+          </a:prstGeom>
+          <a:noFill/>
+        </p:spPr>
+        <p:txBody>
+          <a:bodyPr wrap="square" rtlCol="0">
+            <a:spAutoFit/>
+          </a:bodyPr>
+          <a:lstStyle/>
+          <a:p>
+            <a:r>
+              <a:rPr lang="fr-FR" sz="2000" dirty="0">
+                <a:latin typeface="Gill Sans MT" panose="020B0502020104020203" pitchFamily="34" charset="0"/>
+              </a:rPr>
+              <a:t>L’ensemble des tests d’autocorrélation spatiale menés à partir des résidus du modèle MCO sont rejetés. </a:t>
+            </a:r>
           </a:p>
         </p:txBody>
       </p:sp>
     </p:spTree>
     <p:extLst>
       <p:ext uri="{BB962C8B-B14F-4D97-AF65-F5344CB8AC3E}">
-        <p14:creationId xmlns:p14="http://schemas.microsoft.com/office/powerpoint/2010/main" val="2916537731"/>
+        <p14:creationId xmlns:p14="http://schemas.microsoft.com/office/powerpoint/2010/main" val="1622649076"/>
       </p:ext>
     </p:extLst>
   </p:cSld>
@@ -13706,36 +14645,6 @@
           <a:xfrm>
             <a:off x="11078692" y="266700"/>
             <a:ext cx="1170459" cy="1170459"/>
-          </a:xfrm>
-          <a:prstGeom prst="rect">
-            <a:avLst/>
-          </a:prstGeom>
-        </p:spPr>
-      </p:pic>
-      <p:pic>
-        <p:nvPicPr>
-          <p:cNvPr id="6" name="Image 5">
-            <a:extLst>
-              <a:ext uri="{FF2B5EF4-FFF2-40B4-BE49-F238E27FC236}">
-                <a16:creationId xmlns:a16="http://schemas.microsoft.com/office/drawing/2014/main" id="{2AB6183B-8184-4CBD-84AD-63536C0BD4D0}"/>
-              </a:ext>
-            </a:extLst>
-          </p:cNvPr>
-          <p:cNvPicPr>
-            <a:picLocks noChangeAspect="1"/>
-          </p:cNvPicPr>
-          <p:nvPr/>
-        </p:nvPicPr>
-        <p:blipFill>
-          <a:blip r:embed="rId4"/>
-          <a:stretch>
-            <a:fillRect/>
-          </a:stretch>
-        </p:blipFill>
-        <p:spPr>
-          <a:xfrm>
-            <a:off x="3197112" y="1694988"/>
-            <a:ext cx="5473242" cy="3765098"/>
           </a:xfrm>
           <a:prstGeom prst="rect">
             <a:avLst/>
@@ -13791,10 +14700,394 @@
           </a:p>
         </p:txBody>
       </p:sp>
+      <p:graphicFrame>
+        <p:nvGraphicFramePr>
+          <p:cNvPr id="5" name="Tableau 7">
+            <a:extLst>
+              <a:ext uri="{FF2B5EF4-FFF2-40B4-BE49-F238E27FC236}">
+                <a16:creationId xmlns:a16="http://schemas.microsoft.com/office/drawing/2014/main" id="{E7C48B49-1EEC-46A5-9B82-D94A738B97EE}"/>
+              </a:ext>
+            </a:extLst>
+          </p:cNvPr>
+          <p:cNvGraphicFramePr>
+            <a:graphicFrameLocks noGrp="1"/>
+          </p:cNvGraphicFramePr>
+          <p:nvPr/>
+        </p:nvGraphicFramePr>
+        <p:xfrm>
+          <a:off x="3225223" y="1866900"/>
+          <a:ext cx="5627832" cy="3124200"/>
+        </p:xfrm>
+        <a:graphic>
+          <a:graphicData uri="http://schemas.openxmlformats.org/drawingml/2006/table">
+            <a:tbl>
+              <a:tblPr firstRow="1" bandRow="1">
+                <a:tableStyleId>{C083E6E3-FA7D-4D7B-A595-EF9225AFEA82}</a:tableStyleId>
+              </a:tblPr>
+              <a:tblGrid>
+                <a:gridCol w="1875944">
+                  <a:extLst>
+                    <a:ext uri="{9D8B030D-6E8A-4147-A177-3AD203B41FA5}">
+                      <a16:colId xmlns:a16="http://schemas.microsoft.com/office/drawing/2014/main" val="2514074644"/>
+                    </a:ext>
+                  </a:extLst>
+                </a:gridCol>
+                <a:gridCol w="1875944">
+                  <a:extLst>
+                    <a:ext uri="{9D8B030D-6E8A-4147-A177-3AD203B41FA5}">
+                      <a16:colId xmlns:a16="http://schemas.microsoft.com/office/drawing/2014/main" val="2552475894"/>
+                    </a:ext>
+                  </a:extLst>
+                </a:gridCol>
+                <a:gridCol w="1875944">
+                  <a:extLst>
+                    <a:ext uri="{9D8B030D-6E8A-4147-A177-3AD203B41FA5}">
+                      <a16:colId xmlns:a16="http://schemas.microsoft.com/office/drawing/2014/main" val="3269518569"/>
+                    </a:ext>
+                  </a:extLst>
+                </a:gridCol>
+              </a:tblGrid>
+              <a:tr h="520700">
+                <a:tc>
+                  <a:txBody>
+                    <a:bodyPr/>
+                    <a:lstStyle/>
+                    <a:p>
+                      <a:pPr algn="ctr"/>
+                      <a:r>
+                        <a:rPr lang="fr-FR" sz="2800" dirty="0">
+                          <a:latin typeface="Gill Sans MT" panose="020B0502020104020203" pitchFamily="34" charset="0"/>
+                        </a:rPr>
+                        <a:t>Model</a:t>
+                      </a:r>
+                    </a:p>
+                  </a:txBody>
+                  <a:tcPr/>
+                </a:tc>
+                <a:tc>
+                  <a:txBody>
+                    <a:bodyPr/>
+                    <a:lstStyle/>
+                    <a:p>
+                      <a:pPr algn="ctr"/>
+                      <a:r>
+                        <a:rPr lang="fr-FR" sz="2800" dirty="0">
+                          <a:latin typeface="Gill Sans MT" panose="020B0502020104020203" pitchFamily="34" charset="0"/>
+                        </a:rPr>
+                        <a:t>AIC</a:t>
+                      </a:r>
+                    </a:p>
+                  </a:txBody>
+                  <a:tcPr/>
+                </a:tc>
+                <a:tc>
+                  <a:txBody>
+                    <a:bodyPr/>
+                    <a:lstStyle/>
+                    <a:p>
+                      <a:pPr algn="ctr"/>
+                      <a:r>
+                        <a:rPr lang="fr-FR" sz="2800" dirty="0" err="1">
+                          <a:latin typeface="Gill Sans MT" panose="020B0502020104020203" pitchFamily="34" charset="0"/>
+                        </a:rPr>
+                        <a:t>LogLik</a:t>
+                      </a:r>
+                      <a:endParaRPr lang="fr-FR" sz="2800" dirty="0">
+                        <a:latin typeface="Gill Sans MT" panose="020B0502020104020203" pitchFamily="34" charset="0"/>
+                      </a:endParaRPr>
+                    </a:p>
+                  </a:txBody>
+                  <a:tcPr/>
+                </a:tc>
+                <a:extLst>
+                  <a:ext uri="{0D108BD9-81ED-4DB2-BD59-A6C34878D82A}">
+                    <a16:rowId xmlns:a16="http://schemas.microsoft.com/office/drawing/2014/main" val="2489175527"/>
+                  </a:ext>
+                </a:extLst>
+              </a:tr>
+              <a:tr h="520700">
+                <a:tc>
+                  <a:txBody>
+                    <a:bodyPr/>
+                    <a:lstStyle/>
+                    <a:p>
+                      <a:pPr algn="ctr"/>
+                      <a:r>
+                        <a:rPr lang="fr-FR" sz="2800" dirty="0">
+                          <a:latin typeface="Gill Sans MT" panose="020B0502020104020203" pitchFamily="34" charset="0"/>
+                        </a:rPr>
+                        <a:t>MCO</a:t>
+                      </a:r>
+                    </a:p>
+                  </a:txBody>
+                  <a:tcPr/>
+                </a:tc>
+                <a:tc>
+                  <a:txBody>
+                    <a:bodyPr/>
+                    <a:lstStyle/>
+                    <a:p>
+                      <a:pPr algn="ctr"/>
+                      <a:r>
+                        <a:rPr lang="fr-FR" sz="2800" dirty="0">
+                          <a:latin typeface="Gill Sans MT" panose="020B0502020104020203" pitchFamily="34" charset="0"/>
+                        </a:rPr>
+                        <a:t>1429.8742</a:t>
+                      </a:r>
+                    </a:p>
+                  </a:txBody>
+                  <a:tcPr/>
+                </a:tc>
+                <a:tc>
+                  <a:txBody>
+                    <a:bodyPr/>
+                    <a:lstStyle/>
+                    <a:p>
+                      <a:pPr algn="ctr"/>
+                      <a:r>
+                        <a:rPr lang="fr-FR" sz="2800" dirty="0">
+                          <a:latin typeface="Gill Sans MT" panose="020B0502020104020203" pitchFamily="34" charset="0"/>
+                        </a:rPr>
+                        <a:t>-704.93708</a:t>
+                      </a:r>
+                    </a:p>
+                  </a:txBody>
+                  <a:tcPr/>
+                </a:tc>
+                <a:extLst>
+                  <a:ext uri="{0D108BD9-81ED-4DB2-BD59-A6C34878D82A}">
+                    <a16:rowId xmlns:a16="http://schemas.microsoft.com/office/drawing/2014/main" val="2497708941"/>
+                  </a:ext>
+                </a:extLst>
+              </a:tr>
+              <a:tr h="520700">
+                <a:tc>
+                  <a:txBody>
+                    <a:bodyPr/>
+                    <a:lstStyle/>
+                    <a:p>
+                      <a:pPr algn="ctr"/>
+                      <a:r>
+                        <a:rPr lang="fr-FR" sz="2800" dirty="0">
+                          <a:latin typeface="Gill Sans MT" panose="020B0502020104020203" pitchFamily="34" charset="0"/>
+                        </a:rPr>
+                        <a:t>SEM</a:t>
+                      </a:r>
+                    </a:p>
+                  </a:txBody>
+                  <a:tcPr/>
+                </a:tc>
+                <a:tc>
+                  <a:txBody>
+                    <a:bodyPr/>
+                    <a:lstStyle/>
+                    <a:p>
+                      <a:pPr algn="ctr"/>
+                      <a:r>
+                        <a:rPr lang="fr-FR" sz="2800" dirty="0">
+                          <a:latin typeface="Gill Sans MT" panose="020B0502020104020203" pitchFamily="34" charset="0"/>
+                        </a:rPr>
+                        <a:t>422.1136</a:t>
+                      </a:r>
+                    </a:p>
+                  </a:txBody>
+                  <a:tcPr/>
+                </a:tc>
+                <a:tc>
+                  <a:txBody>
+                    <a:bodyPr/>
+                    <a:lstStyle/>
+                    <a:p>
+                      <a:pPr algn="ctr"/>
+                      <a:r>
+                        <a:rPr lang="fr-FR" sz="2800" dirty="0">
+                          <a:latin typeface="Gill Sans MT" panose="020B0502020104020203" pitchFamily="34" charset="0"/>
+                        </a:rPr>
+                        <a:t>-200.05679</a:t>
+                      </a:r>
+                    </a:p>
+                  </a:txBody>
+                  <a:tcPr/>
+                </a:tc>
+                <a:extLst>
+                  <a:ext uri="{0D108BD9-81ED-4DB2-BD59-A6C34878D82A}">
+                    <a16:rowId xmlns:a16="http://schemas.microsoft.com/office/drawing/2014/main" val="2509373316"/>
+                  </a:ext>
+                </a:extLst>
+              </a:tr>
+              <a:tr h="520700">
+                <a:tc>
+                  <a:txBody>
+                    <a:bodyPr/>
+                    <a:lstStyle/>
+                    <a:p>
+                      <a:pPr algn="ctr"/>
+                      <a:r>
+                        <a:rPr lang="fr-FR" sz="2800" dirty="0">
+                          <a:latin typeface="Gill Sans MT" panose="020B0502020104020203" pitchFamily="34" charset="0"/>
+                        </a:rPr>
+                        <a:t>SAR</a:t>
+                      </a:r>
+                    </a:p>
+                  </a:txBody>
+                  <a:tcPr/>
+                </a:tc>
+                <a:tc>
+                  <a:txBody>
+                    <a:bodyPr/>
+                    <a:lstStyle/>
+                    <a:p>
+                      <a:pPr algn="ctr"/>
+                      <a:r>
+                        <a:rPr lang="fr-FR" sz="2800" dirty="0">
+                          <a:latin typeface="Gill Sans MT" panose="020B0502020104020203" pitchFamily="34" charset="0"/>
+                        </a:rPr>
+                        <a:t>729.5523</a:t>
+                      </a:r>
+                    </a:p>
+                  </a:txBody>
+                  <a:tcPr/>
+                </a:tc>
+                <a:tc>
+                  <a:txBody>
+                    <a:bodyPr/>
+                    <a:lstStyle/>
+                    <a:p>
+                      <a:pPr algn="ctr"/>
+                      <a:r>
+                        <a:rPr lang="fr-FR" sz="2800" dirty="0">
+                          <a:latin typeface="Gill Sans MT" panose="020B0502020104020203" pitchFamily="34" charset="0"/>
+                        </a:rPr>
+                        <a:t>-353.77613</a:t>
+                      </a:r>
+                    </a:p>
+                  </a:txBody>
+                  <a:tcPr/>
+                </a:tc>
+                <a:extLst>
+                  <a:ext uri="{0D108BD9-81ED-4DB2-BD59-A6C34878D82A}">
+                    <a16:rowId xmlns:a16="http://schemas.microsoft.com/office/drawing/2014/main" val="265592906"/>
+                  </a:ext>
+                </a:extLst>
+              </a:tr>
+              <a:tr h="520700">
+                <a:tc>
+                  <a:txBody>
+                    <a:bodyPr/>
+                    <a:lstStyle/>
+                    <a:p>
+                      <a:pPr algn="ctr"/>
+                      <a:r>
+                        <a:rPr lang="fr-FR" sz="2800" dirty="0">
+                          <a:latin typeface="Gill Sans MT" panose="020B0502020104020203" pitchFamily="34" charset="0"/>
+                        </a:rPr>
+                        <a:t>SLX</a:t>
+                      </a:r>
+                    </a:p>
+                  </a:txBody>
+                  <a:tcPr/>
+                </a:tc>
+                <a:tc>
+                  <a:txBody>
+                    <a:bodyPr/>
+                    <a:lstStyle/>
+                    <a:p>
+                      <a:pPr algn="ctr"/>
+                      <a:r>
+                        <a:rPr lang="fr-FR" sz="2800" dirty="0">
+                          <a:latin typeface="Gill Sans MT" panose="020B0502020104020203" pitchFamily="34" charset="0"/>
+                        </a:rPr>
+                        <a:t>749.5969</a:t>
+                      </a:r>
+                    </a:p>
+                  </a:txBody>
+                  <a:tcPr/>
+                </a:tc>
+                <a:tc>
+                  <a:txBody>
+                    <a:bodyPr/>
+                    <a:lstStyle/>
+                    <a:p>
+                      <a:pPr algn="ctr"/>
+                      <a:r>
+                        <a:rPr lang="fr-FR" sz="2800" dirty="0">
+                          <a:latin typeface="Gill Sans MT" panose="020B0502020104020203" pitchFamily="34" charset="0"/>
+                        </a:rPr>
+                        <a:t>-356.79846</a:t>
+                      </a:r>
+                    </a:p>
+                  </a:txBody>
+                  <a:tcPr/>
+                </a:tc>
+                <a:extLst>
+                  <a:ext uri="{0D108BD9-81ED-4DB2-BD59-A6C34878D82A}">
+                    <a16:rowId xmlns:a16="http://schemas.microsoft.com/office/drawing/2014/main" val="803825188"/>
+                  </a:ext>
+                </a:extLst>
+              </a:tr>
+              <a:tr h="520700">
+                <a:tc>
+                  <a:txBody>
+                    <a:bodyPr/>
+                    <a:lstStyle/>
+                    <a:p>
+                      <a:pPr algn="ctr"/>
+                      <a:r>
+                        <a:rPr lang="fr-FR" sz="2800" dirty="0">
+                          <a:latin typeface="Gill Sans MT" panose="020B0502020104020203" pitchFamily="34" charset="0"/>
+                        </a:rPr>
+                        <a:t>SDM</a:t>
+                      </a:r>
+                    </a:p>
+                  </a:txBody>
+                  <a:tcPr/>
+                </a:tc>
+                <a:tc>
+                  <a:txBody>
+                    <a:bodyPr/>
+                    <a:lstStyle/>
+                    <a:p>
+                      <a:pPr algn="ctr"/>
+                      <a:r>
+                        <a:rPr lang="fr-FR" sz="2800" dirty="0">
+                          <a:latin typeface="Gill Sans MT" panose="020B0502020104020203" pitchFamily="34" charset="0"/>
+                        </a:rPr>
+                        <a:t>205.1882</a:t>
+                      </a:r>
+                    </a:p>
+                  </a:txBody>
+                  <a:tcPr/>
+                </a:tc>
+                <a:tc>
+                  <a:txBody>
+                    <a:bodyPr/>
+                    <a:lstStyle/>
+                    <a:p>
+                      <a:pPr algn="ctr"/>
+                      <a:r>
+                        <a:rPr lang="fr-FR" sz="2800" dirty="0">
+                          <a:latin typeface="Gill Sans MT" panose="020B0502020104020203" pitchFamily="34" charset="0"/>
+                        </a:rPr>
+                        <a:t>-83.59411</a:t>
+                      </a:r>
+                    </a:p>
+                  </a:txBody>
+                  <a:tcPr/>
+                </a:tc>
+                <a:extLst>
+                  <a:ext uri="{0D108BD9-81ED-4DB2-BD59-A6C34878D82A}">
+                    <a16:rowId xmlns:a16="http://schemas.microsoft.com/office/drawing/2014/main" val="3258615647"/>
+                  </a:ext>
+                </a:extLst>
+              </a:tr>
+            </a:tbl>
+          </a:graphicData>
+        </a:graphic>
+      </p:graphicFrame>
     </p:spTree>
     <p:extLst>
       <p:ext uri="{BB962C8B-B14F-4D97-AF65-F5344CB8AC3E}">
-        <p14:creationId xmlns:p14="http://schemas.microsoft.com/office/powerpoint/2010/main" val="3979927716"/>
+        <p14:creationId xmlns:p14="http://schemas.microsoft.com/office/powerpoint/2010/main" val="1600551046"/>
       </p:ext>
     </p:extLst>
   </p:cSld>
@@ -13894,7 +15187,7 @@
                 </a:solidFill>
                 <a:latin typeface="Gill Sans MT" panose="020B0502020104020203" pitchFamily="34" charset="0"/>
               </a:rPr>
-              <a:t>4.4. Résultats du modèle final</a:t>
+              <a:t>4.4. Résultats du modèle final(1/2)</a:t>
             </a:r>
           </a:p>
         </p:txBody>
@@ -13938,40 +15231,2759 @@
           </a:prstGeom>
         </p:spPr>
       </p:pic>
-      <p:pic>
-        <p:nvPicPr>
-          <p:cNvPr id="6" name="Image 5">
+      <p:graphicFrame>
+        <p:nvGraphicFramePr>
+          <p:cNvPr id="5" name="Tableau 6">
             <a:extLst>
               <a:ext uri="{FF2B5EF4-FFF2-40B4-BE49-F238E27FC236}">
-                <a16:creationId xmlns:a16="http://schemas.microsoft.com/office/drawing/2014/main" id="{D2AF2CAB-204D-446D-8D79-22F35F4C799C}"/>
+                <a16:creationId xmlns:a16="http://schemas.microsoft.com/office/drawing/2014/main" id="{D6EAFB14-C239-42F9-B946-39390A875EDB}"/>
               </a:ext>
             </a:extLst>
           </p:cNvPr>
-          <p:cNvPicPr>
-            <a:picLocks noChangeAspect="1"/>
-          </p:cNvPicPr>
-          <p:nvPr/>
-        </p:nvPicPr>
-        <p:blipFill>
-          <a:blip r:embed="rId4"/>
-          <a:stretch>
-            <a:fillRect/>
-          </a:stretch>
-        </p:blipFill>
-        <p:spPr>
-          <a:xfrm>
-            <a:off x="1145428" y="1517834"/>
-            <a:ext cx="9506439" cy="4807197"/>
-          </a:xfrm>
-          <a:prstGeom prst="rect">
-            <a:avLst/>
-          </a:prstGeom>
-        </p:spPr>
-      </p:pic>
+          <p:cNvGraphicFramePr>
+            <a:graphicFrameLocks noGrp="1"/>
+          </p:cNvGraphicFramePr>
+          <p:nvPr>
+            <p:extLst>
+              <p:ext uri="{D42A27DB-BD31-4B8C-83A1-F6EECF244321}">
+                <p14:modId xmlns:p14="http://schemas.microsoft.com/office/powerpoint/2010/main" val="2552453128"/>
+              </p:ext>
+            </p:extLst>
+          </p:nvPr>
+        </p:nvGraphicFramePr>
+        <p:xfrm>
+          <a:off x="1544782" y="1309254"/>
+          <a:ext cx="9116290" cy="5015776"/>
+        </p:xfrm>
+        <a:graphic>
+          <a:graphicData uri="http://schemas.openxmlformats.org/drawingml/2006/table">
+            <a:tbl>
+              <a:tblPr firstRow="1" bandRow="1">
+                <a:tableStyleId>{C083E6E3-FA7D-4D7B-A595-EF9225AFEA82}</a:tableStyleId>
+              </a:tblPr>
+              <a:tblGrid>
+                <a:gridCol w="4696446">
+                  <a:extLst>
+                    <a:ext uri="{9D8B030D-6E8A-4147-A177-3AD203B41FA5}">
+                      <a16:colId xmlns:a16="http://schemas.microsoft.com/office/drawing/2014/main" val="4058233838"/>
+                    </a:ext>
+                  </a:extLst>
+                </a:gridCol>
+                <a:gridCol w="1104961">
+                  <a:extLst>
+                    <a:ext uri="{9D8B030D-6E8A-4147-A177-3AD203B41FA5}">
+                      <a16:colId xmlns:a16="http://schemas.microsoft.com/office/drawing/2014/main" val="1279771122"/>
+                    </a:ext>
+                  </a:extLst>
+                </a:gridCol>
+                <a:gridCol w="1104961">
+                  <a:extLst>
+                    <a:ext uri="{9D8B030D-6E8A-4147-A177-3AD203B41FA5}">
+                      <a16:colId xmlns:a16="http://schemas.microsoft.com/office/drawing/2014/main" val="930768813"/>
+                    </a:ext>
+                  </a:extLst>
+                </a:gridCol>
+                <a:gridCol w="1104961">
+                  <a:extLst>
+                    <a:ext uri="{9D8B030D-6E8A-4147-A177-3AD203B41FA5}">
+                      <a16:colId xmlns:a16="http://schemas.microsoft.com/office/drawing/2014/main" val="1094455488"/>
+                    </a:ext>
+                  </a:extLst>
+                </a:gridCol>
+                <a:gridCol w="1104961">
+                  <a:extLst>
+                    <a:ext uri="{9D8B030D-6E8A-4147-A177-3AD203B41FA5}">
+                      <a16:colId xmlns:a16="http://schemas.microsoft.com/office/drawing/2014/main" val="748538119"/>
+                    </a:ext>
+                  </a:extLst>
+                </a:gridCol>
+              </a:tblGrid>
+              <a:tr h="313486">
+                <a:tc>
+                  <a:txBody>
+                    <a:bodyPr/>
+                    <a:lstStyle/>
+                    <a:p>
+                      <a:pPr>
+                        <a:lnSpc>
+                          <a:spcPct val="115000"/>
+                        </a:lnSpc>
+                        <a:spcAft>
+                          <a:spcPts val="1000"/>
+                        </a:spcAft>
+                      </a:pPr>
+                      <a:r>
+                        <a:rPr lang="en-US" sz="1600" dirty="0">
+                          <a:effectLst/>
+                          <a:latin typeface="Gill Sans MT" panose="020B0502020104020203" pitchFamily="34" charset="0"/>
+                          <a:ea typeface="MS Mincho" panose="02020609040205080304" pitchFamily="49" charset="-128"/>
+                          <a:cs typeface="Times New Roman" panose="02020603050405020304" pitchFamily="18" charset="0"/>
+                        </a:rPr>
+                        <a:t>Variable</a:t>
+                      </a:r>
+                      <a:endParaRPr lang="fr-FR" sz="1600" dirty="0">
+                        <a:effectLst/>
+                        <a:latin typeface="Gill Sans MT" panose="020B0502020104020203" pitchFamily="34" charset="0"/>
+                        <a:ea typeface="MS Mincho" panose="02020609040205080304" pitchFamily="49" charset="-128"/>
+                        <a:cs typeface="Times New Roman" panose="02020603050405020304" pitchFamily="18" charset="0"/>
+                      </a:endParaRPr>
+                    </a:p>
+                  </a:txBody>
+                  <a:tcPr marL="68580" marR="68580" marT="0" marB="0"/>
+                </a:tc>
+                <a:tc>
+                  <a:txBody>
+                    <a:bodyPr/>
+                    <a:lstStyle/>
+                    <a:p>
+                      <a:pPr algn="ctr">
+                        <a:lnSpc>
+                          <a:spcPct val="115000"/>
+                        </a:lnSpc>
+                        <a:spcAft>
+                          <a:spcPts val="1000"/>
+                        </a:spcAft>
+                      </a:pPr>
+                      <a:r>
+                        <a:rPr lang="en-US" sz="1600" dirty="0">
+                          <a:effectLst/>
+                          <a:latin typeface="Gill Sans MT" panose="020B0502020104020203" pitchFamily="34" charset="0"/>
+                          <a:ea typeface="MS Mincho" panose="02020609040205080304" pitchFamily="49" charset="-128"/>
+                          <a:cs typeface="Times New Roman" panose="02020603050405020304" pitchFamily="18" charset="0"/>
+                        </a:rPr>
+                        <a:t>Estimate</a:t>
+                      </a:r>
+                      <a:endParaRPr lang="fr-FR" sz="1600" dirty="0">
+                        <a:effectLst/>
+                        <a:latin typeface="Gill Sans MT" panose="020B0502020104020203" pitchFamily="34" charset="0"/>
+                        <a:ea typeface="MS Mincho" panose="02020609040205080304" pitchFamily="49" charset="-128"/>
+                        <a:cs typeface="Times New Roman" panose="02020603050405020304" pitchFamily="18" charset="0"/>
+                      </a:endParaRPr>
+                    </a:p>
+                  </a:txBody>
+                  <a:tcPr marL="68580" marR="68580" marT="0" marB="0"/>
+                </a:tc>
+                <a:tc>
+                  <a:txBody>
+                    <a:bodyPr/>
+                    <a:lstStyle/>
+                    <a:p>
+                      <a:pPr algn="ctr">
+                        <a:lnSpc>
+                          <a:spcPct val="115000"/>
+                        </a:lnSpc>
+                        <a:spcAft>
+                          <a:spcPts val="1000"/>
+                        </a:spcAft>
+                      </a:pPr>
+                      <a:r>
+                        <a:rPr lang="en-US" sz="1600">
+                          <a:effectLst/>
+                          <a:latin typeface="Gill Sans MT" panose="020B0502020104020203" pitchFamily="34" charset="0"/>
+                          <a:ea typeface="MS Mincho" panose="02020609040205080304" pitchFamily="49" charset="-128"/>
+                          <a:cs typeface="Times New Roman" panose="02020603050405020304" pitchFamily="18" charset="0"/>
+                        </a:rPr>
+                        <a:t>Std. Error</a:t>
+                      </a:r>
+                      <a:endParaRPr lang="fr-FR" sz="1600">
+                        <a:effectLst/>
+                        <a:latin typeface="Gill Sans MT" panose="020B0502020104020203" pitchFamily="34" charset="0"/>
+                        <a:ea typeface="MS Mincho" panose="02020609040205080304" pitchFamily="49" charset="-128"/>
+                        <a:cs typeface="Times New Roman" panose="02020603050405020304" pitchFamily="18" charset="0"/>
+                      </a:endParaRPr>
+                    </a:p>
+                  </a:txBody>
+                  <a:tcPr marL="68580" marR="68580" marT="0" marB="0"/>
+                </a:tc>
+                <a:tc>
+                  <a:txBody>
+                    <a:bodyPr/>
+                    <a:lstStyle/>
+                    <a:p>
+                      <a:pPr algn="ctr">
+                        <a:lnSpc>
+                          <a:spcPct val="115000"/>
+                        </a:lnSpc>
+                        <a:spcAft>
+                          <a:spcPts val="1000"/>
+                        </a:spcAft>
+                      </a:pPr>
+                      <a:r>
+                        <a:rPr lang="en-US" sz="1600" dirty="0">
+                          <a:effectLst/>
+                          <a:latin typeface="Gill Sans MT" panose="020B0502020104020203" pitchFamily="34" charset="0"/>
+                          <a:ea typeface="MS Mincho" panose="02020609040205080304" pitchFamily="49" charset="-128"/>
+                          <a:cs typeface="Times New Roman" panose="02020603050405020304" pitchFamily="18" charset="0"/>
+                        </a:rPr>
+                        <a:t>t value</a:t>
+                      </a:r>
+                      <a:endParaRPr lang="fr-FR" sz="1600" dirty="0">
+                        <a:effectLst/>
+                        <a:latin typeface="Gill Sans MT" panose="020B0502020104020203" pitchFamily="34" charset="0"/>
+                        <a:ea typeface="MS Mincho" panose="02020609040205080304" pitchFamily="49" charset="-128"/>
+                        <a:cs typeface="Times New Roman" panose="02020603050405020304" pitchFamily="18" charset="0"/>
+                      </a:endParaRPr>
+                    </a:p>
+                  </a:txBody>
+                  <a:tcPr marL="68580" marR="68580" marT="0" marB="0"/>
+                </a:tc>
+                <a:tc>
+                  <a:txBody>
+                    <a:bodyPr/>
+                    <a:lstStyle/>
+                    <a:p>
+                      <a:pPr algn="ctr">
+                        <a:lnSpc>
+                          <a:spcPct val="115000"/>
+                        </a:lnSpc>
+                        <a:spcAft>
+                          <a:spcPts val="1000"/>
+                        </a:spcAft>
+                      </a:pPr>
+                      <a:r>
+                        <a:rPr lang="en-US" sz="1600">
+                          <a:effectLst/>
+                          <a:latin typeface="Gill Sans MT" panose="020B0502020104020203" pitchFamily="34" charset="0"/>
+                          <a:ea typeface="MS Mincho" panose="02020609040205080304" pitchFamily="49" charset="-128"/>
+                          <a:cs typeface="Times New Roman" panose="02020603050405020304" pitchFamily="18" charset="0"/>
+                        </a:rPr>
+                        <a:t>Pr(&gt;|t|)</a:t>
+                      </a:r>
+                      <a:endParaRPr lang="fr-FR" sz="1600">
+                        <a:effectLst/>
+                        <a:latin typeface="Gill Sans MT" panose="020B0502020104020203" pitchFamily="34" charset="0"/>
+                        <a:ea typeface="MS Mincho" panose="02020609040205080304" pitchFamily="49" charset="-128"/>
+                        <a:cs typeface="Times New Roman" panose="02020603050405020304" pitchFamily="18" charset="0"/>
+                      </a:endParaRPr>
+                    </a:p>
+                  </a:txBody>
+                  <a:tcPr marL="68580" marR="68580" marT="0" marB="0"/>
+                </a:tc>
+                <a:extLst>
+                  <a:ext uri="{0D108BD9-81ED-4DB2-BD59-A6C34878D82A}">
+                    <a16:rowId xmlns:a16="http://schemas.microsoft.com/office/drawing/2014/main" val="1507252365"/>
+                  </a:ext>
+                </a:extLst>
+              </a:tr>
+              <a:tr h="313486">
+                <a:tc>
+                  <a:txBody>
+                    <a:bodyPr/>
+                    <a:lstStyle/>
+                    <a:p>
+                      <a:pPr>
+                        <a:lnSpc>
+                          <a:spcPct val="115000"/>
+                        </a:lnSpc>
+                        <a:spcAft>
+                          <a:spcPts val="1000"/>
+                        </a:spcAft>
+                      </a:pPr>
+                      <a:r>
+                        <a:rPr lang="en-US" sz="1600">
+                          <a:effectLst/>
+                          <a:latin typeface="Gill Sans MT" panose="020B0502020104020203" pitchFamily="34" charset="0"/>
+                          <a:ea typeface="MS Mincho" panose="02020609040205080304" pitchFamily="49" charset="-128"/>
+                          <a:cs typeface="Times New Roman" panose="02020603050405020304" pitchFamily="18" charset="0"/>
+                        </a:rPr>
+                        <a:t>(Intercept)</a:t>
+                      </a:r>
+                      <a:endParaRPr lang="fr-FR" sz="1600">
+                        <a:effectLst/>
+                        <a:latin typeface="Gill Sans MT" panose="020B0502020104020203" pitchFamily="34" charset="0"/>
+                        <a:ea typeface="MS Mincho" panose="02020609040205080304" pitchFamily="49" charset="-128"/>
+                        <a:cs typeface="Times New Roman" panose="02020603050405020304" pitchFamily="18" charset="0"/>
+                      </a:endParaRPr>
+                    </a:p>
+                  </a:txBody>
+                  <a:tcPr marL="68580" marR="68580" marT="0" marB="0"/>
+                </a:tc>
+                <a:tc>
+                  <a:txBody>
+                    <a:bodyPr/>
+                    <a:lstStyle/>
+                    <a:p>
+                      <a:pPr algn="ctr">
+                        <a:lnSpc>
+                          <a:spcPct val="115000"/>
+                        </a:lnSpc>
+                        <a:spcAft>
+                          <a:spcPts val="1000"/>
+                        </a:spcAft>
+                      </a:pPr>
+                      <a:r>
+                        <a:rPr lang="en-US" sz="1600" dirty="0">
+                          <a:effectLst/>
+                          <a:latin typeface="Gill Sans MT" panose="020B0502020104020203" pitchFamily="34" charset="0"/>
+                          <a:ea typeface="MS Mincho" panose="02020609040205080304" pitchFamily="49" charset="-128"/>
+                          <a:cs typeface="Times New Roman" panose="02020603050405020304" pitchFamily="18" charset="0"/>
+                        </a:rPr>
+                        <a:t>7.9121986</a:t>
+                      </a:r>
+                      <a:endParaRPr lang="fr-FR" sz="1600" dirty="0">
+                        <a:effectLst/>
+                        <a:latin typeface="Gill Sans MT" panose="020B0502020104020203" pitchFamily="34" charset="0"/>
+                        <a:ea typeface="MS Mincho" panose="02020609040205080304" pitchFamily="49" charset="-128"/>
+                        <a:cs typeface="Times New Roman" panose="02020603050405020304" pitchFamily="18" charset="0"/>
+                      </a:endParaRPr>
+                    </a:p>
+                  </a:txBody>
+                  <a:tcPr marL="68580" marR="68580" marT="0" marB="0"/>
+                </a:tc>
+                <a:tc>
+                  <a:txBody>
+                    <a:bodyPr/>
+                    <a:lstStyle/>
+                    <a:p>
+                      <a:pPr algn="ctr">
+                        <a:lnSpc>
+                          <a:spcPct val="115000"/>
+                        </a:lnSpc>
+                        <a:spcAft>
+                          <a:spcPts val="1000"/>
+                        </a:spcAft>
+                      </a:pPr>
+                      <a:r>
+                        <a:rPr lang="en-US" sz="1600">
+                          <a:effectLst/>
+                          <a:latin typeface="Gill Sans MT" panose="020B0502020104020203" pitchFamily="34" charset="0"/>
+                          <a:ea typeface="MS Mincho" panose="02020609040205080304" pitchFamily="49" charset="-128"/>
+                          <a:cs typeface="Times New Roman" panose="02020603050405020304" pitchFamily="18" charset="0"/>
+                        </a:rPr>
+                        <a:t>1.4026624</a:t>
+                      </a:r>
+                      <a:endParaRPr lang="fr-FR" sz="1600">
+                        <a:effectLst/>
+                        <a:latin typeface="Gill Sans MT" panose="020B0502020104020203" pitchFamily="34" charset="0"/>
+                        <a:ea typeface="MS Mincho" panose="02020609040205080304" pitchFamily="49" charset="-128"/>
+                        <a:cs typeface="Times New Roman" panose="02020603050405020304" pitchFamily="18" charset="0"/>
+                      </a:endParaRPr>
+                    </a:p>
+                  </a:txBody>
+                  <a:tcPr marL="68580" marR="68580" marT="0" marB="0"/>
+                </a:tc>
+                <a:tc>
+                  <a:txBody>
+                    <a:bodyPr/>
+                    <a:lstStyle/>
+                    <a:p>
+                      <a:pPr algn="ctr">
+                        <a:lnSpc>
+                          <a:spcPct val="115000"/>
+                        </a:lnSpc>
+                        <a:spcAft>
+                          <a:spcPts val="1000"/>
+                        </a:spcAft>
+                      </a:pPr>
+                      <a:r>
+                        <a:rPr lang="en-US" sz="1600">
+                          <a:effectLst/>
+                          <a:latin typeface="Gill Sans MT" panose="020B0502020104020203" pitchFamily="34" charset="0"/>
+                          <a:ea typeface="MS Mincho" panose="02020609040205080304" pitchFamily="49" charset="-128"/>
+                          <a:cs typeface="Times New Roman" panose="02020603050405020304" pitchFamily="18" charset="0"/>
+                        </a:rPr>
+                        <a:t>5.640843</a:t>
+                      </a:r>
+                      <a:endParaRPr lang="fr-FR" sz="1600">
+                        <a:effectLst/>
+                        <a:latin typeface="Gill Sans MT" panose="020B0502020104020203" pitchFamily="34" charset="0"/>
+                        <a:ea typeface="MS Mincho" panose="02020609040205080304" pitchFamily="49" charset="-128"/>
+                        <a:cs typeface="Times New Roman" panose="02020603050405020304" pitchFamily="18" charset="0"/>
+                      </a:endParaRPr>
+                    </a:p>
+                  </a:txBody>
+                  <a:tcPr marL="68580" marR="68580" marT="0" marB="0"/>
+                </a:tc>
+                <a:tc>
+                  <a:txBody>
+                    <a:bodyPr/>
+                    <a:lstStyle/>
+                    <a:p>
+                      <a:pPr algn="ctr">
+                        <a:lnSpc>
+                          <a:spcPct val="115000"/>
+                        </a:lnSpc>
+                        <a:spcAft>
+                          <a:spcPts val="1000"/>
+                        </a:spcAft>
+                      </a:pPr>
+                      <a:r>
+                        <a:rPr lang="en-US" sz="1600">
+                          <a:effectLst/>
+                          <a:latin typeface="Gill Sans MT" panose="020B0502020104020203" pitchFamily="34" charset="0"/>
+                          <a:ea typeface="MS Mincho" panose="02020609040205080304" pitchFamily="49" charset="-128"/>
+                          <a:cs typeface="Times New Roman" panose="02020603050405020304" pitchFamily="18" charset="0"/>
+                        </a:rPr>
+                        <a:t>1.692e-08</a:t>
+                      </a:r>
+                      <a:endParaRPr lang="fr-FR" sz="1600">
+                        <a:effectLst/>
+                        <a:latin typeface="Gill Sans MT" panose="020B0502020104020203" pitchFamily="34" charset="0"/>
+                        <a:ea typeface="MS Mincho" panose="02020609040205080304" pitchFamily="49" charset="-128"/>
+                        <a:cs typeface="Times New Roman" panose="02020603050405020304" pitchFamily="18" charset="0"/>
+                      </a:endParaRPr>
+                    </a:p>
+                  </a:txBody>
+                  <a:tcPr marL="68580" marR="68580" marT="0" marB="0"/>
+                </a:tc>
+                <a:extLst>
+                  <a:ext uri="{0D108BD9-81ED-4DB2-BD59-A6C34878D82A}">
+                    <a16:rowId xmlns:a16="http://schemas.microsoft.com/office/drawing/2014/main" val="4282681986"/>
+                  </a:ext>
+                </a:extLst>
+              </a:tr>
+              <a:tr h="313486">
+                <a:tc>
+                  <a:txBody>
+                    <a:bodyPr/>
+                    <a:lstStyle/>
+                    <a:p>
+                      <a:pPr>
+                        <a:lnSpc>
+                          <a:spcPct val="115000"/>
+                        </a:lnSpc>
+                        <a:spcAft>
+                          <a:spcPts val="1000"/>
+                        </a:spcAft>
+                      </a:pPr>
+                      <a:r>
+                        <a:rPr lang="en-US" sz="1600">
+                          <a:effectLst/>
+                          <a:latin typeface="Gill Sans MT" panose="020B0502020104020203" pitchFamily="34" charset="0"/>
+                          <a:ea typeface="MS Mincho" panose="02020609040205080304" pitchFamily="49" charset="-128"/>
+                          <a:cs typeface="Times New Roman" panose="02020603050405020304" pitchFamily="18" charset="0"/>
+                        </a:rPr>
+                        <a:t>pct_pop_25_64</a:t>
+                      </a:r>
+                      <a:endParaRPr lang="fr-FR" sz="1600">
+                        <a:effectLst/>
+                        <a:latin typeface="Gill Sans MT" panose="020B0502020104020203" pitchFamily="34" charset="0"/>
+                        <a:ea typeface="MS Mincho" panose="02020609040205080304" pitchFamily="49" charset="-128"/>
+                        <a:cs typeface="Times New Roman" panose="02020603050405020304" pitchFamily="18" charset="0"/>
+                      </a:endParaRPr>
+                    </a:p>
+                  </a:txBody>
+                  <a:tcPr marL="68580" marR="68580" marT="0" marB="0"/>
+                </a:tc>
+                <a:tc>
+                  <a:txBody>
+                    <a:bodyPr/>
+                    <a:lstStyle/>
+                    <a:p>
+                      <a:pPr algn="ctr">
+                        <a:lnSpc>
+                          <a:spcPct val="115000"/>
+                        </a:lnSpc>
+                        <a:spcAft>
+                          <a:spcPts val="1000"/>
+                        </a:spcAft>
+                      </a:pPr>
+                      <a:r>
+                        <a:rPr lang="en-US" sz="1600">
+                          <a:effectLst/>
+                          <a:latin typeface="Gill Sans MT" panose="020B0502020104020203" pitchFamily="34" charset="0"/>
+                          <a:ea typeface="MS Mincho" panose="02020609040205080304" pitchFamily="49" charset="-128"/>
+                          <a:cs typeface="Times New Roman" panose="02020603050405020304" pitchFamily="18" charset="0"/>
+                        </a:rPr>
+                        <a:t>-0.0136882</a:t>
+                      </a:r>
+                      <a:endParaRPr lang="fr-FR" sz="1600">
+                        <a:effectLst/>
+                        <a:latin typeface="Gill Sans MT" panose="020B0502020104020203" pitchFamily="34" charset="0"/>
+                        <a:ea typeface="MS Mincho" panose="02020609040205080304" pitchFamily="49" charset="-128"/>
+                        <a:cs typeface="Times New Roman" panose="02020603050405020304" pitchFamily="18" charset="0"/>
+                      </a:endParaRPr>
+                    </a:p>
+                  </a:txBody>
+                  <a:tcPr marL="68580" marR="68580" marT="0" marB="0"/>
+                </a:tc>
+                <a:tc>
+                  <a:txBody>
+                    <a:bodyPr/>
+                    <a:lstStyle/>
+                    <a:p>
+                      <a:pPr algn="ctr">
+                        <a:lnSpc>
+                          <a:spcPct val="115000"/>
+                        </a:lnSpc>
+                        <a:spcAft>
+                          <a:spcPts val="1000"/>
+                        </a:spcAft>
+                      </a:pPr>
+                      <a:r>
+                        <a:rPr lang="en-US" sz="1600">
+                          <a:effectLst/>
+                          <a:latin typeface="Gill Sans MT" panose="020B0502020104020203" pitchFamily="34" charset="0"/>
+                          <a:ea typeface="MS Mincho" panose="02020609040205080304" pitchFamily="49" charset="-128"/>
+                          <a:cs typeface="Times New Roman" panose="02020603050405020304" pitchFamily="18" charset="0"/>
+                        </a:rPr>
+                        <a:t>0.0021707</a:t>
+                      </a:r>
+                      <a:endParaRPr lang="fr-FR" sz="1600">
+                        <a:effectLst/>
+                        <a:latin typeface="Gill Sans MT" panose="020B0502020104020203" pitchFamily="34" charset="0"/>
+                        <a:ea typeface="MS Mincho" panose="02020609040205080304" pitchFamily="49" charset="-128"/>
+                        <a:cs typeface="Times New Roman" panose="02020603050405020304" pitchFamily="18" charset="0"/>
+                      </a:endParaRPr>
+                    </a:p>
+                  </a:txBody>
+                  <a:tcPr marL="68580" marR="68580" marT="0" marB="0"/>
+                </a:tc>
+                <a:tc>
+                  <a:txBody>
+                    <a:bodyPr/>
+                    <a:lstStyle/>
+                    <a:p>
+                      <a:pPr algn="ctr">
+                        <a:lnSpc>
+                          <a:spcPct val="115000"/>
+                        </a:lnSpc>
+                        <a:spcAft>
+                          <a:spcPts val="1000"/>
+                        </a:spcAft>
+                      </a:pPr>
+                      <a:r>
+                        <a:rPr lang="en-US" sz="1600">
+                          <a:effectLst/>
+                          <a:latin typeface="Gill Sans MT" panose="020B0502020104020203" pitchFamily="34" charset="0"/>
+                          <a:ea typeface="MS Mincho" panose="02020609040205080304" pitchFamily="49" charset="-128"/>
+                          <a:cs typeface="Times New Roman" panose="02020603050405020304" pitchFamily="18" charset="0"/>
+                        </a:rPr>
+                        <a:t>-6.305993</a:t>
+                      </a:r>
+                      <a:endParaRPr lang="fr-FR" sz="1600">
+                        <a:effectLst/>
+                        <a:latin typeface="Gill Sans MT" panose="020B0502020104020203" pitchFamily="34" charset="0"/>
+                        <a:ea typeface="MS Mincho" panose="02020609040205080304" pitchFamily="49" charset="-128"/>
+                        <a:cs typeface="Times New Roman" panose="02020603050405020304" pitchFamily="18" charset="0"/>
+                      </a:endParaRPr>
+                    </a:p>
+                  </a:txBody>
+                  <a:tcPr marL="68580" marR="68580" marT="0" marB="0"/>
+                </a:tc>
+                <a:tc>
+                  <a:txBody>
+                    <a:bodyPr/>
+                    <a:lstStyle/>
+                    <a:p>
+                      <a:pPr algn="ctr">
+                        <a:lnSpc>
+                          <a:spcPct val="115000"/>
+                        </a:lnSpc>
+                        <a:spcAft>
+                          <a:spcPts val="1000"/>
+                        </a:spcAft>
+                      </a:pPr>
+                      <a:r>
+                        <a:rPr lang="en-US" sz="1600">
+                          <a:effectLst/>
+                          <a:latin typeface="Gill Sans MT" panose="020B0502020104020203" pitchFamily="34" charset="0"/>
+                          <a:ea typeface="MS Mincho" panose="02020609040205080304" pitchFamily="49" charset="-128"/>
+                          <a:cs typeface="Times New Roman" panose="02020603050405020304" pitchFamily="18" charset="0"/>
+                        </a:rPr>
+                        <a:t>2.864e-10</a:t>
+                      </a:r>
+                      <a:endParaRPr lang="fr-FR" sz="1600">
+                        <a:effectLst/>
+                        <a:latin typeface="Gill Sans MT" panose="020B0502020104020203" pitchFamily="34" charset="0"/>
+                        <a:ea typeface="MS Mincho" panose="02020609040205080304" pitchFamily="49" charset="-128"/>
+                        <a:cs typeface="Times New Roman" panose="02020603050405020304" pitchFamily="18" charset="0"/>
+                      </a:endParaRPr>
+                    </a:p>
+                  </a:txBody>
+                  <a:tcPr marL="68580" marR="68580" marT="0" marB="0"/>
+                </a:tc>
+                <a:extLst>
+                  <a:ext uri="{0D108BD9-81ED-4DB2-BD59-A6C34878D82A}">
+                    <a16:rowId xmlns:a16="http://schemas.microsoft.com/office/drawing/2014/main" val="932466880"/>
+                  </a:ext>
+                </a:extLst>
+              </a:tr>
+              <a:tr h="313486">
+                <a:tc>
+                  <a:txBody>
+                    <a:bodyPr/>
+                    <a:lstStyle/>
+                    <a:p>
+                      <a:pPr>
+                        <a:lnSpc>
+                          <a:spcPct val="115000"/>
+                        </a:lnSpc>
+                        <a:spcAft>
+                          <a:spcPts val="1000"/>
+                        </a:spcAft>
+                      </a:pPr>
+                      <a:r>
+                        <a:rPr lang="en-US" sz="1600" dirty="0">
+                          <a:effectLst/>
+                          <a:latin typeface="Gill Sans MT" panose="020B0502020104020203" pitchFamily="34" charset="0"/>
+                          <a:ea typeface="MS Mincho" panose="02020609040205080304" pitchFamily="49" charset="-128"/>
+                          <a:cs typeface="Times New Roman" panose="02020603050405020304" pitchFamily="18" charset="0"/>
+                        </a:rPr>
+                        <a:t>pct_pop_65_plus</a:t>
+                      </a:r>
+                      <a:endParaRPr lang="fr-FR" sz="1600" dirty="0">
+                        <a:effectLst/>
+                        <a:latin typeface="Gill Sans MT" panose="020B0502020104020203" pitchFamily="34" charset="0"/>
+                        <a:ea typeface="MS Mincho" panose="02020609040205080304" pitchFamily="49" charset="-128"/>
+                        <a:cs typeface="Times New Roman" panose="02020603050405020304" pitchFamily="18" charset="0"/>
+                      </a:endParaRPr>
+                    </a:p>
+                  </a:txBody>
+                  <a:tcPr marL="68580" marR="68580" marT="0" marB="0"/>
+                </a:tc>
+                <a:tc>
+                  <a:txBody>
+                    <a:bodyPr/>
+                    <a:lstStyle/>
+                    <a:p>
+                      <a:pPr algn="ctr">
+                        <a:lnSpc>
+                          <a:spcPct val="115000"/>
+                        </a:lnSpc>
+                        <a:spcAft>
+                          <a:spcPts val="1000"/>
+                        </a:spcAft>
+                      </a:pPr>
+                      <a:r>
+                        <a:rPr lang="en-US" sz="1600" dirty="0">
+                          <a:effectLst/>
+                          <a:latin typeface="Gill Sans MT" panose="020B0502020104020203" pitchFamily="34" charset="0"/>
+                          <a:ea typeface="MS Mincho" panose="02020609040205080304" pitchFamily="49" charset="-128"/>
+                          <a:cs typeface="Times New Roman" panose="02020603050405020304" pitchFamily="18" charset="0"/>
+                        </a:rPr>
+                        <a:t>-0.0251166</a:t>
+                      </a:r>
+                      <a:endParaRPr lang="fr-FR" sz="1600" dirty="0">
+                        <a:effectLst/>
+                        <a:latin typeface="Gill Sans MT" panose="020B0502020104020203" pitchFamily="34" charset="0"/>
+                        <a:ea typeface="MS Mincho" panose="02020609040205080304" pitchFamily="49" charset="-128"/>
+                        <a:cs typeface="Times New Roman" panose="02020603050405020304" pitchFamily="18" charset="0"/>
+                      </a:endParaRPr>
+                    </a:p>
+                  </a:txBody>
+                  <a:tcPr marL="68580" marR="68580" marT="0" marB="0"/>
+                </a:tc>
+                <a:tc>
+                  <a:txBody>
+                    <a:bodyPr/>
+                    <a:lstStyle/>
+                    <a:p>
+                      <a:pPr algn="ctr">
+                        <a:lnSpc>
+                          <a:spcPct val="115000"/>
+                        </a:lnSpc>
+                        <a:spcAft>
+                          <a:spcPts val="1000"/>
+                        </a:spcAft>
+                      </a:pPr>
+                      <a:r>
+                        <a:rPr lang="en-US" sz="1600" dirty="0">
+                          <a:effectLst/>
+                          <a:latin typeface="Gill Sans MT" panose="020B0502020104020203" pitchFamily="34" charset="0"/>
+                          <a:ea typeface="MS Mincho" panose="02020609040205080304" pitchFamily="49" charset="-128"/>
+                          <a:cs typeface="Times New Roman" panose="02020603050405020304" pitchFamily="18" charset="0"/>
+                        </a:rPr>
+                        <a:t>0.0015417</a:t>
+                      </a:r>
+                      <a:endParaRPr lang="fr-FR" sz="1600" dirty="0">
+                        <a:effectLst/>
+                        <a:latin typeface="Gill Sans MT" panose="020B0502020104020203" pitchFamily="34" charset="0"/>
+                        <a:ea typeface="MS Mincho" panose="02020609040205080304" pitchFamily="49" charset="-128"/>
+                        <a:cs typeface="Times New Roman" panose="02020603050405020304" pitchFamily="18" charset="0"/>
+                      </a:endParaRPr>
+                    </a:p>
+                  </a:txBody>
+                  <a:tcPr marL="68580" marR="68580" marT="0" marB="0"/>
+                </a:tc>
+                <a:tc>
+                  <a:txBody>
+                    <a:bodyPr/>
+                    <a:lstStyle/>
+                    <a:p>
+                      <a:pPr algn="ctr">
+                        <a:lnSpc>
+                          <a:spcPct val="115000"/>
+                        </a:lnSpc>
+                        <a:spcAft>
+                          <a:spcPts val="1000"/>
+                        </a:spcAft>
+                      </a:pPr>
+                      <a:r>
+                        <a:rPr lang="en-US" sz="1600">
+                          <a:effectLst/>
+                          <a:latin typeface="Gill Sans MT" panose="020B0502020104020203" pitchFamily="34" charset="0"/>
+                          <a:ea typeface="MS Mincho" panose="02020609040205080304" pitchFamily="49" charset="-128"/>
+                          <a:cs typeface="Times New Roman" panose="02020603050405020304" pitchFamily="18" charset="0"/>
+                        </a:rPr>
+                        <a:t>-16.291218</a:t>
+                      </a:r>
+                      <a:endParaRPr lang="fr-FR" sz="1600">
+                        <a:effectLst/>
+                        <a:latin typeface="Gill Sans MT" panose="020B0502020104020203" pitchFamily="34" charset="0"/>
+                        <a:ea typeface="MS Mincho" panose="02020609040205080304" pitchFamily="49" charset="-128"/>
+                        <a:cs typeface="Times New Roman" panose="02020603050405020304" pitchFamily="18" charset="0"/>
+                      </a:endParaRPr>
+                    </a:p>
+                  </a:txBody>
+                  <a:tcPr marL="68580" marR="68580" marT="0" marB="0"/>
+                </a:tc>
+                <a:tc>
+                  <a:txBody>
+                    <a:bodyPr/>
+                    <a:lstStyle/>
+                    <a:p>
+                      <a:pPr algn="ctr">
+                        <a:lnSpc>
+                          <a:spcPct val="115000"/>
+                        </a:lnSpc>
+                        <a:spcAft>
+                          <a:spcPts val="1000"/>
+                        </a:spcAft>
+                      </a:pPr>
+                      <a:r>
+                        <a:rPr lang="en-US" sz="1600">
+                          <a:effectLst/>
+                          <a:latin typeface="Gill Sans MT" panose="020B0502020104020203" pitchFamily="34" charset="0"/>
+                          <a:ea typeface="MS Mincho" panose="02020609040205080304" pitchFamily="49" charset="-128"/>
+                          <a:cs typeface="Times New Roman" panose="02020603050405020304" pitchFamily="18" charset="0"/>
+                        </a:rPr>
+                        <a:t>&lt; 2.2e-16</a:t>
+                      </a:r>
+                      <a:endParaRPr lang="fr-FR" sz="1600">
+                        <a:effectLst/>
+                        <a:latin typeface="Gill Sans MT" panose="020B0502020104020203" pitchFamily="34" charset="0"/>
+                        <a:ea typeface="MS Mincho" panose="02020609040205080304" pitchFamily="49" charset="-128"/>
+                        <a:cs typeface="Times New Roman" panose="02020603050405020304" pitchFamily="18" charset="0"/>
+                      </a:endParaRPr>
+                    </a:p>
+                  </a:txBody>
+                  <a:tcPr marL="68580" marR="68580" marT="0" marB="0"/>
+                </a:tc>
+                <a:extLst>
+                  <a:ext uri="{0D108BD9-81ED-4DB2-BD59-A6C34878D82A}">
+                    <a16:rowId xmlns:a16="http://schemas.microsoft.com/office/drawing/2014/main" val="3860682075"/>
+                  </a:ext>
+                </a:extLst>
+              </a:tr>
+              <a:tr h="313486">
+                <a:tc>
+                  <a:txBody>
+                    <a:bodyPr/>
+                    <a:lstStyle/>
+                    <a:p>
+                      <a:pPr>
+                        <a:lnSpc>
+                          <a:spcPct val="115000"/>
+                        </a:lnSpc>
+                        <a:spcAft>
+                          <a:spcPts val="1000"/>
+                        </a:spcAft>
+                      </a:pPr>
+                      <a:r>
+                        <a:rPr lang="en-US" sz="1600" dirty="0" err="1">
+                          <a:effectLst/>
+                          <a:latin typeface="Gill Sans MT" panose="020B0502020104020203" pitchFamily="34" charset="0"/>
+                          <a:ea typeface="MS Mincho" panose="02020609040205080304" pitchFamily="49" charset="-128"/>
+                          <a:cs typeface="Times New Roman" panose="02020603050405020304" pitchFamily="18" charset="0"/>
+                        </a:rPr>
+                        <a:t>pct_union_libre</a:t>
+                      </a:r>
+                      <a:endParaRPr lang="fr-FR" sz="1600" dirty="0">
+                        <a:effectLst/>
+                        <a:latin typeface="Gill Sans MT" panose="020B0502020104020203" pitchFamily="34" charset="0"/>
+                        <a:ea typeface="MS Mincho" panose="02020609040205080304" pitchFamily="49" charset="-128"/>
+                        <a:cs typeface="Times New Roman" panose="02020603050405020304" pitchFamily="18" charset="0"/>
+                      </a:endParaRPr>
+                    </a:p>
+                  </a:txBody>
+                  <a:tcPr marL="68580" marR="68580" marT="0" marB="0"/>
+                </a:tc>
+                <a:tc>
+                  <a:txBody>
+                    <a:bodyPr/>
+                    <a:lstStyle/>
+                    <a:p>
+                      <a:pPr algn="ctr">
+                        <a:lnSpc>
+                          <a:spcPct val="115000"/>
+                        </a:lnSpc>
+                        <a:spcAft>
+                          <a:spcPts val="1000"/>
+                        </a:spcAft>
+                      </a:pPr>
+                      <a:r>
+                        <a:rPr lang="en-US" sz="1600">
+                          <a:effectLst/>
+                          <a:latin typeface="Gill Sans MT" panose="020B0502020104020203" pitchFamily="34" charset="0"/>
+                          <a:ea typeface="MS Mincho" panose="02020609040205080304" pitchFamily="49" charset="-128"/>
+                          <a:cs typeface="Times New Roman" panose="02020603050405020304" pitchFamily="18" charset="0"/>
+                        </a:rPr>
+                        <a:t>-0.0216354</a:t>
+                      </a:r>
+                      <a:endParaRPr lang="fr-FR" sz="1600">
+                        <a:effectLst/>
+                        <a:latin typeface="Gill Sans MT" panose="020B0502020104020203" pitchFamily="34" charset="0"/>
+                        <a:ea typeface="MS Mincho" panose="02020609040205080304" pitchFamily="49" charset="-128"/>
+                        <a:cs typeface="Times New Roman" panose="02020603050405020304" pitchFamily="18" charset="0"/>
+                      </a:endParaRPr>
+                    </a:p>
+                  </a:txBody>
+                  <a:tcPr marL="68580" marR="68580" marT="0" marB="0"/>
+                </a:tc>
+                <a:tc>
+                  <a:txBody>
+                    <a:bodyPr/>
+                    <a:lstStyle/>
+                    <a:p>
+                      <a:pPr algn="ctr">
+                        <a:lnSpc>
+                          <a:spcPct val="115000"/>
+                        </a:lnSpc>
+                        <a:spcAft>
+                          <a:spcPts val="1000"/>
+                        </a:spcAft>
+                      </a:pPr>
+                      <a:r>
+                        <a:rPr lang="en-US" sz="1600" dirty="0">
+                          <a:effectLst/>
+                          <a:latin typeface="Gill Sans MT" panose="020B0502020104020203" pitchFamily="34" charset="0"/>
+                          <a:ea typeface="MS Mincho" panose="02020609040205080304" pitchFamily="49" charset="-128"/>
+                          <a:cs typeface="Times New Roman" panose="02020603050405020304" pitchFamily="18" charset="0"/>
+                        </a:rPr>
+                        <a:t>0.003338</a:t>
+                      </a:r>
+                      <a:endParaRPr lang="fr-FR" sz="1600" dirty="0">
+                        <a:effectLst/>
+                        <a:latin typeface="Gill Sans MT" panose="020B0502020104020203" pitchFamily="34" charset="0"/>
+                        <a:ea typeface="MS Mincho" panose="02020609040205080304" pitchFamily="49" charset="-128"/>
+                        <a:cs typeface="Times New Roman" panose="02020603050405020304" pitchFamily="18" charset="0"/>
+                      </a:endParaRPr>
+                    </a:p>
+                  </a:txBody>
+                  <a:tcPr marL="68580" marR="68580" marT="0" marB="0"/>
+                </a:tc>
+                <a:tc>
+                  <a:txBody>
+                    <a:bodyPr/>
+                    <a:lstStyle/>
+                    <a:p>
+                      <a:pPr algn="ctr">
+                        <a:lnSpc>
+                          <a:spcPct val="115000"/>
+                        </a:lnSpc>
+                        <a:spcAft>
+                          <a:spcPts val="1000"/>
+                        </a:spcAft>
+                      </a:pPr>
+                      <a:r>
+                        <a:rPr lang="en-US" sz="1600" dirty="0">
+                          <a:effectLst/>
+                          <a:latin typeface="Gill Sans MT" panose="020B0502020104020203" pitchFamily="34" charset="0"/>
+                          <a:ea typeface="MS Mincho" panose="02020609040205080304" pitchFamily="49" charset="-128"/>
+                          <a:cs typeface="Times New Roman" panose="02020603050405020304" pitchFamily="18" charset="0"/>
+                        </a:rPr>
+                        <a:t>-6.481541</a:t>
+                      </a:r>
+                      <a:endParaRPr lang="fr-FR" sz="1600" dirty="0">
+                        <a:effectLst/>
+                        <a:latin typeface="Gill Sans MT" panose="020B0502020104020203" pitchFamily="34" charset="0"/>
+                        <a:ea typeface="MS Mincho" panose="02020609040205080304" pitchFamily="49" charset="-128"/>
+                        <a:cs typeface="Times New Roman" panose="02020603050405020304" pitchFamily="18" charset="0"/>
+                      </a:endParaRPr>
+                    </a:p>
+                  </a:txBody>
+                  <a:tcPr marL="68580" marR="68580" marT="0" marB="0"/>
+                </a:tc>
+                <a:tc>
+                  <a:txBody>
+                    <a:bodyPr/>
+                    <a:lstStyle/>
+                    <a:p>
+                      <a:pPr algn="ctr">
+                        <a:lnSpc>
+                          <a:spcPct val="115000"/>
+                        </a:lnSpc>
+                        <a:spcAft>
+                          <a:spcPts val="1000"/>
+                        </a:spcAft>
+                      </a:pPr>
+                      <a:r>
+                        <a:rPr lang="en-US" sz="1600">
+                          <a:effectLst/>
+                          <a:latin typeface="Gill Sans MT" panose="020B0502020104020203" pitchFamily="34" charset="0"/>
+                          <a:ea typeface="MS Mincho" panose="02020609040205080304" pitchFamily="49" charset="-128"/>
+                          <a:cs typeface="Times New Roman" panose="02020603050405020304" pitchFamily="18" charset="0"/>
+                        </a:rPr>
+                        <a:t>9.079e-11</a:t>
+                      </a:r>
+                      <a:endParaRPr lang="fr-FR" sz="1600">
+                        <a:effectLst/>
+                        <a:latin typeface="Gill Sans MT" panose="020B0502020104020203" pitchFamily="34" charset="0"/>
+                        <a:ea typeface="MS Mincho" panose="02020609040205080304" pitchFamily="49" charset="-128"/>
+                        <a:cs typeface="Times New Roman" panose="02020603050405020304" pitchFamily="18" charset="0"/>
+                      </a:endParaRPr>
+                    </a:p>
+                  </a:txBody>
+                  <a:tcPr marL="68580" marR="68580" marT="0" marB="0"/>
+                </a:tc>
+                <a:extLst>
+                  <a:ext uri="{0D108BD9-81ED-4DB2-BD59-A6C34878D82A}">
+                    <a16:rowId xmlns:a16="http://schemas.microsoft.com/office/drawing/2014/main" val="3747354943"/>
+                  </a:ext>
+                </a:extLst>
+              </a:tr>
+              <a:tr h="313486">
+                <a:tc>
+                  <a:txBody>
+                    <a:bodyPr/>
+                    <a:lstStyle/>
+                    <a:p>
+                      <a:pPr>
+                        <a:lnSpc>
+                          <a:spcPct val="115000"/>
+                        </a:lnSpc>
+                        <a:spcAft>
+                          <a:spcPts val="1000"/>
+                        </a:spcAft>
+                      </a:pPr>
+                      <a:r>
+                        <a:rPr lang="en-US" sz="1600">
+                          <a:effectLst/>
+                          <a:latin typeface="Gill Sans MT" panose="020B0502020104020203" pitchFamily="34" charset="0"/>
+                          <a:ea typeface="MS Mincho" panose="02020609040205080304" pitchFamily="49" charset="-128"/>
+                          <a:cs typeface="Times New Roman" panose="02020603050405020304" pitchFamily="18" charset="0"/>
+                        </a:rPr>
+                        <a:t>pct_ouvriers</a:t>
+                      </a:r>
+                      <a:endParaRPr lang="fr-FR" sz="1600">
+                        <a:effectLst/>
+                        <a:latin typeface="Gill Sans MT" panose="020B0502020104020203" pitchFamily="34" charset="0"/>
+                        <a:ea typeface="MS Mincho" panose="02020609040205080304" pitchFamily="49" charset="-128"/>
+                        <a:cs typeface="Times New Roman" panose="02020603050405020304" pitchFamily="18" charset="0"/>
+                      </a:endParaRPr>
+                    </a:p>
+                  </a:txBody>
+                  <a:tcPr marL="68580" marR="68580" marT="0" marB="0"/>
+                </a:tc>
+                <a:tc>
+                  <a:txBody>
+                    <a:bodyPr/>
+                    <a:lstStyle/>
+                    <a:p>
+                      <a:pPr algn="ctr">
+                        <a:lnSpc>
+                          <a:spcPct val="115000"/>
+                        </a:lnSpc>
+                        <a:spcAft>
+                          <a:spcPts val="1000"/>
+                        </a:spcAft>
+                      </a:pPr>
+                      <a:r>
+                        <a:rPr lang="en-US" sz="1600">
+                          <a:effectLst/>
+                          <a:latin typeface="Gill Sans MT" panose="020B0502020104020203" pitchFamily="34" charset="0"/>
+                          <a:ea typeface="MS Mincho" panose="02020609040205080304" pitchFamily="49" charset="-128"/>
+                          <a:cs typeface="Times New Roman" panose="02020603050405020304" pitchFamily="18" charset="0"/>
+                        </a:rPr>
+                        <a:t>-0.0110614</a:t>
+                      </a:r>
+                      <a:endParaRPr lang="fr-FR" sz="1600">
+                        <a:effectLst/>
+                        <a:latin typeface="Gill Sans MT" panose="020B0502020104020203" pitchFamily="34" charset="0"/>
+                        <a:ea typeface="MS Mincho" panose="02020609040205080304" pitchFamily="49" charset="-128"/>
+                        <a:cs typeface="Times New Roman" panose="02020603050405020304" pitchFamily="18" charset="0"/>
+                      </a:endParaRPr>
+                    </a:p>
+                  </a:txBody>
+                  <a:tcPr marL="68580" marR="68580" marT="0" marB="0"/>
+                </a:tc>
+                <a:tc>
+                  <a:txBody>
+                    <a:bodyPr/>
+                    <a:lstStyle/>
+                    <a:p>
+                      <a:pPr algn="ctr">
+                        <a:lnSpc>
+                          <a:spcPct val="115000"/>
+                        </a:lnSpc>
+                        <a:spcAft>
+                          <a:spcPts val="1000"/>
+                        </a:spcAft>
+                      </a:pPr>
+                      <a:r>
+                        <a:rPr lang="en-US" sz="1600">
+                          <a:effectLst/>
+                          <a:latin typeface="Gill Sans MT" panose="020B0502020104020203" pitchFamily="34" charset="0"/>
+                          <a:ea typeface="MS Mincho" panose="02020609040205080304" pitchFamily="49" charset="-128"/>
+                          <a:cs typeface="Times New Roman" panose="02020603050405020304" pitchFamily="18" charset="0"/>
+                        </a:rPr>
+                        <a:t>0.0019103</a:t>
+                      </a:r>
+                      <a:endParaRPr lang="fr-FR" sz="1600">
+                        <a:effectLst/>
+                        <a:latin typeface="Gill Sans MT" panose="020B0502020104020203" pitchFamily="34" charset="0"/>
+                        <a:ea typeface="MS Mincho" panose="02020609040205080304" pitchFamily="49" charset="-128"/>
+                        <a:cs typeface="Times New Roman" panose="02020603050405020304" pitchFamily="18" charset="0"/>
+                      </a:endParaRPr>
+                    </a:p>
+                  </a:txBody>
+                  <a:tcPr marL="68580" marR="68580" marT="0" marB="0"/>
+                </a:tc>
+                <a:tc>
+                  <a:txBody>
+                    <a:bodyPr/>
+                    <a:lstStyle/>
+                    <a:p>
+                      <a:pPr algn="ctr">
+                        <a:lnSpc>
+                          <a:spcPct val="115000"/>
+                        </a:lnSpc>
+                        <a:spcAft>
+                          <a:spcPts val="1000"/>
+                        </a:spcAft>
+                      </a:pPr>
+                      <a:r>
+                        <a:rPr lang="en-US" sz="1600" dirty="0">
+                          <a:effectLst/>
+                          <a:latin typeface="Gill Sans MT" panose="020B0502020104020203" pitchFamily="34" charset="0"/>
+                          <a:ea typeface="MS Mincho" panose="02020609040205080304" pitchFamily="49" charset="-128"/>
+                          <a:cs typeface="Times New Roman" panose="02020603050405020304" pitchFamily="18" charset="0"/>
+                        </a:rPr>
+                        <a:t>-5.790438</a:t>
+                      </a:r>
+                      <a:endParaRPr lang="fr-FR" sz="1600" dirty="0">
+                        <a:effectLst/>
+                        <a:latin typeface="Gill Sans MT" panose="020B0502020104020203" pitchFamily="34" charset="0"/>
+                        <a:ea typeface="MS Mincho" panose="02020609040205080304" pitchFamily="49" charset="-128"/>
+                        <a:cs typeface="Times New Roman" panose="02020603050405020304" pitchFamily="18" charset="0"/>
+                      </a:endParaRPr>
+                    </a:p>
+                  </a:txBody>
+                  <a:tcPr marL="68580" marR="68580" marT="0" marB="0"/>
+                </a:tc>
+                <a:tc>
+                  <a:txBody>
+                    <a:bodyPr/>
+                    <a:lstStyle/>
+                    <a:p>
+                      <a:pPr algn="ctr">
+                        <a:lnSpc>
+                          <a:spcPct val="115000"/>
+                        </a:lnSpc>
+                        <a:spcAft>
+                          <a:spcPts val="1000"/>
+                        </a:spcAft>
+                      </a:pPr>
+                      <a:r>
+                        <a:rPr lang="en-US" sz="1600">
+                          <a:effectLst/>
+                          <a:latin typeface="Gill Sans MT" panose="020B0502020104020203" pitchFamily="34" charset="0"/>
+                          <a:ea typeface="MS Mincho" panose="02020609040205080304" pitchFamily="49" charset="-128"/>
+                          <a:cs typeface="Times New Roman" panose="02020603050405020304" pitchFamily="18" charset="0"/>
+                        </a:rPr>
+                        <a:t>7.020e-09</a:t>
+                      </a:r>
+                      <a:endParaRPr lang="fr-FR" sz="1600">
+                        <a:effectLst/>
+                        <a:latin typeface="Gill Sans MT" panose="020B0502020104020203" pitchFamily="34" charset="0"/>
+                        <a:ea typeface="MS Mincho" panose="02020609040205080304" pitchFamily="49" charset="-128"/>
+                        <a:cs typeface="Times New Roman" panose="02020603050405020304" pitchFamily="18" charset="0"/>
+                      </a:endParaRPr>
+                    </a:p>
+                  </a:txBody>
+                  <a:tcPr marL="68580" marR="68580" marT="0" marB="0"/>
+                </a:tc>
+                <a:extLst>
+                  <a:ext uri="{0D108BD9-81ED-4DB2-BD59-A6C34878D82A}">
+                    <a16:rowId xmlns:a16="http://schemas.microsoft.com/office/drawing/2014/main" val="2139166984"/>
+                  </a:ext>
+                </a:extLst>
+              </a:tr>
+              <a:tr h="313486">
+                <a:tc>
+                  <a:txBody>
+                    <a:bodyPr/>
+                    <a:lstStyle/>
+                    <a:p>
+                      <a:pPr>
+                        <a:lnSpc>
+                          <a:spcPct val="115000"/>
+                        </a:lnSpc>
+                        <a:spcAft>
+                          <a:spcPts val="1000"/>
+                        </a:spcAft>
+                      </a:pPr>
+                      <a:r>
+                        <a:rPr lang="en-US" sz="1600" dirty="0" err="1">
+                          <a:effectLst/>
+                          <a:latin typeface="Gill Sans MT" panose="020B0502020104020203" pitchFamily="34" charset="0"/>
+                          <a:ea typeface="MS Mincho" panose="02020609040205080304" pitchFamily="49" charset="-128"/>
+                          <a:cs typeface="Times New Roman" panose="02020603050405020304" pitchFamily="18" charset="0"/>
+                        </a:rPr>
+                        <a:t>pct_sans_emploi</a:t>
+                      </a:r>
+                      <a:endParaRPr lang="fr-FR" sz="1600" dirty="0">
+                        <a:effectLst/>
+                        <a:latin typeface="Gill Sans MT" panose="020B0502020104020203" pitchFamily="34" charset="0"/>
+                        <a:ea typeface="MS Mincho" panose="02020609040205080304" pitchFamily="49" charset="-128"/>
+                        <a:cs typeface="Times New Roman" panose="02020603050405020304" pitchFamily="18" charset="0"/>
+                      </a:endParaRPr>
+                    </a:p>
+                  </a:txBody>
+                  <a:tcPr marL="68580" marR="68580" marT="0" marB="0"/>
+                </a:tc>
+                <a:tc>
+                  <a:txBody>
+                    <a:bodyPr/>
+                    <a:lstStyle/>
+                    <a:p>
+                      <a:pPr algn="ctr">
+                        <a:lnSpc>
+                          <a:spcPct val="115000"/>
+                        </a:lnSpc>
+                        <a:spcAft>
+                          <a:spcPts val="1000"/>
+                        </a:spcAft>
+                      </a:pPr>
+                      <a:r>
+                        <a:rPr lang="en-US" sz="1600">
+                          <a:effectLst/>
+                          <a:latin typeface="Gill Sans MT" panose="020B0502020104020203" pitchFamily="34" charset="0"/>
+                          <a:ea typeface="MS Mincho" panose="02020609040205080304" pitchFamily="49" charset="-128"/>
+                          <a:cs typeface="Times New Roman" panose="02020603050405020304" pitchFamily="18" charset="0"/>
+                        </a:rPr>
+                        <a:t>-0.0063356</a:t>
+                      </a:r>
+                      <a:endParaRPr lang="fr-FR" sz="1600">
+                        <a:effectLst/>
+                        <a:latin typeface="Gill Sans MT" panose="020B0502020104020203" pitchFamily="34" charset="0"/>
+                        <a:ea typeface="MS Mincho" panose="02020609040205080304" pitchFamily="49" charset="-128"/>
+                        <a:cs typeface="Times New Roman" panose="02020603050405020304" pitchFamily="18" charset="0"/>
+                      </a:endParaRPr>
+                    </a:p>
+                  </a:txBody>
+                  <a:tcPr marL="68580" marR="68580" marT="0" marB="0"/>
+                </a:tc>
+                <a:tc>
+                  <a:txBody>
+                    <a:bodyPr/>
+                    <a:lstStyle/>
+                    <a:p>
+                      <a:pPr algn="ctr">
+                        <a:lnSpc>
+                          <a:spcPct val="115000"/>
+                        </a:lnSpc>
+                        <a:spcAft>
+                          <a:spcPts val="1000"/>
+                        </a:spcAft>
+                      </a:pPr>
+                      <a:r>
+                        <a:rPr lang="en-US" sz="1600">
+                          <a:effectLst/>
+                          <a:latin typeface="Gill Sans MT" panose="020B0502020104020203" pitchFamily="34" charset="0"/>
+                          <a:ea typeface="MS Mincho" panose="02020609040205080304" pitchFamily="49" charset="-128"/>
+                          <a:cs typeface="Times New Roman" panose="02020603050405020304" pitchFamily="18" charset="0"/>
+                        </a:rPr>
+                        <a:t>0.0013535</a:t>
+                      </a:r>
+                      <a:endParaRPr lang="fr-FR" sz="1600">
+                        <a:effectLst/>
+                        <a:latin typeface="Gill Sans MT" panose="020B0502020104020203" pitchFamily="34" charset="0"/>
+                        <a:ea typeface="MS Mincho" panose="02020609040205080304" pitchFamily="49" charset="-128"/>
+                        <a:cs typeface="Times New Roman" panose="02020603050405020304" pitchFamily="18" charset="0"/>
+                      </a:endParaRPr>
+                    </a:p>
+                  </a:txBody>
+                  <a:tcPr marL="68580" marR="68580" marT="0" marB="0"/>
+                </a:tc>
+                <a:tc>
+                  <a:txBody>
+                    <a:bodyPr/>
+                    <a:lstStyle/>
+                    <a:p>
+                      <a:pPr algn="ctr">
+                        <a:lnSpc>
+                          <a:spcPct val="115000"/>
+                        </a:lnSpc>
+                        <a:spcAft>
+                          <a:spcPts val="1000"/>
+                        </a:spcAft>
+                      </a:pPr>
+                      <a:r>
+                        <a:rPr lang="en-US" sz="1600" dirty="0">
+                          <a:effectLst/>
+                          <a:latin typeface="Gill Sans MT" panose="020B0502020104020203" pitchFamily="34" charset="0"/>
+                          <a:ea typeface="MS Mincho" panose="02020609040205080304" pitchFamily="49" charset="-128"/>
+                          <a:cs typeface="Times New Roman" panose="02020603050405020304" pitchFamily="18" charset="0"/>
+                        </a:rPr>
+                        <a:t>-4.680834</a:t>
+                      </a:r>
+                      <a:endParaRPr lang="fr-FR" sz="1600" dirty="0">
+                        <a:effectLst/>
+                        <a:latin typeface="Gill Sans MT" panose="020B0502020104020203" pitchFamily="34" charset="0"/>
+                        <a:ea typeface="MS Mincho" panose="02020609040205080304" pitchFamily="49" charset="-128"/>
+                        <a:cs typeface="Times New Roman" panose="02020603050405020304" pitchFamily="18" charset="0"/>
+                      </a:endParaRPr>
+                    </a:p>
+                  </a:txBody>
+                  <a:tcPr marL="68580" marR="68580" marT="0" marB="0"/>
+                </a:tc>
+                <a:tc>
+                  <a:txBody>
+                    <a:bodyPr/>
+                    <a:lstStyle/>
+                    <a:p>
+                      <a:pPr algn="ctr">
+                        <a:lnSpc>
+                          <a:spcPct val="115000"/>
+                        </a:lnSpc>
+                        <a:spcAft>
+                          <a:spcPts val="1000"/>
+                        </a:spcAft>
+                      </a:pPr>
+                      <a:r>
+                        <a:rPr lang="en-US" sz="1600">
+                          <a:effectLst/>
+                          <a:latin typeface="Gill Sans MT" panose="020B0502020104020203" pitchFamily="34" charset="0"/>
+                          <a:ea typeface="MS Mincho" panose="02020609040205080304" pitchFamily="49" charset="-128"/>
+                          <a:cs typeface="Times New Roman" panose="02020603050405020304" pitchFamily="18" charset="0"/>
+                        </a:rPr>
+                        <a:t>2.857e-06</a:t>
+                      </a:r>
+                      <a:endParaRPr lang="fr-FR" sz="1600">
+                        <a:effectLst/>
+                        <a:latin typeface="Gill Sans MT" panose="020B0502020104020203" pitchFamily="34" charset="0"/>
+                        <a:ea typeface="MS Mincho" panose="02020609040205080304" pitchFamily="49" charset="-128"/>
+                        <a:cs typeface="Times New Roman" panose="02020603050405020304" pitchFamily="18" charset="0"/>
+                      </a:endParaRPr>
+                    </a:p>
+                  </a:txBody>
+                  <a:tcPr marL="68580" marR="68580" marT="0" marB="0"/>
+                </a:tc>
+                <a:extLst>
+                  <a:ext uri="{0D108BD9-81ED-4DB2-BD59-A6C34878D82A}">
+                    <a16:rowId xmlns:a16="http://schemas.microsoft.com/office/drawing/2014/main" val="1408835832"/>
+                  </a:ext>
+                </a:extLst>
+              </a:tr>
+              <a:tr h="313486">
+                <a:tc>
+                  <a:txBody>
+                    <a:bodyPr/>
+                    <a:lstStyle/>
+                    <a:p>
+                      <a:pPr>
+                        <a:lnSpc>
+                          <a:spcPct val="115000"/>
+                        </a:lnSpc>
+                        <a:spcAft>
+                          <a:spcPts val="1000"/>
+                        </a:spcAft>
+                      </a:pPr>
+                      <a:r>
+                        <a:rPr lang="en-US" sz="1600">
+                          <a:effectLst/>
+                          <a:latin typeface="Gill Sans MT" panose="020B0502020104020203" pitchFamily="34" charset="0"/>
+                          <a:ea typeface="MS Mincho" panose="02020609040205080304" pitchFamily="49" charset="-128"/>
+                          <a:cs typeface="Times New Roman" panose="02020603050405020304" pitchFamily="18" charset="0"/>
+                        </a:rPr>
+                        <a:t>pct_fam_3_enfants_plus</a:t>
+                      </a:r>
+                      <a:endParaRPr lang="fr-FR" sz="1600">
+                        <a:effectLst/>
+                        <a:latin typeface="Gill Sans MT" panose="020B0502020104020203" pitchFamily="34" charset="0"/>
+                        <a:ea typeface="MS Mincho" panose="02020609040205080304" pitchFamily="49" charset="-128"/>
+                        <a:cs typeface="Times New Roman" panose="02020603050405020304" pitchFamily="18" charset="0"/>
+                      </a:endParaRPr>
+                    </a:p>
+                  </a:txBody>
+                  <a:tcPr marL="68580" marR="68580" marT="0" marB="0"/>
+                </a:tc>
+                <a:tc>
+                  <a:txBody>
+                    <a:bodyPr/>
+                    <a:lstStyle/>
+                    <a:p>
+                      <a:pPr algn="ctr">
+                        <a:lnSpc>
+                          <a:spcPct val="115000"/>
+                        </a:lnSpc>
+                        <a:spcAft>
+                          <a:spcPts val="1000"/>
+                        </a:spcAft>
+                      </a:pPr>
+                      <a:r>
+                        <a:rPr lang="en-US" sz="1600">
+                          <a:effectLst/>
+                          <a:latin typeface="Gill Sans MT" panose="020B0502020104020203" pitchFamily="34" charset="0"/>
+                          <a:ea typeface="MS Mincho" panose="02020609040205080304" pitchFamily="49" charset="-128"/>
+                          <a:cs typeface="Times New Roman" panose="02020603050405020304" pitchFamily="18" charset="0"/>
+                        </a:rPr>
+                        <a:t>-0.0046316</a:t>
+                      </a:r>
+                      <a:endParaRPr lang="fr-FR" sz="1600">
+                        <a:effectLst/>
+                        <a:latin typeface="Gill Sans MT" panose="020B0502020104020203" pitchFamily="34" charset="0"/>
+                        <a:ea typeface="MS Mincho" panose="02020609040205080304" pitchFamily="49" charset="-128"/>
+                        <a:cs typeface="Times New Roman" panose="02020603050405020304" pitchFamily="18" charset="0"/>
+                      </a:endParaRPr>
+                    </a:p>
+                  </a:txBody>
+                  <a:tcPr marL="68580" marR="68580" marT="0" marB="0"/>
+                </a:tc>
+                <a:tc>
+                  <a:txBody>
+                    <a:bodyPr/>
+                    <a:lstStyle/>
+                    <a:p>
+                      <a:pPr algn="ctr">
+                        <a:lnSpc>
+                          <a:spcPct val="115000"/>
+                        </a:lnSpc>
+                        <a:spcAft>
+                          <a:spcPts val="1000"/>
+                        </a:spcAft>
+                      </a:pPr>
+                      <a:r>
+                        <a:rPr lang="en-US" sz="1600">
+                          <a:effectLst/>
+                          <a:latin typeface="Gill Sans MT" panose="020B0502020104020203" pitchFamily="34" charset="0"/>
+                          <a:ea typeface="MS Mincho" panose="02020609040205080304" pitchFamily="49" charset="-128"/>
+                          <a:cs typeface="Times New Roman" panose="02020603050405020304" pitchFamily="18" charset="0"/>
+                        </a:rPr>
+                        <a:t>0.0027472</a:t>
+                      </a:r>
+                      <a:endParaRPr lang="fr-FR" sz="1600">
+                        <a:effectLst/>
+                        <a:latin typeface="Gill Sans MT" panose="020B0502020104020203" pitchFamily="34" charset="0"/>
+                        <a:ea typeface="MS Mincho" panose="02020609040205080304" pitchFamily="49" charset="-128"/>
+                        <a:cs typeface="Times New Roman" panose="02020603050405020304" pitchFamily="18" charset="0"/>
+                      </a:endParaRPr>
+                    </a:p>
+                  </a:txBody>
+                  <a:tcPr marL="68580" marR="68580" marT="0" marB="0"/>
+                </a:tc>
+                <a:tc>
+                  <a:txBody>
+                    <a:bodyPr/>
+                    <a:lstStyle/>
+                    <a:p>
+                      <a:pPr algn="ctr">
+                        <a:lnSpc>
+                          <a:spcPct val="115000"/>
+                        </a:lnSpc>
+                        <a:spcAft>
+                          <a:spcPts val="1000"/>
+                        </a:spcAft>
+                      </a:pPr>
+                      <a:r>
+                        <a:rPr lang="en-US" sz="1600" dirty="0">
+                          <a:effectLst/>
+                          <a:latin typeface="Gill Sans MT" panose="020B0502020104020203" pitchFamily="34" charset="0"/>
+                          <a:ea typeface="MS Mincho" panose="02020609040205080304" pitchFamily="49" charset="-128"/>
+                          <a:cs typeface="Times New Roman" panose="02020603050405020304" pitchFamily="18" charset="0"/>
+                        </a:rPr>
+                        <a:t>-1.685924</a:t>
+                      </a:r>
+                      <a:endParaRPr lang="fr-FR" sz="1600" dirty="0">
+                        <a:effectLst/>
+                        <a:latin typeface="Gill Sans MT" panose="020B0502020104020203" pitchFamily="34" charset="0"/>
+                        <a:ea typeface="MS Mincho" panose="02020609040205080304" pitchFamily="49" charset="-128"/>
+                        <a:cs typeface="Times New Roman" panose="02020603050405020304" pitchFamily="18" charset="0"/>
+                      </a:endParaRPr>
+                    </a:p>
+                  </a:txBody>
+                  <a:tcPr marL="68580" marR="68580" marT="0" marB="0"/>
+                </a:tc>
+                <a:tc>
+                  <a:txBody>
+                    <a:bodyPr/>
+                    <a:lstStyle/>
+                    <a:p>
+                      <a:pPr algn="ctr">
+                        <a:lnSpc>
+                          <a:spcPct val="115000"/>
+                        </a:lnSpc>
+                        <a:spcAft>
+                          <a:spcPts val="1000"/>
+                        </a:spcAft>
+                      </a:pPr>
+                      <a:r>
+                        <a:rPr lang="en-US" sz="1600">
+                          <a:effectLst/>
+                          <a:latin typeface="Gill Sans MT" panose="020B0502020104020203" pitchFamily="34" charset="0"/>
+                          <a:ea typeface="MS Mincho" panose="02020609040205080304" pitchFamily="49" charset="-128"/>
+                          <a:cs typeface="Times New Roman" panose="02020603050405020304" pitchFamily="18" charset="0"/>
+                        </a:rPr>
+                        <a:t>0.0918104</a:t>
+                      </a:r>
+                      <a:endParaRPr lang="fr-FR" sz="1600">
+                        <a:effectLst/>
+                        <a:latin typeface="Gill Sans MT" panose="020B0502020104020203" pitchFamily="34" charset="0"/>
+                        <a:ea typeface="MS Mincho" panose="02020609040205080304" pitchFamily="49" charset="-128"/>
+                        <a:cs typeface="Times New Roman" panose="02020603050405020304" pitchFamily="18" charset="0"/>
+                      </a:endParaRPr>
+                    </a:p>
+                  </a:txBody>
+                  <a:tcPr marL="68580" marR="68580" marT="0" marB="0"/>
+                </a:tc>
+                <a:extLst>
+                  <a:ext uri="{0D108BD9-81ED-4DB2-BD59-A6C34878D82A}">
+                    <a16:rowId xmlns:a16="http://schemas.microsoft.com/office/drawing/2014/main" val="1379440414"/>
+                  </a:ext>
+                </a:extLst>
+              </a:tr>
+              <a:tr h="313486">
+                <a:tc>
+                  <a:txBody>
+                    <a:bodyPr/>
+                    <a:lstStyle/>
+                    <a:p>
+                      <a:pPr>
+                        <a:lnSpc>
+                          <a:spcPct val="115000"/>
+                        </a:lnSpc>
+                        <a:spcAft>
+                          <a:spcPts val="1000"/>
+                        </a:spcAft>
+                      </a:pPr>
+                      <a:r>
+                        <a:rPr lang="en-US" sz="1600" b="0" dirty="0" err="1">
+                          <a:solidFill>
+                            <a:schemeClr val="tx1"/>
+                          </a:solidFill>
+                          <a:effectLst/>
+                          <a:latin typeface="Gill Sans MT" panose="020B0502020104020203" pitchFamily="34" charset="0"/>
+                          <a:ea typeface="MS Mincho" panose="02020609040205080304" pitchFamily="49" charset="-128"/>
+                          <a:cs typeface="Times New Roman" panose="02020603050405020304" pitchFamily="18" charset="0"/>
+                        </a:rPr>
+                        <a:t>taux_de_natalite_annuel_moyen</a:t>
+                      </a:r>
+                      <a:endParaRPr lang="fr-FR" sz="1600" b="0" dirty="0">
+                        <a:solidFill>
+                          <a:schemeClr val="tx1"/>
+                        </a:solidFill>
+                        <a:effectLst/>
+                        <a:latin typeface="Gill Sans MT" panose="020B0502020104020203" pitchFamily="34" charset="0"/>
+                        <a:ea typeface="MS Mincho" panose="02020609040205080304" pitchFamily="49" charset="-128"/>
+                        <a:cs typeface="Times New Roman" panose="02020603050405020304" pitchFamily="18" charset="0"/>
+                      </a:endParaRPr>
+                    </a:p>
+                  </a:txBody>
+                  <a:tcPr marL="68580" marR="68580" marT="0" marB="0"/>
+                </a:tc>
+                <a:tc>
+                  <a:txBody>
+                    <a:bodyPr/>
+                    <a:lstStyle/>
+                    <a:p>
+                      <a:pPr algn="ctr">
+                        <a:lnSpc>
+                          <a:spcPct val="115000"/>
+                        </a:lnSpc>
+                        <a:spcAft>
+                          <a:spcPts val="1000"/>
+                        </a:spcAft>
+                      </a:pPr>
+                      <a:r>
+                        <a:rPr lang="en-US" sz="1600">
+                          <a:effectLst/>
+                          <a:latin typeface="Gill Sans MT" panose="020B0502020104020203" pitchFamily="34" charset="0"/>
+                          <a:ea typeface="MS Mincho" panose="02020609040205080304" pitchFamily="49" charset="-128"/>
+                          <a:cs typeface="Times New Roman" panose="02020603050405020304" pitchFamily="18" charset="0"/>
+                        </a:rPr>
+                        <a:t>0.0641966</a:t>
+                      </a:r>
+                      <a:endParaRPr lang="fr-FR" sz="1600">
+                        <a:effectLst/>
+                        <a:latin typeface="Gill Sans MT" panose="020B0502020104020203" pitchFamily="34" charset="0"/>
+                        <a:ea typeface="MS Mincho" panose="02020609040205080304" pitchFamily="49" charset="-128"/>
+                        <a:cs typeface="Times New Roman" panose="02020603050405020304" pitchFamily="18" charset="0"/>
+                      </a:endParaRPr>
+                    </a:p>
+                  </a:txBody>
+                  <a:tcPr marL="68580" marR="68580" marT="0" marB="0"/>
+                </a:tc>
+                <a:tc>
+                  <a:txBody>
+                    <a:bodyPr/>
+                    <a:lstStyle/>
+                    <a:p>
+                      <a:pPr algn="ctr">
+                        <a:lnSpc>
+                          <a:spcPct val="115000"/>
+                        </a:lnSpc>
+                        <a:spcAft>
+                          <a:spcPts val="1000"/>
+                        </a:spcAft>
+                      </a:pPr>
+                      <a:r>
+                        <a:rPr lang="en-US" sz="1600">
+                          <a:effectLst/>
+                          <a:latin typeface="Gill Sans MT" panose="020B0502020104020203" pitchFamily="34" charset="0"/>
+                          <a:ea typeface="MS Mincho" panose="02020609040205080304" pitchFamily="49" charset="-128"/>
+                          <a:cs typeface="Times New Roman" panose="02020603050405020304" pitchFamily="18" charset="0"/>
+                        </a:rPr>
+                        <a:t>0.0030226</a:t>
+                      </a:r>
+                      <a:endParaRPr lang="fr-FR" sz="1600">
+                        <a:effectLst/>
+                        <a:latin typeface="Gill Sans MT" panose="020B0502020104020203" pitchFamily="34" charset="0"/>
+                        <a:ea typeface="MS Mincho" panose="02020609040205080304" pitchFamily="49" charset="-128"/>
+                        <a:cs typeface="Times New Roman" panose="02020603050405020304" pitchFamily="18" charset="0"/>
+                      </a:endParaRPr>
+                    </a:p>
+                  </a:txBody>
+                  <a:tcPr marL="68580" marR="68580" marT="0" marB="0"/>
+                </a:tc>
+                <a:tc>
+                  <a:txBody>
+                    <a:bodyPr/>
+                    <a:lstStyle/>
+                    <a:p>
+                      <a:pPr algn="ctr">
+                        <a:lnSpc>
+                          <a:spcPct val="115000"/>
+                        </a:lnSpc>
+                        <a:spcAft>
+                          <a:spcPts val="1000"/>
+                        </a:spcAft>
+                      </a:pPr>
+                      <a:r>
+                        <a:rPr lang="en-US" sz="1600" dirty="0">
+                          <a:effectLst/>
+                          <a:latin typeface="Gill Sans MT" panose="020B0502020104020203" pitchFamily="34" charset="0"/>
+                          <a:ea typeface="MS Mincho" panose="02020609040205080304" pitchFamily="49" charset="-128"/>
+                          <a:cs typeface="Times New Roman" panose="02020603050405020304" pitchFamily="18" charset="0"/>
+                        </a:rPr>
+                        <a:t>21.23868</a:t>
+                      </a:r>
+                      <a:endParaRPr lang="fr-FR" sz="1600" dirty="0">
+                        <a:effectLst/>
+                        <a:latin typeface="Gill Sans MT" panose="020B0502020104020203" pitchFamily="34" charset="0"/>
+                        <a:ea typeface="MS Mincho" panose="02020609040205080304" pitchFamily="49" charset="-128"/>
+                        <a:cs typeface="Times New Roman" panose="02020603050405020304" pitchFamily="18" charset="0"/>
+                      </a:endParaRPr>
+                    </a:p>
+                  </a:txBody>
+                  <a:tcPr marL="68580" marR="68580" marT="0" marB="0"/>
+                </a:tc>
+                <a:tc>
+                  <a:txBody>
+                    <a:bodyPr/>
+                    <a:lstStyle/>
+                    <a:p>
+                      <a:pPr algn="ctr">
+                        <a:lnSpc>
+                          <a:spcPct val="115000"/>
+                        </a:lnSpc>
+                        <a:spcAft>
+                          <a:spcPts val="1000"/>
+                        </a:spcAft>
+                      </a:pPr>
+                      <a:r>
+                        <a:rPr lang="en-US" sz="1600">
+                          <a:effectLst/>
+                          <a:latin typeface="Gill Sans MT" panose="020B0502020104020203" pitchFamily="34" charset="0"/>
+                          <a:ea typeface="MS Mincho" panose="02020609040205080304" pitchFamily="49" charset="-128"/>
+                          <a:cs typeface="Times New Roman" panose="02020603050405020304" pitchFamily="18" charset="0"/>
+                        </a:rPr>
+                        <a:t>&lt; 2.2e-16</a:t>
+                      </a:r>
+                      <a:endParaRPr lang="fr-FR" sz="1600">
+                        <a:effectLst/>
+                        <a:latin typeface="Gill Sans MT" panose="020B0502020104020203" pitchFamily="34" charset="0"/>
+                        <a:ea typeface="MS Mincho" panose="02020609040205080304" pitchFamily="49" charset="-128"/>
+                        <a:cs typeface="Times New Roman" panose="02020603050405020304" pitchFamily="18" charset="0"/>
+                      </a:endParaRPr>
+                    </a:p>
+                  </a:txBody>
+                  <a:tcPr marL="68580" marR="68580" marT="0" marB="0"/>
+                </a:tc>
+                <a:extLst>
+                  <a:ext uri="{0D108BD9-81ED-4DB2-BD59-A6C34878D82A}">
+                    <a16:rowId xmlns:a16="http://schemas.microsoft.com/office/drawing/2014/main" val="830049012"/>
+                  </a:ext>
+                </a:extLst>
+              </a:tr>
+              <a:tr h="313486">
+                <a:tc>
+                  <a:txBody>
+                    <a:bodyPr/>
+                    <a:lstStyle/>
+                    <a:p>
+                      <a:pPr>
+                        <a:lnSpc>
+                          <a:spcPct val="115000"/>
+                        </a:lnSpc>
+                        <a:spcAft>
+                          <a:spcPts val="1000"/>
+                        </a:spcAft>
+                      </a:pPr>
+                      <a:r>
+                        <a:rPr lang="en-US" sz="1600">
+                          <a:effectLst/>
+                          <a:latin typeface="Gill Sans MT" panose="020B0502020104020203" pitchFamily="34" charset="0"/>
+                          <a:ea typeface="MS Mincho" panose="02020609040205080304" pitchFamily="49" charset="-128"/>
+                          <a:cs typeface="Times New Roman" panose="02020603050405020304" pitchFamily="18" charset="0"/>
+                        </a:rPr>
+                        <a:t>lag.pct_pop_25_64</a:t>
+                      </a:r>
+                      <a:endParaRPr lang="fr-FR" sz="1600">
+                        <a:effectLst/>
+                        <a:latin typeface="Gill Sans MT" panose="020B0502020104020203" pitchFamily="34" charset="0"/>
+                        <a:ea typeface="MS Mincho" panose="02020609040205080304" pitchFamily="49" charset="-128"/>
+                        <a:cs typeface="Times New Roman" panose="02020603050405020304" pitchFamily="18" charset="0"/>
+                      </a:endParaRPr>
+                    </a:p>
+                  </a:txBody>
+                  <a:tcPr marL="68580" marR="68580" marT="0" marB="0"/>
+                </a:tc>
+                <a:tc>
+                  <a:txBody>
+                    <a:bodyPr/>
+                    <a:lstStyle/>
+                    <a:p>
+                      <a:pPr algn="ctr">
+                        <a:lnSpc>
+                          <a:spcPct val="115000"/>
+                        </a:lnSpc>
+                        <a:spcAft>
+                          <a:spcPts val="1000"/>
+                        </a:spcAft>
+                      </a:pPr>
+                      <a:r>
+                        <a:rPr lang="en-US" sz="1600">
+                          <a:effectLst/>
+                          <a:latin typeface="Gill Sans MT" panose="020B0502020104020203" pitchFamily="34" charset="0"/>
+                          <a:ea typeface="MS Mincho" panose="02020609040205080304" pitchFamily="49" charset="-128"/>
+                          <a:cs typeface="Times New Roman" panose="02020603050405020304" pitchFamily="18" charset="0"/>
+                        </a:rPr>
+                        <a:t>-0.0919607</a:t>
+                      </a:r>
+                      <a:endParaRPr lang="fr-FR" sz="1600">
+                        <a:effectLst/>
+                        <a:latin typeface="Gill Sans MT" panose="020B0502020104020203" pitchFamily="34" charset="0"/>
+                        <a:ea typeface="MS Mincho" panose="02020609040205080304" pitchFamily="49" charset="-128"/>
+                        <a:cs typeface="Times New Roman" panose="02020603050405020304" pitchFamily="18" charset="0"/>
+                      </a:endParaRPr>
+                    </a:p>
+                  </a:txBody>
+                  <a:tcPr marL="68580" marR="68580" marT="0" marB="0"/>
+                </a:tc>
+                <a:tc>
+                  <a:txBody>
+                    <a:bodyPr/>
+                    <a:lstStyle/>
+                    <a:p>
+                      <a:pPr algn="ctr">
+                        <a:lnSpc>
+                          <a:spcPct val="115000"/>
+                        </a:lnSpc>
+                        <a:spcAft>
+                          <a:spcPts val="1000"/>
+                        </a:spcAft>
+                      </a:pPr>
+                      <a:r>
+                        <a:rPr lang="en-US" sz="1600">
+                          <a:effectLst/>
+                          <a:latin typeface="Gill Sans MT" panose="020B0502020104020203" pitchFamily="34" charset="0"/>
+                          <a:ea typeface="MS Mincho" panose="02020609040205080304" pitchFamily="49" charset="-128"/>
+                          <a:cs typeface="Times New Roman" panose="02020603050405020304" pitchFamily="18" charset="0"/>
+                        </a:rPr>
+                        <a:t>0.0200256</a:t>
+                      </a:r>
+                      <a:endParaRPr lang="fr-FR" sz="1600">
+                        <a:effectLst/>
+                        <a:latin typeface="Gill Sans MT" panose="020B0502020104020203" pitchFamily="34" charset="0"/>
+                        <a:ea typeface="MS Mincho" panose="02020609040205080304" pitchFamily="49" charset="-128"/>
+                        <a:cs typeface="Times New Roman" panose="02020603050405020304" pitchFamily="18" charset="0"/>
+                      </a:endParaRPr>
+                    </a:p>
+                  </a:txBody>
+                  <a:tcPr marL="68580" marR="68580" marT="0" marB="0"/>
+                </a:tc>
+                <a:tc>
+                  <a:txBody>
+                    <a:bodyPr/>
+                    <a:lstStyle/>
+                    <a:p>
+                      <a:pPr algn="ctr">
+                        <a:lnSpc>
+                          <a:spcPct val="115000"/>
+                        </a:lnSpc>
+                        <a:spcAft>
+                          <a:spcPts val="1000"/>
+                        </a:spcAft>
+                      </a:pPr>
+                      <a:r>
+                        <a:rPr lang="en-US" sz="1600">
+                          <a:effectLst/>
+                          <a:latin typeface="Gill Sans MT" panose="020B0502020104020203" pitchFamily="34" charset="0"/>
+                          <a:ea typeface="MS Mincho" panose="02020609040205080304" pitchFamily="49" charset="-128"/>
+                          <a:cs typeface="Times New Roman" panose="02020603050405020304" pitchFamily="18" charset="0"/>
+                        </a:rPr>
+                        <a:t>-4.592151</a:t>
+                      </a:r>
+                      <a:endParaRPr lang="fr-FR" sz="1600">
+                        <a:effectLst/>
+                        <a:latin typeface="Gill Sans MT" panose="020B0502020104020203" pitchFamily="34" charset="0"/>
+                        <a:ea typeface="MS Mincho" panose="02020609040205080304" pitchFamily="49" charset="-128"/>
+                        <a:cs typeface="Times New Roman" panose="02020603050405020304" pitchFamily="18" charset="0"/>
+                      </a:endParaRPr>
+                    </a:p>
+                  </a:txBody>
+                  <a:tcPr marL="68580" marR="68580" marT="0" marB="0"/>
+                </a:tc>
+                <a:tc>
+                  <a:txBody>
+                    <a:bodyPr/>
+                    <a:lstStyle/>
+                    <a:p>
+                      <a:pPr algn="ctr">
+                        <a:lnSpc>
+                          <a:spcPct val="115000"/>
+                        </a:lnSpc>
+                        <a:spcAft>
+                          <a:spcPts val="1000"/>
+                        </a:spcAft>
+                      </a:pPr>
+                      <a:r>
+                        <a:rPr lang="en-US" sz="1600" dirty="0">
+                          <a:effectLst/>
+                          <a:latin typeface="Gill Sans MT" panose="020B0502020104020203" pitchFamily="34" charset="0"/>
+                          <a:ea typeface="MS Mincho" panose="02020609040205080304" pitchFamily="49" charset="-128"/>
+                          <a:cs typeface="Times New Roman" panose="02020603050405020304" pitchFamily="18" charset="0"/>
+                        </a:rPr>
+                        <a:t>4.387e-06</a:t>
+                      </a:r>
+                      <a:endParaRPr lang="fr-FR" sz="1600" dirty="0">
+                        <a:effectLst/>
+                        <a:latin typeface="Gill Sans MT" panose="020B0502020104020203" pitchFamily="34" charset="0"/>
+                        <a:ea typeface="MS Mincho" panose="02020609040205080304" pitchFamily="49" charset="-128"/>
+                        <a:cs typeface="Times New Roman" panose="02020603050405020304" pitchFamily="18" charset="0"/>
+                      </a:endParaRPr>
+                    </a:p>
+                  </a:txBody>
+                  <a:tcPr marL="68580" marR="68580" marT="0" marB="0"/>
+                </a:tc>
+                <a:extLst>
+                  <a:ext uri="{0D108BD9-81ED-4DB2-BD59-A6C34878D82A}">
+                    <a16:rowId xmlns:a16="http://schemas.microsoft.com/office/drawing/2014/main" val="3945885517"/>
+                  </a:ext>
+                </a:extLst>
+              </a:tr>
+              <a:tr h="313486">
+                <a:tc>
+                  <a:txBody>
+                    <a:bodyPr/>
+                    <a:lstStyle/>
+                    <a:p>
+                      <a:pPr>
+                        <a:lnSpc>
+                          <a:spcPct val="115000"/>
+                        </a:lnSpc>
+                        <a:spcAft>
+                          <a:spcPts val="1000"/>
+                        </a:spcAft>
+                      </a:pPr>
+                      <a:r>
+                        <a:rPr lang="en-US" sz="1600" dirty="0">
+                          <a:effectLst/>
+                          <a:latin typeface="Gill Sans MT" panose="020B0502020104020203" pitchFamily="34" charset="0"/>
+                          <a:ea typeface="MS Mincho" panose="02020609040205080304" pitchFamily="49" charset="-128"/>
+                          <a:cs typeface="Times New Roman" panose="02020603050405020304" pitchFamily="18" charset="0"/>
+                        </a:rPr>
+                        <a:t>lag.pct_pop_65_plus</a:t>
+                      </a:r>
+                      <a:endParaRPr lang="fr-FR" sz="1600" dirty="0">
+                        <a:effectLst/>
+                        <a:latin typeface="Gill Sans MT" panose="020B0502020104020203" pitchFamily="34" charset="0"/>
+                        <a:ea typeface="MS Mincho" panose="02020609040205080304" pitchFamily="49" charset="-128"/>
+                        <a:cs typeface="Times New Roman" panose="02020603050405020304" pitchFamily="18" charset="0"/>
+                      </a:endParaRPr>
+                    </a:p>
+                  </a:txBody>
+                  <a:tcPr marL="68580" marR="68580" marT="0" marB="0"/>
+                </a:tc>
+                <a:tc>
+                  <a:txBody>
+                    <a:bodyPr/>
+                    <a:lstStyle/>
+                    <a:p>
+                      <a:pPr algn="ctr">
+                        <a:lnSpc>
+                          <a:spcPct val="115000"/>
+                        </a:lnSpc>
+                        <a:spcAft>
+                          <a:spcPts val="1000"/>
+                        </a:spcAft>
+                      </a:pPr>
+                      <a:r>
+                        <a:rPr lang="en-US" sz="1600" dirty="0">
+                          <a:effectLst/>
+                          <a:latin typeface="Gill Sans MT" panose="020B0502020104020203" pitchFamily="34" charset="0"/>
+                          <a:ea typeface="MS Mincho" panose="02020609040205080304" pitchFamily="49" charset="-128"/>
+                          <a:cs typeface="Times New Roman" panose="02020603050405020304" pitchFamily="18" charset="0"/>
+                        </a:rPr>
+                        <a:t>-0.0802855</a:t>
+                      </a:r>
+                      <a:endParaRPr lang="fr-FR" sz="1600" dirty="0">
+                        <a:effectLst/>
+                        <a:latin typeface="Gill Sans MT" panose="020B0502020104020203" pitchFamily="34" charset="0"/>
+                        <a:ea typeface="MS Mincho" panose="02020609040205080304" pitchFamily="49" charset="-128"/>
+                        <a:cs typeface="Times New Roman" panose="02020603050405020304" pitchFamily="18" charset="0"/>
+                      </a:endParaRPr>
+                    </a:p>
+                  </a:txBody>
+                  <a:tcPr marL="68580" marR="68580" marT="0" marB="0"/>
+                </a:tc>
+                <a:tc>
+                  <a:txBody>
+                    <a:bodyPr/>
+                    <a:lstStyle/>
+                    <a:p>
+                      <a:pPr algn="ctr">
+                        <a:lnSpc>
+                          <a:spcPct val="115000"/>
+                        </a:lnSpc>
+                        <a:spcAft>
+                          <a:spcPts val="1000"/>
+                        </a:spcAft>
+                      </a:pPr>
+                      <a:r>
+                        <a:rPr lang="en-US" sz="1600" dirty="0">
+                          <a:effectLst/>
+                          <a:latin typeface="Gill Sans MT" panose="020B0502020104020203" pitchFamily="34" charset="0"/>
+                          <a:ea typeface="MS Mincho" panose="02020609040205080304" pitchFamily="49" charset="-128"/>
+                          <a:cs typeface="Times New Roman" panose="02020603050405020304" pitchFamily="18" charset="0"/>
+                        </a:rPr>
+                        <a:t>0.0145221</a:t>
+                      </a:r>
+                      <a:endParaRPr lang="fr-FR" sz="1600" dirty="0">
+                        <a:effectLst/>
+                        <a:latin typeface="Gill Sans MT" panose="020B0502020104020203" pitchFamily="34" charset="0"/>
+                        <a:ea typeface="MS Mincho" panose="02020609040205080304" pitchFamily="49" charset="-128"/>
+                        <a:cs typeface="Times New Roman" panose="02020603050405020304" pitchFamily="18" charset="0"/>
+                      </a:endParaRPr>
+                    </a:p>
+                  </a:txBody>
+                  <a:tcPr marL="68580" marR="68580" marT="0" marB="0"/>
+                </a:tc>
+                <a:tc>
+                  <a:txBody>
+                    <a:bodyPr/>
+                    <a:lstStyle/>
+                    <a:p>
+                      <a:pPr algn="ctr">
+                        <a:lnSpc>
+                          <a:spcPct val="115000"/>
+                        </a:lnSpc>
+                        <a:spcAft>
+                          <a:spcPts val="1000"/>
+                        </a:spcAft>
+                      </a:pPr>
+                      <a:r>
+                        <a:rPr lang="en-US" sz="1600">
+                          <a:effectLst/>
+                          <a:latin typeface="Gill Sans MT" panose="020B0502020104020203" pitchFamily="34" charset="0"/>
+                          <a:ea typeface="MS Mincho" panose="02020609040205080304" pitchFamily="49" charset="-128"/>
+                          <a:cs typeface="Times New Roman" panose="02020603050405020304" pitchFamily="18" charset="0"/>
+                        </a:rPr>
+                        <a:t>-5.528498</a:t>
+                      </a:r>
+                      <a:endParaRPr lang="fr-FR" sz="1600">
+                        <a:effectLst/>
+                        <a:latin typeface="Gill Sans MT" panose="020B0502020104020203" pitchFamily="34" charset="0"/>
+                        <a:ea typeface="MS Mincho" panose="02020609040205080304" pitchFamily="49" charset="-128"/>
+                        <a:cs typeface="Times New Roman" panose="02020603050405020304" pitchFamily="18" charset="0"/>
+                      </a:endParaRPr>
+                    </a:p>
+                  </a:txBody>
+                  <a:tcPr marL="68580" marR="68580" marT="0" marB="0"/>
+                </a:tc>
+                <a:tc>
+                  <a:txBody>
+                    <a:bodyPr/>
+                    <a:lstStyle/>
+                    <a:p>
+                      <a:pPr algn="ctr">
+                        <a:lnSpc>
+                          <a:spcPct val="115000"/>
+                        </a:lnSpc>
+                        <a:spcAft>
+                          <a:spcPts val="1000"/>
+                        </a:spcAft>
+                      </a:pPr>
+                      <a:r>
+                        <a:rPr lang="en-US" sz="1600" dirty="0">
+                          <a:effectLst/>
+                          <a:latin typeface="Gill Sans MT" panose="020B0502020104020203" pitchFamily="34" charset="0"/>
+                          <a:ea typeface="MS Mincho" panose="02020609040205080304" pitchFamily="49" charset="-128"/>
+                          <a:cs typeface="Times New Roman" panose="02020603050405020304" pitchFamily="18" charset="0"/>
+                        </a:rPr>
+                        <a:t>3.230e-08</a:t>
+                      </a:r>
+                      <a:endParaRPr lang="fr-FR" sz="1600" dirty="0">
+                        <a:effectLst/>
+                        <a:latin typeface="Gill Sans MT" panose="020B0502020104020203" pitchFamily="34" charset="0"/>
+                        <a:ea typeface="MS Mincho" panose="02020609040205080304" pitchFamily="49" charset="-128"/>
+                        <a:cs typeface="Times New Roman" panose="02020603050405020304" pitchFamily="18" charset="0"/>
+                      </a:endParaRPr>
+                    </a:p>
+                  </a:txBody>
+                  <a:tcPr marL="68580" marR="68580" marT="0" marB="0"/>
+                </a:tc>
+                <a:extLst>
+                  <a:ext uri="{0D108BD9-81ED-4DB2-BD59-A6C34878D82A}">
+                    <a16:rowId xmlns:a16="http://schemas.microsoft.com/office/drawing/2014/main" val="3745327878"/>
+                  </a:ext>
+                </a:extLst>
+              </a:tr>
+              <a:tr h="313486">
+                <a:tc>
+                  <a:txBody>
+                    <a:bodyPr/>
+                    <a:lstStyle/>
+                    <a:p>
+                      <a:pPr>
+                        <a:lnSpc>
+                          <a:spcPct val="115000"/>
+                        </a:lnSpc>
+                        <a:spcAft>
+                          <a:spcPts val="1000"/>
+                        </a:spcAft>
+                      </a:pPr>
+                      <a:r>
+                        <a:rPr lang="en-US" sz="1600">
+                          <a:effectLst/>
+                          <a:latin typeface="Gill Sans MT" panose="020B0502020104020203" pitchFamily="34" charset="0"/>
+                          <a:ea typeface="MS Mincho" panose="02020609040205080304" pitchFamily="49" charset="-128"/>
+                          <a:cs typeface="Times New Roman" panose="02020603050405020304" pitchFamily="18" charset="0"/>
+                        </a:rPr>
+                        <a:t>lag.pct_union_libre</a:t>
+                      </a:r>
+                      <a:endParaRPr lang="fr-FR" sz="1600">
+                        <a:effectLst/>
+                        <a:latin typeface="Gill Sans MT" panose="020B0502020104020203" pitchFamily="34" charset="0"/>
+                        <a:ea typeface="MS Mincho" panose="02020609040205080304" pitchFamily="49" charset="-128"/>
+                        <a:cs typeface="Times New Roman" panose="02020603050405020304" pitchFamily="18" charset="0"/>
+                      </a:endParaRPr>
+                    </a:p>
+                  </a:txBody>
+                  <a:tcPr marL="68580" marR="68580" marT="0" marB="0"/>
+                </a:tc>
+                <a:tc>
+                  <a:txBody>
+                    <a:bodyPr/>
+                    <a:lstStyle/>
+                    <a:p>
+                      <a:pPr algn="ctr">
+                        <a:lnSpc>
+                          <a:spcPct val="115000"/>
+                        </a:lnSpc>
+                        <a:spcAft>
+                          <a:spcPts val="1000"/>
+                        </a:spcAft>
+                      </a:pPr>
+                      <a:r>
+                        <a:rPr lang="en-US" sz="1600">
+                          <a:effectLst/>
+                          <a:latin typeface="Gill Sans MT" panose="020B0502020104020203" pitchFamily="34" charset="0"/>
+                          <a:ea typeface="MS Mincho" panose="02020609040205080304" pitchFamily="49" charset="-128"/>
+                          <a:cs typeface="Times New Roman" panose="02020603050405020304" pitchFamily="18" charset="0"/>
+                        </a:rPr>
+                        <a:t>0.0334492</a:t>
+                      </a:r>
+                      <a:endParaRPr lang="fr-FR" sz="1600">
+                        <a:effectLst/>
+                        <a:latin typeface="Gill Sans MT" panose="020B0502020104020203" pitchFamily="34" charset="0"/>
+                        <a:ea typeface="MS Mincho" panose="02020609040205080304" pitchFamily="49" charset="-128"/>
+                        <a:cs typeface="Times New Roman" panose="02020603050405020304" pitchFamily="18" charset="0"/>
+                      </a:endParaRPr>
+                    </a:p>
+                  </a:txBody>
+                  <a:tcPr marL="68580" marR="68580" marT="0" marB="0"/>
+                </a:tc>
+                <a:tc>
+                  <a:txBody>
+                    <a:bodyPr/>
+                    <a:lstStyle/>
+                    <a:p>
+                      <a:pPr algn="ctr">
+                        <a:lnSpc>
+                          <a:spcPct val="115000"/>
+                        </a:lnSpc>
+                        <a:spcAft>
+                          <a:spcPts val="1000"/>
+                        </a:spcAft>
+                      </a:pPr>
+                      <a:r>
+                        <a:rPr lang="en-US" sz="1600">
+                          <a:effectLst/>
+                          <a:latin typeface="Gill Sans MT" panose="020B0502020104020203" pitchFamily="34" charset="0"/>
+                          <a:ea typeface="MS Mincho" panose="02020609040205080304" pitchFamily="49" charset="-128"/>
+                          <a:cs typeface="Times New Roman" panose="02020603050405020304" pitchFamily="18" charset="0"/>
+                        </a:rPr>
+                        <a:t>0.0181204</a:t>
+                      </a:r>
+                      <a:endParaRPr lang="fr-FR" sz="1600">
+                        <a:effectLst/>
+                        <a:latin typeface="Gill Sans MT" panose="020B0502020104020203" pitchFamily="34" charset="0"/>
+                        <a:ea typeface="MS Mincho" panose="02020609040205080304" pitchFamily="49" charset="-128"/>
+                        <a:cs typeface="Times New Roman" panose="02020603050405020304" pitchFamily="18" charset="0"/>
+                      </a:endParaRPr>
+                    </a:p>
+                  </a:txBody>
+                  <a:tcPr marL="68580" marR="68580" marT="0" marB="0"/>
+                </a:tc>
+                <a:tc>
+                  <a:txBody>
+                    <a:bodyPr/>
+                    <a:lstStyle/>
+                    <a:p>
+                      <a:pPr algn="ctr">
+                        <a:lnSpc>
+                          <a:spcPct val="115000"/>
+                        </a:lnSpc>
+                        <a:spcAft>
+                          <a:spcPts val="1000"/>
+                        </a:spcAft>
+                      </a:pPr>
+                      <a:r>
+                        <a:rPr lang="en-US" sz="1600">
+                          <a:effectLst/>
+                          <a:latin typeface="Gill Sans MT" panose="020B0502020104020203" pitchFamily="34" charset="0"/>
+                          <a:ea typeface="MS Mincho" panose="02020609040205080304" pitchFamily="49" charset="-128"/>
+                          <a:cs typeface="Times New Roman" panose="02020603050405020304" pitchFamily="18" charset="0"/>
+                        </a:rPr>
+                        <a:t>1.845939</a:t>
+                      </a:r>
+                      <a:endParaRPr lang="fr-FR" sz="1600">
+                        <a:effectLst/>
+                        <a:latin typeface="Gill Sans MT" panose="020B0502020104020203" pitchFamily="34" charset="0"/>
+                        <a:ea typeface="MS Mincho" panose="02020609040205080304" pitchFamily="49" charset="-128"/>
+                        <a:cs typeface="Times New Roman" panose="02020603050405020304" pitchFamily="18" charset="0"/>
+                      </a:endParaRPr>
+                    </a:p>
+                  </a:txBody>
+                  <a:tcPr marL="68580" marR="68580" marT="0" marB="0"/>
+                </a:tc>
+                <a:tc>
+                  <a:txBody>
+                    <a:bodyPr/>
+                    <a:lstStyle/>
+                    <a:p>
+                      <a:pPr algn="ctr">
+                        <a:lnSpc>
+                          <a:spcPct val="115000"/>
+                        </a:lnSpc>
+                        <a:spcAft>
+                          <a:spcPts val="1000"/>
+                        </a:spcAft>
+                      </a:pPr>
+                      <a:r>
+                        <a:rPr lang="en-US" sz="1600" dirty="0">
+                          <a:effectLst/>
+                          <a:latin typeface="Gill Sans MT" panose="020B0502020104020203" pitchFamily="34" charset="0"/>
+                          <a:ea typeface="MS Mincho" panose="02020609040205080304" pitchFamily="49" charset="-128"/>
+                          <a:cs typeface="Times New Roman" panose="02020603050405020304" pitchFamily="18" charset="0"/>
+                        </a:rPr>
+                        <a:t>0.0649011</a:t>
+                      </a:r>
+                      <a:endParaRPr lang="fr-FR" sz="1600" dirty="0">
+                        <a:effectLst/>
+                        <a:latin typeface="Gill Sans MT" panose="020B0502020104020203" pitchFamily="34" charset="0"/>
+                        <a:ea typeface="MS Mincho" panose="02020609040205080304" pitchFamily="49" charset="-128"/>
+                        <a:cs typeface="Times New Roman" panose="02020603050405020304" pitchFamily="18" charset="0"/>
+                      </a:endParaRPr>
+                    </a:p>
+                  </a:txBody>
+                  <a:tcPr marL="68580" marR="68580" marT="0" marB="0"/>
+                </a:tc>
+                <a:extLst>
+                  <a:ext uri="{0D108BD9-81ED-4DB2-BD59-A6C34878D82A}">
+                    <a16:rowId xmlns:a16="http://schemas.microsoft.com/office/drawing/2014/main" val="1134171893"/>
+                  </a:ext>
+                </a:extLst>
+              </a:tr>
+              <a:tr h="313486">
+                <a:tc>
+                  <a:txBody>
+                    <a:bodyPr/>
+                    <a:lstStyle/>
+                    <a:p>
+                      <a:pPr>
+                        <a:lnSpc>
+                          <a:spcPct val="115000"/>
+                        </a:lnSpc>
+                        <a:spcAft>
+                          <a:spcPts val="1000"/>
+                        </a:spcAft>
+                      </a:pPr>
+                      <a:r>
+                        <a:rPr lang="en-US" sz="1600">
+                          <a:effectLst/>
+                          <a:latin typeface="Gill Sans MT" panose="020B0502020104020203" pitchFamily="34" charset="0"/>
+                          <a:ea typeface="MS Mincho" panose="02020609040205080304" pitchFamily="49" charset="-128"/>
+                          <a:cs typeface="Times New Roman" panose="02020603050405020304" pitchFamily="18" charset="0"/>
+                        </a:rPr>
+                        <a:t>lag.pct_ouvriers</a:t>
+                      </a:r>
+                      <a:endParaRPr lang="fr-FR" sz="1600">
+                        <a:effectLst/>
+                        <a:latin typeface="Gill Sans MT" panose="020B0502020104020203" pitchFamily="34" charset="0"/>
+                        <a:ea typeface="MS Mincho" panose="02020609040205080304" pitchFamily="49" charset="-128"/>
+                        <a:cs typeface="Times New Roman" panose="02020603050405020304" pitchFamily="18" charset="0"/>
+                      </a:endParaRPr>
+                    </a:p>
+                  </a:txBody>
+                  <a:tcPr marL="68580" marR="68580" marT="0" marB="0"/>
+                </a:tc>
+                <a:tc>
+                  <a:txBody>
+                    <a:bodyPr/>
+                    <a:lstStyle/>
+                    <a:p>
+                      <a:pPr algn="ctr">
+                        <a:lnSpc>
+                          <a:spcPct val="115000"/>
+                        </a:lnSpc>
+                        <a:spcAft>
+                          <a:spcPts val="1000"/>
+                        </a:spcAft>
+                      </a:pPr>
+                      <a:r>
+                        <a:rPr lang="en-US" sz="1600">
+                          <a:effectLst/>
+                          <a:latin typeface="Gill Sans MT" panose="020B0502020104020203" pitchFamily="34" charset="0"/>
+                          <a:ea typeface="MS Mincho" panose="02020609040205080304" pitchFamily="49" charset="-128"/>
+                          <a:cs typeface="Times New Roman" panose="02020603050405020304" pitchFamily="18" charset="0"/>
+                        </a:rPr>
+                        <a:t>0.0320869</a:t>
+                      </a:r>
+                      <a:endParaRPr lang="fr-FR" sz="1600">
+                        <a:effectLst/>
+                        <a:latin typeface="Gill Sans MT" panose="020B0502020104020203" pitchFamily="34" charset="0"/>
+                        <a:ea typeface="MS Mincho" panose="02020609040205080304" pitchFamily="49" charset="-128"/>
+                        <a:cs typeface="Times New Roman" panose="02020603050405020304" pitchFamily="18" charset="0"/>
+                      </a:endParaRPr>
+                    </a:p>
+                  </a:txBody>
+                  <a:tcPr marL="68580" marR="68580" marT="0" marB="0"/>
+                </a:tc>
+                <a:tc>
+                  <a:txBody>
+                    <a:bodyPr/>
+                    <a:lstStyle/>
+                    <a:p>
+                      <a:pPr algn="ctr">
+                        <a:lnSpc>
+                          <a:spcPct val="115000"/>
+                        </a:lnSpc>
+                        <a:spcAft>
+                          <a:spcPts val="1000"/>
+                        </a:spcAft>
+                      </a:pPr>
+                      <a:r>
+                        <a:rPr lang="en-US" sz="1600">
+                          <a:effectLst/>
+                          <a:latin typeface="Gill Sans MT" panose="020B0502020104020203" pitchFamily="34" charset="0"/>
+                          <a:ea typeface="MS Mincho" panose="02020609040205080304" pitchFamily="49" charset="-128"/>
+                          <a:cs typeface="Times New Roman" panose="02020603050405020304" pitchFamily="18" charset="0"/>
+                        </a:rPr>
+                        <a:t>0.0089915</a:t>
+                      </a:r>
+                      <a:endParaRPr lang="fr-FR" sz="1600">
+                        <a:effectLst/>
+                        <a:latin typeface="Gill Sans MT" panose="020B0502020104020203" pitchFamily="34" charset="0"/>
+                        <a:ea typeface="MS Mincho" panose="02020609040205080304" pitchFamily="49" charset="-128"/>
+                        <a:cs typeface="Times New Roman" panose="02020603050405020304" pitchFamily="18" charset="0"/>
+                      </a:endParaRPr>
+                    </a:p>
+                  </a:txBody>
+                  <a:tcPr marL="68580" marR="68580" marT="0" marB="0"/>
+                </a:tc>
+                <a:tc>
+                  <a:txBody>
+                    <a:bodyPr/>
+                    <a:lstStyle/>
+                    <a:p>
+                      <a:pPr algn="ctr">
+                        <a:lnSpc>
+                          <a:spcPct val="115000"/>
+                        </a:lnSpc>
+                        <a:spcAft>
+                          <a:spcPts val="1000"/>
+                        </a:spcAft>
+                      </a:pPr>
+                      <a:r>
+                        <a:rPr lang="en-US" sz="1600">
+                          <a:effectLst/>
+                          <a:latin typeface="Gill Sans MT" panose="020B0502020104020203" pitchFamily="34" charset="0"/>
+                          <a:ea typeface="MS Mincho" panose="02020609040205080304" pitchFamily="49" charset="-128"/>
+                          <a:cs typeface="Times New Roman" panose="02020603050405020304" pitchFamily="18" charset="0"/>
+                        </a:rPr>
+                        <a:t>3.568581</a:t>
+                      </a:r>
+                      <a:endParaRPr lang="fr-FR" sz="1600">
+                        <a:effectLst/>
+                        <a:latin typeface="Gill Sans MT" panose="020B0502020104020203" pitchFamily="34" charset="0"/>
+                        <a:ea typeface="MS Mincho" panose="02020609040205080304" pitchFamily="49" charset="-128"/>
+                        <a:cs typeface="Times New Roman" panose="02020603050405020304" pitchFamily="18" charset="0"/>
+                      </a:endParaRPr>
+                    </a:p>
+                  </a:txBody>
+                  <a:tcPr marL="68580" marR="68580" marT="0" marB="0"/>
+                </a:tc>
+                <a:tc>
+                  <a:txBody>
+                    <a:bodyPr/>
+                    <a:lstStyle/>
+                    <a:p>
+                      <a:pPr algn="ctr">
+                        <a:lnSpc>
+                          <a:spcPct val="115000"/>
+                        </a:lnSpc>
+                        <a:spcAft>
+                          <a:spcPts val="1000"/>
+                        </a:spcAft>
+                      </a:pPr>
+                      <a:r>
+                        <a:rPr lang="en-US" sz="1600" dirty="0">
+                          <a:effectLst/>
+                          <a:latin typeface="Gill Sans MT" panose="020B0502020104020203" pitchFamily="34" charset="0"/>
+                          <a:ea typeface="MS Mincho" panose="02020609040205080304" pitchFamily="49" charset="-128"/>
+                          <a:cs typeface="Times New Roman" panose="02020603050405020304" pitchFamily="18" charset="0"/>
+                        </a:rPr>
+                        <a:t>0.0003589</a:t>
+                      </a:r>
+                      <a:endParaRPr lang="fr-FR" sz="1600" dirty="0">
+                        <a:effectLst/>
+                        <a:latin typeface="Gill Sans MT" panose="020B0502020104020203" pitchFamily="34" charset="0"/>
+                        <a:ea typeface="MS Mincho" panose="02020609040205080304" pitchFamily="49" charset="-128"/>
+                        <a:cs typeface="Times New Roman" panose="02020603050405020304" pitchFamily="18" charset="0"/>
+                      </a:endParaRPr>
+                    </a:p>
+                  </a:txBody>
+                  <a:tcPr marL="68580" marR="68580" marT="0" marB="0"/>
+                </a:tc>
+                <a:extLst>
+                  <a:ext uri="{0D108BD9-81ED-4DB2-BD59-A6C34878D82A}">
+                    <a16:rowId xmlns:a16="http://schemas.microsoft.com/office/drawing/2014/main" val="2855278930"/>
+                  </a:ext>
+                </a:extLst>
+              </a:tr>
+              <a:tr h="313486">
+                <a:tc>
+                  <a:txBody>
+                    <a:bodyPr/>
+                    <a:lstStyle/>
+                    <a:p>
+                      <a:pPr>
+                        <a:lnSpc>
+                          <a:spcPct val="115000"/>
+                        </a:lnSpc>
+                        <a:spcAft>
+                          <a:spcPts val="1000"/>
+                        </a:spcAft>
+                      </a:pPr>
+                      <a:r>
+                        <a:rPr lang="en-US" sz="1600">
+                          <a:effectLst/>
+                          <a:latin typeface="Gill Sans MT" panose="020B0502020104020203" pitchFamily="34" charset="0"/>
+                          <a:ea typeface="MS Mincho" panose="02020609040205080304" pitchFamily="49" charset="-128"/>
+                          <a:cs typeface="Times New Roman" panose="02020603050405020304" pitchFamily="18" charset="0"/>
+                        </a:rPr>
+                        <a:t>lag.pct_sans_emploi</a:t>
+                      </a:r>
+                      <a:endParaRPr lang="fr-FR" sz="1600">
+                        <a:effectLst/>
+                        <a:latin typeface="Gill Sans MT" panose="020B0502020104020203" pitchFamily="34" charset="0"/>
+                        <a:ea typeface="MS Mincho" panose="02020609040205080304" pitchFamily="49" charset="-128"/>
+                        <a:cs typeface="Times New Roman" panose="02020603050405020304" pitchFamily="18" charset="0"/>
+                      </a:endParaRPr>
+                    </a:p>
+                  </a:txBody>
+                  <a:tcPr marL="68580" marR="68580" marT="0" marB="0"/>
+                </a:tc>
+                <a:tc>
+                  <a:txBody>
+                    <a:bodyPr/>
+                    <a:lstStyle/>
+                    <a:p>
+                      <a:pPr algn="ctr">
+                        <a:lnSpc>
+                          <a:spcPct val="115000"/>
+                        </a:lnSpc>
+                        <a:spcAft>
+                          <a:spcPts val="1000"/>
+                        </a:spcAft>
+                      </a:pPr>
+                      <a:r>
+                        <a:rPr lang="en-US" sz="1600">
+                          <a:effectLst/>
+                          <a:latin typeface="Gill Sans MT" panose="020B0502020104020203" pitchFamily="34" charset="0"/>
+                          <a:ea typeface="MS Mincho" panose="02020609040205080304" pitchFamily="49" charset="-128"/>
+                          <a:cs typeface="Times New Roman" panose="02020603050405020304" pitchFamily="18" charset="0"/>
+                        </a:rPr>
+                        <a:t>0.0551488</a:t>
+                      </a:r>
+                      <a:endParaRPr lang="fr-FR" sz="1600">
+                        <a:effectLst/>
+                        <a:latin typeface="Gill Sans MT" panose="020B0502020104020203" pitchFamily="34" charset="0"/>
+                        <a:ea typeface="MS Mincho" panose="02020609040205080304" pitchFamily="49" charset="-128"/>
+                        <a:cs typeface="Times New Roman" panose="02020603050405020304" pitchFamily="18" charset="0"/>
+                      </a:endParaRPr>
+                    </a:p>
+                  </a:txBody>
+                  <a:tcPr marL="68580" marR="68580" marT="0" marB="0"/>
+                </a:tc>
+                <a:tc>
+                  <a:txBody>
+                    <a:bodyPr/>
+                    <a:lstStyle/>
+                    <a:p>
+                      <a:pPr algn="ctr">
+                        <a:lnSpc>
+                          <a:spcPct val="115000"/>
+                        </a:lnSpc>
+                        <a:spcAft>
+                          <a:spcPts val="1000"/>
+                        </a:spcAft>
+                      </a:pPr>
+                      <a:r>
+                        <a:rPr lang="en-US" sz="1600">
+                          <a:effectLst/>
+                          <a:latin typeface="Gill Sans MT" panose="020B0502020104020203" pitchFamily="34" charset="0"/>
+                          <a:ea typeface="MS Mincho" panose="02020609040205080304" pitchFamily="49" charset="-128"/>
+                          <a:cs typeface="Times New Roman" panose="02020603050405020304" pitchFamily="18" charset="0"/>
+                        </a:rPr>
+                        <a:t>0.0051154</a:t>
+                      </a:r>
+                      <a:endParaRPr lang="fr-FR" sz="1600">
+                        <a:effectLst/>
+                        <a:latin typeface="Gill Sans MT" panose="020B0502020104020203" pitchFamily="34" charset="0"/>
+                        <a:ea typeface="MS Mincho" panose="02020609040205080304" pitchFamily="49" charset="-128"/>
+                        <a:cs typeface="Times New Roman" panose="02020603050405020304" pitchFamily="18" charset="0"/>
+                      </a:endParaRPr>
+                    </a:p>
+                  </a:txBody>
+                  <a:tcPr marL="68580" marR="68580" marT="0" marB="0"/>
+                </a:tc>
+                <a:tc>
+                  <a:txBody>
+                    <a:bodyPr/>
+                    <a:lstStyle/>
+                    <a:p>
+                      <a:pPr algn="ctr">
+                        <a:lnSpc>
+                          <a:spcPct val="115000"/>
+                        </a:lnSpc>
+                        <a:spcAft>
+                          <a:spcPts val="1000"/>
+                        </a:spcAft>
+                      </a:pPr>
+                      <a:r>
+                        <a:rPr lang="en-US" sz="1600">
+                          <a:effectLst/>
+                          <a:latin typeface="Gill Sans MT" panose="020B0502020104020203" pitchFamily="34" charset="0"/>
+                          <a:ea typeface="MS Mincho" panose="02020609040205080304" pitchFamily="49" charset="-128"/>
+                          <a:cs typeface="Times New Roman" panose="02020603050405020304" pitchFamily="18" charset="0"/>
+                        </a:rPr>
+                        <a:t>10.78092</a:t>
+                      </a:r>
+                      <a:endParaRPr lang="fr-FR" sz="1600">
+                        <a:effectLst/>
+                        <a:latin typeface="Gill Sans MT" panose="020B0502020104020203" pitchFamily="34" charset="0"/>
+                        <a:ea typeface="MS Mincho" panose="02020609040205080304" pitchFamily="49" charset="-128"/>
+                        <a:cs typeface="Times New Roman" panose="02020603050405020304" pitchFamily="18" charset="0"/>
+                      </a:endParaRPr>
+                    </a:p>
+                  </a:txBody>
+                  <a:tcPr marL="68580" marR="68580" marT="0" marB="0"/>
+                </a:tc>
+                <a:tc>
+                  <a:txBody>
+                    <a:bodyPr/>
+                    <a:lstStyle/>
+                    <a:p>
+                      <a:pPr algn="ctr">
+                        <a:lnSpc>
+                          <a:spcPct val="115000"/>
+                        </a:lnSpc>
+                        <a:spcAft>
+                          <a:spcPts val="1000"/>
+                        </a:spcAft>
+                      </a:pPr>
+                      <a:r>
+                        <a:rPr lang="en-US" sz="1600" dirty="0">
+                          <a:effectLst/>
+                          <a:latin typeface="Gill Sans MT" panose="020B0502020104020203" pitchFamily="34" charset="0"/>
+                          <a:ea typeface="MS Mincho" panose="02020609040205080304" pitchFamily="49" charset="-128"/>
+                          <a:cs typeface="Times New Roman" panose="02020603050405020304" pitchFamily="18" charset="0"/>
+                        </a:rPr>
+                        <a:t>&lt; 2.2e-16</a:t>
+                      </a:r>
+                      <a:endParaRPr lang="fr-FR" sz="1600" dirty="0">
+                        <a:effectLst/>
+                        <a:latin typeface="Gill Sans MT" panose="020B0502020104020203" pitchFamily="34" charset="0"/>
+                        <a:ea typeface="MS Mincho" panose="02020609040205080304" pitchFamily="49" charset="-128"/>
+                        <a:cs typeface="Times New Roman" panose="02020603050405020304" pitchFamily="18" charset="0"/>
+                      </a:endParaRPr>
+                    </a:p>
+                  </a:txBody>
+                  <a:tcPr marL="68580" marR="68580" marT="0" marB="0"/>
+                </a:tc>
+                <a:extLst>
+                  <a:ext uri="{0D108BD9-81ED-4DB2-BD59-A6C34878D82A}">
+                    <a16:rowId xmlns:a16="http://schemas.microsoft.com/office/drawing/2014/main" val="78230506"/>
+                  </a:ext>
+                </a:extLst>
+              </a:tr>
+              <a:tr h="313486">
+                <a:tc>
+                  <a:txBody>
+                    <a:bodyPr/>
+                    <a:lstStyle/>
+                    <a:p>
+                      <a:pPr>
+                        <a:lnSpc>
+                          <a:spcPct val="115000"/>
+                        </a:lnSpc>
+                        <a:spcAft>
+                          <a:spcPts val="1000"/>
+                        </a:spcAft>
+                      </a:pPr>
+                      <a:r>
+                        <a:rPr lang="en-US" sz="1600">
+                          <a:effectLst/>
+                          <a:latin typeface="Gill Sans MT" panose="020B0502020104020203" pitchFamily="34" charset="0"/>
+                          <a:ea typeface="MS Mincho" panose="02020609040205080304" pitchFamily="49" charset="-128"/>
+                          <a:cs typeface="Times New Roman" panose="02020603050405020304" pitchFamily="18" charset="0"/>
+                        </a:rPr>
+                        <a:t>lag.pct_fam_3_enfants_plus</a:t>
+                      </a:r>
+                      <a:endParaRPr lang="fr-FR" sz="1600">
+                        <a:effectLst/>
+                        <a:latin typeface="Gill Sans MT" panose="020B0502020104020203" pitchFamily="34" charset="0"/>
+                        <a:ea typeface="MS Mincho" panose="02020609040205080304" pitchFamily="49" charset="-128"/>
+                        <a:cs typeface="Times New Roman" panose="02020603050405020304" pitchFamily="18" charset="0"/>
+                      </a:endParaRPr>
+                    </a:p>
+                  </a:txBody>
+                  <a:tcPr marL="68580" marR="68580" marT="0" marB="0"/>
+                </a:tc>
+                <a:tc>
+                  <a:txBody>
+                    <a:bodyPr/>
+                    <a:lstStyle/>
+                    <a:p>
+                      <a:pPr algn="ctr">
+                        <a:lnSpc>
+                          <a:spcPct val="115000"/>
+                        </a:lnSpc>
+                        <a:spcAft>
+                          <a:spcPts val="1000"/>
+                        </a:spcAft>
+                      </a:pPr>
+                      <a:r>
+                        <a:rPr lang="en-US" sz="1600">
+                          <a:effectLst/>
+                          <a:latin typeface="Gill Sans MT" panose="020B0502020104020203" pitchFamily="34" charset="0"/>
+                          <a:ea typeface="MS Mincho" panose="02020609040205080304" pitchFamily="49" charset="-128"/>
+                          <a:cs typeface="Times New Roman" panose="02020603050405020304" pitchFamily="18" charset="0"/>
+                        </a:rPr>
+                        <a:t>-0.103986</a:t>
+                      </a:r>
+                      <a:endParaRPr lang="fr-FR" sz="1600">
+                        <a:effectLst/>
+                        <a:latin typeface="Gill Sans MT" panose="020B0502020104020203" pitchFamily="34" charset="0"/>
+                        <a:ea typeface="MS Mincho" panose="02020609040205080304" pitchFamily="49" charset="-128"/>
+                        <a:cs typeface="Times New Roman" panose="02020603050405020304" pitchFamily="18" charset="0"/>
+                      </a:endParaRPr>
+                    </a:p>
+                  </a:txBody>
+                  <a:tcPr marL="68580" marR="68580" marT="0" marB="0"/>
+                </a:tc>
+                <a:tc>
+                  <a:txBody>
+                    <a:bodyPr/>
+                    <a:lstStyle/>
+                    <a:p>
+                      <a:pPr algn="ctr">
+                        <a:lnSpc>
+                          <a:spcPct val="115000"/>
+                        </a:lnSpc>
+                        <a:spcAft>
+                          <a:spcPts val="1000"/>
+                        </a:spcAft>
+                      </a:pPr>
+                      <a:r>
+                        <a:rPr lang="en-US" sz="1600">
+                          <a:effectLst/>
+                          <a:latin typeface="Gill Sans MT" panose="020B0502020104020203" pitchFamily="34" charset="0"/>
+                          <a:ea typeface="MS Mincho" panose="02020609040205080304" pitchFamily="49" charset="-128"/>
+                          <a:cs typeface="Times New Roman" panose="02020603050405020304" pitchFamily="18" charset="0"/>
+                        </a:rPr>
+                        <a:t>0.0184588</a:t>
+                      </a:r>
+                      <a:endParaRPr lang="fr-FR" sz="1600">
+                        <a:effectLst/>
+                        <a:latin typeface="Gill Sans MT" panose="020B0502020104020203" pitchFamily="34" charset="0"/>
+                        <a:ea typeface="MS Mincho" panose="02020609040205080304" pitchFamily="49" charset="-128"/>
+                        <a:cs typeface="Times New Roman" panose="02020603050405020304" pitchFamily="18" charset="0"/>
+                      </a:endParaRPr>
+                    </a:p>
+                  </a:txBody>
+                  <a:tcPr marL="68580" marR="68580" marT="0" marB="0"/>
+                </a:tc>
+                <a:tc>
+                  <a:txBody>
+                    <a:bodyPr/>
+                    <a:lstStyle/>
+                    <a:p>
+                      <a:pPr algn="ctr">
+                        <a:lnSpc>
+                          <a:spcPct val="115000"/>
+                        </a:lnSpc>
+                        <a:spcAft>
+                          <a:spcPts val="1000"/>
+                        </a:spcAft>
+                      </a:pPr>
+                      <a:r>
+                        <a:rPr lang="en-US" sz="1600">
+                          <a:effectLst/>
+                          <a:latin typeface="Gill Sans MT" panose="020B0502020104020203" pitchFamily="34" charset="0"/>
+                          <a:ea typeface="MS Mincho" panose="02020609040205080304" pitchFamily="49" charset="-128"/>
+                          <a:cs typeface="Times New Roman" panose="02020603050405020304" pitchFamily="18" charset="0"/>
+                        </a:rPr>
+                        <a:t>-5.633394</a:t>
+                      </a:r>
+                      <a:endParaRPr lang="fr-FR" sz="1600">
+                        <a:effectLst/>
+                        <a:latin typeface="Gill Sans MT" panose="020B0502020104020203" pitchFamily="34" charset="0"/>
+                        <a:ea typeface="MS Mincho" panose="02020609040205080304" pitchFamily="49" charset="-128"/>
+                        <a:cs typeface="Times New Roman" panose="02020603050405020304" pitchFamily="18" charset="0"/>
+                      </a:endParaRPr>
+                    </a:p>
+                  </a:txBody>
+                  <a:tcPr marL="68580" marR="68580" marT="0" marB="0"/>
+                </a:tc>
+                <a:tc>
+                  <a:txBody>
+                    <a:bodyPr/>
+                    <a:lstStyle/>
+                    <a:p>
+                      <a:pPr algn="ctr">
+                        <a:lnSpc>
+                          <a:spcPct val="115000"/>
+                        </a:lnSpc>
+                        <a:spcAft>
+                          <a:spcPts val="1000"/>
+                        </a:spcAft>
+                      </a:pPr>
+                      <a:r>
+                        <a:rPr lang="en-US" sz="1600" dirty="0">
+                          <a:effectLst/>
+                          <a:latin typeface="Gill Sans MT" panose="020B0502020104020203" pitchFamily="34" charset="0"/>
+                          <a:ea typeface="MS Mincho" panose="02020609040205080304" pitchFamily="49" charset="-128"/>
+                          <a:cs typeface="Times New Roman" panose="02020603050405020304" pitchFamily="18" charset="0"/>
+                        </a:rPr>
+                        <a:t>1.767e-08</a:t>
+                      </a:r>
+                      <a:endParaRPr lang="fr-FR" sz="1600" dirty="0">
+                        <a:effectLst/>
+                        <a:latin typeface="Gill Sans MT" panose="020B0502020104020203" pitchFamily="34" charset="0"/>
+                        <a:ea typeface="MS Mincho" panose="02020609040205080304" pitchFamily="49" charset="-128"/>
+                        <a:cs typeface="Times New Roman" panose="02020603050405020304" pitchFamily="18" charset="0"/>
+                      </a:endParaRPr>
+                    </a:p>
+                  </a:txBody>
+                  <a:tcPr marL="68580" marR="68580" marT="0" marB="0"/>
+                </a:tc>
+                <a:extLst>
+                  <a:ext uri="{0D108BD9-81ED-4DB2-BD59-A6C34878D82A}">
+                    <a16:rowId xmlns:a16="http://schemas.microsoft.com/office/drawing/2014/main" val="4195292262"/>
+                  </a:ext>
+                </a:extLst>
+              </a:tr>
+              <a:tr h="313486">
+                <a:tc>
+                  <a:txBody>
+                    <a:bodyPr/>
+                    <a:lstStyle/>
+                    <a:p>
+                      <a:pPr>
+                        <a:lnSpc>
+                          <a:spcPct val="115000"/>
+                        </a:lnSpc>
+                        <a:spcAft>
+                          <a:spcPts val="1000"/>
+                        </a:spcAft>
+                      </a:pPr>
+                      <a:r>
+                        <a:rPr lang="en-US" sz="1600" dirty="0" err="1">
+                          <a:effectLst/>
+                          <a:latin typeface="Gill Sans MT" panose="020B0502020104020203" pitchFamily="34" charset="0"/>
+                          <a:ea typeface="MS Mincho" panose="02020609040205080304" pitchFamily="49" charset="-128"/>
+                          <a:cs typeface="Times New Roman" panose="02020603050405020304" pitchFamily="18" charset="0"/>
+                        </a:rPr>
+                        <a:t>lag.taux_de_natalite_annuel_moyen</a:t>
+                      </a:r>
+                      <a:endParaRPr lang="fr-FR" sz="1600" dirty="0">
+                        <a:effectLst/>
+                        <a:latin typeface="Gill Sans MT" panose="020B0502020104020203" pitchFamily="34" charset="0"/>
+                        <a:ea typeface="MS Mincho" panose="02020609040205080304" pitchFamily="49" charset="-128"/>
+                        <a:cs typeface="Times New Roman" panose="02020603050405020304" pitchFamily="18" charset="0"/>
+                      </a:endParaRPr>
+                    </a:p>
+                  </a:txBody>
+                  <a:tcPr marL="68580" marR="68580" marT="0" marB="0"/>
+                </a:tc>
+                <a:tc>
+                  <a:txBody>
+                    <a:bodyPr/>
+                    <a:lstStyle/>
+                    <a:p>
+                      <a:pPr algn="ctr">
+                        <a:lnSpc>
+                          <a:spcPct val="115000"/>
+                        </a:lnSpc>
+                        <a:spcAft>
+                          <a:spcPts val="1000"/>
+                        </a:spcAft>
+                      </a:pPr>
+                      <a:r>
+                        <a:rPr lang="en-US" sz="1600">
+                          <a:effectLst/>
+                          <a:latin typeface="Gill Sans MT" panose="020B0502020104020203" pitchFamily="34" charset="0"/>
+                          <a:ea typeface="MS Mincho" panose="02020609040205080304" pitchFamily="49" charset="-128"/>
+                          <a:cs typeface="Times New Roman" panose="02020603050405020304" pitchFamily="18" charset="0"/>
+                        </a:rPr>
+                        <a:t>-0.1117246</a:t>
+                      </a:r>
+                      <a:endParaRPr lang="fr-FR" sz="1600">
+                        <a:effectLst/>
+                        <a:latin typeface="Gill Sans MT" panose="020B0502020104020203" pitchFamily="34" charset="0"/>
+                        <a:ea typeface="MS Mincho" panose="02020609040205080304" pitchFamily="49" charset="-128"/>
+                        <a:cs typeface="Times New Roman" panose="02020603050405020304" pitchFamily="18" charset="0"/>
+                      </a:endParaRPr>
+                    </a:p>
+                  </a:txBody>
+                  <a:tcPr marL="68580" marR="68580" marT="0" marB="0"/>
+                </a:tc>
+                <a:tc>
+                  <a:txBody>
+                    <a:bodyPr/>
+                    <a:lstStyle/>
+                    <a:p>
+                      <a:pPr algn="ctr">
+                        <a:lnSpc>
+                          <a:spcPct val="115000"/>
+                        </a:lnSpc>
+                        <a:spcAft>
+                          <a:spcPts val="1000"/>
+                        </a:spcAft>
+                      </a:pPr>
+                      <a:r>
+                        <a:rPr lang="en-US" sz="1600">
+                          <a:effectLst/>
+                          <a:latin typeface="Gill Sans MT" panose="020B0502020104020203" pitchFamily="34" charset="0"/>
+                          <a:ea typeface="MS Mincho" panose="02020609040205080304" pitchFamily="49" charset="-128"/>
+                          <a:cs typeface="Times New Roman" panose="02020603050405020304" pitchFamily="18" charset="0"/>
+                        </a:rPr>
+                        <a:t>0.0295648</a:t>
+                      </a:r>
+                      <a:endParaRPr lang="fr-FR" sz="1600">
+                        <a:effectLst/>
+                        <a:latin typeface="Gill Sans MT" panose="020B0502020104020203" pitchFamily="34" charset="0"/>
+                        <a:ea typeface="MS Mincho" panose="02020609040205080304" pitchFamily="49" charset="-128"/>
+                        <a:cs typeface="Times New Roman" panose="02020603050405020304" pitchFamily="18" charset="0"/>
+                      </a:endParaRPr>
+                    </a:p>
+                  </a:txBody>
+                  <a:tcPr marL="68580" marR="68580" marT="0" marB="0"/>
+                </a:tc>
+                <a:tc>
+                  <a:txBody>
+                    <a:bodyPr/>
+                    <a:lstStyle/>
+                    <a:p>
+                      <a:pPr algn="ctr">
+                        <a:lnSpc>
+                          <a:spcPct val="115000"/>
+                        </a:lnSpc>
+                        <a:spcAft>
+                          <a:spcPts val="1000"/>
+                        </a:spcAft>
+                      </a:pPr>
+                      <a:r>
+                        <a:rPr lang="en-US" sz="1600">
+                          <a:effectLst/>
+                          <a:latin typeface="Gill Sans MT" panose="020B0502020104020203" pitchFamily="34" charset="0"/>
+                          <a:ea typeface="MS Mincho" panose="02020609040205080304" pitchFamily="49" charset="-128"/>
+                          <a:cs typeface="Times New Roman" panose="02020603050405020304" pitchFamily="18" charset="0"/>
+                        </a:rPr>
+                        <a:t>-3.77898</a:t>
+                      </a:r>
+                      <a:endParaRPr lang="fr-FR" sz="1600">
+                        <a:effectLst/>
+                        <a:latin typeface="Gill Sans MT" panose="020B0502020104020203" pitchFamily="34" charset="0"/>
+                        <a:ea typeface="MS Mincho" panose="02020609040205080304" pitchFamily="49" charset="-128"/>
+                        <a:cs typeface="Times New Roman" panose="02020603050405020304" pitchFamily="18" charset="0"/>
+                      </a:endParaRPr>
+                    </a:p>
+                  </a:txBody>
+                  <a:tcPr marL="68580" marR="68580" marT="0" marB="0"/>
+                </a:tc>
+                <a:tc>
+                  <a:txBody>
+                    <a:bodyPr/>
+                    <a:lstStyle/>
+                    <a:p>
+                      <a:pPr algn="ctr">
+                        <a:lnSpc>
+                          <a:spcPct val="115000"/>
+                        </a:lnSpc>
+                        <a:spcAft>
+                          <a:spcPts val="1000"/>
+                        </a:spcAft>
+                      </a:pPr>
+                      <a:r>
+                        <a:rPr lang="en-US" sz="1600" dirty="0">
+                          <a:effectLst/>
+                          <a:latin typeface="Gill Sans MT" panose="020B0502020104020203" pitchFamily="34" charset="0"/>
+                          <a:ea typeface="MS Mincho" panose="02020609040205080304" pitchFamily="49" charset="-128"/>
+                          <a:cs typeface="Times New Roman" panose="02020603050405020304" pitchFamily="18" charset="0"/>
+                        </a:rPr>
+                        <a:t>0.0001575</a:t>
+                      </a:r>
+                      <a:endParaRPr lang="fr-FR" sz="1600" dirty="0">
+                        <a:effectLst/>
+                        <a:latin typeface="Gill Sans MT" panose="020B0502020104020203" pitchFamily="34" charset="0"/>
+                        <a:ea typeface="MS Mincho" panose="02020609040205080304" pitchFamily="49" charset="-128"/>
+                        <a:cs typeface="Times New Roman" panose="02020603050405020304" pitchFamily="18" charset="0"/>
+                      </a:endParaRPr>
+                    </a:p>
+                  </a:txBody>
+                  <a:tcPr marL="68580" marR="68580" marT="0" marB="0"/>
+                </a:tc>
+                <a:extLst>
+                  <a:ext uri="{0D108BD9-81ED-4DB2-BD59-A6C34878D82A}">
+                    <a16:rowId xmlns:a16="http://schemas.microsoft.com/office/drawing/2014/main" val="3119279071"/>
+                  </a:ext>
+                </a:extLst>
+              </a:tr>
+            </a:tbl>
+          </a:graphicData>
+        </a:graphic>
+      </p:graphicFrame>
     </p:spTree>
     <p:extLst>
       <p:ext uri="{BB962C8B-B14F-4D97-AF65-F5344CB8AC3E}">
-        <p14:creationId xmlns:p14="http://schemas.microsoft.com/office/powerpoint/2010/main" val="3452338476"/>
+        <p14:creationId xmlns:p14="http://schemas.microsoft.com/office/powerpoint/2010/main" val="1872024013"/>
       </p:ext>
     </p:extLst>
   </p:cSld>
@@ -14071,7 +18083,7 @@
                 </a:solidFill>
                 <a:latin typeface="Gill Sans MT" panose="020B0502020104020203" pitchFamily="34" charset="0"/>
               </a:rPr>
-              <a:t>4.4. Résultats du modèle final</a:t>
+              <a:t>4.4. Résultats du modèle final(2/2)</a:t>
             </a:r>
           </a:p>
         </p:txBody>
@@ -14109,36 +18121,6 @@
           <a:xfrm>
             <a:off x="11078692" y="266700"/>
             <a:ext cx="1170459" cy="1170459"/>
-          </a:xfrm>
-          <a:prstGeom prst="rect">
-            <a:avLst/>
-          </a:prstGeom>
-        </p:spPr>
-      </p:pic>
-      <p:pic>
-        <p:nvPicPr>
-          <p:cNvPr id="7" name="Image 6">
-            <a:extLst>
-              <a:ext uri="{FF2B5EF4-FFF2-40B4-BE49-F238E27FC236}">
-                <a16:creationId xmlns:a16="http://schemas.microsoft.com/office/drawing/2014/main" id="{85E00EB5-86B6-4B6D-81B2-AB61329BBD07}"/>
-              </a:ext>
-            </a:extLst>
-          </p:cNvPr>
-          <p:cNvPicPr>
-            <a:picLocks noChangeAspect="1"/>
-          </p:cNvPicPr>
-          <p:nvPr/>
-        </p:nvPicPr>
-        <p:blipFill>
-          <a:blip r:embed="rId4"/>
-          <a:stretch>
-            <a:fillRect/>
-          </a:stretch>
-        </p:blipFill>
-        <p:spPr>
-          <a:xfrm>
-            <a:off x="2074958" y="2153004"/>
-            <a:ext cx="7029571" cy="1754576"/>
           </a:xfrm>
           <a:prstGeom prst="rect">
             <a:avLst/>
@@ -14161,7 +18143,7 @@
             </p:nvSpPr>
             <p:spPr>
               <a:xfrm>
-                <a:off x="1170957" y="4238099"/>
+                <a:off x="1136321" y="4574851"/>
                 <a:ext cx="10387321" cy="1200329"/>
               </a:xfrm>
               <a:prstGeom prst="rect">
@@ -14197,7 +18179,7 @@
                   <a:rPr lang="fr-FR" sz="2400" dirty="0">
                     <a:latin typeface="Gill Sans MT" panose="020B0502020104020203" pitchFamily="34" charset="0"/>
                   </a:rPr>
-                  <a:t> du modèle SDM confirme l’existence d’un effet spatial significatif, indiquant une interdépendance dans le taux de consultations entre communes voisines</a:t>
+                  <a:t> estimé du modèle SDM confirme l’existence d’un effet spatial significatif, indiquant une interdépendance dans le taux de consultations entre communes voisines</a:t>
                 </a:r>
               </a:p>
             </p:txBody>
@@ -14220,14 +18202,14 @@
             </p:nvSpPr>
             <p:spPr>
               <a:xfrm>
-                <a:off x="1170957" y="4238099"/>
+                <a:off x="1136321" y="4574851"/>
                 <a:ext cx="10387321" cy="1200329"/>
               </a:xfrm>
               <a:prstGeom prst="rect">
                 <a:avLst/>
               </a:prstGeom>
               <a:blipFill>
-                <a:blip r:embed="rId5"/>
+                <a:blip r:embed="rId4"/>
                 <a:stretch>
                   <a:fillRect l="-880" t="-4061" r="-939" b="-10660"/>
                 </a:stretch>
@@ -14248,10 +18230,253 @@
           </p:sp>
         </mc:Fallback>
       </mc:AlternateContent>
+      <p:graphicFrame>
+        <p:nvGraphicFramePr>
+          <p:cNvPr id="9" name="Tableau 9">
+            <a:extLst>
+              <a:ext uri="{FF2B5EF4-FFF2-40B4-BE49-F238E27FC236}">
+                <a16:creationId xmlns:a16="http://schemas.microsoft.com/office/drawing/2014/main" id="{C2009E60-4C85-4C9F-A07C-82C45C27A2D4}"/>
+              </a:ext>
+            </a:extLst>
+          </p:cNvPr>
+          <p:cNvGraphicFramePr>
+            <a:graphicFrameLocks noGrp="1"/>
+          </p:cNvGraphicFramePr>
+          <p:nvPr/>
+        </p:nvGraphicFramePr>
+        <p:xfrm>
+          <a:off x="3088932" y="2107455"/>
+          <a:ext cx="6014136" cy="2072640"/>
+        </p:xfrm>
+        <a:graphic>
+          <a:graphicData uri="http://schemas.openxmlformats.org/drawingml/2006/table">
+            <a:tbl>
+              <a:tblPr bandRow="1">
+                <a:tableStyleId>{C083E6E3-FA7D-4D7B-A595-EF9225AFEA82}</a:tableStyleId>
+              </a:tblPr>
+              <a:tblGrid>
+                <a:gridCol w="4178409">
+                  <a:extLst>
+                    <a:ext uri="{9D8B030D-6E8A-4147-A177-3AD203B41FA5}">
+                      <a16:colId xmlns:a16="http://schemas.microsoft.com/office/drawing/2014/main" val="3589781340"/>
+                    </a:ext>
+                  </a:extLst>
+                </a:gridCol>
+                <a:gridCol w="1835727">
+                  <a:extLst>
+                    <a:ext uri="{9D8B030D-6E8A-4147-A177-3AD203B41FA5}">
+                      <a16:colId xmlns:a16="http://schemas.microsoft.com/office/drawing/2014/main" val="2502687889"/>
+                    </a:ext>
+                  </a:extLst>
+                </a:gridCol>
+              </a:tblGrid>
+              <a:tr h="370840">
+                <a:tc>
+                  <a:txBody>
+                    <a:bodyPr/>
+                    <a:lstStyle/>
+                    <a:p>
+                      <a:pPr algn="l"/>
+                      <a:r>
+                        <a:rPr lang="fr-FR" sz="2800" dirty="0">
+                          <a:latin typeface="Gill Sans MT" panose="020B0502020104020203" pitchFamily="34" charset="0"/>
+                        </a:rPr>
+                        <a:t>Rho</a:t>
+                      </a:r>
+                    </a:p>
+                  </a:txBody>
+                  <a:tcPr/>
+                </a:tc>
+                <a:tc>
+                  <a:txBody>
+                    <a:bodyPr/>
+                    <a:lstStyle/>
+                    <a:p>
+                      <a:pPr algn="ctr"/>
+                      <a:r>
+                        <a:rPr lang="fr-FR" sz="2800" dirty="0">
+                          <a:latin typeface="Gill Sans MT" panose="020B0502020104020203" pitchFamily="34" charset="0"/>
+                        </a:rPr>
+                        <a:t>0.9947686</a:t>
+                      </a:r>
+                    </a:p>
+                  </a:txBody>
+                  <a:tcPr/>
+                </a:tc>
+                <a:extLst>
+                  <a:ext uri="{0D108BD9-81ED-4DB2-BD59-A6C34878D82A}">
+                    <a16:rowId xmlns:a16="http://schemas.microsoft.com/office/drawing/2014/main" val="2353644177"/>
+                  </a:ext>
+                </a:extLst>
+              </a:tr>
+              <a:tr h="442262">
+                <a:tc>
+                  <a:txBody>
+                    <a:bodyPr/>
+                    <a:lstStyle/>
+                    <a:p>
+                      <a:pPr algn="l"/>
+                      <a:r>
+                        <a:rPr lang="fr-FR" sz="2800" dirty="0">
+                          <a:latin typeface="Gill Sans MT" panose="020B0502020104020203" pitchFamily="34" charset="0"/>
+                        </a:rPr>
+                        <a:t>LR test value</a:t>
+                      </a:r>
+                    </a:p>
+                  </a:txBody>
+                  <a:tcPr/>
+                </a:tc>
+                <a:tc>
+                  <a:txBody>
+                    <a:bodyPr/>
+                    <a:lstStyle/>
+                    <a:p>
+                      <a:pPr algn="ctr"/>
+                      <a:r>
+                        <a:rPr lang="fr-FR" sz="2800" dirty="0">
+                          <a:latin typeface="Gill Sans MT" panose="020B0502020104020203" pitchFamily="34" charset="0"/>
+                        </a:rPr>
+                        <a:t>555.0326</a:t>
+                      </a:r>
+                    </a:p>
+                  </a:txBody>
+                  <a:tcPr/>
+                </a:tc>
+                <a:extLst>
+                  <a:ext uri="{0D108BD9-81ED-4DB2-BD59-A6C34878D82A}">
+                    <a16:rowId xmlns:a16="http://schemas.microsoft.com/office/drawing/2014/main" val="1018985115"/>
+                  </a:ext>
+                </a:extLst>
+              </a:tr>
+              <a:tr h="370840">
+                <a:tc>
+                  <a:txBody>
+                    <a:bodyPr/>
+                    <a:lstStyle/>
+                    <a:p>
+                      <a:pPr algn="l"/>
+                      <a:r>
+                        <a:rPr lang="fr-FR" sz="2800" dirty="0">
+                          <a:latin typeface="Gill Sans MT" panose="020B0502020104020203" pitchFamily="34" charset="0"/>
+                        </a:rPr>
+                        <a:t>p-value</a:t>
+                      </a:r>
+                    </a:p>
+                  </a:txBody>
+                  <a:tcPr/>
+                </a:tc>
+                <a:tc>
+                  <a:txBody>
+                    <a:bodyPr/>
+                    <a:lstStyle/>
+                    <a:p>
+                      <a:pPr marL="0" marR="0" lvl="0" indent="0" algn="ctr" defTabSz="914400" rtl="0" eaLnBrk="1" fontAlgn="auto" latinLnBrk="0" hangingPunct="1">
+                        <a:lnSpc>
+                          <a:spcPct val="100000"/>
+                        </a:lnSpc>
+                        <a:spcBef>
+                          <a:spcPts val="0"/>
+                        </a:spcBef>
+                        <a:spcAft>
+                          <a:spcPts val="0"/>
+                        </a:spcAft>
+                        <a:buClrTx/>
+                        <a:buSzTx/>
+                        <a:buFontTx/>
+                        <a:buNone/>
+                        <a:tabLst/>
+                        <a:defRPr/>
+                      </a:pPr>
+                      <a:r>
+                        <a:rPr lang="fr-FR" sz="2800" dirty="0">
+                          <a:latin typeface="Gill Sans MT" panose="020B0502020104020203" pitchFamily="34" charset="0"/>
+                        </a:rPr>
+                        <a:t>&lt; 2.2e-16</a:t>
+                      </a:r>
+                    </a:p>
+                  </a:txBody>
+                  <a:tcPr/>
+                </a:tc>
+                <a:extLst>
+                  <a:ext uri="{0D108BD9-81ED-4DB2-BD59-A6C34878D82A}">
+                    <a16:rowId xmlns:a16="http://schemas.microsoft.com/office/drawing/2014/main" val="355930459"/>
+                  </a:ext>
+                </a:extLst>
+              </a:tr>
+              <a:tr h="370840">
+                <a:tc>
+                  <a:txBody>
+                    <a:bodyPr/>
+                    <a:lstStyle/>
+                    <a:p>
+                      <a:pPr algn="l"/>
+                      <a:r>
+                        <a:rPr lang="fr-FR" sz="2800" dirty="0" err="1">
+                          <a:latin typeface="Gill Sans MT" panose="020B0502020104020203" pitchFamily="34" charset="0"/>
+                        </a:rPr>
+                        <a:t>Asymptotic</a:t>
+                      </a:r>
+                      <a:r>
+                        <a:rPr lang="fr-FR" sz="2800" dirty="0">
+                          <a:latin typeface="Gill Sans MT" panose="020B0502020104020203" pitchFamily="34" charset="0"/>
+                        </a:rPr>
+                        <a:t> </a:t>
+                      </a:r>
+                      <a:r>
+                        <a:rPr lang="fr-FR" sz="2800" dirty="0" err="1">
+                          <a:latin typeface="Gill Sans MT" panose="020B0502020104020203" pitchFamily="34" charset="0"/>
+                        </a:rPr>
+                        <a:t>stantard</a:t>
+                      </a:r>
+                      <a:r>
+                        <a:rPr lang="fr-FR" sz="2800" dirty="0">
+                          <a:latin typeface="Gill Sans MT" panose="020B0502020104020203" pitchFamily="34" charset="0"/>
+                        </a:rPr>
+                        <a:t> </a:t>
+                      </a:r>
+                      <a:r>
+                        <a:rPr lang="fr-FR" sz="2800" dirty="0" err="1">
+                          <a:latin typeface="Gill Sans MT" panose="020B0502020104020203" pitchFamily="34" charset="0"/>
+                        </a:rPr>
+                        <a:t>error</a:t>
+                      </a:r>
+                      <a:endParaRPr lang="fr-FR" sz="2800" dirty="0">
+                        <a:latin typeface="Gill Sans MT" panose="020B0502020104020203" pitchFamily="34" charset="0"/>
+                      </a:endParaRPr>
+                    </a:p>
+                  </a:txBody>
+                  <a:tcPr/>
+                </a:tc>
+                <a:tc>
+                  <a:txBody>
+                    <a:bodyPr/>
+                    <a:lstStyle/>
+                    <a:p>
+                      <a:pPr algn="ctr"/>
+                      <a:r>
+                        <a:rPr lang="fr-FR" sz="2800" dirty="0">
+                          <a:latin typeface="Gill Sans MT" panose="020B0502020104020203" pitchFamily="34" charset="0"/>
+                        </a:rPr>
+                        <a:t>0.003269</a:t>
+                      </a:r>
+                    </a:p>
+                  </a:txBody>
+                  <a:tcPr/>
+                </a:tc>
+                <a:extLst>
+                  <a:ext uri="{0D108BD9-81ED-4DB2-BD59-A6C34878D82A}">
+                    <a16:rowId xmlns:a16="http://schemas.microsoft.com/office/drawing/2014/main" val="1630266566"/>
+                  </a:ext>
+                </a:extLst>
+              </a:tr>
+            </a:tbl>
+          </a:graphicData>
+        </a:graphic>
+      </p:graphicFrame>
     </p:spTree>
     <p:extLst>
       <p:ext uri="{BB962C8B-B14F-4D97-AF65-F5344CB8AC3E}">
-        <p14:creationId xmlns:p14="http://schemas.microsoft.com/office/powerpoint/2010/main" val="3022964590"/>
+        <p14:creationId xmlns:p14="http://schemas.microsoft.com/office/powerpoint/2010/main" val="2179920171"/>
       </p:ext>
     </p:extLst>
   </p:cSld>
@@ -14592,13 +18817,13 @@
           <p:nvPr/>
         </p:nvPicPr>
         <p:blipFill>
-          <a:blip r:embed="rId2">
+          <a:blip r:embed="rId3">
             <a:extLst>
               <a:ext uri="{28A0092B-C50C-407E-A947-70E740481C1C}">
                 <a14:useLocalDpi xmlns:a14="http://schemas.microsoft.com/office/drawing/2010/main" val="0"/>
               </a:ext>
               <a:ext uri="{96DAC541-7B7A-43D3-8B79-37D633B846F1}">
-                <asvg:svgBlip xmlns:asvg="http://schemas.microsoft.com/office/drawing/2016/SVG/main" r:embed="rId3"/>
+                <asvg:svgBlip xmlns:asvg="http://schemas.microsoft.com/office/drawing/2016/SVG/main" r:embed="rId4"/>
               </a:ext>
             </a:extLst>
           </a:blip>
@@ -14631,7 +18856,7 @@
           <p:nvPr/>
         </p:nvPicPr>
         <p:blipFill>
-          <a:blip r:embed="rId4"/>
+          <a:blip r:embed="rId5"/>
           <a:stretch>
             <a:fillRect/>
           </a:stretch>
@@ -14661,7 +18886,7 @@
           <p:nvPr/>
         </p:nvPicPr>
         <p:blipFill>
-          <a:blip r:embed="rId5"/>
+          <a:blip r:embed="rId6"/>
           <a:stretch>
             <a:fillRect/>
           </a:stretch>
@@ -14676,10 +18901,71 @@
           </a:prstGeom>
         </p:spPr>
       </p:pic>
+      <p:sp>
+        <p:nvSpPr>
+          <p:cNvPr id="5" name="ZoneTexte 4">
+            <a:extLst>
+              <a:ext uri="{FF2B5EF4-FFF2-40B4-BE49-F238E27FC236}">
+                <a16:creationId xmlns:a16="http://schemas.microsoft.com/office/drawing/2014/main" id="{50B9101C-0AE5-4556-A440-A5E8C844FFC8}"/>
+              </a:ext>
+            </a:extLst>
+          </p:cNvPr>
+          <p:cNvSpPr txBox="1"/>
+          <p:nvPr/>
+        </p:nvSpPr>
+        <p:spPr>
+          <a:xfrm>
+            <a:off x="2037652" y="5748889"/>
+            <a:ext cx="8528945" cy="923330"/>
+          </a:xfrm>
+          <a:prstGeom prst="rect">
+            <a:avLst/>
+          </a:prstGeom>
+          <a:noFill/>
+        </p:spPr>
+        <p:txBody>
+          <a:bodyPr wrap="square" rtlCol="0">
+            <a:spAutoFit/>
+          </a:bodyPr>
+          <a:lstStyle/>
+          <a:p>
+            <a:r>
+              <a:rPr lang="fr-FR" dirty="0">
+                <a:latin typeface="Gill Sans MT" panose="020B0502020104020203" pitchFamily="34" charset="0"/>
+              </a:rPr>
+              <a:t>Les taux de consultations observés et prédits présentent structure spatiale globalement similaire. Certaines zones, notamment au </a:t>
+            </a:r>
+            <a:r>
+              <a:rPr lang="fr-FR" b="1" dirty="0">
+                <a:latin typeface="Gill Sans MT" panose="020B0502020104020203" pitchFamily="34" charset="0"/>
+              </a:rPr>
+              <a:t>sud-est</a:t>
+            </a:r>
+            <a:r>
+              <a:rPr lang="fr-FR" dirty="0">
+                <a:latin typeface="Gill Sans MT" panose="020B0502020104020203" pitchFamily="34" charset="0"/>
+              </a:rPr>
+              <a:t> et au </a:t>
+            </a:r>
+            <a:r>
+              <a:rPr lang="fr-FR" b="1" dirty="0">
+                <a:latin typeface="Gill Sans MT" panose="020B0502020104020203" pitchFamily="34" charset="0"/>
+              </a:rPr>
+              <a:t>nord-oues</a:t>
+            </a:r>
+            <a:r>
+              <a:rPr lang="fr-FR" dirty="0">
+                <a:latin typeface="Gill Sans MT" panose="020B0502020104020203" pitchFamily="34" charset="0"/>
+              </a:rPr>
+              <a:t>t, mettent toutefois en évidence des divergences marquées entre les valeurs observées et prédites</a:t>
+            </a:r>
+          </a:p>
+        </p:txBody>
+      </p:sp>
     </p:spTree>
     <p:extLst>
       <p:ext uri="{BB962C8B-B14F-4D97-AF65-F5344CB8AC3E}">
-        <p14:creationId xmlns:p14="http://schemas.microsoft.com/office/powerpoint/2010/main" val="3381023947"/>
+        <p14:creationId xmlns:p14="http://schemas.microsoft.com/office/powerpoint/2010/main" val="951892530"/>
       </p:ext>
     </p:extLst>
   </p:cSld>
@@ -19653,8 +23939,8 @@
           </a:p>
         </p:txBody>
       </p:sp>
-      <mc:AlternateContent xmlns:mc="http://schemas.openxmlformats.org/markup-compatibility/2006">
-        <mc:Choice xmlns:a14="http://schemas.microsoft.com/office/drawing/2010/main" Requires="a14">
+      <mc:AlternateContent xmlns:mc="http://schemas.openxmlformats.org/markup-compatibility/2006" xmlns:a14="http://schemas.microsoft.com/office/drawing/2010/main">
+        <mc:Choice Requires="a14">
           <p:sp>
             <p:nvSpPr>
               <p:cNvPr id="6" name="ZoneTexte 5">
@@ -19816,7 +24102,7 @@
             </p:txBody>
           </p:sp>
         </mc:Choice>
-        <mc:Fallback>
+        <mc:Fallback xmlns="">
           <p:sp>
             <p:nvSpPr>
               <p:cNvPr id="6" name="ZoneTexte 5">
@@ -19861,8 +24147,8 @@
           </p:sp>
         </mc:Fallback>
       </mc:AlternateContent>
-      <mc:AlternateContent xmlns:mc="http://schemas.openxmlformats.org/markup-compatibility/2006">
-        <mc:Choice xmlns:a14="http://schemas.microsoft.com/office/drawing/2010/main" Requires="a14">
+      <mc:AlternateContent xmlns:mc="http://schemas.openxmlformats.org/markup-compatibility/2006" xmlns:a14="http://schemas.microsoft.com/office/drawing/2010/main">
+        <mc:Choice Requires="a14">
           <p:sp>
             <p:nvSpPr>
               <p:cNvPr id="7" name="ZoneTexte 6">
@@ -19924,6 +24210,7 @@
                 </a:endParaRPr>
               </a:p>
               <a:p>
+                <a:pPr/>
                 <a14:m>
                   <m:oMathPara xmlns:m="http://schemas.openxmlformats.org/officeDocument/2006/math">
                     <m:oMathParaPr>
@@ -20325,7 +24612,7 @@
             </p:txBody>
           </p:sp>
         </mc:Choice>
-        <mc:Fallback>
+        <mc:Fallback xmlns="">
           <p:sp>
             <p:nvSpPr>
               <p:cNvPr id="7" name="ZoneTexte 6">

</xml_diff>

<commit_message>
Ajustement des partie de Ali
</commit_message>
<xml_diff>
--- a/Présentation/Soutenance_Groupe25.pptx
+++ b/Présentation/Soutenance_Groupe25.pptx
@@ -25,11 +25,11 @@
     <p:sldId id="265" r:id="rId13"/>
     <p:sldId id="266" r:id="rId14"/>
     <p:sldId id="277" r:id="rId15"/>
-    <p:sldId id="278" r:id="rId16"/>
+    <p:sldId id="312" r:id="rId16"/>
     <p:sldId id="267" r:id="rId17"/>
-    <p:sldId id="301" r:id="rId18"/>
-    <p:sldId id="302" r:id="rId19"/>
-    <p:sldId id="303" r:id="rId20"/>
+    <p:sldId id="313" r:id="rId18"/>
+    <p:sldId id="314" r:id="rId19"/>
+    <p:sldId id="315" r:id="rId20"/>
     <p:sldId id="304" r:id="rId21"/>
     <p:sldId id="269" r:id="rId22"/>
     <p:sldId id="270" r:id="rId23"/>
@@ -37,8 +37,8 @@
     <p:sldId id="307" r:id="rId25"/>
     <p:sldId id="308" r:id="rId26"/>
     <p:sldId id="309" r:id="rId27"/>
-    <p:sldId id="285" r:id="rId28"/>
-    <p:sldId id="310" r:id="rId29"/>
+    <p:sldId id="316" r:id="rId28"/>
+    <p:sldId id="299" r:id="rId29"/>
     <p:sldId id="272" r:id="rId30"/>
     <p:sldId id="271" r:id="rId31"/>
     <p:sldId id="297" r:id="rId32"/>
@@ -5318,7 +5318,7 @@
           <a:p>
             <a:fld id="{02EF5511-433E-438D-93BB-1E1EB804EB9E}" type="datetimeFigureOut">
               <a:rPr lang="fr-FR" smtClean="0"/>
-              <a:t>27/04/2025</a:t>
+              <a:t>28/04/2025</a:t>
             </a:fld>
             <a:endParaRPr lang="fr-FR"/>
           </a:p>
@@ -5396,7 +5396,7 @@
           <a:p>
             <a:fld id="{EE097A57-0322-46FF-8CE5-DBA4BCCC1C9B}" type="slidenum">
               <a:rPr lang="fr-FR" smtClean="0"/>
-              <a:t>‹#›</a:t>
+              <a:t>‹N°›</a:t>
             </a:fld>
             <a:endParaRPr lang="fr-FR"/>
           </a:p>
@@ -5496,7 +5496,7 @@
           <a:p>
             <a:fld id="{173019D8-EACC-4538-984E-33CCC42DAA4E}" type="datetimeFigureOut">
               <a:rPr lang="fr-FR" smtClean="0"/>
-              <a:t>27/04/2025</a:t>
+              <a:t>28/04/2025</a:t>
             </a:fld>
             <a:endParaRPr lang="fr-FR"/>
           </a:p>
@@ -5654,7 +5654,7 @@
           <a:p>
             <a:fld id="{45C44DBB-F87B-49EA-91FB-EDB78BBE8593}" type="slidenum">
               <a:rPr lang="fr-FR" smtClean="0"/>
-              <a:t>‹#›</a:t>
+              <a:t>‹N°›</a:t>
             </a:fld>
             <a:endParaRPr lang="fr-FR"/>
           </a:p>
@@ -5839,6 +5839,533 @@
     <p:extLst>
       <p:ext uri="{BB962C8B-B14F-4D97-AF65-F5344CB8AC3E}">
         <p14:creationId xmlns:p14="http://schemas.microsoft.com/office/powerpoint/2010/main" val="4056806860"/>
+      </p:ext>
+    </p:extLst>
+  </p:cSld>
+  <p:clrMapOvr>
+    <a:masterClrMapping/>
+  </p:clrMapOvr>
+</p:notes>
+</file>
+
+<file path=ppt/notesSlides/notesSlide10.xml><?xml version="1.0" encoding="utf-8"?>
+<p:notes xmlns:a="http://schemas.openxmlformats.org/drawingml/2006/main" xmlns:r="http://schemas.openxmlformats.org/officeDocument/2006/relationships" xmlns:p="http://schemas.openxmlformats.org/presentationml/2006/main">
+  <p:cSld>
+    <p:spTree>
+      <p:nvGrpSpPr>
+        <p:cNvPr id="1" name=""/>
+        <p:cNvGrpSpPr/>
+        <p:nvPr/>
+      </p:nvGrpSpPr>
+      <p:grpSpPr>
+        <a:xfrm>
+          <a:off x="0" y="0"/>
+          <a:ext cx="0" cy="0"/>
+          <a:chOff x="0" y="0"/>
+          <a:chExt cx="0" cy="0"/>
+        </a:xfrm>
+      </p:grpSpPr>
+      <p:sp>
+        <p:nvSpPr>
+          <p:cNvPr id="2" name="Espace réservé de l'image des diapositives 1"/>
+          <p:cNvSpPr>
+            <a:spLocks noGrp="1" noRot="1" noChangeAspect="1"/>
+          </p:cNvSpPr>
+          <p:nvPr>
+            <p:ph type="sldImg"/>
+          </p:nvPr>
+        </p:nvSpPr>
+        <p:spPr/>
+      </p:sp>
+      <p:sp>
+        <p:nvSpPr>
+          <p:cNvPr id="3" name="Espace réservé des notes 2"/>
+          <p:cNvSpPr>
+            <a:spLocks noGrp="1"/>
+          </p:cNvSpPr>
+          <p:nvPr>
+            <p:ph type="body" idx="1"/>
+          </p:nvPr>
+        </p:nvSpPr>
+        <p:spPr/>
+        <p:txBody>
+          <a:bodyPr/>
+          <a:lstStyle/>
+          <a:p>
+            <a:pPr marL="0" marR="0" lvl="0" indent="0" algn="l" defTabSz="914400" rtl="0" eaLnBrk="1" fontAlgn="auto" latinLnBrk="0" hangingPunct="1">
+              <a:lnSpc>
+                <a:spcPct val="100000"/>
+              </a:lnSpc>
+              <a:spcBef>
+                <a:spcPts val="0"/>
+              </a:spcBef>
+              <a:spcAft>
+                <a:spcPts val="0"/>
+              </a:spcAft>
+              <a:buClrTx/>
+              <a:buSzTx/>
+              <a:buFontTx/>
+              <a:buNone/>
+              <a:tabLst/>
+              <a:defRPr/>
+            </a:pPr>
+            <a:r>
+              <a:rPr lang="fr-FR" i="1" dirty="0"/>
+              <a:t>« Le choix des variables repose à la fois sur une méthode statistique rigoureuse (ACP) et une validation par la littérature. Nous avons cherché un compromis entre cohérence théorique et pouvoir explicatif, tout en évitant les redondances entre variables. »</a:t>
+            </a:r>
+          </a:p>
+          <a:p>
+            <a:pPr marL="0" marR="0" lvl="0" indent="0" algn="l" defTabSz="914400" rtl="0" eaLnBrk="1" fontAlgn="auto" latinLnBrk="0" hangingPunct="1">
+              <a:lnSpc>
+                <a:spcPct val="100000"/>
+              </a:lnSpc>
+              <a:spcBef>
+                <a:spcPts val="0"/>
+              </a:spcBef>
+              <a:spcAft>
+                <a:spcPts val="0"/>
+              </a:spcAft>
+              <a:buClrTx/>
+              <a:buSzTx/>
+              <a:buFontTx/>
+              <a:buNone/>
+              <a:tabLst/>
+              <a:defRPr/>
+            </a:pPr>
+            <a:br>
+              <a:rPr lang="fr-FR" dirty="0"/>
+            </a:br>
+            <a:r>
+              <a:rPr lang="fr-FR" i="1" dirty="0"/>
+              <a:t>« L'accent a été mis sur des variables démographiques et socio-économiques connues pour influencer le recours aux soins. »</a:t>
+            </a:r>
+            <a:endParaRPr lang="fr-FR" dirty="0"/>
+          </a:p>
+          <a:p>
+            <a:endParaRPr lang="fr-FR" dirty="0"/>
+          </a:p>
+        </p:txBody>
+      </p:sp>
+      <p:sp>
+        <p:nvSpPr>
+          <p:cNvPr id="4" name="Espace réservé du numéro de diapositive 3"/>
+          <p:cNvSpPr>
+            <a:spLocks noGrp="1"/>
+          </p:cNvSpPr>
+          <p:nvPr>
+            <p:ph type="sldNum" sz="quarter" idx="5"/>
+          </p:nvPr>
+        </p:nvSpPr>
+        <p:spPr/>
+        <p:txBody>
+          <a:bodyPr/>
+          <a:lstStyle/>
+          <a:p>
+            <a:fld id="{45C44DBB-F87B-49EA-91FB-EDB78BBE8593}" type="slidenum">
+              <a:rPr lang="fr-FR" smtClean="0"/>
+              <a:t>18</a:t>
+            </a:fld>
+            <a:endParaRPr lang="fr-FR"/>
+          </a:p>
+        </p:txBody>
+      </p:sp>
+    </p:spTree>
+    <p:extLst>
+      <p:ext uri="{BB962C8B-B14F-4D97-AF65-F5344CB8AC3E}">
+        <p14:creationId xmlns:p14="http://schemas.microsoft.com/office/powerpoint/2010/main" val="2251595791"/>
+      </p:ext>
+    </p:extLst>
+  </p:cSld>
+  <p:clrMapOvr>
+    <a:masterClrMapping/>
+  </p:clrMapOvr>
+</p:notes>
+</file>
+
+<file path=ppt/notesSlides/notesSlide11.xml><?xml version="1.0" encoding="utf-8"?>
+<p:notes xmlns:a="http://schemas.openxmlformats.org/drawingml/2006/main" xmlns:r="http://schemas.openxmlformats.org/officeDocument/2006/relationships" xmlns:p="http://schemas.openxmlformats.org/presentationml/2006/main">
+  <p:cSld>
+    <p:spTree>
+      <p:nvGrpSpPr>
+        <p:cNvPr id="1" name=""/>
+        <p:cNvGrpSpPr/>
+        <p:nvPr/>
+      </p:nvGrpSpPr>
+      <p:grpSpPr>
+        <a:xfrm>
+          <a:off x="0" y="0"/>
+          <a:ext cx="0" cy="0"/>
+          <a:chOff x="0" y="0"/>
+          <a:chExt cx="0" cy="0"/>
+        </a:xfrm>
+      </p:grpSpPr>
+      <p:sp>
+        <p:nvSpPr>
+          <p:cNvPr id="2" name="Espace réservé de l'image des diapositives 1"/>
+          <p:cNvSpPr>
+            <a:spLocks noGrp="1" noRot="1" noChangeAspect="1"/>
+          </p:cNvSpPr>
+          <p:nvPr>
+            <p:ph type="sldImg"/>
+          </p:nvPr>
+        </p:nvSpPr>
+        <p:spPr/>
+      </p:sp>
+      <p:sp>
+        <p:nvSpPr>
+          <p:cNvPr id="3" name="Espace réservé des notes 2"/>
+          <p:cNvSpPr>
+            <a:spLocks noGrp="1"/>
+          </p:cNvSpPr>
+          <p:nvPr>
+            <p:ph type="body" idx="1"/>
+          </p:nvPr>
+        </p:nvSpPr>
+        <p:spPr/>
+        <p:txBody>
+          <a:bodyPr/>
+          <a:lstStyle/>
+          <a:p>
+            <a:endParaRPr lang="fr-FR" dirty="0"/>
+          </a:p>
+        </p:txBody>
+      </p:sp>
+      <p:sp>
+        <p:nvSpPr>
+          <p:cNvPr id="4" name="Espace réservé du numéro de diapositive 3"/>
+          <p:cNvSpPr>
+            <a:spLocks noGrp="1"/>
+          </p:cNvSpPr>
+          <p:nvPr>
+            <p:ph type="sldNum" sz="quarter" idx="5"/>
+          </p:nvPr>
+        </p:nvSpPr>
+        <p:spPr/>
+        <p:txBody>
+          <a:bodyPr/>
+          <a:lstStyle/>
+          <a:p>
+            <a:fld id="{45C44DBB-F87B-49EA-91FB-EDB78BBE8593}" type="slidenum">
+              <a:rPr lang="fr-FR" smtClean="0"/>
+              <a:t>23</a:t>
+            </a:fld>
+            <a:endParaRPr lang="fr-FR"/>
+          </a:p>
+        </p:txBody>
+      </p:sp>
+    </p:spTree>
+    <p:extLst>
+      <p:ext uri="{BB962C8B-B14F-4D97-AF65-F5344CB8AC3E}">
+        <p14:creationId xmlns:p14="http://schemas.microsoft.com/office/powerpoint/2010/main" val="3754391591"/>
+      </p:ext>
+    </p:extLst>
+  </p:cSld>
+  <p:clrMapOvr>
+    <a:masterClrMapping/>
+  </p:clrMapOvr>
+</p:notes>
+</file>
+
+<file path=ppt/notesSlides/notesSlide12.xml><?xml version="1.0" encoding="utf-8"?>
+<p:notes xmlns:a="http://schemas.openxmlformats.org/drawingml/2006/main" xmlns:r="http://schemas.openxmlformats.org/officeDocument/2006/relationships" xmlns:p="http://schemas.openxmlformats.org/presentationml/2006/main">
+  <p:cSld>
+    <p:spTree>
+      <p:nvGrpSpPr>
+        <p:cNvPr id="1" name=""/>
+        <p:cNvGrpSpPr/>
+        <p:nvPr/>
+      </p:nvGrpSpPr>
+      <p:grpSpPr>
+        <a:xfrm>
+          <a:off x="0" y="0"/>
+          <a:ext cx="0" cy="0"/>
+          <a:chOff x="0" y="0"/>
+          <a:chExt cx="0" cy="0"/>
+        </a:xfrm>
+      </p:grpSpPr>
+      <p:sp>
+        <p:nvSpPr>
+          <p:cNvPr id="2" name="Espace réservé de l'image des diapositives 1"/>
+          <p:cNvSpPr>
+            <a:spLocks noGrp="1" noRot="1" noChangeAspect="1"/>
+          </p:cNvSpPr>
+          <p:nvPr>
+            <p:ph type="sldImg"/>
+          </p:nvPr>
+        </p:nvSpPr>
+        <p:spPr/>
+      </p:sp>
+      <p:sp>
+        <p:nvSpPr>
+          <p:cNvPr id="3" name="Espace réservé des notes 2"/>
+          <p:cNvSpPr>
+            <a:spLocks noGrp="1"/>
+          </p:cNvSpPr>
+          <p:nvPr>
+            <p:ph type="body" idx="1"/>
+          </p:nvPr>
+        </p:nvSpPr>
+        <p:spPr/>
+        <p:txBody>
+          <a:bodyPr/>
+          <a:lstStyle/>
+          <a:p>
+            <a:r>
+              <a:rPr lang="fr-FR" dirty="0"/>
+              <a:t>Les taux de consultations observés et prédits présentent une </a:t>
+            </a:r>
+            <a:r>
+              <a:rPr lang="fr-FR" b="1" dirty="0"/>
+              <a:t>structure spatiale globalement similaire</a:t>
+            </a:r>
+            <a:r>
+              <a:rPr lang="fr-FR" dirty="0"/>
+              <a:t>. Certaines zones, notamment </a:t>
+            </a:r>
+            <a:r>
+              <a:rPr lang="fr-FR" b="1" dirty="0"/>
+              <a:t>au sud-est et au nord-ouest</a:t>
+            </a:r>
+            <a:r>
+              <a:rPr lang="fr-FR" dirty="0"/>
+              <a:t>, mettent toutefois en évidence des divergences marquées entre les valeurs observées et prédites.</a:t>
+            </a:r>
+          </a:p>
+        </p:txBody>
+      </p:sp>
+      <p:sp>
+        <p:nvSpPr>
+          <p:cNvPr id="4" name="Espace réservé du numéro de diapositive 3"/>
+          <p:cNvSpPr>
+            <a:spLocks noGrp="1"/>
+          </p:cNvSpPr>
+          <p:nvPr>
+            <p:ph type="sldNum" sz="quarter" idx="5"/>
+          </p:nvPr>
+        </p:nvSpPr>
+        <p:spPr/>
+        <p:txBody>
+          <a:bodyPr/>
+          <a:lstStyle/>
+          <a:p>
+            <a:fld id="{45C44DBB-F87B-49EA-91FB-EDB78BBE8593}" type="slidenum">
+              <a:rPr lang="fr-FR" smtClean="0"/>
+              <a:t>24</a:t>
+            </a:fld>
+            <a:endParaRPr lang="fr-FR"/>
+          </a:p>
+        </p:txBody>
+      </p:sp>
+    </p:spTree>
+    <p:extLst>
+      <p:ext uri="{BB962C8B-B14F-4D97-AF65-F5344CB8AC3E}">
+        <p14:creationId xmlns:p14="http://schemas.microsoft.com/office/powerpoint/2010/main" val="3227107383"/>
+      </p:ext>
+    </p:extLst>
+  </p:cSld>
+  <p:clrMapOvr>
+    <a:masterClrMapping/>
+  </p:clrMapOvr>
+</p:notes>
+</file>
+
+<file path=ppt/notesSlides/notesSlide13.xml><?xml version="1.0" encoding="utf-8"?>
+<p:notes xmlns:a="http://schemas.openxmlformats.org/drawingml/2006/main" xmlns:r="http://schemas.openxmlformats.org/officeDocument/2006/relationships" xmlns:p="http://schemas.openxmlformats.org/presentationml/2006/main">
+  <p:cSld>
+    <p:spTree>
+      <p:nvGrpSpPr>
+        <p:cNvPr id="1" name=""/>
+        <p:cNvGrpSpPr/>
+        <p:nvPr/>
+      </p:nvGrpSpPr>
+      <p:grpSpPr>
+        <a:xfrm>
+          <a:off x="0" y="0"/>
+          <a:ext cx="0" cy="0"/>
+          <a:chOff x="0" y="0"/>
+          <a:chExt cx="0" cy="0"/>
+        </a:xfrm>
+      </p:grpSpPr>
+      <p:sp>
+        <p:nvSpPr>
+          <p:cNvPr id="2" name="Espace réservé de l'image des diapositives 1"/>
+          <p:cNvSpPr>
+            <a:spLocks noGrp="1" noRot="1" noChangeAspect="1"/>
+          </p:cNvSpPr>
+          <p:nvPr>
+            <p:ph type="sldImg"/>
+          </p:nvPr>
+        </p:nvSpPr>
+        <p:spPr/>
+      </p:sp>
+      <p:sp>
+        <p:nvSpPr>
+          <p:cNvPr id="3" name="Espace réservé des notes 2"/>
+          <p:cNvSpPr>
+            <a:spLocks noGrp="1"/>
+          </p:cNvSpPr>
+          <p:nvPr>
+            <p:ph type="body" idx="1"/>
+          </p:nvPr>
+        </p:nvSpPr>
+        <p:spPr/>
+        <p:txBody>
+          <a:bodyPr/>
+          <a:lstStyle/>
+          <a:p>
+            <a:r>
+              <a:rPr lang="fr-FR" dirty="0"/>
+              <a:t>Nous insistons ici sur les </a:t>
+            </a:r>
+            <a:r>
+              <a:rPr lang="fr-FR" b="1" dirty="0"/>
+              <a:t>grands déterminants</a:t>
+            </a:r>
+            <a:r>
+              <a:rPr lang="fr-FR" dirty="0"/>
+              <a:t> de l’accès aux soins : géographie, démographie et situation sociale. La corrélation négative avec les personnes âgées est un point important à discuter avec le jury, en soulignant les barrières comme la mobilité ou l’attente.</a:t>
+            </a:r>
+          </a:p>
+        </p:txBody>
+      </p:sp>
+      <p:sp>
+        <p:nvSpPr>
+          <p:cNvPr id="4" name="Espace réservé du numéro de diapositive 3"/>
+          <p:cNvSpPr>
+            <a:spLocks noGrp="1"/>
+          </p:cNvSpPr>
+          <p:nvPr>
+            <p:ph type="sldNum" sz="quarter" idx="5"/>
+          </p:nvPr>
+        </p:nvSpPr>
+        <p:spPr/>
+        <p:txBody>
+          <a:bodyPr/>
+          <a:lstStyle/>
+          <a:p>
+            <a:fld id="{45C44DBB-F87B-49EA-91FB-EDB78BBE8593}" type="slidenum">
+              <a:rPr lang="fr-FR" smtClean="0"/>
+              <a:t>26</a:t>
+            </a:fld>
+            <a:endParaRPr lang="fr-FR"/>
+          </a:p>
+        </p:txBody>
+      </p:sp>
+    </p:spTree>
+    <p:extLst>
+      <p:ext uri="{BB962C8B-B14F-4D97-AF65-F5344CB8AC3E}">
+        <p14:creationId xmlns:p14="http://schemas.microsoft.com/office/powerpoint/2010/main" val="1986272852"/>
+      </p:ext>
+    </p:extLst>
+  </p:cSld>
+  <p:clrMapOvr>
+    <a:masterClrMapping/>
+  </p:clrMapOvr>
+</p:notes>
+</file>
+
+<file path=ppt/notesSlides/notesSlide14.xml><?xml version="1.0" encoding="utf-8"?>
+<p:notes xmlns:a="http://schemas.openxmlformats.org/drawingml/2006/main" xmlns:r="http://schemas.openxmlformats.org/officeDocument/2006/relationships" xmlns:p="http://schemas.openxmlformats.org/presentationml/2006/main">
+  <p:cSld>
+    <p:spTree>
+      <p:nvGrpSpPr>
+        <p:cNvPr id="1" name=""/>
+        <p:cNvGrpSpPr/>
+        <p:nvPr/>
+      </p:nvGrpSpPr>
+      <p:grpSpPr>
+        <a:xfrm>
+          <a:off x="0" y="0"/>
+          <a:ext cx="0" cy="0"/>
+          <a:chOff x="0" y="0"/>
+          <a:chExt cx="0" cy="0"/>
+        </a:xfrm>
+      </p:grpSpPr>
+      <p:sp>
+        <p:nvSpPr>
+          <p:cNvPr id="2" name="Espace réservé de l'image des diapositives 1"/>
+          <p:cNvSpPr>
+            <a:spLocks noGrp="1" noRot="1" noChangeAspect="1"/>
+          </p:cNvSpPr>
+          <p:nvPr>
+            <p:ph type="sldImg"/>
+          </p:nvPr>
+        </p:nvSpPr>
+        <p:spPr/>
+      </p:sp>
+      <p:sp>
+        <p:nvSpPr>
+          <p:cNvPr id="3" name="Espace réservé des notes 2"/>
+          <p:cNvSpPr>
+            <a:spLocks noGrp="1"/>
+          </p:cNvSpPr>
+          <p:nvPr>
+            <p:ph type="body" idx="1"/>
+          </p:nvPr>
+        </p:nvSpPr>
+        <p:spPr/>
+        <p:txBody>
+          <a:bodyPr/>
+          <a:lstStyle/>
+          <a:p>
+            <a:r>
+              <a:rPr lang="fr-FR" dirty="0"/>
+              <a:t>Revenons sur les </a:t>
+            </a:r>
+            <a:r>
+              <a:rPr lang="fr-FR" b="1" dirty="0"/>
+              <a:t>implications concrètes</a:t>
+            </a:r>
+            <a:r>
+              <a:rPr lang="fr-FR" dirty="0"/>
+              <a:t> pour les politiques publiques. Il ne s’agit pas seulement de moyens, mais de </a:t>
+            </a:r>
+            <a:r>
+              <a:rPr lang="fr-FR" b="1" dirty="0"/>
+              <a:t>répartition intelligente</a:t>
+            </a:r>
+            <a:r>
+              <a:rPr lang="fr-FR" dirty="0"/>
+              <a:t> des services. Le concept d’</a:t>
+            </a:r>
+            <a:r>
+              <a:rPr lang="fr-FR" b="1" dirty="0"/>
+              <a:t>exode sanitaire</a:t>
+            </a:r>
+            <a:r>
+              <a:rPr lang="fr-FR" dirty="0"/>
+              <a:t> peut illustrer le déséquilibre et justifier des politiques ciblées.</a:t>
+            </a:r>
+          </a:p>
+        </p:txBody>
+      </p:sp>
+      <p:sp>
+        <p:nvSpPr>
+          <p:cNvPr id="4" name="Espace réservé du numéro de diapositive 3"/>
+          <p:cNvSpPr>
+            <a:spLocks noGrp="1"/>
+          </p:cNvSpPr>
+          <p:nvPr>
+            <p:ph type="sldNum" sz="quarter" idx="5"/>
+          </p:nvPr>
+        </p:nvSpPr>
+        <p:spPr/>
+        <p:txBody>
+          <a:bodyPr/>
+          <a:lstStyle/>
+          <a:p>
+            <a:fld id="{45C44DBB-F87B-49EA-91FB-EDB78BBE8593}" type="slidenum">
+              <a:rPr lang="fr-FR" smtClean="0"/>
+              <a:t>27</a:t>
+            </a:fld>
+            <a:endParaRPr lang="fr-FR"/>
+          </a:p>
+        </p:txBody>
+      </p:sp>
+    </p:spTree>
+    <p:extLst>
+      <p:ext uri="{BB962C8B-B14F-4D97-AF65-F5344CB8AC3E}">
+        <p14:creationId xmlns:p14="http://schemas.microsoft.com/office/powerpoint/2010/main" val="1814091251"/>
       </p:ext>
     </p:extLst>
   </p:cSld>
@@ -6235,7 +6762,7 @@
       </p:grpSpPr>
       <p:sp>
         <p:nvSpPr>
-          <p:cNvPr id="2" name="Slide Image Placeholder 1"/>
+          <p:cNvPr id="2" name="Espace réservé de l'image des diapositives 1"/>
           <p:cNvSpPr>
             <a:spLocks noGrp="1" noRot="1" noChangeAspect="1"/>
           </p:cNvSpPr>
@@ -6247,7 +6774,7 @@
       </p:sp>
       <p:sp>
         <p:nvSpPr>
-          <p:cNvPr id="3" name="Notes Placeholder 2"/>
+          <p:cNvPr id="3" name="Espace réservé des notes 2"/>
           <p:cNvSpPr>
             <a:spLocks noGrp="1"/>
           </p:cNvSpPr>
@@ -6260,13 +6787,25 @@
           <a:bodyPr/>
           <a:lstStyle/>
           <a:p>
+            <a:r>
+              <a:rPr lang="fr-FR" dirty="0"/>
+              <a:t>Nous avons modèles de régression spatiale : le modèle SAR qui prend en compte la dépendance spatiale endogène, le modèle prenant en compte la dépendance exogène, le modèle de dépendance dans les erreurs et le modèle SDM qui prend en compte à la fois les dépendances endogène et exogène.</a:t>
+            </a:r>
+          </a:p>
+          <a:p>
             <a:endParaRPr lang="fr-FR" dirty="0"/>
+          </a:p>
+          <a:p>
+            <a:r>
+              <a:rPr lang="fr-FR" dirty="0"/>
+              <a:t>Et un modèle de régression linéaire pour la réalisation des tests d’autocorrélation spatiale.</a:t>
+            </a:r>
           </a:p>
         </p:txBody>
       </p:sp>
       <p:sp>
         <p:nvSpPr>
-          <p:cNvPr id="4" name="Slide Number Placeholder 3"/>
+          <p:cNvPr id="4" name="Espace réservé du numéro de diapositive 3"/>
           <p:cNvSpPr>
             <a:spLocks noGrp="1"/>
           </p:cNvSpPr>
@@ -6281,7 +6820,7 @@
           <a:p>
             <a:fld id="{45C44DBB-F87B-49EA-91FB-EDB78BBE8593}" type="slidenum">
               <a:rPr lang="fr-FR" smtClean="0"/>
-              <a:t>16</a:t>
+              <a:t>11</a:t>
             </a:fld>
             <a:endParaRPr lang="fr-FR"/>
           </a:p>
@@ -6290,7 +6829,7 @@
     </p:spTree>
     <p:extLst>
       <p:ext uri="{BB962C8B-B14F-4D97-AF65-F5344CB8AC3E}">
-        <p14:creationId xmlns:p14="http://schemas.microsoft.com/office/powerpoint/2010/main" val="991168377"/>
+        <p14:creationId xmlns:p14="http://schemas.microsoft.com/office/powerpoint/2010/main" val="3198304080"/>
       </p:ext>
     </p:extLst>
   </p:cSld>
@@ -6344,54 +6883,143 @@
           <a:bodyPr/>
           <a:lstStyle/>
           <a:p>
-            <a:pPr marL="0" marR="0" lvl="0" indent="0" algn="l" defTabSz="914400" rtl="0" eaLnBrk="1" fontAlgn="auto" latinLnBrk="0" hangingPunct="1">
-              <a:lnSpc>
-                <a:spcPct val="100000"/>
-              </a:lnSpc>
-              <a:spcBef>
-                <a:spcPts val="0"/>
-              </a:spcBef>
-              <a:spcAft>
-                <a:spcPts val="0"/>
-              </a:spcAft>
-              <a:buClrTx/>
-              <a:buSzTx/>
-              <a:buFontTx/>
-              <a:buNone/>
-              <a:tabLst/>
-              <a:defRPr/>
+            <a:pPr marL="342900" indent="-342900" algn="just">
+              <a:buFont typeface="Wingdings" panose="05000000000000000000" pitchFamily="2" charset="2"/>
+              <a:buChar char="ü"/>
             </a:pPr>
             <a:r>
-              <a:rPr lang="fr-FR" i="1" dirty="0"/>
-              <a:t>« Le choix des variables repose à la fois sur une méthode statistique rigoureuse (ACP) et une validation par la littérature. Nous avons cherché un compromis entre cohérence théorique et pouvoir explicatif, tout en évitant les redondances entre variables. »</a:t>
+              <a:rPr lang="fr-FR" sz="1200" dirty="0">
+                <a:solidFill>
+                  <a:schemeClr val="bg1"/>
+                </a:solidFill>
+              </a:rPr>
+              <a:t>Une base étroite (0-20 ans), indiquant une faible natalité récente.</a:t>
             </a:r>
           </a:p>
           <a:p>
-            <a:pPr marL="0" marR="0" lvl="0" indent="0" algn="l" defTabSz="914400" rtl="0" eaLnBrk="1" fontAlgn="auto" latinLnBrk="0" hangingPunct="1">
-              <a:lnSpc>
-                <a:spcPct val="100000"/>
-              </a:lnSpc>
-              <a:spcBef>
-                <a:spcPts val="0"/>
-              </a:spcBef>
-              <a:spcAft>
-                <a:spcPts val="0"/>
-              </a:spcAft>
-              <a:buClrTx/>
-              <a:buSzTx/>
-              <a:buFontTx/>
+            <a:pPr marL="342900" indent="-342900" algn="just">
+              <a:buFont typeface="Wingdings" panose="05000000000000000000" pitchFamily="2" charset="2"/>
+              <a:buChar char="ü"/>
+            </a:pPr>
+            <a:endParaRPr lang="fr-FR" sz="1200" dirty="0">
+              <a:solidFill>
+                <a:schemeClr val="bg1"/>
+              </a:solidFill>
+            </a:endParaRPr>
+          </a:p>
+          <a:p>
+            <a:pPr marL="342900" indent="-342900" algn="just">
+              <a:buFont typeface="Wingdings" panose="05000000000000000000" pitchFamily="2" charset="2"/>
+              <a:buChar char="ü"/>
+            </a:pPr>
+            <a:r>
+              <a:rPr lang="fr-FR" sz="1200" dirty="0">
+                <a:solidFill>
+                  <a:schemeClr val="bg1"/>
+                </a:solidFill>
+              </a:rPr>
+              <a:t>Un corps large et uniforme (20-60 ans), signe d'une population adulte importante, </a:t>
+            </a:r>
+            <a:r>
+              <a:rPr lang="fr-FR" dirty="0"/>
+              <a:t>probablement dû aux effets des générations du baby-boom tardif (années 1960-70) et aux flux migratoires.</a:t>
+            </a:r>
+            <a:endParaRPr lang="fr-FR" sz="1200" dirty="0">
+              <a:solidFill>
+                <a:schemeClr val="bg1"/>
+              </a:solidFill>
+            </a:endParaRPr>
+          </a:p>
+          <a:p>
+            <a:pPr marL="342900" indent="-342900" algn="just">
+              <a:buFont typeface="Wingdings" panose="05000000000000000000" pitchFamily="2" charset="2"/>
+              <a:buChar char="ü"/>
+            </a:pPr>
+            <a:endParaRPr lang="fr-FR" sz="1200" dirty="0">
+              <a:solidFill>
+                <a:schemeClr val="bg1"/>
+              </a:solidFill>
+            </a:endParaRPr>
+          </a:p>
+          <a:p>
+            <a:pPr marL="342900" indent="-342900" algn="just">
+              <a:buFont typeface="Wingdings" panose="05000000000000000000" pitchFamily="2" charset="2"/>
+              <a:buChar char="ü"/>
+            </a:pPr>
+            <a:r>
+              <a:rPr lang="fr-FR" sz="1200" dirty="0">
+                <a:solidFill>
+                  <a:schemeClr val="bg1"/>
+                </a:solidFill>
+              </a:rPr>
+              <a:t>Un élargissement notable au-delà de 60 ans, traduisant le vieillissement démographique.</a:t>
+            </a:r>
+          </a:p>
+          <a:p>
+            <a:pPr marL="342900" indent="-342900" algn="just">
+              <a:buFont typeface="Wingdings" panose="05000000000000000000" pitchFamily="2" charset="2"/>
+              <a:buChar char="ü"/>
+            </a:pPr>
+            <a:endParaRPr lang="fr-FR" sz="1200" dirty="0">
+              <a:solidFill>
+                <a:schemeClr val="bg1"/>
+              </a:solidFill>
+            </a:endParaRPr>
+          </a:p>
+          <a:p>
+            <a:pPr marL="342900" indent="-342900" algn="just">
+              <a:buFont typeface="Wingdings" panose="05000000000000000000" pitchFamily="2" charset="2"/>
+              <a:buChar char="ü"/>
+            </a:pPr>
+            <a:r>
+              <a:rPr lang="fr-FR" sz="1200" dirty="0">
+                <a:solidFill>
+                  <a:schemeClr val="bg1"/>
+                </a:solidFill>
+              </a:rPr>
+              <a:t>Au-dessus de 80 ans, on observe une nette prédominance des femmes sur les hommes, ce qui est cohérent avec l'espérance de vie plus longue des femmes.</a:t>
+            </a:r>
+          </a:p>
+          <a:p>
+            <a:pPr marL="342900" indent="-342900" algn="just">
+              <a:buFont typeface="Wingdings" panose="05000000000000000000" pitchFamily="2" charset="2"/>
+              <a:buChar char="ü"/>
+            </a:pPr>
+            <a:endParaRPr lang="fr-FR" sz="1200" dirty="0">
+              <a:solidFill>
+                <a:schemeClr val="bg1"/>
+              </a:solidFill>
+            </a:endParaRPr>
+          </a:p>
+          <a:p>
+            <a:pPr>
               <a:buNone/>
-              <a:tabLst/>
-              <a:defRPr/>
             </a:pPr>
-            <a:br>
+            <a:r>
               <a:rPr lang="fr-FR" dirty="0"/>
-            </a:br>
+              <a:t>La forme générale, </a:t>
+            </a:r>
             <a:r>
-              <a:rPr lang="fr-FR" i="1" dirty="0"/>
-              <a:t>« L'accent a été mis sur des variables démographiques et socio-économiques connues pour influencer le recours aux soins. »</a:t>
+              <a:rPr lang="fr-FR" b="1" dirty="0"/>
+              <a:t>presque en cœur</a:t>
             </a:r>
-            <a:endParaRPr lang="fr-FR" dirty="0"/>
+            <a:r>
+              <a:rPr lang="fr-FR" dirty="0"/>
+              <a:t>, confirme que la France est dans une </a:t>
+            </a:r>
+            <a:r>
+              <a:rPr lang="fr-FR" b="1" dirty="0"/>
+              <a:t>phase avancée de transition démographique</a:t>
+            </a:r>
+            <a:r>
+              <a:rPr lang="fr-FR" dirty="0"/>
+              <a:t> : faible natalité, forte proportion de personnes âgées.</a:t>
+            </a:r>
+            <a:endParaRPr lang="fr-FR" sz="1200" dirty="0">
+              <a:solidFill>
+                <a:schemeClr val="bg1"/>
+              </a:solidFill>
+            </a:endParaRPr>
           </a:p>
           <a:p>
             <a:endParaRPr lang="fr-FR" dirty="0"/>
@@ -6415,7 +7043,7 @@
           <a:p>
             <a:fld id="{45C44DBB-F87B-49EA-91FB-EDB78BBE8593}" type="slidenum">
               <a:rPr lang="fr-FR" smtClean="0"/>
-              <a:t>18</a:t>
+              <a:t>13</a:t>
             </a:fld>
             <a:endParaRPr lang="fr-FR"/>
           </a:p>
@@ -6424,7 +7052,7 @@
     </p:spTree>
     <p:extLst>
       <p:ext uri="{BB962C8B-B14F-4D97-AF65-F5344CB8AC3E}">
-        <p14:creationId xmlns:p14="http://schemas.microsoft.com/office/powerpoint/2010/main" val="2251595791"/>
+        <p14:creationId xmlns:p14="http://schemas.microsoft.com/office/powerpoint/2010/main" val="3681943613"/>
       </p:ext>
     </p:extLst>
   </p:cSld>
@@ -6435,6 +7063,93 @@
 </file>
 
 <file path=ppt/notesSlides/notesSlide7.xml><?xml version="1.0" encoding="utf-8"?>
+<p:notes xmlns:a="http://schemas.openxmlformats.org/drawingml/2006/main" xmlns:r="http://schemas.openxmlformats.org/officeDocument/2006/relationships" xmlns:p="http://schemas.openxmlformats.org/presentationml/2006/main">
+  <p:cSld>
+    <p:spTree>
+      <p:nvGrpSpPr>
+        <p:cNvPr id="1" name=""/>
+        <p:cNvGrpSpPr/>
+        <p:nvPr/>
+      </p:nvGrpSpPr>
+      <p:grpSpPr>
+        <a:xfrm>
+          <a:off x="0" y="0"/>
+          <a:ext cx="0" cy="0"/>
+          <a:chOff x="0" y="0"/>
+          <a:chExt cx="0" cy="0"/>
+        </a:xfrm>
+      </p:grpSpPr>
+      <p:sp>
+        <p:nvSpPr>
+          <p:cNvPr id="2" name="Espace réservé de l'image des diapositives 1"/>
+          <p:cNvSpPr>
+            <a:spLocks noGrp="1" noRot="1" noChangeAspect="1"/>
+          </p:cNvSpPr>
+          <p:nvPr>
+            <p:ph type="sldImg"/>
+          </p:nvPr>
+        </p:nvSpPr>
+        <p:spPr/>
+      </p:sp>
+      <p:sp>
+        <p:nvSpPr>
+          <p:cNvPr id="3" name="Espace réservé des notes 2"/>
+          <p:cNvSpPr>
+            <a:spLocks noGrp="1"/>
+          </p:cNvSpPr>
+          <p:nvPr>
+            <p:ph type="body" idx="1"/>
+          </p:nvPr>
+        </p:nvSpPr>
+        <p:spPr/>
+        <p:txBody>
+          <a:bodyPr/>
+          <a:lstStyle/>
+          <a:p>
+            <a:r>
+              <a:rPr lang="fr-FR" dirty="0"/>
+              <a:t>Pour neutraliser l'effet de taille des communes et comparer de manière pertinente l'intensité du recours aux soins entre territoires de tailles démographiques différentes, nous sommes passés du nombre absolu de consultations au taux de consultations rapporté à la population.</a:t>
+            </a:r>
+          </a:p>
+        </p:txBody>
+      </p:sp>
+      <p:sp>
+        <p:nvSpPr>
+          <p:cNvPr id="4" name="Espace réservé du numéro de diapositive 3"/>
+          <p:cNvSpPr>
+            <a:spLocks noGrp="1"/>
+          </p:cNvSpPr>
+          <p:nvPr>
+            <p:ph type="sldNum" sz="quarter" idx="5"/>
+          </p:nvPr>
+        </p:nvSpPr>
+        <p:spPr/>
+        <p:txBody>
+          <a:bodyPr/>
+          <a:lstStyle/>
+          <a:p>
+            <a:fld id="{45C44DBB-F87B-49EA-91FB-EDB78BBE8593}" type="slidenum">
+              <a:rPr lang="fr-FR" smtClean="0"/>
+              <a:t>14</a:t>
+            </a:fld>
+            <a:endParaRPr lang="fr-FR"/>
+          </a:p>
+        </p:txBody>
+      </p:sp>
+    </p:spTree>
+    <p:extLst>
+      <p:ext uri="{BB962C8B-B14F-4D97-AF65-F5344CB8AC3E}">
+        <p14:creationId xmlns:p14="http://schemas.microsoft.com/office/powerpoint/2010/main" val="777571603"/>
+      </p:ext>
+    </p:extLst>
+  </p:cSld>
+  <p:clrMapOvr>
+    <a:masterClrMapping/>
+  </p:clrMapOvr>
+</p:notes>
+</file>
+
+<file path=ppt/notesSlides/notesSlide8.xml><?xml version="1.0" encoding="utf-8"?>
 <p:notes xmlns:a="http://schemas.openxmlformats.org/drawingml/2006/main" xmlns:r="http://schemas.openxmlformats.org/officeDocument/2006/relationships" xmlns:p="http://schemas.openxmlformats.org/presentationml/2006/main">
   <p:cSld>
     <p:spTree>
@@ -6499,7 +7214,7 @@
           <a:p>
             <a:fld id="{45C44DBB-F87B-49EA-91FB-EDB78BBE8593}" type="slidenum">
               <a:rPr lang="fr-FR" smtClean="0"/>
-              <a:t>24</a:t>
+              <a:t>15</a:t>
             </a:fld>
             <a:endParaRPr lang="fr-FR"/>
           </a:p>
@@ -6508,102 +7223,7 @@
     </p:spTree>
     <p:extLst>
       <p:ext uri="{BB962C8B-B14F-4D97-AF65-F5344CB8AC3E}">
-        <p14:creationId xmlns:p14="http://schemas.microsoft.com/office/powerpoint/2010/main" val="2613062387"/>
-      </p:ext>
-    </p:extLst>
-  </p:cSld>
-  <p:clrMapOvr>
-    <a:masterClrMapping/>
-  </p:clrMapOvr>
-</p:notes>
-</file>
-
-<file path=ppt/notesSlides/notesSlide8.xml><?xml version="1.0" encoding="utf-8"?>
-<p:notes xmlns:a="http://schemas.openxmlformats.org/drawingml/2006/main" xmlns:r="http://schemas.openxmlformats.org/officeDocument/2006/relationships" xmlns:p="http://schemas.openxmlformats.org/presentationml/2006/main">
-  <p:cSld>
-    <p:spTree>
-      <p:nvGrpSpPr>
-        <p:cNvPr id="1" name=""/>
-        <p:cNvGrpSpPr/>
-        <p:nvPr/>
-      </p:nvGrpSpPr>
-      <p:grpSpPr>
-        <a:xfrm>
-          <a:off x="0" y="0"/>
-          <a:ext cx="0" cy="0"/>
-          <a:chOff x="0" y="0"/>
-          <a:chExt cx="0" cy="0"/>
-        </a:xfrm>
-      </p:grpSpPr>
-      <p:sp>
-        <p:nvSpPr>
-          <p:cNvPr id="2" name="Espace réservé de l'image des diapositives 1"/>
-          <p:cNvSpPr>
-            <a:spLocks noGrp="1" noRot="1" noChangeAspect="1"/>
-          </p:cNvSpPr>
-          <p:nvPr>
-            <p:ph type="sldImg"/>
-          </p:nvPr>
-        </p:nvSpPr>
-        <p:spPr/>
-      </p:sp>
-      <p:sp>
-        <p:nvSpPr>
-          <p:cNvPr id="3" name="Espace réservé des notes 2"/>
-          <p:cNvSpPr>
-            <a:spLocks noGrp="1"/>
-          </p:cNvSpPr>
-          <p:nvPr>
-            <p:ph type="body" idx="1"/>
-          </p:nvPr>
-        </p:nvSpPr>
-        <p:spPr/>
-        <p:txBody>
-          <a:bodyPr/>
-          <a:lstStyle/>
-          <a:p>
-            <a:r>
-              <a:rPr lang="fr-FR" dirty="0"/>
-              <a:t>Nous insistons ici sur les </a:t>
-            </a:r>
-            <a:r>
-              <a:rPr lang="fr-FR" b="1" dirty="0"/>
-              <a:t>grands déterminants</a:t>
-            </a:r>
-            <a:r>
-              <a:rPr lang="fr-FR" dirty="0"/>
-              <a:t> de l’accès aux soins : géographie, démographie et situation sociale. La corrélation négative avec les personnes âgées est un point important à discuter avec le jury, en soulignant les barrières comme la mobilité ou l’attente.</a:t>
-            </a:r>
-          </a:p>
-        </p:txBody>
-      </p:sp>
-      <p:sp>
-        <p:nvSpPr>
-          <p:cNvPr id="4" name="Espace réservé du numéro de diapositive 3"/>
-          <p:cNvSpPr>
-            <a:spLocks noGrp="1"/>
-          </p:cNvSpPr>
-          <p:nvPr>
-            <p:ph type="sldNum" sz="quarter" idx="5"/>
-          </p:nvPr>
-        </p:nvSpPr>
-        <p:spPr/>
-        <p:txBody>
-          <a:bodyPr/>
-          <a:lstStyle/>
-          <a:p>
-            <a:fld id="{45C44DBB-F87B-49EA-91FB-EDB78BBE8593}" type="slidenum">
-              <a:rPr lang="fr-FR" smtClean="0"/>
-              <a:t>26</a:t>
-            </a:fld>
-            <a:endParaRPr lang="fr-FR"/>
-          </a:p>
-        </p:txBody>
-      </p:sp>
-    </p:spTree>
-    <p:extLst>
-      <p:ext uri="{BB962C8B-B14F-4D97-AF65-F5344CB8AC3E}">
-        <p14:creationId xmlns:p14="http://schemas.microsoft.com/office/powerpoint/2010/main" val="1986272852"/>
+        <p14:creationId xmlns:p14="http://schemas.microsoft.com/office/powerpoint/2010/main" val="1662777783"/>
       </p:ext>
     </p:extLst>
   </p:cSld>
@@ -6632,7 +7252,7 @@
       </p:grpSpPr>
       <p:sp>
         <p:nvSpPr>
-          <p:cNvPr id="2" name="Espace réservé de l'image des diapositives 1"/>
+          <p:cNvPr id="2" name="Slide Image Placeholder 1"/>
           <p:cNvSpPr>
             <a:spLocks noGrp="1" noRot="1" noChangeAspect="1"/>
           </p:cNvSpPr>
@@ -6644,7 +7264,7 @@
       </p:sp>
       <p:sp>
         <p:nvSpPr>
-          <p:cNvPr id="3" name="Espace réservé des notes 2"/>
+          <p:cNvPr id="3" name="Notes Placeholder 2"/>
           <p:cNvSpPr>
             <a:spLocks noGrp="1"/>
           </p:cNvSpPr>
@@ -6657,40 +7277,13 @@
           <a:bodyPr/>
           <a:lstStyle/>
           <a:p>
-            <a:r>
-              <a:rPr lang="fr-FR" dirty="0"/>
-              <a:t>Revenons sur les </a:t>
-            </a:r>
-            <a:r>
-              <a:rPr lang="fr-FR" b="1" dirty="0"/>
-              <a:t>implications concrètes</a:t>
-            </a:r>
-            <a:r>
-              <a:rPr lang="fr-FR" dirty="0"/>
-              <a:t> pour les politiques publiques. Il ne s’agit pas seulement de moyens, mais de </a:t>
-            </a:r>
-            <a:r>
-              <a:rPr lang="fr-FR" b="1" dirty="0"/>
-              <a:t>répartition intelligente</a:t>
-            </a:r>
-            <a:r>
-              <a:rPr lang="fr-FR" dirty="0"/>
-              <a:t> des services. Le concept d’</a:t>
-            </a:r>
-            <a:r>
-              <a:rPr lang="fr-FR" b="1" dirty="0"/>
-              <a:t>exode sanitaire</a:t>
-            </a:r>
-            <a:r>
-              <a:rPr lang="fr-FR" dirty="0"/>
-              <a:t> peut illustrer le déséquilibre et justifier des politiques ciblées.</a:t>
-            </a:r>
+            <a:endParaRPr lang="fr-FR" dirty="0"/>
           </a:p>
         </p:txBody>
       </p:sp>
       <p:sp>
         <p:nvSpPr>
-          <p:cNvPr id="4" name="Espace réservé du numéro de diapositive 3"/>
+          <p:cNvPr id="4" name="Slide Number Placeholder 3"/>
           <p:cNvSpPr>
             <a:spLocks noGrp="1"/>
           </p:cNvSpPr>
@@ -6705,7 +7298,7 @@
           <a:p>
             <a:fld id="{45C44DBB-F87B-49EA-91FB-EDB78BBE8593}" type="slidenum">
               <a:rPr lang="fr-FR" smtClean="0"/>
-              <a:t>27</a:t>
+              <a:t>16</a:t>
             </a:fld>
             <a:endParaRPr lang="fr-FR"/>
           </a:p>
@@ -6714,7 +7307,7 @@
     </p:spTree>
     <p:extLst>
       <p:ext uri="{BB962C8B-B14F-4D97-AF65-F5344CB8AC3E}">
-        <p14:creationId xmlns:p14="http://schemas.microsoft.com/office/powerpoint/2010/main" val="1814091251"/>
+        <p14:creationId xmlns:p14="http://schemas.microsoft.com/office/powerpoint/2010/main" val="991168377"/>
       </p:ext>
     </p:extLst>
   </p:cSld>
@@ -6865,7 +7458,7 @@
             <a:fld id="{B4BDA9CF-F2B2-41BE-8486-9C59032E0655}" type="datetime4">
               <a:rPr lang="fr-FR" smtClean="0"/>
               <a:pPr/>
-              <a:t>27 avril 2025</a:t>
+              <a:t>28 avril 2025</a:t>
             </a:fld>
             <a:endParaRPr lang="fr-FR" dirty="0"/>
           </a:p>
@@ -6942,7 +7535,7 @@
             <a:fld id="{F546B7B7-7D14-4795-A998-350CFB2BDD43}" type="slidenum">
               <a:rPr lang="fr-FR" smtClean="0"/>
               <a:pPr/>
-              <a:t>‹#›</a:t>
+              <a:t>‹N°›</a:t>
             </a:fld>
             <a:endParaRPr lang="fr-FR"/>
           </a:p>
@@ -7039,7 +7632,7 @@
           <a:p>
             <a:fld id="{F546B7B7-7D14-4795-A998-350CFB2BDD43}" type="slidenum">
               <a:rPr lang="fr-FR" smtClean="0"/>
-              <a:t>‹#›</a:t>
+              <a:t>‹N°›</a:t>
             </a:fld>
             <a:endParaRPr lang="fr-FR"/>
           </a:p>
@@ -7208,7 +7801,7 @@
             <a:fld id="{F546B7B7-7D14-4795-A998-350CFB2BDD43}" type="slidenum">
               <a:rPr lang="fr-FR" smtClean="0"/>
               <a:pPr/>
-              <a:t>‹#›</a:t>
+              <a:t>‹N°›</a:t>
             </a:fld>
             <a:endParaRPr lang="fr-FR"/>
           </a:p>
@@ -7334,7 +7927,7 @@
             <a:fld id="{F546B7B7-7D14-4795-A998-350CFB2BDD43}" type="slidenum">
               <a:rPr lang="fr-FR" smtClean="0"/>
               <a:pPr/>
-              <a:t>‹#›</a:t>
+              <a:t>‹N°›</a:t>
             </a:fld>
             <a:endParaRPr lang="fr-FR"/>
           </a:p>
@@ -7694,7 +8287,7 @@
             <a:fld id="{F546B7B7-7D14-4795-A998-350CFB2BDD43}" type="slidenum">
               <a:rPr lang="fr-FR" smtClean="0"/>
               <a:pPr/>
-              <a:t>‹#›</a:t>
+              <a:t>‹N°›</a:t>
             </a:fld>
             <a:endParaRPr lang="fr-FR"/>
           </a:p>
@@ -8054,7 +8647,7 @@
             <a:fld id="{F546B7B7-7D14-4795-A998-350CFB2BDD43}" type="slidenum">
               <a:rPr lang="fr-FR" smtClean="0"/>
               <a:pPr/>
-              <a:t>‹#›</a:t>
+              <a:t>‹N°›</a:t>
             </a:fld>
             <a:endParaRPr lang="fr-FR"/>
           </a:p>
@@ -8414,7 +9007,7 @@
             <a:fld id="{F546B7B7-7D14-4795-A998-350CFB2BDD43}" type="slidenum">
               <a:rPr lang="fr-FR" smtClean="0"/>
               <a:pPr/>
-              <a:t>‹#›</a:t>
+              <a:t>‹N°›</a:t>
             </a:fld>
             <a:endParaRPr lang="fr-FR"/>
           </a:p>
@@ -8769,7 +9362,7 @@
             <a:fld id="{F546B7B7-7D14-4795-A998-350CFB2BDD43}" type="slidenum">
               <a:rPr lang="fr-FR" smtClean="0"/>
               <a:pPr/>
-              <a:t>‹#›</a:t>
+              <a:t>‹N°›</a:t>
             </a:fld>
             <a:endParaRPr lang="fr-FR"/>
           </a:p>
@@ -9124,7 +9717,7 @@
             <a:fld id="{F546B7B7-7D14-4795-A998-350CFB2BDD43}" type="slidenum">
               <a:rPr lang="fr-FR" smtClean="0"/>
               <a:pPr/>
-              <a:t>‹#›</a:t>
+              <a:t>‹N°›</a:t>
             </a:fld>
             <a:endParaRPr lang="fr-FR"/>
           </a:p>
@@ -9781,7 +10374,7 @@
             <a:fld id="{F546B7B7-7D14-4795-A998-350CFB2BDD43}" type="slidenum">
               <a:rPr lang="fr-FR" smtClean="0"/>
               <a:pPr/>
-              <a:t>‹#›</a:t>
+              <a:t>‹N°›</a:t>
             </a:fld>
             <a:endParaRPr lang="fr-FR"/>
           </a:p>
@@ -10337,7 +10930,7 @@
             <a:fld id="{F546B7B7-7D14-4795-A998-350CFB2BDD43}" type="slidenum">
               <a:rPr lang="fr-FR" smtClean="0"/>
               <a:pPr/>
-              <a:t>‹#›</a:t>
+              <a:t>‹N°›</a:t>
             </a:fld>
             <a:endParaRPr lang="fr-FR"/>
           </a:p>
@@ -11119,7 +11712,7 @@
             <a:fld id="{F546B7B7-7D14-4795-A998-350CFB2BDD43}" type="slidenum">
               <a:rPr lang="fr-FR" smtClean="0"/>
               <a:pPr/>
-              <a:t>‹#›</a:t>
+              <a:t>‹N°›</a:t>
             </a:fld>
             <a:endParaRPr lang="fr-FR"/>
           </a:p>
@@ -12241,7 +12834,7 @@
             <a:fld id="{F546B7B7-7D14-4795-A998-350CFB2BDD43}" type="slidenum">
               <a:rPr lang="fr-FR" smtClean="0"/>
               <a:pPr/>
-              <a:t>‹#›</a:t>
+              <a:t>‹N°›</a:t>
             </a:fld>
             <a:endParaRPr lang="fr-FR"/>
           </a:p>
@@ -13993,6 +14586,202 @@
       </p:grpSpPr>
       <p:sp>
         <p:nvSpPr>
+          <p:cNvPr id="25" name="Bulle narrative : rectangle 24">
+            <a:extLst>
+              <a:ext uri="{FF2B5EF4-FFF2-40B4-BE49-F238E27FC236}">
+                <a16:creationId xmlns:a16="http://schemas.microsoft.com/office/drawing/2014/main" id="{03741D8F-5252-3C14-6EB1-393B79A58E2E}"/>
+              </a:ext>
+            </a:extLst>
+          </p:cNvPr>
+          <p:cNvSpPr/>
+          <p:nvPr/>
+        </p:nvSpPr>
+        <p:spPr>
+          <a:xfrm>
+            <a:off x="8954677" y="5171417"/>
+            <a:ext cx="2116463" cy="646331"/>
+          </a:xfrm>
+          <a:prstGeom prst="wedgeRectCallout">
+            <a:avLst>
+              <a:gd name="adj1" fmla="val -13594"/>
+              <a:gd name="adj2" fmla="val -164963"/>
+            </a:avLst>
+          </a:prstGeom>
+          <a:solidFill>
+            <a:schemeClr val="accent4">
+              <a:lumMod val="75000"/>
+            </a:schemeClr>
+          </a:solidFill>
+          <a:ln>
+            <a:noFill/>
+          </a:ln>
+        </p:spPr>
+        <p:style>
+          <a:lnRef idx="2">
+            <a:schemeClr val="accent1">
+              <a:shade val="15000"/>
+            </a:schemeClr>
+          </a:lnRef>
+          <a:fillRef idx="1">
+            <a:schemeClr val="accent1"/>
+          </a:fillRef>
+          <a:effectRef idx="0">
+            <a:schemeClr val="accent1"/>
+          </a:effectRef>
+          <a:fontRef idx="minor">
+            <a:schemeClr val="lt1"/>
+          </a:fontRef>
+        </p:style>
+        <p:txBody>
+          <a:bodyPr rtlCol="0" anchor="ctr"/>
+          <a:lstStyle/>
+          <a:p>
+            <a:pPr algn="ctr"/>
+            <a:r>
+              <a:rPr lang="fr-FR" sz="2000" noProof="0" dirty="0">
+                <a:latin typeface="Gill Sans MT" panose="020B0502020104020203" pitchFamily="34" charset="0"/>
+              </a:rPr>
+              <a:t>Dépendance dans les erreurs</a:t>
+            </a:r>
+          </a:p>
+        </p:txBody>
+      </p:sp>
+      <p:sp>
+        <p:nvSpPr>
+          <p:cNvPr id="23" name="Bulle narrative : rectangle 22">
+            <a:extLst>
+              <a:ext uri="{FF2B5EF4-FFF2-40B4-BE49-F238E27FC236}">
+                <a16:creationId xmlns:a16="http://schemas.microsoft.com/office/drawing/2014/main" id="{51920941-C001-044B-CB30-EA4A2208698B}"/>
+              </a:ext>
+            </a:extLst>
+          </p:cNvPr>
+          <p:cNvSpPr/>
+          <p:nvPr/>
+        </p:nvSpPr>
+        <p:spPr>
+          <a:xfrm>
+            <a:off x="342074" y="1882607"/>
+            <a:ext cx="2116463" cy="646331"/>
+          </a:xfrm>
+          <a:prstGeom prst="wedgeRectCallout">
+            <a:avLst>
+              <a:gd name="adj1" fmla="val -27995"/>
+              <a:gd name="adj2" fmla="val 170199"/>
+            </a:avLst>
+          </a:prstGeom>
+          <a:solidFill>
+            <a:schemeClr val="accent4">
+              <a:lumMod val="75000"/>
+            </a:schemeClr>
+          </a:solidFill>
+          <a:ln>
+            <a:noFill/>
+          </a:ln>
+        </p:spPr>
+        <p:style>
+          <a:lnRef idx="2">
+            <a:schemeClr val="accent1">
+              <a:shade val="15000"/>
+            </a:schemeClr>
+          </a:lnRef>
+          <a:fillRef idx="1">
+            <a:schemeClr val="accent1"/>
+          </a:fillRef>
+          <a:effectRef idx="0">
+            <a:schemeClr val="accent1"/>
+          </a:effectRef>
+          <a:fontRef idx="minor">
+            <a:schemeClr val="lt1"/>
+          </a:fontRef>
+        </p:style>
+        <p:txBody>
+          <a:bodyPr rtlCol="0" anchor="ctr"/>
+          <a:lstStyle/>
+          <a:p>
+            <a:pPr algn="ctr"/>
+            <a:r>
+              <a:rPr lang="fr-FR" sz="2000" noProof="0" dirty="0">
+                <a:latin typeface="Gill Sans MT" panose="020B0502020104020203" pitchFamily="34" charset="0"/>
+              </a:rPr>
+              <a:t>Dépendance endogène</a:t>
+            </a:r>
+          </a:p>
+        </p:txBody>
+      </p:sp>
+      <p:sp>
+        <p:nvSpPr>
+          <p:cNvPr id="24" name="Bulle narrative : rectangle 23">
+            <a:extLst>
+              <a:ext uri="{FF2B5EF4-FFF2-40B4-BE49-F238E27FC236}">
+                <a16:creationId xmlns:a16="http://schemas.microsoft.com/office/drawing/2014/main" id="{D50EEF8E-CAA7-D265-A7F5-1294CBCA85CB}"/>
+              </a:ext>
+            </a:extLst>
+          </p:cNvPr>
+          <p:cNvSpPr/>
+          <p:nvPr/>
+        </p:nvSpPr>
+        <p:spPr>
+          <a:xfrm>
+            <a:off x="8150365" y="1961069"/>
+            <a:ext cx="2116463" cy="646331"/>
+          </a:xfrm>
+          <a:prstGeom prst="wedgeRectCallout">
+            <a:avLst>
+              <a:gd name="adj1" fmla="val -161208"/>
+              <a:gd name="adj2" fmla="val 173567"/>
+            </a:avLst>
+          </a:prstGeom>
+          <a:solidFill>
+            <a:srgbClr val="C00000"/>
+          </a:solidFill>
+          <a:ln>
+            <a:noFill/>
+          </a:ln>
+        </p:spPr>
+        <p:style>
+          <a:lnRef idx="2">
+            <a:schemeClr val="accent1">
+              <a:shade val="15000"/>
+            </a:schemeClr>
+          </a:lnRef>
+          <a:fillRef idx="1">
+            <a:schemeClr val="accent1"/>
+          </a:fillRef>
+          <a:effectRef idx="0">
+            <a:schemeClr val="accent1"/>
+          </a:effectRef>
+          <a:fontRef idx="minor">
+            <a:schemeClr val="lt1"/>
+          </a:fontRef>
+        </p:style>
+        <p:txBody>
+          <a:bodyPr rtlCol="0" anchor="ctr"/>
+          <a:lstStyle/>
+          <a:p>
+            <a:pPr algn="ctr"/>
+            <a:r>
+              <a:rPr lang="fr-FR" sz="2000" noProof="0" dirty="0">
+                <a:latin typeface="Gill Sans MT" panose="020B0502020104020203" pitchFamily="34" charset="0"/>
+              </a:rPr>
+              <a:t>Dépendance </a:t>
+            </a:r>
+            <a:r>
+              <a:rPr lang="fr-FR" sz="2000" dirty="0">
+                <a:latin typeface="Gill Sans MT" panose="020B0502020104020203" pitchFamily="34" charset="0"/>
+              </a:rPr>
+              <a:t>exo</a:t>
+            </a:r>
+            <a:r>
+              <a:rPr lang="fr-FR" sz="2000" noProof="0" dirty="0">
+                <a:latin typeface="Gill Sans MT" panose="020B0502020104020203" pitchFamily="34" charset="0"/>
+              </a:rPr>
+              <a:t>gène</a:t>
+            </a:r>
+          </a:p>
+        </p:txBody>
+      </p:sp>
+      <p:sp>
+        <p:nvSpPr>
           <p:cNvPr id="2" name="Espace réservé du numéro de diapositive 1">
             <a:extLst>
               <a:ext uri="{FF2B5EF4-FFF2-40B4-BE49-F238E27FC236}">
@@ -14017,7 +14806,7 @@
               <a:pPr/>
               <a:t>11</a:t>
             </a:fld>
-            <a:endParaRPr lang="fr-FR"/>
+            <a:endParaRPr lang="fr-FR" dirty="0"/>
           </a:p>
         </p:txBody>
       </p:sp>
@@ -14078,13 +14867,13 @@
           <p:nvPr/>
         </p:nvPicPr>
         <p:blipFill>
-          <a:blip r:embed="rId2">
+          <a:blip r:embed="rId3">
             <a:extLst>
               <a:ext uri="{28A0092B-C50C-407E-A947-70E740481C1C}">
                 <a14:useLocalDpi xmlns:a14="http://schemas.microsoft.com/office/drawing/2010/main" val="0"/>
               </a:ext>
               <a:ext uri="{96DAC541-7B7A-43D3-8B79-37D633B846F1}">
-                <asvg:svgBlip xmlns:asvg="http://schemas.microsoft.com/office/drawing/2016/SVG/main" r:embed="rId3"/>
+                <asvg:svgBlip xmlns:asvg="http://schemas.microsoft.com/office/drawing/2016/SVG/main" r:embed="rId4"/>
               </a:ext>
             </a:extLst>
           </a:blip>
@@ -14116,7 +14905,7 @@
         </p:nvSpPr>
         <p:spPr>
           <a:xfrm>
-            <a:off x="570676" y="1664256"/>
+            <a:off x="4446319" y="1649189"/>
             <a:ext cx="3585236" cy="461665"/>
           </a:xfrm>
           <a:prstGeom prst="rect">
@@ -14132,12 +14921,18 @@
           <a:p>
             <a:r>
               <a:rPr lang="fr-FR" sz="2400" b="1" dirty="0">
+                <a:solidFill>
+                  <a:srgbClr val="006A5A"/>
+                </a:solidFill>
                 <a:latin typeface="Gill Sans MT" panose="020B0502020104020203" pitchFamily="34" charset="0"/>
               </a:rPr>
               <a:t>MCO</a:t>
             </a:r>
             <a:r>
               <a:rPr lang="fr-FR" sz="2400" dirty="0">
+                <a:solidFill>
+                  <a:srgbClr val="006A5A"/>
+                </a:solidFill>
                 <a:latin typeface="Gill Sans MT" panose="020B0502020104020203" pitchFamily="34" charset="0"/>
               </a:rPr>
               <a:t>(Modèle classique) </a:t>
@@ -14159,7 +14954,7 @@
         </p:nvSpPr>
         <p:spPr>
           <a:xfrm>
-            <a:off x="570676" y="3264703"/>
+            <a:off x="342074" y="3319133"/>
             <a:ext cx="3697070" cy="461665"/>
           </a:xfrm>
           <a:prstGeom prst="rect">
@@ -14183,51 +14978,93 @@
           </a:lstStyle>
           <a:p>
             <a:r>
-              <a:rPr lang="fr-FR" b="1" dirty="0"/>
+              <a:rPr lang="fr-FR" b="1" dirty="0">
+                <a:solidFill>
+                  <a:schemeClr val="accent4">
+                    <a:lumMod val="75000"/>
+                  </a:schemeClr>
+                </a:solidFill>
+              </a:rPr>
               <a:t>SAR </a:t>
             </a:r>
             <a:r>
-              <a:rPr lang="fr-FR" dirty="0"/>
+              <a:rPr lang="fr-FR" dirty="0">
+                <a:solidFill>
+                  <a:schemeClr val="accent4">
+                    <a:lumMod val="75000"/>
+                  </a:schemeClr>
+                </a:solidFill>
+              </a:rPr>
               <a:t>(</a:t>
             </a:r>
             <a:r>
               <a:rPr lang="fr-FR" b="1" dirty="0">
                 <a:solidFill>
-                  <a:srgbClr val="006A5A"/>
+                  <a:schemeClr val="accent4">
+                    <a:lumMod val="75000"/>
+                  </a:schemeClr>
                 </a:solidFill>
               </a:rPr>
               <a:t>S</a:t>
             </a:r>
             <a:r>
-              <a:rPr lang="fr-FR" dirty="0"/>
+              <a:rPr lang="fr-FR" dirty="0">
+                <a:solidFill>
+                  <a:schemeClr val="accent4">
+                    <a:lumMod val="75000"/>
+                  </a:schemeClr>
+                </a:solidFill>
+              </a:rPr>
               <a:t>patial </a:t>
             </a:r>
             <a:r>
               <a:rPr lang="fr-FR" b="1" dirty="0" err="1">
                 <a:solidFill>
-                  <a:srgbClr val="006A5A"/>
+                  <a:schemeClr val="accent4">
+                    <a:lumMod val="75000"/>
+                  </a:schemeClr>
                 </a:solidFill>
               </a:rPr>
               <a:t>A</a:t>
             </a:r>
             <a:r>
-              <a:rPr lang="fr-FR" dirty="0" err="1"/>
+              <a:rPr lang="fr-FR" dirty="0" err="1">
+                <a:solidFill>
+                  <a:schemeClr val="accent4">
+                    <a:lumMod val="75000"/>
+                  </a:schemeClr>
+                </a:solidFill>
+              </a:rPr>
               <a:t>uto</a:t>
             </a:r>
             <a:r>
               <a:rPr lang="fr-FR" b="1" dirty="0" err="1">
                 <a:solidFill>
-                  <a:srgbClr val="006A5A"/>
+                  <a:schemeClr val="accent4">
+                    <a:lumMod val="75000"/>
+                  </a:schemeClr>
                 </a:solidFill>
               </a:rPr>
               <a:t>R</a:t>
             </a:r>
             <a:r>
-              <a:rPr lang="fr-FR" dirty="0" err="1"/>
+              <a:rPr lang="fr-FR" dirty="0" err="1">
+                <a:solidFill>
+                  <a:schemeClr val="accent4">
+                    <a:lumMod val="75000"/>
+                  </a:schemeClr>
+                </a:solidFill>
+              </a:rPr>
               <a:t>egresif</a:t>
             </a:r>
             <a:r>
-              <a:rPr lang="fr-FR" dirty="0"/>
+              <a:rPr lang="fr-FR" dirty="0">
+                <a:solidFill>
+                  <a:schemeClr val="accent4">
+                    <a:lumMod val="75000"/>
+                  </a:schemeClr>
+                </a:solidFill>
+              </a:rPr>
               <a:t>)</a:t>
             </a:r>
           </a:p>
@@ -14247,7 +15084,7 @@
         </p:nvSpPr>
         <p:spPr>
           <a:xfrm>
-            <a:off x="7309260" y="1658361"/>
+            <a:off x="8711502" y="3330668"/>
             <a:ext cx="3585237" cy="461665"/>
           </a:xfrm>
           <a:prstGeom prst="rect">
@@ -14271,51 +15108,75 @@
           </a:lstStyle>
           <a:p>
             <a:r>
-              <a:rPr lang="fr-FR" b="1" dirty="0"/>
+              <a:rPr lang="fr-FR" b="1" dirty="0">
+                <a:solidFill>
+                  <a:schemeClr val="accent1"/>
+                </a:solidFill>
+              </a:rPr>
               <a:t>SEM</a:t>
             </a:r>
             <a:r>
-              <a:rPr lang="fr-FR" dirty="0"/>
+              <a:rPr lang="fr-FR" dirty="0">
+                <a:solidFill>
+                  <a:schemeClr val="accent1"/>
+                </a:solidFill>
+              </a:rPr>
               <a:t>(</a:t>
             </a:r>
             <a:r>
               <a:rPr lang="fr-FR" b="1" dirty="0">
                 <a:solidFill>
-                  <a:srgbClr val="006A5A"/>
+                  <a:schemeClr val="accent1"/>
                 </a:solidFill>
               </a:rPr>
               <a:t>S</a:t>
             </a:r>
             <a:r>
-              <a:rPr lang="fr-FR" dirty="0"/>
+              <a:rPr lang="fr-FR" dirty="0">
+                <a:solidFill>
+                  <a:schemeClr val="accent1"/>
+                </a:solidFill>
+              </a:rPr>
               <a:t>patial </a:t>
             </a:r>
             <a:r>
               <a:rPr lang="fr-FR" b="1" dirty="0" err="1">
                 <a:solidFill>
-                  <a:srgbClr val="006A5A"/>
+                  <a:schemeClr val="accent1"/>
                 </a:solidFill>
               </a:rPr>
               <a:t>E</a:t>
             </a:r>
             <a:r>
-              <a:rPr lang="fr-FR" dirty="0" err="1"/>
+              <a:rPr lang="fr-FR" dirty="0" err="1">
+                <a:solidFill>
+                  <a:schemeClr val="accent1"/>
+                </a:solidFill>
+              </a:rPr>
               <a:t>rror</a:t>
             </a:r>
             <a:r>
-              <a:rPr lang="fr-FR" dirty="0"/>
+              <a:rPr lang="fr-FR" dirty="0">
+                <a:solidFill>
+                  <a:schemeClr val="accent1"/>
+                </a:solidFill>
+              </a:rPr>
               <a:t> </a:t>
             </a:r>
             <a:r>
               <a:rPr lang="fr-FR" b="1" dirty="0">
                 <a:solidFill>
-                  <a:srgbClr val="006A5A"/>
+                  <a:schemeClr val="accent1"/>
                 </a:solidFill>
               </a:rPr>
               <a:t>M</a:t>
             </a:r>
             <a:r>
-              <a:rPr lang="fr-FR" dirty="0"/>
+              <a:rPr lang="fr-FR" dirty="0">
+                <a:solidFill>
+                  <a:schemeClr val="accent1"/>
+                </a:solidFill>
+              </a:rPr>
               <a:t>odel)</a:t>
             </a:r>
           </a:p>
@@ -14335,7 +15196,7 @@
         </p:nvSpPr>
         <p:spPr>
           <a:xfrm>
-            <a:off x="7309260" y="3127011"/>
+            <a:off x="4446319" y="3335274"/>
             <a:ext cx="4137186" cy="461665"/>
           </a:xfrm>
           <a:prstGeom prst="rect">
@@ -14359,47 +15220,67 @@
           </a:lstStyle>
           <a:p>
             <a:r>
-              <a:rPr lang="fr-FR" b="1" dirty="0"/>
+              <a:rPr lang="fr-FR" b="1" dirty="0">
+                <a:solidFill>
+                  <a:srgbClr val="C00000"/>
+                </a:solidFill>
+              </a:rPr>
               <a:t>SLX</a:t>
             </a:r>
             <a:r>
-              <a:rPr lang="fr-FR" dirty="0"/>
+              <a:rPr lang="fr-FR" dirty="0">
+                <a:solidFill>
+                  <a:srgbClr val="C00000"/>
+                </a:solidFill>
+              </a:rPr>
               <a:t>(</a:t>
             </a:r>
             <a:r>
               <a:rPr lang="fr-FR" b="1" dirty="0">
                 <a:solidFill>
-                  <a:srgbClr val="006A5A"/>
+                  <a:srgbClr val="C00000"/>
                 </a:solidFill>
               </a:rPr>
               <a:t>S</a:t>
             </a:r>
             <a:r>
-              <a:rPr lang="fr-FR" dirty="0"/>
+              <a:rPr lang="fr-FR" dirty="0">
+                <a:solidFill>
+                  <a:srgbClr val="C00000"/>
+                </a:solidFill>
+              </a:rPr>
               <a:t>patial </a:t>
             </a:r>
             <a:r>
               <a:rPr lang="fr-FR" b="1" dirty="0">
                 <a:solidFill>
-                  <a:srgbClr val="006A5A"/>
+                  <a:srgbClr val="C00000"/>
                 </a:solidFill>
               </a:rPr>
               <a:t>L</a:t>
             </a:r>
             <a:r>
-              <a:rPr lang="fr-FR" dirty="0"/>
+              <a:rPr lang="fr-FR" dirty="0">
+                <a:solidFill>
+                  <a:srgbClr val="C00000"/>
+                </a:solidFill>
+              </a:rPr>
               <a:t>ag of </a:t>
             </a:r>
             <a:r>
               <a:rPr lang="fr-FR" b="1" dirty="0">
                 <a:solidFill>
-                  <a:srgbClr val="006A5A"/>
+                  <a:srgbClr val="C00000"/>
                 </a:solidFill>
               </a:rPr>
               <a:t>X</a:t>
             </a:r>
             <a:r>
-              <a:rPr lang="fr-FR" dirty="0"/>
+              <a:rPr lang="fr-FR" dirty="0">
+                <a:solidFill>
+                  <a:srgbClr val="C00000"/>
+                </a:solidFill>
+              </a:rPr>
               <a:t> model)</a:t>
             </a:r>
           </a:p>
@@ -14419,7 +15300,7 @@
         </p:nvSpPr>
         <p:spPr>
           <a:xfrm>
-            <a:off x="4267746" y="4967598"/>
+            <a:off x="2417174" y="5185314"/>
             <a:ext cx="3894422" cy="461665"/>
           </a:xfrm>
           <a:prstGeom prst="rect">
@@ -14443,47 +15324,67 @@
           </a:lstStyle>
           <a:p>
             <a:r>
-              <a:rPr lang="fr-FR" b="1" dirty="0"/>
+              <a:rPr lang="fr-FR" b="1" dirty="0">
+                <a:solidFill>
+                  <a:srgbClr val="7030A0"/>
+                </a:solidFill>
+              </a:rPr>
               <a:t>SDM</a:t>
             </a:r>
             <a:r>
-              <a:rPr lang="fr-FR" dirty="0"/>
+              <a:rPr lang="fr-FR" dirty="0">
+                <a:solidFill>
+                  <a:srgbClr val="7030A0"/>
+                </a:solidFill>
+              </a:rPr>
               <a:t>(</a:t>
             </a:r>
             <a:r>
               <a:rPr lang="fr-FR" b="1" dirty="0">
                 <a:solidFill>
-                  <a:srgbClr val="006A5A"/>
+                  <a:srgbClr val="7030A0"/>
                 </a:solidFill>
               </a:rPr>
               <a:t>S</a:t>
             </a:r>
             <a:r>
-              <a:rPr lang="fr-FR" dirty="0"/>
+              <a:rPr lang="fr-FR" dirty="0">
+                <a:solidFill>
+                  <a:srgbClr val="7030A0"/>
+                </a:solidFill>
+              </a:rPr>
               <a:t>patial </a:t>
             </a:r>
             <a:r>
               <a:rPr lang="fr-FR" b="1" dirty="0">
                 <a:solidFill>
-                  <a:srgbClr val="006A5A"/>
+                  <a:srgbClr val="7030A0"/>
                 </a:solidFill>
               </a:rPr>
               <a:t>D</a:t>
             </a:r>
             <a:r>
-              <a:rPr lang="fr-FR" dirty="0"/>
+              <a:rPr lang="fr-FR" dirty="0">
+                <a:solidFill>
+                  <a:srgbClr val="7030A0"/>
+                </a:solidFill>
+              </a:rPr>
               <a:t>urbin </a:t>
             </a:r>
             <a:r>
               <a:rPr lang="fr-FR" b="1" dirty="0">
                 <a:solidFill>
-                  <a:srgbClr val="006A5A"/>
+                  <a:srgbClr val="7030A0"/>
                 </a:solidFill>
               </a:rPr>
               <a:t>M</a:t>
             </a:r>
             <a:r>
-              <a:rPr lang="fr-FR" dirty="0"/>
+              <a:rPr lang="fr-FR" dirty="0">
+                <a:solidFill>
+                  <a:srgbClr val="7030A0"/>
+                </a:solidFill>
+              </a:rPr>
               <a:t>odel)</a:t>
             </a:r>
           </a:p>
@@ -14503,7 +15404,7 @@
         </p:nvSpPr>
         <p:spPr>
           <a:xfrm>
-            <a:off x="317406" y="1817868"/>
+            <a:off x="4193049" y="1802801"/>
             <a:ext cx="203931" cy="197353"/>
           </a:xfrm>
           <a:prstGeom prst="rect">
@@ -14511,6 +15412,234 @@
           </a:prstGeom>
           <a:solidFill>
             <a:srgbClr val="006A5A"/>
+          </a:solidFill>
+          <a:ln>
+            <a:noFill/>
+          </a:ln>
+        </p:spPr>
+        <p:style>
+          <a:lnRef idx="2">
+            <a:schemeClr val="accent1">
+              <a:shade val="50000"/>
+            </a:schemeClr>
+          </a:lnRef>
+          <a:fillRef idx="1">
+            <a:schemeClr val="accent1"/>
+          </a:fillRef>
+          <a:effectRef idx="0">
+            <a:schemeClr val="accent1"/>
+          </a:effectRef>
+          <a:fontRef idx="minor">
+            <a:schemeClr val="lt1"/>
+          </a:fontRef>
+        </p:style>
+        <p:txBody>
+          <a:bodyPr rtlCol="0" anchor="ctr"/>
+          <a:lstStyle/>
+          <a:p>
+            <a:pPr algn="ctr"/>
+            <a:endParaRPr lang="fr-FR">
+              <a:solidFill>
+                <a:srgbClr val="006A5A"/>
+              </a:solidFill>
+            </a:endParaRPr>
+          </a:p>
+        </p:txBody>
+      </p:sp>
+      <p:sp>
+        <p:nvSpPr>
+          <p:cNvPr id="11" name="Rectangle 10">
+            <a:extLst>
+              <a:ext uri="{FF2B5EF4-FFF2-40B4-BE49-F238E27FC236}">
+                <a16:creationId xmlns:a16="http://schemas.microsoft.com/office/drawing/2014/main" id="{1D4F0291-506F-4EF2-9B91-4B4432012D97}"/>
+              </a:ext>
+            </a:extLst>
+          </p:cNvPr>
+          <p:cNvSpPr/>
+          <p:nvPr/>
+        </p:nvSpPr>
+        <p:spPr>
+          <a:xfrm>
+            <a:off x="88803" y="3451288"/>
+            <a:ext cx="203931" cy="197353"/>
+          </a:xfrm>
+          <a:prstGeom prst="rect">
+            <a:avLst/>
+          </a:prstGeom>
+          <a:solidFill>
+            <a:schemeClr val="accent4">
+              <a:lumMod val="75000"/>
+            </a:schemeClr>
+          </a:solidFill>
+          <a:ln>
+            <a:noFill/>
+          </a:ln>
+        </p:spPr>
+        <p:style>
+          <a:lnRef idx="2">
+            <a:schemeClr val="accent1">
+              <a:shade val="50000"/>
+            </a:schemeClr>
+          </a:lnRef>
+          <a:fillRef idx="1">
+            <a:schemeClr val="accent1"/>
+          </a:fillRef>
+          <a:effectRef idx="0">
+            <a:schemeClr val="accent1"/>
+          </a:effectRef>
+          <a:fontRef idx="minor">
+            <a:schemeClr val="lt1"/>
+          </a:fontRef>
+        </p:style>
+        <p:txBody>
+          <a:bodyPr rtlCol="0" anchor="ctr"/>
+          <a:lstStyle/>
+          <a:p>
+            <a:pPr algn="ctr"/>
+            <a:endParaRPr lang="fr-FR">
+              <a:solidFill>
+                <a:schemeClr val="accent4">
+                  <a:lumMod val="75000"/>
+                </a:schemeClr>
+              </a:solidFill>
+            </a:endParaRPr>
+          </a:p>
+        </p:txBody>
+      </p:sp>
+      <p:sp>
+        <p:nvSpPr>
+          <p:cNvPr id="12" name="Rectangle 11">
+            <a:extLst>
+              <a:ext uri="{FF2B5EF4-FFF2-40B4-BE49-F238E27FC236}">
+                <a16:creationId xmlns:a16="http://schemas.microsoft.com/office/drawing/2014/main" id="{9178589A-CC7E-473B-884D-A479078A8174}"/>
+              </a:ext>
+            </a:extLst>
+          </p:cNvPr>
+          <p:cNvSpPr/>
+          <p:nvPr/>
+        </p:nvSpPr>
+        <p:spPr>
+          <a:xfrm>
+            <a:off x="8458233" y="3494356"/>
+            <a:ext cx="203931" cy="197353"/>
+          </a:xfrm>
+          <a:prstGeom prst="rect">
+            <a:avLst/>
+          </a:prstGeom>
+          <a:solidFill>
+            <a:schemeClr val="accent1"/>
+          </a:solidFill>
+          <a:ln>
+            <a:noFill/>
+          </a:ln>
+        </p:spPr>
+        <p:style>
+          <a:lnRef idx="2">
+            <a:schemeClr val="accent1">
+              <a:shade val="50000"/>
+            </a:schemeClr>
+          </a:lnRef>
+          <a:fillRef idx="1">
+            <a:schemeClr val="accent1"/>
+          </a:fillRef>
+          <a:effectRef idx="0">
+            <a:schemeClr val="accent1"/>
+          </a:effectRef>
+          <a:fontRef idx="minor">
+            <a:schemeClr val="lt1"/>
+          </a:fontRef>
+        </p:style>
+        <p:txBody>
+          <a:bodyPr rtlCol="0" anchor="ctr"/>
+          <a:lstStyle/>
+          <a:p>
+            <a:pPr algn="ctr"/>
+            <a:endParaRPr lang="fr-FR">
+              <a:solidFill>
+                <a:schemeClr val="accent1"/>
+              </a:solidFill>
+            </a:endParaRPr>
+          </a:p>
+        </p:txBody>
+      </p:sp>
+      <p:sp>
+        <p:nvSpPr>
+          <p:cNvPr id="13" name="Rectangle 12">
+            <a:extLst>
+              <a:ext uri="{FF2B5EF4-FFF2-40B4-BE49-F238E27FC236}">
+                <a16:creationId xmlns:a16="http://schemas.microsoft.com/office/drawing/2014/main" id="{B4E803D5-3B40-440D-8151-5EF4C6E7C9CA}"/>
+              </a:ext>
+            </a:extLst>
+          </p:cNvPr>
+          <p:cNvSpPr/>
+          <p:nvPr/>
+        </p:nvSpPr>
+        <p:spPr>
+          <a:xfrm>
+            <a:off x="4193049" y="3467429"/>
+            <a:ext cx="203931" cy="197353"/>
+          </a:xfrm>
+          <a:prstGeom prst="rect">
+            <a:avLst/>
+          </a:prstGeom>
+          <a:solidFill>
+            <a:srgbClr val="C00000"/>
+          </a:solidFill>
+          <a:ln>
+            <a:noFill/>
+          </a:ln>
+        </p:spPr>
+        <p:style>
+          <a:lnRef idx="2">
+            <a:schemeClr val="accent1">
+              <a:shade val="50000"/>
+            </a:schemeClr>
+          </a:lnRef>
+          <a:fillRef idx="1">
+            <a:schemeClr val="accent1"/>
+          </a:fillRef>
+          <a:effectRef idx="0">
+            <a:schemeClr val="accent1"/>
+          </a:effectRef>
+          <a:fontRef idx="minor">
+            <a:schemeClr val="lt1"/>
+          </a:fontRef>
+        </p:style>
+        <p:txBody>
+          <a:bodyPr rtlCol="0" anchor="ctr"/>
+          <a:lstStyle/>
+          <a:p>
+            <a:pPr algn="ctr"/>
+            <a:endParaRPr lang="fr-FR" dirty="0">
+              <a:solidFill>
+                <a:srgbClr val="C00000"/>
+              </a:solidFill>
+            </a:endParaRPr>
+          </a:p>
+        </p:txBody>
+      </p:sp>
+      <p:sp>
+        <p:nvSpPr>
+          <p:cNvPr id="14" name="Rectangle 13">
+            <a:extLst>
+              <a:ext uri="{FF2B5EF4-FFF2-40B4-BE49-F238E27FC236}">
+                <a16:creationId xmlns:a16="http://schemas.microsoft.com/office/drawing/2014/main" id="{1421FB3C-83A0-4FCD-904A-42050F6EBA00}"/>
+              </a:ext>
+            </a:extLst>
+          </p:cNvPr>
+          <p:cNvSpPr/>
+          <p:nvPr/>
+        </p:nvSpPr>
+        <p:spPr>
+          <a:xfrm>
+            <a:off x="2093276" y="5328644"/>
+            <a:ext cx="203931" cy="197353"/>
+          </a:xfrm>
+          <a:prstGeom prst="rect">
+            <a:avLst/>
+          </a:prstGeom>
+          <a:solidFill>
+            <a:srgbClr val="7030A0"/>
           </a:solidFill>
         </p:spPr>
         <p:style>
@@ -14534,203 +15663,11 @@
           <a:lstStyle/>
           <a:p>
             <a:pPr algn="ctr"/>
-            <a:endParaRPr lang="fr-FR"/>
-          </a:p>
-        </p:txBody>
-      </p:sp>
-      <p:sp>
-        <p:nvSpPr>
-          <p:cNvPr id="11" name="Rectangle 10">
-            <a:extLst>
-              <a:ext uri="{FF2B5EF4-FFF2-40B4-BE49-F238E27FC236}">
-                <a16:creationId xmlns:a16="http://schemas.microsoft.com/office/drawing/2014/main" id="{1D4F0291-506F-4EF2-9B91-4B4432012D97}"/>
-              </a:ext>
-            </a:extLst>
-          </p:cNvPr>
-          <p:cNvSpPr/>
-          <p:nvPr/>
-        </p:nvSpPr>
-        <p:spPr>
-          <a:xfrm>
-            <a:off x="317405" y="3396858"/>
-            <a:ext cx="203931" cy="197353"/>
-          </a:xfrm>
-          <a:prstGeom prst="rect">
-            <a:avLst/>
-          </a:prstGeom>
-          <a:solidFill>
-            <a:srgbClr val="006A5A"/>
-          </a:solidFill>
-        </p:spPr>
-        <p:style>
-          <a:lnRef idx="2">
-            <a:schemeClr val="accent1">
-              <a:shade val="50000"/>
-            </a:schemeClr>
-          </a:lnRef>
-          <a:fillRef idx="1">
-            <a:schemeClr val="accent1"/>
-          </a:fillRef>
-          <a:effectRef idx="0">
-            <a:schemeClr val="accent1"/>
-          </a:effectRef>
-          <a:fontRef idx="minor">
-            <a:schemeClr val="lt1"/>
-          </a:fontRef>
-        </p:style>
-        <p:txBody>
-          <a:bodyPr rtlCol="0" anchor="ctr"/>
-          <a:lstStyle/>
-          <a:p>
-            <a:pPr algn="ctr"/>
-            <a:endParaRPr lang="fr-FR"/>
-          </a:p>
-        </p:txBody>
-      </p:sp>
-      <p:sp>
-        <p:nvSpPr>
-          <p:cNvPr id="12" name="Rectangle 11">
-            <a:extLst>
-              <a:ext uri="{FF2B5EF4-FFF2-40B4-BE49-F238E27FC236}">
-                <a16:creationId xmlns:a16="http://schemas.microsoft.com/office/drawing/2014/main" id="{9178589A-CC7E-473B-884D-A479078A8174}"/>
-              </a:ext>
-            </a:extLst>
-          </p:cNvPr>
-          <p:cNvSpPr/>
-          <p:nvPr/>
-        </p:nvSpPr>
-        <p:spPr>
-          <a:xfrm>
-            <a:off x="7055991" y="1822049"/>
-            <a:ext cx="203931" cy="197353"/>
-          </a:xfrm>
-          <a:prstGeom prst="rect">
-            <a:avLst/>
-          </a:prstGeom>
-          <a:solidFill>
-            <a:srgbClr val="006A5A"/>
-          </a:solidFill>
-        </p:spPr>
-        <p:style>
-          <a:lnRef idx="2">
-            <a:schemeClr val="accent1">
-              <a:shade val="50000"/>
-            </a:schemeClr>
-          </a:lnRef>
-          <a:fillRef idx="1">
-            <a:schemeClr val="accent1"/>
-          </a:fillRef>
-          <a:effectRef idx="0">
-            <a:schemeClr val="accent1"/>
-          </a:effectRef>
-          <a:fontRef idx="minor">
-            <a:schemeClr val="lt1"/>
-          </a:fontRef>
-        </p:style>
-        <p:txBody>
-          <a:bodyPr rtlCol="0" anchor="ctr"/>
-          <a:lstStyle/>
-          <a:p>
-            <a:pPr algn="ctr"/>
-            <a:endParaRPr lang="fr-FR"/>
-          </a:p>
-        </p:txBody>
-      </p:sp>
-      <p:sp>
-        <p:nvSpPr>
-          <p:cNvPr id="13" name="Rectangle 12">
-            <a:extLst>
-              <a:ext uri="{FF2B5EF4-FFF2-40B4-BE49-F238E27FC236}">
-                <a16:creationId xmlns:a16="http://schemas.microsoft.com/office/drawing/2014/main" id="{B4E803D5-3B40-440D-8151-5EF4C6E7C9CA}"/>
-              </a:ext>
-            </a:extLst>
-          </p:cNvPr>
-          <p:cNvSpPr/>
-          <p:nvPr/>
-        </p:nvSpPr>
-        <p:spPr>
-          <a:xfrm>
-            <a:off x="7055990" y="3259166"/>
-            <a:ext cx="203931" cy="197353"/>
-          </a:xfrm>
-          <a:prstGeom prst="rect">
-            <a:avLst/>
-          </a:prstGeom>
-          <a:solidFill>
-            <a:srgbClr val="006A5A"/>
-          </a:solidFill>
-        </p:spPr>
-        <p:style>
-          <a:lnRef idx="2">
-            <a:schemeClr val="accent1">
-              <a:shade val="50000"/>
-            </a:schemeClr>
-          </a:lnRef>
-          <a:fillRef idx="1">
-            <a:schemeClr val="accent1"/>
-          </a:fillRef>
-          <a:effectRef idx="0">
-            <a:schemeClr val="accent1"/>
-          </a:effectRef>
-          <a:fontRef idx="minor">
-            <a:schemeClr val="lt1"/>
-          </a:fontRef>
-        </p:style>
-        <p:txBody>
-          <a:bodyPr rtlCol="0" anchor="ctr"/>
-          <a:lstStyle/>
-          <a:p>
-            <a:pPr algn="ctr"/>
-            <a:endParaRPr lang="fr-FR"/>
-          </a:p>
-        </p:txBody>
-      </p:sp>
-      <p:sp>
-        <p:nvSpPr>
-          <p:cNvPr id="14" name="Rectangle 13">
-            <a:extLst>
-              <a:ext uri="{FF2B5EF4-FFF2-40B4-BE49-F238E27FC236}">
-                <a16:creationId xmlns:a16="http://schemas.microsoft.com/office/drawing/2014/main" id="{1421FB3C-83A0-4FCD-904A-42050F6EBA00}"/>
-              </a:ext>
-            </a:extLst>
-          </p:cNvPr>
-          <p:cNvSpPr/>
-          <p:nvPr/>
-        </p:nvSpPr>
-        <p:spPr>
-          <a:xfrm>
-            <a:off x="3943848" y="5110928"/>
-            <a:ext cx="203931" cy="197353"/>
-          </a:xfrm>
-          <a:prstGeom prst="rect">
-            <a:avLst/>
-          </a:prstGeom>
-          <a:solidFill>
-            <a:srgbClr val="006A5A"/>
-          </a:solidFill>
-        </p:spPr>
-        <p:style>
-          <a:lnRef idx="2">
-            <a:schemeClr val="accent1">
-              <a:shade val="50000"/>
-            </a:schemeClr>
-          </a:lnRef>
-          <a:fillRef idx="1">
-            <a:schemeClr val="accent1"/>
-          </a:fillRef>
-          <a:effectRef idx="0">
-            <a:schemeClr val="accent1"/>
-          </a:effectRef>
-          <a:fontRef idx="minor">
-            <a:schemeClr val="lt1"/>
-          </a:fontRef>
-        </p:style>
-        <p:txBody>
-          <a:bodyPr rtlCol="0" anchor="ctr"/>
-          <a:lstStyle/>
-          <a:p>
-            <a:pPr algn="ctr"/>
-            <a:endParaRPr lang="fr-FR"/>
+            <a:endParaRPr lang="fr-FR" dirty="0">
+              <a:solidFill>
+                <a:srgbClr val="7030A0"/>
+              </a:solidFill>
+            </a:endParaRPr>
           </a:p>
         </p:txBody>
       </p:sp>
@@ -14750,7 +15687,7 @@
             </p:nvSpPr>
             <p:spPr>
               <a:xfrm>
-                <a:off x="962090" y="2257864"/>
+                <a:off x="4837733" y="2242797"/>
                 <a:ext cx="1958870" cy="430887"/>
               </a:xfrm>
               <a:prstGeom prst="rect">
@@ -14773,24 +15710,36 @@
                     <m:oMath xmlns:m="http://schemas.openxmlformats.org/officeDocument/2006/math">
                       <m:r>
                         <a:rPr lang="fr-FR" sz="2800" b="0" i="1" smtClean="0">
+                          <a:solidFill>
+                            <a:srgbClr val="006A5A"/>
+                          </a:solidFill>
                           <a:latin typeface="Cambria Math" panose="02040503050406030204" pitchFamily="18" charset="0"/>
                         </a:rPr>
                         <m:t>𝑌</m:t>
                       </m:r>
                       <m:r>
                         <a:rPr lang="fr-FR" sz="2800" b="0" i="1" smtClean="0">
+                          <a:solidFill>
+                            <a:srgbClr val="006A5A"/>
+                          </a:solidFill>
                           <a:latin typeface="Cambria Math" panose="02040503050406030204" pitchFamily="18" charset="0"/>
                         </a:rPr>
                         <m:t>=</m:t>
                       </m:r>
                       <m:r>
                         <a:rPr lang="fr-FR" sz="2800" b="0" i="1" smtClean="0">
+                          <a:solidFill>
+                            <a:srgbClr val="006A5A"/>
+                          </a:solidFill>
                           <a:latin typeface="Cambria Math" panose="02040503050406030204" pitchFamily="18" charset="0"/>
                         </a:rPr>
                         <m:t>𝑋</m:t>
                       </m:r>
                       <m:r>
                         <a:rPr lang="fr-FR" sz="2800" b="0" i="1" smtClean="0">
+                          <a:solidFill>
+                            <a:srgbClr val="006A5A"/>
+                          </a:solidFill>
                           <a:latin typeface="Cambria Math" panose="02040503050406030204" pitchFamily="18" charset="0"/>
                           <a:ea typeface="Cambria Math" panose="02040503050406030204" pitchFamily="18" charset="0"/>
                         </a:rPr>
@@ -14798,6 +15747,9 @@
                       </m:r>
                       <m:r>
                         <a:rPr lang="fr-FR" sz="2800" b="0" i="1" smtClean="0">
+                          <a:solidFill>
+                            <a:srgbClr val="006A5A"/>
+                          </a:solidFill>
                           <a:latin typeface="Cambria Math" panose="02040503050406030204" pitchFamily="18" charset="0"/>
                           <a:ea typeface="Cambria Math" panose="02040503050406030204" pitchFamily="18" charset="0"/>
                         </a:rPr>
@@ -14805,6 +15757,9 @@
                       </m:r>
                       <m:r>
                         <a:rPr lang="fr-FR" sz="2800" b="0" i="1" smtClean="0">
+                          <a:solidFill>
+                            <a:srgbClr val="006A5A"/>
+                          </a:solidFill>
                           <a:latin typeface="Cambria Math" panose="02040503050406030204" pitchFamily="18" charset="0"/>
                           <a:ea typeface="Cambria Math" panose="02040503050406030204" pitchFamily="18" charset="0"/>
                         </a:rPr>
@@ -14813,7 +15768,11 @@
                     </m:oMath>
                   </m:oMathPara>
                 </a14:m>
-                <a:endParaRPr lang="fr-FR" sz="2800" dirty="0"/>
+                <a:endParaRPr lang="fr-FR" sz="2800" dirty="0">
+                  <a:solidFill>
+                    <a:srgbClr val="006A5A"/>
+                  </a:solidFill>
+                </a:endParaRPr>
               </a:p>
             </p:txBody>
           </p:sp>
@@ -14835,14 +15794,14 @@
             </p:nvSpPr>
             <p:spPr>
               <a:xfrm>
-                <a:off x="962090" y="2257864"/>
+                <a:off x="4837733" y="2242797"/>
                 <a:ext cx="1958870" cy="430887"/>
               </a:xfrm>
               <a:prstGeom prst="rect">
                 <a:avLst/>
               </a:prstGeom>
               <a:blipFill>
-                <a:blip r:embed="rId4"/>
+                <a:blip r:embed="rId5"/>
                 <a:stretch>
                   <a:fillRect/>
                 </a:stretch>
@@ -14853,7 +15812,7 @@
               <a:lstStyle/>
               <a:p>
                 <a:r>
-                  <a:rPr lang="fr-FR">
+                  <a:rPr lang="en-US">
                     <a:noFill/>
                   </a:rPr>
                   <a:t> </a:t>
@@ -14879,7 +15838,7 @@
             </p:nvSpPr>
             <p:spPr>
               <a:xfrm>
-                <a:off x="521336" y="3797294"/>
+                <a:off x="292734" y="3851724"/>
                 <a:ext cx="3177986" cy="430887"/>
               </a:xfrm>
               <a:prstGeom prst="rect">
@@ -14888,7 +15847,7 @@
               <a:noFill/>
             </p:spPr>
             <p:txBody>
-              <a:bodyPr wrap="none" lIns="0" tIns="0" rIns="0" bIns="0" rtlCol="0">
+              <a:bodyPr wrap="square" lIns="0" tIns="0" rIns="0" bIns="0" rtlCol="0">
                 <a:spAutoFit/>
               </a:bodyPr>
               <a:lstStyle/>
@@ -14901,55 +15860,88 @@
                     </m:oMathParaPr>
                     <m:oMath xmlns:m="http://schemas.openxmlformats.org/officeDocument/2006/math">
                       <m:r>
-                        <a:rPr lang="fr-FR" sz="2800" b="0" i="1">
+                        <a:rPr lang="fr-FR" sz="2800" b="0" i="1" smtClean="0">
+                          <a:solidFill>
+                            <a:schemeClr val="tx1"/>
+                          </a:solidFill>
                           <a:latin typeface="Cambria Math" panose="02040503050406030204" pitchFamily="18" charset="0"/>
                         </a:rPr>
                         <m:t>𝑌</m:t>
                       </m:r>
                       <m:r>
-                        <a:rPr lang="fr-FR" sz="2800" b="0" i="1">
+                        <a:rPr lang="fr-FR" sz="2800" b="0" i="1" smtClean="0">
+                          <a:solidFill>
+                            <a:schemeClr val="tx1"/>
+                          </a:solidFill>
                           <a:latin typeface="Cambria Math" panose="02040503050406030204" pitchFamily="18" charset="0"/>
                         </a:rPr>
                         <m:t>=</m:t>
                       </m:r>
                       <m:r>
-                        <a:rPr lang="fr-FR" sz="2800" b="0" i="1">
+                        <a:rPr lang="fr-FR" sz="2800" b="0" i="1" smtClean="0">
+                          <a:solidFill>
+                            <a:schemeClr val="accent4">
+                              <a:lumMod val="75000"/>
+                            </a:schemeClr>
+                          </a:solidFill>
                           <a:latin typeface="Cambria Math" panose="02040503050406030204" pitchFamily="18" charset="0"/>
                         </a:rPr>
                         <m:t>𝜌</m:t>
                       </m:r>
                       <m:r>
-                        <a:rPr lang="fr-FR" sz="2800" b="0" i="1">
+                        <a:rPr lang="fr-FR" sz="2800" b="0" i="1" smtClean="0">
+                          <a:solidFill>
+                            <a:schemeClr val="accent4">
+                              <a:lumMod val="75000"/>
+                            </a:schemeClr>
+                          </a:solidFill>
                           <a:latin typeface="Cambria Math" panose="02040503050406030204" pitchFamily="18" charset="0"/>
                         </a:rPr>
                         <m:t>𝑊𝑌</m:t>
                       </m:r>
                       <m:r>
-                        <a:rPr lang="fr-FR" sz="2800" b="0" i="1">
+                        <a:rPr lang="fr-FR" sz="2800" b="0" i="1" smtClean="0">
+                          <a:solidFill>
+                            <a:schemeClr val="accent4">
+                              <a:lumMod val="75000"/>
+                            </a:schemeClr>
+                          </a:solidFill>
                           <a:latin typeface="Cambria Math" panose="02040503050406030204" pitchFamily="18" charset="0"/>
                         </a:rPr>
                         <m:t>+</m:t>
                       </m:r>
                       <m:r>
-                        <a:rPr lang="fr-FR" sz="2800" b="0" i="1">
+                        <a:rPr lang="fr-FR" sz="2800" b="0" i="1" smtClean="0">
+                          <a:solidFill>
+                            <a:schemeClr val="tx1"/>
+                          </a:solidFill>
                           <a:latin typeface="Cambria Math" panose="02040503050406030204" pitchFamily="18" charset="0"/>
                         </a:rPr>
                         <m:t>𝑋</m:t>
                       </m:r>
                       <m:r>
-                        <a:rPr lang="fr-FR" sz="2800" b="0" i="1">
+                        <a:rPr lang="fr-FR" sz="2800" b="0" i="1" smtClean="0">
+                          <a:solidFill>
+                            <a:schemeClr val="tx1"/>
+                          </a:solidFill>
                           <a:latin typeface="Cambria Math" panose="02040503050406030204" pitchFamily="18" charset="0"/>
                         </a:rPr>
                         <m:t>𝛽</m:t>
                       </m:r>
                       <m:r>
-                        <a:rPr lang="fr-FR" sz="2800" b="0" i="1">
+                        <a:rPr lang="fr-FR" sz="2800" b="0" i="1" smtClean="0">
+                          <a:solidFill>
+                            <a:schemeClr val="tx1"/>
+                          </a:solidFill>
                           <a:latin typeface="Cambria Math" panose="02040503050406030204" pitchFamily="18" charset="0"/>
                         </a:rPr>
                         <m:t>+ </m:t>
                       </m:r>
                       <m:r>
-                        <a:rPr lang="fr-FR" sz="2800" b="0" i="1">
+                        <a:rPr lang="fr-FR" sz="2800" b="0" i="1" smtClean="0">
+                          <a:solidFill>
+                            <a:schemeClr val="tx1"/>
+                          </a:solidFill>
                           <a:latin typeface="Cambria Math" panose="02040503050406030204" pitchFamily="18" charset="0"/>
                         </a:rPr>
                         <m:t>𝜖</m:t>
@@ -14958,6 +15950,11 @@
                   </m:oMathPara>
                 </a14:m>
                 <a:endParaRPr lang="fr-FR" sz="2800" i="1" dirty="0">
+                  <a:solidFill>
+                    <a:schemeClr val="accent4">
+                      <a:lumMod val="75000"/>
+                    </a:schemeClr>
+                  </a:solidFill>
                   <a:latin typeface="Cambria Math" panose="02040503050406030204" pitchFamily="18" charset="0"/>
                 </a:endParaRPr>
               </a:p>
@@ -14981,14 +15978,14 @@
             </p:nvSpPr>
             <p:spPr>
               <a:xfrm>
-                <a:off x="521336" y="3797294"/>
+                <a:off x="292734" y="3851724"/>
                 <a:ext cx="3177986" cy="430887"/>
               </a:xfrm>
               <a:prstGeom prst="rect">
                 <a:avLst/>
               </a:prstGeom>
               <a:blipFill>
-                <a:blip r:embed="rId5"/>
+                <a:blip r:embed="rId6"/>
                 <a:stretch>
                   <a:fillRect/>
                 </a:stretch>
@@ -14999,7 +15996,7 @@
               <a:lstStyle/>
               <a:p>
                 <a:r>
-                  <a:rPr lang="fr-FR">
+                  <a:rPr lang="en-US">
                     <a:noFill/>
                   </a:rPr>
                   <a:t> </a:t>
@@ -15025,8 +16022,8 @@
             </p:nvSpPr>
             <p:spPr>
               <a:xfrm>
-                <a:off x="7378332" y="2257864"/>
-                <a:ext cx="3242105" cy="430887"/>
+                <a:off x="8780574" y="3930171"/>
+                <a:ext cx="2994281" cy="430887"/>
               </a:xfrm>
               <a:prstGeom prst="rect">
                 <a:avLst/>
@@ -15048,36 +16045,27 @@
                     <m:oMath xmlns:m="http://schemas.openxmlformats.org/officeDocument/2006/math">
                       <m:r>
                         <a:rPr lang="fr-FR" sz="2800" b="0" i="1" smtClean="0">
+                          <a:solidFill>
+                            <a:schemeClr val="tx1"/>
+                          </a:solidFill>
                           <a:latin typeface="Cambria Math" panose="02040503050406030204" pitchFamily="18" charset="0"/>
                         </a:rPr>
                         <m:t>𝑌</m:t>
                       </m:r>
                       <m:r>
                         <a:rPr lang="fr-FR" sz="2800" b="0" i="1" smtClean="0">
+                          <a:solidFill>
+                            <a:schemeClr val="tx1"/>
+                          </a:solidFill>
                           <a:latin typeface="Cambria Math" panose="02040503050406030204" pitchFamily="18" charset="0"/>
                         </a:rPr>
                         <m:t>=</m:t>
                       </m:r>
                       <m:r>
                         <a:rPr lang="fr-FR" sz="2800" b="0" i="1" smtClean="0">
-                          <a:latin typeface="Cambria Math" panose="02040503050406030204" pitchFamily="18" charset="0"/>
-                        </a:rPr>
-                        <m:t>𝑋</m:t>
-                      </m:r>
-                      <m:r>
-                        <a:rPr lang="fr-FR" sz="2800" b="0" i="1" smtClean="0">
-                          <a:latin typeface="Cambria Math" panose="02040503050406030204" pitchFamily="18" charset="0"/>
-                        </a:rPr>
-                        <m:t>𝛽</m:t>
-                      </m:r>
-                      <m:r>
-                        <a:rPr lang="fr-FR" sz="2800" b="0" i="1" smtClean="0">
-                          <a:latin typeface="Cambria Math" panose="02040503050406030204" pitchFamily="18" charset="0"/>
-                        </a:rPr>
-                        <m:t>+ </m:t>
-                      </m:r>
-                      <m:r>
-                        <a:rPr lang="fr-FR" sz="2800" b="0" i="1" smtClean="0">
+                          <a:solidFill>
+                            <a:schemeClr val="accent1"/>
+                          </a:solidFill>
                           <a:latin typeface="Cambria Math" panose="02040503050406030204" pitchFamily="18" charset="0"/>
                           <a:ea typeface="Cambria Math" panose="02040503050406030204" pitchFamily="18" charset="0"/>
                         </a:rPr>
@@ -15085,6 +16073,9 @@
                       </m:r>
                       <m:r>
                         <a:rPr lang="fr-FR" sz="2800" b="0" i="1" smtClean="0">
+                          <a:solidFill>
+                            <a:schemeClr val="accent1"/>
+                          </a:solidFill>
                           <a:latin typeface="Cambria Math" panose="02040503050406030204" pitchFamily="18" charset="0"/>
                           <a:ea typeface="Cambria Math" panose="02040503050406030204" pitchFamily="18" charset="0"/>
                         </a:rPr>
@@ -15092,6 +16083,9 @@
                       </m:r>
                       <m:r>
                         <a:rPr lang="fr-FR" sz="2800" b="0" i="1" smtClean="0">
+                          <a:solidFill>
+                            <a:schemeClr val="accent1"/>
+                          </a:solidFill>
                           <a:latin typeface="Cambria Math" panose="02040503050406030204" pitchFamily="18" charset="0"/>
                           <a:ea typeface="Cambria Math" panose="02040503050406030204" pitchFamily="18" charset="0"/>
                         </a:rPr>
@@ -15099,13 +16093,46 @@
                       </m:r>
                       <m:r>
                         <a:rPr lang="fr-FR" sz="2800" b="0" i="1" smtClean="0">
+                          <a:solidFill>
+                            <a:schemeClr val="accent1"/>
+                          </a:solidFill>
                           <a:latin typeface="Cambria Math" panose="02040503050406030204" pitchFamily="18" charset="0"/>
                           <a:ea typeface="Cambria Math" panose="02040503050406030204" pitchFamily="18" charset="0"/>
                         </a:rPr>
-                        <m:t>+ </m:t>
+                        <m:t>+</m:t>
+                      </m:r>
+                      <m:r>
+                        <a:rPr lang="fr-FR" sz="2800" i="1" smtClean="0">
+                          <a:solidFill>
+                            <a:schemeClr val="tx1"/>
+                          </a:solidFill>
+                          <a:latin typeface="Cambria Math" panose="02040503050406030204" pitchFamily="18" charset="0"/>
+                        </a:rPr>
+                        <m:t>𝑋</m:t>
+                      </m:r>
+                      <m:r>
+                        <a:rPr lang="fr-FR" sz="2800" i="1" smtClean="0">
+                          <a:solidFill>
+                            <a:schemeClr val="tx1"/>
+                          </a:solidFill>
+                          <a:latin typeface="Cambria Math" panose="02040503050406030204" pitchFamily="18" charset="0"/>
+                        </a:rPr>
+                        <m:t>𝛽</m:t>
+                      </m:r>
+                      <m:r>
+                        <a:rPr lang="fr-FR" sz="2800" i="1" smtClean="0">
+                          <a:solidFill>
+                            <a:schemeClr val="tx1"/>
+                          </a:solidFill>
+                          <a:latin typeface="Cambria Math" panose="02040503050406030204" pitchFamily="18" charset="0"/>
+                        </a:rPr>
+                        <m:t>+</m:t>
                       </m:r>
                       <m:r>
                         <a:rPr lang="fr-FR" sz="2800" b="0" i="1" smtClean="0">
+                          <a:solidFill>
+                            <a:schemeClr val="tx1"/>
+                          </a:solidFill>
                           <a:latin typeface="Cambria Math" panose="02040503050406030204" pitchFamily="18" charset="0"/>
                           <a:ea typeface="Cambria Math" panose="02040503050406030204" pitchFamily="18" charset="0"/>
                         </a:rPr>
@@ -15115,6 +16142,9 @@
                   </m:oMathPara>
                 </a14:m>
                 <a:endParaRPr lang="fr-FR" sz="2800" i="1" dirty="0">
+                  <a:solidFill>
+                    <a:schemeClr val="accent1"/>
+                  </a:solidFill>
                   <a:latin typeface="Cambria Math" panose="02040503050406030204" pitchFamily="18" charset="0"/>
                 </a:endParaRPr>
               </a:p>
@@ -15138,14 +16168,14 @@
             </p:nvSpPr>
             <p:spPr>
               <a:xfrm>
-                <a:off x="7378332" y="2257864"/>
-                <a:ext cx="3242105" cy="430887"/>
+                <a:off x="8780574" y="3930171"/>
+                <a:ext cx="2994281" cy="430887"/>
               </a:xfrm>
               <a:prstGeom prst="rect">
                 <a:avLst/>
               </a:prstGeom>
               <a:blipFill>
-                <a:blip r:embed="rId6"/>
+                <a:blip r:embed="rId7"/>
                 <a:stretch>
                   <a:fillRect/>
                 </a:stretch>
@@ -15156,7 +16186,7 @@
               <a:lstStyle/>
               <a:p>
                 <a:r>
-                  <a:rPr lang="fr-FR">
+                  <a:rPr lang="en-US">
                     <a:noFill/>
                   </a:rPr>
                   <a:t> </a:t>
@@ -15182,8 +16212,8 @@
             </p:nvSpPr>
             <p:spPr>
               <a:xfrm>
-                <a:off x="7378332" y="3797294"/>
-                <a:ext cx="3124894" cy="430887"/>
+                <a:off x="4515391" y="4005557"/>
+                <a:ext cx="3046347" cy="430887"/>
               </a:xfrm>
               <a:prstGeom prst="rect">
                 <a:avLst/>
@@ -15205,57 +16235,84 @@
                     <m:oMath xmlns:m="http://schemas.openxmlformats.org/officeDocument/2006/math">
                       <m:r>
                         <a:rPr lang="fr-FR" sz="2800" i="1" smtClean="0">
+                          <a:solidFill>
+                            <a:schemeClr val="tx1"/>
+                          </a:solidFill>
                           <a:latin typeface="Cambria Math" panose="02040503050406030204" pitchFamily="18" charset="0"/>
                         </a:rPr>
                         <m:t>𝑌</m:t>
                       </m:r>
                       <m:r>
                         <a:rPr lang="fr-FR" sz="2800" i="1" smtClean="0">
+                          <a:solidFill>
+                            <a:schemeClr val="tx1"/>
+                          </a:solidFill>
                           <a:latin typeface="Cambria Math" panose="02040503050406030204" pitchFamily="18" charset="0"/>
                         </a:rPr>
                         <m:t>=</m:t>
                       </m:r>
                       <m:r>
+                        <a:rPr lang="fr-FR" sz="2800" i="1">
+                          <a:solidFill>
+                            <a:srgbClr val="C00000"/>
+                          </a:solidFill>
+                          <a:latin typeface="Cambria Math" panose="02040503050406030204" pitchFamily="18" charset="0"/>
+                          <a:ea typeface="Cambria Math" panose="02040503050406030204" pitchFamily="18" charset="0"/>
+                        </a:rPr>
+                        <m:t>𝜃</m:t>
+                      </m:r>
+                      <m:r>
+                        <a:rPr lang="fr-FR" sz="2800" i="1">
+                          <a:solidFill>
+                            <a:srgbClr val="C00000"/>
+                          </a:solidFill>
+                          <a:latin typeface="Cambria Math" panose="02040503050406030204" pitchFamily="18" charset="0"/>
+                          <a:ea typeface="Cambria Math" panose="02040503050406030204" pitchFamily="18" charset="0"/>
+                        </a:rPr>
+                        <m:t>𝑊𝑋</m:t>
+                      </m:r>
+                      <m:r>
+                        <a:rPr lang="fr-FR" sz="2800" i="1">
+                          <a:solidFill>
+                            <a:srgbClr val="C00000"/>
+                          </a:solidFill>
+                          <a:latin typeface="Cambria Math" panose="02040503050406030204" pitchFamily="18" charset="0"/>
+                          <a:ea typeface="Cambria Math" panose="02040503050406030204" pitchFamily="18" charset="0"/>
+                        </a:rPr>
+                        <m:t>+</m:t>
+                      </m:r>
+                      <m:r>
                         <a:rPr lang="fr-FR" sz="2800" i="1" smtClean="0">
+                          <a:solidFill>
+                            <a:schemeClr val="tx1"/>
+                          </a:solidFill>
                           <a:latin typeface="Cambria Math" panose="02040503050406030204" pitchFamily="18" charset="0"/>
                         </a:rPr>
                         <m:t>𝑋</m:t>
                       </m:r>
                       <m:r>
                         <a:rPr lang="fr-FR" sz="2800" i="1" smtClean="0">
+                          <a:solidFill>
+                            <a:schemeClr val="tx1"/>
+                          </a:solidFill>
                           <a:latin typeface="Cambria Math" panose="02040503050406030204" pitchFamily="18" charset="0"/>
                         </a:rPr>
                         <m:t>𝛽</m:t>
                       </m:r>
                       <m:r>
                         <a:rPr lang="fr-FR" sz="2800" i="1" smtClean="0">
+                          <a:solidFill>
+                            <a:schemeClr val="tx1"/>
+                          </a:solidFill>
                           <a:latin typeface="Cambria Math" panose="02040503050406030204" pitchFamily="18" charset="0"/>
                         </a:rPr>
                         <m:t>+</m:t>
                       </m:r>
                       <m:r>
-                        <a:rPr lang="fr-FR" sz="2800" i="1" smtClean="0">
-                          <a:latin typeface="Cambria Math" panose="02040503050406030204" pitchFamily="18" charset="0"/>
-                          <a:ea typeface="Cambria Math" panose="02040503050406030204" pitchFamily="18" charset="0"/>
-                        </a:rPr>
-                        <m:t>𝜃</m:t>
-                      </m:r>
-                      <m:r>
-                        <a:rPr lang="fr-FR" sz="2800" b="0" i="1" smtClean="0">
-                          <a:latin typeface="Cambria Math" panose="02040503050406030204" pitchFamily="18" charset="0"/>
-                          <a:ea typeface="Cambria Math" panose="02040503050406030204" pitchFamily="18" charset="0"/>
-                        </a:rPr>
-                        <m:t>𝑊𝑋</m:t>
-                      </m:r>
-                      <m:r>
-                        <a:rPr lang="fr-FR" sz="2800" b="0" i="1" smtClean="0">
-                          <a:latin typeface="Cambria Math" panose="02040503050406030204" pitchFamily="18" charset="0"/>
-                          <a:ea typeface="Cambria Math" panose="02040503050406030204" pitchFamily="18" charset="0"/>
-                        </a:rPr>
-                        <m:t>+ </m:t>
-                      </m:r>
-                      <m:r>
                         <a:rPr lang="fr-FR" sz="2800" i="1">
+                          <a:solidFill>
+                            <a:schemeClr val="tx1"/>
+                          </a:solidFill>
                           <a:latin typeface="Cambria Math" panose="02040503050406030204" pitchFamily="18" charset="0"/>
                         </a:rPr>
                         <m:t>𝜖</m:t>
@@ -15264,6 +16321,9 @@
                   </m:oMathPara>
                 </a14:m>
                 <a:endParaRPr lang="fr-FR" sz="2800" i="1" dirty="0">
+                  <a:solidFill>
+                    <a:srgbClr val="C00000"/>
+                  </a:solidFill>
                   <a:latin typeface="Cambria Math" panose="02040503050406030204" pitchFamily="18" charset="0"/>
                 </a:endParaRPr>
               </a:p>
@@ -15287,14 +16347,14 @@
             </p:nvSpPr>
             <p:spPr>
               <a:xfrm>
-                <a:off x="7378332" y="3797294"/>
-                <a:ext cx="3124894" cy="430887"/>
+                <a:off x="4515391" y="4005557"/>
+                <a:ext cx="3046347" cy="430887"/>
               </a:xfrm>
               <a:prstGeom prst="rect">
                 <a:avLst/>
               </a:prstGeom>
               <a:blipFill>
-                <a:blip r:embed="rId7"/>
+                <a:blip r:embed="rId8"/>
                 <a:stretch>
                   <a:fillRect/>
                 </a:stretch>
@@ -15305,7 +16365,7 @@
               <a:lstStyle/>
               <a:p>
                 <a:r>
-                  <a:rPr lang="fr-FR">
+                  <a:rPr lang="en-US">
                     <a:noFill/>
                   </a:rPr>
                   <a:t> </a:t>
@@ -15331,8 +16391,8 @@
             </p:nvSpPr>
             <p:spPr>
               <a:xfrm>
-                <a:off x="3662532" y="5643626"/>
-                <a:ext cx="4430765" cy="430887"/>
+                <a:off x="2465103" y="5861342"/>
+                <a:ext cx="4242187" cy="430887"/>
               </a:xfrm>
               <a:prstGeom prst="rect">
                 <a:avLst/>
@@ -15354,54 +16414,54 @@
                     <m:oMath xmlns:m="http://schemas.openxmlformats.org/officeDocument/2006/math">
                       <m:r>
                         <a:rPr lang="fr-FR" sz="2800" b="0" i="1" smtClean="0">
+                          <a:solidFill>
+                            <a:schemeClr val="tx1"/>
+                          </a:solidFill>
                           <a:latin typeface="Cambria Math" panose="02040503050406030204" pitchFamily="18" charset="0"/>
                         </a:rPr>
                         <m:t>𝑌</m:t>
                       </m:r>
                       <m:r>
                         <a:rPr lang="fr-FR" sz="2800" b="0" i="1" smtClean="0">
+                          <a:solidFill>
+                            <a:schemeClr val="tx1"/>
+                          </a:solidFill>
                           <a:latin typeface="Cambria Math" panose="02040503050406030204" pitchFamily="18" charset="0"/>
                         </a:rPr>
                         <m:t>=</m:t>
                       </m:r>
                       <m:r>
                         <a:rPr lang="fr-FR" sz="2800" b="0" i="1" smtClean="0">
+                          <a:solidFill>
+                            <a:srgbClr val="7030A0"/>
+                          </a:solidFill>
                           <a:latin typeface="Cambria Math" panose="02040503050406030204" pitchFamily="18" charset="0"/>
                         </a:rPr>
                         <m:t>𝜌</m:t>
                       </m:r>
                       <m:r>
                         <a:rPr lang="fr-FR" sz="2800" b="0" i="1" smtClean="0">
+                          <a:solidFill>
+                            <a:srgbClr val="7030A0"/>
+                          </a:solidFill>
                           <a:latin typeface="Cambria Math" panose="02040503050406030204" pitchFamily="18" charset="0"/>
                         </a:rPr>
                         <m:t>𝑊𝑌</m:t>
                       </m:r>
                       <m:r>
                         <a:rPr lang="fr-FR" sz="2800" b="0" i="1" smtClean="0">
-                          <a:latin typeface="Cambria Math" panose="02040503050406030204" pitchFamily="18" charset="0"/>
-                        </a:rPr>
-                        <m:t>+</m:t>
-                      </m:r>
-                      <m:r>
-                        <a:rPr lang="fr-FR" sz="2800" b="0" i="1" smtClean="0">
-                          <a:latin typeface="Cambria Math" panose="02040503050406030204" pitchFamily="18" charset="0"/>
-                        </a:rPr>
-                        <m:t>𝑋</m:t>
-                      </m:r>
-                      <m:r>
-                        <a:rPr lang="fr-FR" sz="2800" b="0" i="1" smtClean="0">
-                          <a:latin typeface="Cambria Math" panose="02040503050406030204" pitchFamily="18" charset="0"/>
-                        </a:rPr>
-                        <m:t>𝛽</m:t>
-                      </m:r>
-                      <m:r>
-                        <a:rPr lang="fr-FR" sz="2800" b="0" i="1" smtClean="0">
+                          <a:solidFill>
+                            <a:srgbClr val="7030A0"/>
+                          </a:solidFill>
                           <a:latin typeface="Cambria Math" panose="02040503050406030204" pitchFamily="18" charset="0"/>
                         </a:rPr>
                         <m:t>+</m:t>
                       </m:r>
                       <m:r>
                         <a:rPr lang="fr-FR" sz="2800" b="0" i="1">
+                          <a:solidFill>
+                            <a:srgbClr val="7030A0"/>
+                          </a:solidFill>
                           <a:latin typeface="Cambria Math" panose="02040503050406030204" pitchFamily="18" charset="0"/>
                           <a:ea typeface="Cambria Math" panose="02040503050406030204" pitchFamily="18" charset="0"/>
                         </a:rPr>
@@ -15409,6 +16469,9 @@
                       </m:r>
                       <m:r>
                         <a:rPr lang="fr-FR" sz="2800" b="0" i="1">
+                          <a:solidFill>
+                            <a:srgbClr val="7030A0"/>
+                          </a:solidFill>
                           <a:latin typeface="Cambria Math" panose="02040503050406030204" pitchFamily="18" charset="0"/>
                           <a:ea typeface="Cambria Math" panose="02040503050406030204" pitchFamily="18" charset="0"/>
                         </a:rPr>
@@ -15416,13 +16479,46 @@
                       </m:r>
                       <m:r>
                         <a:rPr lang="fr-FR" sz="2800" b="0" i="1" smtClean="0">
+                          <a:solidFill>
+                            <a:srgbClr val="7030A0"/>
+                          </a:solidFill>
                           <a:latin typeface="Cambria Math" panose="02040503050406030204" pitchFamily="18" charset="0"/>
                           <a:ea typeface="Cambria Math" panose="02040503050406030204" pitchFamily="18" charset="0"/>
                         </a:rPr>
-                        <m:t>+ </m:t>
+                        <m:t>+</m:t>
+                      </m:r>
+                      <m:r>
+                        <a:rPr lang="fr-FR" sz="2800" i="1" smtClean="0">
+                          <a:solidFill>
+                            <a:schemeClr val="tx1"/>
+                          </a:solidFill>
+                          <a:latin typeface="Cambria Math" panose="02040503050406030204" pitchFamily="18" charset="0"/>
+                        </a:rPr>
+                        <m:t>𝑋</m:t>
+                      </m:r>
+                      <m:r>
+                        <a:rPr lang="fr-FR" sz="2800" i="1" smtClean="0">
+                          <a:solidFill>
+                            <a:schemeClr val="tx1"/>
+                          </a:solidFill>
+                          <a:latin typeface="Cambria Math" panose="02040503050406030204" pitchFamily="18" charset="0"/>
+                        </a:rPr>
+                        <m:t>𝛽</m:t>
+                      </m:r>
+                      <m:r>
+                        <a:rPr lang="fr-FR" sz="2800" i="1" smtClean="0">
+                          <a:solidFill>
+                            <a:schemeClr val="tx1"/>
+                          </a:solidFill>
+                          <a:latin typeface="Cambria Math" panose="02040503050406030204" pitchFamily="18" charset="0"/>
+                        </a:rPr>
+                        <m:t>+</m:t>
                       </m:r>
                       <m:r>
                         <a:rPr lang="fr-FR" sz="2800" b="0" i="1">
+                          <a:solidFill>
+                            <a:schemeClr val="tx1"/>
+                          </a:solidFill>
                           <a:latin typeface="Cambria Math" panose="02040503050406030204" pitchFamily="18" charset="0"/>
                         </a:rPr>
                         <m:t>𝜖</m:t>
@@ -15431,6 +16527,9 @@
                   </m:oMathPara>
                 </a14:m>
                 <a:endParaRPr lang="fr-FR" sz="2800" i="1" dirty="0">
+                  <a:solidFill>
+                    <a:srgbClr val="7030A0"/>
+                  </a:solidFill>
                   <a:latin typeface="Cambria Math" panose="02040503050406030204" pitchFamily="18" charset="0"/>
                 </a:endParaRPr>
               </a:p>
@@ -15454,14 +16553,14 @@
             </p:nvSpPr>
             <p:spPr>
               <a:xfrm>
-                <a:off x="3662532" y="5643626"/>
-                <a:ext cx="4430765" cy="430887"/>
+                <a:off x="2465103" y="5861342"/>
+                <a:ext cx="4242187" cy="430887"/>
               </a:xfrm>
               <a:prstGeom prst="rect">
                 <a:avLst/>
               </a:prstGeom>
               <a:blipFill>
-                <a:blip r:embed="rId8"/>
+                <a:blip r:embed="rId9"/>
                 <a:stretch>
                   <a:fillRect/>
                 </a:stretch>
@@ -15472,7 +16571,7 @@
               <a:lstStyle/>
               <a:p>
                 <a:r>
-                  <a:rPr lang="fr-FR">
+                  <a:rPr lang="en-US">
                     <a:noFill/>
                   </a:rPr>
                   <a:t> </a:t>
@@ -15482,10 +16581,108 @@
           </p:sp>
         </mc:Fallback>
       </mc:AlternateContent>
+      <p:sp>
+        <p:nvSpPr>
+          <p:cNvPr id="17" name="Accolade ouvrante 16">
+            <a:extLst>
+              <a:ext uri="{FF2B5EF4-FFF2-40B4-BE49-F238E27FC236}">
+                <a16:creationId xmlns:a16="http://schemas.microsoft.com/office/drawing/2014/main" id="{8886E1FE-D408-8CAF-1F80-3BD6700215FD}"/>
+              </a:ext>
+            </a:extLst>
+          </p:cNvPr>
+          <p:cNvSpPr/>
+          <p:nvPr/>
+        </p:nvSpPr>
+        <p:spPr>
+          <a:xfrm rot="5400000">
+            <a:off x="6011849" y="-2913489"/>
+            <a:ext cx="232435" cy="11670666"/>
+          </a:xfrm>
+          <a:prstGeom prst="leftBrace">
+            <a:avLst/>
+          </a:prstGeom>
+          <a:ln w="38100">
+            <a:solidFill>
+              <a:srgbClr val="006A5A"/>
+            </a:solidFill>
+          </a:ln>
+        </p:spPr>
+        <p:style>
+          <a:lnRef idx="1">
+            <a:schemeClr val="accent1"/>
+          </a:lnRef>
+          <a:fillRef idx="0">
+            <a:schemeClr val="accent1"/>
+          </a:fillRef>
+          <a:effectRef idx="0">
+            <a:schemeClr val="accent1"/>
+          </a:effectRef>
+          <a:fontRef idx="minor">
+            <a:schemeClr val="tx1"/>
+          </a:fontRef>
+        </p:style>
+        <p:txBody>
+          <a:bodyPr rtlCol="0" anchor="ctr"/>
+          <a:lstStyle/>
+          <a:p>
+            <a:pPr algn="ctr"/>
+            <a:endParaRPr lang="en-US" dirty="0"/>
+          </a:p>
+        </p:txBody>
+      </p:sp>
+      <p:sp>
+        <p:nvSpPr>
+          <p:cNvPr id="18" name="Accolade ouvrante 17">
+            <a:extLst>
+              <a:ext uri="{FF2B5EF4-FFF2-40B4-BE49-F238E27FC236}">
+                <a16:creationId xmlns:a16="http://schemas.microsoft.com/office/drawing/2014/main" id="{EF163844-05CC-82EB-876E-B652D30B0ABC}"/>
+              </a:ext>
+            </a:extLst>
+          </p:cNvPr>
+          <p:cNvSpPr/>
+          <p:nvPr/>
+        </p:nvSpPr>
+        <p:spPr>
+          <a:xfrm rot="16200000">
+            <a:off x="4228936" y="1798315"/>
+            <a:ext cx="166991" cy="6299341"/>
+          </a:xfrm>
+          <a:prstGeom prst="leftBrace">
+            <a:avLst/>
+          </a:prstGeom>
+          <a:ln w="28575">
+            <a:solidFill>
+              <a:srgbClr val="7030A0"/>
+            </a:solidFill>
+          </a:ln>
+        </p:spPr>
+        <p:style>
+          <a:lnRef idx="1">
+            <a:schemeClr val="accent1"/>
+          </a:lnRef>
+          <a:fillRef idx="0">
+            <a:schemeClr val="accent1"/>
+          </a:fillRef>
+          <a:effectRef idx="0">
+            <a:schemeClr val="accent1"/>
+          </a:effectRef>
+          <a:fontRef idx="minor">
+            <a:schemeClr val="tx1"/>
+          </a:fontRef>
+        </p:style>
+        <p:txBody>
+          <a:bodyPr rtlCol="0" anchor="ctr"/>
+          <a:lstStyle/>
+          <a:p>
+            <a:pPr algn="ctr"/>
+            <a:endParaRPr lang="en-US" dirty="0"/>
+          </a:p>
+        </p:txBody>
+      </p:sp>
     </p:spTree>
     <p:extLst>
       <p:ext uri="{BB962C8B-B14F-4D97-AF65-F5344CB8AC3E}">
-        <p14:creationId xmlns:p14="http://schemas.microsoft.com/office/powerpoint/2010/main" val="3610963717"/>
+        <p14:creationId xmlns:p14="http://schemas.microsoft.com/office/powerpoint/2010/main" val="3107508694"/>
       </p:ext>
     </p:extLst>
   </p:cSld>
@@ -15659,13 +16856,13 @@
           <p:nvPr/>
         </p:nvPicPr>
         <p:blipFill>
-          <a:blip r:embed="rId2">
+          <a:blip r:embed="rId3">
             <a:extLst>
               <a:ext uri="{28A0092B-C50C-407E-A947-70E740481C1C}">
                 <a14:useLocalDpi xmlns:a14="http://schemas.microsoft.com/office/drawing/2010/main" val="0"/>
               </a:ext>
               <a:ext uri="{96DAC541-7B7A-43D3-8B79-37D633B846F1}">
-                <asvg:svgBlip xmlns:asvg="http://schemas.microsoft.com/office/drawing/2016/SVG/main" r:embed="rId3"/>
+                <asvg:svgBlip xmlns:asvg="http://schemas.microsoft.com/office/drawing/2016/SVG/main" r:embed="rId4"/>
               </a:ext>
             </a:extLst>
           </a:blip>
@@ -15698,7 +16895,7 @@
           <p:nvPr/>
         </p:nvPicPr>
         <p:blipFill>
-          <a:blip r:embed="rId4">
+          <a:blip r:embed="rId5">
             <a:extLst>
               <a:ext uri="{28A0092B-C50C-407E-A947-70E740481C1C}">
                 <a14:useLocalDpi xmlns:a14="http://schemas.microsoft.com/office/drawing/2010/main" val="0"/>
@@ -15711,8 +16908,8 @@
         </p:blipFill>
         <p:spPr>
           <a:xfrm>
-            <a:off x="5741044" y="1433994"/>
-            <a:ext cx="6204030" cy="4910781"/>
+            <a:off x="5117909" y="1445569"/>
+            <a:ext cx="6827165" cy="4910781"/>
           </a:xfrm>
           <a:prstGeom prst="rect">
             <a:avLst/>
@@ -15721,10 +16918,59 @@
       </p:pic>
       <p:sp>
         <p:nvSpPr>
-          <p:cNvPr id="8" name="ZoneTexte 7">
+          <p:cNvPr id="5" name="Cœur 4">
             <a:extLst>
               <a:ext uri="{FF2B5EF4-FFF2-40B4-BE49-F238E27FC236}">
-                <a16:creationId xmlns:a16="http://schemas.microsoft.com/office/drawing/2014/main" id="{3DA8EC54-449C-F632-FC88-43B124E3F748}"/>
+                <a16:creationId xmlns:a16="http://schemas.microsoft.com/office/drawing/2014/main" id="{AF60D09A-B3EB-A0E1-AA29-888E9CFCAB98}"/>
+              </a:ext>
+            </a:extLst>
+          </p:cNvPr>
+          <p:cNvSpPr/>
+          <p:nvPr/>
+        </p:nvSpPr>
+        <p:spPr>
+          <a:xfrm>
+            <a:off x="3920771" y="5352190"/>
+            <a:ext cx="914400" cy="914400"/>
+          </a:xfrm>
+          <a:prstGeom prst="heart">
+            <a:avLst/>
+          </a:prstGeom>
+          <a:solidFill>
+            <a:srgbClr val="006A5A"/>
+          </a:solidFill>
+        </p:spPr>
+        <p:style>
+          <a:lnRef idx="2">
+            <a:schemeClr val="accent1">
+              <a:shade val="15000"/>
+            </a:schemeClr>
+          </a:lnRef>
+          <a:fillRef idx="1">
+            <a:schemeClr val="accent1"/>
+          </a:fillRef>
+          <a:effectRef idx="0">
+            <a:schemeClr val="accent1"/>
+          </a:effectRef>
+          <a:fontRef idx="minor">
+            <a:schemeClr val="lt1"/>
+          </a:fontRef>
+        </p:style>
+        <p:txBody>
+          <a:bodyPr rtlCol="0" anchor="ctr"/>
+          <a:lstStyle/>
+          <a:p>
+            <a:pPr algn="ctr"/>
+            <a:endParaRPr lang="fr-FR" dirty="0"/>
+          </a:p>
+        </p:txBody>
+      </p:sp>
+      <p:sp>
+        <p:nvSpPr>
+          <p:cNvPr id="12" name="ZoneTexte 11">
+            <a:extLst>
+              <a:ext uri="{FF2B5EF4-FFF2-40B4-BE49-F238E27FC236}">
+                <a16:creationId xmlns:a16="http://schemas.microsoft.com/office/drawing/2014/main" id="{A8B122C9-4CA4-909D-68E9-7453BE0C9CDB}"/>
               </a:ext>
             </a:extLst>
           </p:cNvPr>
@@ -15733,8 +16979,48 @@
         </p:nvSpPr>
         <p:spPr>
           <a:xfrm>
-            <a:off x="347241" y="1431599"/>
-            <a:ext cx="5069711" cy="4893647"/>
+            <a:off x="0" y="5435593"/>
+            <a:ext cx="3920771" cy="830997"/>
+          </a:xfrm>
+          <a:prstGeom prst="rect">
+            <a:avLst/>
+          </a:prstGeom>
+          <a:noFill/>
+        </p:spPr>
+        <p:txBody>
+          <a:bodyPr wrap="square">
+            <a:spAutoFit/>
+          </a:bodyPr>
+          <a:lstStyle/>
+          <a:p>
+            <a:r>
+              <a:rPr lang="fr-FR" sz="2400" b="1" dirty="0">
+                <a:latin typeface="Gill Sans MT" panose="020B0502020104020203" pitchFamily="34" charset="0"/>
+              </a:rPr>
+              <a:t>Phase avancée de transition démographique</a:t>
+            </a:r>
+            <a:endParaRPr lang="fr-FR" sz="2400" dirty="0">
+              <a:latin typeface="Gill Sans MT" panose="020B0502020104020203" pitchFamily="34" charset="0"/>
+            </a:endParaRPr>
+          </a:p>
+        </p:txBody>
+      </p:sp>
+      <p:sp>
+        <p:nvSpPr>
+          <p:cNvPr id="19" name="ZoneTexte 18">
+            <a:extLst>
+              <a:ext uri="{FF2B5EF4-FFF2-40B4-BE49-F238E27FC236}">
+                <a16:creationId xmlns:a16="http://schemas.microsoft.com/office/drawing/2014/main" id="{8D55B29F-ED2E-CC8B-8A14-F0E8437FF441}"/>
+              </a:ext>
+            </a:extLst>
+          </p:cNvPr>
+          <p:cNvSpPr txBox="1"/>
+          <p:nvPr/>
+        </p:nvSpPr>
+        <p:spPr>
+          <a:xfrm>
+            <a:off x="43491" y="1466018"/>
+            <a:ext cx="4475849" cy="3046988"/>
           </a:xfrm>
           <a:prstGeom prst="rect">
             <a:avLst/>
@@ -15789,9 +17075,8 @@
                 <a:solidFill>
                   <a:schemeClr val="bg1"/>
                 </a:solidFill>
-                <a:latin typeface="Gill Sans MT" panose="020B0502020104020203" pitchFamily="34" charset="0"/>
               </a:rPr>
-              <a:t>Population assez homogène en matière d’âge.</a:t>
+              <a:t>Faible natalité récente.</a:t>
             </a:r>
           </a:p>
           <a:p>
@@ -15803,7 +17088,6 @@
               <a:solidFill>
                 <a:schemeClr val="bg1"/>
               </a:solidFill>
-              <a:latin typeface="Gill Sans MT" panose="020B0502020104020203" pitchFamily="34" charset="0"/>
             </a:endParaRPr>
           </a:p>
           <a:p>
@@ -15816,9 +17100,8 @@
                 <a:solidFill>
                   <a:schemeClr val="bg1"/>
                 </a:solidFill>
-                <a:latin typeface="Gill Sans MT" panose="020B0502020104020203" pitchFamily="34" charset="0"/>
               </a:rPr>
-              <a:t>Beaucoup de jeunes (&lt;= forte natalité)</a:t>
+              <a:t>Population adulte importante.</a:t>
             </a:r>
           </a:p>
           <a:p>
@@ -15830,7 +17113,6 @@
               <a:solidFill>
                 <a:schemeClr val="bg1"/>
               </a:solidFill>
-              <a:latin typeface="Gill Sans MT" panose="020B0502020104020203" pitchFamily="34" charset="0"/>
             </a:endParaRPr>
           </a:p>
           <a:p>
@@ -15843,9 +17125,8 @@
                 <a:solidFill>
                   <a:schemeClr val="bg1"/>
                 </a:solidFill>
-                <a:latin typeface="Gill Sans MT" panose="020B0502020104020203" pitchFamily="34" charset="0"/>
               </a:rPr>
-              <a:t>Population active plus grande, mais elle diminue progressivement avec l’âge à cause de la mortalité naturelle.</a:t>
+              <a:t>Vieillissement démographique.</a:t>
             </a:r>
           </a:p>
           <a:p>
@@ -15857,7 +17138,6 @@
               <a:solidFill>
                 <a:schemeClr val="bg1"/>
               </a:solidFill>
-              <a:latin typeface="Gill Sans MT" panose="020B0502020104020203" pitchFamily="34" charset="0"/>
             </a:endParaRPr>
           </a:p>
           <a:p>
@@ -15870,72 +17150,16 @@
                 <a:solidFill>
                   <a:schemeClr val="bg1"/>
                 </a:solidFill>
-                <a:latin typeface="Gill Sans MT" panose="020B0502020104020203" pitchFamily="34" charset="0"/>
               </a:rPr>
-              <a:t>Les femmes vivent plus longtemps que les hommes</a:t>
+              <a:t>Espérance de vie plus longue des femmes.</a:t>
             </a:r>
-            <a:endParaRPr lang="en-US" sz="2400" dirty="0">
-              <a:solidFill>
-                <a:schemeClr val="bg1"/>
-              </a:solidFill>
-              <a:latin typeface="Gill Sans MT" panose="020B0502020104020203" pitchFamily="34" charset="0"/>
-            </a:endParaRPr>
-          </a:p>
-        </p:txBody>
-      </p:sp>
-      <p:sp>
-        <p:nvSpPr>
-          <p:cNvPr id="10" name="Accolade ouvrante 9">
-            <a:extLst>
-              <a:ext uri="{FF2B5EF4-FFF2-40B4-BE49-F238E27FC236}">
-                <a16:creationId xmlns:a16="http://schemas.microsoft.com/office/drawing/2014/main" id="{52B25F2D-5007-2525-A862-DEB592ED1978}"/>
-              </a:ext>
-            </a:extLst>
-          </p:cNvPr>
-          <p:cNvSpPr/>
-          <p:nvPr/>
-        </p:nvSpPr>
-        <p:spPr>
-          <a:xfrm>
-            <a:off x="5457463" y="1717116"/>
-            <a:ext cx="243068" cy="4322611"/>
-          </a:xfrm>
-          <a:prstGeom prst="leftBrace">
-            <a:avLst/>
-          </a:prstGeom>
-          <a:ln w="19050">
-            <a:solidFill>
-              <a:srgbClr val="006A5A"/>
-            </a:solidFill>
-          </a:ln>
-        </p:spPr>
-        <p:style>
-          <a:lnRef idx="1">
-            <a:schemeClr val="accent1"/>
-          </a:lnRef>
-          <a:fillRef idx="0">
-            <a:schemeClr val="accent1"/>
-          </a:fillRef>
-          <a:effectRef idx="0">
-            <a:schemeClr val="accent1"/>
-          </a:effectRef>
-          <a:fontRef idx="minor">
-            <a:schemeClr val="tx1"/>
-          </a:fontRef>
-        </p:style>
-        <p:txBody>
-          <a:bodyPr rtlCol="0" anchor="ctr"/>
-          <a:lstStyle/>
-          <a:p>
-            <a:pPr algn="ctr"/>
-            <a:endParaRPr lang="en-US" dirty="0"/>
           </a:p>
         </p:txBody>
       </p:sp>
     </p:spTree>
     <p:extLst>
       <p:ext uri="{BB962C8B-B14F-4D97-AF65-F5344CB8AC3E}">
-        <p14:creationId xmlns:p14="http://schemas.microsoft.com/office/powerpoint/2010/main" val="1095280147"/>
+        <p14:creationId xmlns:p14="http://schemas.microsoft.com/office/powerpoint/2010/main" val="3716065417"/>
       </p:ext>
     </p:extLst>
   </p:cSld>
@@ -16055,13 +17279,13 @@
           <p:nvPr/>
         </p:nvPicPr>
         <p:blipFill>
-          <a:blip r:embed="rId2">
+          <a:blip r:embed="rId3">
             <a:extLst>
               <a:ext uri="{28A0092B-C50C-407E-A947-70E740481C1C}">
                 <a14:useLocalDpi xmlns:a14="http://schemas.microsoft.com/office/drawing/2010/main" val="0"/>
               </a:ext>
               <a:ext uri="{96DAC541-7B7A-43D3-8B79-37D633B846F1}">
-                <asvg:svgBlip xmlns:asvg="http://schemas.microsoft.com/office/drawing/2016/SVG/main" r:embed="rId3"/>
+                <asvg:svgBlip xmlns:asvg="http://schemas.microsoft.com/office/drawing/2016/SVG/main" r:embed="rId4"/>
               </a:ext>
             </a:extLst>
           </a:blip>
@@ -16094,7 +17318,7 @@
           <p:nvPr/>
         </p:nvPicPr>
         <p:blipFill>
-          <a:blip r:embed="rId4"/>
+          <a:blip r:embed="rId5"/>
           <a:stretch>
             <a:fillRect/>
           </a:stretch>
@@ -16102,7 +17326,7 @@
         <p:spPr>
           <a:xfrm>
             <a:off x="2984682" y="1399733"/>
-            <a:ext cx="3606279" cy="3417973"/>
+            <a:ext cx="3606279" cy="3829078"/>
           </a:xfrm>
           <a:prstGeom prst="rect">
             <a:avLst/>
@@ -16124,7 +17348,7 @@
           <p:nvPr/>
         </p:nvPicPr>
         <p:blipFill>
-          <a:blip r:embed="rId5"/>
+          <a:blip r:embed="rId6"/>
           <a:stretch>
             <a:fillRect/>
           </a:stretch>
@@ -16132,7 +17356,7 @@
         <p:spPr>
           <a:xfrm>
             <a:off x="8074296" y="1399733"/>
-            <a:ext cx="3606279" cy="3417973"/>
+            <a:ext cx="3606279" cy="3829078"/>
           </a:xfrm>
           <a:prstGeom prst="rect">
             <a:avLst/>
@@ -16221,14 +17445,10 @@
           <a:p>
             <a:pPr algn="just"/>
             <a:r>
-              <a:rPr lang="fr-FR" sz="2400" dirty="0">
-                <a:latin typeface="Gill Sans MT" panose="020B0502020104020203" pitchFamily="34" charset="0"/>
-              </a:rPr>
+              <a:rPr lang="fr-FR" sz="2400" dirty="0"/>
               <a:t>Effet taille</a:t>
             </a:r>
-            <a:endParaRPr lang="en-US" sz="2400" dirty="0">
-              <a:latin typeface="Gill Sans MT" panose="020B0502020104020203" pitchFamily="34" charset="0"/>
-            </a:endParaRPr>
+            <a:endParaRPr lang="en-US" sz="2400" dirty="0"/>
           </a:p>
         </p:txBody>
       </p:sp>
@@ -16294,23 +17514,13 @@
           <a:lstStyle/>
           <a:p>
             <a:r>
-              <a:rPr lang="fr-FR" sz="2400" dirty="0">
+              <a:rPr lang="fr-FR" sz="2400" b="1" dirty="0">
                 <a:solidFill>
                   <a:schemeClr val="bg1"/>
                 </a:solidFill>
-                <a:latin typeface="Gill Sans MT" panose="020B0502020104020203" pitchFamily="34" charset="0"/>
+                <a:latin typeface="DeepSeek-CJK-patch"/>
               </a:rPr>
               <a:t>Forte a</a:t>
-            </a:r>
-            <a:r>
-              <a:rPr lang="fr-FR" sz="2400" b="0" i="0" dirty="0">
-                <a:solidFill>
-                  <a:schemeClr val="bg1"/>
-                </a:solidFill>
-                <a:effectLst/>
-                <a:latin typeface="Gill Sans MT" panose="020B0502020104020203" pitchFamily="34" charset="0"/>
-              </a:rPr>
-              <a:t>symétrie à droite (moyenne = 19 130 </a:t>
             </a:r>
             <a:r>
               <a:rPr lang="fr-FR" sz="2400" b="1" i="0" dirty="0">
@@ -16318,19 +17528,9 @@
                   <a:schemeClr val="bg1"/>
                 </a:solidFill>
                 <a:effectLst/>
-                <a:latin typeface="Gill Sans MT" panose="020B0502020104020203" pitchFamily="34" charset="0"/>
+                <a:latin typeface="DeepSeek-CJK-patch"/>
               </a:rPr>
-              <a:t>vs</a:t>
-            </a:r>
-            <a:r>
-              <a:rPr lang="fr-FR" sz="2400" b="0" i="0" dirty="0">
-                <a:solidFill>
-                  <a:schemeClr val="bg1"/>
-                </a:solidFill>
-                <a:effectLst/>
-                <a:latin typeface="Gill Sans MT" panose="020B0502020104020203" pitchFamily="34" charset="0"/>
-              </a:rPr>
-              <a:t> médiane = 9 127) </a:t>
+              <a:t>symétrie à droite (moyenne = 19 130 vs médiane = 9 127) </a:t>
             </a:r>
           </a:p>
         </p:txBody>
@@ -16402,7 +17602,6 @@
                 <a:solidFill>
                   <a:schemeClr val="bg1"/>
                 </a:solidFill>
-                <a:latin typeface="Gill Sans MT" panose="020B0502020104020203" pitchFamily="34" charset="0"/>
               </a:rPr>
               <a:t>Valeurs extrêmes tirant la distribution vers le haut</a:t>
             </a:r>
@@ -16410,7 +17609,6 @@
               <a:solidFill>
                 <a:schemeClr val="bg1"/>
               </a:solidFill>
-              <a:latin typeface="Gill Sans MT" panose="020B0502020104020203" pitchFamily="34" charset="0"/>
             </a:endParaRPr>
           </a:p>
         </p:txBody>
@@ -16482,7 +17680,6 @@
                 <a:solidFill>
                   <a:schemeClr val="bg1"/>
                 </a:solidFill>
-                <a:latin typeface="Gill Sans MT" panose="020B0502020104020203" pitchFamily="34" charset="0"/>
               </a:rPr>
               <a:t>Ecart considérable entre les consultations par an (min = 1 037 et max = 76 5833)</a:t>
             </a:r>
@@ -16490,7 +17687,6 @@
               <a:solidFill>
                 <a:schemeClr val="bg1"/>
               </a:solidFill>
-              <a:latin typeface="Gill Sans MT" panose="020B0502020104020203" pitchFamily="34" charset="0"/>
             </a:endParaRPr>
           </a:p>
         </p:txBody>
@@ -16639,8 +17835,8 @@
         </p:nvSpPr>
         <p:spPr>
           <a:xfrm>
-            <a:off x="6096000" y="5139173"/>
-            <a:ext cx="5910800" cy="1200329"/>
+            <a:off x="6438557" y="5486670"/>
+            <a:ext cx="5601039" cy="830997"/>
           </a:xfrm>
           <a:prstGeom prst="rect">
             <a:avLst/>
@@ -16692,15 +17888,13 @@
                 <a:solidFill>
                   <a:schemeClr val="bg1"/>
                 </a:solidFill>
-                <a:latin typeface="Gill Sans MT" panose="020B0502020104020203" pitchFamily="34" charset="0"/>
               </a:rPr>
-              <a:t>Distribution, centrée autour de la moyenne, légèrement asymétrique à droite (quelques zones à taux de consultation très élevé).</a:t>
+              <a:t>Distribution, centrée autour de la moyenne, légèrement asymétrique à droite</a:t>
             </a:r>
             <a:endParaRPr lang="en-US" sz="2400" dirty="0">
               <a:solidFill>
                 <a:schemeClr val="bg1"/>
               </a:solidFill>
-              <a:latin typeface="Gill Sans MT" panose="020B0502020104020203" pitchFamily="34" charset="0"/>
             </a:endParaRPr>
           </a:p>
         </p:txBody>
@@ -16708,7 +17902,7 @@
     </p:spTree>
     <p:extLst>
       <p:ext uri="{BB962C8B-B14F-4D97-AF65-F5344CB8AC3E}">
-        <p14:creationId xmlns:p14="http://schemas.microsoft.com/office/powerpoint/2010/main" val="38532534"/>
+        <p14:creationId xmlns:p14="http://schemas.microsoft.com/office/powerpoint/2010/main" val="3550637830"/>
       </p:ext>
     </p:extLst>
   </p:cSld>
@@ -16866,13 +18060,13 @@
           <p:nvPr/>
         </p:nvPicPr>
         <p:blipFill>
-          <a:blip r:embed="rId2">
+          <a:blip r:embed="rId3">
             <a:extLst>
               <a:ext uri="{28A0092B-C50C-407E-A947-70E740481C1C}">
                 <a14:useLocalDpi xmlns:a14="http://schemas.microsoft.com/office/drawing/2010/main" val="0"/>
               </a:ext>
               <a:ext uri="{96DAC541-7B7A-43D3-8B79-37D633B846F1}">
-                <asvg:svgBlip xmlns:asvg="http://schemas.microsoft.com/office/drawing/2016/SVG/main" r:embed="rId3"/>
+                <asvg:svgBlip xmlns:asvg="http://schemas.microsoft.com/office/drawing/2016/SVG/main" r:embed="rId4"/>
               </a:ext>
             </a:extLst>
           </a:blip>
@@ -16905,7 +18099,7 @@
           <p:nvPr/>
         </p:nvPicPr>
         <p:blipFill>
-          <a:blip r:embed="rId4">
+          <a:blip r:embed="rId5">
             <a:extLst>
               <a:ext uri="{28A0092B-C50C-407E-A947-70E740481C1C}">
                 <a14:useLocalDpi xmlns:a14="http://schemas.microsoft.com/office/drawing/2010/main" val="0"/>
@@ -16993,7 +18187,6 @@
                 <a:solidFill>
                   <a:schemeClr val="bg1"/>
                 </a:solidFill>
-                <a:latin typeface="Gill Sans MT" panose="020B0502020104020203" pitchFamily="34" charset="0"/>
               </a:rPr>
               <a:t>Les consultations augmentent avec le taux de natalité et la part des familles avec des enfants jeunes, mais évolue en sens inverse de la part des familles sans enfants et du taux de mortalité.</a:t>
             </a:r>
@@ -17001,7 +18194,6 @@
               <a:solidFill>
                 <a:schemeClr val="bg1"/>
               </a:solidFill>
-              <a:latin typeface="Gill Sans MT" panose="020B0502020104020203" pitchFamily="34" charset="0"/>
             </a:endParaRPr>
           </a:p>
         </p:txBody>
@@ -17009,7 +18201,7 @@
     </p:spTree>
     <p:extLst>
       <p:ext uri="{BB962C8B-B14F-4D97-AF65-F5344CB8AC3E}">
-        <p14:creationId xmlns:p14="http://schemas.microsoft.com/office/powerpoint/2010/main" val="251220028"/>
+        <p14:creationId xmlns:p14="http://schemas.microsoft.com/office/powerpoint/2010/main" val="3187316871"/>
       </p:ext>
     </p:extLst>
   </p:cSld>
@@ -23199,6 +24391,116 @@
       </p:grpSpPr>
       <p:sp>
         <p:nvSpPr>
+          <p:cNvPr id="34" name="Nuage 33">
+            <a:extLst>
+              <a:ext uri="{FF2B5EF4-FFF2-40B4-BE49-F238E27FC236}">
+                <a16:creationId xmlns:a16="http://schemas.microsoft.com/office/drawing/2014/main" id="{AF588447-C583-EED6-6B7F-F4A8E6A4343E}"/>
+              </a:ext>
+            </a:extLst>
+          </p:cNvPr>
+          <p:cNvSpPr/>
+          <p:nvPr/>
+        </p:nvSpPr>
+        <p:spPr>
+          <a:xfrm>
+            <a:off x="592913" y="5419373"/>
+            <a:ext cx="10485782" cy="995073"/>
+          </a:xfrm>
+          <a:prstGeom prst="cloud">
+            <a:avLst/>
+          </a:prstGeom>
+          <a:solidFill>
+            <a:schemeClr val="accent6">
+              <a:lumMod val="60000"/>
+              <a:lumOff val="40000"/>
+            </a:schemeClr>
+          </a:solidFill>
+          <a:ln>
+            <a:noFill/>
+          </a:ln>
+        </p:spPr>
+        <p:style>
+          <a:lnRef idx="2">
+            <a:schemeClr val="accent1">
+              <a:shade val="15000"/>
+            </a:schemeClr>
+          </a:lnRef>
+          <a:fillRef idx="1">
+            <a:schemeClr val="accent1"/>
+          </a:fillRef>
+          <a:effectRef idx="0">
+            <a:schemeClr val="accent1"/>
+          </a:effectRef>
+          <a:fontRef idx="minor">
+            <a:schemeClr val="lt1"/>
+          </a:fontRef>
+        </p:style>
+        <p:txBody>
+          <a:bodyPr rtlCol="0" anchor="ctr"/>
+          <a:lstStyle/>
+          <a:p>
+            <a:pPr algn="ctr"/>
+            <a:endParaRPr lang="fr-FR" dirty="0"/>
+          </a:p>
+        </p:txBody>
+      </p:sp>
+      <p:sp>
+        <p:nvSpPr>
+          <p:cNvPr id="5" name="Rectangle : coins arrondis 4">
+            <a:extLst>
+              <a:ext uri="{FF2B5EF4-FFF2-40B4-BE49-F238E27FC236}">
+                <a16:creationId xmlns:a16="http://schemas.microsoft.com/office/drawing/2014/main" id="{AFEC8FFA-5C5C-0E9C-7F4A-45E9F67E4E54}"/>
+              </a:ext>
+            </a:extLst>
+          </p:cNvPr>
+          <p:cNvSpPr/>
+          <p:nvPr/>
+        </p:nvSpPr>
+        <p:spPr>
+          <a:xfrm>
+            <a:off x="592910" y="1437159"/>
+            <a:ext cx="3255759" cy="978495"/>
+          </a:xfrm>
+          <a:prstGeom prst="roundRect">
+            <a:avLst/>
+          </a:prstGeom>
+          <a:solidFill>
+            <a:schemeClr val="accent6">
+              <a:lumMod val="60000"/>
+              <a:lumOff val="40000"/>
+            </a:schemeClr>
+          </a:solidFill>
+          <a:ln>
+            <a:noFill/>
+          </a:ln>
+        </p:spPr>
+        <p:style>
+          <a:lnRef idx="2">
+            <a:schemeClr val="accent1">
+              <a:shade val="15000"/>
+            </a:schemeClr>
+          </a:lnRef>
+          <a:fillRef idx="1">
+            <a:schemeClr val="accent1"/>
+          </a:fillRef>
+          <a:effectRef idx="0">
+            <a:schemeClr val="accent1"/>
+          </a:effectRef>
+          <a:fontRef idx="minor">
+            <a:schemeClr val="lt1"/>
+          </a:fontRef>
+        </p:style>
+        <p:txBody>
+          <a:bodyPr rtlCol="0" anchor="ctr"/>
+          <a:lstStyle/>
+          <a:p>
+            <a:pPr algn="ctr"/>
+            <a:endParaRPr lang="fr-FR" dirty="0"/>
+          </a:p>
+        </p:txBody>
+      </p:sp>
+      <p:sp>
+        <p:nvSpPr>
           <p:cNvPr id="2" name="Espace réservé du numéro de diapositive 1">
             <a:extLst>
               <a:ext uri="{FF2B5EF4-FFF2-40B4-BE49-F238E27FC236}">
@@ -23284,13 +24586,13 @@
           <p:nvPr/>
         </p:nvPicPr>
         <p:blipFill>
-          <a:blip r:embed="rId2">
+          <a:blip r:embed="rId3">
             <a:extLst>
               <a:ext uri="{28A0092B-C50C-407E-A947-70E740481C1C}">
                 <a14:useLocalDpi xmlns:a14="http://schemas.microsoft.com/office/drawing/2010/main" val="0"/>
               </a:ext>
               <a:ext uri="{96DAC541-7B7A-43D3-8B79-37D633B846F1}">
-                <asvg:svgBlip xmlns:asvg="http://schemas.microsoft.com/office/drawing/2016/SVG/main" r:embed="rId3"/>
+                <asvg:svgBlip xmlns:asvg="http://schemas.microsoft.com/office/drawing/2016/SVG/main" r:embed="rId4"/>
               </a:ext>
             </a:extLst>
           </a:blip>
@@ -23302,42 +24604,6 @@
           <a:xfrm>
             <a:off x="11078692" y="266700"/>
             <a:ext cx="1170459" cy="1170459"/>
-          </a:xfrm>
-          <a:prstGeom prst="rect">
-            <a:avLst/>
-          </a:prstGeom>
-        </p:spPr>
-      </p:pic>
-      <p:pic>
-        <p:nvPicPr>
-          <p:cNvPr id="6" name="Image 5">
-            <a:extLst>
-              <a:ext uri="{FF2B5EF4-FFF2-40B4-BE49-F238E27FC236}">
-                <a16:creationId xmlns:a16="http://schemas.microsoft.com/office/drawing/2014/main" id="{D23AC962-1BBC-5893-FA64-FBBF3CB72B31}"/>
-              </a:ext>
-            </a:extLst>
-          </p:cNvPr>
-          <p:cNvPicPr>
-            <a:picLocks noChangeAspect="1"/>
-          </p:cNvPicPr>
-          <p:nvPr/>
-        </p:nvPicPr>
-        <p:blipFill>
-          <a:blip r:embed="rId4">
-            <a:extLst>
-              <a:ext uri="{28A0092B-C50C-407E-A947-70E740481C1C}">
-                <a14:useLocalDpi xmlns:a14="http://schemas.microsoft.com/office/drawing/2010/main" val="0"/>
-              </a:ext>
-            </a:extLst>
-          </a:blip>
-          <a:stretch>
-            <a:fillRect/>
-          </a:stretch>
-        </p:blipFill>
-        <p:spPr>
-          <a:xfrm>
-            <a:off x="1750954" y="1288381"/>
-            <a:ext cx="8690090" cy="4106805"/>
           </a:xfrm>
           <a:prstGeom prst="rect">
             <a:avLst/>
@@ -23358,8 +24624,8 @@
         </p:nvSpPr>
         <p:spPr>
           <a:xfrm>
-            <a:off x="1750955" y="5642832"/>
-            <a:ext cx="8690089" cy="830997"/>
+            <a:off x="1580898" y="5514930"/>
+            <a:ext cx="9194549" cy="830997"/>
           </a:xfrm>
           <a:prstGeom prst="rect">
             <a:avLst/>
@@ -23374,18 +24640,113 @@
           <a:p>
             <a:pPr algn="just"/>
             <a:r>
-              <a:rPr lang="fr-FR" sz="2400" dirty="0">
+              <a:rPr lang="fr-FR" sz="2400" b="1" dirty="0">
+                <a:solidFill>
+                  <a:schemeClr val="bg1"/>
+                </a:solidFill>
                 <a:latin typeface="Gill Sans MT" panose="020B0502020104020203" pitchFamily="34" charset="0"/>
               </a:rPr>
-              <a:t>Le graphique montre l’influence marquée des caractéristiques des communes voisines sur le taux de consultations</a:t>
+              <a:t>Influence marquée des caractéristiques des communes voisines</a:t>
+            </a:r>
+            <a:r>
+              <a:rPr lang="fr-FR" sz="2400" dirty="0">
+                <a:solidFill>
+                  <a:schemeClr val="bg1"/>
+                </a:solidFill>
+                <a:latin typeface="Gill Sans MT" panose="020B0502020104020203" pitchFamily="34" charset="0"/>
+              </a:rPr>
+              <a:t> sur le taux de consultations.</a:t>
             </a:r>
           </a:p>
         </p:txBody>
       </p:sp>
+      <p:pic>
+        <p:nvPicPr>
+          <p:cNvPr id="33" name="Image 32">
+            <a:extLst>
+              <a:ext uri="{FF2B5EF4-FFF2-40B4-BE49-F238E27FC236}">
+                <a16:creationId xmlns:a16="http://schemas.microsoft.com/office/drawing/2014/main" id="{D23AC962-1BBC-5893-FA64-FBBF3CB72B31}"/>
+              </a:ext>
+            </a:extLst>
+          </p:cNvPr>
+          <p:cNvPicPr>
+            <a:picLocks noChangeAspect="1"/>
+          </p:cNvPicPr>
+          <p:nvPr/>
+        </p:nvPicPr>
+        <p:blipFill>
+          <a:blip r:embed="rId5">
+            <a:extLst>
+              <a:ext uri="{28A0092B-C50C-407E-A947-70E740481C1C}">
+                <a14:useLocalDpi xmlns:a14="http://schemas.microsoft.com/office/drawing/2010/main" val="0"/>
+              </a:ext>
+            </a:extLst>
+          </a:blip>
+          <a:stretch>
+            <a:fillRect/>
+          </a:stretch>
+        </p:blipFill>
+        <p:spPr>
+          <a:xfrm>
+            <a:off x="592910" y="1261182"/>
+            <a:ext cx="10182537" cy="4106805"/>
+          </a:xfrm>
+          <a:prstGeom prst="rect">
+            <a:avLst/>
+          </a:prstGeom>
+        </p:spPr>
+      </p:pic>
+      <p:cxnSp>
+        <p:nvCxnSpPr>
+          <p:cNvPr id="36" name="Connecteur : en angle 35">
+            <a:extLst>
+              <a:ext uri="{FF2B5EF4-FFF2-40B4-BE49-F238E27FC236}">
+                <a16:creationId xmlns:a16="http://schemas.microsoft.com/office/drawing/2014/main" id="{05557227-D437-34B3-9423-088F4B501833}"/>
+              </a:ext>
+            </a:extLst>
+          </p:cNvPr>
+          <p:cNvCxnSpPr>
+            <a:cxnSpLocks/>
+          </p:cNvCxnSpPr>
+          <p:nvPr/>
+        </p:nvCxnSpPr>
+        <p:spPr>
+          <a:xfrm rot="16200000" flipH="1">
+            <a:off x="-1460493" y="3685190"/>
+            <a:ext cx="4106805" cy="297892"/>
+          </a:xfrm>
+          <a:prstGeom prst="bentConnector2">
+            <a:avLst/>
+          </a:prstGeom>
+          <a:ln w="28575">
+            <a:solidFill>
+              <a:schemeClr val="accent6">
+                <a:lumMod val="60000"/>
+                <a:lumOff val="40000"/>
+              </a:schemeClr>
+            </a:solidFill>
+            <a:tailEnd type="triangle"/>
+          </a:ln>
+        </p:spPr>
+        <p:style>
+          <a:lnRef idx="1">
+            <a:schemeClr val="accent1"/>
+          </a:lnRef>
+          <a:fillRef idx="0">
+            <a:schemeClr val="accent1"/>
+          </a:fillRef>
+          <a:effectRef idx="0">
+            <a:schemeClr val="accent1"/>
+          </a:effectRef>
+          <a:fontRef idx="minor">
+            <a:schemeClr val="tx1"/>
+          </a:fontRef>
+        </p:style>
+      </p:cxnSp>
     </p:spTree>
     <p:extLst>
       <p:ext uri="{BB962C8B-B14F-4D97-AF65-F5344CB8AC3E}">
-        <p14:creationId xmlns:p14="http://schemas.microsoft.com/office/powerpoint/2010/main" val="218831556"/>
+        <p14:creationId xmlns:p14="http://schemas.microsoft.com/office/powerpoint/2010/main" val="837968329"/>
       </p:ext>
     </p:extLst>
   </p:cSld>
@@ -23418,6 +24779,113 @@
           <a:chExt cx="0" cy="0"/>
         </a:xfrm>
       </p:grpSpPr>
+      <p:sp>
+        <p:nvSpPr>
+          <p:cNvPr id="46" name="Nuage 45">
+            <a:extLst>
+              <a:ext uri="{FF2B5EF4-FFF2-40B4-BE49-F238E27FC236}">
+                <a16:creationId xmlns:a16="http://schemas.microsoft.com/office/drawing/2014/main" id="{D47236CC-B57E-9CE7-2B2F-A50E9B5BA8A6}"/>
+              </a:ext>
+            </a:extLst>
+          </p:cNvPr>
+          <p:cNvSpPr/>
+          <p:nvPr/>
+        </p:nvSpPr>
+        <p:spPr>
+          <a:xfrm>
+            <a:off x="5431809" y="6259810"/>
+            <a:ext cx="4973623" cy="476012"/>
+          </a:xfrm>
+          <a:prstGeom prst="cloud">
+            <a:avLst/>
+          </a:prstGeom>
+          <a:solidFill>
+            <a:srgbClr val="FFC000"/>
+          </a:solidFill>
+          <a:ln>
+            <a:noFill/>
+          </a:ln>
+        </p:spPr>
+        <p:style>
+          <a:lnRef idx="2">
+            <a:schemeClr val="accent1">
+              <a:shade val="15000"/>
+            </a:schemeClr>
+          </a:lnRef>
+          <a:fillRef idx="1">
+            <a:schemeClr val="accent1"/>
+          </a:fillRef>
+          <a:effectRef idx="0">
+            <a:schemeClr val="accent1"/>
+          </a:effectRef>
+          <a:fontRef idx="minor">
+            <a:schemeClr val="lt1"/>
+          </a:fontRef>
+        </p:style>
+        <p:txBody>
+          <a:bodyPr rtlCol="0" anchor="ctr"/>
+          <a:lstStyle/>
+          <a:p>
+            <a:pPr algn="ctr"/>
+            <a:endParaRPr lang="fr-FR" dirty="0"/>
+          </a:p>
+        </p:txBody>
+      </p:sp>
+      <p:sp>
+        <p:nvSpPr>
+          <p:cNvPr id="45" name="Nuage 44">
+            <a:extLst>
+              <a:ext uri="{FF2B5EF4-FFF2-40B4-BE49-F238E27FC236}">
+                <a16:creationId xmlns:a16="http://schemas.microsoft.com/office/drawing/2014/main" id="{292B2018-E5E0-8B96-F15A-A0DBBB3D6A75}"/>
+              </a:ext>
+            </a:extLst>
+          </p:cNvPr>
+          <p:cNvSpPr/>
+          <p:nvPr/>
+        </p:nvSpPr>
+        <p:spPr>
+          <a:xfrm>
+            <a:off x="2609778" y="1367688"/>
+            <a:ext cx="8035476" cy="416899"/>
+          </a:xfrm>
+          <a:prstGeom prst="cloud">
+            <a:avLst/>
+          </a:prstGeom>
+          <a:solidFill>
+            <a:schemeClr val="accent6">
+              <a:lumMod val="60000"/>
+              <a:lumOff val="40000"/>
+            </a:schemeClr>
+          </a:solidFill>
+          <a:ln>
+            <a:noFill/>
+          </a:ln>
+        </p:spPr>
+        <p:style>
+          <a:lnRef idx="2">
+            <a:schemeClr val="accent1">
+              <a:shade val="15000"/>
+            </a:schemeClr>
+          </a:lnRef>
+          <a:fillRef idx="1">
+            <a:schemeClr val="accent1"/>
+          </a:fillRef>
+          <a:effectRef idx="0">
+            <a:schemeClr val="accent1"/>
+          </a:effectRef>
+          <a:fontRef idx="minor">
+            <a:schemeClr val="lt1"/>
+          </a:fontRef>
+        </p:style>
+        <p:txBody>
+          <a:bodyPr rtlCol="0" anchor="ctr"/>
+          <a:lstStyle/>
+          <a:p>
+            <a:pPr algn="ctr"/>
+            <a:endParaRPr lang="fr-FR" dirty="0"/>
+          </a:p>
+        </p:txBody>
+      </p:sp>
       <p:sp>
         <p:nvSpPr>
           <p:cNvPr id="2" name="Espace réservé du numéro de diapositive 1">
@@ -23551,8 +25019,8 @@
         </p:blipFill>
         <p:spPr>
           <a:xfrm>
-            <a:off x="232727" y="1437159"/>
-            <a:ext cx="6069398" cy="4193966"/>
+            <a:off x="232727" y="1928209"/>
+            <a:ext cx="6069398" cy="4220714"/>
           </a:xfrm>
           <a:prstGeom prst="rect">
             <a:avLst/>
@@ -23581,8 +25049,8 @@
         </p:blipFill>
         <p:spPr>
           <a:xfrm>
-            <a:off x="5704427" y="1437159"/>
-            <a:ext cx="6366969" cy="4193966"/>
+            <a:off x="5704427" y="1928209"/>
+            <a:ext cx="6366969" cy="4220714"/>
           </a:xfrm>
           <a:prstGeom prst="rect">
             <a:avLst/>
@@ -23591,10 +25059,10 @@
       </p:pic>
       <p:sp>
         <p:nvSpPr>
-          <p:cNvPr id="5" name="ZoneTexte 4">
+          <p:cNvPr id="6" name="ZoneTexte 5">
             <a:extLst>
               <a:ext uri="{FF2B5EF4-FFF2-40B4-BE49-F238E27FC236}">
-                <a16:creationId xmlns:a16="http://schemas.microsoft.com/office/drawing/2014/main" id="{50B9101C-0AE5-4556-A440-A5E8C844FFC8}"/>
+                <a16:creationId xmlns:a16="http://schemas.microsoft.com/office/drawing/2014/main" id="{EA141030-7B20-852C-FF52-8B3FA1C96E4C}"/>
               </a:ext>
             </a:extLst>
           </p:cNvPr>
@@ -23603,8 +25071,8 @@
         </p:nvSpPr>
         <p:spPr>
           <a:xfrm>
-            <a:off x="2037652" y="5748889"/>
-            <a:ext cx="8528945" cy="923330"/>
+            <a:off x="3912802" y="1322922"/>
+            <a:ext cx="6069398" cy="461665"/>
           </a:xfrm>
           <a:prstGeom prst="rect">
             <a:avLst/>
@@ -23612,48 +25080,530 @@
           <a:noFill/>
         </p:spPr>
         <p:txBody>
-          <a:bodyPr wrap="square" rtlCol="0">
+          <a:bodyPr wrap="square">
             <a:spAutoFit/>
           </a:bodyPr>
           <a:lstStyle/>
           <a:p>
             <a:r>
-              <a:rPr lang="fr-FR" dirty="0">
+              <a:rPr lang="fr-FR" sz="2400" b="1" dirty="0">
+                <a:effectLst/>
                 <a:latin typeface="Gill Sans MT" panose="020B0502020104020203" pitchFamily="34" charset="0"/>
+                <a:ea typeface="Calibri" panose="020F0502020204030204" pitchFamily="34" charset="0"/>
               </a:rPr>
-              <a:t>Les taux de consultations observés et prédits présentent structure spatiale globalement similaire. Certaines zones, notamment au </a:t>
+              <a:t>Structure spatiale globalement similaire</a:t>
             </a:r>
-            <a:r>
-              <a:rPr lang="fr-FR" b="1" dirty="0">
-                <a:latin typeface="Gill Sans MT" panose="020B0502020104020203" pitchFamily="34" charset="0"/>
-              </a:rPr>
-              <a:t>sud-est</a:t>
-            </a:r>
-            <a:r>
-              <a:rPr lang="fr-FR" dirty="0">
-                <a:latin typeface="Gill Sans MT" panose="020B0502020104020203" pitchFamily="34" charset="0"/>
-              </a:rPr>
-              <a:t> et au </a:t>
-            </a:r>
-            <a:r>
-              <a:rPr lang="fr-FR" b="1" dirty="0">
-                <a:latin typeface="Gill Sans MT" panose="020B0502020104020203" pitchFamily="34" charset="0"/>
-              </a:rPr>
-              <a:t>nord-oues</a:t>
-            </a:r>
-            <a:r>
-              <a:rPr lang="fr-FR" dirty="0">
-                <a:latin typeface="Gill Sans MT" panose="020B0502020104020203" pitchFamily="34" charset="0"/>
-              </a:rPr>
-              <a:t>t, mettent toutefois en évidence des divergences marquées entre les valeurs observées et prédites</a:t>
-            </a:r>
+            <a:endParaRPr lang="fr-FR" sz="2400" dirty="0">
+              <a:latin typeface="Gill Sans MT" panose="020B0502020104020203" pitchFamily="34" charset="0"/>
+            </a:endParaRPr>
           </a:p>
         </p:txBody>
       </p:sp>
+      <p:sp>
+        <p:nvSpPr>
+          <p:cNvPr id="10" name="ZoneTexte 9">
+            <a:extLst>
+              <a:ext uri="{FF2B5EF4-FFF2-40B4-BE49-F238E27FC236}">
+                <a16:creationId xmlns:a16="http://schemas.microsoft.com/office/drawing/2014/main" id="{8E9409B9-4717-7962-7725-FF8C2CCDE0BD}"/>
+              </a:ext>
+            </a:extLst>
+          </p:cNvPr>
+          <p:cNvSpPr txBox="1"/>
+          <p:nvPr/>
+        </p:nvSpPr>
+        <p:spPr>
+          <a:xfrm>
+            <a:off x="6123965" y="6259810"/>
+            <a:ext cx="3525673" cy="461665"/>
+          </a:xfrm>
+          <a:prstGeom prst="rect">
+            <a:avLst/>
+          </a:prstGeom>
+          <a:noFill/>
+        </p:spPr>
+        <p:txBody>
+          <a:bodyPr wrap="square">
+            <a:spAutoFit/>
+          </a:bodyPr>
+          <a:lstStyle/>
+          <a:p>
+            <a:r>
+              <a:rPr lang="fr-FR" sz="2400" b="1" dirty="0">
+                <a:latin typeface="Gill Sans MT" panose="020B0502020104020203" pitchFamily="34" charset="0"/>
+                <a:ea typeface="Calibri" panose="020F0502020204030204" pitchFamily="34" charset="0"/>
+              </a:rPr>
+              <a:t>D</a:t>
+            </a:r>
+            <a:r>
+              <a:rPr lang="fr-FR" sz="2400" b="1" dirty="0">
+                <a:effectLst/>
+                <a:latin typeface="Gill Sans MT" panose="020B0502020104020203" pitchFamily="34" charset="0"/>
+                <a:ea typeface="Calibri" panose="020F0502020204030204" pitchFamily="34" charset="0"/>
+              </a:rPr>
+              <a:t>ivergences marquées</a:t>
+            </a:r>
+            <a:r>
+              <a:rPr lang="fr-FR" sz="2400" dirty="0">
+                <a:effectLst/>
+                <a:latin typeface="Gill Sans MT" panose="020B0502020104020203" pitchFamily="34" charset="0"/>
+                <a:ea typeface="Calibri" panose="020F0502020204030204" pitchFamily="34" charset="0"/>
+              </a:rPr>
+              <a:t> </a:t>
+            </a:r>
+            <a:endParaRPr lang="fr-FR" sz="2400" dirty="0">
+              <a:latin typeface="Gill Sans MT" panose="020B0502020104020203" pitchFamily="34" charset="0"/>
+            </a:endParaRPr>
+          </a:p>
+        </p:txBody>
+      </p:sp>
+      <p:sp>
+        <p:nvSpPr>
+          <p:cNvPr id="11" name="Ellipse 10">
+            <a:extLst>
+              <a:ext uri="{FF2B5EF4-FFF2-40B4-BE49-F238E27FC236}">
+                <a16:creationId xmlns:a16="http://schemas.microsoft.com/office/drawing/2014/main" id="{8DC4AF19-9425-09D6-8744-DD60A96F0D6B}"/>
+              </a:ext>
+            </a:extLst>
+          </p:cNvPr>
+          <p:cNvSpPr/>
+          <p:nvPr/>
+        </p:nvSpPr>
+        <p:spPr>
+          <a:xfrm>
+            <a:off x="3267426" y="4850892"/>
+            <a:ext cx="914400" cy="518614"/>
+          </a:xfrm>
+          <a:prstGeom prst="ellipse">
+            <a:avLst/>
+          </a:prstGeom>
+          <a:noFill/>
+          <a:ln w="38100">
+            <a:solidFill>
+              <a:srgbClr val="FFC000"/>
+            </a:solidFill>
+          </a:ln>
+        </p:spPr>
+        <p:style>
+          <a:lnRef idx="2">
+            <a:schemeClr val="accent1">
+              <a:shade val="15000"/>
+            </a:schemeClr>
+          </a:lnRef>
+          <a:fillRef idx="1">
+            <a:schemeClr val="accent1"/>
+          </a:fillRef>
+          <a:effectRef idx="0">
+            <a:schemeClr val="accent1"/>
+          </a:effectRef>
+          <a:fontRef idx="minor">
+            <a:schemeClr val="lt1"/>
+          </a:fontRef>
+        </p:style>
+        <p:txBody>
+          <a:bodyPr rtlCol="0" anchor="ctr"/>
+          <a:lstStyle/>
+          <a:p>
+            <a:pPr algn="ctr"/>
+            <a:endParaRPr lang="fr-FR" dirty="0"/>
+          </a:p>
+        </p:txBody>
+      </p:sp>
+      <p:sp>
+        <p:nvSpPr>
+          <p:cNvPr id="12" name="Ellipse 11">
+            <a:extLst>
+              <a:ext uri="{FF2B5EF4-FFF2-40B4-BE49-F238E27FC236}">
+                <a16:creationId xmlns:a16="http://schemas.microsoft.com/office/drawing/2014/main" id="{2CB7A681-8C89-2EC1-E2D3-68D54ED880D8}"/>
+              </a:ext>
+            </a:extLst>
+          </p:cNvPr>
+          <p:cNvSpPr/>
+          <p:nvPr/>
+        </p:nvSpPr>
+        <p:spPr>
+          <a:xfrm>
+            <a:off x="8887911" y="4850892"/>
+            <a:ext cx="914400" cy="518614"/>
+          </a:xfrm>
+          <a:prstGeom prst="ellipse">
+            <a:avLst/>
+          </a:prstGeom>
+          <a:noFill/>
+          <a:ln w="38100">
+            <a:solidFill>
+              <a:srgbClr val="FFC000"/>
+            </a:solidFill>
+          </a:ln>
+        </p:spPr>
+        <p:style>
+          <a:lnRef idx="2">
+            <a:schemeClr val="accent1">
+              <a:shade val="15000"/>
+            </a:schemeClr>
+          </a:lnRef>
+          <a:fillRef idx="1">
+            <a:schemeClr val="accent1"/>
+          </a:fillRef>
+          <a:effectRef idx="0">
+            <a:schemeClr val="accent1"/>
+          </a:effectRef>
+          <a:fontRef idx="minor">
+            <a:schemeClr val="lt1"/>
+          </a:fontRef>
+        </p:style>
+        <p:txBody>
+          <a:bodyPr rtlCol="0" anchor="ctr"/>
+          <a:lstStyle/>
+          <a:p>
+            <a:pPr algn="ctr"/>
+            <a:endParaRPr lang="fr-FR" dirty="0"/>
+          </a:p>
+        </p:txBody>
+      </p:sp>
+      <p:cxnSp>
+        <p:nvCxnSpPr>
+          <p:cNvPr id="14" name="Connecteur droit avec flèche 13">
+            <a:extLst>
+              <a:ext uri="{FF2B5EF4-FFF2-40B4-BE49-F238E27FC236}">
+                <a16:creationId xmlns:a16="http://schemas.microsoft.com/office/drawing/2014/main" id="{59EC19DD-7110-9F47-98F9-E5E125BE533B}"/>
+              </a:ext>
+            </a:extLst>
+          </p:cNvPr>
+          <p:cNvCxnSpPr>
+            <a:cxnSpLocks/>
+            <a:stCxn id="10" idx="0"/>
+            <a:endCxn id="11" idx="5"/>
+          </p:cNvCxnSpPr>
+          <p:nvPr/>
+        </p:nvCxnSpPr>
+        <p:spPr>
+          <a:xfrm flipH="1" flipV="1">
+            <a:off x="4047915" y="5293557"/>
+            <a:ext cx="3838887" cy="966253"/>
+          </a:xfrm>
+          <a:prstGeom prst="straightConnector1">
+            <a:avLst/>
+          </a:prstGeom>
+          <a:ln w="28575">
+            <a:solidFill>
+              <a:srgbClr val="FFC000"/>
+            </a:solidFill>
+            <a:tailEnd type="triangle"/>
+          </a:ln>
+        </p:spPr>
+        <p:style>
+          <a:lnRef idx="1">
+            <a:schemeClr val="accent1"/>
+          </a:lnRef>
+          <a:fillRef idx="0">
+            <a:schemeClr val="accent1"/>
+          </a:fillRef>
+          <a:effectRef idx="0">
+            <a:schemeClr val="accent1"/>
+          </a:effectRef>
+          <a:fontRef idx="minor">
+            <a:schemeClr val="tx1"/>
+          </a:fontRef>
+        </p:style>
+      </p:cxnSp>
+      <p:cxnSp>
+        <p:nvCxnSpPr>
+          <p:cNvPr id="16" name="Connecteur droit avec flèche 15">
+            <a:extLst>
+              <a:ext uri="{FF2B5EF4-FFF2-40B4-BE49-F238E27FC236}">
+                <a16:creationId xmlns:a16="http://schemas.microsoft.com/office/drawing/2014/main" id="{BB88D393-B1E7-E906-6DB4-80247FB2DED0}"/>
+              </a:ext>
+            </a:extLst>
+          </p:cNvPr>
+          <p:cNvCxnSpPr>
+            <a:cxnSpLocks/>
+            <a:stCxn id="10" idx="0"/>
+            <a:endCxn id="12" idx="3"/>
+          </p:cNvCxnSpPr>
+          <p:nvPr/>
+        </p:nvCxnSpPr>
+        <p:spPr>
+          <a:xfrm flipV="1">
+            <a:off x="7886802" y="5293557"/>
+            <a:ext cx="1135020" cy="966253"/>
+          </a:xfrm>
+          <a:prstGeom prst="straightConnector1">
+            <a:avLst/>
+          </a:prstGeom>
+          <a:ln w="28575">
+            <a:solidFill>
+              <a:srgbClr val="FFC000"/>
+            </a:solidFill>
+            <a:tailEnd type="triangle"/>
+          </a:ln>
+        </p:spPr>
+        <p:style>
+          <a:lnRef idx="1">
+            <a:schemeClr val="accent1"/>
+          </a:lnRef>
+          <a:fillRef idx="0">
+            <a:schemeClr val="accent1"/>
+          </a:fillRef>
+          <a:effectRef idx="0">
+            <a:schemeClr val="accent1"/>
+          </a:effectRef>
+          <a:fontRef idx="minor">
+            <a:schemeClr val="tx1"/>
+          </a:fontRef>
+        </p:style>
+      </p:cxnSp>
+      <p:sp>
+        <p:nvSpPr>
+          <p:cNvPr id="31" name="Accolade ouvrante 30">
+            <a:extLst>
+              <a:ext uri="{FF2B5EF4-FFF2-40B4-BE49-F238E27FC236}">
+                <a16:creationId xmlns:a16="http://schemas.microsoft.com/office/drawing/2014/main" id="{66DDA998-10B2-1B1E-068B-BF660541BA75}"/>
+              </a:ext>
+            </a:extLst>
+          </p:cNvPr>
+          <p:cNvSpPr/>
+          <p:nvPr/>
+        </p:nvSpPr>
+        <p:spPr>
+          <a:xfrm rot="5400000">
+            <a:off x="5941403" y="-3918502"/>
+            <a:ext cx="365124" cy="11681770"/>
+          </a:xfrm>
+          <a:prstGeom prst="leftBrace">
+            <a:avLst/>
+          </a:prstGeom>
+          <a:ln w="28575">
+            <a:solidFill>
+              <a:schemeClr val="accent6">
+                <a:lumMod val="60000"/>
+                <a:lumOff val="40000"/>
+              </a:schemeClr>
+            </a:solidFill>
+          </a:ln>
+        </p:spPr>
+        <p:style>
+          <a:lnRef idx="1">
+            <a:schemeClr val="accent1"/>
+          </a:lnRef>
+          <a:fillRef idx="0">
+            <a:schemeClr val="accent1"/>
+          </a:fillRef>
+          <a:effectRef idx="0">
+            <a:schemeClr val="accent1"/>
+          </a:effectRef>
+          <a:fontRef idx="minor">
+            <a:schemeClr val="tx1"/>
+          </a:fontRef>
+        </p:style>
+        <p:txBody>
+          <a:bodyPr rtlCol="0" anchor="ctr"/>
+          <a:lstStyle/>
+          <a:p>
+            <a:pPr algn="ctr"/>
+            <a:endParaRPr lang="fr-FR" dirty="0"/>
+          </a:p>
+        </p:txBody>
+      </p:sp>
+      <p:sp>
+        <p:nvSpPr>
+          <p:cNvPr id="38" name="Ellipse 37">
+            <a:extLst>
+              <a:ext uri="{FF2B5EF4-FFF2-40B4-BE49-F238E27FC236}">
+                <a16:creationId xmlns:a16="http://schemas.microsoft.com/office/drawing/2014/main" id="{399BE038-9C7C-059E-876E-6D0F5D55AD98}"/>
+              </a:ext>
+            </a:extLst>
+          </p:cNvPr>
+          <p:cNvSpPr/>
+          <p:nvPr/>
+        </p:nvSpPr>
+        <p:spPr>
+          <a:xfrm>
+            <a:off x="1299942" y="3417782"/>
+            <a:ext cx="914400" cy="518614"/>
+          </a:xfrm>
+          <a:prstGeom prst="ellipse">
+            <a:avLst/>
+          </a:prstGeom>
+          <a:noFill/>
+          <a:ln w="38100">
+            <a:solidFill>
+              <a:srgbClr val="FFC000"/>
+            </a:solidFill>
+          </a:ln>
+        </p:spPr>
+        <p:style>
+          <a:lnRef idx="2">
+            <a:schemeClr val="accent1">
+              <a:shade val="15000"/>
+            </a:schemeClr>
+          </a:lnRef>
+          <a:fillRef idx="1">
+            <a:schemeClr val="accent1"/>
+          </a:fillRef>
+          <a:effectRef idx="0">
+            <a:schemeClr val="accent1"/>
+          </a:effectRef>
+          <a:fontRef idx="minor">
+            <a:schemeClr val="lt1"/>
+          </a:fontRef>
+        </p:style>
+        <p:txBody>
+          <a:bodyPr rtlCol="0" anchor="ctr"/>
+          <a:lstStyle/>
+          <a:p>
+            <a:pPr algn="ctr"/>
+            <a:endParaRPr lang="fr-FR" dirty="0"/>
+          </a:p>
+        </p:txBody>
+      </p:sp>
+      <p:sp>
+        <p:nvSpPr>
+          <p:cNvPr id="39" name="Ellipse 38">
+            <a:extLst>
+              <a:ext uri="{FF2B5EF4-FFF2-40B4-BE49-F238E27FC236}">
+                <a16:creationId xmlns:a16="http://schemas.microsoft.com/office/drawing/2014/main" id="{19E25E9B-D5B8-1A40-F74B-8A46278AC5C9}"/>
+              </a:ext>
+            </a:extLst>
+          </p:cNvPr>
+          <p:cNvSpPr/>
+          <p:nvPr/>
+        </p:nvSpPr>
+        <p:spPr>
+          <a:xfrm>
+            <a:off x="6920427" y="3417782"/>
+            <a:ext cx="914400" cy="518614"/>
+          </a:xfrm>
+          <a:prstGeom prst="ellipse">
+            <a:avLst/>
+          </a:prstGeom>
+          <a:noFill/>
+          <a:ln w="38100">
+            <a:solidFill>
+              <a:srgbClr val="FFC000"/>
+            </a:solidFill>
+          </a:ln>
+        </p:spPr>
+        <p:style>
+          <a:lnRef idx="2">
+            <a:schemeClr val="accent1">
+              <a:shade val="15000"/>
+            </a:schemeClr>
+          </a:lnRef>
+          <a:fillRef idx="1">
+            <a:schemeClr val="accent1"/>
+          </a:fillRef>
+          <a:effectRef idx="0">
+            <a:schemeClr val="accent1"/>
+          </a:effectRef>
+          <a:fontRef idx="minor">
+            <a:schemeClr val="lt1"/>
+          </a:fontRef>
+        </p:style>
+        <p:txBody>
+          <a:bodyPr rtlCol="0" anchor="ctr"/>
+          <a:lstStyle/>
+          <a:p>
+            <a:pPr algn="ctr"/>
+            <a:endParaRPr lang="fr-FR" dirty="0"/>
+          </a:p>
+        </p:txBody>
+      </p:sp>
+      <p:cxnSp>
+        <p:nvCxnSpPr>
+          <p:cNvPr id="40" name="Connecteur droit avec flèche 39">
+            <a:extLst>
+              <a:ext uri="{FF2B5EF4-FFF2-40B4-BE49-F238E27FC236}">
+                <a16:creationId xmlns:a16="http://schemas.microsoft.com/office/drawing/2014/main" id="{66636E20-B700-C977-090A-5B8E0F2A2536}"/>
+              </a:ext>
+            </a:extLst>
+          </p:cNvPr>
+          <p:cNvCxnSpPr>
+            <a:cxnSpLocks/>
+            <a:stCxn id="10" idx="0"/>
+            <a:endCxn id="38" idx="5"/>
+          </p:cNvCxnSpPr>
+          <p:nvPr/>
+        </p:nvCxnSpPr>
+        <p:spPr>
+          <a:xfrm flipH="1" flipV="1">
+            <a:off x="2080431" y="3860447"/>
+            <a:ext cx="5806371" cy="2399363"/>
+          </a:xfrm>
+          <a:prstGeom prst="straightConnector1">
+            <a:avLst/>
+          </a:prstGeom>
+          <a:ln w="28575">
+            <a:solidFill>
+              <a:srgbClr val="FFC000"/>
+            </a:solidFill>
+            <a:tailEnd type="triangle"/>
+          </a:ln>
+        </p:spPr>
+        <p:style>
+          <a:lnRef idx="1">
+            <a:schemeClr val="accent1"/>
+          </a:lnRef>
+          <a:fillRef idx="0">
+            <a:schemeClr val="accent1"/>
+          </a:fillRef>
+          <a:effectRef idx="0">
+            <a:schemeClr val="accent1"/>
+          </a:effectRef>
+          <a:fontRef idx="minor">
+            <a:schemeClr val="tx1"/>
+          </a:fontRef>
+        </p:style>
+      </p:cxnSp>
+      <p:cxnSp>
+        <p:nvCxnSpPr>
+          <p:cNvPr id="41" name="Connecteur droit avec flèche 40">
+            <a:extLst>
+              <a:ext uri="{FF2B5EF4-FFF2-40B4-BE49-F238E27FC236}">
+                <a16:creationId xmlns:a16="http://schemas.microsoft.com/office/drawing/2014/main" id="{712FD341-501B-1DC8-7C69-ECAFF4A9334D}"/>
+              </a:ext>
+            </a:extLst>
+          </p:cNvPr>
+          <p:cNvCxnSpPr>
+            <a:cxnSpLocks/>
+            <a:stCxn id="10" idx="0"/>
+            <a:endCxn id="39" idx="4"/>
+          </p:cNvCxnSpPr>
+          <p:nvPr/>
+        </p:nvCxnSpPr>
+        <p:spPr>
+          <a:xfrm flipH="1" flipV="1">
+            <a:off x="7377627" y="3936396"/>
+            <a:ext cx="509175" cy="2323414"/>
+          </a:xfrm>
+          <a:prstGeom prst="straightConnector1">
+            <a:avLst/>
+          </a:prstGeom>
+          <a:ln w="28575">
+            <a:solidFill>
+              <a:srgbClr val="FFC000"/>
+            </a:solidFill>
+            <a:tailEnd type="triangle"/>
+          </a:ln>
+        </p:spPr>
+        <p:style>
+          <a:lnRef idx="1">
+            <a:schemeClr val="accent1"/>
+          </a:lnRef>
+          <a:fillRef idx="0">
+            <a:schemeClr val="accent1"/>
+          </a:fillRef>
+          <a:effectRef idx="0">
+            <a:schemeClr val="accent1"/>
+          </a:effectRef>
+          <a:fontRef idx="minor">
+            <a:schemeClr val="tx1"/>
+          </a:fontRef>
+        </p:style>
+      </p:cxnSp>
     </p:spTree>
     <p:extLst>
       <p:ext uri="{BB962C8B-B14F-4D97-AF65-F5344CB8AC3E}">
-        <p14:creationId xmlns:p14="http://schemas.microsoft.com/office/powerpoint/2010/main" val="951892530"/>
+        <p14:creationId xmlns:p14="http://schemas.microsoft.com/office/powerpoint/2010/main" val="3381023947"/>
       </p:ext>
     </p:extLst>
   </p:cSld>

</xml_diff>

<commit_message>
Ajout de mes modifications
Ajout de mes modifs
</commit_message>
<xml_diff>
--- a/Présentation/Soutenance_Groupe25.pptx
+++ b/Présentation/Soutenance_Groupe25.pptx
@@ -9,10 +9,10 @@
     <p:sldMasterId id="2147483672" r:id="rId5"/>
   </p:sldMasterIdLst>
   <p:notesMasterIdLst>
-    <p:notesMasterId r:id="rId36"/>
+    <p:notesMasterId r:id="rId37"/>
   </p:notesMasterIdLst>
   <p:handoutMasterIdLst>
-    <p:handoutMasterId r:id="rId37"/>
+    <p:handoutMasterId r:id="rId38"/>
   </p:handoutMasterIdLst>
   <p:sldIdLst>
     <p:sldId id="257" r:id="rId6"/>
@@ -44,7 +44,8 @@
     <p:sldId id="297" r:id="rId32"/>
     <p:sldId id="261" r:id="rId33"/>
     <p:sldId id="273" r:id="rId34"/>
-    <p:sldId id="274" r:id="rId35"/>
+    <p:sldId id="317" r:id="rId35"/>
+    <p:sldId id="274" r:id="rId36"/>
   </p:sldIdLst>
   <p:sldSz cx="12192000" cy="6858000"/>
   <p:notesSz cx="6858000" cy="9144000"/>
@@ -972,9 +973,18 @@
         <a:p>
           <a:r>
             <a:rPr lang="fr-FR" sz="1100" b="1" dirty="0">
+              <a:solidFill>
+                <a:srgbClr val="FFFF00"/>
+              </a:solidFill>
               <a:latin typeface="Gill Sans MT" panose="020B0502020104020203" pitchFamily="34" charset="0"/>
             </a:rPr>
-            <a:t>↑ 65-79 ans (chroniques)</a:t>
+            <a:t>↑ 65-79 ans </a:t>
+          </a:r>
+          <a:r>
+            <a:rPr lang="fr-FR" sz="1100" b="1" dirty="0">
+              <a:latin typeface="Gill Sans MT" panose="020B0502020104020203" pitchFamily="34" charset="0"/>
+            </a:rPr>
+            <a:t>(chroniques)</a:t>
           </a:r>
           <a:br>
             <a:rPr lang="fr-FR" sz="1100" b="1" dirty="0">
@@ -991,6 +1001,22 @@
               <a:latin typeface="Gill Sans MT" panose="020B0502020104020203" pitchFamily="34" charset="0"/>
             </a:rPr>
             <a:t>↓ 18-35 ans (sporadiques)</a:t>
+          </a:r>
+          <a:br>
+            <a:rPr lang="fr-FR" sz="1100" b="1" dirty="0">
+              <a:latin typeface="Gill Sans MT" panose="020B0502020104020203" pitchFamily="34" charset="0"/>
+            </a:rPr>
+          </a:br>
+          <a:br>
+            <a:rPr lang="fr-FR" sz="1100" b="1" dirty="0">
+              <a:latin typeface="Gill Sans MT" panose="020B0502020104020203" pitchFamily="34" charset="0"/>
+            </a:rPr>
+          </a:br>
+          <a:r>
+            <a:rPr lang="fr-FR" sz="1100" b="1" dirty="0">
+              <a:latin typeface="Gill Sans MT" panose="020B0502020104020203" pitchFamily="34" charset="0"/>
+            </a:rPr>
+            <a:t>[1]</a:t>
           </a:r>
           <a:endParaRPr lang="fr-FR" sz="1100" dirty="0">
             <a:latin typeface="Gill Sans MT" panose="020B0502020104020203" pitchFamily="34" charset="0"/>
@@ -1037,6 +1063,9 @@
         <a:p>
           <a:r>
             <a:rPr lang="fr-FR" sz="1100" b="1" dirty="0">
+              <a:solidFill>
+                <a:srgbClr val="FFFF00"/>
+              </a:solidFill>
               <a:latin typeface="Gill Sans MT" panose="020B0502020104020203" pitchFamily="34" charset="0"/>
             </a:rPr>
             <a:t>↑ Revenus Elevés</a:t>
@@ -1056,6 +1085,22 @@
               <a:latin typeface="Gill Sans MT" panose="020B0502020104020203" pitchFamily="34" charset="0"/>
             </a:rPr>
             <a:t>↓ Précarités (obstacles)</a:t>
+          </a:r>
+          <a:br>
+            <a:rPr lang="fr-FR" sz="1100" b="1" dirty="0">
+              <a:latin typeface="Gill Sans MT" panose="020B0502020104020203" pitchFamily="34" charset="0"/>
+            </a:rPr>
+          </a:br>
+          <a:br>
+            <a:rPr lang="fr-FR" sz="1100" b="1" dirty="0">
+              <a:latin typeface="Gill Sans MT" panose="020B0502020104020203" pitchFamily="34" charset="0"/>
+            </a:rPr>
+          </a:br>
+          <a:r>
+            <a:rPr lang="fr-FR" sz="1100" b="1" dirty="0">
+              <a:latin typeface="Gill Sans MT" panose="020B0502020104020203" pitchFamily="34" charset="0"/>
+            </a:rPr>
+            <a:t>[3]</a:t>
           </a:r>
           <a:endParaRPr lang="fr-FR" sz="1100" dirty="0">
             <a:latin typeface="Gill Sans MT" panose="020B0502020104020203" pitchFamily="34" charset="0"/>
@@ -1102,6 +1147,9 @@
         <a:p>
           <a:r>
             <a:rPr lang="fr-FR" sz="1100" b="1" dirty="0">
+              <a:solidFill>
+                <a:srgbClr val="FFFF00"/>
+              </a:solidFill>
               <a:latin typeface="Gill Sans MT" panose="020B0502020104020203" pitchFamily="34" charset="0"/>
             </a:rPr>
             <a:t>↑ Femmes (préventif)</a:t>
@@ -1121,6 +1169,22 @@
               <a:latin typeface="Gill Sans MT" panose="020B0502020104020203" pitchFamily="34" charset="0"/>
             </a:rPr>
             <a:t>↓ Hommes (sous-utilisent)</a:t>
+          </a:r>
+          <a:br>
+            <a:rPr lang="fr-FR" sz="1100" b="1" dirty="0">
+              <a:latin typeface="Gill Sans MT" panose="020B0502020104020203" pitchFamily="34" charset="0"/>
+            </a:rPr>
+          </a:br>
+          <a:br>
+            <a:rPr lang="fr-FR" sz="1100" b="1" dirty="0">
+              <a:latin typeface="Gill Sans MT" panose="020B0502020104020203" pitchFamily="34" charset="0"/>
+            </a:rPr>
+          </a:br>
+          <a:r>
+            <a:rPr lang="fr-FR" sz="1100" b="1" dirty="0">
+              <a:latin typeface="Gill Sans MT" panose="020B0502020104020203" pitchFamily="34" charset="0"/>
+            </a:rPr>
+            <a:t>[4]</a:t>
           </a:r>
           <a:endParaRPr lang="fr-FR" sz="1100" dirty="0">
             <a:latin typeface="Gill Sans MT" panose="020B0502020104020203" pitchFamily="34" charset="0"/>
@@ -1167,6 +1231,9 @@
         <a:p>
           <a:r>
             <a:rPr lang="fr-FR" sz="1100" b="1" dirty="0">
+              <a:solidFill>
+                <a:srgbClr val="FFFF00"/>
+              </a:solidFill>
               <a:latin typeface="Gill Sans MT" panose="020B0502020104020203" pitchFamily="34" charset="0"/>
             </a:rPr>
             <a:t>↑ Zones urbaines (denses)</a:t>
@@ -1186,6 +1253,22 @@
               <a:latin typeface="Gill Sans MT" panose="020B0502020104020203" pitchFamily="34" charset="0"/>
             </a:rPr>
             <a:t>↓ Zones rurales (déserts médicaux)</a:t>
+          </a:r>
+          <a:br>
+            <a:rPr lang="fr-FR" sz="1100" b="1" dirty="0">
+              <a:latin typeface="Gill Sans MT" panose="020B0502020104020203" pitchFamily="34" charset="0"/>
+            </a:rPr>
+          </a:br>
+          <a:br>
+            <a:rPr lang="fr-FR" sz="1100" b="1" dirty="0">
+              <a:latin typeface="Gill Sans MT" panose="020B0502020104020203" pitchFamily="34" charset="0"/>
+            </a:rPr>
+          </a:br>
+          <a:r>
+            <a:rPr lang="fr-FR" sz="1100" b="1" dirty="0">
+              <a:latin typeface="Gill Sans MT" panose="020B0502020104020203" pitchFamily="34" charset="0"/>
+            </a:rPr>
+            <a:t>[5]</a:t>
           </a:r>
           <a:endParaRPr lang="fr-FR" sz="1100" dirty="0">
             <a:latin typeface="Gill Sans MT" panose="020B0502020104020203" pitchFamily="34" charset="0"/>
@@ -1231,26 +1314,45 @@
         <a:lstStyle/>
         <a:p>
           <a:r>
-            <a:rPr lang="fr-FR" sz="1100" b="1">
+            <a:rPr lang="fr-FR" sz="1100" b="1" dirty="0">
+              <a:solidFill>
+                <a:srgbClr val="FFFF00"/>
+              </a:solidFill>
               <a:latin typeface="Gill Sans MT" panose="020B0502020104020203" pitchFamily="34" charset="0"/>
             </a:rPr>
             <a:t>↑ Négative</a:t>
           </a:r>
           <a:br>
-            <a:rPr lang="fr-FR" sz="1100" b="1">
+            <a:rPr lang="fr-FR" sz="1100" b="1" dirty="0">
               <a:latin typeface="Gill Sans MT" panose="020B0502020104020203" pitchFamily="34" charset="0"/>
             </a:rPr>
           </a:br>
           <a:br>
-            <a:rPr lang="fr-FR" sz="1100" b="1">
+            <a:rPr lang="fr-FR" sz="1100" b="1" dirty="0">
               <a:latin typeface="Gill Sans MT" panose="020B0502020104020203" pitchFamily="34" charset="0"/>
             </a:rPr>
           </a:br>
           <a:r>
-            <a:rPr lang="fr-FR" sz="1100" b="1">
+            <a:rPr lang="fr-FR" sz="1100" b="1" dirty="0">
               <a:latin typeface="Gill Sans MT" panose="020B0502020104020203" pitchFamily="34" charset="0"/>
             </a:rPr>
             <a:t>↓ Positive</a:t>
+          </a:r>
+          <a:br>
+            <a:rPr lang="fr-FR" sz="1100" b="1" dirty="0">
+              <a:latin typeface="Gill Sans MT" panose="020B0502020104020203" pitchFamily="34" charset="0"/>
+            </a:rPr>
+          </a:br>
+          <a:br>
+            <a:rPr lang="fr-FR" sz="1100" b="1" dirty="0">
+              <a:latin typeface="Gill Sans MT" panose="020B0502020104020203" pitchFamily="34" charset="0"/>
+            </a:rPr>
+          </a:br>
+          <a:r>
+            <a:rPr lang="fr-FR" sz="1100" b="1" dirty="0">
+              <a:latin typeface="Gill Sans MT" panose="020B0502020104020203" pitchFamily="34" charset="0"/>
+            </a:rPr>
+            <a:t>[2]</a:t>
           </a:r>
           <a:endParaRPr lang="fr-FR" sz="1100" dirty="0">
             <a:latin typeface="Gill Sans MT" panose="020B0502020104020203" pitchFamily="34" charset="0"/>
@@ -1354,7 +1456,7 @@
       <dgm:spPr/>
     </dgm:pt>
     <dgm:pt modelId="{BDD2DE81-D07F-484F-961E-38E5C95F5D54}" type="pres">
-      <dgm:prSet presAssocID="{F30E1AEC-B86D-402F-9383-B2C2CEA9D59A}" presName="rootText" presStyleLbl="node1" presStyleIdx="0" presStyleCnt="5" custScaleX="113844" custScaleY="140841">
+      <dgm:prSet presAssocID="{F30E1AEC-B86D-402F-9383-B2C2CEA9D59A}" presName="rootText" presStyleLbl="node1" presStyleIdx="0" presStyleCnt="5" custScaleX="131205" custScaleY="140841">
         <dgm:presLayoutVars>
           <dgm:chMax/>
           <dgm:chPref val="3"/>
@@ -1409,7 +1511,7 @@
       <dgm:spPr/>
     </dgm:pt>
     <dgm:pt modelId="{32A76272-9E49-496F-A151-2FF09D8F4C55}" type="pres">
-      <dgm:prSet presAssocID="{1B8A8D43-7EB5-444D-BBFB-0CC2421E86CF}" presName="titleText2" presStyleLbl="fgAcc1" presStyleIdx="1" presStyleCnt="5" custLinFactNeighborX="-2004" custLinFactNeighborY="95237">
+      <dgm:prSet presAssocID="{1B8A8D43-7EB5-444D-BBFB-0CC2421E86CF}" presName="titleText2" presStyleLbl="fgAcc1" presStyleIdx="1" presStyleCnt="5" custScaleX="133782" custScaleY="93667" custLinFactNeighborX="-2004" custLinFactNeighborY="95237">
         <dgm:presLayoutVars>
           <dgm:chMax val="0"/>
           <dgm:chPref val="0"/>
@@ -1492,7 +1594,7 @@
       <dgm:spPr/>
     </dgm:pt>
     <dgm:pt modelId="{E1A2814E-00AF-45FA-A764-DAAD560BFCBE}" type="pres">
-      <dgm:prSet presAssocID="{CC1A4EBB-A5C7-4AFC-9CC2-2A465CA24435}" presName="rootText" presStyleLbl="node1" presStyleIdx="3" presStyleCnt="5" custScaleX="109575" custScaleY="134478">
+      <dgm:prSet presAssocID="{CC1A4EBB-A5C7-4AFC-9CC2-2A465CA24435}" presName="rootText" presStyleLbl="node1" presStyleIdx="3" presStyleCnt="5" custScaleX="137786" custScaleY="134478">
         <dgm:presLayoutVars>
           <dgm:chMax/>
           <dgm:chPref val="3"/>
@@ -1538,7 +1640,7 @@
       <dgm:spPr/>
     </dgm:pt>
     <dgm:pt modelId="{CFEFEC0D-446F-499C-8192-A96275E4D758}" type="pres">
-      <dgm:prSet presAssocID="{81A5EA27-B2B7-47EE-ACDD-39B5E332E642}" presName="rootText" presStyleLbl="node1" presStyleIdx="4" presStyleCnt="5" custScaleX="115680" custScaleY="133521">
+      <dgm:prSet presAssocID="{81A5EA27-B2B7-47EE-ACDD-39B5E332E642}" presName="rootText" presStyleLbl="node1" presStyleIdx="4" presStyleCnt="5" custScaleX="157713" custScaleY="143801">
         <dgm:presLayoutVars>
           <dgm:chMax/>
           <dgm:chPref val="3"/>
@@ -1547,7 +1649,7 @@
       <dgm:spPr/>
     </dgm:pt>
     <dgm:pt modelId="{0E752C1A-A122-4566-B257-E4AEEFE31CAB}" type="pres">
-      <dgm:prSet presAssocID="{81A5EA27-B2B7-47EE-ACDD-39B5E332E642}" presName="titleText2" presStyleLbl="fgAcc1" presStyleIdx="4" presStyleCnt="5" custLinFactNeighborX="-13171" custLinFactNeighborY="83718">
+      <dgm:prSet presAssocID="{81A5EA27-B2B7-47EE-ACDD-39B5E332E642}" presName="titleText2" presStyleLbl="fgAcc1" presStyleIdx="4" presStyleCnt="5" custScaleX="145046" custScaleY="91006" custLinFactNeighborX="-1572" custLinFactNeighborY="84540">
         <dgm:presLayoutVars>
           <dgm:chMax val="0"/>
           <dgm:chPref val="0"/>
@@ -1679,8 +1781,8 @@
       </dsp:nvSpPr>
       <dsp:spPr>
         <a:xfrm>
-          <a:off x="5109171" y="2149316"/>
-          <a:ext cx="4277445" cy="433339"/>
+          <a:off x="5117417" y="2181585"/>
+          <a:ext cx="4109025" cy="384002"/>
         </a:xfrm>
         <a:custGeom>
           <a:avLst/>
@@ -1694,13 +1796,13 @@
                 <a:pt x="0" y="0"/>
               </a:moveTo>
               <a:lnTo>
-                <a:pt x="0" y="258336"/>
+                <a:pt x="0" y="228924"/>
               </a:lnTo>
               <a:lnTo>
-                <a:pt x="4277445" y="258336"/>
+                <a:pt x="4109025" y="228924"/>
               </a:lnTo>
               <a:lnTo>
-                <a:pt x="4277445" y="433339"/>
+                <a:pt x="4109025" y="384002"/>
               </a:lnTo>
             </a:path>
           </a:pathLst>
@@ -1741,8 +1843,8 @@
       </dsp:nvSpPr>
       <dsp:spPr>
         <a:xfrm>
-          <a:off x="5109171" y="2149316"/>
-          <a:ext cx="2220435" cy="433339"/>
+          <a:off x="5117417" y="2181585"/>
+          <a:ext cx="1902275" cy="384002"/>
         </a:xfrm>
         <a:custGeom>
           <a:avLst/>
@@ -1756,13 +1858,13 @@
                 <a:pt x="0" y="0"/>
               </a:moveTo>
               <a:lnTo>
-                <a:pt x="0" y="258336"/>
+                <a:pt x="0" y="228924"/>
               </a:lnTo>
               <a:lnTo>
-                <a:pt x="2220435" y="258336"/>
+                <a:pt x="1902275" y="228924"/>
               </a:lnTo>
               <a:lnTo>
-                <a:pt x="2220435" y="433339"/>
+                <a:pt x="1902275" y="384002"/>
               </a:lnTo>
             </a:path>
           </a:pathLst>
@@ -1803,8 +1905,8 @@
       </dsp:nvSpPr>
       <dsp:spPr>
         <a:xfrm>
-          <a:off x="5109171" y="2149316"/>
-          <a:ext cx="155588" cy="433339"/>
+          <a:off x="5008866" y="2181585"/>
+          <a:ext cx="108551" cy="384002"/>
         </a:xfrm>
         <a:custGeom>
           <a:avLst/>
@@ -1815,16 +1917,16 @@
           <a:pathLst>
             <a:path>
               <a:moveTo>
-                <a:pt x="0" y="0"/>
+                <a:pt x="108551" y="0"/>
               </a:moveTo>
               <a:lnTo>
-                <a:pt x="0" y="258336"/>
+                <a:pt x="108551" y="228924"/>
               </a:lnTo>
               <a:lnTo>
-                <a:pt x="155588" y="258336"/>
+                <a:pt x="0" y="228924"/>
               </a:lnTo>
               <a:lnTo>
-                <a:pt x="155588" y="433339"/>
+                <a:pt x="0" y="384002"/>
               </a:lnTo>
             </a:path>
           </a:pathLst>
@@ -1865,8 +1967,8 @@
       </dsp:nvSpPr>
       <dsp:spPr>
         <a:xfrm>
-          <a:off x="3072350" y="2149316"/>
-          <a:ext cx="2036820" cy="433339"/>
+          <a:off x="2917055" y="2181585"/>
+          <a:ext cx="2200361" cy="384002"/>
         </a:xfrm>
         <a:custGeom>
           <a:avLst/>
@@ -1877,16 +1979,16 @@
           <a:pathLst>
             <a:path>
               <a:moveTo>
-                <a:pt x="2036820" y="0"/>
+                <a:pt x="2200361" y="0"/>
               </a:moveTo>
               <a:lnTo>
-                <a:pt x="2036820" y="258336"/>
+                <a:pt x="2200361" y="228924"/>
               </a:lnTo>
               <a:lnTo>
-                <a:pt x="0" y="258336"/>
+                <a:pt x="0" y="228924"/>
               </a:lnTo>
               <a:lnTo>
-                <a:pt x="0" y="433339"/>
+                <a:pt x="0" y="384002"/>
               </a:lnTo>
             </a:path>
           </a:pathLst>
@@ -1927,8 +2029,8 @@
       </dsp:nvSpPr>
       <dsp:spPr>
         <a:xfrm>
-          <a:off x="931996" y="2149316"/>
-          <a:ext cx="4177174" cy="433339"/>
+          <a:off x="948468" y="2181585"/>
+          <a:ext cx="4168949" cy="384002"/>
         </a:xfrm>
         <a:custGeom>
           <a:avLst/>
@@ -1939,16 +2041,16 @@
           <a:pathLst>
             <a:path>
               <a:moveTo>
-                <a:pt x="4177174" y="0"/>
+                <a:pt x="4168949" y="0"/>
               </a:moveTo>
               <a:lnTo>
-                <a:pt x="4177174" y="258336"/>
+                <a:pt x="4168949" y="228924"/>
               </a:lnTo>
               <a:lnTo>
-                <a:pt x="0" y="258336"/>
+                <a:pt x="0" y="228924"/>
               </a:lnTo>
               <a:lnTo>
-                <a:pt x="0" y="433339"/>
+                <a:pt x="0" y="384002"/>
               </a:lnTo>
             </a:path>
           </a:pathLst>
@@ -1989,8 +2091,8 @@
       </dsp:nvSpPr>
       <dsp:spPr>
         <a:xfrm>
-          <a:off x="4384881" y="1399306"/>
-          <a:ext cx="1448579" cy="750010"/>
+          <a:off x="4475589" y="1516965"/>
+          <a:ext cx="1283655" cy="664619"/>
         </a:xfrm>
         <a:prstGeom prst="rect">
           <a:avLst/>
@@ -2032,7 +2134,7 @@
         </a:fontRef>
       </dsp:style>
       <dsp:txBody>
-        <a:bodyPr spcFirstLastPara="0" vert="horz" wrap="square" lIns="11430" tIns="11430" rIns="11430" bIns="105835" numCol="1" spcCol="1270" anchor="ctr" anchorCtr="0">
+        <a:bodyPr spcFirstLastPara="0" vert="horz" wrap="square" lIns="11430" tIns="11430" rIns="11430" bIns="93785" numCol="1" spcCol="1270" anchor="ctr" anchorCtr="0">
           <a:noAutofit/>
         </a:bodyPr>
         <a:lstStyle/>
@@ -2058,8 +2160,8 @@
         </a:p>
       </dsp:txBody>
       <dsp:txXfrm>
-        <a:off x="4384881" y="1399306"/>
-        <a:ext cx="1448579" cy="750010"/>
+        <a:off x="4475589" y="1516965"/>
+        <a:ext cx="1283655" cy="664619"/>
       </dsp:txXfrm>
     </dsp:sp>
     <dsp:sp modelId="{9ADD0247-70CB-4D70-93AE-36E1EDE9B9A8}">
@@ -2069,8 +2171,8 @@
       </dsp:nvSpPr>
       <dsp:spPr>
         <a:xfrm>
-          <a:off x="4863871" y="2035983"/>
-          <a:ext cx="1303721" cy="250003"/>
+          <a:off x="4900045" y="2081155"/>
+          <a:ext cx="1155289" cy="221539"/>
         </a:xfrm>
         <a:prstGeom prst="rect">
           <a:avLst/>
@@ -2119,8 +2221,8 @@
         </a:p>
       </dsp:txBody>
       <dsp:txXfrm>
-        <a:off x="4863871" y="2035983"/>
-        <a:ext cx="1303721" cy="250003"/>
+        <a:off x="4900045" y="2081155"/>
+        <a:ext cx="1155289" cy="221539"/>
       </dsp:txXfrm>
     </dsp:sp>
     <dsp:sp modelId="{BDD2DE81-D07F-484F-961E-38E5C95F5D54}">
@@ -2130,8 +2232,8 @@
       </dsp:nvSpPr>
       <dsp:spPr>
         <a:xfrm>
-          <a:off x="107435" y="2582655"/>
-          <a:ext cx="1649120" cy="1056321"/>
+          <a:off x="106358" y="2565588"/>
+          <a:ext cx="1684220" cy="936057"/>
         </a:xfrm>
         <a:prstGeom prst="rect">
           <a:avLst/>
@@ -2173,7 +2275,7 @@
         </a:fontRef>
       </dsp:style>
       <dsp:txBody>
-        <a:bodyPr spcFirstLastPara="0" vert="horz" wrap="square" lIns="6985" tIns="6985" rIns="6985" bIns="105835" numCol="1" spcCol="1270" anchor="ctr" anchorCtr="0">
+        <a:bodyPr spcFirstLastPara="0" vert="horz" wrap="square" lIns="6985" tIns="6985" rIns="6985" bIns="93785" numCol="1" spcCol="1270" anchor="ctr" anchorCtr="0">
           <a:noAutofit/>
         </a:bodyPr>
         <a:lstStyle/>
@@ -2192,9 +2294,18 @@
           </a:pPr>
           <a:r>
             <a:rPr lang="fr-FR" sz="1100" b="1" kern="1200" dirty="0">
+              <a:solidFill>
+                <a:srgbClr val="FFFF00"/>
+              </a:solidFill>
               <a:latin typeface="Gill Sans MT" panose="020B0502020104020203" pitchFamily="34" charset="0"/>
             </a:rPr>
-            <a:t>↑ 65-79 ans (chroniques)</a:t>
+            <a:t>↑ 65-79 ans </a:t>
+          </a:r>
+          <a:r>
+            <a:rPr lang="fr-FR" sz="1100" b="1" kern="1200" dirty="0">
+              <a:latin typeface="Gill Sans MT" panose="020B0502020104020203" pitchFamily="34" charset="0"/>
+            </a:rPr>
+            <a:t>(chroniques)</a:t>
           </a:r>
           <a:br>
             <a:rPr lang="fr-FR" sz="1100" b="1" kern="1200" dirty="0">
@@ -2212,14 +2323,30 @@
             </a:rPr>
             <a:t>↓ 18-35 ans (sporadiques)</a:t>
           </a:r>
+          <a:br>
+            <a:rPr lang="fr-FR" sz="1100" b="1" kern="1200" dirty="0">
+              <a:latin typeface="Gill Sans MT" panose="020B0502020104020203" pitchFamily="34" charset="0"/>
+            </a:rPr>
+          </a:br>
+          <a:br>
+            <a:rPr lang="fr-FR" sz="1100" b="1" kern="1200" dirty="0">
+              <a:latin typeface="Gill Sans MT" panose="020B0502020104020203" pitchFamily="34" charset="0"/>
+            </a:rPr>
+          </a:br>
+          <a:r>
+            <a:rPr lang="fr-FR" sz="1100" b="1" kern="1200" dirty="0">
+              <a:latin typeface="Gill Sans MT" panose="020B0502020104020203" pitchFamily="34" charset="0"/>
+            </a:rPr>
+            <a:t>[1]</a:t>
+          </a:r>
           <a:endParaRPr lang="fr-FR" sz="1100" kern="1200" dirty="0">
             <a:latin typeface="Gill Sans MT" panose="020B0502020104020203" pitchFamily="34" charset="0"/>
           </a:endParaRPr>
         </a:p>
       </dsp:txBody>
       <dsp:txXfrm>
-        <a:off x="107435" y="2582655"/>
-        <a:ext cx="1649120" cy="1056321"/>
+        <a:off x="106358" y="2565588"/>
+        <a:ext cx="1684220" cy="936057"/>
       </dsp:txXfrm>
     </dsp:sp>
     <dsp:sp modelId="{EB73548C-7AE5-4B06-85AE-EBA1DB090AD4}">
@@ -2229,8 +2356,8 @@
       </dsp:nvSpPr>
       <dsp:spPr>
         <a:xfrm>
-          <a:off x="442913" y="3523542"/>
-          <a:ext cx="1303721" cy="250003"/>
+          <a:off x="515068" y="3399353"/>
+          <a:ext cx="1155289" cy="221539"/>
         </a:xfrm>
         <a:prstGeom prst="rect">
           <a:avLst/>
@@ -2297,8 +2424,8 @@
         </a:p>
       </dsp:txBody>
       <dsp:txXfrm>
-        <a:off x="442913" y="3523542"/>
-        <a:ext cx="1303721" cy="250003"/>
+        <a:off x="515068" y="3399353"/>
+        <a:ext cx="1155289" cy="221539"/>
       </dsp:txXfrm>
     </dsp:sp>
     <dsp:sp modelId="{72F22623-1BC5-4D5F-ADBD-969075903A51}">
@@ -2308,8 +2435,8 @@
       </dsp:nvSpPr>
       <dsp:spPr>
         <a:xfrm>
-          <a:off x="2151148" y="2582655"/>
-          <a:ext cx="1842404" cy="1030386"/>
+          <a:off x="2100734" y="2565588"/>
+          <a:ext cx="1632642" cy="913074"/>
         </a:xfrm>
         <a:prstGeom prst="rect">
           <a:avLst/>
@@ -2351,7 +2478,7 @@
         </a:fontRef>
       </dsp:style>
       <dsp:txBody>
-        <a:bodyPr spcFirstLastPara="0" vert="horz" wrap="square" lIns="6985" tIns="6985" rIns="6985" bIns="105835" numCol="1" spcCol="1270" anchor="ctr" anchorCtr="0">
+        <a:bodyPr spcFirstLastPara="0" vert="horz" wrap="square" lIns="6985" tIns="6985" rIns="6985" bIns="93785" numCol="1" spcCol="1270" anchor="ctr" anchorCtr="0">
           <a:noAutofit/>
         </a:bodyPr>
         <a:lstStyle/>
@@ -2369,26 +2496,45 @@
             <a:buNone/>
           </a:pPr>
           <a:r>
-            <a:rPr lang="fr-FR" sz="1100" b="1" kern="1200">
+            <a:rPr lang="fr-FR" sz="1100" b="1" kern="1200" dirty="0">
+              <a:solidFill>
+                <a:srgbClr val="FFFF00"/>
+              </a:solidFill>
               <a:latin typeface="Gill Sans MT" panose="020B0502020104020203" pitchFamily="34" charset="0"/>
             </a:rPr>
             <a:t>↑ Négative</a:t>
           </a:r>
           <a:br>
-            <a:rPr lang="fr-FR" sz="1100" b="1" kern="1200">
+            <a:rPr lang="fr-FR" sz="1100" b="1" kern="1200" dirty="0">
               <a:latin typeface="Gill Sans MT" panose="020B0502020104020203" pitchFamily="34" charset="0"/>
             </a:rPr>
           </a:br>
           <a:br>
-            <a:rPr lang="fr-FR" sz="1100" b="1" kern="1200">
+            <a:rPr lang="fr-FR" sz="1100" b="1" kern="1200" dirty="0">
               <a:latin typeface="Gill Sans MT" panose="020B0502020104020203" pitchFamily="34" charset="0"/>
             </a:rPr>
           </a:br>
           <a:r>
-            <a:rPr lang="fr-FR" sz="1100" b="1" kern="1200">
+            <a:rPr lang="fr-FR" sz="1100" b="1" kern="1200" dirty="0">
               <a:latin typeface="Gill Sans MT" panose="020B0502020104020203" pitchFamily="34" charset="0"/>
             </a:rPr>
             <a:t>↓ Positive</a:t>
+          </a:r>
+          <a:br>
+            <a:rPr lang="fr-FR" sz="1100" b="1" kern="1200" dirty="0">
+              <a:latin typeface="Gill Sans MT" panose="020B0502020104020203" pitchFamily="34" charset="0"/>
+            </a:rPr>
+          </a:br>
+          <a:br>
+            <a:rPr lang="fr-FR" sz="1100" b="1" kern="1200" dirty="0">
+              <a:latin typeface="Gill Sans MT" panose="020B0502020104020203" pitchFamily="34" charset="0"/>
+            </a:rPr>
+          </a:br>
+          <a:r>
+            <a:rPr lang="fr-FR" sz="1100" b="1" kern="1200" dirty="0">
+              <a:latin typeface="Gill Sans MT" panose="020B0502020104020203" pitchFamily="34" charset="0"/>
+            </a:rPr>
+            <a:t>[2]</a:t>
           </a:r>
           <a:endParaRPr lang="fr-FR" sz="1100" kern="1200" dirty="0">
             <a:latin typeface="Gill Sans MT" panose="020B0502020104020203" pitchFamily="34" charset="0"/>
@@ -2396,8 +2542,8 @@
         </a:p>
       </dsp:txBody>
       <dsp:txXfrm>
-        <a:off x="2151148" y="2582655"/>
-        <a:ext cx="1842404" cy="1030386"/>
+        <a:off x="2100734" y="2565588"/>
+        <a:ext cx="1632642" cy="913074"/>
       </dsp:txXfrm>
     </dsp:sp>
     <dsp:sp modelId="{32A76272-9E49-496F-A151-2FF09D8F4C55}">
@@ -2407,8 +2553,8 @@
       </dsp:nvSpPr>
       <dsp:spPr>
         <a:xfrm>
-          <a:off x="2611650" y="3544280"/>
-          <a:ext cx="1303721" cy="250003"/>
+          <a:off x="2313666" y="3424745"/>
+          <a:ext cx="1545569" cy="207509"/>
         </a:xfrm>
         <a:prstGeom prst="rect">
           <a:avLst/>
@@ -2475,8 +2621,8 @@
         </a:p>
       </dsp:txBody>
       <dsp:txXfrm>
-        <a:off x="2611650" y="3544280"/>
-        <a:ext cx="1303721" cy="250003"/>
+        <a:off x="2313666" y="3424745"/>
+        <a:ext cx="1545569" cy="207509"/>
       </dsp:txXfrm>
     </dsp:sp>
     <dsp:sp modelId="{2373B881-9F7A-4D31-8CA7-C9F47C7E0CAA}">
@@ -2486,8 +2632,8 @@
       </dsp:nvSpPr>
       <dsp:spPr>
         <a:xfrm>
-          <a:off x="4343557" y="2582655"/>
-          <a:ext cx="1842404" cy="1030386"/>
+          <a:off x="4192544" y="2565588"/>
+          <a:ext cx="1632642" cy="913074"/>
         </a:xfrm>
         <a:prstGeom prst="rect">
           <a:avLst/>
@@ -2529,7 +2675,7 @@
         </a:fontRef>
       </dsp:style>
       <dsp:txBody>
-        <a:bodyPr spcFirstLastPara="0" vert="horz" wrap="square" lIns="6985" tIns="6985" rIns="6985" bIns="105835" numCol="1" spcCol="1270" anchor="ctr" anchorCtr="0">
+        <a:bodyPr spcFirstLastPara="0" vert="horz" wrap="square" lIns="6985" tIns="6985" rIns="6985" bIns="93785" numCol="1" spcCol="1270" anchor="ctr" anchorCtr="0">
           <a:noAutofit/>
         </a:bodyPr>
         <a:lstStyle/>
@@ -2548,6 +2694,9 @@
           </a:pPr>
           <a:r>
             <a:rPr lang="fr-FR" sz="1100" b="1" kern="1200" dirty="0">
+              <a:solidFill>
+                <a:srgbClr val="FFFF00"/>
+              </a:solidFill>
               <a:latin typeface="Gill Sans MT" panose="020B0502020104020203" pitchFamily="34" charset="0"/>
             </a:rPr>
             <a:t>↑ Revenus Elevés</a:t>
@@ -2568,14 +2717,30 @@
             </a:rPr>
             <a:t>↓ Précarités (obstacles)</a:t>
           </a:r>
+          <a:br>
+            <a:rPr lang="fr-FR" sz="1100" b="1" kern="1200" dirty="0">
+              <a:latin typeface="Gill Sans MT" panose="020B0502020104020203" pitchFamily="34" charset="0"/>
+            </a:rPr>
+          </a:br>
+          <a:br>
+            <a:rPr lang="fr-FR" sz="1100" b="1" kern="1200" dirty="0">
+              <a:latin typeface="Gill Sans MT" panose="020B0502020104020203" pitchFamily="34" charset="0"/>
+            </a:rPr>
+          </a:br>
+          <a:r>
+            <a:rPr lang="fr-FR" sz="1100" b="1" kern="1200" dirty="0">
+              <a:latin typeface="Gill Sans MT" panose="020B0502020104020203" pitchFamily="34" charset="0"/>
+            </a:rPr>
+            <a:t>[3]</a:t>
+          </a:r>
           <a:endParaRPr lang="fr-FR" sz="1100" kern="1200" dirty="0">
             <a:latin typeface="Gill Sans MT" panose="020B0502020104020203" pitchFamily="34" charset="0"/>
           </a:endParaRPr>
         </a:p>
       </dsp:txBody>
       <dsp:txXfrm>
-        <a:off x="4343557" y="2582655"/>
-        <a:ext cx="1842404" cy="1030386"/>
+        <a:off x="4192544" y="2565588"/>
+        <a:ext cx="1632642" cy="913074"/>
       </dsp:txXfrm>
     </dsp:sp>
     <dsp:sp modelId="{99D4BADF-3E2D-4967-8622-57EF488432BC}">
@@ -2585,8 +2750,8 @@
       </dsp:nvSpPr>
       <dsp:spPr>
         <a:xfrm>
-          <a:off x="4769014" y="3501000"/>
-          <a:ext cx="1303721" cy="250003"/>
+          <a:off x="4569563" y="3379377"/>
+          <a:ext cx="1155289" cy="221539"/>
         </a:xfrm>
         <a:prstGeom prst="rect">
           <a:avLst/>
@@ -2653,8 +2818,8 @@
         </a:p>
       </dsp:txBody>
       <dsp:txXfrm>
-        <a:off x="4769014" y="3501000"/>
-        <a:ext cx="1303721" cy="250003"/>
+        <a:off x="4569563" y="3379377"/>
+        <a:ext cx="1155289" cy="221539"/>
       </dsp:txXfrm>
     </dsp:sp>
     <dsp:sp modelId="{E1A2814E-00AF-45FA-A764-DAAD560BFCBE}">
@@ -2664,8 +2829,8 @@
       </dsp:nvSpPr>
       <dsp:spPr>
         <a:xfrm>
-          <a:off x="6535966" y="2582655"/>
-          <a:ext cx="1587280" cy="1008598"/>
+          <a:off x="6135343" y="2565588"/>
+          <a:ext cx="1768697" cy="893767"/>
         </a:xfrm>
         <a:prstGeom prst="rect">
           <a:avLst/>
@@ -2707,7 +2872,7 @@
         </a:fontRef>
       </dsp:style>
       <dsp:txBody>
-        <a:bodyPr spcFirstLastPara="0" vert="horz" wrap="square" lIns="6985" tIns="6985" rIns="6985" bIns="105835" numCol="1" spcCol="1270" anchor="ctr" anchorCtr="0">
+        <a:bodyPr spcFirstLastPara="0" vert="horz" wrap="square" lIns="6985" tIns="6985" rIns="6985" bIns="93785" numCol="1" spcCol="1270" anchor="ctr" anchorCtr="0">
           <a:noAutofit/>
         </a:bodyPr>
         <a:lstStyle/>
@@ -2726,6 +2891,9 @@
           </a:pPr>
           <a:r>
             <a:rPr lang="fr-FR" sz="1100" b="1" kern="1200" dirty="0">
+              <a:solidFill>
+                <a:srgbClr val="FFFF00"/>
+              </a:solidFill>
               <a:latin typeface="Gill Sans MT" panose="020B0502020104020203" pitchFamily="34" charset="0"/>
             </a:rPr>
             <a:t>↑ Femmes (préventif)</a:t>
@@ -2746,14 +2914,30 @@
             </a:rPr>
             <a:t>↓ Hommes (sous-utilisent)</a:t>
           </a:r>
+          <a:br>
+            <a:rPr lang="fr-FR" sz="1100" b="1" kern="1200" dirty="0">
+              <a:latin typeface="Gill Sans MT" panose="020B0502020104020203" pitchFamily="34" charset="0"/>
+            </a:rPr>
+          </a:br>
+          <a:br>
+            <a:rPr lang="fr-FR" sz="1100" b="1" kern="1200" dirty="0">
+              <a:latin typeface="Gill Sans MT" panose="020B0502020104020203" pitchFamily="34" charset="0"/>
+            </a:rPr>
+          </a:br>
+          <a:r>
+            <a:rPr lang="fr-FR" sz="1100" b="1" kern="1200" dirty="0">
+              <a:latin typeface="Gill Sans MT" panose="020B0502020104020203" pitchFamily="34" charset="0"/>
+            </a:rPr>
+            <a:t>[4]</a:t>
+          </a:r>
           <a:endParaRPr lang="fr-FR" sz="1100" kern="1200" dirty="0">
             <a:latin typeface="Gill Sans MT" panose="020B0502020104020203" pitchFamily="34" charset="0"/>
           </a:endParaRPr>
         </a:p>
       </dsp:txBody>
       <dsp:txXfrm>
-        <a:off x="6535966" y="2582655"/>
-        <a:ext cx="1587280" cy="1008598"/>
+        <a:off x="6135343" y="2565588"/>
+        <a:ext cx="1768697" cy="893767"/>
       </dsp:txXfrm>
     </dsp:sp>
     <dsp:sp modelId="{1F8D5F11-8910-46E1-B068-44E45FF3E6FF}">
@@ -2763,8 +2947,8 @@
       </dsp:nvSpPr>
       <dsp:spPr>
         <a:xfrm>
-          <a:off x="6764569" y="3500998"/>
-          <a:ext cx="1303721" cy="250003"/>
+          <a:off x="6518985" y="3379376"/>
+          <a:ext cx="1155289" cy="221539"/>
         </a:xfrm>
         <a:prstGeom prst="rect">
           <a:avLst/>
@@ -2831,8 +3015,8 @@
         </a:p>
       </dsp:txBody>
       <dsp:txXfrm>
-        <a:off x="6764569" y="3500998"/>
-        <a:ext cx="1303721" cy="250003"/>
+        <a:off x="6518985" y="3379376"/>
+        <a:ext cx="1155289" cy="221539"/>
       </dsp:txXfrm>
     </dsp:sp>
     <dsp:sp modelId="{CFEFEC0D-446F-499C-8192-A96275E4D758}">
@@ -2842,8 +3026,8 @@
       </dsp:nvSpPr>
       <dsp:spPr>
         <a:xfrm>
-          <a:off x="8548758" y="2582655"/>
-          <a:ext cx="1675716" cy="1001420"/>
+          <a:off x="8214197" y="2565588"/>
+          <a:ext cx="2024491" cy="955730"/>
         </a:xfrm>
         <a:prstGeom prst="rect">
           <a:avLst/>
@@ -2885,7 +3069,7 @@
         </a:fontRef>
       </dsp:style>
       <dsp:txBody>
-        <a:bodyPr spcFirstLastPara="0" vert="horz" wrap="square" lIns="6985" tIns="6985" rIns="6985" bIns="105835" numCol="1" spcCol="1270" anchor="ctr" anchorCtr="0">
+        <a:bodyPr spcFirstLastPara="0" vert="horz" wrap="square" lIns="6985" tIns="6985" rIns="6985" bIns="93785" numCol="1" spcCol="1270" anchor="ctr" anchorCtr="0">
           <a:noAutofit/>
         </a:bodyPr>
         <a:lstStyle/>
@@ -2904,6 +3088,9 @@
           </a:pPr>
           <a:r>
             <a:rPr lang="fr-FR" sz="1100" b="1" kern="1200" dirty="0">
+              <a:solidFill>
+                <a:srgbClr val="FFFF00"/>
+              </a:solidFill>
               <a:latin typeface="Gill Sans MT" panose="020B0502020104020203" pitchFamily="34" charset="0"/>
             </a:rPr>
             <a:t>↑ Zones urbaines (denses)</a:t>
@@ -2924,14 +3111,30 @@
             </a:rPr>
             <a:t>↓ Zones rurales (déserts médicaux)</a:t>
           </a:r>
+          <a:br>
+            <a:rPr lang="fr-FR" sz="1100" b="1" kern="1200" dirty="0">
+              <a:latin typeface="Gill Sans MT" panose="020B0502020104020203" pitchFamily="34" charset="0"/>
+            </a:rPr>
+          </a:br>
+          <a:br>
+            <a:rPr lang="fr-FR" sz="1100" b="1" kern="1200" dirty="0">
+              <a:latin typeface="Gill Sans MT" panose="020B0502020104020203" pitchFamily="34" charset="0"/>
+            </a:rPr>
+          </a:br>
+          <a:r>
+            <a:rPr lang="fr-FR" sz="1100" b="1" kern="1200" dirty="0">
+              <a:latin typeface="Gill Sans MT" panose="020B0502020104020203" pitchFamily="34" charset="0"/>
+            </a:rPr>
+            <a:t>[5]</a:t>
+          </a:r>
           <a:endParaRPr lang="fr-FR" sz="1100" kern="1200" dirty="0">
             <a:latin typeface="Gill Sans MT" panose="020B0502020104020203" pitchFamily="34" charset="0"/>
           </a:endParaRPr>
         </a:p>
       </dsp:txBody>
       <dsp:txXfrm>
-        <a:off x="8548758" y="2582655"/>
-        <a:ext cx="1675716" cy="1001420"/>
+        <a:off x="8214197" y="2565588"/>
+        <a:ext cx="2024491" cy="955730"/>
       </dsp:txXfrm>
     </dsp:sp>
     <dsp:sp modelId="{0E752C1A-A122-4566-B257-E4AEEFE31CAB}">
@@ -2941,8 +3144,8 @@
       </dsp:nvSpPr>
       <dsp:spPr>
         <a:xfrm>
-          <a:off x="8780329" y="3501000"/>
-          <a:ext cx="1303721" cy="250003"/>
+          <a:off x="8562979" y="3425322"/>
+          <a:ext cx="1675701" cy="201614"/>
         </a:xfrm>
         <a:prstGeom prst="rect">
           <a:avLst/>
@@ -3009,8 +3212,8 @@
         </a:p>
       </dsp:txBody>
       <dsp:txXfrm>
-        <a:off x="8780329" y="3501000"/>
-        <a:ext cx="1303721" cy="250003"/>
+        <a:off x="8562979" y="3425322"/>
+        <a:ext cx="1675701" cy="201614"/>
       </dsp:txXfrm>
     </dsp:sp>
   </dsp:spTree>
@@ -5404,7 +5607,7 @@
           <a:p>
             <a:fld id="{EE097A57-0322-46FF-8CE5-DBA4BCCC1C9B}" type="slidenum">
               <a:rPr lang="fr-FR" smtClean="0"/>
-              <a:t>‹N°›</a:t>
+              <a:t>‹#›</a:t>
             </a:fld>
             <a:endParaRPr lang="fr-FR"/>
           </a:p>
@@ -5662,7 +5865,7 @@
           <a:p>
             <a:fld id="{45C44DBB-F87B-49EA-91FB-EDB78BBE8593}" type="slidenum">
               <a:rPr lang="fr-FR" smtClean="0"/>
-              <a:t>‹N°›</a:t>
+              <a:t>‹#›</a:t>
             </a:fld>
             <a:endParaRPr lang="fr-FR"/>
           </a:p>
@@ -7627,7 +7830,7 @@
             <a:fld id="{F546B7B7-7D14-4795-A998-350CFB2BDD43}" type="slidenum">
               <a:rPr lang="fr-FR" smtClean="0"/>
               <a:pPr/>
-              <a:t>‹N°›</a:t>
+              <a:t>‹#›</a:t>
             </a:fld>
             <a:endParaRPr lang="fr-FR"/>
           </a:p>
@@ -7724,7 +7927,7 @@
           <a:p>
             <a:fld id="{F546B7B7-7D14-4795-A998-350CFB2BDD43}" type="slidenum">
               <a:rPr lang="fr-FR" smtClean="0"/>
-              <a:t>‹N°›</a:t>
+              <a:t>‹#›</a:t>
             </a:fld>
             <a:endParaRPr lang="fr-FR"/>
           </a:p>
@@ -7893,7 +8096,7 @@
             <a:fld id="{F546B7B7-7D14-4795-A998-350CFB2BDD43}" type="slidenum">
               <a:rPr lang="fr-FR" smtClean="0"/>
               <a:pPr/>
-              <a:t>‹N°›</a:t>
+              <a:t>‹#›</a:t>
             </a:fld>
             <a:endParaRPr lang="fr-FR"/>
           </a:p>
@@ -8019,7 +8222,7 @@
             <a:fld id="{F546B7B7-7D14-4795-A998-350CFB2BDD43}" type="slidenum">
               <a:rPr lang="fr-FR" smtClean="0"/>
               <a:pPr/>
-              <a:t>‹N°›</a:t>
+              <a:t>‹#›</a:t>
             </a:fld>
             <a:endParaRPr lang="fr-FR"/>
           </a:p>
@@ -8379,7 +8582,7 @@
             <a:fld id="{F546B7B7-7D14-4795-A998-350CFB2BDD43}" type="slidenum">
               <a:rPr lang="fr-FR" smtClean="0"/>
               <a:pPr/>
-              <a:t>‹N°›</a:t>
+              <a:t>‹#›</a:t>
             </a:fld>
             <a:endParaRPr lang="fr-FR"/>
           </a:p>
@@ -8739,7 +8942,7 @@
             <a:fld id="{F546B7B7-7D14-4795-A998-350CFB2BDD43}" type="slidenum">
               <a:rPr lang="fr-FR" smtClean="0"/>
               <a:pPr/>
-              <a:t>‹N°›</a:t>
+              <a:t>‹#›</a:t>
             </a:fld>
             <a:endParaRPr lang="fr-FR"/>
           </a:p>
@@ -9099,7 +9302,7 @@
             <a:fld id="{F546B7B7-7D14-4795-A998-350CFB2BDD43}" type="slidenum">
               <a:rPr lang="fr-FR" smtClean="0"/>
               <a:pPr/>
-              <a:t>‹N°›</a:t>
+              <a:t>‹#›</a:t>
             </a:fld>
             <a:endParaRPr lang="fr-FR"/>
           </a:p>
@@ -9454,7 +9657,7 @@
             <a:fld id="{F546B7B7-7D14-4795-A998-350CFB2BDD43}" type="slidenum">
               <a:rPr lang="fr-FR" smtClean="0"/>
               <a:pPr/>
-              <a:t>‹N°›</a:t>
+              <a:t>‹#›</a:t>
             </a:fld>
             <a:endParaRPr lang="fr-FR"/>
           </a:p>
@@ -9809,7 +10012,7 @@
             <a:fld id="{F546B7B7-7D14-4795-A998-350CFB2BDD43}" type="slidenum">
               <a:rPr lang="fr-FR" smtClean="0"/>
               <a:pPr/>
-              <a:t>‹N°›</a:t>
+              <a:t>‹#›</a:t>
             </a:fld>
             <a:endParaRPr lang="fr-FR"/>
           </a:p>
@@ -10466,7 +10669,7 @@
             <a:fld id="{F546B7B7-7D14-4795-A998-350CFB2BDD43}" type="slidenum">
               <a:rPr lang="fr-FR" smtClean="0"/>
               <a:pPr/>
-              <a:t>‹N°›</a:t>
+              <a:t>‹#›</a:t>
             </a:fld>
             <a:endParaRPr lang="fr-FR"/>
           </a:p>
@@ -11022,7 +11225,7 @@
             <a:fld id="{F546B7B7-7D14-4795-A998-350CFB2BDD43}" type="slidenum">
               <a:rPr lang="fr-FR" smtClean="0"/>
               <a:pPr/>
-              <a:t>‹N°›</a:t>
+              <a:t>‹#›</a:t>
             </a:fld>
             <a:endParaRPr lang="fr-FR"/>
           </a:p>
@@ -11804,7 +12007,7 @@
             <a:fld id="{F546B7B7-7D14-4795-A998-350CFB2BDD43}" type="slidenum">
               <a:rPr lang="fr-FR" smtClean="0"/>
               <a:pPr/>
-              <a:t>‹N°›</a:t>
+              <a:t>‹#›</a:t>
             </a:fld>
             <a:endParaRPr lang="fr-FR"/>
           </a:p>
@@ -12926,7 +13129,7 @@
             <a:fld id="{F546B7B7-7D14-4795-A998-350CFB2BDD43}" type="slidenum">
               <a:rPr lang="fr-FR" smtClean="0"/>
               <a:pPr/>
-              <a:t>‹N°›</a:t>
+              <a:t>‹#›</a:t>
             </a:fld>
             <a:endParaRPr lang="fr-FR"/>
           </a:p>
@@ -16758,6 +16961,43 @@
           <a:p>
             <a:pPr algn="ctr"/>
             <a:endParaRPr lang="en-US" dirty="0"/>
+          </a:p>
+        </p:txBody>
+      </p:sp>
+      <p:sp>
+        <p:nvSpPr>
+          <p:cNvPr id="22" name="TextBox 21">
+            <a:extLst>
+              <a:ext uri="{FF2B5EF4-FFF2-40B4-BE49-F238E27FC236}">
+                <a16:creationId xmlns:a16="http://schemas.microsoft.com/office/drawing/2014/main" id="{C4CC80D3-00C0-489C-A753-66B89582058E}"/>
+              </a:ext>
+            </a:extLst>
+          </p:cNvPr>
+          <p:cNvSpPr txBox="1"/>
+          <p:nvPr/>
+        </p:nvSpPr>
+        <p:spPr>
+          <a:xfrm>
+            <a:off x="7462102" y="6165273"/>
+            <a:ext cx="569453" cy="369332"/>
+          </a:xfrm>
+          <a:prstGeom prst="rect">
+            <a:avLst/>
+          </a:prstGeom>
+          <a:noFill/>
+        </p:spPr>
+        <p:txBody>
+          <a:bodyPr wrap="square" rtlCol="0">
+            <a:spAutoFit/>
+          </a:bodyPr>
+          <a:lstStyle/>
+          <a:p>
+            <a:r>
+              <a:rPr lang="fr-FR" dirty="0">
+                <a:latin typeface="Gill Sans MT" panose="020B0502020104020203" pitchFamily="34" charset="0"/>
+              </a:rPr>
+              <a:t>[6]</a:t>
+            </a:r>
           </a:p>
         </p:txBody>
       </p:sp>
@@ -28563,6 +28803,290 @@
   <p:cSld>
     <p:spTree>
       <p:nvGrpSpPr>
+        <p:cNvPr id="1" name="">
+          <a:extLst>
+            <a:ext uri="{FF2B5EF4-FFF2-40B4-BE49-F238E27FC236}">
+              <a16:creationId xmlns:a16="http://schemas.microsoft.com/office/drawing/2014/main" id="{9658799F-B625-DA42-E33E-CAA5585B1433}"/>
+            </a:ext>
+          </a:extLst>
+        </p:cNvPr>
+        <p:cNvGrpSpPr/>
+        <p:nvPr/>
+      </p:nvGrpSpPr>
+      <p:grpSpPr>
+        <a:xfrm>
+          <a:off x="0" y="0"/>
+          <a:ext cx="0" cy="0"/>
+          <a:chOff x="0" y="0"/>
+          <a:chExt cx="0" cy="0"/>
+        </a:xfrm>
+      </p:grpSpPr>
+      <p:sp>
+        <p:nvSpPr>
+          <p:cNvPr id="2" name="Espace réservé du numéro de diapositive 1">
+            <a:extLst>
+              <a:ext uri="{FF2B5EF4-FFF2-40B4-BE49-F238E27FC236}">
+                <a16:creationId xmlns:a16="http://schemas.microsoft.com/office/drawing/2014/main" id="{8F636E6D-2DFC-B1D8-B6A5-5D16D9A7B834}"/>
+              </a:ext>
+            </a:extLst>
+          </p:cNvPr>
+          <p:cNvSpPr>
+            <a:spLocks noGrp="1"/>
+          </p:cNvSpPr>
+          <p:nvPr>
+            <p:ph type="sldNum" sz="quarter" idx="4"/>
+          </p:nvPr>
+        </p:nvSpPr>
+        <p:spPr/>
+        <p:txBody>
+          <a:bodyPr/>
+          <a:lstStyle/>
+          <a:p>
+            <a:fld id="{F546B7B7-7D14-4795-A998-350CFB2BDD43}" type="slidenum">
+              <a:rPr lang="fr-FR" smtClean="0"/>
+              <a:pPr/>
+              <a:t>30</a:t>
+            </a:fld>
+            <a:endParaRPr lang="fr-FR" dirty="0"/>
+          </a:p>
+        </p:txBody>
+      </p:sp>
+      <p:sp>
+        <p:nvSpPr>
+          <p:cNvPr id="3" name="ZoneTexte 2">
+            <a:extLst>
+              <a:ext uri="{FF2B5EF4-FFF2-40B4-BE49-F238E27FC236}">
+                <a16:creationId xmlns:a16="http://schemas.microsoft.com/office/drawing/2014/main" id="{CE5A935D-6C97-6D69-D581-24F8704F08B1}"/>
+              </a:ext>
+            </a:extLst>
+          </p:cNvPr>
+          <p:cNvSpPr txBox="1"/>
+          <p:nvPr/>
+        </p:nvSpPr>
+        <p:spPr>
+          <a:xfrm>
+            <a:off x="2" y="532969"/>
+            <a:ext cx="12191999" cy="646331"/>
+          </a:xfrm>
+          <a:prstGeom prst="rect">
+            <a:avLst/>
+          </a:prstGeom>
+          <a:solidFill>
+            <a:srgbClr val="006A5A"/>
+          </a:solidFill>
+        </p:spPr>
+        <p:txBody>
+          <a:bodyPr wrap="square" rtlCol="0">
+            <a:spAutoFit/>
+          </a:bodyPr>
+          <a:lstStyle/>
+          <a:p>
+            <a:r>
+              <a:rPr lang="fr-FR" sz="3600" b="1" dirty="0">
+                <a:solidFill>
+                  <a:schemeClr val="bg1"/>
+                </a:solidFill>
+                <a:latin typeface="Gill Sans MT" panose="020B0502020104020203" pitchFamily="34" charset="0"/>
+              </a:rPr>
+              <a:t>Références Bibliographiques</a:t>
+            </a:r>
+          </a:p>
+        </p:txBody>
+      </p:sp>
+      <p:pic>
+        <p:nvPicPr>
+          <p:cNvPr id="4" name="Graphique 3" descr="Flèches de chevron">
+            <a:extLst>
+              <a:ext uri="{FF2B5EF4-FFF2-40B4-BE49-F238E27FC236}">
+                <a16:creationId xmlns:a16="http://schemas.microsoft.com/office/drawing/2014/main" id="{5656D646-2ADE-3673-AEFA-DA2A546191F0}"/>
+              </a:ext>
+            </a:extLst>
+          </p:cNvPr>
+          <p:cNvPicPr>
+            <a:picLocks noChangeAspect="1"/>
+          </p:cNvPicPr>
+          <p:nvPr/>
+        </p:nvPicPr>
+        <p:blipFill>
+          <a:blip r:embed="rId2">
+            <a:extLst>
+              <a:ext uri="{28A0092B-C50C-407E-A947-70E740481C1C}">
+                <a14:useLocalDpi xmlns:a14="http://schemas.microsoft.com/office/drawing/2010/main" val="0"/>
+              </a:ext>
+              <a:ext uri="{96DAC541-7B7A-43D3-8B79-37D633B846F1}">
+                <asvg:svgBlip xmlns:asvg="http://schemas.microsoft.com/office/drawing/2016/SVG/main" r:embed="rId3"/>
+              </a:ext>
+            </a:extLst>
+          </a:blip>
+          <a:stretch>
+            <a:fillRect/>
+          </a:stretch>
+        </p:blipFill>
+        <p:spPr>
+          <a:xfrm>
+            <a:off x="11078692" y="266700"/>
+            <a:ext cx="1170459" cy="1170459"/>
+          </a:xfrm>
+          <a:prstGeom prst="rect">
+            <a:avLst/>
+          </a:prstGeom>
+        </p:spPr>
+      </p:pic>
+      <p:sp>
+        <p:nvSpPr>
+          <p:cNvPr id="8" name="ZoneTexte 7">
+            <a:extLst>
+              <a:ext uri="{FF2B5EF4-FFF2-40B4-BE49-F238E27FC236}">
+                <a16:creationId xmlns:a16="http://schemas.microsoft.com/office/drawing/2014/main" id="{571F1102-DC3C-873A-C117-FAC24511C7FB}"/>
+              </a:ext>
+            </a:extLst>
+          </p:cNvPr>
+          <p:cNvSpPr txBox="1"/>
+          <p:nvPr/>
+        </p:nvSpPr>
+        <p:spPr>
+          <a:xfrm>
+            <a:off x="401720" y="1911595"/>
+            <a:ext cx="11262201" cy="3970318"/>
+          </a:xfrm>
+          <a:prstGeom prst="rect">
+            <a:avLst/>
+          </a:prstGeom>
+          <a:noFill/>
+        </p:spPr>
+        <p:txBody>
+          <a:bodyPr wrap="square">
+            <a:spAutoFit/>
+          </a:bodyPr>
+          <a:lstStyle/>
+          <a:p>
+            <a:pPr marL="342900" indent="-342900" algn="just">
+              <a:buFont typeface="Arial" panose="020B0604020202020204" pitchFamily="34" charset="0"/>
+              <a:buChar char="•"/>
+            </a:pPr>
+            <a:r>
+              <a:rPr lang="fr-FR" dirty="0">
+                <a:latin typeface="Gill Sans MT" panose="020B0502020104020203" pitchFamily="34" charset="0"/>
+              </a:rPr>
+              <a:t>[1] Ministère de la Santé et des Services sociaux Québec. Proportion de la population de 12 ans et plus ayant consulté un médecin au cours des 12 derniers mois, selon le sexe et selon le groupe d’âge, Québec, 2013-2014. 2014.</a:t>
+            </a:r>
+          </a:p>
+          <a:p>
+            <a:pPr marL="342900" indent="-342900" algn="just">
+              <a:buFont typeface="Arial" panose="020B0604020202020204" pitchFamily="34" charset="0"/>
+              <a:buChar char="•"/>
+            </a:pPr>
+            <a:endParaRPr lang="fr-FR" dirty="0">
+              <a:latin typeface="Gill Sans MT" panose="020B0502020104020203" pitchFamily="34" charset="0"/>
+            </a:endParaRPr>
+          </a:p>
+          <a:p>
+            <a:pPr marL="342900" indent="-342900" algn="just">
+              <a:buFont typeface="Arial" panose="020B0604020202020204" pitchFamily="34" charset="0"/>
+              <a:buChar char="•"/>
+            </a:pPr>
+            <a:r>
+              <a:rPr lang="fr-FR" dirty="0">
+                <a:latin typeface="Gill Sans MT" panose="020B0502020104020203" pitchFamily="34" charset="0"/>
+              </a:rPr>
+              <a:t>[2] Statistique Canada. Fréquence des consultations médicales et facteurs sociodémographiques. 2022.</a:t>
+            </a:r>
+          </a:p>
+          <a:p>
+            <a:pPr algn="just"/>
+            <a:endParaRPr lang="fr-FR" dirty="0">
+              <a:latin typeface="Gill Sans MT" panose="020B0502020104020203" pitchFamily="34" charset="0"/>
+            </a:endParaRPr>
+          </a:p>
+          <a:p>
+            <a:pPr marL="342900" indent="-342900" algn="just">
+              <a:buFont typeface="Arial" panose="020B0604020202020204" pitchFamily="34" charset="0"/>
+              <a:buChar char="•"/>
+            </a:pPr>
+            <a:r>
+              <a:rPr lang="fr-FR" dirty="0">
+                <a:latin typeface="Gill Sans MT" panose="020B0502020104020203" pitchFamily="34" charset="0"/>
+              </a:rPr>
+              <a:t>[3] BVS Santé. Facteurs influençant l’accès aux soins médicaux en milieu défavorisé. 2023.</a:t>
+            </a:r>
+          </a:p>
+          <a:p>
+            <a:pPr algn="just"/>
+            <a:endParaRPr lang="fr-FR" dirty="0">
+              <a:latin typeface="Gill Sans MT" panose="020B0502020104020203" pitchFamily="34" charset="0"/>
+            </a:endParaRPr>
+          </a:p>
+          <a:p>
+            <a:pPr marL="342900" indent="-342900" algn="just">
+              <a:buFont typeface="Arial" panose="020B0604020202020204" pitchFamily="34" charset="0"/>
+              <a:buChar char="•"/>
+            </a:pPr>
+            <a:r>
+              <a:rPr lang="fr-FR" dirty="0">
+                <a:latin typeface="Gill Sans MT" panose="020B0502020104020203" pitchFamily="34" charset="0"/>
+              </a:rPr>
+              <a:t>[4] Office fédéral de la santé publique. Santé des femmes et accès aux soins en Suisse. 2024.</a:t>
+            </a:r>
+          </a:p>
+          <a:p>
+            <a:pPr marL="342900" indent="-342900" algn="just">
+              <a:buFont typeface="Arial" panose="020B0604020202020204" pitchFamily="34" charset="0"/>
+              <a:buChar char="•"/>
+            </a:pPr>
+            <a:endParaRPr lang="fr-FR" dirty="0">
+              <a:latin typeface="Gill Sans MT" panose="020B0502020104020203" pitchFamily="34" charset="0"/>
+            </a:endParaRPr>
+          </a:p>
+          <a:p>
+            <a:pPr marL="342900" indent="-342900" algn="just">
+              <a:buFont typeface="Arial" panose="020B0604020202020204" pitchFamily="34" charset="0"/>
+              <a:buChar char="•"/>
+            </a:pPr>
+            <a:r>
+              <a:rPr lang="fr-FR" dirty="0">
+                <a:latin typeface="Gill Sans MT" panose="020B0502020104020203" pitchFamily="34" charset="0"/>
+              </a:rPr>
+              <a:t>[5] IRDES. Inégalités spatiales d’accessibilité aux soins médicaux. 2020.</a:t>
+            </a:r>
+          </a:p>
+          <a:p>
+            <a:pPr algn="just"/>
+            <a:endParaRPr lang="fr-FR" dirty="0">
+              <a:latin typeface="Gill Sans MT" panose="020B0502020104020203" pitchFamily="34" charset="0"/>
+            </a:endParaRPr>
+          </a:p>
+          <a:p>
+            <a:pPr marL="342900" indent="-342900" algn="just">
+              <a:buFont typeface="Arial" panose="020B0604020202020204" pitchFamily="34" charset="0"/>
+              <a:buChar char="•"/>
+            </a:pPr>
+            <a:r>
+              <a:rPr lang="fr-FR" dirty="0">
+                <a:latin typeface="Gill Sans MT" panose="020B0502020104020203" pitchFamily="34" charset="0"/>
+              </a:rPr>
+              <a:t>[6] Institut national de la statistique et des études économiques (INSEE). Manuel d’analyse spatiale. Insee Eurostat, Montrouge, France, 2018. Chapitres 1, 3 et 6.</a:t>
+            </a:r>
+          </a:p>
+        </p:txBody>
+      </p:sp>
+    </p:spTree>
+    <p:extLst>
+      <p:ext uri="{BB962C8B-B14F-4D97-AF65-F5344CB8AC3E}">
+        <p14:creationId xmlns:p14="http://schemas.microsoft.com/office/powerpoint/2010/main" val="1603522567"/>
+      </p:ext>
+    </p:extLst>
+  </p:cSld>
+  <p:clrMapOvr>
+    <a:masterClrMapping/>
+  </p:clrMapOvr>
+</p:sld>
+</file>
+
+<file path=ppt/slides/slide31.xml><?xml version="1.0" encoding="utf-8"?>
+<p:sld xmlns:a="http://schemas.openxmlformats.org/drawingml/2006/main" xmlns:r="http://schemas.openxmlformats.org/officeDocument/2006/relationships" xmlns:p="http://schemas.openxmlformats.org/presentationml/2006/main">
+  <p:cSld>
+    <p:spTree>
+      <p:nvGrpSpPr>
         <p:cNvPr id="1" name=""/>
         <p:cNvGrpSpPr/>
         <p:nvPr/>
@@ -28705,7 +29229,7 @@
                 <a:latin typeface="Montserrat" panose="02000505000000020004" pitchFamily="2" charset="0"/>
               </a:rPr>
               <a:pPr algn="r"/>
-              <a:t>30</a:t>
+              <a:t>31</a:t>
             </a:fld>
             <a:endParaRPr lang="fr-FR" dirty="0">
               <a:solidFill>
@@ -31558,13 +32082,13 @@
           <p:nvPr>
             <p:extLst>
               <p:ext uri="{D42A27DB-BD31-4B8C-83A1-F6EECF244321}">
-                <p14:modId xmlns:p14="http://schemas.microsoft.com/office/powerpoint/2010/main" val="4006748103"/>
+                <p14:modId xmlns:p14="http://schemas.microsoft.com/office/powerpoint/2010/main" val="2442475386"/>
               </p:ext>
             </p:extLst>
           </p:nvPr>
         </p:nvGraphicFramePr>
         <p:xfrm>
-          <a:off x="838200" y="1553016"/>
+          <a:off x="838200" y="887739"/>
           <a:ext cx="10363200" cy="5038284"/>
         </p:xfrm>
         <a:graphic>

</xml_diff>